<commit_message>
2021073 updates to project files.
</commit_message>
<xml_diff>
--- a/docs/Project 0.pptx
+++ b/docs/Project 0.pptx
@@ -137,7 +137,7 @@
           <p:cNvPr id="2" name="Title 1">
             <a:extLst>
               <a:ext uri="{FF2B5EF4-FFF2-40B4-BE49-F238E27FC236}">
-                <a16:creationId xmlns:a16="http://schemas.microsoft.com/office/drawing/2014/main" id="{67106D7E-D400-44F1-9A1A-D68CE501C73D}"/>
+                <a16:creationId xmlns:a16="http://schemas.microsoft.com/office/drawing/2014/main" xmlns="" id="{67106D7E-D400-44F1-9A1A-D68CE501C73D}"/>
               </a:ext>
             </a:extLst>
           </p:cNvPr>
@@ -174,7 +174,7 @@
           <p:cNvPr id="3" name="Subtitle 2">
             <a:extLst>
               <a:ext uri="{FF2B5EF4-FFF2-40B4-BE49-F238E27FC236}">
-                <a16:creationId xmlns:a16="http://schemas.microsoft.com/office/drawing/2014/main" id="{A5FDE527-E621-4639-A0C7-E1E9B0DFBCEC}"/>
+                <a16:creationId xmlns:a16="http://schemas.microsoft.com/office/drawing/2014/main" xmlns="" id="{A5FDE527-E621-4639-A0C7-E1E9B0DFBCEC}"/>
               </a:ext>
             </a:extLst>
           </p:cNvPr>
@@ -244,7 +244,7 @@
           <p:cNvPr id="4" name="Date Placeholder 3">
             <a:extLst>
               <a:ext uri="{FF2B5EF4-FFF2-40B4-BE49-F238E27FC236}">
-                <a16:creationId xmlns:a16="http://schemas.microsoft.com/office/drawing/2014/main" id="{E109CE88-B989-4109-89C8-36F7C245DB1C}"/>
+                <a16:creationId xmlns:a16="http://schemas.microsoft.com/office/drawing/2014/main" xmlns="" id="{E109CE88-B989-4109-89C8-36F7C245DB1C}"/>
               </a:ext>
             </a:extLst>
           </p:cNvPr>
@@ -262,7 +262,7 @@
           <a:p>
             <a:fld id="{6C733091-19F0-4DD7-90FE-000B4789B4CF}" type="datetimeFigureOut">
               <a:rPr lang="en-US" smtClean="0"/>
-              <a:t>7/29/2021</a:t>
+              <a:t>7/30/2021</a:t>
             </a:fld>
             <a:endParaRPr lang="en-US"/>
           </a:p>
@@ -273,7 +273,7 @@
           <p:cNvPr id="5" name="Footer Placeholder 4">
             <a:extLst>
               <a:ext uri="{FF2B5EF4-FFF2-40B4-BE49-F238E27FC236}">
-                <a16:creationId xmlns:a16="http://schemas.microsoft.com/office/drawing/2014/main" id="{0841498F-B991-43D3-B408-CC35D8EFCF37}"/>
+                <a16:creationId xmlns:a16="http://schemas.microsoft.com/office/drawing/2014/main" xmlns="" id="{0841498F-B991-43D3-B408-CC35D8EFCF37}"/>
               </a:ext>
             </a:extLst>
           </p:cNvPr>
@@ -298,7 +298,7 @@
           <p:cNvPr id="6" name="Slide Number Placeholder 5">
             <a:extLst>
               <a:ext uri="{FF2B5EF4-FFF2-40B4-BE49-F238E27FC236}">
-                <a16:creationId xmlns:a16="http://schemas.microsoft.com/office/drawing/2014/main" id="{01754CB8-17B1-45A0-AE7D-755EAA1B69D8}"/>
+                <a16:creationId xmlns:a16="http://schemas.microsoft.com/office/drawing/2014/main" xmlns="" id="{01754CB8-17B1-45A0-AE7D-755EAA1B69D8}"/>
               </a:ext>
             </a:extLst>
           </p:cNvPr>
@@ -357,7 +357,7 @@
           <p:cNvPr id="2" name="Title 1">
             <a:extLst>
               <a:ext uri="{FF2B5EF4-FFF2-40B4-BE49-F238E27FC236}">
-                <a16:creationId xmlns:a16="http://schemas.microsoft.com/office/drawing/2014/main" id="{E7A7B055-5DC2-440D-83C1-CAAE8E9A8E14}"/>
+                <a16:creationId xmlns:a16="http://schemas.microsoft.com/office/drawing/2014/main" xmlns="" id="{E7A7B055-5DC2-440D-83C1-CAAE8E9A8E14}"/>
               </a:ext>
             </a:extLst>
           </p:cNvPr>
@@ -385,7 +385,7 @@
           <p:cNvPr id="3" name="Vertical Text Placeholder 2">
             <a:extLst>
               <a:ext uri="{FF2B5EF4-FFF2-40B4-BE49-F238E27FC236}">
-                <a16:creationId xmlns:a16="http://schemas.microsoft.com/office/drawing/2014/main" id="{65710707-423D-4F9D-A49D-6C764C562553}"/>
+                <a16:creationId xmlns:a16="http://schemas.microsoft.com/office/drawing/2014/main" xmlns="" id="{65710707-423D-4F9D-A49D-6C764C562553}"/>
               </a:ext>
             </a:extLst>
           </p:cNvPr>
@@ -442,7 +442,7 @@
           <p:cNvPr id="4" name="Date Placeholder 3">
             <a:extLst>
               <a:ext uri="{FF2B5EF4-FFF2-40B4-BE49-F238E27FC236}">
-                <a16:creationId xmlns:a16="http://schemas.microsoft.com/office/drawing/2014/main" id="{98B6F7EF-D1BE-4437-85F3-99626E37E4EF}"/>
+                <a16:creationId xmlns:a16="http://schemas.microsoft.com/office/drawing/2014/main" xmlns="" id="{98B6F7EF-D1BE-4437-85F3-99626E37E4EF}"/>
               </a:ext>
             </a:extLst>
           </p:cNvPr>
@@ -460,7 +460,7 @@
           <a:p>
             <a:fld id="{6C733091-19F0-4DD7-90FE-000B4789B4CF}" type="datetimeFigureOut">
               <a:rPr lang="en-US" smtClean="0"/>
-              <a:t>7/29/2021</a:t>
+              <a:t>7/30/2021</a:t>
             </a:fld>
             <a:endParaRPr lang="en-US"/>
           </a:p>
@@ -471,7 +471,7 @@
           <p:cNvPr id="5" name="Footer Placeholder 4">
             <a:extLst>
               <a:ext uri="{FF2B5EF4-FFF2-40B4-BE49-F238E27FC236}">
-                <a16:creationId xmlns:a16="http://schemas.microsoft.com/office/drawing/2014/main" id="{D890AA9B-E479-4209-B245-83608F3D4013}"/>
+                <a16:creationId xmlns:a16="http://schemas.microsoft.com/office/drawing/2014/main" xmlns="" id="{D890AA9B-E479-4209-B245-83608F3D4013}"/>
               </a:ext>
             </a:extLst>
           </p:cNvPr>
@@ -496,7 +496,7 @@
           <p:cNvPr id="6" name="Slide Number Placeholder 5">
             <a:extLst>
               <a:ext uri="{FF2B5EF4-FFF2-40B4-BE49-F238E27FC236}">
-                <a16:creationId xmlns:a16="http://schemas.microsoft.com/office/drawing/2014/main" id="{0E4976E4-E15A-4296-A430-633D2BB9142B}"/>
+                <a16:creationId xmlns:a16="http://schemas.microsoft.com/office/drawing/2014/main" xmlns="" id="{0E4976E4-E15A-4296-A430-633D2BB9142B}"/>
               </a:ext>
             </a:extLst>
           </p:cNvPr>
@@ -555,7 +555,7 @@
           <p:cNvPr id="2" name="Vertical Title 1">
             <a:extLst>
               <a:ext uri="{FF2B5EF4-FFF2-40B4-BE49-F238E27FC236}">
-                <a16:creationId xmlns:a16="http://schemas.microsoft.com/office/drawing/2014/main" id="{66F63CF5-8DEE-4BB2-A2A5-5C16FEBE1AD5}"/>
+                <a16:creationId xmlns:a16="http://schemas.microsoft.com/office/drawing/2014/main" xmlns="" id="{66F63CF5-8DEE-4BB2-A2A5-5C16FEBE1AD5}"/>
               </a:ext>
             </a:extLst>
           </p:cNvPr>
@@ -588,7 +588,7 @@
           <p:cNvPr id="3" name="Vertical Text Placeholder 2">
             <a:extLst>
               <a:ext uri="{FF2B5EF4-FFF2-40B4-BE49-F238E27FC236}">
-                <a16:creationId xmlns:a16="http://schemas.microsoft.com/office/drawing/2014/main" id="{E0D5EBA5-94AF-4373-B032-A40FF73C7575}"/>
+                <a16:creationId xmlns:a16="http://schemas.microsoft.com/office/drawing/2014/main" xmlns="" id="{E0D5EBA5-94AF-4373-B032-A40FF73C7575}"/>
               </a:ext>
             </a:extLst>
           </p:cNvPr>
@@ -650,7 +650,7 @@
           <p:cNvPr id="4" name="Date Placeholder 3">
             <a:extLst>
               <a:ext uri="{FF2B5EF4-FFF2-40B4-BE49-F238E27FC236}">
-                <a16:creationId xmlns:a16="http://schemas.microsoft.com/office/drawing/2014/main" id="{7426B8E1-6758-4F5E-B618-96641332600B}"/>
+                <a16:creationId xmlns:a16="http://schemas.microsoft.com/office/drawing/2014/main" xmlns="" id="{7426B8E1-6758-4F5E-B618-96641332600B}"/>
               </a:ext>
             </a:extLst>
           </p:cNvPr>
@@ -668,7 +668,7 @@
           <a:p>
             <a:fld id="{6C733091-19F0-4DD7-90FE-000B4789B4CF}" type="datetimeFigureOut">
               <a:rPr lang="en-US" smtClean="0"/>
-              <a:t>7/29/2021</a:t>
+              <a:t>7/30/2021</a:t>
             </a:fld>
             <a:endParaRPr lang="en-US"/>
           </a:p>
@@ -679,7 +679,7 @@
           <p:cNvPr id="5" name="Footer Placeholder 4">
             <a:extLst>
               <a:ext uri="{FF2B5EF4-FFF2-40B4-BE49-F238E27FC236}">
-                <a16:creationId xmlns:a16="http://schemas.microsoft.com/office/drawing/2014/main" id="{F65E330E-2A7E-482D-AE0F-70EA5A29958B}"/>
+                <a16:creationId xmlns:a16="http://schemas.microsoft.com/office/drawing/2014/main" xmlns="" id="{F65E330E-2A7E-482D-AE0F-70EA5A29958B}"/>
               </a:ext>
             </a:extLst>
           </p:cNvPr>
@@ -704,7 +704,7 @@
           <p:cNvPr id="6" name="Slide Number Placeholder 5">
             <a:extLst>
               <a:ext uri="{FF2B5EF4-FFF2-40B4-BE49-F238E27FC236}">
-                <a16:creationId xmlns:a16="http://schemas.microsoft.com/office/drawing/2014/main" id="{B8000005-FC38-4A6C-9D09-7945EFA08160}"/>
+                <a16:creationId xmlns:a16="http://schemas.microsoft.com/office/drawing/2014/main" xmlns="" id="{B8000005-FC38-4A6C-9D09-7945EFA08160}"/>
               </a:ext>
             </a:extLst>
           </p:cNvPr>
@@ -763,7 +763,7 @@
           <p:cNvPr id="2" name="Title 1">
             <a:extLst>
               <a:ext uri="{FF2B5EF4-FFF2-40B4-BE49-F238E27FC236}">
-                <a16:creationId xmlns:a16="http://schemas.microsoft.com/office/drawing/2014/main" id="{91D0002C-766B-44B4-A24C-BE6DE6C7BA4C}"/>
+                <a16:creationId xmlns:a16="http://schemas.microsoft.com/office/drawing/2014/main" xmlns="" id="{91D0002C-766B-44B4-A24C-BE6DE6C7BA4C}"/>
               </a:ext>
             </a:extLst>
           </p:cNvPr>
@@ -791,7 +791,7 @@
           <p:cNvPr id="3" name="Content Placeholder 2">
             <a:extLst>
               <a:ext uri="{FF2B5EF4-FFF2-40B4-BE49-F238E27FC236}">
-                <a16:creationId xmlns:a16="http://schemas.microsoft.com/office/drawing/2014/main" id="{3455BAA9-6C7B-4874-AD76-BD466F64802D}"/>
+                <a16:creationId xmlns:a16="http://schemas.microsoft.com/office/drawing/2014/main" xmlns="" id="{3455BAA9-6C7B-4874-AD76-BD466F64802D}"/>
               </a:ext>
             </a:extLst>
           </p:cNvPr>
@@ -848,7 +848,7 @@
           <p:cNvPr id="4" name="Date Placeholder 3">
             <a:extLst>
               <a:ext uri="{FF2B5EF4-FFF2-40B4-BE49-F238E27FC236}">
-                <a16:creationId xmlns:a16="http://schemas.microsoft.com/office/drawing/2014/main" id="{8776BDAF-D8F2-4A61-904D-094BB4545702}"/>
+                <a16:creationId xmlns:a16="http://schemas.microsoft.com/office/drawing/2014/main" xmlns="" id="{8776BDAF-D8F2-4A61-904D-094BB4545702}"/>
               </a:ext>
             </a:extLst>
           </p:cNvPr>
@@ -866,7 +866,7 @@
           <a:p>
             <a:fld id="{6C733091-19F0-4DD7-90FE-000B4789B4CF}" type="datetimeFigureOut">
               <a:rPr lang="en-US" smtClean="0"/>
-              <a:t>7/29/2021</a:t>
+              <a:t>7/30/2021</a:t>
             </a:fld>
             <a:endParaRPr lang="en-US"/>
           </a:p>
@@ -877,7 +877,7 @@
           <p:cNvPr id="5" name="Footer Placeholder 4">
             <a:extLst>
               <a:ext uri="{FF2B5EF4-FFF2-40B4-BE49-F238E27FC236}">
-                <a16:creationId xmlns:a16="http://schemas.microsoft.com/office/drawing/2014/main" id="{F89C5665-4384-4706-9BD2-9F42B05C96BC}"/>
+                <a16:creationId xmlns:a16="http://schemas.microsoft.com/office/drawing/2014/main" xmlns="" id="{F89C5665-4384-4706-9BD2-9F42B05C96BC}"/>
               </a:ext>
             </a:extLst>
           </p:cNvPr>
@@ -902,7 +902,7 @@
           <p:cNvPr id="6" name="Slide Number Placeholder 5">
             <a:extLst>
               <a:ext uri="{FF2B5EF4-FFF2-40B4-BE49-F238E27FC236}">
-                <a16:creationId xmlns:a16="http://schemas.microsoft.com/office/drawing/2014/main" id="{7DCAD73E-CAB3-4BA7-905E-D203691D0418}"/>
+                <a16:creationId xmlns:a16="http://schemas.microsoft.com/office/drawing/2014/main" xmlns="" id="{7DCAD73E-CAB3-4BA7-905E-D203691D0418}"/>
               </a:ext>
             </a:extLst>
           </p:cNvPr>
@@ -961,7 +961,7 @@
           <p:cNvPr id="2" name="Title 1">
             <a:extLst>
               <a:ext uri="{FF2B5EF4-FFF2-40B4-BE49-F238E27FC236}">
-                <a16:creationId xmlns:a16="http://schemas.microsoft.com/office/drawing/2014/main" id="{A9880706-F7FA-4EC3-A022-9D6C7CEC3692}"/>
+                <a16:creationId xmlns:a16="http://schemas.microsoft.com/office/drawing/2014/main" xmlns="" id="{A9880706-F7FA-4EC3-A022-9D6C7CEC3692}"/>
               </a:ext>
             </a:extLst>
           </p:cNvPr>
@@ -998,7 +998,7 @@
           <p:cNvPr id="3" name="Text Placeholder 2">
             <a:extLst>
               <a:ext uri="{FF2B5EF4-FFF2-40B4-BE49-F238E27FC236}">
-                <a16:creationId xmlns:a16="http://schemas.microsoft.com/office/drawing/2014/main" id="{FA8A65D0-3DF5-448D-82EC-A967682A0DED}"/>
+                <a16:creationId xmlns:a16="http://schemas.microsoft.com/office/drawing/2014/main" xmlns="" id="{FA8A65D0-3DF5-448D-82EC-A967682A0DED}"/>
               </a:ext>
             </a:extLst>
           </p:cNvPr>
@@ -1123,7 +1123,7 @@
           <p:cNvPr id="4" name="Date Placeholder 3">
             <a:extLst>
               <a:ext uri="{FF2B5EF4-FFF2-40B4-BE49-F238E27FC236}">
-                <a16:creationId xmlns:a16="http://schemas.microsoft.com/office/drawing/2014/main" id="{600EA68C-01A6-487D-9D6E-1D1B4EAC0440}"/>
+                <a16:creationId xmlns:a16="http://schemas.microsoft.com/office/drawing/2014/main" xmlns="" id="{600EA68C-01A6-487D-9D6E-1D1B4EAC0440}"/>
               </a:ext>
             </a:extLst>
           </p:cNvPr>
@@ -1141,7 +1141,7 @@
           <a:p>
             <a:fld id="{6C733091-19F0-4DD7-90FE-000B4789B4CF}" type="datetimeFigureOut">
               <a:rPr lang="en-US" smtClean="0"/>
-              <a:t>7/29/2021</a:t>
+              <a:t>7/30/2021</a:t>
             </a:fld>
             <a:endParaRPr lang="en-US"/>
           </a:p>
@@ -1152,7 +1152,7 @@
           <p:cNvPr id="5" name="Footer Placeholder 4">
             <a:extLst>
               <a:ext uri="{FF2B5EF4-FFF2-40B4-BE49-F238E27FC236}">
-                <a16:creationId xmlns:a16="http://schemas.microsoft.com/office/drawing/2014/main" id="{6E6527CB-4FFD-4569-A82C-5EDC311B2CF6}"/>
+                <a16:creationId xmlns:a16="http://schemas.microsoft.com/office/drawing/2014/main" xmlns="" id="{6E6527CB-4FFD-4569-A82C-5EDC311B2CF6}"/>
               </a:ext>
             </a:extLst>
           </p:cNvPr>
@@ -1177,7 +1177,7 @@
           <p:cNvPr id="6" name="Slide Number Placeholder 5">
             <a:extLst>
               <a:ext uri="{FF2B5EF4-FFF2-40B4-BE49-F238E27FC236}">
-                <a16:creationId xmlns:a16="http://schemas.microsoft.com/office/drawing/2014/main" id="{24B19E5B-5A98-4381-A01D-01F81FD65792}"/>
+                <a16:creationId xmlns:a16="http://schemas.microsoft.com/office/drawing/2014/main" xmlns="" id="{24B19E5B-5A98-4381-A01D-01F81FD65792}"/>
               </a:ext>
             </a:extLst>
           </p:cNvPr>
@@ -1236,7 +1236,7 @@
           <p:cNvPr id="2" name="Title 1">
             <a:extLst>
               <a:ext uri="{FF2B5EF4-FFF2-40B4-BE49-F238E27FC236}">
-                <a16:creationId xmlns:a16="http://schemas.microsoft.com/office/drawing/2014/main" id="{63228B71-E923-4431-B8D2-FAE724678940}"/>
+                <a16:creationId xmlns:a16="http://schemas.microsoft.com/office/drawing/2014/main" xmlns="" id="{63228B71-E923-4431-B8D2-FAE724678940}"/>
               </a:ext>
             </a:extLst>
           </p:cNvPr>
@@ -1264,7 +1264,7 @@
           <p:cNvPr id="3" name="Content Placeholder 2">
             <a:extLst>
               <a:ext uri="{FF2B5EF4-FFF2-40B4-BE49-F238E27FC236}">
-                <a16:creationId xmlns:a16="http://schemas.microsoft.com/office/drawing/2014/main" id="{B18895E9-B7FF-4A00-955B-206CF8C73E43}"/>
+                <a16:creationId xmlns:a16="http://schemas.microsoft.com/office/drawing/2014/main" xmlns="" id="{B18895E9-B7FF-4A00-955B-206CF8C73E43}"/>
               </a:ext>
             </a:extLst>
           </p:cNvPr>
@@ -1326,7 +1326,7 @@
           <p:cNvPr id="4" name="Content Placeholder 3">
             <a:extLst>
               <a:ext uri="{FF2B5EF4-FFF2-40B4-BE49-F238E27FC236}">
-                <a16:creationId xmlns:a16="http://schemas.microsoft.com/office/drawing/2014/main" id="{DA813955-E3B9-44BC-8E1D-139269C8B48A}"/>
+                <a16:creationId xmlns:a16="http://schemas.microsoft.com/office/drawing/2014/main" xmlns="" id="{DA813955-E3B9-44BC-8E1D-139269C8B48A}"/>
               </a:ext>
             </a:extLst>
           </p:cNvPr>
@@ -1388,7 +1388,7 @@
           <p:cNvPr id="5" name="Date Placeholder 4">
             <a:extLst>
               <a:ext uri="{FF2B5EF4-FFF2-40B4-BE49-F238E27FC236}">
-                <a16:creationId xmlns:a16="http://schemas.microsoft.com/office/drawing/2014/main" id="{7E9B8EF5-28D5-4C4E-A2AB-EEA30D75DAFE}"/>
+                <a16:creationId xmlns:a16="http://schemas.microsoft.com/office/drawing/2014/main" xmlns="" id="{7E9B8EF5-28D5-4C4E-A2AB-EEA30D75DAFE}"/>
               </a:ext>
             </a:extLst>
           </p:cNvPr>
@@ -1406,7 +1406,7 @@
           <a:p>
             <a:fld id="{6C733091-19F0-4DD7-90FE-000B4789B4CF}" type="datetimeFigureOut">
               <a:rPr lang="en-US" smtClean="0"/>
-              <a:t>7/29/2021</a:t>
+              <a:t>7/30/2021</a:t>
             </a:fld>
             <a:endParaRPr lang="en-US"/>
           </a:p>
@@ -1417,7 +1417,7 @@
           <p:cNvPr id="6" name="Footer Placeholder 5">
             <a:extLst>
               <a:ext uri="{FF2B5EF4-FFF2-40B4-BE49-F238E27FC236}">
-                <a16:creationId xmlns:a16="http://schemas.microsoft.com/office/drawing/2014/main" id="{5723E678-8CB4-4335-AA04-6BD391748717}"/>
+                <a16:creationId xmlns:a16="http://schemas.microsoft.com/office/drawing/2014/main" xmlns="" id="{5723E678-8CB4-4335-AA04-6BD391748717}"/>
               </a:ext>
             </a:extLst>
           </p:cNvPr>
@@ -1442,7 +1442,7 @@
           <p:cNvPr id="7" name="Slide Number Placeholder 6">
             <a:extLst>
               <a:ext uri="{FF2B5EF4-FFF2-40B4-BE49-F238E27FC236}">
-                <a16:creationId xmlns:a16="http://schemas.microsoft.com/office/drawing/2014/main" id="{887B5567-9F4D-4AE1-92D8-769C9F7EA4F0}"/>
+                <a16:creationId xmlns:a16="http://schemas.microsoft.com/office/drawing/2014/main" xmlns="" id="{887B5567-9F4D-4AE1-92D8-769C9F7EA4F0}"/>
               </a:ext>
             </a:extLst>
           </p:cNvPr>
@@ -1501,7 +1501,7 @@
           <p:cNvPr id="2" name="Title 1">
             <a:extLst>
               <a:ext uri="{FF2B5EF4-FFF2-40B4-BE49-F238E27FC236}">
-                <a16:creationId xmlns:a16="http://schemas.microsoft.com/office/drawing/2014/main" id="{A40320A9-7C0C-45B4-BF2B-3B53B5686EBB}"/>
+                <a16:creationId xmlns:a16="http://schemas.microsoft.com/office/drawing/2014/main" xmlns="" id="{A40320A9-7C0C-45B4-BF2B-3B53B5686EBB}"/>
               </a:ext>
             </a:extLst>
           </p:cNvPr>
@@ -1534,7 +1534,7 @@
           <p:cNvPr id="3" name="Text Placeholder 2">
             <a:extLst>
               <a:ext uri="{FF2B5EF4-FFF2-40B4-BE49-F238E27FC236}">
-                <a16:creationId xmlns:a16="http://schemas.microsoft.com/office/drawing/2014/main" id="{8C440DE1-7DD6-4B1C-B961-CD2079B51F03}"/>
+                <a16:creationId xmlns:a16="http://schemas.microsoft.com/office/drawing/2014/main" xmlns="" id="{8C440DE1-7DD6-4B1C-B961-CD2079B51F03}"/>
               </a:ext>
             </a:extLst>
           </p:cNvPr>
@@ -1605,7 +1605,7 @@
           <p:cNvPr id="4" name="Content Placeholder 3">
             <a:extLst>
               <a:ext uri="{FF2B5EF4-FFF2-40B4-BE49-F238E27FC236}">
-                <a16:creationId xmlns:a16="http://schemas.microsoft.com/office/drawing/2014/main" id="{6FAFE840-CC9A-4D89-B05F-159EF756B427}"/>
+                <a16:creationId xmlns:a16="http://schemas.microsoft.com/office/drawing/2014/main" xmlns="" id="{6FAFE840-CC9A-4D89-B05F-159EF756B427}"/>
               </a:ext>
             </a:extLst>
           </p:cNvPr>
@@ -1667,7 +1667,7 @@
           <p:cNvPr id="5" name="Text Placeholder 4">
             <a:extLst>
               <a:ext uri="{FF2B5EF4-FFF2-40B4-BE49-F238E27FC236}">
-                <a16:creationId xmlns:a16="http://schemas.microsoft.com/office/drawing/2014/main" id="{4B87AADC-3401-48C6-98F6-0AB60F6DF9BE}"/>
+                <a16:creationId xmlns:a16="http://schemas.microsoft.com/office/drawing/2014/main" xmlns="" id="{4B87AADC-3401-48C6-98F6-0AB60F6DF9BE}"/>
               </a:ext>
             </a:extLst>
           </p:cNvPr>
@@ -1738,7 +1738,7 @@
           <p:cNvPr id="6" name="Content Placeholder 5">
             <a:extLst>
               <a:ext uri="{FF2B5EF4-FFF2-40B4-BE49-F238E27FC236}">
-                <a16:creationId xmlns:a16="http://schemas.microsoft.com/office/drawing/2014/main" id="{34BCF1A4-FB52-4DCD-80BC-324BA41C33CD}"/>
+                <a16:creationId xmlns:a16="http://schemas.microsoft.com/office/drawing/2014/main" xmlns="" id="{34BCF1A4-FB52-4DCD-80BC-324BA41C33CD}"/>
               </a:ext>
             </a:extLst>
           </p:cNvPr>
@@ -1800,7 +1800,7 @@
           <p:cNvPr id="7" name="Date Placeholder 6">
             <a:extLst>
               <a:ext uri="{FF2B5EF4-FFF2-40B4-BE49-F238E27FC236}">
-                <a16:creationId xmlns:a16="http://schemas.microsoft.com/office/drawing/2014/main" id="{8CFD4208-60E7-48B1-8CD0-717D5E26B827}"/>
+                <a16:creationId xmlns:a16="http://schemas.microsoft.com/office/drawing/2014/main" xmlns="" id="{8CFD4208-60E7-48B1-8CD0-717D5E26B827}"/>
               </a:ext>
             </a:extLst>
           </p:cNvPr>
@@ -1818,7 +1818,7 @@
           <a:p>
             <a:fld id="{6C733091-19F0-4DD7-90FE-000B4789B4CF}" type="datetimeFigureOut">
               <a:rPr lang="en-US" smtClean="0"/>
-              <a:t>7/29/2021</a:t>
+              <a:t>7/30/2021</a:t>
             </a:fld>
             <a:endParaRPr lang="en-US"/>
           </a:p>
@@ -1829,7 +1829,7 @@
           <p:cNvPr id="8" name="Footer Placeholder 7">
             <a:extLst>
               <a:ext uri="{FF2B5EF4-FFF2-40B4-BE49-F238E27FC236}">
-                <a16:creationId xmlns:a16="http://schemas.microsoft.com/office/drawing/2014/main" id="{94E429D1-BEB1-4D8A-91F2-CD4F80157F8D}"/>
+                <a16:creationId xmlns:a16="http://schemas.microsoft.com/office/drawing/2014/main" xmlns="" id="{94E429D1-BEB1-4D8A-91F2-CD4F80157F8D}"/>
               </a:ext>
             </a:extLst>
           </p:cNvPr>
@@ -1854,7 +1854,7 @@
           <p:cNvPr id="9" name="Slide Number Placeholder 8">
             <a:extLst>
               <a:ext uri="{FF2B5EF4-FFF2-40B4-BE49-F238E27FC236}">
-                <a16:creationId xmlns:a16="http://schemas.microsoft.com/office/drawing/2014/main" id="{6F17C19C-8370-4118-A8FC-5DDA6F84230F}"/>
+                <a16:creationId xmlns:a16="http://schemas.microsoft.com/office/drawing/2014/main" xmlns="" id="{6F17C19C-8370-4118-A8FC-5DDA6F84230F}"/>
               </a:ext>
             </a:extLst>
           </p:cNvPr>
@@ -1913,7 +1913,7 @@
           <p:cNvPr id="2" name="Title 1">
             <a:extLst>
               <a:ext uri="{FF2B5EF4-FFF2-40B4-BE49-F238E27FC236}">
-                <a16:creationId xmlns:a16="http://schemas.microsoft.com/office/drawing/2014/main" id="{252CBF36-7F99-45A9-BC35-BD2EC260CBF0}"/>
+                <a16:creationId xmlns:a16="http://schemas.microsoft.com/office/drawing/2014/main" xmlns="" id="{252CBF36-7F99-45A9-BC35-BD2EC260CBF0}"/>
               </a:ext>
             </a:extLst>
           </p:cNvPr>
@@ -1941,7 +1941,7 @@
           <p:cNvPr id="3" name="Date Placeholder 2">
             <a:extLst>
               <a:ext uri="{FF2B5EF4-FFF2-40B4-BE49-F238E27FC236}">
-                <a16:creationId xmlns:a16="http://schemas.microsoft.com/office/drawing/2014/main" id="{0D6F5F83-F07E-4501-B86B-9F96CD43993C}"/>
+                <a16:creationId xmlns:a16="http://schemas.microsoft.com/office/drawing/2014/main" xmlns="" id="{0D6F5F83-F07E-4501-B86B-9F96CD43993C}"/>
               </a:ext>
             </a:extLst>
           </p:cNvPr>
@@ -1959,7 +1959,7 @@
           <a:p>
             <a:fld id="{6C733091-19F0-4DD7-90FE-000B4789B4CF}" type="datetimeFigureOut">
               <a:rPr lang="en-US" smtClean="0"/>
-              <a:t>7/29/2021</a:t>
+              <a:t>7/30/2021</a:t>
             </a:fld>
             <a:endParaRPr lang="en-US"/>
           </a:p>
@@ -1970,7 +1970,7 @@
           <p:cNvPr id="4" name="Footer Placeholder 3">
             <a:extLst>
               <a:ext uri="{FF2B5EF4-FFF2-40B4-BE49-F238E27FC236}">
-                <a16:creationId xmlns:a16="http://schemas.microsoft.com/office/drawing/2014/main" id="{2861989B-F8E9-41FD-8E16-687424BCC266}"/>
+                <a16:creationId xmlns:a16="http://schemas.microsoft.com/office/drawing/2014/main" xmlns="" id="{2861989B-F8E9-41FD-8E16-687424BCC266}"/>
               </a:ext>
             </a:extLst>
           </p:cNvPr>
@@ -1995,7 +1995,7 @@
           <p:cNvPr id="5" name="Slide Number Placeholder 4">
             <a:extLst>
               <a:ext uri="{FF2B5EF4-FFF2-40B4-BE49-F238E27FC236}">
-                <a16:creationId xmlns:a16="http://schemas.microsoft.com/office/drawing/2014/main" id="{2026B6D7-7832-4815-95CE-5CEC39502825}"/>
+                <a16:creationId xmlns:a16="http://schemas.microsoft.com/office/drawing/2014/main" xmlns="" id="{2026B6D7-7832-4815-95CE-5CEC39502825}"/>
               </a:ext>
             </a:extLst>
           </p:cNvPr>
@@ -2054,7 +2054,7 @@
           <p:cNvPr id="2" name="Date Placeholder 1">
             <a:extLst>
               <a:ext uri="{FF2B5EF4-FFF2-40B4-BE49-F238E27FC236}">
-                <a16:creationId xmlns:a16="http://schemas.microsoft.com/office/drawing/2014/main" id="{9877919A-C4B6-46FD-A08A-9A4B867FE01A}"/>
+                <a16:creationId xmlns:a16="http://schemas.microsoft.com/office/drawing/2014/main" xmlns="" id="{9877919A-C4B6-46FD-A08A-9A4B867FE01A}"/>
               </a:ext>
             </a:extLst>
           </p:cNvPr>
@@ -2072,7 +2072,7 @@
           <a:p>
             <a:fld id="{6C733091-19F0-4DD7-90FE-000B4789B4CF}" type="datetimeFigureOut">
               <a:rPr lang="en-US" smtClean="0"/>
-              <a:t>7/29/2021</a:t>
+              <a:t>7/30/2021</a:t>
             </a:fld>
             <a:endParaRPr lang="en-US"/>
           </a:p>
@@ -2083,7 +2083,7 @@
           <p:cNvPr id="3" name="Footer Placeholder 2">
             <a:extLst>
               <a:ext uri="{FF2B5EF4-FFF2-40B4-BE49-F238E27FC236}">
-                <a16:creationId xmlns:a16="http://schemas.microsoft.com/office/drawing/2014/main" id="{9118539E-383C-4F1C-86F2-14C533A7E9FB}"/>
+                <a16:creationId xmlns:a16="http://schemas.microsoft.com/office/drawing/2014/main" xmlns="" id="{9118539E-383C-4F1C-86F2-14C533A7E9FB}"/>
               </a:ext>
             </a:extLst>
           </p:cNvPr>
@@ -2108,7 +2108,7 @@
           <p:cNvPr id="4" name="Slide Number Placeholder 3">
             <a:extLst>
               <a:ext uri="{FF2B5EF4-FFF2-40B4-BE49-F238E27FC236}">
-                <a16:creationId xmlns:a16="http://schemas.microsoft.com/office/drawing/2014/main" id="{C9A6D4E1-CA83-4214-9942-9E4617AA89BF}"/>
+                <a16:creationId xmlns:a16="http://schemas.microsoft.com/office/drawing/2014/main" xmlns="" id="{C9A6D4E1-CA83-4214-9942-9E4617AA89BF}"/>
               </a:ext>
             </a:extLst>
           </p:cNvPr>
@@ -2167,7 +2167,7 @@
           <p:cNvPr id="2" name="Title 1">
             <a:extLst>
               <a:ext uri="{FF2B5EF4-FFF2-40B4-BE49-F238E27FC236}">
-                <a16:creationId xmlns:a16="http://schemas.microsoft.com/office/drawing/2014/main" id="{046EF9B5-7A2A-4225-8817-86D028D6950C}"/>
+                <a16:creationId xmlns:a16="http://schemas.microsoft.com/office/drawing/2014/main" xmlns="" id="{046EF9B5-7A2A-4225-8817-86D028D6950C}"/>
               </a:ext>
             </a:extLst>
           </p:cNvPr>
@@ -2204,7 +2204,7 @@
           <p:cNvPr id="3" name="Content Placeholder 2">
             <a:extLst>
               <a:ext uri="{FF2B5EF4-FFF2-40B4-BE49-F238E27FC236}">
-                <a16:creationId xmlns:a16="http://schemas.microsoft.com/office/drawing/2014/main" id="{8667C390-5297-41E8-A403-22856007B051}"/>
+                <a16:creationId xmlns:a16="http://schemas.microsoft.com/office/drawing/2014/main" xmlns="" id="{8667C390-5297-41E8-A403-22856007B051}"/>
               </a:ext>
             </a:extLst>
           </p:cNvPr>
@@ -2294,7 +2294,7 @@
           <p:cNvPr id="4" name="Text Placeholder 3">
             <a:extLst>
               <a:ext uri="{FF2B5EF4-FFF2-40B4-BE49-F238E27FC236}">
-                <a16:creationId xmlns:a16="http://schemas.microsoft.com/office/drawing/2014/main" id="{8D0D2F7D-D6CD-4AB1-A3EA-CBFD2A2B3703}"/>
+                <a16:creationId xmlns:a16="http://schemas.microsoft.com/office/drawing/2014/main" xmlns="" id="{8D0D2F7D-D6CD-4AB1-A3EA-CBFD2A2B3703}"/>
               </a:ext>
             </a:extLst>
           </p:cNvPr>
@@ -2365,7 +2365,7 @@
           <p:cNvPr id="5" name="Date Placeholder 4">
             <a:extLst>
               <a:ext uri="{FF2B5EF4-FFF2-40B4-BE49-F238E27FC236}">
-                <a16:creationId xmlns:a16="http://schemas.microsoft.com/office/drawing/2014/main" id="{E17A441D-4FA7-4110-BF24-165CD3C3DAD7}"/>
+                <a16:creationId xmlns:a16="http://schemas.microsoft.com/office/drawing/2014/main" xmlns="" id="{E17A441D-4FA7-4110-BF24-165CD3C3DAD7}"/>
               </a:ext>
             </a:extLst>
           </p:cNvPr>
@@ -2383,7 +2383,7 @@
           <a:p>
             <a:fld id="{6C733091-19F0-4DD7-90FE-000B4789B4CF}" type="datetimeFigureOut">
               <a:rPr lang="en-US" smtClean="0"/>
-              <a:t>7/29/2021</a:t>
+              <a:t>7/30/2021</a:t>
             </a:fld>
             <a:endParaRPr lang="en-US"/>
           </a:p>
@@ -2394,7 +2394,7 @@
           <p:cNvPr id="6" name="Footer Placeholder 5">
             <a:extLst>
               <a:ext uri="{FF2B5EF4-FFF2-40B4-BE49-F238E27FC236}">
-                <a16:creationId xmlns:a16="http://schemas.microsoft.com/office/drawing/2014/main" id="{346102C5-5AE3-43CF-A686-1AB72B0790AB}"/>
+                <a16:creationId xmlns:a16="http://schemas.microsoft.com/office/drawing/2014/main" xmlns="" id="{346102C5-5AE3-43CF-A686-1AB72B0790AB}"/>
               </a:ext>
             </a:extLst>
           </p:cNvPr>
@@ -2419,7 +2419,7 @@
           <p:cNvPr id="7" name="Slide Number Placeholder 6">
             <a:extLst>
               <a:ext uri="{FF2B5EF4-FFF2-40B4-BE49-F238E27FC236}">
-                <a16:creationId xmlns:a16="http://schemas.microsoft.com/office/drawing/2014/main" id="{5528B3F7-462C-4500-8836-B3E5CD8DA61A}"/>
+                <a16:creationId xmlns:a16="http://schemas.microsoft.com/office/drawing/2014/main" xmlns="" id="{5528B3F7-462C-4500-8836-B3E5CD8DA61A}"/>
               </a:ext>
             </a:extLst>
           </p:cNvPr>
@@ -2478,7 +2478,7 @@
           <p:cNvPr id="2" name="Title 1">
             <a:extLst>
               <a:ext uri="{FF2B5EF4-FFF2-40B4-BE49-F238E27FC236}">
-                <a16:creationId xmlns:a16="http://schemas.microsoft.com/office/drawing/2014/main" id="{4BA10E59-DA48-4690-A956-9EB8E4E11EE5}"/>
+                <a16:creationId xmlns:a16="http://schemas.microsoft.com/office/drawing/2014/main" xmlns="" id="{4BA10E59-DA48-4690-A956-9EB8E4E11EE5}"/>
               </a:ext>
             </a:extLst>
           </p:cNvPr>
@@ -2515,7 +2515,7 @@
           <p:cNvPr id="3" name="Picture Placeholder 2">
             <a:extLst>
               <a:ext uri="{FF2B5EF4-FFF2-40B4-BE49-F238E27FC236}">
-                <a16:creationId xmlns:a16="http://schemas.microsoft.com/office/drawing/2014/main" id="{AC7AFE1E-67D1-4106-97CA-98302D42CC4D}"/>
+                <a16:creationId xmlns:a16="http://schemas.microsoft.com/office/drawing/2014/main" xmlns="" id="{AC7AFE1E-67D1-4106-97CA-98302D42CC4D}"/>
               </a:ext>
             </a:extLst>
           </p:cNvPr>
@@ -2582,7 +2582,7 @@
           <p:cNvPr id="4" name="Text Placeholder 3">
             <a:extLst>
               <a:ext uri="{FF2B5EF4-FFF2-40B4-BE49-F238E27FC236}">
-                <a16:creationId xmlns:a16="http://schemas.microsoft.com/office/drawing/2014/main" id="{67D8D73B-3D4D-42A7-9A3C-1D508E8A9B45}"/>
+                <a16:creationId xmlns:a16="http://schemas.microsoft.com/office/drawing/2014/main" xmlns="" id="{67D8D73B-3D4D-42A7-9A3C-1D508E8A9B45}"/>
               </a:ext>
             </a:extLst>
           </p:cNvPr>
@@ -2653,7 +2653,7 @@
           <p:cNvPr id="5" name="Date Placeholder 4">
             <a:extLst>
               <a:ext uri="{FF2B5EF4-FFF2-40B4-BE49-F238E27FC236}">
-                <a16:creationId xmlns:a16="http://schemas.microsoft.com/office/drawing/2014/main" id="{48C8945E-A47A-42A2-9DF6-CA6D5002F65F}"/>
+                <a16:creationId xmlns:a16="http://schemas.microsoft.com/office/drawing/2014/main" xmlns="" id="{48C8945E-A47A-42A2-9DF6-CA6D5002F65F}"/>
               </a:ext>
             </a:extLst>
           </p:cNvPr>
@@ -2671,7 +2671,7 @@
           <a:p>
             <a:fld id="{6C733091-19F0-4DD7-90FE-000B4789B4CF}" type="datetimeFigureOut">
               <a:rPr lang="en-US" smtClean="0"/>
-              <a:t>7/29/2021</a:t>
+              <a:t>7/30/2021</a:t>
             </a:fld>
             <a:endParaRPr lang="en-US"/>
           </a:p>
@@ -2682,7 +2682,7 @@
           <p:cNvPr id="6" name="Footer Placeholder 5">
             <a:extLst>
               <a:ext uri="{FF2B5EF4-FFF2-40B4-BE49-F238E27FC236}">
-                <a16:creationId xmlns:a16="http://schemas.microsoft.com/office/drawing/2014/main" id="{EB000DB4-2747-4297-B400-42A539FBDB42}"/>
+                <a16:creationId xmlns:a16="http://schemas.microsoft.com/office/drawing/2014/main" xmlns="" id="{EB000DB4-2747-4297-B400-42A539FBDB42}"/>
               </a:ext>
             </a:extLst>
           </p:cNvPr>
@@ -2707,7 +2707,7 @@
           <p:cNvPr id="7" name="Slide Number Placeholder 6">
             <a:extLst>
               <a:ext uri="{FF2B5EF4-FFF2-40B4-BE49-F238E27FC236}">
-                <a16:creationId xmlns:a16="http://schemas.microsoft.com/office/drawing/2014/main" id="{5BAD9222-F141-4803-AF73-E2DD92E2ABBC}"/>
+                <a16:creationId xmlns:a16="http://schemas.microsoft.com/office/drawing/2014/main" xmlns="" id="{5BAD9222-F141-4803-AF73-E2DD92E2ABBC}"/>
               </a:ext>
             </a:extLst>
           </p:cNvPr>
@@ -2771,7 +2771,7 @@
           <p:cNvPr id="2" name="Title Placeholder 1">
             <a:extLst>
               <a:ext uri="{FF2B5EF4-FFF2-40B4-BE49-F238E27FC236}">
-                <a16:creationId xmlns:a16="http://schemas.microsoft.com/office/drawing/2014/main" id="{5BF9D404-795C-4EA4-AD01-26740519239C}"/>
+                <a16:creationId xmlns:a16="http://schemas.microsoft.com/office/drawing/2014/main" xmlns="" id="{5BF9D404-795C-4EA4-AD01-26740519239C}"/>
               </a:ext>
             </a:extLst>
           </p:cNvPr>
@@ -2809,7 +2809,7 @@
           <p:cNvPr id="3" name="Text Placeholder 2">
             <a:extLst>
               <a:ext uri="{FF2B5EF4-FFF2-40B4-BE49-F238E27FC236}">
-                <a16:creationId xmlns:a16="http://schemas.microsoft.com/office/drawing/2014/main" id="{DE3FEC7B-48F8-4348-9BC6-68F83B859EE9}"/>
+                <a16:creationId xmlns:a16="http://schemas.microsoft.com/office/drawing/2014/main" xmlns="" id="{DE3FEC7B-48F8-4348-9BC6-68F83B859EE9}"/>
               </a:ext>
             </a:extLst>
           </p:cNvPr>
@@ -2876,7 +2876,7 @@
           <p:cNvPr id="4" name="Date Placeholder 3">
             <a:extLst>
               <a:ext uri="{FF2B5EF4-FFF2-40B4-BE49-F238E27FC236}">
-                <a16:creationId xmlns:a16="http://schemas.microsoft.com/office/drawing/2014/main" id="{31CA1A1D-E2F5-4161-A025-7B911965C2FE}"/>
+                <a16:creationId xmlns:a16="http://schemas.microsoft.com/office/drawing/2014/main" xmlns="" id="{31CA1A1D-E2F5-4161-A025-7B911965C2FE}"/>
               </a:ext>
             </a:extLst>
           </p:cNvPr>
@@ -2912,7 +2912,7 @@
           <a:p>
             <a:fld id="{6C733091-19F0-4DD7-90FE-000B4789B4CF}" type="datetimeFigureOut">
               <a:rPr lang="en-US" smtClean="0"/>
-              <a:t>7/29/2021</a:t>
+              <a:t>7/30/2021</a:t>
             </a:fld>
             <a:endParaRPr lang="en-US"/>
           </a:p>
@@ -2923,7 +2923,7 @@
           <p:cNvPr id="5" name="Footer Placeholder 4">
             <a:extLst>
               <a:ext uri="{FF2B5EF4-FFF2-40B4-BE49-F238E27FC236}">
-                <a16:creationId xmlns:a16="http://schemas.microsoft.com/office/drawing/2014/main" id="{43C7B926-18F3-4C13-AB92-764E10D324FB}"/>
+                <a16:creationId xmlns:a16="http://schemas.microsoft.com/office/drawing/2014/main" xmlns="" id="{43C7B926-18F3-4C13-AB92-764E10D324FB}"/>
               </a:ext>
             </a:extLst>
           </p:cNvPr>
@@ -2966,7 +2966,7 @@
           <p:cNvPr id="6" name="Slide Number Placeholder 5">
             <a:extLst>
               <a:ext uri="{FF2B5EF4-FFF2-40B4-BE49-F238E27FC236}">
-                <a16:creationId xmlns:a16="http://schemas.microsoft.com/office/drawing/2014/main" id="{734FA846-3BF6-46FD-80CF-34B300D244C0}"/>
+                <a16:creationId xmlns:a16="http://schemas.microsoft.com/office/drawing/2014/main" xmlns="" id="{734FA846-3BF6-46FD-80CF-34B300D244C0}"/>
               </a:ext>
             </a:extLst>
           </p:cNvPr>
@@ -3334,7 +3334,7 @@
           <p:cNvPr id="4" name="Rectangle 3">
             <a:extLst>
               <a:ext uri="{FF2B5EF4-FFF2-40B4-BE49-F238E27FC236}">
-                <a16:creationId xmlns:a16="http://schemas.microsoft.com/office/drawing/2014/main" id="{0A71868C-EF96-4004-8116-DFD1FCCEE6C3}"/>
+                <a16:creationId xmlns:a16="http://schemas.microsoft.com/office/drawing/2014/main" xmlns="" id="{0A71868C-EF96-4004-8116-DFD1FCCEE6C3}"/>
               </a:ext>
             </a:extLst>
           </p:cNvPr>
@@ -3390,7 +3390,7 @@
           <p:cNvPr id="5" name="Rectangle 4">
             <a:extLst>
               <a:ext uri="{FF2B5EF4-FFF2-40B4-BE49-F238E27FC236}">
-                <a16:creationId xmlns:a16="http://schemas.microsoft.com/office/drawing/2014/main" id="{67A88ADC-D070-420B-9A88-FDBA4865856A}"/>
+                <a16:creationId xmlns:a16="http://schemas.microsoft.com/office/drawing/2014/main" xmlns="" id="{67A88ADC-D070-420B-9A88-FDBA4865856A}"/>
               </a:ext>
             </a:extLst>
           </p:cNvPr>
@@ -3450,7 +3450,7 @@
           <p:cNvPr id="7" name="Straight Arrow Connector 6">
             <a:extLst>
               <a:ext uri="{FF2B5EF4-FFF2-40B4-BE49-F238E27FC236}">
-                <a16:creationId xmlns:a16="http://schemas.microsoft.com/office/drawing/2014/main" id="{45AD00B6-B022-4C7F-A523-E16E6292918D}"/>
+                <a16:creationId xmlns:a16="http://schemas.microsoft.com/office/drawing/2014/main" xmlns="" id="{45AD00B6-B022-4C7F-A523-E16E6292918D}"/>
               </a:ext>
             </a:extLst>
           </p:cNvPr>
@@ -3492,7 +3492,7 @@
           <p:cNvPr id="8" name="Rectangle 7">
             <a:extLst>
               <a:ext uri="{FF2B5EF4-FFF2-40B4-BE49-F238E27FC236}">
-                <a16:creationId xmlns:a16="http://schemas.microsoft.com/office/drawing/2014/main" id="{3C7A2B3E-B0CA-48CD-A6CB-935EF9D71843}"/>
+                <a16:creationId xmlns:a16="http://schemas.microsoft.com/office/drawing/2014/main" xmlns="" id="{3C7A2B3E-B0CA-48CD-A6CB-935EF9D71843}"/>
               </a:ext>
             </a:extLst>
           </p:cNvPr>
@@ -3552,7 +3552,7 @@
           <p:cNvPr id="9" name="TextBox 8">
             <a:extLst>
               <a:ext uri="{FF2B5EF4-FFF2-40B4-BE49-F238E27FC236}">
-                <a16:creationId xmlns:a16="http://schemas.microsoft.com/office/drawing/2014/main" id="{ABD7B54F-357C-489B-ADE1-DFA04BEA1686}"/>
+                <a16:creationId xmlns:a16="http://schemas.microsoft.com/office/drawing/2014/main" xmlns="" id="{ABD7B54F-357C-489B-ADE1-DFA04BEA1686}"/>
               </a:ext>
             </a:extLst>
           </p:cNvPr>
@@ -3587,7 +3587,7 @@
           <p:cNvPr id="10" name="Rectangle 9">
             <a:extLst>
               <a:ext uri="{FF2B5EF4-FFF2-40B4-BE49-F238E27FC236}">
-                <a16:creationId xmlns:a16="http://schemas.microsoft.com/office/drawing/2014/main" id="{21B869D6-66CB-4B38-975F-B7FEB6AA9B13}"/>
+                <a16:creationId xmlns:a16="http://schemas.microsoft.com/office/drawing/2014/main" xmlns="" id="{21B869D6-66CB-4B38-975F-B7FEB6AA9B13}"/>
               </a:ext>
             </a:extLst>
           </p:cNvPr>
@@ -3636,7 +3636,7 @@
           <p:cNvPr id="12" name="Straight Arrow Connector 11">
             <a:extLst>
               <a:ext uri="{FF2B5EF4-FFF2-40B4-BE49-F238E27FC236}">
-                <a16:creationId xmlns:a16="http://schemas.microsoft.com/office/drawing/2014/main" id="{78CBB1AB-C0E2-40F2-828D-F209304958AC}"/>
+                <a16:creationId xmlns:a16="http://schemas.microsoft.com/office/drawing/2014/main" xmlns="" id="{78CBB1AB-C0E2-40F2-828D-F209304958AC}"/>
               </a:ext>
             </a:extLst>
           </p:cNvPr>
@@ -3679,7 +3679,7 @@
           <p:cNvPr id="14" name="TextBox 13">
             <a:extLst>
               <a:ext uri="{FF2B5EF4-FFF2-40B4-BE49-F238E27FC236}">
-                <a16:creationId xmlns:a16="http://schemas.microsoft.com/office/drawing/2014/main" id="{E0BBD6C8-C8F2-40C5-AA64-85961A11ADC2}"/>
+                <a16:creationId xmlns:a16="http://schemas.microsoft.com/office/drawing/2014/main" xmlns="" id="{E0BBD6C8-C8F2-40C5-AA64-85961A11ADC2}"/>
               </a:ext>
             </a:extLst>
           </p:cNvPr>
@@ -3714,7 +3714,7 @@
           <p:cNvPr id="16" name="Straight Arrow Connector 15">
             <a:extLst>
               <a:ext uri="{FF2B5EF4-FFF2-40B4-BE49-F238E27FC236}">
-                <a16:creationId xmlns:a16="http://schemas.microsoft.com/office/drawing/2014/main" id="{22509349-F226-482F-AC14-E28C2411C4C3}"/>
+                <a16:creationId xmlns:a16="http://schemas.microsoft.com/office/drawing/2014/main" xmlns="" id="{22509349-F226-482F-AC14-E28C2411C4C3}"/>
               </a:ext>
             </a:extLst>
           </p:cNvPr>
@@ -3757,7 +3757,7 @@
           <p:cNvPr id="18" name="TextBox 17">
             <a:extLst>
               <a:ext uri="{FF2B5EF4-FFF2-40B4-BE49-F238E27FC236}">
-                <a16:creationId xmlns:a16="http://schemas.microsoft.com/office/drawing/2014/main" id="{E2DE2503-050C-47C3-BC73-C61D89CEB131}"/>
+                <a16:creationId xmlns:a16="http://schemas.microsoft.com/office/drawing/2014/main" xmlns="" id="{E2DE2503-050C-47C3-BC73-C61D89CEB131}"/>
               </a:ext>
             </a:extLst>
           </p:cNvPr>
@@ -3792,7 +3792,7 @@
           <p:cNvPr id="23" name="Straight Arrow Connector 22">
             <a:extLst>
               <a:ext uri="{FF2B5EF4-FFF2-40B4-BE49-F238E27FC236}">
-                <a16:creationId xmlns:a16="http://schemas.microsoft.com/office/drawing/2014/main" id="{5D314D83-3A56-4BD7-B215-19DEE4ED8C0B}"/>
+                <a16:creationId xmlns:a16="http://schemas.microsoft.com/office/drawing/2014/main" xmlns="" id="{5D314D83-3A56-4BD7-B215-19DEE4ED8C0B}"/>
               </a:ext>
             </a:extLst>
           </p:cNvPr>
@@ -3835,7 +3835,7 @@
           <p:cNvPr id="24" name="Straight Arrow Connector 23">
             <a:extLst>
               <a:ext uri="{FF2B5EF4-FFF2-40B4-BE49-F238E27FC236}">
-                <a16:creationId xmlns:a16="http://schemas.microsoft.com/office/drawing/2014/main" id="{874E7075-4C88-4378-99B9-DC474BE0CE65}"/>
+                <a16:creationId xmlns:a16="http://schemas.microsoft.com/office/drawing/2014/main" xmlns="" id="{874E7075-4C88-4378-99B9-DC474BE0CE65}"/>
               </a:ext>
             </a:extLst>
           </p:cNvPr>
@@ -3878,7 +3878,7 @@
           <p:cNvPr id="25" name="TextBox 24">
             <a:extLst>
               <a:ext uri="{FF2B5EF4-FFF2-40B4-BE49-F238E27FC236}">
-                <a16:creationId xmlns:a16="http://schemas.microsoft.com/office/drawing/2014/main" id="{171D93A1-C181-4F9C-8D75-C106DB531AB7}"/>
+                <a16:creationId xmlns:a16="http://schemas.microsoft.com/office/drawing/2014/main" xmlns="" id="{171D93A1-C181-4F9C-8D75-C106DB531AB7}"/>
               </a:ext>
             </a:extLst>
           </p:cNvPr>
@@ -3913,7 +3913,7 @@
           <p:cNvPr id="26" name="TextBox 25">
             <a:extLst>
               <a:ext uri="{FF2B5EF4-FFF2-40B4-BE49-F238E27FC236}">
-                <a16:creationId xmlns:a16="http://schemas.microsoft.com/office/drawing/2014/main" id="{03EAB749-77B2-435B-A0A3-02060FD4A06F}"/>
+                <a16:creationId xmlns:a16="http://schemas.microsoft.com/office/drawing/2014/main" xmlns="" id="{03EAB749-77B2-435B-A0A3-02060FD4A06F}"/>
               </a:ext>
             </a:extLst>
           </p:cNvPr>
@@ -3948,7 +3948,7 @@
           <p:cNvPr id="27" name="TextBox 26">
             <a:extLst>
               <a:ext uri="{FF2B5EF4-FFF2-40B4-BE49-F238E27FC236}">
-                <a16:creationId xmlns:a16="http://schemas.microsoft.com/office/drawing/2014/main" id="{7D8414B9-747D-41E7-A06D-8BBA5042C15C}"/>
+                <a16:creationId xmlns:a16="http://schemas.microsoft.com/office/drawing/2014/main" xmlns="" id="{7D8414B9-747D-41E7-A06D-8BBA5042C15C}"/>
               </a:ext>
             </a:extLst>
           </p:cNvPr>
@@ -3983,7 +3983,7 @@
           <p:cNvPr id="28" name="TextBox 27">
             <a:extLst>
               <a:ext uri="{FF2B5EF4-FFF2-40B4-BE49-F238E27FC236}">
-                <a16:creationId xmlns:a16="http://schemas.microsoft.com/office/drawing/2014/main" id="{F559714E-416D-4742-9901-ADC4D8BAC5FA}"/>
+                <a16:creationId xmlns:a16="http://schemas.microsoft.com/office/drawing/2014/main" xmlns="" id="{F559714E-416D-4742-9901-ADC4D8BAC5FA}"/>
               </a:ext>
             </a:extLst>
           </p:cNvPr>
@@ -4018,7 +4018,7 @@
           <p:cNvPr id="31" name="Rectangle 30">
             <a:extLst>
               <a:ext uri="{FF2B5EF4-FFF2-40B4-BE49-F238E27FC236}">
-                <a16:creationId xmlns:a16="http://schemas.microsoft.com/office/drawing/2014/main" id="{9061AF07-38B9-4B05-B6B2-1A74D7C0C618}"/>
+                <a16:creationId xmlns:a16="http://schemas.microsoft.com/office/drawing/2014/main" xmlns="" id="{9061AF07-38B9-4B05-B6B2-1A74D7C0C618}"/>
               </a:ext>
             </a:extLst>
           </p:cNvPr>
@@ -4078,7 +4078,7 @@
           <p:cNvPr id="33" name="Connector: Elbow 32">
             <a:extLst>
               <a:ext uri="{FF2B5EF4-FFF2-40B4-BE49-F238E27FC236}">
-                <a16:creationId xmlns:a16="http://schemas.microsoft.com/office/drawing/2014/main" id="{B367C937-E98B-4009-B48E-DBF7102DCFD1}"/>
+                <a16:creationId xmlns:a16="http://schemas.microsoft.com/office/drawing/2014/main" xmlns="" id="{B367C937-E98B-4009-B48E-DBF7102DCFD1}"/>
               </a:ext>
             </a:extLst>
           </p:cNvPr>
@@ -4120,7 +4120,7 @@
           <p:cNvPr id="34" name="TextBox 33">
             <a:extLst>
               <a:ext uri="{FF2B5EF4-FFF2-40B4-BE49-F238E27FC236}">
-                <a16:creationId xmlns:a16="http://schemas.microsoft.com/office/drawing/2014/main" id="{7FC33359-8BE1-4CD9-AD98-06C75CE8FF08}"/>
+                <a16:creationId xmlns:a16="http://schemas.microsoft.com/office/drawing/2014/main" xmlns="" id="{7FC33359-8BE1-4CD9-AD98-06C75CE8FF08}"/>
               </a:ext>
             </a:extLst>
           </p:cNvPr>
@@ -4155,7 +4155,7 @@
           <p:cNvPr id="35" name="Rectangle 34">
             <a:extLst>
               <a:ext uri="{FF2B5EF4-FFF2-40B4-BE49-F238E27FC236}">
-                <a16:creationId xmlns:a16="http://schemas.microsoft.com/office/drawing/2014/main" id="{85531841-C806-4F00-B17D-D19E7CE1C155}"/>
+                <a16:creationId xmlns:a16="http://schemas.microsoft.com/office/drawing/2014/main" xmlns="" id="{85531841-C806-4F00-B17D-D19E7CE1C155}"/>
               </a:ext>
             </a:extLst>
           </p:cNvPr>
@@ -4214,7 +4214,7 @@
           <p:cNvPr id="37" name="Connector: Elbow 36">
             <a:extLst>
               <a:ext uri="{FF2B5EF4-FFF2-40B4-BE49-F238E27FC236}">
-                <a16:creationId xmlns:a16="http://schemas.microsoft.com/office/drawing/2014/main" id="{1BFE62EC-0F5D-4135-832D-63D5DC95509C}"/>
+                <a16:creationId xmlns:a16="http://schemas.microsoft.com/office/drawing/2014/main" xmlns="" id="{1BFE62EC-0F5D-4135-832D-63D5DC95509C}"/>
               </a:ext>
             </a:extLst>
           </p:cNvPr>
@@ -4259,7 +4259,7 @@
           <p:cNvPr id="38" name="TextBox 37">
             <a:extLst>
               <a:ext uri="{FF2B5EF4-FFF2-40B4-BE49-F238E27FC236}">
-                <a16:creationId xmlns:a16="http://schemas.microsoft.com/office/drawing/2014/main" id="{892D5E6B-E445-4560-9C01-6D3C52FFC5AA}"/>
+                <a16:creationId xmlns:a16="http://schemas.microsoft.com/office/drawing/2014/main" xmlns="" id="{892D5E6B-E445-4560-9C01-6D3C52FFC5AA}"/>
               </a:ext>
             </a:extLst>
           </p:cNvPr>
@@ -4294,7 +4294,7 @@
           <p:cNvPr id="39" name="Rectangle 38">
             <a:extLst>
               <a:ext uri="{FF2B5EF4-FFF2-40B4-BE49-F238E27FC236}">
-                <a16:creationId xmlns:a16="http://schemas.microsoft.com/office/drawing/2014/main" id="{2F2BC059-EF97-4BEE-8F18-133838E3F2D8}"/>
+                <a16:creationId xmlns:a16="http://schemas.microsoft.com/office/drawing/2014/main" xmlns="" id="{2F2BC059-EF97-4BEE-8F18-133838E3F2D8}"/>
               </a:ext>
             </a:extLst>
           </p:cNvPr>
@@ -4343,7 +4343,7 @@
           <p:cNvPr id="44" name="TextBox 43">
             <a:extLst>
               <a:ext uri="{FF2B5EF4-FFF2-40B4-BE49-F238E27FC236}">
-                <a16:creationId xmlns:a16="http://schemas.microsoft.com/office/drawing/2014/main" id="{48B10C1F-BA7F-40E8-B79A-E87D7A3A66AB}"/>
+                <a16:creationId xmlns:a16="http://schemas.microsoft.com/office/drawing/2014/main" xmlns="" id="{48B10C1F-BA7F-40E8-B79A-E87D7A3A66AB}"/>
               </a:ext>
             </a:extLst>
           </p:cNvPr>
@@ -4558,7 +4558,7 @@
           <p:cNvPr id="11" name="TextBox 10">
             <a:extLst>
               <a:ext uri="{FF2B5EF4-FFF2-40B4-BE49-F238E27FC236}">
-                <a16:creationId xmlns:a16="http://schemas.microsoft.com/office/drawing/2014/main" id="{E0BBD6C8-C8F2-40C5-AA64-85961A11ADC2}"/>
+                <a16:creationId xmlns:a16="http://schemas.microsoft.com/office/drawing/2014/main" xmlns="" id="{E0BBD6C8-C8F2-40C5-AA64-85961A11ADC2}"/>
               </a:ext>
             </a:extLst>
           </p:cNvPr>
@@ -4692,7 +4692,7 @@
           <p:cNvPr id="19" name="TextBox 18">
             <a:extLst>
               <a:ext uri="{FF2B5EF4-FFF2-40B4-BE49-F238E27FC236}">
-                <a16:creationId xmlns:a16="http://schemas.microsoft.com/office/drawing/2014/main" id="{E0BBD6C8-C8F2-40C5-AA64-85961A11ADC2}"/>
+                <a16:creationId xmlns:a16="http://schemas.microsoft.com/office/drawing/2014/main" xmlns="" id="{E0BBD6C8-C8F2-40C5-AA64-85961A11ADC2}"/>
               </a:ext>
             </a:extLst>
           </p:cNvPr>
@@ -4814,7 +4814,7 @@
           <p:cNvPr id="23" name="TextBox 22">
             <a:extLst>
               <a:ext uri="{FF2B5EF4-FFF2-40B4-BE49-F238E27FC236}">
-                <a16:creationId xmlns:a16="http://schemas.microsoft.com/office/drawing/2014/main" id="{E0BBD6C8-C8F2-40C5-AA64-85961A11ADC2}"/>
+                <a16:creationId xmlns:a16="http://schemas.microsoft.com/office/drawing/2014/main" xmlns="" id="{E0BBD6C8-C8F2-40C5-AA64-85961A11ADC2}"/>
               </a:ext>
             </a:extLst>
           </p:cNvPr>
@@ -4928,7 +4928,7 @@
           <p:cNvPr id="28" name="TextBox 27">
             <a:extLst>
               <a:ext uri="{FF2B5EF4-FFF2-40B4-BE49-F238E27FC236}">
-                <a16:creationId xmlns:a16="http://schemas.microsoft.com/office/drawing/2014/main" id="{E0BBD6C8-C8F2-40C5-AA64-85961A11ADC2}"/>
+                <a16:creationId xmlns:a16="http://schemas.microsoft.com/office/drawing/2014/main" xmlns="" id="{E0BBD6C8-C8F2-40C5-AA64-85961A11ADC2}"/>
               </a:ext>
             </a:extLst>
           </p:cNvPr>
@@ -5049,7 +5049,7 @@
           <p:cNvPr id="34" name="TextBox 33">
             <a:extLst>
               <a:ext uri="{FF2B5EF4-FFF2-40B4-BE49-F238E27FC236}">
-                <a16:creationId xmlns:a16="http://schemas.microsoft.com/office/drawing/2014/main" id="{E0BBD6C8-C8F2-40C5-AA64-85961A11ADC2}"/>
+                <a16:creationId xmlns:a16="http://schemas.microsoft.com/office/drawing/2014/main" xmlns="" id="{E0BBD6C8-C8F2-40C5-AA64-85961A11ADC2}"/>
               </a:ext>
             </a:extLst>
           </p:cNvPr>
@@ -5176,7 +5176,7 @@
           <p:cNvPr id="38" name="TextBox 37">
             <a:extLst>
               <a:ext uri="{FF2B5EF4-FFF2-40B4-BE49-F238E27FC236}">
-                <a16:creationId xmlns:a16="http://schemas.microsoft.com/office/drawing/2014/main" id="{E0BBD6C8-C8F2-40C5-AA64-85961A11ADC2}"/>
+                <a16:creationId xmlns:a16="http://schemas.microsoft.com/office/drawing/2014/main" xmlns="" id="{E0BBD6C8-C8F2-40C5-AA64-85961A11ADC2}"/>
               </a:ext>
             </a:extLst>
           </p:cNvPr>
@@ -5340,7 +5340,7 @@
           <p:cNvPr id="44" name="TextBox 43">
             <a:extLst>
               <a:ext uri="{FF2B5EF4-FFF2-40B4-BE49-F238E27FC236}">
-                <a16:creationId xmlns:a16="http://schemas.microsoft.com/office/drawing/2014/main" id="{E0BBD6C8-C8F2-40C5-AA64-85961A11ADC2}"/>
+                <a16:creationId xmlns:a16="http://schemas.microsoft.com/office/drawing/2014/main" xmlns="" id="{E0BBD6C8-C8F2-40C5-AA64-85961A11ADC2}"/>
               </a:ext>
             </a:extLst>
           </p:cNvPr>
@@ -5375,7 +5375,7 @@
           <p:cNvPr id="45" name="TextBox 44">
             <a:extLst>
               <a:ext uri="{FF2B5EF4-FFF2-40B4-BE49-F238E27FC236}">
-                <a16:creationId xmlns:a16="http://schemas.microsoft.com/office/drawing/2014/main" id="{E0BBD6C8-C8F2-40C5-AA64-85961A11ADC2}"/>
+                <a16:creationId xmlns:a16="http://schemas.microsoft.com/office/drawing/2014/main" xmlns="" id="{E0BBD6C8-C8F2-40C5-AA64-85961A11ADC2}"/>
               </a:ext>
             </a:extLst>
           </p:cNvPr>
@@ -5410,7 +5410,7 @@
           <p:cNvPr id="26" name="TextBox 25">
             <a:extLst>
               <a:ext uri="{FF2B5EF4-FFF2-40B4-BE49-F238E27FC236}">
-                <a16:creationId xmlns:a16="http://schemas.microsoft.com/office/drawing/2014/main" id="{70BF22D6-D5A2-4CCC-8E2D-329E25668556}"/>
+                <a16:creationId xmlns:a16="http://schemas.microsoft.com/office/drawing/2014/main" xmlns="" id="{70BF22D6-D5A2-4CCC-8E2D-329E25668556}"/>
               </a:ext>
             </a:extLst>
           </p:cNvPr>
@@ -5639,7 +5639,7 @@
           <p:cNvPr id="11" name="TextBox 10">
             <a:extLst>
               <a:ext uri="{FF2B5EF4-FFF2-40B4-BE49-F238E27FC236}">
-                <a16:creationId xmlns:a16="http://schemas.microsoft.com/office/drawing/2014/main" id="{E0BBD6C8-C8F2-40C5-AA64-85961A11ADC2}"/>
+                <a16:creationId xmlns:a16="http://schemas.microsoft.com/office/drawing/2014/main" xmlns="" id="{E0BBD6C8-C8F2-40C5-AA64-85961A11ADC2}"/>
               </a:ext>
             </a:extLst>
           </p:cNvPr>
@@ -5689,6 +5689,9 @@
           <a:prstGeom prst="rect">
             <a:avLst/>
           </a:prstGeom>
+          <a:solidFill>
+            <a:schemeClr val="accent3"/>
+          </a:solidFill>
         </p:spPr>
         <p:style>
           <a:lnRef idx="2">
@@ -5726,9 +5729,10 @@
           <a:p>
             <a:pPr algn="ctr"/>
             <a:r>
-              <a:rPr lang="en-US" dirty="0"/>
-              <a:t>DTO</a:t>
-            </a:r>
+              <a:rPr lang="en-US" dirty="0" err="1" smtClean="0"/>
+              <a:t>ClientDTO</a:t>
+            </a:r>
+            <a:endParaRPr lang="en-US" dirty="0"/>
           </a:p>
         </p:txBody>
       </p:sp>
@@ -5773,7 +5777,7 @@
           <p:cNvPr id="19" name="TextBox 18">
             <a:extLst>
               <a:ext uri="{FF2B5EF4-FFF2-40B4-BE49-F238E27FC236}">
-                <a16:creationId xmlns:a16="http://schemas.microsoft.com/office/drawing/2014/main" id="{E0BBD6C8-C8F2-40C5-AA64-85961A11ADC2}"/>
+                <a16:creationId xmlns:a16="http://schemas.microsoft.com/office/drawing/2014/main" xmlns="" id="{E0BBD6C8-C8F2-40C5-AA64-85961A11ADC2}"/>
               </a:ext>
             </a:extLst>
           </p:cNvPr>
@@ -5812,7 +5816,7 @@
         <p:spPr>
           <a:xfrm>
             <a:off x="7319764" y="1859829"/>
-            <a:ext cx="1494797" cy="991056"/>
+            <a:ext cx="1589922" cy="991056"/>
           </a:xfrm>
           <a:prstGeom prst="rect">
             <a:avLst/>
@@ -5851,7 +5855,7 @@
             <a:pPr algn="ctr"/>
             <a:r>
               <a:rPr lang="en-US" dirty="0" err="1"/>
-              <a:t>DAOImpl</a:t>
+              <a:t>ClientDAOImpl</a:t>
             </a:r>
             <a:endParaRPr lang="en-US" dirty="0"/>
           </a:p>
@@ -5898,7 +5902,7 @@
           <p:cNvPr id="23" name="TextBox 22">
             <a:extLst>
               <a:ext uri="{FF2B5EF4-FFF2-40B4-BE49-F238E27FC236}">
-                <a16:creationId xmlns:a16="http://schemas.microsoft.com/office/drawing/2014/main" id="{E0BBD6C8-C8F2-40C5-AA64-85961A11ADC2}"/>
+                <a16:creationId xmlns:a16="http://schemas.microsoft.com/office/drawing/2014/main" xmlns="" id="{E0BBD6C8-C8F2-40C5-AA64-85961A11ADC2}"/>
               </a:ext>
             </a:extLst>
           </p:cNvPr>
@@ -5985,8 +5989,8 @@
         </p:nvCxnSpPr>
         <p:spPr>
           <a:xfrm>
-            <a:off x="8814561" y="2355357"/>
-            <a:ext cx="1692826" cy="1077750"/>
+            <a:off x="8909686" y="2355357"/>
+            <a:ext cx="1597701" cy="1077750"/>
           </a:xfrm>
           <a:prstGeom prst="straightConnector1">
             <a:avLst/>
@@ -6015,7 +6019,7 @@
           <p:cNvPr id="28" name="TextBox 27">
             <a:extLst>
               <a:ext uri="{FF2B5EF4-FFF2-40B4-BE49-F238E27FC236}">
-                <a16:creationId xmlns:a16="http://schemas.microsoft.com/office/drawing/2014/main" id="{E0BBD6C8-C8F2-40C5-AA64-85961A11ADC2}"/>
+                <a16:creationId xmlns:a16="http://schemas.microsoft.com/office/drawing/2014/main" xmlns="" id="{E0BBD6C8-C8F2-40C5-AA64-85961A11ADC2}"/>
               </a:ext>
             </a:extLst>
           </p:cNvPr>
@@ -6106,8 +6110,8 @@
         </p:nvCxnSpPr>
         <p:spPr>
           <a:xfrm flipH="1" flipV="1">
-            <a:off x="8067163" y="2850885"/>
-            <a:ext cx="59318" cy="1423617"/>
+            <a:off x="8114725" y="2850885"/>
+            <a:ext cx="11756" cy="1423617"/>
           </a:xfrm>
           <a:prstGeom prst="straightConnector1">
             <a:avLst/>
@@ -6136,7 +6140,7 @@
           <p:cNvPr id="34" name="TextBox 33">
             <a:extLst>
               <a:ext uri="{FF2B5EF4-FFF2-40B4-BE49-F238E27FC236}">
-                <a16:creationId xmlns:a16="http://schemas.microsoft.com/office/drawing/2014/main" id="{E0BBD6C8-C8F2-40C5-AA64-85961A11ADC2}"/>
+                <a16:creationId xmlns:a16="http://schemas.microsoft.com/office/drawing/2014/main" xmlns="" id="{E0BBD6C8-C8F2-40C5-AA64-85961A11ADC2}"/>
               </a:ext>
             </a:extLst>
           </p:cNvPr>
@@ -6263,7 +6267,7 @@
           <p:cNvPr id="38" name="TextBox 37">
             <a:extLst>
               <a:ext uri="{FF2B5EF4-FFF2-40B4-BE49-F238E27FC236}">
-                <a16:creationId xmlns:a16="http://schemas.microsoft.com/office/drawing/2014/main" id="{E0BBD6C8-C8F2-40C5-AA64-85961A11ADC2}"/>
+                <a16:creationId xmlns:a16="http://schemas.microsoft.com/office/drawing/2014/main" xmlns="" id="{E0BBD6C8-C8F2-40C5-AA64-85961A11ADC2}"/>
               </a:ext>
             </a:extLst>
           </p:cNvPr>
@@ -6365,8 +6369,8 @@
         </p:nvCxnSpPr>
         <p:spPr>
           <a:xfrm flipV="1">
-            <a:off x="8067163" y="967812"/>
-            <a:ext cx="842523" cy="892017"/>
+            <a:off x="8114725" y="967812"/>
+            <a:ext cx="794961" cy="892017"/>
           </a:xfrm>
           <a:prstGeom prst="straightConnector1">
             <a:avLst/>
@@ -6431,7 +6435,7 @@
           <p:cNvPr id="44" name="TextBox 43">
             <a:extLst>
               <a:ext uri="{FF2B5EF4-FFF2-40B4-BE49-F238E27FC236}">
-                <a16:creationId xmlns:a16="http://schemas.microsoft.com/office/drawing/2014/main" id="{E0BBD6C8-C8F2-40C5-AA64-85961A11ADC2}"/>
+                <a16:creationId xmlns:a16="http://schemas.microsoft.com/office/drawing/2014/main" xmlns="" id="{E0BBD6C8-C8F2-40C5-AA64-85961A11ADC2}"/>
               </a:ext>
             </a:extLst>
           </p:cNvPr>
@@ -6466,7 +6470,7 @@
           <p:cNvPr id="45" name="TextBox 44">
             <a:extLst>
               <a:ext uri="{FF2B5EF4-FFF2-40B4-BE49-F238E27FC236}">
-                <a16:creationId xmlns:a16="http://schemas.microsoft.com/office/drawing/2014/main" id="{E0BBD6C8-C8F2-40C5-AA64-85961A11ADC2}"/>
+                <a16:creationId xmlns:a16="http://schemas.microsoft.com/office/drawing/2014/main" xmlns="" id="{E0BBD6C8-C8F2-40C5-AA64-85961A11ADC2}"/>
               </a:ext>
             </a:extLst>
           </p:cNvPr>
@@ -6501,7 +6505,7 @@
           <p:cNvPr id="26" name="TextBox 25">
             <a:extLst>
               <a:ext uri="{FF2B5EF4-FFF2-40B4-BE49-F238E27FC236}">
-                <a16:creationId xmlns:a16="http://schemas.microsoft.com/office/drawing/2014/main" id="{6C45E26E-8FEE-4439-A34B-789237C9C62C}"/>
+                <a16:creationId xmlns:a16="http://schemas.microsoft.com/office/drawing/2014/main" xmlns="" id="{6C45E26E-8FEE-4439-A34B-789237C9C62C}"/>
               </a:ext>
             </a:extLst>
           </p:cNvPr>
@@ -6710,7 +6714,7 @@
           <p:cNvPr id="11" name="TextBox 10">
             <a:extLst>
               <a:ext uri="{FF2B5EF4-FFF2-40B4-BE49-F238E27FC236}">
-                <a16:creationId xmlns:a16="http://schemas.microsoft.com/office/drawing/2014/main" id="{E0BBD6C8-C8F2-40C5-AA64-85961A11ADC2}"/>
+                <a16:creationId xmlns:a16="http://schemas.microsoft.com/office/drawing/2014/main" xmlns="" id="{E0BBD6C8-C8F2-40C5-AA64-85961A11ADC2}"/>
               </a:ext>
             </a:extLst>
           </p:cNvPr>

</xml_diff>

<commit_message>
20210801 updates to project files, client arch complete.
</commit_message>
<xml_diff>
--- a/docs/Project 0.pptx
+++ b/docs/Project 0.pptx
@@ -262,7 +262,7 @@
           <a:p>
             <a:fld id="{6C733091-19F0-4DD7-90FE-000B4789B4CF}" type="datetimeFigureOut">
               <a:rPr lang="en-US" smtClean="0"/>
-              <a:t>7/29/2021</a:t>
+              <a:t>8/1/2021</a:t>
             </a:fld>
             <a:endParaRPr lang="en-US"/>
           </a:p>
@@ -460,7 +460,7 @@
           <a:p>
             <a:fld id="{6C733091-19F0-4DD7-90FE-000B4789B4CF}" type="datetimeFigureOut">
               <a:rPr lang="en-US" smtClean="0"/>
-              <a:t>7/29/2021</a:t>
+              <a:t>8/1/2021</a:t>
             </a:fld>
             <a:endParaRPr lang="en-US"/>
           </a:p>
@@ -668,7 +668,7 @@
           <a:p>
             <a:fld id="{6C733091-19F0-4DD7-90FE-000B4789B4CF}" type="datetimeFigureOut">
               <a:rPr lang="en-US" smtClean="0"/>
-              <a:t>7/29/2021</a:t>
+              <a:t>8/1/2021</a:t>
             </a:fld>
             <a:endParaRPr lang="en-US"/>
           </a:p>
@@ -866,7 +866,7 @@
           <a:p>
             <a:fld id="{6C733091-19F0-4DD7-90FE-000B4789B4CF}" type="datetimeFigureOut">
               <a:rPr lang="en-US" smtClean="0"/>
-              <a:t>7/29/2021</a:t>
+              <a:t>8/1/2021</a:t>
             </a:fld>
             <a:endParaRPr lang="en-US"/>
           </a:p>
@@ -1141,7 +1141,7 @@
           <a:p>
             <a:fld id="{6C733091-19F0-4DD7-90FE-000B4789B4CF}" type="datetimeFigureOut">
               <a:rPr lang="en-US" smtClean="0"/>
-              <a:t>7/29/2021</a:t>
+              <a:t>8/1/2021</a:t>
             </a:fld>
             <a:endParaRPr lang="en-US"/>
           </a:p>
@@ -1406,7 +1406,7 @@
           <a:p>
             <a:fld id="{6C733091-19F0-4DD7-90FE-000B4789B4CF}" type="datetimeFigureOut">
               <a:rPr lang="en-US" smtClean="0"/>
-              <a:t>7/29/2021</a:t>
+              <a:t>8/1/2021</a:t>
             </a:fld>
             <a:endParaRPr lang="en-US"/>
           </a:p>
@@ -1818,7 +1818,7 @@
           <a:p>
             <a:fld id="{6C733091-19F0-4DD7-90FE-000B4789B4CF}" type="datetimeFigureOut">
               <a:rPr lang="en-US" smtClean="0"/>
-              <a:t>7/29/2021</a:t>
+              <a:t>8/1/2021</a:t>
             </a:fld>
             <a:endParaRPr lang="en-US"/>
           </a:p>
@@ -1959,7 +1959,7 @@
           <a:p>
             <a:fld id="{6C733091-19F0-4DD7-90FE-000B4789B4CF}" type="datetimeFigureOut">
               <a:rPr lang="en-US" smtClean="0"/>
-              <a:t>7/29/2021</a:t>
+              <a:t>8/1/2021</a:t>
             </a:fld>
             <a:endParaRPr lang="en-US"/>
           </a:p>
@@ -2072,7 +2072,7 @@
           <a:p>
             <a:fld id="{6C733091-19F0-4DD7-90FE-000B4789B4CF}" type="datetimeFigureOut">
               <a:rPr lang="en-US" smtClean="0"/>
-              <a:t>7/29/2021</a:t>
+              <a:t>8/1/2021</a:t>
             </a:fld>
             <a:endParaRPr lang="en-US"/>
           </a:p>
@@ -2383,7 +2383,7 @@
           <a:p>
             <a:fld id="{6C733091-19F0-4DD7-90FE-000B4789B4CF}" type="datetimeFigureOut">
               <a:rPr lang="en-US" smtClean="0"/>
-              <a:t>7/29/2021</a:t>
+              <a:t>8/1/2021</a:t>
             </a:fld>
             <a:endParaRPr lang="en-US"/>
           </a:p>
@@ -2671,7 +2671,7 @@
           <a:p>
             <a:fld id="{6C733091-19F0-4DD7-90FE-000B4789B4CF}" type="datetimeFigureOut">
               <a:rPr lang="en-US" smtClean="0"/>
-              <a:t>7/29/2021</a:t>
+              <a:t>8/1/2021</a:t>
             </a:fld>
             <a:endParaRPr lang="en-US"/>
           </a:p>
@@ -2912,7 +2912,7 @@
           <a:p>
             <a:fld id="{6C733091-19F0-4DD7-90FE-000B4789B4CF}" type="datetimeFigureOut">
               <a:rPr lang="en-US" smtClean="0"/>
-              <a:t>7/29/2021</a:t>
+              <a:t>8/1/2021</a:t>
             </a:fld>
             <a:endParaRPr lang="en-US"/>
           </a:p>
@@ -5553,7 +5553,7 @@
             <a:avLst/>
           </a:prstGeom>
           <a:solidFill>
-            <a:schemeClr val="accent3"/>
+            <a:schemeClr val="accent2"/>
           </a:solidFill>
         </p:spPr>
         <p:style>
@@ -5602,13 +5602,14 @@
         <p:nvCxnSpPr>
           <p:cNvPr id="9" name="Straight Arrow Connector 8"/>
           <p:cNvCxnSpPr>
-            <a:stCxn id="5" idx="0"/>
-            <a:endCxn id="4" idx="1"/>
+            <a:cxnSpLocks/>
+            <a:stCxn id="4" idx="1"/>
+            <a:endCxn id="5" idx="0"/>
           </p:cNvCxnSpPr>
           <p:nvPr/>
         </p:nvCxnSpPr>
         <p:spPr>
-          <a:xfrm flipV="1">
+          <a:xfrm flipH="1">
             <a:off x="1367165" y="1327797"/>
             <a:ext cx="2832505" cy="780778"/>
           </a:xfrm>
@@ -5689,6 +5690,9 @@
           <a:prstGeom prst="rect">
             <a:avLst/>
           </a:prstGeom>
+          <a:solidFill>
+            <a:schemeClr val="accent2"/>
+          </a:solidFill>
         </p:spPr>
         <p:style>
           <a:lnRef idx="2">
@@ -5726,9 +5730,18 @@
           <a:p>
             <a:pPr algn="ctr"/>
             <a:r>
-              <a:rPr lang="en-US" dirty="0"/>
-              <a:t>DTO</a:t>
-            </a:r>
+              <a:rPr lang="en-US" dirty="0" err="1"/>
+              <a:t>ClientDTO</a:t>
+            </a:r>
+            <a:endParaRPr lang="en-US" dirty="0"/>
+          </a:p>
+          <a:p>
+            <a:pPr algn="ctr"/>
+            <a:r>
+              <a:rPr lang="en-US" sz="1200" dirty="0" err="1"/>
+              <a:t>AddOrEditClientDTO</a:t>
+            </a:r>
+            <a:endParaRPr lang="en-US" sz="1200" dirty="0"/>
           </a:p>
         </p:txBody>
       </p:sp>
@@ -5812,13 +5825,13 @@
         <p:spPr>
           <a:xfrm>
             <a:off x="7319764" y="1859829"/>
-            <a:ext cx="1494797" cy="991056"/>
+            <a:ext cx="1589922" cy="991056"/>
           </a:xfrm>
           <a:prstGeom prst="rect">
             <a:avLst/>
           </a:prstGeom>
           <a:solidFill>
-            <a:schemeClr val="accent3"/>
+            <a:schemeClr val="accent2"/>
           </a:solidFill>
         </p:spPr>
         <p:style>
@@ -5851,7 +5864,7 @@
             <a:pPr algn="ctr"/>
             <a:r>
               <a:rPr lang="en-US" dirty="0" err="1"/>
-              <a:t>DAOImpl</a:t>
+              <a:t>ClientDAOImpl</a:t>
             </a:r>
             <a:endParaRPr lang="en-US" dirty="0"/>
           </a:p>
@@ -5985,8 +5998,8 @@
         </p:nvCxnSpPr>
         <p:spPr>
           <a:xfrm>
-            <a:off x="8814561" y="2355357"/>
-            <a:ext cx="1692826" cy="1077750"/>
+            <a:off x="8909686" y="2355357"/>
+            <a:ext cx="1597701" cy="1077750"/>
           </a:xfrm>
           <a:prstGeom prst="straightConnector1">
             <a:avLst/>
@@ -6059,6 +6072,9 @@
           <a:prstGeom prst="rect">
             <a:avLst/>
           </a:prstGeom>
+          <a:solidFill>
+            <a:schemeClr val="accent2"/>
+          </a:solidFill>
         </p:spPr>
         <p:style>
           <a:lnRef idx="2">
@@ -6089,9 +6105,10 @@
           <a:p>
             <a:pPr algn="ctr"/>
             <a:r>
-              <a:rPr lang="en-US" dirty="0"/>
-              <a:t>Service</a:t>
-            </a:r>
+              <a:rPr lang="en-US" dirty="0" err="1"/>
+              <a:t>ClientService</a:t>
+            </a:r>
+            <a:endParaRPr lang="en-US" dirty="0"/>
           </a:p>
         </p:txBody>
       </p:sp>
@@ -6106,8 +6123,8 @@
         </p:nvCxnSpPr>
         <p:spPr>
           <a:xfrm flipH="1" flipV="1">
-            <a:off x="8067163" y="2850885"/>
-            <a:ext cx="59318" cy="1423617"/>
+            <a:off x="8114725" y="2850885"/>
+            <a:ext cx="11756" cy="1423617"/>
           </a:xfrm>
           <a:prstGeom prst="straightConnector1">
             <a:avLst/>
@@ -6180,12 +6197,15 @@
         </p:nvSpPr>
         <p:spPr>
           <a:xfrm>
-            <a:off x="4333820" y="4377623"/>
-            <a:ext cx="1494797" cy="991056"/>
+            <a:off x="4505165" y="3447841"/>
+            <a:ext cx="1998489" cy="657053"/>
           </a:xfrm>
           <a:prstGeom prst="rect">
             <a:avLst/>
           </a:prstGeom>
+          <a:solidFill>
+            <a:schemeClr val="accent2"/>
+          </a:solidFill>
         </p:spPr>
         <p:style>
           <a:lnRef idx="2">
@@ -6216,9 +6236,10 @@
           <a:p>
             <a:pPr algn="ctr"/>
             <a:r>
-              <a:rPr lang="en-US" dirty="0"/>
-              <a:t>Exception</a:t>
-            </a:r>
+              <a:rPr lang="en-US" sz="1400" dirty="0" err="1"/>
+              <a:t>BadParameterException</a:t>
+            </a:r>
+            <a:endParaRPr lang="en-US" sz="1400" dirty="0"/>
           </a:p>
         </p:txBody>
       </p:sp>
@@ -6226,15 +6247,16 @@
         <p:nvCxnSpPr>
           <p:cNvPr id="37" name="Straight Arrow Connector 36"/>
           <p:cNvCxnSpPr>
+            <a:cxnSpLocks/>
             <a:stCxn id="29" idx="1"/>
             <a:endCxn id="35" idx="3"/>
           </p:cNvCxnSpPr>
           <p:nvPr/>
         </p:nvCxnSpPr>
         <p:spPr>
-          <a:xfrm flipH="1">
-            <a:off x="5828617" y="4770030"/>
-            <a:ext cx="1550465" cy="103121"/>
+          <a:xfrm flipH="1" flipV="1">
+            <a:off x="6503654" y="3776368"/>
+            <a:ext cx="875428" cy="993662"/>
           </a:xfrm>
           <a:prstGeom prst="straightConnector1">
             <a:avLst/>
@@ -6272,7 +6294,7 @@
         </p:nvSpPr>
         <p:spPr>
           <a:xfrm>
-            <a:off x="6211549" y="4503299"/>
+            <a:off x="6700557" y="4617354"/>
             <a:ext cx="728932" cy="276999"/>
           </a:xfrm>
           <a:prstGeom prst="rect">
@@ -6365,8 +6387,8 @@
         </p:nvCxnSpPr>
         <p:spPr>
           <a:xfrm flipV="1">
-            <a:off x="8067163" y="967812"/>
-            <a:ext cx="842523" cy="892017"/>
+            <a:off x="8114725" y="967812"/>
+            <a:ext cx="794961" cy="892017"/>
           </a:xfrm>
           <a:prstGeom prst="straightConnector1">
             <a:avLst/>
@@ -6531,6 +6553,210 @@
           </a:p>
         </p:txBody>
       </p:sp>
+      <p:sp>
+        <p:nvSpPr>
+          <p:cNvPr id="31" name="Rectangle 30">
+            <a:extLst>
+              <a:ext uri="{FF2B5EF4-FFF2-40B4-BE49-F238E27FC236}">
+                <a16:creationId xmlns:a16="http://schemas.microsoft.com/office/drawing/2014/main" id="{6D396BFC-10E0-4935-903B-EDC457BD1755}"/>
+              </a:ext>
+            </a:extLst>
+          </p:cNvPr>
+          <p:cNvSpPr/>
+          <p:nvPr/>
+        </p:nvSpPr>
+        <p:spPr>
+          <a:xfrm>
+            <a:off x="4508845" y="4540325"/>
+            <a:ext cx="1621682" cy="657053"/>
+          </a:xfrm>
+          <a:prstGeom prst="rect">
+            <a:avLst/>
+          </a:prstGeom>
+          <a:solidFill>
+            <a:schemeClr val="accent2"/>
+          </a:solidFill>
+        </p:spPr>
+        <p:style>
+          <a:lnRef idx="2">
+            <a:schemeClr val="accent1">
+              <a:shade val="50000"/>
+            </a:schemeClr>
+          </a:lnRef>
+          <a:fillRef idx="1">
+            <a:schemeClr val="accent1"/>
+          </a:fillRef>
+          <a:effectRef idx="0">
+            <a:schemeClr val="accent1"/>
+          </a:effectRef>
+          <a:fontRef idx="minor">
+            <a:schemeClr val="lt1"/>
+          </a:fontRef>
+        </p:style>
+        <p:txBody>
+          <a:bodyPr rtlCol="0" anchor="ctr"/>
+          <a:lstStyle/>
+          <a:p>
+            <a:pPr algn="ctr"/>
+            <a:r>
+              <a:rPr lang="en-US" sz="1000" dirty="0"/>
+              <a:t>com.tlw8253.exception</a:t>
+            </a:r>
+          </a:p>
+          <a:p>
+            <a:pPr algn="ctr"/>
+            <a:r>
+              <a:rPr lang="en-US" sz="1400" dirty="0" err="1"/>
+              <a:t>DatabaseException</a:t>
+            </a:r>
+            <a:endParaRPr lang="en-US" sz="1400" dirty="0"/>
+          </a:p>
+        </p:txBody>
+      </p:sp>
+      <p:sp>
+        <p:nvSpPr>
+          <p:cNvPr id="32" name="Rectangle 31">
+            <a:extLst>
+              <a:ext uri="{FF2B5EF4-FFF2-40B4-BE49-F238E27FC236}">
+                <a16:creationId xmlns:a16="http://schemas.microsoft.com/office/drawing/2014/main" id="{02A645C8-F11F-438D-92DC-F6FCCA5ECFB8}"/>
+              </a:ext>
+            </a:extLst>
+          </p:cNvPr>
+          <p:cNvSpPr/>
+          <p:nvPr/>
+        </p:nvSpPr>
+        <p:spPr>
+          <a:xfrm>
+            <a:off x="4505165" y="5729410"/>
+            <a:ext cx="2048896" cy="657053"/>
+          </a:xfrm>
+          <a:prstGeom prst="rect">
+            <a:avLst/>
+          </a:prstGeom>
+          <a:solidFill>
+            <a:schemeClr val="accent2"/>
+          </a:solidFill>
+        </p:spPr>
+        <p:style>
+          <a:lnRef idx="2">
+            <a:schemeClr val="accent1">
+              <a:shade val="50000"/>
+            </a:schemeClr>
+          </a:lnRef>
+          <a:fillRef idx="1">
+            <a:schemeClr val="accent1"/>
+          </a:fillRef>
+          <a:effectRef idx="0">
+            <a:schemeClr val="accent1"/>
+          </a:effectRef>
+          <a:fontRef idx="minor">
+            <a:schemeClr val="lt1"/>
+          </a:fontRef>
+        </p:style>
+        <p:txBody>
+          <a:bodyPr rtlCol="0" anchor="ctr"/>
+          <a:lstStyle/>
+          <a:p>
+            <a:pPr algn="ctr"/>
+            <a:r>
+              <a:rPr lang="en-US" sz="1000" dirty="0"/>
+              <a:t>com.tlw8253.exception</a:t>
+            </a:r>
+          </a:p>
+          <a:p>
+            <a:pPr algn="ctr"/>
+            <a:r>
+              <a:rPr lang="en-US" sz="1400" dirty="0" err="1"/>
+              <a:t>ClientNotFoundException</a:t>
+            </a:r>
+            <a:endParaRPr lang="en-US" sz="1400" dirty="0"/>
+          </a:p>
+        </p:txBody>
+      </p:sp>
+      <p:cxnSp>
+        <p:nvCxnSpPr>
+          <p:cNvPr id="12" name="Straight Arrow Connector 11">
+            <a:extLst>
+              <a:ext uri="{FF2B5EF4-FFF2-40B4-BE49-F238E27FC236}">
+                <a16:creationId xmlns:a16="http://schemas.microsoft.com/office/drawing/2014/main" id="{FF2076CA-F897-4293-B6CD-7408EB452156}"/>
+              </a:ext>
+            </a:extLst>
+          </p:cNvPr>
+          <p:cNvCxnSpPr>
+            <a:stCxn id="29" idx="1"/>
+            <a:endCxn id="31" idx="3"/>
+          </p:cNvCxnSpPr>
+          <p:nvPr/>
+        </p:nvCxnSpPr>
+        <p:spPr>
+          <a:xfrm flipH="1">
+            <a:off x="6130527" y="4770030"/>
+            <a:ext cx="1248555" cy="98822"/>
+          </a:xfrm>
+          <a:prstGeom prst="straightConnector1">
+            <a:avLst/>
+          </a:prstGeom>
+          <a:ln>
+            <a:tailEnd type="triangle"/>
+          </a:ln>
+        </p:spPr>
+        <p:style>
+          <a:lnRef idx="1">
+            <a:schemeClr val="accent1"/>
+          </a:lnRef>
+          <a:fillRef idx="0">
+            <a:schemeClr val="accent1"/>
+          </a:fillRef>
+          <a:effectRef idx="0">
+            <a:schemeClr val="accent1"/>
+          </a:effectRef>
+          <a:fontRef idx="minor">
+            <a:schemeClr val="tx1"/>
+          </a:fontRef>
+        </p:style>
+      </p:cxnSp>
+      <p:cxnSp>
+        <p:nvCxnSpPr>
+          <p:cNvPr id="14" name="Straight Arrow Connector 13">
+            <a:extLst>
+              <a:ext uri="{FF2B5EF4-FFF2-40B4-BE49-F238E27FC236}">
+                <a16:creationId xmlns:a16="http://schemas.microsoft.com/office/drawing/2014/main" id="{5C625B7B-4A1E-46C5-9082-4FEC89B30DA9}"/>
+              </a:ext>
+            </a:extLst>
+          </p:cNvPr>
+          <p:cNvCxnSpPr>
+            <a:stCxn id="29" idx="1"/>
+            <a:endCxn id="32" idx="3"/>
+          </p:cNvCxnSpPr>
+          <p:nvPr/>
+        </p:nvCxnSpPr>
+        <p:spPr>
+          <a:xfrm flipH="1">
+            <a:off x="6554061" y="4770030"/>
+            <a:ext cx="825021" cy="1287907"/>
+          </a:xfrm>
+          <a:prstGeom prst="straightConnector1">
+            <a:avLst/>
+          </a:prstGeom>
+          <a:ln>
+            <a:tailEnd type="triangle"/>
+          </a:ln>
+        </p:spPr>
+        <p:style>
+          <a:lnRef idx="1">
+            <a:schemeClr val="accent1"/>
+          </a:lnRef>
+          <a:fillRef idx="0">
+            <a:schemeClr val="accent1"/>
+          </a:fillRef>
+          <a:effectRef idx="0">
+            <a:schemeClr val="accent1"/>
+          </a:effectRef>
+          <a:fontRef idx="minor">
+            <a:schemeClr val="tx1"/>
+          </a:fontRef>
+        </p:style>
+      </p:cxnSp>
     </p:spTree>
     <p:extLst>
       <p:ext uri="{BB962C8B-B14F-4D97-AF65-F5344CB8AC3E}">

</xml_diff>

<commit_message>
20210802 updates to project files.
</commit_message>
<xml_diff>
--- a/docs/Project 0.pptx
+++ b/docs/Project 0.pptx
@@ -7,8 +7,9 @@
   <p:sldIdLst>
     <p:sldId id="256" r:id="rId2"/>
     <p:sldId id="257" r:id="rId3"/>
-    <p:sldId id="259" r:id="rId4"/>
-    <p:sldId id="258" r:id="rId5"/>
+    <p:sldId id="260" r:id="rId4"/>
+    <p:sldId id="259" r:id="rId5"/>
+    <p:sldId id="258" r:id="rId6"/>
   </p:sldIdLst>
   <p:sldSz cx="12192000" cy="6858000"/>
   <p:notesSz cx="6858000" cy="9144000"/>
@@ -137,7 +138,7 @@
           <p:cNvPr id="2" name="Title 1">
             <a:extLst>
               <a:ext uri="{FF2B5EF4-FFF2-40B4-BE49-F238E27FC236}">
-                <a16:creationId xmlns:a16="http://schemas.microsoft.com/office/drawing/2014/main" id="{67106D7E-D400-44F1-9A1A-D68CE501C73D}"/>
+                <a16:creationId xmlns:a16="http://schemas.microsoft.com/office/drawing/2014/main" xmlns="" id="{67106D7E-D400-44F1-9A1A-D68CE501C73D}"/>
               </a:ext>
             </a:extLst>
           </p:cNvPr>
@@ -174,7 +175,7 @@
           <p:cNvPr id="3" name="Subtitle 2">
             <a:extLst>
               <a:ext uri="{FF2B5EF4-FFF2-40B4-BE49-F238E27FC236}">
-                <a16:creationId xmlns:a16="http://schemas.microsoft.com/office/drawing/2014/main" id="{A5FDE527-E621-4639-A0C7-E1E9B0DFBCEC}"/>
+                <a16:creationId xmlns:a16="http://schemas.microsoft.com/office/drawing/2014/main" xmlns="" id="{A5FDE527-E621-4639-A0C7-E1E9B0DFBCEC}"/>
               </a:ext>
             </a:extLst>
           </p:cNvPr>
@@ -244,7 +245,7 @@
           <p:cNvPr id="4" name="Date Placeholder 3">
             <a:extLst>
               <a:ext uri="{FF2B5EF4-FFF2-40B4-BE49-F238E27FC236}">
-                <a16:creationId xmlns:a16="http://schemas.microsoft.com/office/drawing/2014/main" id="{E109CE88-B989-4109-89C8-36F7C245DB1C}"/>
+                <a16:creationId xmlns:a16="http://schemas.microsoft.com/office/drawing/2014/main" xmlns="" id="{E109CE88-B989-4109-89C8-36F7C245DB1C}"/>
               </a:ext>
             </a:extLst>
           </p:cNvPr>
@@ -262,7 +263,7 @@
           <a:p>
             <a:fld id="{6C733091-19F0-4DD7-90FE-000B4789B4CF}" type="datetimeFigureOut">
               <a:rPr lang="en-US" smtClean="0"/>
-              <a:t>8/1/2021</a:t>
+              <a:t>8/2/2021</a:t>
             </a:fld>
             <a:endParaRPr lang="en-US"/>
           </a:p>
@@ -273,7 +274,7 @@
           <p:cNvPr id="5" name="Footer Placeholder 4">
             <a:extLst>
               <a:ext uri="{FF2B5EF4-FFF2-40B4-BE49-F238E27FC236}">
-                <a16:creationId xmlns:a16="http://schemas.microsoft.com/office/drawing/2014/main" id="{0841498F-B991-43D3-B408-CC35D8EFCF37}"/>
+                <a16:creationId xmlns:a16="http://schemas.microsoft.com/office/drawing/2014/main" xmlns="" id="{0841498F-B991-43D3-B408-CC35D8EFCF37}"/>
               </a:ext>
             </a:extLst>
           </p:cNvPr>
@@ -298,7 +299,7 @@
           <p:cNvPr id="6" name="Slide Number Placeholder 5">
             <a:extLst>
               <a:ext uri="{FF2B5EF4-FFF2-40B4-BE49-F238E27FC236}">
-                <a16:creationId xmlns:a16="http://schemas.microsoft.com/office/drawing/2014/main" id="{01754CB8-17B1-45A0-AE7D-755EAA1B69D8}"/>
+                <a16:creationId xmlns:a16="http://schemas.microsoft.com/office/drawing/2014/main" xmlns="" id="{01754CB8-17B1-45A0-AE7D-755EAA1B69D8}"/>
               </a:ext>
             </a:extLst>
           </p:cNvPr>
@@ -357,7 +358,7 @@
           <p:cNvPr id="2" name="Title 1">
             <a:extLst>
               <a:ext uri="{FF2B5EF4-FFF2-40B4-BE49-F238E27FC236}">
-                <a16:creationId xmlns:a16="http://schemas.microsoft.com/office/drawing/2014/main" id="{E7A7B055-5DC2-440D-83C1-CAAE8E9A8E14}"/>
+                <a16:creationId xmlns:a16="http://schemas.microsoft.com/office/drawing/2014/main" xmlns="" id="{E7A7B055-5DC2-440D-83C1-CAAE8E9A8E14}"/>
               </a:ext>
             </a:extLst>
           </p:cNvPr>
@@ -385,7 +386,7 @@
           <p:cNvPr id="3" name="Vertical Text Placeholder 2">
             <a:extLst>
               <a:ext uri="{FF2B5EF4-FFF2-40B4-BE49-F238E27FC236}">
-                <a16:creationId xmlns:a16="http://schemas.microsoft.com/office/drawing/2014/main" id="{65710707-423D-4F9D-A49D-6C764C562553}"/>
+                <a16:creationId xmlns:a16="http://schemas.microsoft.com/office/drawing/2014/main" xmlns="" id="{65710707-423D-4F9D-A49D-6C764C562553}"/>
               </a:ext>
             </a:extLst>
           </p:cNvPr>
@@ -442,7 +443,7 @@
           <p:cNvPr id="4" name="Date Placeholder 3">
             <a:extLst>
               <a:ext uri="{FF2B5EF4-FFF2-40B4-BE49-F238E27FC236}">
-                <a16:creationId xmlns:a16="http://schemas.microsoft.com/office/drawing/2014/main" id="{98B6F7EF-D1BE-4437-85F3-99626E37E4EF}"/>
+                <a16:creationId xmlns:a16="http://schemas.microsoft.com/office/drawing/2014/main" xmlns="" id="{98B6F7EF-D1BE-4437-85F3-99626E37E4EF}"/>
               </a:ext>
             </a:extLst>
           </p:cNvPr>
@@ -460,7 +461,7 @@
           <a:p>
             <a:fld id="{6C733091-19F0-4DD7-90FE-000B4789B4CF}" type="datetimeFigureOut">
               <a:rPr lang="en-US" smtClean="0"/>
-              <a:t>8/1/2021</a:t>
+              <a:t>8/2/2021</a:t>
             </a:fld>
             <a:endParaRPr lang="en-US"/>
           </a:p>
@@ -471,7 +472,7 @@
           <p:cNvPr id="5" name="Footer Placeholder 4">
             <a:extLst>
               <a:ext uri="{FF2B5EF4-FFF2-40B4-BE49-F238E27FC236}">
-                <a16:creationId xmlns:a16="http://schemas.microsoft.com/office/drawing/2014/main" id="{D890AA9B-E479-4209-B245-83608F3D4013}"/>
+                <a16:creationId xmlns:a16="http://schemas.microsoft.com/office/drawing/2014/main" xmlns="" id="{D890AA9B-E479-4209-B245-83608F3D4013}"/>
               </a:ext>
             </a:extLst>
           </p:cNvPr>
@@ -496,7 +497,7 @@
           <p:cNvPr id="6" name="Slide Number Placeholder 5">
             <a:extLst>
               <a:ext uri="{FF2B5EF4-FFF2-40B4-BE49-F238E27FC236}">
-                <a16:creationId xmlns:a16="http://schemas.microsoft.com/office/drawing/2014/main" id="{0E4976E4-E15A-4296-A430-633D2BB9142B}"/>
+                <a16:creationId xmlns:a16="http://schemas.microsoft.com/office/drawing/2014/main" xmlns="" id="{0E4976E4-E15A-4296-A430-633D2BB9142B}"/>
               </a:ext>
             </a:extLst>
           </p:cNvPr>
@@ -555,7 +556,7 @@
           <p:cNvPr id="2" name="Vertical Title 1">
             <a:extLst>
               <a:ext uri="{FF2B5EF4-FFF2-40B4-BE49-F238E27FC236}">
-                <a16:creationId xmlns:a16="http://schemas.microsoft.com/office/drawing/2014/main" id="{66F63CF5-8DEE-4BB2-A2A5-5C16FEBE1AD5}"/>
+                <a16:creationId xmlns:a16="http://schemas.microsoft.com/office/drawing/2014/main" xmlns="" id="{66F63CF5-8DEE-4BB2-A2A5-5C16FEBE1AD5}"/>
               </a:ext>
             </a:extLst>
           </p:cNvPr>
@@ -588,7 +589,7 @@
           <p:cNvPr id="3" name="Vertical Text Placeholder 2">
             <a:extLst>
               <a:ext uri="{FF2B5EF4-FFF2-40B4-BE49-F238E27FC236}">
-                <a16:creationId xmlns:a16="http://schemas.microsoft.com/office/drawing/2014/main" id="{E0D5EBA5-94AF-4373-B032-A40FF73C7575}"/>
+                <a16:creationId xmlns:a16="http://schemas.microsoft.com/office/drawing/2014/main" xmlns="" id="{E0D5EBA5-94AF-4373-B032-A40FF73C7575}"/>
               </a:ext>
             </a:extLst>
           </p:cNvPr>
@@ -650,7 +651,7 @@
           <p:cNvPr id="4" name="Date Placeholder 3">
             <a:extLst>
               <a:ext uri="{FF2B5EF4-FFF2-40B4-BE49-F238E27FC236}">
-                <a16:creationId xmlns:a16="http://schemas.microsoft.com/office/drawing/2014/main" id="{7426B8E1-6758-4F5E-B618-96641332600B}"/>
+                <a16:creationId xmlns:a16="http://schemas.microsoft.com/office/drawing/2014/main" xmlns="" id="{7426B8E1-6758-4F5E-B618-96641332600B}"/>
               </a:ext>
             </a:extLst>
           </p:cNvPr>
@@ -668,7 +669,7 @@
           <a:p>
             <a:fld id="{6C733091-19F0-4DD7-90FE-000B4789B4CF}" type="datetimeFigureOut">
               <a:rPr lang="en-US" smtClean="0"/>
-              <a:t>8/1/2021</a:t>
+              <a:t>8/2/2021</a:t>
             </a:fld>
             <a:endParaRPr lang="en-US"/>
           </a:p>
@@ -679,7 +680,7 @@
           <p:cNvPr id="5" name="Footer Placeholder 4">
             <a:extLst>
               <a:ext uri="{FF2B5EF4-FFF2-40B4-BE49-F238E27FC236}">
-                <a16:creationId xmlns:a16="http://schemas.microsoft.com/office/drawing/2014/main" id="{F65E330E-2A7E-482D-AE0F-70EA5A29958B}"/>
+                <a16:creationId xmlns:a16="http://schemas.microsoft.com/office/drawing/2014/main" xmlns="" id="{F65E330E-2A7E-482D-AE0F-70EA5A29958B}"/>
               </a:ext>
             </a:extLst>
           </p:cNvPr>
@@ -704,7 +705,7 @@
           <p:cNvPr id="6" name="Slide Number Placeholder 5">
             <a:extLst>
               <a:ext uri="{FF2B5EF4-FFF2-40B4-BE49-F238E27FC236}">
-                <a16:creationId xmlns:a16="http://schemas.microsoft.com/office/drawing/2014/main" id="{B8000005-FC38-4A6C-9D09-7945EFA08160}"/>
+                <a16:creationId xmlns:a16="http://schemas.microsoft.com/office/drawing/2014/main" xmlns="" id="{B8000005-FC38-4A6C-9D09-7945EFA08160}"/>
               </a:ext>
             </a:extLst>
           </p:cNvPr>
@@ -763,7 +764,7 @@
           <p:cNvPr id="2" name="Title 1">
             <a:extLst>
               <a:ext uri="{FF2B5EF4-FFF2-40B4-BE49-F238E27FC236}">
-                <a16:creationId xmlns:a16="http://schemas.microsoft.com/office/drawing/2014/main" id="{91D0002C-766B-44B4-A24C-BE6DE6C7BA4C}"/>
+                <a16:creationId xmlns:a16="http://schemas.microsoft.com/office/drawing/2014/main" xmlns="" id="{91D0002C-766B-44B4-A24C-BE6DE6C7BA4C}"/>
               </a:ext>
             </a:extLst>
           </p:cNvPr>
@@ -791,7 +792,7 @@
           <p:cNvPr id="3" name="Content Placeholder 2">
             <a:extLst>
               <a:ext uri="{FF2B5EF4-FFF2-40B4-BE49-F238E27FC236}">
-                <a16:creationId xmlns:a16="http://schemas.microsoft.com/office/drawing/2014/main" id="{3455BAA9-6C7B-4874-AD76-BD466F64802D}"/>
+                <a16:creationId xmlns:a16="http://schemas.microsoft.com/office/drawing/2014/main" xmlns="" id="{3455BAA9-6C7B-4874-AD76-BD466F64802D}"/>
               </a:ext>
             </a:extLst>
           </p:cNvPr>
@@ -848,7 +849,7 @@
           <p:cNvPr id="4" name="Date Placeholder 3">
             <a:extLst>
               <a:ext uri="{FF2B5EF4-FFF2-40B4-BE49-F238E27FC236}">
-                <a16:creationId xmlns:a16="http://schemas.microsoft.com/office/drawing/2014/main" id="{8776BDAF-D8F2-4A61-904D-094BB4545702}"/>
+                <a16:creationId xmlns:a16="http://schemas.microsoft.com/office/drawing/2014/main" xmlns="" id="{8776BDAF-D8F2-4A61-904D-094BB4545702}"/>
               </a:ext>
             </a:extLst>
           </p:cNvPr>
@@ -866,7 +867,7 @@
           <a:p>
             <a:fld id="{6C733091-19F0-4DD7-90FE-000B4789B4CF}" type="datetimeFigureOut">
               <a:rPr lang="en-US" smtClean="0"/>
-              <a:t>8/1/2021</a:t>
+              <a:t>8/2/2021</a:t>
             </a:fld>
             <a:endParaRPr lang="en-US"/>
           </a:p>
@@ -877,7 +878,7 @@
           <p:cNvPr id="5" name="Footer Placeholder 4">
             <a:extLst>
               <a:ext uri="{FF2B5EF4-FFF2-40B4-BE49-F238E27FC236}">
-                <a16:creationId xmlns:a16="http://schemas.microsoft.com/office/drawing/2014/main" id="{F89C5665-4384-4706-9BD2-9F42B05C96BC}"/>
+                <a16:creationId xmlns:a16="http://schemas.microsoft.com/office/drawing/2014/main" xmlns="" id="{F89C5665-4384-4706-9BD2-9F42B05C96BC}"/>
               </a:ext>
             </a:extLst>
           </p:cNvPr>
@@ -902,7 +903,7 @@
           <p:cNvPr id="6" name="Slide Number Placeholder 5">
             <a:extLst>
               <a:ext uri="{FF2B5EF4-FFF2-40B4-BE49-F238E27FC236}">
-                <a16:creationId xmlns:a16="http://schemas.microsoft.com/office/drawing/2014/main" id="{7DCAD73E-CAB3-4BA7-905E-D203691D0418}"/>
+                <a16:creationId xmlns:a16="http://schemas.microsoft.com/office/drawing/2014/main" xmlns="" id="{7DCAD73E-CAB3-4BA7-905E-D203691D0418}"/>
               </a:ext>
             </a:extLst>
           </p:cNvPr>
@@ -961,7 +962,7 @@
           <p:cNvPr id="2" name="Title 1">
             <a:extLst>
               <a:ext uri="{FF2B5EF4-FFF2-40B4-BE49-F238E27FC236}">
-                <a16:creationId xmlns:a16="http://schemas.microsoft.com/office/drawing/2014/main" id="{A9880706-F7FA-4EC3-A022-9D6C7CEC3692}"/>
+                <a16:creationId xmlns:a16="http://schemas.microsoft.com/office/drawing/2014/main" xmlns="" id="{A9880706-F7FA-4EC3-A022-9D6C7CEC3692}"/>
               </a:ext>
             </a:extLst>
           </p:cNvPr>
@@ -998,7 +999,7 @@
           <p:cNvPr id="3" name="Text Placeholder 2">
             <a:extLst>
               <a:ext uri="{FF2B5EF4-FFF2-40B4-BE49-F238E27FC236}">
-                <a16:creationId xmlns:a16="http://schemas.microsoft.com/office/drawing/2014/main" id="{FA8A65D0-3DF5-448D-82EC-A967682A0DED}"/>
+                <a16:creationId xmlns:a16="http://schemas.microsoft.com/office/drawing/2014/main" xmlns="" id="{FA8A65D0-3DF5-448D-82EC-A967682A0DED}"/>
               </a:ext>
             </a:extLst>
           </p:cNvPr>
@@ -1123,7 +1124,7 @@
           <p:cNvPr id="4" name="Date Placeholder 3">
             <a:extLst>
               <a:ext uri="{FF2B5EF4-FFF2-40B4-BE49-F238E27FC236}">
-                <a16:creationId xmlns:a16="http://schemas.microsoft.com/office/drawing/2014/main" id="{600EA68C-01A6-487D-9D6E-1D1B4EAC0440}"/>
+                <a16:creationId xmlns:a16="http://schemas.microsoft.com/office/drawing/2014/main" xmlns="" id="{600EA68C-01A6-487D-9D6E-1D1B4EAC0440}"/>
               </a:ext>
             </a:extLst>
           </p:cNvPr>
@@ -1141,7 +1142,7 @@
           <a:p>
             <a:fld id="{6C733091-19F0-4DD7-90FE-000B4789B4CF}" type="datetimeFigureOut">
               <a:rPr lang="en-US" smtClean="0"/>
-              <a:t>8/1/2021</a:t>
+              <a:t>8/2/2021</a:t>
             </a:fld>
             <a:endParaRPr lang="en-US"/>
           </a:p>
@@ -1152,7 +1153,7 @@
           <p:cNvPr id="5" name="Footer Placeholder 4">
             <a:extLst>
               <a:ext uri="{FF2B5EF4-FFF2-40B4-BE49-F238E27FC236}">
-                <a16:creationId xmlns:a16="http://schemas.microsoft.com/office/drawing/2014/main" id="{6E6527CB-4FFD-4569-A82C-5EDC311B2CF6}"/>
+                <a16:creationId xmlns:a16="http://schemas.microsoft.com/office/drawing/2014/main" xmlns="" id="{6E6527CB-4FFD-4569-A82C-5EDC311B2CF6}"/>
               </a:ext>
             </a:extLst>
           </p:cNvPr>
@@ -1177,7 +1178,7 @@
           <p:cNvPr id="6" name="Slide Number Placeholder 5">
             <a:extLst>
               <a:ext uri="{FF2B5EF4-FFF2-40B4-BE49-F238E27FC236}">
-                <a16:creationId xmlns:a16="http://schemas.microsoft.com/office/drawing/2014/main" id="{24B19E5B-5A98-4381-A01D-01F81FD65792}"/>
+                <a16:creationId xmlns:a16="http://schemas.microsoft.com/office/drawing/2014/main" xmlns="" id="{24B19E5B-5A98-4381-A01D-01F81FD65792}"/>
               </a:ext>
             </a:extLst>
           </p:cNvPr>
@@ -1236,7 +1237,7 @@
           <p:cNvPr id="2" name="Title 1">
             <a:extLst>
               <a:ext uri="{FF2B5EF4-FFF2-40B4-BE49-F238E27FC236}">
-                <a16:creationId xmlns:a16="http://schemas.microsoft.com/office/drawing/2014/main" id="{63228B71-E923-4431-B8D2-FAE724678940}"/>
+                <a16:creationId xmlns:a16="http://schemas.microsoft.com/office/drawing/2014/main" xmlns="" id="{63228B71-E923-4431-B8D2-FAE724678940}"/>
               </a:ext>
             </a:extLst>
           </p:cNvPr>
@@ -1264,7 +1265,7 @@
           <p:cNvPr id="3" name="Content Placeholder 2">
             <a:extLst>
               <a:ext uri="{FF2B5EF4-FFF2-40B4-BE49-F238E27FC236}">
-                <a16:creationId xmlns:a16="http://schemas.microsoft.com/office/drawing/2014/main" id="{B18895E9-B7FF-4A00-955B-206CF8C73E43}"/>
+                <a16:creationId xmlns:a16="http://schemas.microsoft.com/office/drawing/2014/main" xmlns="" id="{B18895E9-B7FF-4A00-955B-206CF8C73E43}"/>
               </a:ext>
             </a:extLst>
           </p:cNvPr>
@@ -1326,7 +1327,7 @@
           <p:cNvPr id="4" name="Content Placeholder 3">
             <a:extLst>
               <a:ext uri="{FF2B5EF4-FFF2-40B4-BE49-F238E27FC236}">
-                <a16:creationId xmlns:a16="http://schemas.microsoft.com/office/drawing/2014/main" id="{DA813955-E3B9-44BC-8E1D-139269C8B48A}"/>
+                <a16:creationId xmlns:a16="http://schemas.microsoft.com/office/drawing/2014/main" xmlns="" id="{DA813955-E3B9-44BC-8E1D-139269C8B48A}"/>
               </a:ext>
             </a:extLst>
           </p:cNvPr>
@@ -1388,7 +1389,7 @@
           <p:cNvPr id="5" name="Date Placeholder 4">
             <a:extLst>
               <a:ext uri="{FF2B5EF4-FFF2-40B4-BE49-F238E27FC236}">
-                <a16:creationId xmlns:a16="http://schemas.microsoft.com/office/drawing/2014/main" id="{7E9B8EF5-28D5-4C4E-A2AB-EEA30D75DAFE}"/>
+                <a16:creationId xmlns:a16="http://schemas.microsoft.com/office/drawing/2014/main" xmlns="" id="{7E9B8EF5-28D5-4C4E-A2AB-EEA30D75DAFE}"/>
               </a:ext>
             </a:extLst>
           </p:cNvPr>
@@ -1406,7 +1407,7 @@
           <a:p>
             <a:fld id="{6C733091-19F0-4DD7-90FE-000B4789B4CF}" type="datetimeFigureOut">
               <a:rPr lang="en-US" smtClean="0"/>
-              <a:t>8/1/2021</a:t>
+              <a:t>8/2/2021</a:t>
             </a:fld>
             <a:endParaRPr lang="en-US"/>
           </a:p>
@@ -1417,7 +1418,7 @@
           <p:cNvPr id="6" name="Footer Placeholder 5">
             <a:extLst>
               <a:ext uri="{FF2B5EF4-FFF2-40B4-BE49-F238E27FC236}">
-                <a16:creationId xmlns:a16="http://schemas.microsoft.com/office/drawing/2014/main" id="{5723E678-8CB4-4335-AA04-6BD391748717}"/>
+                <a16:creationId xmlns:a16="http://schemas.microsoft.com/office/drawing/2014/main" xmlns="" id="{5723E678-8CB4-4335-AA04-6BD391748717}"/>
               </a:ext>
             </a:extLst>
           </p:cNvPr>
@@ -1442,7 +1443,7 @@
           <p:cNvPr id="7" name="Slide Number Placeholder 6">
             <a:extLst>
               <a:ext uri="{FF2B5EF4-FFF2-40B4-BE49-F238E27FC236}">
-                <a16:creationId xmlns:a16="http://schemas.microsoft.com/office/drawing/2014/main" id="{887B5567-9F4D-4AE1-92D8-769C9F7EA4F0}"/>
+                <a16:creationId xmlns:a16="http://schemas.microsoft.com/office/drawing/2014/main" xmlns="" id="{887B5567-9F4D-4AE1-92D8-769C9F7EA4F0}"/>
               </a:ext>
             </a:extLst>
           </p:cNvPr>
@@ -1501,7 +1502,7 @@
           <p:cNvPr id="2" name="Title 1">
             <a:extLst>
               <a:ext uri="{FF2B5EF4-FFF2-40B4-BE49-F238E27FC236}">
-                <a16:creationId xmlns:a16="http://schemas.microsoft.com/office/drawing/2014/main" id="{A40320A9-7C0C-45B4-BF2B-3B53B5686EBB}"/>
+                <a16:creationId xmlns:a16="http://schemas.microsoft.com/office/drawing/2014/main" xmlns="" id="{A40320A9-7C0C-45B4-BF2B-3B53B5686EBB}"/>
               </a:ext>
             </a:extLst>
           </p:cNvPr>
@@ -1534,7 +1535,7 @@
           <p:cNvPr id="3" name="Text Placeholder 2">
             <a:extLst>
               <a:ext uri="{FF2B5EF4-FFF2-40B4-BE49-F238E27FC236}">
-                <a16:creationId xmlns:a16="http://schemas.microsoft.com/office/drawing/2014/main" id="{8C440DE1-7DD6-4B1C-B961-CD2079B51F03}"/>
+                <a16:creationId xmlns:a16="http://schemas.microsoft.com/office/drawing/2014/main" xmlns="" id="{8C440DE1-7DD6-4B1C-B961-CD2079B51F03}"/>
               </a:ext>
             </a:extLst>
           </p:cNvPr>
@@ -1605,7 +1606,7 @@
           <p:cNvPr id="4" name="Content Placeholder 3">
             <a:extLst>
               <a:ext uri="{FF2B5EF4-FFF2-40B4-BE49-F238E27FC236}">
-                <a16:creationId xmlns:a16="http://schemas.microsoft.com/office/drawing/2014/main" id="{6FAFE840-CC9A-4D89-B05F-159EF756B427}"/>
+                <a16:creationId xmlns:a16="http://schemas.microsoft.com/office/drawing/2014/main" xmlns="" id="{6FAFE840-CC9A-4D89-B05F-159EF756B427}"/>
               </a:ext>
             </a:extLst>
           </p:cNvPr>
@@ -1667,7 +1668,7 @@
           <p:cNvPr id="5" name="Text Placeholder 4">
             <a:extLst>
               <a:ext uri="{FF2B5EF4-FFF2-40B4-BE49-F238E27FC236}">
-                <a16:creationId xmlns:a16="http://schemas.microsoft.com/office/drawing/2014/main" id="{4B87AADC-3401-48C6-98F6-0AB60F6DF9BE}"/>
+                <a16:creationId xmlns:a16="http://schemas.microsoft.com/office/drawing/2014/main" xmlns="" id="{4B87AADC-3401-48C6-98F6-0AB60F6DF9BE}"/>
               </a:ext>
             </a:extLst>
           </p:cNvPr>
@@ -1738,7 +1739,7 @@
           <p:cNvPr id="6" name="Content Placeholder 5">
             <a:extLst>
               <a:ext uri="{FF2B5EF4-FFF2-40B4-BE49-F238E27FC236}">
-                <a16:creationId xmlns:a16="http://schemas.microsoft.com/office/drawing/2014/main" id="{34BCF1A4-FB52-4DCD-80BC-324BA41C33CD}"/>
+                <a16:creationId xmlns:a16="http://schemas.microsoft.com/office/drawing/2014/main" xmlns="" id="{34BCF1A4-FB52-4DCD-80BC-324BA41C33CD}"/>
               </a:ext>
             </a:extLst>
           </p:cNvPr>
@@ -1800,7 +1801,7 @@
           <p:cNvPr id="7" name="Date Placeholder 6">
             <a:extLst>
               <a:ext uri="{FF2B5EF4-FFF2-40B4-BE49-F238E27FC236}">
-                <a16:creationId xmlns:a16="http://schemas.microsoft.com/office/drawing/2014/main" id="{8CFD4208-60E7-48B1-8CD0-717D5E26B827}"/>
+                <a16:creationId xmlns:a16="http://schemas.microsoft.com/office/drawing/2014/main" xmlns="" id="{8CFD4208-60E7-48B1-8CD0-717D5E26B827}"/>
               </a:ext>
             </a:extLst>
           </p:cNvPr>
@@ -1818,7 +1819,7 @@
           <a:p>
             <a:fld id="{6C733091-19F0-4DD7-90FE-000B4789B4CF}" type="datetimeFigureOut">
               <a:rPr lang="en-US" smtClean="0"/>
-              <a:t>8/1/2021</a:t>
+              <a:t>8/2/2021</a:t>
             </a:fld>
             <a:endParaRPr lang="en-US"/>
           </a:p>
@@ -1829,7 +1830,7 @@
           <p:cNvPr id="8" name="Footer Placeholder 7">
             <a:extLst>
               <a:ext uri="{FF2B5EF4-FFF2-40B4-BE49-F238E27FC236}">
-                <a16:creationId xmlns:a16="http://schemas.microsoft.com/office/drawing/2014/main" id="{94E429D1-BEB1-4D8A-91F2-CD4F80157F8D}"/>
+                <a16:creationId xmlns:a16="http://schemas.microsoft.com/office/drawing/2014/main" xmlns="" id="{94E429D1-BEB1-4D8A-91F2-CD4F80157F8D}"/>
               </a:ext>
             </a:extLst>
           </p:cNvPr>
@@ -1854,7 +1855,7 @@
           <p:cNvPr id="9" name="Slide Number Placeholder 8">
             <a:extLst>
               <a:ext uri="{FF2B5EF4-FFF2-40B4-BE49-F238E27FC236}">
-                <a16:creationId xmlns:a16="http://schemas.microsoft.com/office/drawing/2014/main" id="{6F17C19C-8370-4118-A8FC-5DDA6F84230F}"/>
+                <a16:creationId xmlns:a16="http://schemas.microsoft.com/office/drawing/2014/main" xmlns="" id="{6F17C19C-8370-4118-A8FC-5DDA6F84230F}"/>
               </a:ext>
             </a:extLst>
           </p:cNvPr>
@@ -1913,7 +1914,7 @@
           <p:cNvPr id="2" name="Title 1">
             <a:extLst>
               <a:ext uri="{FF2B5EF4-FFF2-40B4-BE49-F238E27FC236}">
-                <a16:creationId xmlns:a16="http://schemas.microsoft.com/office/drawing/2014/main" id="{252CBF36-7F99-45A9-BC35-BD2EC260CBF0}"/>
+                <a16:creationId xmlns:a16="http://schemas.microsoft.com/office/drawing/2014/main" xmlns="" id="{252CBF36-7F99-45A9-BC35-BD2EC260CBF0}"/>
               </a:ext>
             </a:extLst>
           </p:cNvPr>
@@ -1941,7 +1942,7 @@
           <p:cNvPr id="3" name="Date Placeholder 2">
             <a:extLst>
               <a:ext uri="{FF2B5EF4-FFF2-40B4-BE49-F238E27FC236}">
-                <a16:creationId xmlns:a16="http://schemas.microsoft.com/office/drawing/2014/main" id="{0D6F5F83-F07E-4501-B86B-9F96CD43993C}"/>
+                <a16:creationId xmlns:a16="http://schemas.microsoft.com/office/drawing/2014/main" xmlns="" id="{0D6F5F83-F07E-4501-B86B-9F96CD43993C}"/>
               </a:ext>
             </a:extLst>
           </p:cNvPr>
@@ -1959,7 +1960,7 @@
           <a:p>
             <a:fld id="{6C733091-19F0-4DD7-90FE-000B4789B4CF}" type="datetimeFigureOut">
               <a:rPr lang="en-US" smtClean="0"/>
-              <a:t>8/1/2021</a:t>
+              <a:t>8/2/2021</a:t>
             </a:fld>
             <a:endParaRPr lang="en-US"/>
           </a:p>
@@ -1970,7 +1971,7 @@
           <p:cNvPr id="4" name="Footer Placeholder 3">
             <a:extLst>
               <a:ext uri="{FF2B5EF4-FFF2-40B4-BE49-F238E27FC236}">
-                <a16:creationId xmlns:a16="http://schemas.microsoft.com/office/drawing/2014/main" id="{2861989B-F8E9-41FD-8E16-687424BCC266}"/>
+                <a16:creationId xmlns:a16="http://schemas.microsoft.com/office/drawing/2014/main" xmlns="" id="{2861989B-F8E9-41FD-8E16-687424BCC266}"/>
               </a:ext>
             </a:extLst>
           </p:cNvPr>
@@ -1995,7 +1996,7 @@
           <p:cNvPr id="5" name="Slide Number Placeholder 4">
             <a:extLst>
               <a:ext uri="{FF2B5EF4-FFF2-40B4-BE49-F238E27FC236}">
-                <a16:creationId xmlns:a16="http://schemas.microsoft.com/office/drawing/2014/main" id="{2026B6D7-7832-4815-95CE-5CEC39502825}"/>
+                <a16:creationId xmlns:a16="http://schemas.microsoft.com/office/drawing/2014/main" xmlns="" id="{2026B6D7-7832-4815-95CE-5CEC39502825}"/>
               </a:ext>
             </a:extLst>
           </p:cNvPr>
@@ -2054,7 +2055,7 @@
           <p:cNvPr id="2" name="Date Placeholder 1">
             <a:extLst>
               <a:ext uri="{FF2B5EF4-FFF2-40B4-BE49-F238E27FC236}">
-                <a16:creationId xmlns:a16="http://schemas.microsoft.com/office/drawing/2014/main" id="{9877919A-C4B6-46FD-A08A-9A4B867FE01A}"/>
+                <a16:creationId xmlns:a16="http://schemas.microsoft.com/office/drawing/2014/main" xmlns="" id="{9877919A-C4B6-46FD-A08A-9A4B867FE01A}"/>
               </a:ext>
             </a:extLst>
           </p:cNvPr>
@@ -2072,7 +2073,7 @@
           <a:p>
             <a:fld id="{6C733091-19F0-4DD7-90FE-000B4789B4CF}" type="datetimeFigureOut">
               <a:rPr lang="en-US" smtClean="0"/>
-              <a:t>8/1/2021</a:t>
+              <a:t>8/2/2021</a:t>
             </a:fld>
             <a:endParaRPr lang="en-US"/>
           </a:p>
@@ -2083,7 +2084,7 @@
           <p:cNvPr id="3" name="Footer Placeholder 2">
             <a:extLst>
               <a:ext uri="{FF2B5EF4-FFF2-40B4-BE49-F238E27FC236}">
-                <a16:creationId xmlns:a16="http://schemas.microsoft.com/office/drawing/2014/main" id="{9118539E-383C-4F1C-86F2-14C533A7E9FB}"/>
+                <a16:creationId xmlns:a16="http://schemas.microsoft.com/office/drawing/2014/main" xmlns="" id="{9118539E-383C-4F1C-86F2-14C533A7E9FB}"/>
               </a:ext>
             </a:extLst>
           </p:cNvPr>
@@ -2108,7 +2109,7 @@
           <p:cNvPr id="4" name="Slide Number Placeholder 3">
             <a:extLst>
               <a:ext uri="{FF2B5EF4-FFF2-40B4-BE49-F238E27FC236}">
-                <a16:creationId xmlns:a16="http://schemas.microsoft.com/office/drawing/2014/main" id="{C9A6D4E1-CA83-4214-9942-9E4617AA89BF}"/>
+                <a16:creationId xmlns:a16="http://schemas.microsoft.com/office/drawing/2014/main" xmlns="" id="{C9A6D4E1-CA83-4214-9942-9E4617AA89BF}"/>
               </a:ext>
             </a:extLst>
           </p:cNvPr>
@@ -2167,7 +2168,7 @@
           <p:cNvPr id="2" name="Title 1">
             <a:extLst>
               <a:ext uri="{FF2B5EF4-FFF2-40B4-BE49-F238E27FC236}">
-                <a16:creationId xmlns:a16="http://schemas.microsoft.com/office/drawing/2014/main" id="{046EF9B5-7A2A-4225-8817-86D028D6950C}"/>
+                <a16:creationId xmlns:a16="http://schemas.microsoft.com/office/drawing/2014/main" xmlns="" id="{046EF9B5-7A2A-4225-8817-86D028D6950C}"/>
               </a:ext>
             </a:extLst>
           </p:cNvPr>
@@ -2204,7 +2205,7 @@
           <p:cNvPr id="3" name="Content Placeholder 2">
             <a:extLst>
               <a:ext uri="{FF2B5EF4-FFF2-40B4-BE49-F238E27FC236}">
-                <a16:creationId xmlns:a16="http://schemas.microsoft.com/office/drawing/2014/main" id="{8667C390-5297-41E8-A403-22856007B051}"/>
+                <a16:creationId xmlns:a16="http://schemas.microsoft.com/office/drawing/2014/main" xmlns="" id="{8667C390-5297-41E8-A403-22856007B051}"/>
               </a:ext>
             </a:extLst>
           </p:cNvPr>
@@ -2294,7 +2295,7 @@
           <p:cNvPr id="4" name="Text Placeholder 3">
             <a:extLst>
               <a:ext uri="{FF2B5EF4-FFF2-40B4-BE49-F238E27FC236}">
-                <a16:creationId xmlns:a16="http://schemas.microsoft.com/office/drawing/2014/main" id="{8D0D2F7D-D6CD-4AB1-A3EA-CBFD2A2B3703}"/>
+                <a16:creationId xmlns:a16="http://schemas.microsoft.com/office/drawing/2014/main" xmlns="" id="{8D0D2F7D-D6CD-4AB1-A3EA-CBFD2A2B3703}"/>
               </a:ext>
             </a:extLst>
           </p:cNvPr>
@@ -2365,7 +2366,7 @@
           <p:cNvPr id="5" name="Date Placeholder 4">
             <a:extLst>
               <a:ext uri="{FF2B5EF4-FFF2-40B4-BE49-F238E27FC236}">
-                <a16:creationId xmlns:a16="http://schemas.microsoft.com/office/drawing/2014/main" id="{E17A441D-4FA7-4110-BF24-165CD3C3DAD7}"/>
+                <a16:creationId xmlns:a16="http://schemas.microsoft.com/office/drawing/2014/main" xmlns="" id="{E17A441D-4FA7-4110-BF24-165CD3C3DAD7}"/>
               </a:ext>
             </a:extLst>
           </p:cNvPr>
@@ -2383,7 +2384,7 @@
           <a:p>
             <a:fld id="{6C733091-19F0-4DD7-90FE-000B4789B4CF}" type="datetimeFigureOut">
               <a:rPr lang="en-US" smtClean="0"/>
-              <a:t>8/1/2021</a:t>
+              <a:t>8/2/2021</a:t>
             </a:fld>
             <a:endParaRPr lang="en-US"/>
           </a:p>
@@ -2394,7 +2395,7 @@
           <p:cNvPr id="6" name="Footer Placeholder 5">
             <a:extLst>
               <a:ext uri="{FF2B5EF4-FFF2-40B4-BE49-F238E27FC236}">
-                <a16:creationId xmlns:a16="http://schemas.microsoft.com/office/drawing/2014/main" id="{346102C5-5AE3-43CF-A686-1AB72B0790AB}"/>
+                <a16:creationId xmlns:a16="http://schemas.microsoft.com/office/drawing/2014/main" xmlns="" id="{346102C5-5AE3-43CF-A686-1AB72B0790AB}"/>
               </a:ext>
             </a:extLst>
           </p:cNvPr>
@@ -2419,7 +2420,7 @@
           <p:cNvPr id="7" name="Slide Number Placeholder 6">
             <a:extLst>
               <a:ext uri="{FF2B5EF4-FFF2-40B4-BE49-F238E27FC236}">
-                <a16:creationId xmlns:a16="http://schemas.microsoft.com/office/drawing/2014/main" id="{5528B3F7-462C-4500-8836-B3E5CD8DA61A}"/>
+                <a16:creationId xmlns:a16="http://schemas.microsoft.com/office/drawing/2014/main" xmlns="" id="{5528B3F7-462C-4500-8836-B3E5CD8DA61A}"/>
               </a:ext>
             </a:extLst>
           </p:cNvPr>
@@ -2478,7 +2479,7 @@
           <p:cNvPr id="2" name="Title 1">
             <a:extLst>
               <a:ext uri="{FF2B5EF4-FFF2-40B4-BE49-F238E27FC236}">
-                <a16:creationId xmlns:a16="http://schemas.microsoft.com/office/drawing/2014/main" id="{4BA10E59-DA48-4690-A956-9EB8E4E11EE5}"/>
+                <a16:creationId xmlns:a16="http://schemas.microsoft.com/office/drawing/2014/main" xmlns="" id="{4BA10E59-DA48-4690-A956-9EB8E4E11EE5}"/>
               </a:ext>
             </a:extLst>
           </p:cNvPr>
@@ -2515,7 +2516,7 @@
           <p:cNvPr id="3" name="Picture Placeholder 2">
             <a:extLst>
               <a:ext uri="{FF2B5EF4-FFF2-40B4-BE49-F238E27FC236}">
-                <a16:creationId xmlns:a16="http://schemas.microsoft.com/office/drawing/2014/main" id="{AC7AFE1E-67D1-4106-97CA-98302D42CC4D}"/>
+                <a16:creationId xmlns:a16="http://schemas.microsoft.com/office/drawing/2014/main" xmlns="" id="{AC7AFE1E-67D1-4106-97CA-98302D42CC4D}"/>
               </a:ext>
             </a:extLst>
           </p:cNvPr>
@@ -2582,7 +2583,7 @@
           <p:cNvPr id="4" name="Text Placeholder 3">
             <a:extLst>
               <a:ext uri="{FF2B5EF4-FFF2-40B4-BE49-F238E27FC236}">
-                <a16:creationId xmlns:a16="http://schemas.microsoft.com/office/drawing/2014/main" id="{67D8D73B-3D4D-42A7-9A3C-1D508E8A9B45}"/>
+                <a16:creationId xmlns:a16="http://schemas.microsoft.com/office/drawing/2014/main" xmlns="" id="{67D8D73B-3D4D-42A7-9A3C-1D508E8A9B45}"/>
               </a:ext>
             </a:extLst>
           </p:cNvPr>
@@ -2653,7 +2654,7 @@
           <p:cNvPr id="5" name="Date Placeholder 4">
             <a:extLst>
               <a:ext uri="{FF2B5EF4-FFF2-40B4-BE49-F238E27FC236}">
-                <a16:creationId xmlns:a16="http://schemas.microsoft.com/office/drawing/2014/main" id="{48C8945E-A47A-42A2-9DF6-CA6D5002F65F}"/>
+                <a16:creationId xmlns:a16="http://schemas.microsoft.com/office/drawing/2014/main" xmlns="" id="{48C8945E-A47A-42A2-9DF6-CA6D5002F65F}"/>
               </a:ext>
             </a:extLst>
           </p:cNvPr>
@@ -2671,7 +2672,7 @@
           <a:p>
             <a:fld id="{6C733091-19F0-4DD7-90FE-000B4789B4CF}" type="datetimeFigureOut">
               <a:rPr lang="en-US" smtClean="0"/>
-              <a:t>8/1/2021</a:t>
+              <a:t>8/2/2021</a:t>
             </a:fld>
             <a:endParaRPr lang="en-US"/>
           </a:p>
@@ -2682,7 +2683,7 @@
           <p:cNvPr id="6" name="Footer Placeholder 5">
             <a:extLst>
               <a:ext uri="{FF2B5EF4-FFF2-40B4-BE49-F238E27FC236}">
-                <a16:creationId xmlns:a16="http://schemas.microsoft.com/office/drawing/2014/main" id="{EB000DB4-2747-4297-B400-42A539FBDB42}"/>
+                <a16:creationId xmlns:a16="http://schemas.microsoft.com/office/drawing/2014/main" xmlns="" id="{EB000DB4-2747-4297-B400-42A539FBDB42}"/>
               </a:ext>
             </a:extLst>
           </p:cNvPr>
@@ -2707,7 +2708,7 @@
           <p:cNvPr id="7" name="Slide Number Placeholder 6">
             <a:extLst>
               <a:ext uri="{FF2B5EF4-FFF2-40B4-BE49-F238E27FC236}">
-                <a16:creationId xmlns:a16="http://schemas.microsoft.com/office/drawing/2014/main" id="{5BAD9222-F141-4803-AF73-E2DD92E2ABBC}"/>
+                <a16:creationId xmlns:a16="http://schemas.microsoft.com/office/drawing/2014/main" xmlns="" id="{5BAD9222-F141-4803-AF73-E2DD92E2ABBC}"/>
               </a:ext>
             </a:extLst>
           </p:cNvPr>
@@ -2771,7 +2772,7 @@
           <p:cNvPr id="2" name="Title Placeholder 1">
             <a:extLst>
               <a:ext uri="{FF2B5EF4-FFF2-40B4-BE49-F238E27FC236}">
-                <a16:creationId xmlns:a16="http://schemas.microsoft.com/office/drawing/2014/main" id="{5BF9D404-795C-4EA4-AD01-26740519239C}"/>
+                <a16:creationId xmlns:a16="http://schemas.microsoft.com/office/drawing/2014/main" xmlns="" id="{5BF9D404-795C-4EA4-AD01-26740519239C}"/>
               </a:ext>
             </a:extLst>
           </p:cNvPr>
@@ -2809,7 +2810,7 @@
           <p:cNvPr id="3" name="Text Placeholder 2">
             <a:extLst>
               <a:ext uri="{FF2B5EF4-FFF2-40B4-BE49-F238E27FC236}">
-                <a16:creationId xmlns:a16="http://schemas.microsoft.com/office/drawing/2014/main" id="{DE3FEC7B-48F8-4348-9BC6-68F83B859EE9}"/>
+                <a16:creationId xmlns:a16="http://schemas.microsoft.com/office/drawing/2014/main" xmlns="" id="{DE3FEC7B-48F8-4348-9BC6-68F83B859EE9}"/>
               </a:ext>
             </a:extLst>
           </p:cNvPr>
@@ -2876,7 +2877,7 @@
           <p:cNvPr id="4" name="Date Placeholder 3">
             <a:extLst>
               <a:ext uri="{FF2B5EF4-FFF2-40B4-BE49-F238E27FC236}">
-                <a16:creationId xmlns:a16="http://schemas.microsoft.com/office/drawing/2014/main" id="{31CA1A1D-E2F5-4161-A025-7B911965C2FE}"/>
+                <a16:creationId xmlns:a16="http://schemas.microsoft.com/office/drawing/2014/main" xmlns="" id="{31CA1A1D-E2F5-4161-A025-7B911965C2FE}"/>
               </a:ext>
             </a:extLst>
           </p:cNvPr>
@@ -2912,7 +2913,7 @@
           <a:p>
             <a:fld id="{6C733091-19F0-4DD7-90FE-000B4789B4CF}" type="datetimeFigureOut">
               <a:rPr lang="en-US" smtClean="0"/>
-              <a:t>8/1/2021</a:t>
+              <a:t>8/2/2021</a:t>
             </a:fld>
             <a:endParaRPr lang="en-US"/>
           </a:p>
@@ -2923,7 +2924,7 @@
           <p:cNvPr id="5" name="Footer Placeholder 4">
             <a:extLst>
               <a:ext uri="{FF2B5EF4-FFF2-40B4-BE49-F238E27FC236}">
-                <a16:creationId xmlns:a16="http://schemas.microsoft.com/office/drawing/2014/main" id="{43C7B926-18F3-4C13-AB92-764E10D324FB}"/>
+                <a16:creationId xmlns:a16="http://schemas.microsoft.com/office/drawing/2014/main" xmlns="" id="{43C7B926-18F3-4C13-AB92-764E10D324FB}"/>
               </a:ext>
             </a:extLst>
           </p:cNvPr>
@@ -2966,7 +2967,7 @@
           <p:cNvPr id="6" name="Slide Number Placeholder 5">
             <a:extLst>
               <a:ext uri="{FF2B5EF4-FFF2-40B4-BE49-F238E27FC236}">
-                <a16:creationId xmlns:a16="http://schemas.microsoft.com/office/drawing/2014/main" id="{734FA846-3BF6-46FD-80CF-34B300D244C0}"/>
+                <a16:creationId xmlns:a16="http://schemas.microsoft.com/office/drawing/2014/main" xmlns="" id="{734FA846-3BF6-46FD-80CF-34B300D244C0}"/>
               </a:ext>
             </a:extLst>
           </p:cNvPr>
@@ -3334,7 +3335,7 @@
           <p:cNvPr id="4" name="Rectangle 3">
             <a:extLst>
               <a:ext uri="{FF2B5EF4-FFF2-40B4-BE49-F238E27FC236}">
-                <a16:creationId xmlns:a16="http://schemas.microsoft.com/office/drawing/2014/main" id="{0A71868C-EF96-4004-8116-DFD1FCCEE6C3}"/>
+                <a16:creationId xmlns:a16="http://schemas.microsoft.com/office/drawing/2014/main" xmlns="" id="{0A71868C-EF96-4004-8116-DFD1FCCEE6C3}"/>
               </a:ext>
             </a:extLst>
           </p:cNvPr>
@@ -3390,7 +3391,7 @@
           <p:cNvPr id="5" name="Rectangle 4">
             <a:extLst>
               <a:ext uri="{FF2B5EF4-FFF2-40B4-BE49-F238E27FC236}">
-                <a16:creationId xmlns:a16="http://schemas.microsoft.com/office/drawing/2014/main" id="{67A88ADC-D070-420B-9A88-FDBA4865856A}"/>
+                <a16:creationId xmlns:a16="http://schemas.microsoft.com/office/drawing/2014/main" xmlns="" id="{67A88ADC-D070-420B-9A88-FDBA4865856A}"/>
               </a:ext>
             </a:extLst>
           </p:cNvPr>
@@ -3450,7 +3451,7 @@
           <p:cNvPr id="7" name="Straight Arrow Connector 6">
             <a:extLst>
               <a:ext uri="{FF2B5EF4-FFF2-40B4-BE49-F238E27FC236}">
-                <a16:creationId xmlns:a16="http://schemas.microsoft.com/office/drawing/2014/main" id="{45AD00B6-B022-4C7F-A523-E16E6292918D}"/>
+                <a16:creationId xmlns:a16="http://schemas.microsoft.com/office/drawing/2014/main" xmlns="" id="{45AD00B6-B022-4C7F-A523-E16E6292918D}"/>
               </a:ext>
             </a:extLst>
           </p:cNvPr>
@@ -3492,7 +3493,7 @@
           <p:cNvPr id="8" name="Rectangle 7">
             <a:extLst>
               <a:ext uri="{FF2B5EF4-FFF2-40B4-BE49-F238E27FC236}">
-                <a16:creationId xmlns:a16="http://schemas.microsoft.com/office/drawing/2014/main" id="{3C7A2B3E-B0CA-48CD-A6CB-935EF9D71843}"/>
+                <a16:creationId xmlns:a16="http://schemas.microsoft.com/office/drawing/2014/main" xmlns="" id="{3C7A2B3E-B0CA-48CD-A6CB-935EF9D71843}"/>
               </a:ext>
             </a:extLst>
           </p:cNvPr>
@@ -3552,7 +3553,7 @@
           <p:cNvPr id="9" name="TextBox 8">
             <a:extLst>
               <a:ext uri="{FF2B5EF4-FFF2-40B4-BE49-F238E27FC236}">
-                <a16:creationId xmlns:a16="http://schemas.microsoft.com/office/drawing/2014/main" id="{ABD7B54F-357C-489B-ADE1-DFA04BEA1686}"/>
+                <a16:creationId xmlns:a16="http://schemas.microsoft.com/office/drawing/2014/main" xmlns="" id="{ABD7B54F-357C-489B-ADE1-DFA04BEA1686}"/>
               </a:ext>
             </a:extLst>
           </p:cNvPr>
@@ -3587,7 +3588,7 @@
           <p:cNvPr id="10" name="Rectangle 9">
             <a:extLst>
               <a:ext uri="{FF2B5EF4-FFF2-40B4-BE49-F238E27FC236}">
-                <a16:creationId xmlns:a16="http://schemas.microsoft.com/office/drawing/2014/main" id="{21B869D6-66CB-4B38-975F-B7FEB6AA9B13}"/>
+                <a16:creationId xmlns:a16="http://schemas.microsoft.com/office/drawing/2014/main" xmlns="" id="{21B869D6-66CB-4B38-975F-B7FEB6AA9B13}"/>
               </a:ext>
             </a:extLst>
           </p:cNvPr>
@@ -3636,7 +3637,7 @@
           <p:cNvPr id="12" name="Straight Arrow Connector 11">
             <a:extLst>
               <a:ext uri="{FF2B5EF4-FFF2-40B4-BE49-F238E27FC236}">
-                <a16:creationId xmlns:a16="http://schemas.microsoft.com/office/drawing/2014/main" id="{78CBB1AB-C0E2-40F2-828D-F209304958AC}"/>
+                <a16:creationId xmlns:a16="http://schemas.microsoft.com/office/drawing/2014/main" xmlns="" id="{78CBB1AB-C0E2-40F2-828D-F209304958AC}"/>
               </a:ext>
             </a:extLst>
           </p:cNvPr>
@@ -3679,7 +3680,7 @@
           <p:cNvPr id="14" name="TextBox 13">
             <a:extLst>
               <a:ext uri="{FF2B5EF4-FFF2-40B4-BE49-F238E27FC236}">
-                <a16:creationId xmlns:a16="http://schemas.microsoft.com/office/drawing/2014/main" id="{E0BBD6C8-C8F2-40C5-AA64-85961A11ADC2}"/>
+                <a16:creationId xmlns:a16="http://schemas.microsoft.com/office/drawing/2014/main" xmlns="" id="{E0BBD6C8-C8F2-40C5-AA64-85961A11ADC2}"/>
               </a:ext>
             </a:extLst>
           </p:cNvPr>
@@ -3714,7 +3715,7 @@
           <p:cNvPr id="16" name="Straight Arrow Connector 15">
             <a:extLst>
               <a:ext uri="{FF2B5EF4-FFF2-40B4-BE49-F238E27FC236}">
-                <a16:creationId xmlns:a16="http://schemas.microsoft.com/office/drawing/2014/main" id="{22509349-F226-482F-AC14-E28C2411C4C3}"/>
+                <a16:creationId xmlns:a16="http://schemas.microsoft.com/office/drawing/2014/main" xmlns="" id="{22509349-F226-482F-AC14-E28C2411C4C3}"/>
               </a:ext>
             </a:extLst>
           </p:cNvPr>
@@ -3757,7 +3758,7 @@
           <p:cNvPr id="18" name="TextBox 17">
             <a:extLst>
               <a:ext uri="{FF2B5EF4-FFF2-40B4-BE49-F238E27FC236}">
-                <a16:creationId xmlns:a16="http://schemas.microsoft.com/office/drawing/2014/main" id="{E2DE2503-050C-47C3-BC73-C61D89CEB131}"/>
+                <a16:creationId xmlns:a16="http://schemas.microsoft.com/office/drawing/2014/main" xmlns="" id="{E2DE2503-050C-47C3-BC73-C61D89CEB131}"/>
               </a:ext>
             </a:extLst>
           </p:cNvPr>
@@ -3792,7 +3793,7 @@
           <p:cNvPr id="23" name="Straight Arrow Connector 22">
             <a:extLst>
               <a:ext uri="{FF2B5EF4-FFF2-40B4-BE49-F238E27FC236}">
-                <a16:creationId xmlns:a16="http://schemas.microsoft.com/office/drawing/2014/main" id="{5D314D83-3A56-4BD7-B215-19DEE4ED8C0B}"/>
+                <a16:creationId xmlns:a16="http://schemas.microsoft.com/office/drawing/2014/main" xmlns="" id="{5D314D83-3A56-4BD7-B215-19DEE4ED8C0B}"/>
               </a:ext>
             </a:extLst>
           </p:cNvPr>
@@ -3835,7 +3836,7 @@
           <p:cNvPr id="24" name="Straight Arrow Connector 23">
             <a:extLst>
               <a:ext uri="{FF2B5EF4-FFF2-40B4-BE49-F238E27FC236}">
-                <a16:creationId xmlns:a16="http://schemas.microsoft.com/office/drawing/2014/main" id="{874E7075-4C88-4378-99B9-DC474BE0CE65}"/>
+                <a16:creationId xmlns:a16="http://schemas.microsoft.com/office/drawing/2014/main" xmlns="" id="{874E7075-4C88-4378-99B9-DC474BE0CE65}"/>
               </a:ext>
             </a:extLst>
           </p:cNvPr>
@@ -3878,7 +3879,7 @@
           <p:cNvPr id="25" name="TextBox 24">
             <a:extLst>
               <a:ext uri="{FF2B5EF4-FFF2-40B4-BE49-F238E27FC236}">
-                <a16:creationId xmlns:a16="http://schemas.microsoft.com/office/drawing/2014/main" id="{171D93A1-C181-4F9C-8D75-C106DB531AB7}"/>
+                <a16:creationId xmlns:a16="http://schemas.microsoft.com/office/drawing/2014/main" xmlns="" id="{171D93A1-C181-4F9C-8D75-C106DB531AB7}"/>
               </a:ext>
             </a:extLst>
           </p:cNvPr>
@@ -3913,7 +3914,7 @@
           <p:cNvPr id="26" name="TextBox 25">
             <a:extLst>
               <a:ext uri="{FF2B5EF4-FFF2-40B4-BE49-F238E27FC236}">
-                <a16:creationId xmlns:a16="http://schemas.microsoft.com/office/drawing/2014/main" id="{03EAB749-77B2-435B-A0A3-02060FD4A06F}"/>
+                <a16:creationId xmlns:a16="http://schemas.microsoft.com/office/drawing/2014/main" xmlns="" id="{03EAB749-77B2-435B-A0A3-02060FD4A06F}"/>
               </a:ext>
             </a:extLst>
           </p:cNvPr>
@@ -3948,7 +3949,7 @@
           <p:cNvPr id="27" name="TextBox 26">
             <a:extLst>
               <a:ext uri="{FF2B5EF4-FFF2-40B4-BE49-F238E27FC236}">
-                <a16:creationId xmlns:a16="http://schemas.microsoft.com/office/drawing/2014/main" id="{7D8414B9-747D-41E7-A06D-8BBA5042C15C}"/>
+                <a16:creationId xmlns:a16="http://schemas.microsoft.com/office/drawing/2014/main" xmlns="" id="{7D8414B9-747D-41E7-A06D-8BBA5042C15C}"/>
               </a:ext>
             </a:extLst>
           </p:cNvPr>
@@ -3983,7 +3984,7 @@
           <p:cNvPr id="28" name="TextBox 27">
             <a:extLst>
               <a:ext uri="{FF2B5EF4-FFF2-40B4-BE49-F238E27FC236}">
-                <a16:creationId xmlns:a16="http://schemas.microsoft.com/office/drawing/2014/main" id="{F559714E-416D-4742-9901-ADC4D8BAC5FA}"/>
+                <a16:creationId xmlns:a16="http://schemas.microsoft.com/office/drawing/2014/main" xmlns="" id="{F559714E-416D-4742-9901-ADC4D8BAC5FA}"/>
               </a:ext>
             </a:extLst>
           </p:cNvPr>
@@ -4018,7 +4019,7 @@
           <p:cNvPr id="31" name="Rectangle 30">
             <a:extLst>
               <a:ext uri="{FF2B5EF4-FFF2-40B4-BE49-F238E27FC236}">
-                <a16:creationId xmlns:a16="http://schemas.microsoft.com/office/drawing/2014/main" id="{9061AF07-38B9-4B05-B6B2-1A74D7C0C618}"/>
+                <a16:creationId xmlns:a16="http://schemas.microsoft.com/office/drawing/2014/main" xmlns="" id="{9061AF07-38B9-4B05-B6B2-1A74D7C0C618}"/>
               </a:ext>
             </a:extLst>
           </p:cNvPr>
@@ -4078,7 +4079,7 @@
           <p:cNvPr id="33" name="Connector: Elbow 32">
             <a:extLst>
               <a:ext uri="{FF2B5EF4-FFF2-40B4-BE49-F238E27FC236}">
-                <a16:creationId xmlns:a16="http://schemas.microsoft.com/office/drawing/2014/main" id="{B367C937-E98B-4009-B48E-DBF7102DCFD1}"/>
+                <a16:creationId xmlns:a16="http://schemas.microsoft.com/office/drawing/2014/main" xmlns="" id="{B367C937-E98B-4009-B48E-DBF7102DCFD1}"/>
               </a:ext>
             </a:extLst>
           </p:cNvPr>
@@ -4120,7 +4121,7 @@
           <p:cNvPr id="34" name="TextBox 33">
             <a:extLst>
               <a:ext uri="{FF2B5EF4-FFF2-40B4-BE49-F238E27FC236}">
-                <a16:creationId xmlns:a16="http://schemas.microsoft.com/office/drawing/2014/main" id="{7FC33359-8BE1-4CD9-AD98-06C75CE8FF08}"/>
+                <a16:creationId xmlns:a16="http://schemas.microsoft.com/office/drawing/2014/main" xmlns="" id="{7FC33359-8BE1-4CD9-AD98-06C75CE8FF08}"/>
               </a:ext>
             </a:extLst>
           </p:cNvPr>
@@ -4155,7 +4156,7 @@
           <p:cNvPr id="35" name="Rectangle 34">
             <a:extLst>
               <a:ext uri="{FF2B5EF4-FFF2-40B4-BE49-F238E27FC236}">
-                <a16:creationId xmlns:a16="http://schemas.microsoft.com/office/drawing/2014/main" id="{85531841-C806-4F00-B17D-D19E7CE1C155}"/>
+                <a16:creationId xmlns:a16="http://schemas.microsoft.com/office/drawing/2014/main" xmlns="" id="{85531841-C806-4F00-B17D-D19E7CE1C155}"/>
               </a:ext>
             </a:extLst>
           </p:cNvPr>
@@ -4214,7 +4215,7 @@
           <p:cNvPr id="37" name="Connector: Elbow 36">
             <a:extLst>
               <a:ext uri="{FF2B5EF4-FFF2-40B4-BE49-F238E27FC236}">
-                <a16:creationId xmlns:a16="http://schemas.microsoft.com/office/drawing/2014/main" id="{1BFE62EC-0F5D-4135-832D-63D5DC95509C}"/>
+                <a16:creationId xmlns:a16="http://schemas.microsoft.com/office/drawing/2014/main" xmlns="" id="{1BFE62EC-0F5D-4135-832D-63D5DC95509C}"/>
               </a:ext>
             </a:extLst>
           </p:cNvPr>
@@ -4259,7 +4260,7 @@
           <p:cNvPr id="38" name="TextBox 37">
             <a:extLst>
               <a:ext uri="{FF2B5EF4-FFF2-40B4-BE49-F238E27FC236}">
-                <a16:creationId xmlns:a16="http://schemas.microsoft.com/office/drawing/2014/main" id="{892D5E6B-E445-4560-9C01-6D3C52FFC5AA}"/>
+                <a16:creationId xmlns:a16="http://schemas.microsoft.com/office/drawing/2014/main" xmlns="" id="{892D5E6B-E445-4560-9C01-6D3C52FFC5AA}"/>
               </a:ext>
             </a:extLst>
           </p:cNvPr>
@@ -4294,7 +4295,7 @@
           <p:cNvPr id="39" name="Rectangle 38">
             <a:extLst>
               <a:ext uri="{FF2B5EF4-FFF2-40B4-BE49-F238E27FC236}">
-                <a16:creationId xmlns:a16="http://schemas.microsoft.com/office/drawing/2014/main" id="{2F2BC059-EF97-4BEE-8F18-133838E3F2D8}"/>
+                <a16:creationId xmlns:a16="http://schemas.microsoft.com/office/drawing/2014/main" xmlns="" id="{2F2BC059-EF97-4BEE-8F18-133838E3F2D8}"/>
               </a:ext>
             </a:extLst>
           </p:cNvPr>
@@ -4343,7 +4344,7 @@
           <p:cNvPr id="44" name="TextBox 43">
             <a:extLst>
               <a:ext uri="{FF2B5EF4-FFF2-40B4-BE49-F238E27FC236}">
-                <a16:creationId xmlns:a16="http://schemas.microsoft.com/office/drawing/2014/main" id="{48B10C1F-BA7F-40E8-B79A-E87D7A3A66AB}"/>
+                <a16:creationId xmlns:a16="http://schemas.microsoft.com/office/drawing/2014/main" xmlns="" id="{48B10C1F-BA7F-40E8-B79A-E87D7A3A66AB}"/>
               </a:ext>
             </a:extLst>
           </p:cNvPr>
@@ -4411,7 +4412,7 @@
         </p:nvSpPr>
         <p:spPr>
           <a:xfrm>
-            <a:off x="4199670" y="832269"/>
+            <a:off x="3823524" y="717284"/>
             <a:ext cx="1494797" cy="991056"/>
           </a:xfrm>
           <a:prstGeom prst="rect">
@@ -4440,30 +4441,30 @@
           <a:p>
             <a:pPr algn="ctr"/>
             <a:r>
+              <a:rPr lang="en-US" sz="1000" dirty="0" smtClean="0"/>
+              <a:t>com.tlw8253.controller</a:t>
+            </a:r>
+            <a:endParaRPr lang="en-US" sz="1000" dirty="0"/>
+          </a:p>
+          <a:p>
+            <a:pPr algn="ctr"/>
+            <a:r>
               <a:rPr lang="en-US" sz="1000" dirty="0"/>
-              <a:t>com.tlw8253.dao</a:t>
-            </a:r>
+              <a:t>&lt;&lt; interface </a:t>
+            </a:r>
+            <a:r>
+              <a:rPr lang="en-US" sz="1000" dirty="0" smtClean="0"/>
+              <a:t>&gt;&gt;</a:t>
+            </a:r>
+            <a:endParaRPr lang="en-US" sz="1200" dirty="0"/>
           </a:p>
           <a:p>
             <a:pPr algn="ctr"/>
             <a:r>
-              <a:rPr lang="en-US" sz="1000" dirty="0"/>
-              <a:t>&lt;&lt; interface &gt;&gt;</a:t>
-            </a:r>
-          </a:p>
-          <a:p>
-            <a:pPr algn="ctr"/>
-            <a:r>
-              <a:rPr lang="en-US" sz="1200" dirty="0"/>
-              <a:t>Data Access Object</a:t>
-            </a:r>
-          </a:p>
-          <a:p>
-            <a:pPr algn="ctr"/>
-            <a:r>
-              <a:rPr lang="en-US" dirty="0"/>
-              <a:t>DAO</a:t>
-            </a:r>
+              <a:rPr lang="en-US" dirty="0" smtClean="0"/>
+              <a:t>Controller</a:t>
+            </a:r>
+            <a:endParaRPr lang="en-US" dirty="0"/>
           </a:p>
         </p:txBody>
       </p:sp>
@@ -4481,6 +4482,12 @@
           <a:prstGeom prst="rect">
             <a:avLst/>
           </a:prstGeom>
+          <a:solidFill>
+            <a:schemeClr val="tx1">
+              <a:lumMod val="50000"/>
+              <a:lumOff val="50000"/>
+            </a:schemeClr>
+          </a:solidFill>
         </p:spPr>
         <p:style>
           <a:lnRef idx="2">
@@ -4528,8 +4535,8 @@
         </p:nvCxnSpPr>
         <p:spPr>
           <a:xfrm flipV="1">
-            <a:off x="1367165" y="1327797"/>
-            <a:ext cx="2832505" cy="780778"/>
+            <a:off x="1367165" y="1212812"/>
+            <a:ext cx="2456359" cy="895763"/>
           </a:xfrm>
           <a:prstGeom prst="straightConnector1">
             <a:avLst/>
@@ -4558,7 +4565,7 @@
           <p:cNvPr id="11" name="TextBox 10">
             <a:extLst>
               <a:ext uri="{FF2B5EF4-FFF2-40B4-BE49-F238E27FC236}">
-                <a16:creationId xmlns:a16="http://schemas.microsoft.com/office/drawing/2014/main" id="{E0BBD6C8-C8F2-40C5-AA64-85961A11ADC2}"/>
+                <a16:creationId xmlns:a16="http://schemas.microsoft.com/office/drawing/2014/main" xmlns="" id="{E0BBD6C8-C8F2-40C5-AA64-85961A11ADC2}"/>
               </a:ext>
             </a:extLst>
           </p:cNvPr>
@@ -4567,8 +4574,8 @@
         </p:nvSpPr>
         <p:spPr>
           <a:xfrm>
-            <a:off x="1971030" y="1426110"/>
-            <a:ext cx="728932" cy="461665"/>
+            <a:off x="5669321" y="2285299"/>
+            <a:ext cx="728932" cy="276999"/>
           </a:xfrm>
           <a:prstGeom prst="rect">
             <a:avLst/>
@@ -4582,15 +4589,10 @@
           <a:lstStyle/>
           <a:p>
             <a:r>
-              <a:rPr lang="en-US" sz="1200" dirty="0"/>
+              <a:rPr lang="en-US" sz="1200" dirty="0" smtClean="0"/>
               <a:t>contains</a:t>
             </a:r>
-          </a:p>
-          <a:p>
-            <a:r>
-              <a:rPr lang="en-US" sz="1200" dirty="0"/>
-              <a:t>List&lt;&gt;</a:t>
-            </a:r>
+            <a:endParaRPr lang="en-US" sz="1200" dirty="0"/>
           </a:p>
         </p:txBody>
       </p:sp>
@@ -4602,7 +4604,7 @@
         </p:nvSpPr>
         <p:spPr>
           <a:xfrm>
-            <a:off x="2593538" y="2923890"/>
+            <a:off x="4426263" y="2858275"/>
             <a:ext cx="1494797" cy="991056"/>
           </a:xfrm>
           <a:prstGeom prst="rect">
@@ -4655,15 +4657,15 @@
         <p:nvCxnSpPr>
           <p:cNvPr id="17" name="Straight Arrow Connector 16"/>
           <p:cNvCxnSpPr>
-            <a:stCxn id="4" idx="2"/>
+            <a:stCxn id="20" idx="1"/>
             <a:endCxn id="15" idx="0"/>
           </p:cNvCxnSpPr>
           <p:nvPr/>
         </p:nvCxnSpPr>
         <p:spPr>
           <a:xfrm flipH="1">
-            <a:off x="3340937" y="1823325"/>
-            <a:ext cx="1606132" cy="1100565"/>
+            <a:off x="5173662" y="2383303"/>
+            <a:ext cx="1946978" cy="474972"/>
           </a:xfrm>
           <a:prstGeom prst="straightConnector1">
             <a:avLst/>
@@ -4692,7 +4694,7 @@
           <p:cNvPr id="19" name="TextBox 18">
             <a:extLst>
               <a:ext uri="{FF2B5EF4-FFF2-40B4-BE49-F238E27FC236}">
-                <a16:creationId xmlns:a16="http://schemas.microsoft.com/office/drawing/2014/main" id="{E0BBD6C8-C8F2-40C5-AA64-85961A11ADC2}"/>
+                <a16:creationId xmlns:a16="http://schemas.microsoft.com/office/drawing/2014/main" xmlns="" id="{E0BBD6C8-C8F2-40C5-AA64-85961A11ADC2}"/>
               </a:ext>
             </a:extLst>
           </p:cNvPr>
@@ -4730,8 +4732,8 @@
         </p:nvSpPr>
         <p:spPr>
           <a:xfrm>
-            <a:off x="7319764" y="1859829"/>
-            <a:ext cx="1494797" cy="991056"/>
+            <a:off x="7120640" y="1887775"/>
+            <a:ext cx="1632082" cy="991056"/>
           </a:xfrm>
           <a:prstGeom prst="rect">
             <a:avLst/>
@@ -4759,17 +4761,18 @@
           <a:p>
             <a:pPr algn="ctr"/>
             <a:r>
-              <a:rPr lang="en-US" sz="1000" dirty="0"/>
-              <a:t>com.tlw8253.dao</a:t>
-            </a:r>
+              <a:rPr lang="en-US" sz="1000" dirty="0" smtClean="0"/>
+              <a:t>com.tlw8253.controller</a:t>
+            </a:r>
+            <a:endParaRPr lang="en-US" sz="1000" dirty="0"/>
           </a:p>
           <a:p>
             <a:pPr algn="ctr"/>
             <a:r>
-              <a:rPr lang="en-US" dirty="0" err="1"/>
-              <a:t>DAOImpl</a:t>
-            </a:r>
-            <a:endParaRPr lang="en-US" dirty="0"/>
+              <a:rPr lang="en-US" sz="1400" dirty="0" err="1" smtClean="0"/>
+              <a:t>ExceptionController</a:t>
+            </a:r>
+            <a:endParaRPr lang="en-US" sz="1400" dirty="0"/>
           </a:p>
         </p:txBody>
       </p:sp>
@@ -4784,8 +4787,8 @@
         </p:nvCxnSpPr>
         <p:spPr>
           <a:xfrm flipH="1" flipV="1">
-            <a:off x="5694467" y="1327797"/>
-            <a:ext cx="1625297" cy="1027560"/>
+            <a:off x="5318321" y="1212812"/>
+            <a:ext cx="1802319" cy="1170491"/>
           </a:xfrm>
           <a:prstGeom prst="straightConnector1">
             <a:avLst/>
@@ -4814,7 +4817,7 @@
           <p:cNvPr id="23" name="TextBox 22">
             <a:extLst>
               <a:ext uri="{FF2B5EF4-FFF2-40B4-BE49-F238E27FC236}">
-                <a16:creationId xmlns:a16="http://schemas.microsoft.com/office/drawing/2014/main" id="{E0BBD6C8-C8F2-40C5-AA64-85961A11ADC2}"/>
+                <a16:creationId xmlns:a16="http://schemas.microsoft.com/office/drawing/2014/main" xmlns="" id="{E0BBD6C8-C8F2-40C5-AA64-85961A11ADC2}"/>
               </a:ext>
             </a:extLst>
           </p:cNvPr>
@@ -4858,6 +4861,12 @@
           <a:prstGeom prst="flowChartMagneticDisk">
             <a:avLst/>
           </a:prstGeom>
+          <a:solidFill>
+            <a:schemeClr val="tx1">
+              <a:lumMod val="50000"/>
+              <a:lumOff val="50000"/>
+            </a:schemeClr>
+          </a:solidFill>
         </p:spPr>
         <p:style>
           <a:lnRef idx="2">
@@ -4898,8 +4907,8 @@
         </p:nvCxnSpPr>
         <p:spPr>
           <a:xfrm>
-            <a:off x="8814561" y="2355357"/>
-            <a:ext cx="1692826" cy="1077750"/>
+            <a:off x="8752722" y="2383303"/>
+            <a:ext cx="1754665" cy="1049804"/>
           </a:xfrm>
           <a:prstGeom prst="straightConnector1">
             <a:avLst/>
@@ -4928,7 +4937,7 @@
           <p:cNvPr id="28" name="TextBox 27">
             <a:extLst>
               <a:ext uri="{FF2B5EF4-FFF2-40B4-BE49-F238E27FC236}">
-                <a16:creationId xmlns:a16="http://schemas.microsoft.com/office/drawing/2014/main" id="{E0BBD6C8-C8F2-40C5-AA64-85961A11ADC2}"/>
+                <a16:creationId xmlns:a16="http://schemas.microsoft.com/office/drawing/2014/main" xmlns="" id="{E0BBD6C8-C8F2-40C5-AA64-85961A11ADC2}"/>
               </a:ext>
             </a:extLst>
           </p:cNvPr>
@@ -4967,11 +4976,17 @@
         <p:spPr>
           <a:xfrm>
             <a:off x="7379082" y="4274502"/>
-            <a:ext cx="1494797" cy="991056"/>
+            <a:ext cx="1904651" cy="991056"/>
           </a:xfrm>
           <a:prstGeom prst="rect">
             <a:avLst/>
           </a:prstGeom>
+          <a:solidFill>
+            <a:schemeClr val="tx1">
+              <a:lumMod val="50000"/>
+              <a:lumOff val="50000"/>
+            </a:schemeClr>
+          </a:solidFill>
         </p:spPr>
         <p:style>
           <a:lnRef idx="2">
@@ -4995,16 +5010,18 @@
           <a:p>
             <a:pPr algn="ctr"/>
             <a:r>
-              <a:rPr lang="en-US" sz="1000" dirty="0"/>
-              <a:t>com.tlw8253.service</a:t>
-            </a:r>
+              <a:rPr lang="en-US" sz="1000" dirty="0" err="1" smtClean="0"/>
+              <a:t>io.javalin.http.ExceptionHandler</a:t>
+            </a:r>
+            <a:endParaRPr lang="en-US" sz="1000" dirty="0" smtClean="0"/>
           </a:p>
           <a:p>
             <a:pPr algn="ctr"/>
             <a:r>
-              <a:rPr lang="en-US" dirty="0"/>
-              <a:t>Service</a:t>
-            </a:r>
+              <a:rPr lang="en-US" dirty="0" err="1" smtClean="0"/>
+              <a:t>ExceptionHandler</a:t>
+            </a:r>
+            <a:endParaRPr lang="en-US" dirty="0"/>
           </a:p>
         </p:txBody>
       </p:sp>
@@ -5012,15 +5029,15 @@
         <p:nvCxnSpPr>
           <p:cNvPr id="33" name="Straight Arrow Connector 32"/>
           <p:cNvCxnSpPr>
-            <a:stCxn id="29" idx="0"/>
-            <a:endCxn id="20" idx="2"/>
+            <a:stCxn id="20" idx="2"/>
+            <a:endCxn id="29" idx="0"/>
           </p:cNvCxnSpPr>
           <p:nvPr/>
         </p:nvCxnSpPr>
         <p:spPr>
-          <a:xfrm flipH="1" flipV="1">
-            <a:off x="8067163" y="2850885"/>
-            <a:ext cx="59318" cy="1423617"/>
+          <a:xfrm>
+            <a:off x="7936681" y="2878831"/>
+            <a:ext cx="394727" cy="1395671"/>
           </a:xfrm>
           <a:prstGeom prst="straightConnector1">
             <a:avLst/>
@@ -5049,7 +5066,7 @@
           <p:cNvPr id="34" name="TextBox 33">
             <a:extLst>
               <a:ext uri="{FF2B5EF4-FFF2-40B4-BE49-F238E27FC236}">
-                <a16:creationId xmlns:a16="http://schemas.microsoft.com/office/drawing/2014/main" id="{E0BBD6C8-C8F2-40C5-AA64-85961A11ADC2}"/>
+                <a16:creationId xmlns:a16="http://schemas.microsoft.com/office/drawing/2014/main" xmlns="" id="{E0BBD6C8-C8F2-40C5-AA64-85961A11ADC2}"/>
               </a:ext>
             </a:extLst>
           </p:cNvPr>
@@ -5058,8 +5075,8 @@
         </p:nvSpPr>
         <p:spPr>
           <a:xfrm>
-            <a:off x="8221712" y="3239528"/>
-            <a:ext cx="1062021" cy="646331"/>
+            <a:off x="7892172" y="3513136"/>
+            <a:ext cx="1062021" cy="276999"/>
           </a:xfrm>
           <a:prstGeom prst="rect">
             <a:avLst/>
@@ -5073,15 +5090,10 @@
           <a:lstStyle/>
           <a:p>
             <a:r>
-              <a:rPr lang="en-US" sz="1200" dirty="0"/>
-              <a:t>contains</a:t>
-            </a:r>
-          </a:p>
-          <a:p>
-            <a:r>
-              <a:rPr lang="en-US" sz="1200" dirty="0"/>
-              <a:t>Implemented DAO</a:t>
-            </a:r>
+              <a:rPr lang="en-US" sz="1200" dirty="0" smtClean="0"/>
+              <a:t>returns</a:t>
+            </a:r>
+            <a:endParaRPr lang="en-US" sz="1200" dirty="0"/>
           </a:p>
         </p:txBody>
       </p:sp>
@@ -5099,6 +5111,12 @@
           <a:prstGeom prst="rect">
             <a:avLst/>
           </a:prstGeom>
+          <a:solidFill>
+            <a:schemeClr val="tx1">
+              <a:lumMod val="50000"/>
+              <a:lumOff val="50000"/>
+            </a:schemeClr>
+          </a:solidFill>
         </p:spPr>
         <p:style>
           <a:lnRef idx="2">
@@ -5122,16 +5140,22 @@
           <a:p>
             <a:pPr algn="ctr"/>
             <a:r>
-              <a:rPr lang="en-US" sz="1000" dirty="0"/>
-              <a:t>com.tlw8253.exception</a:t>
-            </a:r>
+              <a:rPr lang="en-US" sz="1000" dirty="0" err="1" smtClean="0"/>
+              <a:t>io.javalin.Javalin</a:t>
+            </a:r>
+            <a:endParaRPr lang="en-US" sz="1000" dirty="0" smtClean="0"/>
           </a:p>
           <a:p>
             <a:pPr algn="ctr"/>
             <a:r>
-              <a:rPr lang="en-US" dirty="0"/>
-              <a:t>Exception</a:t>
-            </a:r>
+              <a:rPr lang="en-US" dirty="0" err="1" smtClean="0"/>
+              <a:t>Javalin</a:t>
+            </a:r>
+            <a:r>
+              <a:rPr lang="en-US" dirty="0" smtClean="0"/>
+              <a:t> App</a:t>
+            </a:r>
+            <a:endParaRPr lang="en-US" dirty="0"/>
           </a:p>
         </p:txBody>
       </p:sp>
@@ -5139,15 +5163,15 @@
         <p:nvCxnSpPr>
           <p:cNvPr id="37" name="Straight Arrow Connector 36"/>
           <p:cNvCxnSpPr>
-            <a:stCxn id="29" idx="1"/>
+            <a:stCxn id="20" idx="2"/>
             <a:endCxn id="35" idx="3"/>
           </p:cNvCxnSpPr>
           <p:nvPr/>
         </p:nvCxnSpPr>
         <p:spPr>
           <a:xfrm flipH="1">
-            <a:off x="5828617" y="4770030"/>
-            <a:ext cx="1550465" cy="103121"/>
+            <a:off x="5828617" y="2878831"/>
+            <a:ext cx="2108064" cy="1994320"/>
           </a:xfrm>
           <a:prstGeom prst="straightConnector1">
             <a:avLst/>
@@ -5176,7 +5200,7 @@
           <p:cNvPr id="38" name="TextBox 37">
             <a:extLst>
               <a:ext uri="{FF2B5EF4-FFF2-40B4-BE49-F238E27FC236}">
-                <a16:creationId xmlns:a16="http://schemas.microsoft.com/office/drawing/2014/main" id="{E0BBD6C8-C8F2-40C5-AA64-85961A11ADC2}"/>
+                <a16:creationId xmlns:a16="http://schemas.microsoft.com/office/drawing/2014/main" xmlns="" id="{E0BBD6C8-C8F2-40C5-AA64-85961A11ADC2}"/>
               </a:ext>
             </a:extLst>
           </p:cNvPr>
@@ -5185,8 +5209,8 @@
         </p:nvSpPr>
         <p:spPr>
           <a:xfrm>
-            <a:off x="6211549" y="4503299"/>
-            <a:ext cx="728932" cy="276999"/>
+            <a:off x="6589629" y="3548141"/>
+            <a:ext cx="857256" cy="461665"/>
           </a:xfrm>
           <a:prstGeom prst="rect">
             <a:avLst/>
@@ -5201,8 +5225,13 @@
           <a:p>
             <a:r>
               <a:rPr lang="en-US" sz="1200" dirty="0"/>
-              <a:t>throws</a:t>
-            </a:r>
+              <a:t>m</a:t>
+            </a:r>
+            <a:r>
+              <a:rPr lang="en-US" sz="1200" dirty="0" smtClean="0"/>
+              <a:t>ap endpoints</a:t>
+            </a:r>
+            <a:endParaRPr lang="en-US" sz="1200" dirty="0"/>
           </a:p>
         </p:txBody>
       </p:sp>
@@ -5220,6 +5249,12 @@
           <a:prstGeom prst="rect">
             <a:avLst/>
           </a:prstGeom>
+          <a:solidFill>
+            <a:schemeClr val="tx1">
+              <a:lumMod val="50000"/>
+              <a:lumOff val="50000"/>
+            </a:schemeClr>
+          </a:solidFill>
         </p:spPr>
         <p:style>
           <a:lnRef idx="2">
@@ -5274,8 +5309,8 @@
         </p:nvCxnSpPr>
         <p:spPr>
           <a:xfrm flipV="1">
-            <a:off x="8067163" y="967812"/>
-            <a:ext cx="842523" cy="892017"/>
+            <a:off x="7936681" y="967812"/>
+            <a:ext cx="973005" cy="919963"/>
           </a:xfrm>
           <a:prstGeom prst="straightConnector1">
             <a:avLst/>
@@ -5340,7 +5375,7 @@
           <p:cNvPr id="44" name="TextBox 43">
             <a:extLst>
               <a:ext uri="{FF2B5EF4-FFF2-40B4-BE49-F238E27FC236}">
-                <a16:creationId xmlns:a16="http://schemas.microsoft.com/office/drawing/2014/main" id="{E0BBD6C8-C8F2-40C5-AA64-85961A11ADC2}"/>
+                <a16:creationId xmlns:a16="http://schemas.microsoft.com/office/drawing/2014/main" xmlns="" id="{E0BBD6C8-C8F2-40C5-AA64-85961A11ADC2}"/>
               </a:ext>
             </a:extLst>
           </p:cNvPr>
@@ -5375,7 +5410,7 @@
           <p:cNvPr id="45" name="TextBox 44">
             <a:extLst>
               <a:ext uri="{FF2B5EF4-FFF2-40B4-BE49-F238E27FC236}">
-                <a16:creationId xmlns:a16="http://schemas.microsoft.com/office/drawing/2014/main" id="{E0BBD6C8-C8F2-40C5-AA64-85961A11ADC2}"/>
+                <a16:creationId xmlns:a16="http://schemas.microsoft.com/office/drawing/2014/main" xmlns="" id="{E0BBD6C8-C8F2-40C5-AA64-85961A11ADC2}"/>
               </a:ext>
             </a:extLst>
           </p:cNvPr>
@@ -5410,7 +5445,7 @@
           <p:cNvPr id="26" name="TextBox 25">
             <a:extLst>
               <a:ext uri="{FF2B5EF4-FFF2-40B4-BE49-F238E27FC236}">
-                <a16:creationId xmlns:a16="http://schemas.microsoft.com/office/drawing/2014/main" id="{70BF22D6-D5A2-4CCC-8E2D-329E25668556}"/>
+                <a16:creationId xmlns:a16="http://schemas.microsoft.com/office/drawing/2014/main" xmlns="" id="{70BF22D6-D5A2-4CCC-8E2D-329E25668556}"/>
               </a:ext>
             </a:extLst>
           </p:cNvPr>
@@ -5435,7 +5470,19 @@
           <a:p>
             <a:r>
               <a:rPr lang="en-US" dirty="0"/>
-              <a:t>Project 0 Generic Database Access Model</a:t>
+              <a:t>Project 0 </a:t>
+            </a:r>
+            <a:r>
+              <a:rPr lang="en-US" dirty="0" smtClean="0"/>
+              <a:t>HTTP Exception</a:t>
+            </a:r>
+            <a:r>
+              <a:rPr lang="en-US" dirty="0" smtClean="0"/>
+              <a:t> </a:t>
+            </a:r>
+            <a:r>
+              <a:rPr lang="en-US" dirty="0"/>
+              <a:t>Model</a:t>
             </a:r>
           </a:p>
         </p:txBody>
@@ -5484,9 +5531,6 @@
           <a:prstGeom prst="rect">
             <a:avLst/>
           </a:prstGeom>
-          <a:solidFill>
-            <a:schemeClr val="accent2"/>
-          </a:solidFill>
         </p:spPr>
         <p:style>
           <a:lnRef idx="2">
@@ -5531,10 +5575,9 @@
           <a:p>
             <a:pPr algn="ctr"/>
             <a:r>
-              <a:rPr lang="en-US" dirty="0" err="1"/>
-              <a:t>ClientDAO</a:t>
-            </a:r>
-            <a:endParaRPr lang="en-US" dirty="0"/>
+              <a:rPr lang="en-US" dirty="0"/>
+              <a:t>DAO</a:t>
+            </a:r>
           </a:p>
         </p:txBody>
       </p:sp>
@@ -5552,9 +5595,6 @@
           <a:prstGeom prst="rect">
             <a:avLst/>
           </a:prstGeom>
-          <a:solidFill>
-            <a:schemeClr val="accent2"/>
-          </a:solidFill>
         </p:spPr>
         <p:style>
           <a:lnRef idx="2">
@@ -5579,21 +5619,14 @@
             <a:pPr algn="ctr"/>
             <a:r>
               <a:rPr lang="en-US" sz="1000" dirty="0"/>
-              <a:t>com.tlw8253.mode</a:t>
+              <a:t>com.tlw8253.model</a:t>
             </a:r>
           </a:p>
           <a:p>
             <a:pPr algn="ctr"/>
             <a:r>
-              <a:rPr lang="en-US" sz="1200" dirty="0"/>
+              <a:rPr lang="en-US" dirty="0"/>
               <a:t>Model</a:t>
-            </a:r>
-          </a:p>
-          <a:p>
-            <a:pPr algn="ctr"/>
-            <a:r>
-              <a:rPr lang="en-US" dirty="0"/>
-              <a:t>Client</a:t>
             </a:r>
           </a:p>
         </p:txBody>
@@ -5602,14 +5635,13 @@
         <p:nvCxnSpPr>
           <p:cNvPr id="9" name="Straight Arrow Connector 8"/>
           <p:cNvCxnSpPr>
-            <a:cxnSpLocks/>
-            <a:stCxn id="4" idx="1"/>
-            <a:endCxn id="5" idx="0"/>
+            <a:stCxn id="5" idx="0"/>
+            <a:endCxn id="4" idx="1"/>
           </p:cNvCxnSpPr>
           <p:nvPr/>
         </p:nvCxnSpPr>
         <p:spPr>
-          <a:xfrm flipH="1">
+          <a:xfrm flipV="1">
             <a:off x="1367165" y="1327797"/>
             <a:ext cx="2832505" cy="780778"/>
           </a:xfrm>
@@ -5640,7 +5672,7 @@
           <p:cNvPr id="11" name="TextBox 10">
             <a:extLst>
               <a:ext uri="{FF2B5EF4-FFF2-40B4-BE49-F238E27FC236}">
-                <a16:creationId xmlns:a16="http://schemas.microsoft.com/office/drawing/2014/main" id="{E0BBD6C8-C8F2-40C5-AA64-85961A11ADC2}"/>
+                <a16:creationId xmlns:a16="http://schemas.microsoft.com/office/drawing/2014/main" xmlns="" id="{E0BBD6C8-C8F2-40C5-AA64-85961A11ADC2}"/>
               </a:ext>
             </a:extLst>
           </p:cNvPr>
@@ -5690,9 +5722,6 @@
           <a:prstGeom prst="rect">
             <a:avLst/>
           </a:prstGeom>
-          <a:solidFill>
-            <a:schemeClr val="accent2"/>
-          </a:solidFill>
         </p:spPr>
         <p:style>
           <a:lnRef idx="2">
@@ -5730,18 +5759,9 @@
           <a:p>
             <a:pPr algn="ctr"/>
             <a:r>
-              <a:rPr lang="en-US" dirty="0" err="1"/>
-              <a:t>ClientDTO</a:t>
-            </a:r>
-            <a:endParaRPr lang="en-US" dirty="0"/>
-          </a:p>
-          <a:p>
-            <a:pPr algn="ctr"/>
-            <a:r>
-              <a:rPr lang="en-US" sz="1200" dirty="0" err="1"/>
-              <a:t>AddOrEditClientDTO</a:t>
-            </a:r>
-            <a:endParaRPr lang="en-US" sz="1200" dirty="0"/>
+              <a:rPr lang="en-US" dirty="0"/>
+              <a:t>DTO</a:t>
+            </a:r>
           </a:p>
         </p:txBody>
       </p:sp>
@@ -5786,7 +5806,7 @@
           <p:cNvPr id="19" name="TextBox 18">
             <a:extLst>
               <a:ext uri="{FF2B5EF4-FFF2-40B4-BE49-F238E27FC236}">
-                <a16:creationId xmlns:a16="http://schemas.microsoft.com/office/drawing/2014/main" id="{E0BBD6C8-C8F2-40C5-AA64-85961A11ADC2}"/>
+                <a16:creationId xmlns:a16="http://schemas.microsoft.com/office/drawing/2014/main" xmlns="" id="{E0BBD6C8-C8F2-40C5-AA64-85961A11ADC2}"/>
               </a:ext>
             </a:extLst>
           </p:cNvPr>
@@ -5825,14 +5845,11 @@
         <p:spPr>
           <a:xfrm>
             <a:off x="7319764" y="1859829"/>
-            <a:ext cx="1589922" cy="991056"/>
+            <a:ext cx="1494797" cy="991056"/>
           </a:xfrm>
           <a:prstGeom prst="rect">
             <a:avLst/>
           </a:prstGeom>
-          <a:solidFill>
-            <a:schemeClr val="accent2"/>
-          </a:solidFill>
         </p:spPr>
         <p:style>
           <a:lnRef idx="2">
@@ -5864,7 +5881,7 @@
             <a:pPr algn="ctr"/>
             <a:r>
               <a:rPr lang="en-US" dirty="0" err="1"/>
-              <a:t>ClientDAOImpl</a:t>
+              <a:t>DAOImpl</a:t>
             </a:r>
             <a:endParaRPr lang="en-US" dirty="0"/>
           </a:p>
@@ -5911,7 +5928,7 @@
           <p:cNvPr id="23" name="TextBox 22">
             <a:extLst>
               <a:ext uri="{FF2B5EF4-FFF2-40B4-BE49-F238E27FC236}">
-                <a16:creationId xmlns:a16="http://schemas.microsoft.com/office/drawing/2014/main" id="{E0BBD6C8-C8F2-40C5-AA64-85961A11ADC2}"/>
+                <a16:creationId xmlns:a16="http://schemas.microsoft.com/office/drawing/2014/main" xmlns="" id="{E0BBD6C8-C8F2-40C5-AA64-85961A11ADC2}"/>
               </a:ext>
             </a:extLst>
           </p:cNvPr>
@@ -5955,9 +5972,6 @@
           <a:prstGeom prst="flowChartMagneticDisk">
             <a:avLst/>
           </a:prstGeom>
-          <a:solidFill>
-            <a:schemeClr val="accent3"/>
-          </a:solidFill>
         </p:spPr>
         <p:style>
           <a:lnRef idx="2">
@@ -5998,8 +6012,8 @@
         </p:nvCxnSpPr>
         <p:spPr>
           <a:xfrm>
-            <a:off x="8909686" y="2355357"/>
-            <a:ext cx="1597701" cy="1077750"/>
+            <a:off x="8814561" y="2355357"/>
+            <a:ext cx="1692826" cy="1077750"/>
           </a:xfrm>
           <a:prstGeom prst="straightConnector1">
             <a:avLst/>
@@ -6028,7 +6042,7 @@
           <p:cNvPr id="28" name="TextBox 27">
             <a:extLst>
               <a:ext uri="{FF2B5EF4-FFF2-40B4-BE49-F238E27FC236}">
-                <a16:creationId xmlns:a16="http://schemas.microsoft.com/office/drawing/2014/main" id="{E0BBD6C8-C8F2-40C5-AA64-85961A11ADC2}"/>
+                <a16:creationId xmlns:a16="http://schemas.microsoft.com/office/drawing/2014/main" xmlns="" id="{E0BBD6C8-C8F2-40C5-AA64-85961A11ADC2}"/>
               </a:ext>
             </a:extLst>
           </p:cNvPr>
@@ -6072,9 +6086,6 @@
           <a:prstGeom prst="rect">
             <a:avLst/>
           </a:prstGeom>
-          <a:solidFill>
-            <a:schemeClr val="accent2"/>
-          </a:solidFill>
         </p:spPr>
         <p:style>
           <a:lnRef idx="2">
@@ -6105,10 +6116,9 @@
           <a:p>
             <a:pPr algn="ctr"/>
             <a:r>
-              <a:rPr lang="en-US" dirty="0" err="1"/>
-              <a:t>ClientService</a:t>
-            </a:r>
-            <a:endParaRPr lang="en-US" dirty="0"/>
+              <a:rPr lang="en-US" dirty="0"/>
+              <a:t>Service</a:t>
+            </a:r>
           </a:p>
         </p:txBody>
       </p:sp>
@@ -6123,8 +6133,8 @@
         </p:nvCxnSpPr>
         <p:spPr>
           <a:xfrm flipH="1" flipV="1">
-            <a:off x="8114725" y="2850885"/>
-            <a:ext cx="11756" cy="1423617"/>
+            <a:off x="8067163" y="2850885"/>
+            <a:ext cx="59318" cy="1423617"/>
           </a:xfrm>
           <a:prstGeom prst="straightConnector1">
             <a:avLst/>
@@ -6153,7 +6163,7 @@
           <p:cNvPr id="34" name="TextBox 33">
             <a:extLst>
               <a:ext uri="{FF2B5EF4-FFF2-40B4-BE49-F238E27FC236}">
-                <a16:creationId xmlns:a16="http://schemas.microsoft.com/office/drawing/2014/main" id="{E0BBD6C8-C8F2-40C5-AA64-85961A11ADC2}"/>
+                <a16:creationId xmlns:a16="http://schemas.microsoft.com/office/drawing/2014/main" xmlns="" id="{E0BBD6C8-C8F2-40C5-AA64-85961A11ADC2}"/>
               </a:ext>
             </a:extLst>
           </p:cNvPr>
@@ -6197,15 +6207,12 @@
         </p:nvSpPr>
         <p:spPr>
           <a:xfrm>
-            <a:off x="4505165" y="3447841"/>
-            <a:ext cx="1998489" cy="657053"/>
+            <a:off x="4333820" y="4377623"/>
+            <a:ext cx="1494797" cy="991056"/>
           </a:xfrm>
           <a:prstGeom prst="rect">
             <a:avLst/>
           </a:prstGeom>
-          <a:solidFill>
-            <a:schemeClr val="accent2"/>
-          </a:solidFill>
         </p:spPr>
         <p:style>
           <a:lnRef idx="2">
@@ -6236,10 +6243,9 @@
           <a:p>
             <a:pPr algn="ctr"/>
             <a:r>
-              <a:rPr lang="en-US" sz="1400" dirty="0" err="1"/>
-              <a:t>BadParameterException</a:t>
-            </a:r>
-            <a:endParaRPr lang="en-US" sz="1400" dirty="0"/>
+              <a:rPr lang="en-US" dirty="0"/>
+              <a:t>Exception</a:t>
+            </a:r>
           </a:p>
         </p:txBody>
       </p:sp>
@@ -6247,16 +6253,15 @@
         <p:nvCxnSpPr>
           <p:cNvPr id="37" name="Straight Arrow Connector 36"/>
           <p:cNvCxnSpPr>
-            <a:cxnSpLocks/>
             <a:stCxn id="29" idx="1"/>
             <a:endCxn id="35" idx="3"/>
           </p:cNvCxnSpPr>
           <p:nvPr/>
         </p:nvCxnSpPr>
         <p:spPr>
-          <a:xfrm flipH="1" flipV="1">
-            <a:off x="6503654" y="3776368"/>
-            <a:ext cx="875428" cy="993662"/>
+          <a:xfrm flipH="1">
+            <a:off x="5828617" y="4770030"/>
+            <a:ext cx="1550465" cy="103121"/>
           </a:xfrm>
           <a:prstGeom prst="straightConnector1">
             <a:avLst/>
@@ -6285,7 +6290,7 @@
           <p:cNvPr id="38" name="TextBox 37">
             <a:extLst>
               <a:ext uri="{FF2B5EF4-FFF2-40B4-BE49-F238E27FC236}">
-                <a16:creationId xmlns:a16="http://schemas.microsoft.com/office/drawing/2014/main" id="{E0BBD6C8-C8F2-40C5-AA64-85961A11ADC2}"/>
+                <a16:creationId xmlns:a16="http://schemas.microsoft.com/office/drawing/2014/main" xmlns="" id="{E0BBD6C8-C8F2-40C5-AA64-85961A11ADC2}"/>
               </a:ext>
             </a:extLst>
           </p:cNvPr>
@@ -6294,7 +6299,7 @@
         </p:nvSpPr>
         <p:spPr>
           <a:xfrm>
-            <a:off x="6700557" y="4617354"/>
+            <a:off x="6211549" y="4503299"/>
             <a:ext cx="728932" cy="276999"/>
           </a:xfrm>
           <a:prstGeom prst="rect">
@@ -6324,14 +6329,11 @@
         <p:spPr>
           <a:xfrm>
             <a:off x="8909686" y="472284"/>
-            <a:ext cx="1822194" cy="991056"/>
+            <a:ext cx="1494797" cy="991056"/>
           </a:xfrm>
           <a:prstGeom prst="rect">
             <a:avLst/>
           </a:prstGeom>
-          <a:solidFill>
-            <a:schemeClr val="accent2"/>
-          </a:solidFill>
         </p:spPr>
         <p:style>
           <a:lnRef idx="2">
@@ -6362,17 +6364,16 @@
           <a:p>
             <a:pPr algn="ctr"/>
             <a:r>
-              <a:rPr lang="en-US" sz="1000" dirty="0"/>
+              <a:rPr lang="en-US" dirty="0"/>
               <a:t>Utility</a:t>
             </a:r>
           </a:p>
           <a:p>
             <a:pPr algn="ctr"/>
             <a:r>
-              <a:rPr lang="en-US" dirty="0" err="1"/>
-              <a:t>ConnectionUtility</a:t>
-            </a:r>
-            <a:endParaRPr lang="en-US" dirty="0"/>
+              <a:rPr lang="en-US" sz="1200" dirty="0"/>
+              <a:t>DB Connection</a:t>
+            </a:r>
           </a:p>
         </p:txBody>
       </p:sp>
@@ -6387,8 +6388,8 @@
         </p:nvCxnSpPr>
         <p:spPr>
           <a:xfrm flipV="1">
-            <a:off x="8114725" y="967812"/>
-            <a:ext cx="794961" cy="892017"/>
+            <a:off x="8067163" y="967812"/>
+            <a:ext cx="842523" cy="892017"/>
           </a:xfrm>
           <a:prstGeom prst="straightConnector1">
             <a:avLst/>
@@ -6423,8 +6424,8 @@
         </p:nvCxnSpPr>
         <p:spPr>
           <a:xfrm>
-            <a:off x="9820783" y="1463340"/>
-            <a:ext cx="1013306" cy="1460550"/>
+            <a:off x="9657085" y="1463340"/>
+            <a:ext cx="1177004" cy="1460550"/>
           </a:xfrm>
           <a:prstGeom prst="straightConnector1">
             <a:avLst/>
@@ -6453,7 +6454,7 @@
           <p:cNvPr id="44" name="TextBox 43">
             <a:extLst>
               <a:ext uri="{FF2B5EF4-FFF2-40B4-BE49-F238E27FC236}">
-                <a16:creationId xmlns:a16="http://schemas.microsoft.com/office/drawing/2014/main" id="{E0BBD6C8-C8F2-40C5-AA64-85961A11ADC2}"/>
+                <a16:creationId xmlns:a16="http://schemas.microsoft.com/office/drawing/2014/main" xmlns="" id="{E0BBD6C8-C8F2-40C5-AA64-85961A11ADC2}"/>
               </a:ext>
             </a:extLst>
           </p:cNvPr>
@@ -6488,7 +6489,7 @@
           <p:cNvPr id="45" name="TextBox 44">
             <a:extLst>
               <a:ext uri="{FF2B5EF4-FFF2-40B4-BE49-F238E27FC236}">
-                <a16:creationId xmlns:a16="http://schemas.microsoft.com/office/drawing/2014/main" id="{E0BBD6C8-C8F2-40C5-AA64-85961A11ADC2}"/>
+                <a16:creationId xmlns:a16="http://schemas.microsoft.com/office/drawing/2014/main" xmlns="" id="{E0BBD6C8-C8F2-40C5-AA64-85961A11ADC2}"/>
               </a:ext>
             </a:extLst>
           </p:cNvPr>
@@ -6523,7 +6524,7 @@
           <p:cNvPr id="26" name="TextBox 25">
             <a:extLst>
               <a:ext uri="{FF2B5EF4-FFF2-40B4-BE49-F238E27FC236}">
-                <a16:creationId xmlns:a16="http://schemas.microsoft.com/office/drawing/2014/main" id="{6C45E26E-8FEE-4439-A34B-789237C9C62C}"/>
+                <a16:creationId xmlns:a16="http://schemas.microsoft.com/office/drawing/2014/main" xmlns="" id="{70BF22D6-D5A2-4CCC-8E2D-329E25668556}"/>
               </a:ext>
             </a:extLst>
           </p:cNvPr>
@@ -6533,7 +6534,7 @@
         <p:spPr>
           <a:xfrm>
             <a:off x="146648" y="131998"/>
-            <a:ext cx="4675518" cy="369332"/>
+            <a:ext cx="4252823" cy="369332"/>
           </a:xfrm>
           <a:prstGeom prst="rect">
             <a:avLst/>
@@ -6548,219 +6549,15 @@
           <a:p>
             <a:r>
               <a:rPr lang="en-US" dirty="0"/>
-              <a:t>Project 0 Specific Database Access Client Model</a:t>
-            </a:r>
-          </a:p>
-        </p:txBody>
-      </p:sp>
-      <p:sp>
-        <p:nvSpPr>
-          <p:cNvPr id="31" name="Rectangle 30">
-            <a:extLst>
-              <a:ext uri="{FF2B5EF4-FFF2-40B4-BE49-F238E27FC236}">
-                <a16:creationId xmlns:a16="http://schemas.microsoft.com/office/drawing/2014/main" id="{6D396BFC-10E0-4935-903B-EDC457BD1755}"/>
-              </a:ext>
-            </a:extLst>
-          </p:cNvPr>
-          <p:cNvSpPr/>
-          <p:nvPr/>
-        </p:nvSpPr>
-        <p:spPr>
-          <a:xfrm>
-            <a:off x="4508845" y="4540325"/>
-            <a:ext cx="1621682" cy="657053"/>
-          </a:xfrm>
-          <a:prstGeom prst="rect">
-            <a:avLst/>
-          </a:prstGeom>
-          <a:solidFill>
-            <a:schemeClr val="accent2"/>
-          </a:solidFill>
-        </p:spPr>
-        <p:style>
-          <a:lnRef idx="2">
-            <a:schemeClr val="accent1">
-              <a:shade val="50000"/>
-            </a:schemeClr>
-          </a:lnRef>
-          <a:fillRef idx="1">
-            <a:schemeClr val="accent1"/>
-          </a:fillRef>
-          <a:effectRef idx="0">
-            <a:schemeClr val="accent1"/>
-          </a:effectRef>
-          <a:fontRef idx="minor">
-            <a:schemeClr val="lt1"/>
-          </a:fontRef>
-        </p:style>
-        <p:txBody>
-          <a:bodyPr rtlCol="0" anchor="ctr"/>
-          <a:lstStyle/>
-          <a:p>
-            <a:pPr algn="ctr"/>
-            <a:r>
-              <a:rPr lang="en-US" sz="1000" dirty="0"/>
-              <a:t>com.tlw8253.exception</a:t>
-            </a:r>
-          </a:p>
-          <a:p>
-            <a:pPr algn="ctr"/>
-            <a:r>
-              <a:rPr lang="en-US" sz="1400" dirty="0" err="1"/>
-              <a:t>DatabaseException</a:t>
-            </a:r>
-            <a:endParaRPr lang="en-US" sz="1400" dirty="0"/>
-          </a:p>
-        </p:txBody>
-      </p:sp>
-      <p:sp>
-        <p:nvSpPr>
-          <p:cNvPr id="32" name="Rectangle 31">
-            <a:extLst>
-              <a:ext uri="{FF2B5EF4-FFF2-40B4-BE49-F238E27FC236}">
-                <a16:creationId xmlns:a16="http://schemas.microsoft.com/office/drawing/2014/main" id="{02A645C8-F11F-438D-92DC-F6FCCA5ECFB8}"/>
-              </a:ext>
-            </a:extLst>
-          </p:cNvPr>
-          <p:cNvSpPr/>
-          <p:nvPr/>
-        </p:nvSpPr>
-        <p:spPr>
-          <a:xfrm>
-            <a:off x="4505165" y="5729410"/>
-            <a:ext cx="2048896" cy="657053"/>
-          </a:xfrm>
-          <a:prstGeom prst="rect">
-            <a:avLst/>
-          </a:prstGeom>
-          <a:solidFill>
-            <a:schemeClr val="accent2"/>
-          </a:solidFill>
-        </p:spPr>
-        <p:style>
-          <a:lnRef idx="2">
-            <a:schemeClr val="accent1">
-              <a:shade val="50000"/>
-            </a:schemeClr>
-          </a:lnRef>
-          <a:fillRef idx="1">
-            <a:schemeClr val="accent1"/>
-          </a:fillRef>
-          <a:effectRef idx="0">
-            <a:schemeClr val="accent1"/>
-          </a:effectRef>
-          <a:fontRef idx="minor">
-            <a:schemeClr val="lt1"/>
-          </a:fontRef>
-        </p:style>
-        <p:txBody>
-          <a:bodyPr rtlCol="0" anchor="ctr"/>
-          <a:lstStyle/>
-          <a:p>
-            <a:pPr algn="ctr"/>
-            <a:r>
-              <a:rPr lang="en-US" sz="1000" dirty="0"/>
-              <a:t>com.tlw8253.exception</a:t>
-            </a:r>
-          </a:p>
-          <a:p>
-            <a:pPr algn="ctr"/>
-            <a:r>
-              <a:rPr lang="en-US" sz="1400" dirty="0" err="1"/>
-              <a:t>ClientNotFoundException</a:t>
-            </a:r>
-            <a:endParaRPr lang="en-US" sz="1400" dirty="0"/>
-          </a:p>
-        </p:txBody>
-      </p:sp>
-      <p:cxnSp>
-        <p:nvCxnSpPr>
-          <p:cNvPr id="12" name="Straight Arrow Connector 11">
-            <a:extLst>
-              <a:ext uri="{FF2B5EF4-FFF2-40B4-BE49-F238E27FC236}">
-                <a16:creationId xmlns:a16="http://schemas.microsoft.com/office/drawing/2014/main" id="{FF2076CA-F897-4293-B6CD-7408EB452156}"/>
-              </a:ext>
-            </a:extLst>
-          </p:cNvPr>
-          <p:cNvCxnSpPr>
-            <a:stCxn id="29" idx="1"/>
-            <a:endCxn id="31" idx="3"/>
-          </p:cNvCxnSpPr>
-          <p:nvPr/>
-        </p:nvCxnSpPr>
-        <p:spPr>
-          <a:xfrm flipH="1">
-            <a:off x="6130527" y="4770030"/>
-            <a:ext cx="1248555" cy="98822"/>
-          </a:xfrm>
-          <a:prstGeom prst="straightConnector1">
-            <a:avLst/>
-          </a:prstGeom>
-          <a:ln>
-            <a:tailEnd type="triangle"/>
-          </a:ln>
-        </p:spPr>
-        <p:style>
-          <a:lnRef idx="1">
-            <a:schemeClr val="accent1"/>
-          </a:lnRef>
-          <a:fillRef idx="0">
-            <a:schemeClr val="accent1"/>
-          </a:fillRef>
-          <a:effectRef idx="0">
-            <a:schemeClr val="accent1"/>
-          </a:effectRef>
-          <a:fontRef idx="minor">
-            <a:schemeClr val="tx1"/>
-          </a:fontRef>
-        </p:style>
-      </p:cxnSp>
-      <p:cxnSp>
-        <p:nvCxnSpPr>
-          <p:cNvPr id="14" name="Straight Arrow Connector 13">
-            <a:extLst>
-              <a:ext uri="{FF2B5EF4-FFF2-40B4-BE49-F238E27FC236}">
-                <a16:creationId xmlns:a16="http://schemas.microsoft.com/office/drawing/2014/main" id="{5C625B7B-4A1E-46C5-9082-4FEC89B30DA9}"/>
-              </a:ext>
-            </a:extLst>
-          </p:cNvPr>
-          <p:cNvCxnSpPr>
-            <a:stCxn id="29" idx="1"/>
-            <a:endCxn id="32" idx="3"/>
-          </p:cNvCxnSpPr>
-          <p:nvPr/>
-        </p:nvCxnSpPr>
-        <p:spPr>
-          <a:xfrm flipH="1">
-            <a:off x="6554061" y="4770030"/>
-            <a:ext cx="825021" cy="1287907"/>
-          </a:xfrm>
-          <a:prstGeom prst="straightConnector1">
-            <a:avLst/>
-          </a:prstGeom>
-          <a:ln>
-            <a:tailEnd type="triangle"/>
-          </a:ln>
-        </p:spPr>
-        <p:style>
-          <a:lnRef idx="1">
-            <a:schemeClr val="accent1"/>
-          </a:lnRef>
-          <a:fillRef idx="0">
-            <a:schemeClr val="accent1"/>
-          </a:fillRef>
-          <a:effectRef idx="0">
-            <a:schemeClr val="accent1"/>
-          </a:effectRef>
-          <a:fontRef idx="minor">
-            <a:schemeClr val="tx1"/>
-          </a:fontRef>
-        </p:style>
-      </p:cxnSp>
+              <a:t>Project 0 Generic Database Access Model</a:t>
+            </a:r>
+          </a:p>
+        </p:txBody>
+      </p:sp>
     </p:spTree>
     <p:extLst>
       <p:ext uri="{BB962C8B-B14F-4D97-AF65-F5344CB8AC3E}">
-        <p14:creationId xmlns:p14="http://schemas.microsoft.com/office/powerpoint/2010/main" val="895246066"/>
+        <p14:creationId xmlns:p14="http://schemas.microsoft.com/office/powerpoint/2010/main" val="3319685841"/>
       </p:ext>
     </p:extLst>
   </p:cSld>
@@ -6801,6 +6598,9 @@
           <a:prstGeom prst="rect">
             <a:avLst/>
           </a:prstGeom>
+          <a:solidFill>
+            <a:schemeClr val="accent2"/>
+          </a:solidFill>
         </p:spPr>
         <p:style>
           <a:lnRef idx="2">
@@ -6838,6 +6638,13 @@
           <a:p>
             <a:pPr algn="ctr"/>
             <a:r>
+              <a:rPr lang="en-US" sz="1200" dirty="0"/>
+              <a:t>Data Access Object</a:t>
+            </a:r>
+          </a:p>
+          <a:p>
+            <a:pPr algn="ctr"/>
+            <a:r>
               <a:rPr lang="en-US" dirty="0" err="1"/>
               <a:t>ClientDAO</a:t>
             </a:r>
@@ -6853,12 +6660,15 @@
         </p:nvSpPr>
         <p:spPr>
           <a:xfrm>
-            <a:off x="1039424" y="2278701"/>
+            <a:off x="619766" y="2108575"/>
             <a:ext cx="1494797" cy="991056"/>
           </a:xfrm>
           <a:prstGeom prst="rect">
             <a:avLst/>
           </a:prstGeom>
+          <a:solidFill>
+            <a:schemeClr val="accent2"/>
+          </a:solidFill>
         </p:spPr>
         <p:style>
           <a:lnRef idx="2">
@@ -6883,6 +6693,1310 @@
             <a:pPr algn="ctr"/>
             <a:r>
               <a:rPr lang="en-US" sz="1000" dirty="0"/>
+              <a:t>com.tlw8253.mode</a:t>
+            </a:r>
+          </a:p>
+          <a:p>
+            <a:pPr algn="ctr"/>
+            <a:r>
+              <a:rPr lang="en-US" sz="1200" dirty="0"/>
+              <a:t>Model</a:t>
+            </a:r>
+          </a:p>
+          <a:p>
+            <a:pPr algn="ctr"/>
+            <a:r>
+              <a:rPr lang="en-US" dirty="0"/>
+              <a:t>Client</a:t>
+            </a:r>
+          </a:p>
+        </p:txBody>
+      </p:sp>
+      <p:cxnSp>
+        <p:nvCxnSpPr>
+          <p:cNvPr id="9" name="Straight Arrow Connector 8"/>
+          <p:cNvCxnSpPr>
+            <a:cxnSpLocks/>
+            <a:stCxn id="4" idx="1"/>
+            <a:endCxn id="5" idx="0"/>
+          </p:cNvCxnSpPr>
+          <p:nvPr/>
+        </p:nvCxnSpPr>
+        <p:spPr>
+          <a:xfrm flipH="1">
+            <a:off x="1367165" y="1327797"/>
+            <a:ext cx="2832505" cy="780778"/>
+          </a:xfrm>
+          <a:prstGeom prst="straightConnector1">
+            <a:avLst/>
+          </a:prstGeom>
+          <a:ln>
+            <a:tailEnd type="triangle"/>
+          </a:ln>
+        </p:spPr>
+        <p:style>
+          <a:lnRef idx="1">
+            <a:schemeClr val="accent1"/>
+          </a:lnRef>
+          <a:fillRef idx="0">
+            <a:schemeClr val="accent1"/>
+          </a:fillRef>
+          <a:effectRef idx="0">
+            <a:schemeClr val="accent1"/>
+          </a:effectRef>
+          <a:fontRef idx="minor">
+            <a:schemeClr val="tx1"/>
+          </a:fontRef>
+        </p:style>
+      </p:cxnSp>
+      <p:sp>
+        <p:nvSpPr>
+          <p:cNvPr id="11" name="TextBox 10">
+            <a:extLst>
+              <a:ext uri="{FF2B5EF4-FFF2-40B4-BE49-F238E27FC236}">
+                <a16:creationId xmlns:a16="http://schemas.microsoft.com/office/drawing/2014/main" xmlns="" id="{E0BBD6C8-C8F2-40C5-AA64-85961A11ADC2}"/>
+              </a:ext>
+            </a:extLst>
+          </p:cNvPr>
+          <p:cNvSpPr txBox="1"/>
+          <p:nvPr/>
+        </p:nvSpPr>
+        <p:spPr>
+          <a:xfrm>
+            <a:off x="1971030" y="1426110"/>
+            <a:ext cx="728932" cy="461665"/>
+          </a:xfrm>
+          <a:prstGeom prst="rect">
+            <a:avLst/>
+          </a:prstGeom>
+          <a:noFill/>
+        </p:spPr>
+        <p:txBody>
+          <a:bodyPr wrap="square" rtlCol="0">
+            <a:spAutoFit/>
+          </a:bodyPr>
+          <a:lstStyle/>
+          <a:p>
+            <a:r>
+              <a:rPr lang="en-US" sz="1200" dirty="0"/>
+              <a:t>contains</a:t>
+            </a:r>
+          </a:p>
+          <a:p>
+            <a:r>
+              <a:rPr lang="en-US" sz="1200" dirty="0"/>
+              <a:t>List&lt;&gt;</a:t>
+            </a:r>
+          </a:p>
+        </p:txBody>
+      </p:sp>
+      <p:sp>
+        <p:nvSpPr>
+          <p:cNvPr id="15" name="Rectangle 14"/>
+          <p:cNvSpPr/>
+          <p:nvPr/>
+        </p:nvSpPr>
+        <p:spPr>
+          <a:xfrm>
+            <a:off x="2593538" y="2923890"/>
+            <a:ext cx="1494797" cy="991056"/>
+          </a:xfrm>
+          <a:prstGeom prst="rect">
+            <a:avLst/>
+          </a:prstGeom>
+          <a:solidFill>
+            <a:schemeClr val="accent2"/>
+          </a:solidFill>
+        </p:spPr>
+        <p:style>
+          <a:lnRef idx="2">
+            <a:schemeClr val="accent1">
+              <a:shade val="50000"/>
+            </a:schemeClr>
+          </a:lnRef>
+          <a:fillRef idx="1">
+            <a:schemeClr val="accent1"/>
+          </a:fillRef>
+          <a:effectRef idx="0">
+            <a:schemeClr val="accent1"/>
+          </a:effectRef>
+          <a:fontRef idx="minor">
+            <a:schemeClr val="lt1"/>
+          </a:fontRef>
+        </p:style>
+        <p:txBody>
+          <a:bodyPr rtlCol="0" anchor="ctr"/>
+          <a:lstStyle/>
+          <a:p>
+            <a:pPr algn="ctr"/>
+            <a:r>
+              <a:rPr lang="en-US" sz="1000" dirty="0"/>
+              <a:t>com.tlw8253.dto</a:t>
+            </a:r>
+          </a:p>
+          <a:p>
+            <a:pPr algn="ctr"/>
+            <a:r>
+              <a:rPr lang="en-US" sz="1200" dirty="0"/>
+              <a:t>Data Transfer Object</a:t>
+            </a:r>
+          </a:p>
+          <a:p>
+            <a:pPr algn="ctr"/>
+            <a:r>
+              <a:rPr lang="en-US" dirty="0" err="1"/>
+              <a:t>ClientDTO</a:t>
+            </a:r>
+            <a:endParaRPr lang="en-US" dirty="0"/>
+          </a:p>
+          <a:p>
+            <a:pPr algn="ctr"/>
+            <a:r>
+              <a:rPr lang="en-US" sz="1200" dirty="0" err="1"/>
+              <a:t>AddOrEditClientDTO</a:t>
+            </a:r>
+            <a:endParaRPr lang="en-US" sz="1200" dirty="0"/>
+          </a:p>
+        </p:txBody>
+      </p:sp>
+      <p:cxnSp>
+        <p:nvCxnSpPr>
+          <p:cNvPr id="17" name="Straight Arrow Connector 16"/>
+          <p:cNvCxnSpPr>
+            <a:stCxn id="4" idx="2"/>
+            <a:endCxn id="15" idx="0"/>
+          </p:cNvCxnSpPr>
+          <p:nvPr/>
+        </p:nvCxnSpPr>
+        <p:spPr>
+          <a:xfrm flipH="1">
+            <a:off x="3340937" y="1823325"/>
+            <a:ext cx="1606132" cy="1100565"/>
+          </a:xfrm>
+          <a:prstGeom prst="straightConnector1">
+            <a:avLst/>
+          </a:prstGeom>
+          <a:ln>
+            <a:tailEnd type="triangle"/>
+          </a:ln>
+        </p:spPr>
+        <p:style>
+          <a:lnRef idx="1">
+            <a:schemeClr val="accent1"/>
+          </a:lnRef>
+          <a:fillRef idx="0">
+            <a:schemeClr val="accent1"/>
+          </a:fillRef>
+          <a:effectRef idx="0">
+            <a:schemeClr val="accent1"/>
+          </a:effectRef>
+          <a:fontRef idx="minor">
+            <a:schemeClr val="tx1"/>
+          </a:fontRef>
+        </p:style>
+      </p:cxnSp>
+      <p:sp>
+        <p:nvSpPr>
+          <p:cNvPr id="19" name="TextBox 18">
+            <a:extLst>
+              <a:ext uri="{FF2B5EF4-FFF2-40B4-BE49-F238E27FC236}">
+                <a16:creationId xmlns:a16="http://schemas.microsoft.com/office/drawing/2014/main" xmlns="" id="{E0BBD6C8-C8F2-40C5-AA64-85961A11ADC2}"/>
+              </a:ext>
+            </a:extLst>
+          </p:cNvPr>
+          <p:cNvSpPr txBox="1"/>
+          <p:nvPr/>
+        </p:nvSpPr>
+        <p:spPr>
+          <a:xfrm>
+            <a:off x="3541919" y="2180353"/>
+            <a:ext cx="728932" cy="276999"/>
+          </a:xfrm>
+          <a:prstGeom prst="rect">
+            <a:avLst/>
+          </a:prstGeom>
+          <a:noFill/>
+        </p:spPr>
+        <p:txBody>
+          <a:bodyPr wrap="square" rtlCol="0">
+            <a:spAutoFit/>
+          </a:bodyPr>
+          <a:lstStyle/>
+          <a:p>
+            <a:r>
+              <a:rPr lang="en-US" sz="1200" dirty="0"/>
+              <a:t>uses</a:t>
+            </a:r>
+          </a:p>
+        </p:txBody>
+      </p:sp>
+      <p:sp>
+        <p:nvSpPr>
+          <p:cNvPr id="20" name="Rectangle 19"/>
+          <p:cNvSpPr/>
+          <p:nvPr/>
+        </p:nvSpPr>
+        <p:spPr>
+          <a:xfrm>
+            <a:off x="7319764" y="1859829"/>
+            <a:ext cx="1589922" cy="991056"/>
+          </a:xfrm>
+          <a:prstGeom prst="rect">
+            <a:avLst/>
+          </a:prstGeom>
+          <a:solidFill>
+            <a:schemeClr val="accent2"/>
+          </a:solidFill>
+        </p:spPr>
+        <p:style>
+          <a:lnRef idx="2">
+            <a:schemeClr val="accent1">
+              <a:shade val="50000"/>
+            </a:schemeClr>
+          </a:lnRef>
+          <a:fillRef idx="1">
+            <a:schemeClr val="accent1"/>
+          </a:fillRef>
+          <a:effectRef idx="0">
+            <a:schemeClr val="accent1"/>
+          </a:effectRef>
+          <a:fontRef idx="minor">
+            <a:schemeClr val="lt1"/>
+          </a:fontRef>
+        </p:style>
+        <p:txBody>
+          <a:bodyPr rtlCol="0" anchor="ctr"/>
+          <a:lstStyle/>
+          <a:p>
+            <a:pPr algn="ctr"/>
+            <a:r>
+              <a:rPr lang="en-US" sz="1000" dirty="0"/>
+              <a:t>com.tlw8253.dao</a:t>
+            </a:r>
+          </a:p>
+          <a:p>
+            <a:pPr algn="ctr"/>
+            <a:r>
+              <a:rPr lang="en-US" dirty="0" err="1"/>
+              <a:t>ClientDAOImpl</a:t>
+            </a:r>
+            <a:endParaRPr lang="en-US" dirty="0"/>
+          </a:p>
+        </p:txBody>
+      </p:sp>
+      <p:cxnSp>
+        <p:nvCxnSpPr>
+          <p:cNvPr id="22" name="Straight Arrow Connector 21"/>
+          <p:cNvCxnSpPr>
+            <a:stCxn id="20" idx="1"/>
+            <a:endCxn id="4" idx="3"/>
+          </p:cNvCxnSpPr>
+          <p:nvPr/>
+        </p:nvCxnSpPr>
+        <p:spPr>
+          <a:xfrm flipH="1" flipV="1">
+            <a:off x="5694467" y="1327797"/>
+            <a:ext cx="1625297" cy="1027560"/>
+          </a:xfrm>
+          <a:prstGeom prst="straightConnector1">
+            <a:avLst/>
+          </a:prstGeom>
+          <a:ln>
+            <a:tailEnd type="triangle"/>
+          </a:ln>
+        </p:spPr>
+        <p:style>
+          <a:lnRef idx="1">
+            <a:schemeClr val="accent1"/>
+          </a:lnRef>
+          <a:fillRef idx="0">
+            <a:schemeClr val="accent1"/>
+          </a:fillRef>
+          <a:effectRef idx="0">
+            <a:schemeClr val="accent1"/>
+          </a:effectRef>
+          <a:fontRef idx="minor">
+            <a:schemeClr val="tx1"/>
+          </a:fontRef>
+        </p:style>
+      </p:cxnSp>
+      <p:sp>
+        <p:nvSpPr>
+          <p:cNvPr id="23" name="TextBox 22">
+            <a:extLst>
+              <a:ext uri="{FF2B5EF4-FFF2-40B4-BE49-F238E27FC236}">
+                <a16:creationId xmlns:a16="http://schemas.microsoft.com/office/drawing/2014/main" xmlns="" id="{E0BBD6C8-C8F2-40C5-AA64-85961A11ADC2}"/>
+              </a:ext>
+            </a:extLst>
+          </p:cNvPr>
+          <p:cNvSpPr txBox="1"/>
+          <p:nvPr/>
+        </p:nvSpPr>
+        <p:spPr>
+          <a:xfrm>
+            <a:off x="6166028" y="1299474"/>
+            <a:ext cx="1063847" cy="276999"/>
+          </a:xfrm>
+          <a:prstGeom prst="rect">
+            <a:avLst/>
+          </a:prstGeom>
+          <a:noFill/>
+        </p:spPr>
+        <p:txBody>
+          <a:bodyPr wrap="square" rtlCol="0">
+            <a:spAutoFit/>
+          </a:bodyPr>
+          <a:lstStyle/>
+          <a:p>
+            <a:r>
+              <a:rPr lang="en-US" sz="1200" dirty="0"/>
+              <a:t>implements</a:t>
+            </a:r>
+          </a:p>
+        </p:txBody>
+      </p:sp>
+      <p:sp>
+        <p:nvSpPr>
+          <p:cNvPr id="25" name="Flowchart: Magnetic Disk 24"/>
+          <p:cNvSpPr/>
+          <p:nvPr/>
+        </p:nvSpPr>
+        <p:spPr>
+          <a:xfrm>
+            <a:off x="10507387" y="2923890"/>
+            <a:ext cx="653404" cy="1018434"/>
+          </a:xfrm>
+          <a:prstGeom prst="flowChartMagneticDisk">
+            <a:avLst/>
+          </a:prstGeom>
+          <a:solidFill>
+            <a:schemeClr val="accent3"/>
+          </a:solidFill>
+        </p:spPr>
+        <p:style>
+          <a:lnRef idx="2">
+            <a:schemeClr val="accent1">
+              <a:shade val="50000"/>
+            </a:schemeClr>
+          </a:lnRef>
+          <a:fillRef idx="1">
+            <a:schemeClr val="accent1"/>
+          </a:fillRef>
+          <a:effectRef idx="0">
+            <a:schemeClr val="accent1"/>
+          </a:effectRef>
+          <a:fontRef idx="minor">
+            <a:schemeClr val="lt1"/>
+          </a:fontRef>
+        </p:style>
+        <p:txBody>
+          <a:bodyPr rtlCol="0" anchor="ctr"/>
+          <a:lstStyle/>
+          <a:p>
+            <a:pPr algn="ctr"/>
+            <a:r>
+              <a:rPr lang="en-US" dirty="0"/>
+              <a:t>DB</a:t>
+            </a:r>
+          </a:p>
+        </p:txBody>
+      </p:sp>
+      <p:cxnSp>
+        <p:nvCxnSpPr>
+          <p:cNvPr id="27" name="Straight Arrow Connector 26"/>
+          <p:cNvCxnSpPr>
+            <a:stCxn id="20" idx="3"/>
+            <a:endCxn id="25" idx="2"/>
+          </p:cNvCxnSpPr>
+          <p:nvPr/>
+        </p:nvCxnSpPr>
+        <p:spPr>
+          <a:xfrm>
+            <a:off x="8909686" y="2355357"/>
+            <a:ext cx="1597701" cy="1077750"/>
+          </a:xfrm>
+          <a:prstGeom prst="straightConnector1">
+            <a:avLst/>
+          </a:prstGeom>
+          <a:ln>
+            <a:tailEnd type="triangle"/>
+          </a:ln>
+        </p:spPr>
+        <p:style>
+          <a:lnRef idx="1">
+            <a:schemeClr val="accent1"/>
+          </a:lnRef>
+          <a:fillRef idx="0">
+            <a:schemeClr val="accent1"/>
+          </a:fillRef>
+          <a:effectRef idx="0">
+            <a:schemeClr val="accent1"/>
+          </a:effectRef>
+          <a:fontRef idx="minor">
+            <a:schemeClr val="tx1"/>
+          </a:fontRef>
+        </p:style>
+      </p:cxnSp>
+      <p:sp>
+        <p:nvSpPr>
+          <p:cNvPr id="28" name="TextBox 27">
+            <a:extLst>
+              <a:ext uri="{FF2B5EF4-FFF2-40B4-BE49-F238E27FC236}">
+                <a16:creationId xmlns:a16="http://schemas.microsoft.com/office/drawing/2014/main" xmlns="" id="{E0BBD6C8-C8F2-40C5-AA64-85961A11ADC2}"/>
+              </a:ext>
+            </a:extLst>
+          </p:cNvPr>
+          <p:cNvSpPr txBox="1"/>
+          <p:nvPr/>
+        </p:nvSpPr>
+        <p:spPr>
+          <a:xfrm>
+            <a:off x="9283733" y="2276386"/>
+            <a:ext cx="728932" cy="276999"/>
+          </a:xfrm>
+          <a:prstGeom prst="rect">
+            <a:avLst/>
+          </a:prstGeom>
+          <a:noFill/>
+        </p:spPr>
+        <p:txBody>
+          <a:bodyPr wrap="square" rtlCol="0">
+            <a:spAutoFit/>
+          </a:bodyPr>
+          <a:lstStyle/>
+          <a:p>
+            <a:r>
+              <a:rPr lang="en-US" sz="1200" dirty="0"/>
+              <a:t>access</a:t>
+            </a:r>
+          </a:p>
+        </p:txBody>
+      </p:sp>
+      <p:sp>
+        <p:nvSpPr>
+          <p:cNvPr id="29" name="Rectangle 28"/>
+          <p:cNvSpPr/>
+          <p:nvPr/>
+        </p:nvSpPr>
+        <p:spPr>
+          <a:xfrm>
+            <a:off x="7379082" y="4274502"/>
+            <a:ext cx="1494797" cy="991056"/>
+          </a:xfrm>
+          <a:prstGeom prst="rect">
+            <a:avLst/>
+          </a:prstGeom>
+          <a:solidFill>
+            <a:schemeClr val="accent2"/>
+          </a:solidFill>
+        </p:spPr>
+        <p:style>
+          <a:lnRef idx="2">
+            <a:schemeClr val="accent1">
+              <a:shade val="50000"/>
+            </a:schemeClr>
+          </a:lnRef>
+          <a:fillRef idx="1">
+            <a:schemeClr val="accent1"/>
+          </a:fillRef>
+          <a:effectRef idx="0">
+            <a:schemeClr val="accent1"/>
+          </a:effectRef>
+          <a:fontRef idx="minor">
+            <a:schemeClr val="lt1"/>
+          </a:fontRef>
+        </p:style>
+        <p:txBody>
+          <a:bodyPr rtlCol="0" anchor="ctr"/>
+          <a:lstStyle/>
+          <a:p>
+            <a:pPr algn="ctr"/>
+            <a:r>
+              <a:rPr lang="en-US" sz="1000" dirty="0"/>
+              <a:t>com.tlw8253.service</a:t>
+            </a:r>
+          </a:p>
+          <a:p>
+            <a:pPr algn="ctr"/>
+            <a:r>
+              <a:rPr lang="en-US" dirty="0" err="1"/>
+              <a:t>ClientService</a:t>
+            </a:r>
+            <a:endParaRPr lang="en-US" dirty="0"/>
+          </a:p>
+        </p:txBody>
+      </p:sp>
+      <p:cxnSp>
+        <p:nvCxnSpPr>
+          <p:cNvPr id="33" name="Straight Arrow Connector 32"/>
+          <p:cNvCxnSpPr>
+            <a:stCxn id="29" idx="0"/>
+            <a:endCxn id="20" idx="2"/>
+          </p:cNvCxnSpPr>
+          <p:nvPr/>
+        </p:nvCxnSpPr>
+        <p:spPr>
+          <a:xfrm flipH="1" flipV="1">
+            <a:off x="8114725" y="2850885"/>
+            <a:ext cx="11756" cy="1423617"/>
+          </a:xfrm>
+          <a:prstGeom prst="straightConnector1">
+            <a:avLst/>
+          </a:prstGeom>
+          <a:ln>
+            <a:tailEnd type="triangle"/>
+          </a:ln>
+        </p:spPr>
+        <p:style>
+          <a:lnRef idx="1">
+            <a:schemeClr val="accent1"/>
+          </a:lnRef>
+          <a:fillRef idx="0">
+            <a:schemeClr val="accent1"/>
+          </a:fillRef>
+          <a:effectRef idx="0">
+            <a:schemeClr val="accent1"/>
+          </a:effectRef>
+          <a:fontRef idx="minor">
+            <a:schemeClr val="tx1"/>
+          </a:fontRef>
+        </p:style>
+      </p:cxnSp>
+      <p:sp>
+        <p:nvSpPr>
+          <p:cNvPr id="34" name="TextBox 33">
+            <a:extLst>
+              <a:ext uri="{FF2B5EF4-FFF2-40B4-BE49-F238E27FC236}">
+                <a16:creationId xmlns:a16="http://schemas.microsoft.com/office/drawing/2014/main" xmlns="" id="{E0BBD6C8-C8F2-40C5-AA64-85961A11ADC2}"/>
+              </a:ext>
+            </a:extLst>
+          </p:cNvPr>
+          <p:cNvSpPr txBox="1"/>
+          <p:nvPr/>
+        </p:nvSpPr>
+        <p:spPr>
+          <a:xfrm>
+            <a:off x="8221712" y="3239528"/>
+            <a:ext cx="1062021" cy="646331"/>
+          </a:xfrm>
+          <a:prstGeom prst="rect">
+            <a:avLst/>
+          </a:prstGeom>
+          <a:noFill/>
+        </p:spPr>
+        <p:txBody>
+          <a:bodyPr wrap="square" rtlCol="0">
+            <a:spAutoFit/>
+          </a:bodyPr>
+          <a:lstStyle/>
+          <a:p>
+            <a:r>
+              <a:rPr lang="en-US" sz="1200" dirty="0"/>
+              <a:t>contains</a:t>
+            </a:r>
+          </a:p>
+          <a:p>
+            <a:r>
+              <a:rPr lang="en-US" sz="1200" dirty="0"/>
+              <a:t>Implemented DAO</a:t>
+            </a:r>
+          </a:p>
+        </p:txBody>
+      </p:sp>
+      <p:sp>
+        <p:nvSpPr>
+          <p:cNvPr id="35" name="Rectangle 34"/>
+          <p:cNvSpPr/>
+          <p:nvPr/>
+        </p:nvSpPr>
+        <p:spPr>
+          <a:xfrm>
+            <a:off x="4505165" y="3447841"/>
+            <a:ext cx="1998489" cy="657053"/>
+          </a:xfrm>
+          <a:prstGeom prst="rect">
+            <a:avLst/>
+          </a:prstGeom>
+          <a:solidFill>
+            <a:schemeClr val="accent2"/>
+          </a:solidFill>
+        </p:spPr>
+        <p:style>
+          <a:lnRef idx="2">
+            <a:schemeClr val="accent1">
+              <a:shade val="50000"/>
+            </a:schemeClr>
+          </a:lnRef>
+          <a:fillRef idx="1">
+            <a:schemeClr val="accent1"/>
+          </a:fillRef>
+          <a:effectRef idx="0">
+            <a:schemeClr val="accent1"/>
+          </a:effectRef>
+          <a:fontRef idx="minor">
+            <a:schemeClr val="lt1"/>
+          </a:fontRef>
+        </p:style>
+        <p:txBody>
+          <a:bodyPr rtlCol="0" anchor="ctr"/>
+          <a:lstStyle/>
+          <a:p>
+            <a:pPr algn="ctr"/>
+            <a:r>
+              <a:rPr lang="en-US" sz="1000" dirty="0"/>
+              <a:t>com.tlw8253.exception</a:t>
+            </a:r>
+          </a:p>
+          <a:p>
+            <a:pPr algn="ctr"/>
+            <a:r>
+              <a:rPr lang="en-US" sz="1400" dirty="0" err="1"/>
+              <a:t>BadParameterException</a:t>
+            </a:r>
+            <a:endParaRPr lang="en-US" sz="1400" dirty="0"/>
+          </a:p>
+        </p:txBody>
+      </p:sp>
+      <p:cxnSp>
+        <p:nvCxnSpPr>
+          <p:cNvPr id="37" name="Straight Arrow Connector 36"/>
+          <p:cNvCxnSpPr>
+            <a:cxnSpLocks/>
+            <a:stCxn id="29" idx="1"/>
+            <a:endCxn id="35" idx="3"/>
+          </p:cNvCxnSpPr>
+          <p:nvPr/>
+        </p:nvCxnSpPr>
+        <p:spPr>
+          <a:xfrm flipH="1" flipV="1">
+            <a:off x="6503654" y="3776368"/>
+            <a:ext cx="875428" cy="993662"/>
+          </a:xfrm>
+          <a:prstGeom prst="straightConnector1">
+            <a:avLst/>
+          </a:prstGeom>
+          <a:ln>
+            <a:tailEnd type="triangle"/>
+          </a:ln>
+        </p:spPr>
+        <p:style>
+          <a:lnRef idx="1">
+            <a:schemeClr val="accent1"/>
+          </a:lnRef>
+          <a:fillRef idx="0">
+            <a:schemeClr val="accent1"/>
+          </a:fillRef>
+          <a:effectRef idx="0">
+            <a:schemeClr val="accent1"/>
+          </a:effectRef>
+          <a:fontRef idx="minor">
+            <a:schemeClr val="tx1"/>
+          </a:fontRef>
+        </p:style>
+      </p:cxnSp>
+      <p:sp>
+        <p:nvSpPr>
+          <p:cNvPr id="38" name="TextBox 37">
+            <a:extLst>
+              <a:ext uri="{FF2B5EF4-FFF2-40B4-BE49-F238E27FC236}">
+                <a16:creationId xmlns:a16="http://schemas.microsoft.com/office/drawing/2014/main" xmlns="" id="{E0BBD6C8-C8F2-40C5-AA64-85961A11ADC2}"/>
+              </a:ext>
+            </a:extLst>
+          </p:cNvPr>
+          <p:cNvSpPr txBox="1"/>
+          <p:nvPr/>
+        </p:nvSpPr>
+        <p:spPr>
+          <a:xfrm>
+            <a:off x="6700557" y="4617354"/>
+            <a:ext cx="728932" cy="276999"/>
+          </a:xfrm>
+          <a:prstGeom prst="rect">
+            <a:avLst/>
+          </a:prstGeom>
+          <a:noFill/>
+        </p:spPr>
+        <p:txBody>
+          <a:bodyPr wrap="square" rtlCol="0">
+            <a:spAutoFit/>
+          </a:bodyPr>
+          <a:lstStyle/>
+          <a:p>
+            <a:r>
+              <a:rPr lang="en-US" sz="1200" dirty="0"/>
+              <a:t>throws</a:t>
+            </a:r>
+          </a:p>
+        </p:txBody>
+      </p:sp>
+      <p:sp>
+        <p:nvSpPr>
+          <p:cNvPr id="39" name="Rectangle 38"/>
+          <p:cNvSpPr/>
+          <p:nvPr/>
+        </p:nvSpPr>
+        <p:spPr>
+          <a:xfrm>
+            <a:off x="8909686" y="472284"/>
+            <a:ext cx="1822194" cy="991056"/>
+          </a:xfrm>
+          <a:prstGeom prst="rect">
+            <a:avLst/>
+          </a:prstGeom>
+          <a:solidFill>
+            <a:schemeClr val="accent2"/>
+          </a:solidFill>
+        </p:spPr>
+        <p:style>
+          <a:lnRef idx="2">
+            <a:schemeClr val="accent1">
+              <a:shade val="50000"/>
+            </a:schemeClr>
+          </a:lnRef>
+          <a:fillRef idx="1">
+            <a:schemeClr val="accent1"/>
+          </a:fillRef>
+          <a:effectRef idx="0">
+            <a:schemeClr val="accent1"/>
+          </a:effectRef>
+          <a:fontRef idx="minor">
+            <a:schemeClr val="lt1"/>
+          </a:fontRef>
+        </p:style>
+        <p:txBody>
+          <a:bodyPr rtlCol="0" anchor="ctr"/>
+          <a:lstStyle/>
+          <a:p>
+            <a:pPr algn="ctr"/>
+            <a:r>
+              <a:rPr lang="en-US" sz="1000" dirty="0"/>
+              <a:t>com.tlw8253.utility</a:t>
+            </a:r>
+          </a:p>
+          <a:p>
+            <a:pPr algn="ctr"/>
+            <a:r>
+              <a:rPr lang="en-US" sz="1000" dirty="0"/>
+              <a:t>Utility</a:t>
+            </a:r>
+          </a:p>
+          <a:p>
+            <a:pPr algn="ctr"/>
+            <a:r>
+              <a:rPr lang="en-US" dirty="0" err="1"/>
+              <a:t>ConnectionUtility</a:t>
+            </a:r>
+            <a:endParaRPr lang="en-US" dirty="0"/>
+          </a:p>
+        </p:txBody>
+      </p:sp>
+      <p:cxnSp>
+        <p:nvCxnSpPr>
+          <p:cNvPr id="41" name="Straight Arrow Connector 40"/>
+          <p:cNvCxnSpPr>
+            <a:stCxn id="20" idx="0"/>
+            <a:endCxn id="39" idx="1"/>
+          </p:cNvCxnSpPr>
+          <p:nvPr/>
+        </p:nvCxnSpPr>
+        <p:spPr>
+          <a:xfrm flipV="1">
+            <a:off x="8114725" y="967812"/>
+            <a:ext cx="794961" cy="892017"/>
+          </a:xfrm>
+          <a:prstGeom prst="straightConnector1">
+            <a:avLst/>
+          </a:prstGeom>
+          <a:ln>
+            <a:tailEnd type="triangle"/>
+          </a:ln>
+        </p:spPr>
+        <p:style>
+          <a:lnRef idx="1">
+            <a:schemeClr val="accent1"/>
+          </a:lnRef>
+          <a:fillRef idx="0">
+            <a:schemeClr val="accent1"/>
+          </a:fillRef>
+          <a:effectRef idx="0">
+            <a:schemeClr val="accent1"/>
+          </a:effectRef>
+          <a:fontRef idx="minor">
+            <a:schemeClr val="tx1"/>
+          </a:fontRef>
+        </p:style>
+      </p:cxnSp>
+      <p:cxnSp>
+        <p:nvCxnSpPr>
+          <p:cNvPr id="43" name="Straight Arrow Connector 42"/>
+          <p:cNvCxnSpPr>
+            <a:stCxn id="39" idx="2"/>
+            <a:endCxn id="25" idx="1"/>
+          </p:cNvCxnSpPr>
+          <p:nvPr/>
+        </p:nvCxnSpPr>
+        <p:spPr>
+          <a:xfrm>
+            <a:off x="9820783" y="1463340"/>
+            <a:ext cx="1013306" cy="1460550"/>
+          </a:xfrm>
+          <a:prstGeom prst="straightConnector1">
+            <a:avLst/>
+          </a:prstGeom>
+          <a:ln>
+            <a:tailEnd type="triangle"/>
+          </a:ln>
+        </p:spPr>
+        <p:style>
+          <a:lnRef idx="1">
+            <a:schemeClr val="accent1"/>
+          </a:lnRef>
+          <a:fillRef idx="0">
+            <a:schemeClr val="accent1"/>
+          </a:fillRef>
+          <a:effectRef idx="0">
+            <a:schemeClr val="accent1"/>
+          </a:effectRef>
+          <a:fontRef idx="minor">
+            <a:schemeClr val="tx1"/>
+          </a:fontRef>
+        </p:style>
+      </p:cxnSp>
+      <p:sp>
+        <p:nvSpPr>
+          <p:cNvPr id="44" name="TextBox 43">
+            <a:extLst>
+              <a:ext uri="{FF2B5EF4-FFF2-40B4-BE49-F238E27FC236}">
+                <a16:creationId xmlns:a16="http://schemas.microsoft.com/office/drawing/2014/main" xmlns="" id="{E0BBD6C8-C8F2-40C5-AA64-85961A11ADC2}"/>
+              </a:ext>
+            </a:extLst>
+          </p:cNvPr>
+          <p:cNvSpPr txBox="1"/>
+          <p:nvPr/>
+        </p:nvSpPr>
+        <p:spPr>
+          <a:xfrm>
+            <a:off x="8023790" y="1170629"/>
+            <a:ext cx="728932" cy="276999"/>
+          </a:xfrm>
+          <a:prstGeom prst="rect">
+            <a:avLst/>
+          </a:prstGeom>
+          <a:noFill/>
+        </p:spPr>
+        <p:txBody>
+          <a:bodyPr wrap="square" rtlCol="0">
+            <a:spAutoFit/>
+          </a:bodyPr>
+          <a:lstStyle/>
+          <a:p>
+            <a:r>
+              <a:rPr lang="en-US" sz="1200" dirty="0"/>
+              <a:t>uses</a:t>
+            </a:r>
+          </a:p>
+        </p:txBody>
+      </p:sp>
+      <p:sp>
+        <p:nvSpPr>
+          <p:cNvPr id="45" name="TextBox 44">
+            <a:extLst>
+              <a:ext uri="{FF2B5EF4-FFF2-40B4-BE49-F238E27FC236}">
+                <a16:creationId xmlns:a16="http://schemas.microsoft.com/office/drawing/2014/main" xmlns="" id="{E0BBD6C8-C8F2-40C5-AA64-85961A11ADC2}"/>
+              </a:ext>
+            </a:extLst>
+          </p:cNvPr>
+          <p:cNvSpPr txBox="1"/>
+          <p:nvPr/>
+        </p:nvSpPr>
+        <p:spPr>
+          <a:xfrm>
+            <a:off x="10245586" y="1859829"/>
+            <a:ext cx="864099" cy="276999"/>
+          </a:xfrm>
+          <a:prstGeom prst="rect">
+            <a:avLst/>
+          </a:prstGeom>
+          <a:noFill/>
+        </p:spPr>
+        <p:txBody>
+          <a:bodyPr wrap="square" rtlCol="0">
+            <a:spAutoFit/>
+          </a:bodyPr>
+          <a:lstStyle/>
+          <a:p>
+            <a:r>
+              <a:rPr lang="en-US" sz="1200" dirty="0"/>
+              <a:t>connects</a:t>
+            </a:r>
+          </a:p>
+        </p:txBody>
+      </p:sp>
+      <p:sp>
+        <p:nvSpPr>
+          <p:cNvPr id="26" name="TextBox 25">
+            <a:extLst>
+              <a:ext uri="{FF2B5EF4-FFF2-40B4-BE49-F238E27FC236}">
+                <a16:creationId xmlns:a16="http://schemas.microsoft.com/office/drawing/2014/main" xmlns="" id="{6C45E26E-8FEE-4439-A34B-789237C9C62C}"/>
+              </a:ext>
+            </a:extLst>
+          </p:cNvPr>
+          <p:cNvSpPr txBox="1"/>
+          <p:nvPr/>
+        </p:nvSpPr>
+        <p:spPr>
+          <a:xfrm>
+            <a:off x="146648" y="131998"/>
+            <a:ext cx="4675518" cy="369332"/>
+          </a:xfrm>
+          <a:prstGeom prst="rect">
+            <a:avLst/>
+          </a:prstGeom>
+          <a:noFill/>
+        </p:spPr>
+        <p:txBody>
+          <a:bodyPr wrap="square" rtlCol="0">
+            <a:spAutoFit/>
+          </a:bodyPr>
+          <a:lstStyle/>
+          <a:p>
+            <a:r>
+              <a:rPr lang="en-US" dirty="0"/>
+              <a:t>Project 0 Specific Database Access Client Model</a:t>
+            </a:r>
+          </a:p>
+        </p:txBody>
+      </p:sp>
+      <p:sp>
+        <p:nvSpPr>
+          <p:cNvPr id="31" name="Rectangle 30">
+            <a:extLst>
+              <a:ext uri="{FF2B5EF4-FFF2-40B4-BE49-F238E27FC236}">
+                <a16:creationId xmlns:a16="http://schemas.microsoft.com/office/drawing/2014/main" xmlns="" id="{6D396BFC-10E0-4935-903B-EDC457BD1755}"/>
+              </a:ext>
+            </a:extLst>
+          </p:cNvPr>
+          <p:cNvSpPr/>
+          <p:nvPr/>
+        </p:nvSpPr>
+        <p:spPr>
+          <a:xfrm>
+            <a:off x="4508845" y="4540325"/>
+            <a:ext cx="1621682" cy="657053"/>
+          </a:xfrm>
+          <a:prstGeom prst="rect">
+            <a:avLst/>
+          </a:prstGeom>
+          <a:solidFill>
+            <a:schemeClr val="accent2"/>
+          </a:solidFill>
+        </p:spPr>
+        <p:style>
+          <a:lnRef idx="2">
+            <a:schemeClr val="accent1">
+              <a:shade val="50000"/>
+            </a:schemeClr>
+          </a:lnRef>
+          <a:fillRef idx="1">
+            <a:schemeClr val="accent1"/>
+          </a:fillRef>
+          <a:effectRef idx="0">
+            <a:schemeClr val="accent1"/>
+          </a:effectRef>
+          <a:fontRef idx="minor">
+            <a:schemeClr val="lt1"/>
+          </a:fontRef>
+        </p:style>
+        <p:txBody>
+          <a:bodyPr rtlCol="0" anchor="ctr"/>
+          <a:lstStyle/>
+          <a:p>
+            <a:pPr algn="ctr"/>
+            <a:r>
+              <a:rPr lang="en-US" sz="1000" dirty="0"/>
+              <a:t>com.tlw8253.exception</a:t>
+            </a:r>
+          </a:p>
+          <a:p>
+            <a:pPr algn="ctr"/>
+            <a:r>
+              <a:rPr lang="en-US" sz="1400" dirty="0" err="1"/>
+              <a:t>DatabaseException</a:t>
+            </a:r>
+            <a:endParaRPr lang="en-US" sz="1400" dirty="0"/>
+          </a:p>
+        </p:txBody>
+      </p:sp>
+      <p:sp>
+        <p:nvSpPr>
+          <p:cNvPr id="32" name="Rectangle 31">
+            <a:extLst>
+              <a:ext uri="{FF2B5EF4-FFF2-40B4-BE49-F238E27FC236}">
+                <a16:creationId xmlns:a16="http://schemas.microsoft.com/office/drawing/2014/main" xmlns="" id="{02A645C8-F11F-438D-92DC-F6FCCA5ECFB8}"/>
+              </a:ext>
+            </a:extLst>
+          </p:cNvPr>
+          <p:cNvSpPr/>
+          <p:nvPr/>
+        </p:nvSpPr>
+        <p:spPr>
+          <a:xfrm>
+            <a:off x="4505165" y="5729410"/>
+            <a:ext cx="2048896" cy="657053"/>
+          </a:xfrm>
+          <a:prstGeom prst="rect">
+            <a:avLst/>
+          </a:prstGeom>
+          <a:solidFill>
+            <a:schemeClr val="accent2"/>
+          </a:solidFill>
+        </p:spPr>
+        <p:style>
+          <a:lnRef idx="2">
+            <a:schemeClr val="accent1">
+              <a:shade val="50000"/>
+            </a:schemeClr>
+          </a:lnRef>
+          <a:fillRef idx="1">
+            <a:schemeClr val="accent1"/>
+          </a:fillRef>
+          <a:effectRef idx="0">
+            <a:schemeClr val="accent1"/>
+          </a:effectRef>
+          <a:fontRef idx="minor">
+            <a:schemeClr val="lt1"/>
+          </a:fontRef>
+        </p:style>
+        <p:txBody>
+          <a:bodyPr rtlCol="0" anchor="ctr"/>
+          <a:lstStyle/>
+          <a:p>
+            <a:pPr algn="ctr"/>
+            <a:r>
+              <a:rPr lang="en-US" sz="1000" dirty="0"/>
+              <a:t>com.tlw8253.exception</a:t>
+            </a:r>
+          </a:p>
+          <a:p>
+            <a:pPr algn="ctr"/>
+            <a:r>
+              <a:rPr lang="en-US" sz="1400" dirty="0" err="1"/>
+              <a:t>ClientNotFoundException</a:t>
+            </a:r>
+            <a:endParaRPr lang="en-US" sz="1400" dirty="0"/>
+          </a:p>
+        </p:txBody>
+      </p:sp>
+      <p:cxnSp>
+        <p:nvCxnSpPr>
+          <p:cNvPr id="12" name="Straight Arrow Connector 11">
+            <a:extLst>
+              <a:ext uri="{FF2B5EF4-FFF2-40B4-BE49-F238E27FC236}">
+                <a16:creationId xmlns:a16="http://schemas.microsoft.com/office/drawing/2014/main" xmlns="" id="{FF2076CA-F897-4293-B6CD-7408EB452156}"/>
+              </a:ext>
+            </a:extLst>
+          </p:cNvPr>
+          <p:cNvCxnSpPr>
+            <a:stCxn id="29" idx="1"/>
+            <a:endCxn id="31" idx="3"/>
+          </p:cNvCxnSpPr>
+          <p:nvPr/>
+        </p:nvCxnSpPr>
+        <p:spPr>
+          <a:xfrm flipH="1">
+            <a:off x="6130527" y="4770030"/>
+            <a:ext cx="1248555" cy="98822"/>
+          </a:xfrm>
+          <a:prstGeom prst="straightConnector1">
+            <a:avLst/>
+          </a:prstGeom>
+          <a:ln>
+            <a:tailEnd type="triangle"/>
+          </a:ln>
+        </p:spPr>
+        <p:style>
+          <a:lnRef idx="1">
+            <a:schemeClr val="accent1"/>
+          </a:lnRef>
+          <a:fillRef idx="0">
+            <a:schemeClr val="accent1"/>
+          </a:fillRef>
+          <a:effectRef idx="0">
+            <a:schemeClr val="accent1"/>
+          </a:effectRef>
+          <a:fontRef idx="minor">
+            <a:schemeClr val="tx1"/>
+          </a:fontRef>
+        </p:style>
+      </p:cxnSp>
+      <p:cxnSp>
+        <p:nvCxnSpPr>
+          <p:cNvPr id="14" name="Straight Arrow Connector 13">
+            <a:extLst>
+              <a:ext uri="{FF2B5EF4-FFF2-40B4-BE49-F238E27FC236}">
+                <a16:creationId xmlns:a16="http://schemas.microsoft.com/office/drawing/2014/main" xmlns="" id="{5C625B7B-4A1E-46C5-9082-4FEC89B30DA9}"/>
+              </a:ext>
+            </a:extLst>
+          </p:cNvPr>
+          <p:cNvCxnSpPr>
+            <a:stCxn id="29" idx="1"/>
+            <a:endCxn id="32" idx="3"/>
+          </p:cNvCxnSpPr>
+          <p:nvPr/>
+        </p:nvCxnSpPr>
+        <p:spPr>
+          <a:xfrm flipH="1">
+            <a:off x="6554061" y="4770030"/>
+            <a:ext cx="825021" cy="1287907"/>
+          </a:xfrm>
+          <a:prstGeom prst="straightConnector1">
+            <a:avLst/>
+          </a:prstGeom>
+          <a:ln>
+            <a:tailEnd type="triangle"/>
+          </a:ln>
+        </p:spPr>
+        <p:style>
+          <a:lnRef idx="1">
+            <a:schemeClr val="accent1"/>
+          </a:lnRef>
+          <a:fillRef idx="0">
+            <a:schemeClr val="accent1"/>
+          </a:fillRef>
+          <a:effectRef idx="0">
+            <a:schemeClr val="accent1"/>
+          </a:effectRef>
+          <a:fontRef idx="minor">
+            <a:schemeClr val="tx1"/>
+          </a:fontRef>
+        </p:style>
+      </p:cxnSp>
+    </p:spTree>
+    <p:extLst>
+      <p:ext uri="{BB962C8B-B14F-4D97-AF65-F5344CB8AC3E}">
+        <p14:creationId xmlns:p14="http://schemas.microsoft.com/office/powerpoint/2010/main" val="895246066"/>
+      </p:ext>
+    </p:extLst>
+  </p:cSld>
+  <p:clrMapOvr>
+    <a:masterClrMapping/>
+  </p:clrMapOvr>
+</p:sld>
+</file>
+
+<file path=ppt/slides/slide5.xml><?xml version="1.0" encoding="utf-8"?>
+<p:sld xmlns:a="http://schemas.openxmlformats.org/drawingml/2006/main" xmlns:r="http://schemas.openxmlformats.org/officeDocument/2006/relationships" xmlns:p="http://schemas.openxmlformats.org/presentationml/2006/main">
+  <p:cSld>
+    <p:spTree>
+      <p:nvGrpSpPr>
+        <p:cNvPr id="1" name=""/>
+        <p:cNvGrpSpPr/>
+        <p:nvPr/>
+      </p:nvGrpSpPr>
+      <p:grpSpPr>
+        <a:xfrm>
+          <a:off x="0" y="0"/>
+          <a:ext cx="0" cy="0"/>
+          <a:chOff x="0" y="0"/>
+          <a:chExt cx="0" cy="0"/>
+        </a:xfrm>
+      </p:grpSpPr>
+      <p:sp>
+        <p:nvSpPr>
+          <p:cNvPr id="4" name="Rectangle 3"/>
+          <p:cNvSpPr/>
+          <p:nvPr/>
+        </p:nvSpPr>
+        <p:spPr>
+          <a:xfrm>
+            <a:off x="4199670" y="832269"/>
+            <a:ext cx="1494797" cy="991056"/>
+          </a:xfrm>
+          <a:prstGeom prst="rect">
+            <a:avLst/>
+          </a:prstGeom>
+        </p:spPr>
+        <p:style>
+          <a:lnRef idx="2">
+            <a:schemeClr val="accent1">
+              <a:shade val="50000"/>
+            </a:schemeClr>
+          </a:lnRef>
+          <a:fillRef idx="1">
+            <a:schemeClr val="accent1"/>
+          </a:fillRef>
+          <a:effectRef idx="0">
+            <a:schemeClr val="accent1"/>
+          </a:effectRef>
+          <a:fontRef idx="minor">
+            <a:schemeClr val="lt1"/>
+          </a:fontRef>
+        </p:style>
+        <p:txBody>
+          <a:bodyPr rtlCol="0" anchor="ctr"/>
+          <a:lstStyle/>
+          <a:p>
+            <a:pPr algn="ctr"/>
+            <a:r>
+              <a:rPr lang="en-US" sz="1000" dirty="0"/>
+              <a:t>com.tlw8253.dao</a:t>
+            </a:r>
+          </a:p>
+          <a:p>
+            <a:pPr algn="ctr"/>
+            <a:r>
+              <a:rPr lang="en-US" sz="1000" dirty="0"/>
+              <a:t>&lt;&lt; interface &gt;&gt;</a:t>
+            </a:r>
+          </a:p>
+          <a:p>
+            <a:pPr algn="ctr"/>
+            <a:r>
+              <a:rPr lang="en-US" dirty="0" err="1"/>
+              <a:t>ClientDAO</a:t>
+            </a:r>
+            <a:endParaRPr lang="en-US" dirty="0"/>
+          </a:p>
+        </p:txBody>
+      </p:sp>
+      <p:sp>
+        <p:nvSpPr>
+          <p:cNvPr id="5" name="Rectangle 4"/>
+          <p:cNvSpPr/>
+          <p:nvPr/>
+        </p:nvSpPr>
+        <p:spPr>
+          <a:xfrm>
+            <a:off x="1039424" y="2278701"/>
+            <a:ext cx="1494797" cy="991056"/>
+          </a:xfrm>
+          <a:prstGeom prst="rect">
+            <a:avLst/>
+          </a:prstGeom>
+        </p:spPr>
+        <p:style>
+          <a:lnRef idx="2">
+            <a:schemeClr val="accent1">
+              <a:shade val="50000"/>
+            </a:schemeClr>
+          </a:lnRef>
+          <a:fillRef idx="1">
+            <a:schemeClr val="accent1"/>
+          </a:fillRef>
+          <a:effectRef idx="0">
+            <a:schemeClr val="accent1"/>
+          </a:effectRef>
+          <a:fontRef idx="minor">
+            <a:schemeClr val="lt1"/>
+          </a:fontRef>
+        </p:style>
+        <p:txBody>
+          <a:bodyPr rtlCol="0" anchor="ctr"/>
+          <a:lstStyle/>
+          <a:p>
+            <a:pPr algn="ctr"/>
+            <a:r>
+              <a:rPr lang="en-US" sz="1000" dirty="0"/>
               <a:t>com.tlw8253.model</a:t>
             </a:r>
           </a:p>
@@ -6936,7 +8050,7 @@
           <p:cNvPr id="11" name="TextBox 10">
             <a:extLst>
               <a:ext uri="{FF2B5EF4-FFF2-40B4-BE49-F238E27FC236}">
-                <a16:creationId xmlns:a16="http://schemas.microsoft.com/office/drawing/2014/main" id="{E0BBD6C8-C8F2-40C5-AA64-85961A11ADC2}"/>
+                <a16:creationId xmlns:a16="http://schemas.microsoft.com/office/drawing/2014/main" xmlns="" id="{E0BBD6C8-C8F2-40C5-AA64-85961A11ADC2}"/>
               </a:ext>
             </a:extLst>
           </p:cNvPr>

</xml_diff>

<commit_message>
20210803 update to files from tlw8748253.
</commit_message>
<xml_diff>
--- a/docs/Project 0.pptx
+++ b/docs/Project 0.pptx
@@ -9,7 +9,8 @@
     <p:sldId id="257" r:id="rId3"/>
     <p:sldId id="260" r:id="rId4"/>
     <p:sldId id="259" r:id="rId5"/>
-    <p:sldId id="258" r:id="rId6"/>
+    <p:sldId id="261" r:id="rId6"/>
+    <p:sldId id="258" r:id="rId7"/>
   </p:sldIdLst>
   <p:sldSz cx="12192000" cy="6858000"/>
   <p:notesSz cx="6858000" cy="9144000"/>
@@ -138,7 +139,7 @@
           <p:cNvPr id="2" name="Title 1">
             <a:extLst>
               <a:ext uri="{FF2B5EF4-FFF2-40B4-BE49-F238E27FC236}">
-                <a16:creationId xmlns:a16="http://schemas.microsoft.com/office/drawing/2014/main" xmlns="" id="{67106D7E-D400-44F1-9A1A-D68CE501C73D}"/>
+                <a16:creationId xmlns="" xmlns:a16="http://schemas.microsoft.com/office/drawing/2014/main" id="{67106D7E-D400-44F1-9A1A-D68CE501C73D}"/>
               </a:ext>
             </a:extLst>
           </p:cNvPr>
@@ -175,7 +176,7 @@
           <p:cNvPr id="3" name="Subtitle 2">
             <a:extLst>
               <a:ext uri="{FF2B5EF4-FFF2-40B4-BE49-F238E27FC236}">
-                <a16:creationId xmlns:a16="http://schemas.microsoft.com/office/drawing/2014/main" xmlns="" id="{A5FDE527-E621-4639-A0C7-E1E9B0DFBCEC}"/>
+                <a16:creationId xmlns="" xmlns:a16="http://schemas.microsoft.com/office/drawing/2014/main" id="{A5FDE527-E621-4639-A0C7-E1E9B0DFBCEC}"/>
               </a:ext>
             </a:extLst>
           </p:cNvPr>
@@ -245,7 +246,7 @@
           <p:cNvPr id="4" name="Date Placeholder 3">
             <a:extLst>
               <a:ext uri="{FF2B5EF4-FFF2-40B4-BE49-F238E27FC236}">
-                <a16:creationId xmlns:a16="http://schemas.microsoft.com/office/drawing/2014/main" xmlns="" id="{E109CE88-B989-4109-89C8-36F7C245DB1C}"/>
+                <a16:creationId xmlns="" xmlns:a16="http://schemas.microsoft.com/office/drawing/2014/main" id="{E109CE88-B989-4109-89C8-36F7C245DB1C}"/>
               </a:ext>
             </a:extLst>
           </p:cNvPr>
@@ -263,7 +264,7 @@
           <a:p>
             <a:fld id="{6C733091-19F0-4DD7-90FE-000B4789B4CF}" type="datetimeFigureOut">
               <a:rPr lang="en-US" smtClean="0"/>
-              <a:t>8/2/2021</a:t>
+              <a:t>8/3/2021</a:t>
             </a:fld>
             <a:endParaRPr lang="en-US"/>
           </a:p>
@@ -274,7 +275,7 @@
           <p:cNvPr id="5" name="Footer Placeholder 4">
             <a:extLst>
               <a:ext uri="{FF2B5EF4-FFF2-40B4-BE49-F238E27FC236}">
-                <a16:creationId xmlns:a16="http://schemas.microsoft.com/office/drawing/2014/main" xmlns="" id="{0841498F-B991-43D3-B408-CC35D8EFCF37}"/>
+                <a16:creationId xmlns="" xmlns:a16="http://schemas.microsoft.com/office/drawing/2014/main" id="{0841498F-B991-43D3-B408-CC35D8EFCF37}"/>
               </a:ext>
             </a:extLst>
           </p:cNvPr>
@@ -299,7 +300,7 @@
           <p:cNvPr id="6" name="Slide Number Placeholder 5">
             <a:extLst>
               <a:ext uri="{FF2B5EF4-FFF2-40B4-BE49-F238E27FC236}">
-                <a16:creationId xmlns:a16="http://schemas.microsoft.com/office/drawing/2014/main" xmlns="" id="{01754CB8-17B1-45A0-AE7D-755EAA1B69D8}"/>
+                <a16:creationId xmlns="" xmlns:a16="http://schemas.microsoft.com/office/drawing/2014/main" id="{01754CB8-17B1-45A0-AE7D-755EAA1B69D8}"/>
               </a:ext>
             </a:extLst>
           </p:cNvPr>
@@ -358,7 +359,7 @@
           <p:cNvPr id="2" name="Title 1">
             <a:extLst>
               <a:ext uri="{FF2B5EF4-FFF2-40B4-BE49-F238E27FC236}">
-                <a16:creationId xmlns:a16="http://schemas.microsoft.com/office/drawing/2014/main" xmlns="" id="{E7A7B055-5DC2-440D-83C1-CAAE8E9A8E14}"/>
+                <a16:creationId xmlns="" xmlns:a16="http://schemas.microsoft.com/office/drawing/2014/main" id="{E7A7B055-5DC2-440D-83C1-CAAE8E9A8E14}"/>
               </a:ext>
             </a:extLst>
           </p:cNvPr>
@@ -386,7 +387,7 @@
           <p:cNvPr id="3" name="Vertical Text Placeholder 2">
             <a:extLst>
               <a:ext uri="{FF2B5EF4-FFF2-40B4-BE49-F238E27FC236}">
-                <a16:creationId xmlns:a16="http://schemas.microsoft.com/office/drawing/2014/main" xmlns="" id="{65710707-423D-4F9D-A49D-6C764C562553}"/>
+                <a16:creationId xmlns="" xmlns:a16="http://schemas.microsoft.com/office/drawing/2014/main" id="{65710707-423D-4F9D-A49D-6C764C562553}"/>
               </a:ext>
             </a:extLst>
           </p:cNvPr>
@@ -443,7 +444,7 @@
           <p:cNvPr id="4" name="Date Placeholder 3">
             <a:extLst>
               <a:ext uri="{FF2B5EF4-FFF2-40B4-BE49-F238E27FC236}">
-                <a16:creationId xmlns:a16="http://schemas.microsoft.com/office/drawing/2014/main" xmlns="" id="{98B6F7EF-D1BE-4437-85F3-99626E37E4EF}"/>
+                <a16:creationId xmlns="" xmlns:a16="http://schemas.microsoft.com/office/drawing/2014/main" id="{98B6F7EF-D1BE-4437-85F3-99626E37E4EF}"/>
               </a:ext>
             </a:extLst>
           </p:cNvPr>
@@ -461,7 +462,7 @@
           <a:p>
             <a:fld id="{6C733091-19F0-4DD7-90FE-000B4789B4CF}" type="datetimeFigureOut">
               <a:rPr lang="en-US" smtClean="0"/>
-              <a:t>8/2/2021</a:t>
+              <a:t>8/3/2021</a:t>
             </a:fld>
             <a:endParaRPr lang="en-US"/>
           </a:p>
@@ -472,7 +473,7 @@
           <p:cNvPr id="5" name="Footer Placeholder 4">
             <a:extLst>
               <a:ext uri="{FF2B5EF4-FFF2-40B4-BE49-F238E27FC236}">
-                <a16:creationId xmlns:a16="http://schemas.microsoft.com/office/drawing/2014/main" xmlns="" id="{D890AA9B-E479-4209-B245-83608F3D4013}"/>
+                <a16:creationId xmlns="" xmlns:a16="http://schemas.microsoft.com/office/drawing/2014/main" id="{D890AA9B-E479-4209-B245-83608F3D4013}"/>
               </a:ext>
             </a:extLst>
           </p:cNvPr>
@@ -497,7 +498,7 @@
           <p:cNvPr id="6" name="Slide Number Placeholder 5">
             <a:extLst>
               <a:ext uri="{FF2B5EF4-FFF2-40B4-BE49-F238E27FC236}">
-                <a16:creationId xmlns:a16="http://schemas.microsoft.com/office/drawing/2014/main" xmlns="" id="{0E4976E4-E15A-4296-A430-633D2BB9142B}"/>
+                <a16:creationId xmlns="" xmlns:a16="http://schemas.microsoft.com/office/drawing/2014/main" id="{0E4976E4-E15A-4296-A430-633D2BB9142B}"/>
               </a:ext>
             </a:extLst>
           </p:cNvPr>
@@ -556,7 +557,7 @@
           <p:cNvPr id="2" name="Vertical Title 1">
             <a:extLst>
               <a:ext uri="{FF2B5EF4-FFF2-40B4-BE49-F238E27FC236}">
-                <a16:creationId xmlns:a16="http://schemas.microsoft.com/office/drawing/2014/main" xmlns="" id="{66F63CF5-8DEE-4BB2-A2A5-5C16FEBE1AD5}"/>
+                <a16:creationId xmlns="" xmlns:a16="http://schemas.microsoft.com/office/drawing/2014/main" id="{66F63CF5-8DEE-4BB2-A2A5-5C16FEBE1AD5}"/>
               </a:ext>
             </a:extLst>
           </p:cNvPr>
@@ -589,7 +590,7 @@
           <p:cNvPr id="3" name="Vertical Text Placeholder 2">
             <a:extLst>
               <a:ext uri="{FF2B5EF4-FFF2-40B4-BE49-F238E27FC236}">
-                <a16:creationId xmlns:a16="http://schemas.microsoft.com/office/drawing/2014/main" xmlns="" id="{E0D5EBA5-94AF-4373-B032-A40FF73C7575}"/>
+                <a16:creationId xmlns="" xmlns:a16="http://schemas.microsoft.com/office/drawing/2014/main" id="{E0D5EBA5-94AF-4373-B032-A40FF73C7575}"/>
               </a:ext>
             </a:extLst>
           </p:cNvPr>
@@ -651,7 +652,7 @@
           <p:cNvPr id="4" name="Date Placeholder 3">
             <a:extLst>
               <a:ext uri="{FF2B5EF4-FFF2-40B4-BE49-F238E27FC236}">
-                <a16:creationId xmlns:a16="http://schemas.microsoft.com/office/drawing/2014/main" xmlns="" id="{7426B8E1-6758-4F5E-B618-96641332600B}"/>
+                <a16:creationId xmlns="" xmlns:a16="http://schemas.microsoft.com/office/drawing/2014/main" id="{7426B8E1-6758-4F5E-B618-96641332600B}"/>
               </a:ext>
             </a:extLst>
           </p:cNvPr>
@@ -669,7 +670,7 @@
           <a:p>
             <a:fld id="{6C733091-19F0-4DD7-90FE-000B4789B4CF}" type="datetimeFigureOut">
               <a:rPr lang="en-US" smtClean="0"/>
-              <a:t>8/2/2021</a:t>
+              <a:t>8/3/2021</a:t>
             </a:fld>
             <a:endParaRPr lang="en-US"/>
           </a:p>
@@ -680,7 +681,7 @@
           <p:cNvPr id="5" name="Footer Placeholder 4">
             <a:extLst>
               <a:ext uri="{FF2B5EF4-FFF2-40B4-BE49-F238E27FC236}">
-                <a16:creationId xmlns:a16="http://schemas.microsoft.com/office/drawing/2014/main" xmlns="" id="{F65E330E-2A7E-482D-AE0F-70EA5A29958B}"/>
+                <a16:creationId xmlns="" xmlns:a16="http://schemas.microsoft.com/office/drawing/2014/main" id="{F65E330E-2A7E-482D-AE0F-70EA5A29958B}"/>
               </a:ext>
             </a:extLst>
           </p:cNvPr>
@@ -705,7 +706,7 @@
           <p:cNvPr id="6" name="Slide Number Placeholder 5">
             <a:extLst>
               <a:ext uri="{FF2B5EF4-FFF2-40B4-BE49-F238E27FC236}">
-                <a16:creationId xmlns:a16="http://schemas.microsoft.com/office/drawing/2014/main" xmlns="" id="{B8000005-FC38-4A6C-9D09-7945EFA08160}"/>
+                <a16:creationId xmlns="" xmlns:a16="http://schemas.microsoft.com/office/drawing/2014/main" id="{B8000005-FC38-4A6C-9D09-7945EFA08160}"/>
               </a:ext>
             </a:extLst>
           </p:cNvPr>
@@ -764,7 +765,7 @@
           <p:cNvPr id="2" name="Title 1">
             <a:extLst>
               <a:ext uri="{FF2B5EF4-FFF2-40B4-BE49-F238E27FC236}">
-                <a16:creationId xmlns:a16="http://schemas.microsoft.com/office/drawing/2014/main" xmlns="" id="{91D0002C-766B-44B4-A24C-BE6DE6C7BA4C}"/>
+                <a16:creationId xmlns="" xmlns:a16="http://schemas.microsoft.com/office/drawing/2014/main" id="{91D0002C-766B-44B4-A24C-BE6DE6C7BA4C}"/>
               </a:ext>
             </a:extLst>
           </p:cNvPr>
@@ -792,7 +793,7 @@
           <p:cNvPr id="3" name="Content Placeholder 2">
             <a:extLst>
               <a:ext uri="{FF2B5EF4-FFF2-40B4-BE49-F238E27FC236}">
-                <a16:creationId xmlns:a16="http://schemas.microsoft.com/office/drawing/2014/main" xmlns="" id="{3455BAA9-6C7B-4874-AD76-BD466F64802D}"/>
+                <a16:creationId xmlns="" xmlns:a16="http://schemas.microsoft.com/office/drawing/2014/main" id="{3455BAA9-6C7B-4874-AD76-BD466F64802D}"/>
               </a:ext>
             </a:extLst>
           </p:cNvPr>
@@ -849,7 +850,7 @@
           <p:cNvPr id="4" name="Date Placeholder 3">
             <a:extLst>
               <a:ext uri="{FF2B5EF4-FFF2-40B4-BE49-F238E27FC236}">
-                <a16:creationId xmlns:a16="http://schemas.microsoft.com/office/drawing/2014/main" xmlns="" id="{8776BDAF-D8F2-4A61-904D-094BB4545702}"/>
+                <a16:creationId xmlns="" xmlns:a16="http://schemas.microsoft.com/office/drawing/2014/main" id="{8776BDAF-D8F2-4A61-904D-094BB4545702}"/>
               </a:ext>
             </a:extLst>
           </p:cNvPr>
@@ -867,7 +868,7 @@
           <a:p>
             <a:fld id="{6C733091-19F0-4DD7-90FE-000B4789B4CF}" type="datetimeFigureOut">
               <a:rPr lang="en-US" smtClean="0"/>
-              <a:t>8/2/2021</a:t>
+              <a:t>8/3/2021</a:t>
             </a:fld>
             <a:endParaRPr lang="en-US"/>
           </a:p>
@@ -878,7 +879,7 @@
           <p:cNvPr id="5" name="Footer Placeholder 4">
             <a:extLst>
               <a:ext uri="{FF2B5EF4-FFF2-40B4-BE49-F238E27FC236}">
-                <a16:creationId xmlns:a16="http://schemas.microsoft.com/office/drawing/2014/main" xmlns="" id="{F89C5665-4384-4706-9BD2-9F42B05C96BC}"/>
+                <a16:creationId xmlns="" xmlns:a16="http://schemas.microsoft.com/office/drawing/2014/main" id="{F89C5665-4384-4706-9BD2-9F42B05C96BC}"/>
               </a:ext>
             </a:extLst>
           </p:cNvPr>
@@ -903,7 +904,7 @@
           <p:cNvPr id="6" name="Slide Number Placeholder 5">
             <a:extLst>
               <a:ext uri="{FF2B5EF4-FFF2-40B4-BE49-F238E27FC236}">
-                <a16:creationId xmlns:a16="http://schemas.microsoft.com/office/drawing/2014/main" xmlns="" id="{7DCAD73E-CAB3-4BA7-905E-D203691D0418}"/>
+                <a16:creationId xmlns="" xmlns:a16="http://schemas.microsoft.com/office/drawing/2014/main" id="{7DCAD73E-CAB3-4BA7-905E-D203691D0418}"/>
               </a:ext>
             </a:extLst>
           </p:cNvPr>
@@ -962,7 +963,7 @@
           <p:cNvPr id="2" name="Title 1">
             <a:extLst>
               <a:ext uri="{FF2B5EF4-FFF2-40B4-BE49-F238E27FC236}">
-                <a16:creationId xmlns:a16="http://schemas.microsoft.com/office/drawing/2014/main" xmlns="" id="{A9880706-F7FA-4EC3-A022-9D6C7CEC3692}"/>
+                <a16:creationId xmlns="" xmlns:a16="http://schemas.microsoft.com/office/drawing/2014/main" id="{A9880706-F7FA-4EC3-A022-9D6C7CEC3692}"/>
               </a:ext>
             </a:extLst>
           </p:cNvPr>
@@ -999,7 +1000,7 @@
           <p:cNvPr id="3" name="Text Placeholder 2">
             <a:extLst>
               <a:ext uri="{FF2B5EF4-FFF2-40B4-BE49-F238E27FC236}">
-                <a16:creationId xmlns:a16="http://schemas.microsoft.com/office/drawing/2014/main" xmlns="" id="{FA8A65D0-3DF5-448D-82EC-A967682A0DED}"/>
+                <a16:creationId xmlns="" xmlns:a16="http://schemas.microsoft.com/office/drawing/2014/main" id="{FA8A65D0-3DF5-448D-82EC-A967682A0DED}"/>
               </a:ext>
             </a:extLst>
           </p:cNvPr>
@@ -1124,7 +1125,7 @@
           <p:cNvPr id="4" name="Date Placeholder 3">
             <a:extLst>
               <a:ext uri="{FF2B5EF4-FFF2-40B4-BE49-F238E27FC236}">
-                <a16:creationId xmlns:a16="http://schemas.microsoft.com/office/drawing/2014/main" xmlns="" id="{600EA68C-01A6-487D-9D6E-1D1B4EAC0440}"/>
+                <a16:creationId xmlns="" xmlns:a16="http://schemas.microsoft.com/office/drawing/2014/main" id="{600EA68C-01A6-487D-9D6E-1D1B4EAC0440}"/>
               </a:ext>
             </a:extLst>
           </p:cNvPr>
@@ -1142,7 +1143,7 @@
           <a:p>
             <a:fld id="{6C733091-19F0-4DD7-90FE-000B4789B4CF}" type="datetimeFigureOut">
               <a:rPr lang="en-US" smtClean="0"/>
-              <a:t>8/2/2021</a:t>
+              <a:t>8/3/2021</a:t>
             </a:fld>
             <a:endParaRPr lang="en-US"/>
           </a:p>
@@ -1153,7 +1154,7 @@
           <p:cNvPr id="5" name="Footer Placeholder 4">
             <a:extLst>
               <a:ext uri="{FF2B5EF4-FFF2-40B4-BE49-F238E27FC236}">
-                <a16:creationId xmlns:a16="http://schemas.microsoft.com/office/drawing/2014/main" xmlns="" id="{6E6527CB-4FFD-4569-A82C-5EDC311B2CF6}"/>
+                <a16:creationId xmlns="" xmlns:a16="http://schemas.microsoft.com/office/drawing/2014/main" id="{6E6527CB-4FFD-4569-A82C-5EDC311B2CF6}"/>
               </a:ext>
             </a:extLst>
           </p:cNvPr>
@@ -1178,7 +1179,7 @@
           <p:cNvPr id="6" name="Slide Number Placeholder 5">
             <a:extLst>
               <a:ext uri="{FF2B5EF4-FFF2-40B4-BE49-F238E27FC236}">
-                <a16:creationId xmlns:a16="http://schemas.microsoft.com/office/drawing/2014/main" xmlns="" id="{24B19E5B-5A98-4381-A01D-01F81FD65792}"/>
+                <a16:creationId xmlns="" xmlns:a16="http://schemas.microsoft.com/office/drawing/2014/main" id="{24B19E5B-5A98-4381-A01D-01F81FD65792}"/>
               </a:ext>
             </a:extLst>
           </p:cNvPr>
@@ -1237,7 +1238,7 @@
           <p:cNvPr id="2" name="Title 1">
             <a:extLst>
               <a:ext uri="{FF2B5EF4-FFF2-40B4-BE49-F238E27FC236}">
-                <a16:creationId xmlns:a16="http://schemas.microsoft.com/office/drawing/2014/main" xmlns="" id="{63228B71-E923-4431-B8D2-FAE724678940}"/>
+                <a16:creationId xmlns="" xmlns:a16="http://schemas.microsoft.com/office/drawing/2014/main" id="{63228B71-E923-4431-B8D2-FAE724678940}"/>
               </a:ext>
             </a:extLst>
           </p:cNvPr>
@@ -1265,7 +1266,7 @@
           <p:cNvPr id="3" name="Content Placeholder 2">
             <a:extLst>
               <a:ext uri="{FF2B5EF4-FFF2-40B4-BE49-F238E27FC236}">
-                <a16:creationId xmlns:a16="http://schemas.microsoft.com/office/drawing/2014/main" xmlns="" id="{B18895E9-B7FF-4A00-955B-206CF8C73E43}"/>
+                <a16:creationId xmlns="" xmlns:a16="http://schemas.microsoft.com/office/drawing/2014/main" id="{B18895E9-B7FF-4A00-955B-206CF8C73E43}"/>
               </a:ext>
             </a:extLst>
           </p:cNvPr>
@@ -1327,7 +1328,7 @@
           <p:cNvPr id="4" name="Content Placeholder 3">
             <a:extLst>
               <a:ext uri="{FF2B5EF4-FFF2-40B4-BE49-F238E27FC236}">
-                <a16:creationId xmlns:a16="http://schemas.microsoft.com/office/drawing/2014/main" xmlns="" id="{DA813955-E3B9-44BC-8E1D-139269C8B48A}"/>
+                <a16:creationId xmlns="" xmlns:a16="http://schemas.microsoft.com/office/drawing/2014/main" id="{DA813955-E3B9-44BC-8E1D-139269C8B48A}"/>
               </a:ext>
             </a:extLst>
           </p:cNvPr>
@@ -1389,7 +1390,7 @@
           <p:cNvPr id="5" name="Date Placeholder 4">
             <a:extLst>
               <a:ext uri="{FF2B5EF4-FFF2-40B4-BE49-F238E27FC236}">
-                <a16:creationId xmlns:a16="http://schemas.microsoft.com/office/drawing/2014/main" xmlns="" id="{7E9B8EF5-28D5-4C4E-A2AB-EEA30D75DAFE}"/>
+                <a16:creationId xmlns="" xmlns:a16="http://schemas.microsoft.com/office/drawing/2014/main" id="{7E9B8EF5-28D5-4C4E-A2AB-EEA30D75DAFE}"/>
               </a:ext>
             </a:extLst>
           </p:cNvPr>
@@ -1407,7 +1408,7 @@
           <a:p>
             <a:fld id="{6C733091-19F0-4DD7-90FE-000B4789B4CF}" type="datetimeFigureOut">
               <a:rPr lang="en-US" smtClean="0"/>
-              <a:t>8/2/2021</a:t>
+              <a:t>8/3/2021</a:t>
             </a:fld>
             <a:endParaRPr lang="en-US"/>
           </a:p>
@@ -1418,7 +1419,7 @@
           <p:cNvPr id="6" name="Footer Placeholder 5">
             <a:extLst>
               <a:ext uri="{FF2B5EF4-FFF2-40B4-BE49-F238E27FC236}">
-                <a16:creationId xmlns:a16="http://schemas.microsoft.com/office/drawing/2014/main" xmlns="" id="{5723E678-8CB4-4335-AA04-6BD391748717}"/>
+                <a16:creationId xmlns="" xmlns:a16="http://schemas.microsoft.com/office/drawing/2014/main" id="{5723E678-8CB4-4335-AA04-6BD391748717}"/>
               </a:ext>
             </a:extLst>
           </p:cNvPr>
@@ -1443,7 +1444,7 @@
           <p:cNvPr id="7" name="Slide Number Placeholder 6">
             <a:extLst>
               <a:ext uri="{FF2B5EF4-FFF2-40B4-BE49-F238E27FC236}">
-                <a16:creationId xmlns:a16="http://schemas.microsoft.com/office/drawing/2014/main" xmlns="" id="{887B5567-9F4D-4AE1-92D8-769C9F7EA4F0}"/>
+                <a16:creationId xmlns="" xmlns:a16="http://schemas.microsoft.com/office/drawing/2014/main" id="{887B5567-9F4D-4AE1-92D8-769C9F7EA4F0}"/>
               </a:ext>
             </a:extLst>
           </p:cNvPr>
@@ -1502,7 +1503,7 @@
           <p:cNvPr id="2" name="Title 1">
             <a:extLst>
               <a:ext uri="{FF2B5EF4-FFF2-40B4-BE49-F238E27FC236}">
-                <a16:creationId xmlns:a16="http://schemas.microsoft.com/office/drawing/2014/main" xmlns="" id="{A40320A9-7C0C-45B4-BF2B-3B53B5686EBB}"/>
+                <a16:creationId xmlns="" xmlns:a16="http://schemas.microsoft.com/office/drawing/2014/main" id="{A40320A9-7C0C-45B4-BF2B-3B53B5686EBB}"/>
               </a:ext>
             </a:extLst>
           </p:cNvPr>
@@ -1535,7 +1536,7 @@
           <p:cNvPr id="3" name="Text Placeholder 2">
             <a:extLst>
               <a:ext uri="{FF2B5EF4-FFF2-40B4-BE49-F238E27FC236}">
-                <a16:creationId xmlns:a16="http://schemas.microsoft.com/office/drawing/2014/main" xmlns="" id="{8C440DE1-7DD6-4B1C-B961-CD2079B51F03}"/>
+                <a16:creationId xmlns="" xmlns:a16="http://schemas.microsoft.com/office/drawing/2014/main" id="{8C440DE1-7DD6-4B1C-B961-CD2079B51F03}"/>
               </a:ext>
             </a:extLst>
           </p:cNvPr>
@@ -1606,7 +1607,7 @@
           <p:cNvPr id="4" name="Content Placeholder 3">
             <a:extLst>
               <a:ext uri="{FF2B5EF4-FFF2-40B4-BE49-F238E27FC236}">
-                <a16:creationId xmlns:a16="http://schemas.microsoft.com/office/drawing/2014/main" xmlns="" id="{6FAFE840-CC9A-4D89-B05F-159EF756B427}"/>
+                <a16:creationId xmlns="" xmlns:a16="http://schemas.microsoft.com/office/drawing/2014/main" id="{6FAFE840-CC9A-4D89-B05F-159EF756B427}"/>
               </a:ext>
             </a:extLst>
           </p:cNvPr>
@@ -1668,7 +1669,7 @@
           <p:cNvPr id="5" name="Text Placeholder 4">
             <a:extLst>
               <a:ext uri="{FF2B5EF4-FFF2-40B4-BE49-F238E27FC236}">
-                <a16:creationId xmlns:a16="http://schemas.microsoft.com/office/drawing/2014/main" xmlns="" id="{4B87AADC-3401-48C6-98F6-0AB60F6DF9BE}"/>
+                <a16:creationId xmlns="" xmlns:a16="http://schemas.microsoft.com/office/drawing/2014/main" id="{4B87AADC-3401-48C6-98F6-0AB60F6DF9BE}"/>
               </a:ext>
             </a:extLst>
           </p:cNvPr>
@@ -1739,7 +1740,7 @@
           <p:cNvPr id="6" name="Content Placeholder 5">
             <a:extLst>
               <a:ext uri="{FF2B5EF4-FFF2-40B4-BE49-F238E27FC236}">
-                <a16:creationId xmlns:a16="http://schemas.microsoft.com/office/drawing/2014/main" xmlns="" id="{34BCF1A4-FB52-4DCD-80BC-324BA41C33CD}"/>
+                <a16:creationId xmlns="" xmlns:a16="http://schemas.microsoft.com/office/drawing/2014/main" id="{34BCF1A4-FB52-4DCD-80BC-324BA41C33CD}"/>
               </a:ext>
             </a:extLst>
           </p:cNvPr>
@@ -1801,7 +1802,7 @@
           <p:cNvPr id="7" name="Date Placeholder 6">
             <a:extLst>
               <a:ext uri="{FF2B5EF4-FFF2-40B4-BE49-F238E27FC236}">
-                <a16:creationId xmlns:a16="http://schemas.microsoft.com/office/drawing/2014/main" xmlns="" id="{8CFD4208-60E7-48B1-8CD0-717D5E26B827}"/>
+                <a16:creationId xmlns="" xmlns:a16="http://schemas.microsoft.com/office/drawing/2014/main" id="{8CFD4208-60E7-48B1-8CD0-717D5E26B827}"/>
               </a:ext>
             </a:extLst>
           </p:cNvPr>
@@ -1819,7 +1820,7 @@
           <a:p>
             <a:fld id="{6C733091-19F0-4DD7-90FE-000B4789B4CF}" type="datetimeFigureOut">
               <a:rPr lang="en-US" smtClean="0"/>
-              <a:t>8/2/2021</a:t>
+              <a:t>8/3/2021</a:t>
             </a:fld>
             <a:endParaRPr lang="en-US"/>
           </a:p>
@@ -1830,7 +1831,7 @@
           <p:cNvPr id="8" name="Footer Placeholder 7">
             <a:extLst>
               <a:ext uri="{FF2B5EF4-FFF2-40B4-BE49-F238E27FC236}">
-                <a16:creationId xmlns:a16="http://schemas.microsoft.com/office/drawing/2014/main" xmlns="" id="{94E429D1-BEB1-4D8A-91F2-CD4F80157F8D}"/>
+                <a16:creationId xmlns="" xmlns:a16="http://schemas.microsoft.com/office/drawing/2014/main" id="{94E429D1-BEB1-4D8A-91F2-CD4F80157F8D}"/>
               </a:ext>
             </a:extLst>
           </p:cNvPr>
@@ -1855,7 +1856,7 @@
           <p:cNvPr id="9" name="Slide Number Placeholder 8">
             <a:extLst>
               <a:ext uri="{FF2B5EF4-FFF2-40B4-BE49-F238E27FC236}">
-                <a16:creationId xmlns:a16="http://schemas.microsoft.com/office/drawing/2014/main" xmlns="" id="{6F17C19C-8370-4118-A8FC-5DDA6F84230F}"/>
+                <a16:creationId xmlns="" xmlns:a16="http://schemas.microsoft.com/office/drawing/2014/main" id="{6F17C19C-8370-4118-A8FC-5DDA6F84230F}"/>
               </a:ext>
             </a:extLst>
           </p:cNvPr>
@@ -1914,7 +1915,7 @@
           <p:cNvPr id="2" name="Title 1">
             <a:extLst>
               <a:ext uri="{FF2B5EF4-FFF2-40B4-BE49-F238E27FC236}">
-                <a16:creationId xmlns:a16="http://schemas.microsoft.com/office/drawing/2014/main" xmlns="" id="{252CBF36-7F99-45A9-BC35-BD2EC260CBF0}"/>
+                <a16:creationId xmlns="" xmlns:a16="http://schemas.microsoft.com/office/drawing/2014/main" id="{252CBF36-7F99-45A9-BC35-BD2EC260CBF0}"/>
               </a:ext>
             </a:extLst>
           </p:cNvPr>
@@ -1942,7 +1943,7 @@
           <p:cNvPr id="3" name="Date Placeholder 2">
             <a:extLst>
               <a:ext uri="{FF2B5EF4-FFF2-40B4-BE49-F238E27FC236}">
-                <a16:creationId xmlns:a16="http://schemas.microsoft.com/office/drawing/2014/main" xmlns="" id="{0D6F5F83-F07E-4501-B86B-9F96CD43993C}"/>
+                <a16:creationId xmlns="" xmlns:a16="http://schemas.microsoft.com/office/drawing/2014/main" id="{0D6F5F83-F07E-4501-B86B-9F96CD43993C}"/>
               </a:ext>
             </a:extLst>
           </p:cNvPr>
@@ -1960,7 +1961,7 @@
           <a:p>
             <a:fld id="{6C733091-19F0-4DD7-90FE-000B4789B4CF}" type="datetimeFigureOut">
               <a:rPr lang="en-US" smtClean="0"/>
-              <a:t>8/2/2021</a:t>
+              <a:t>8/3/2021</a:t>
             </a:fld>
             <a:endParaRPr lang="en-US"/>
           </a:p>
@@ -1971,7 +1972,7 @@
           <p:cNvPr id="4" name="Footer Placeholder 3">
             <a:extLst>
               <a:ext uri="{FF2B5EF4-FFF2-40B4-BE49-F238E27FC236}">
-                <a16:creationId xmlns:a16="http://schemas.microsoft.com/office/drawing/2014/main" xmlns="" id="{2861989B-F8E9-41FD-8E16-687424BCC266}"/>
+                <a16:creationId xmlns="" xmlns:a16="http://schemas.microsoft.com/office/drawing/2014/main" id="{2861989B-F8E9-41FD-8E16-687424BCC266}"/>
               </a:ext>
             </a:extLst>
           </p:cNvPr>
@@ -1996,7 +1997,7 @@
           <p:cNvPr id="5" name="Slide Number Placeholder 4">
             <a:extLst>
               <a:ext uri="{FF2B5EF4-FFF2-40B4-BE49-F238E27FC236}">
-                <a16:creationId xmlns:a16="http://schemas.microsoft.com/office/drawing/2014/main" xmlns="" id="{2026B6D7-7832-4815-95CE-5CEC39502825}"/>
+                <a16:creationId xmlns="" xmlns:a16="http://schemas.microsoft.com/office/drawing/2014/main" id="{2026B6D7-7832-4815-95CE-5CEC39502825}"/>
               </a:ext>
             </a:extLst>
           </p:cNvPr>
@@ -2055,7 +2056,7 @@
           <p:cNvPr id="2" name="Date Placeholder 1">
             <a:extLst>
               <a:ext uri="{FF2B5EF4-FFF2-40B4-BE49-F238E27FC236}">
-                <a16:creationId xmlns:a16="http://schemas.microsoft.com/office/drawing/2014/main" xmlns="" id="{9877919A-C4B6-46FD-A08A-9A4B867FE01A}"/>
+                <a16:creationId xmlns="" xmlns:a16="http://schemas.microsoft.com/office/drawing/2014/main" id="{9877919A-C4B6-46FD-A08A-9A4B867FE01A}"/>
               </a:ext>
             </a:extLst>
           </p:cNvPr>
@@ -2073,7 +2074,7 @@
           <a:p>
             <a:fld id="{6C733091-19F0-4DD7-90FE-000B4789B4CF}" type="datetimeFigureOut">
               <a:rPr lang="en-US" smtClean="0"/>
-              <a:t>8/2/2021</a:t>
+              <a:t>8/3/2021</a:t>
             </a:fld>
             <a:endParaRPr lang="en-US"/>
           </a:p>
@@ -2084,7 +2085,7 @@
           <p:cNvPr id="3" name="Footer Placeholder 2">
             <a:extLst>
               <a:ext uri="{FF2B5EF4-FFF2-40B4-BE49-F238E27FC236}">
-                <a16:creationId xmlns:a16="http://schemas.microsoft.com/office/drawing/2014/main" xmlns="" id="{9118539E-383C-4F1C-86F2-14C533A7E9FB}"/>
+                <a16:creationId xmlns="" xmlns:a16="http://schemas.microsoft.com/office/drawing/2014/main" id="{9118539E-383C-4F1C-86F2-14C533A7E9FB}"/>
               </a:ext>
             </a:extLst>
           </p:cNvPr>
@@ -2109,7 +2110,7 @@
           <p:cNvPr id="4" name="Slide Number Placeholder 3">
             <a:extLst>
               <a:ext uri="{FF2B5EF4-FFF2-40B4-BE49-F238E27FC236}">
-                <a16:creationId xmlns:a16="http://schemas.microsoft.com/office/drawing/2014/main" xmlns="" id="{C9A6D4E1-CA83-4214-9942-9E4617AA89BF}"/>
+                <a16:creationId xmlns="" xmlns:a16="http://schemas.microsoft.com/office/drawing/2014/main" id="{C9A6D4E1-CA83-4214-9942-9E4617AA89BF}"/>
               </a:ext>
             </a:extLst>
           </p:cNvPr>
@@ -2168,7 +2169,7 @@
           <p:cNvPr id="2" name="Title 1">
             <a:extLst>
               <a:ext uri="{FF2B5EF4-FFF2-40B4-BE49-F238E27FC236}">
-                <a16:creationId xmlns:a16="http://schemas.microsoft.com/office/drawing/2014/main" xmlns="" id="{046EF9B5-7A2A-4225-8817-86D028D6950C}"/>
+                <a16:creationId xmlns="" xmlns:a16="http://schemas.microsoft.com/office/drawing/2014/main" id="{046EF9B5-7A2A-4225-8817-86D028D6950C}"/>
               </a:ext>
             </a:extLst>
           </p:cNvPr>
@@ -2205,7 +2206,7 @@
           <p:cNvPr id="3" name="Content Placeholder 2">
             <a:extLst>
               <a:ext uri="{FF2B5EF4-FFF2-40B4-BE49-F238E27FC236}">
-                <a16:creationId xmlns:a16="http://schemas.microsoft.com/office/drawing/2014/main" xmlns="" id="{8667C390-5297-41E8-A403-22856007B051}"/>
+                <a16:creationId xmlns="" xmlns:a16="http://schemas.microsoft.com/office/drawing/2014/main" id="{8667C390-5297-41E8-A403-22856007B051}"/>
               </a:ext>
             </a:extLst>
           </p:cNvPr>
@@ -2295,7 +2296,7 @@
           <p:cNvPr id="4" name="Text Placeholder 3">
             <a:extLst>
               <a:ext uri="{FF2B5EF4-FFF2-40B4-BE49-F238E27FC236}">
-                <a16:creationId xmlns:a16="http://schemas.microsoft.com/office/drawing/2014/main" xmlns="" id="{8D0D2F7D-D6CD-4AB1-A3EA-CBFD2A2B3703}"/>
+                <a16:creationId xmlns="" xmlns:a16="http://schemas.microsoft.com/office/drawing/2014/main" id="{8D0D2F7D-D6CD-4AB1-A3EA-CBFD2A2B3703}"/>
               </a:ext>
             </a:extLst>
           </p:cNvPr>
@@ -2366,7 +2367,7 @@
           <p:cNvPr id="5" name="Date Placeholder 4">
             <a:extLst>
               <a:ext uri="{FF2B5EF4-FFF2-40B4-BE49-F238E27FC236}">
-                <a16:creationId xmlns:a16="http://schemas.microsoft.com/office/drawing/2014/main" xmlns="" id="{E17A441D-4FA7-4110-BF24-165CD3C3DAD7}"/>
+                <a16:creationId xmlns="" xmlns:a16="http://schemas.microsoft.com/office/drawing/2014/main" id="{E17A441D-4FA7-4110-BF24-165CD3C3DAD7}"/>
               </a:ext>
             </a:extLst>
           </p:cNvPr>
@@ -2384,7 +2385,7 @@
           <a:p>
             <a:fld id="{6C733091-19F0-4DD7-90FE-000B4789B4CF}" type="datetimeFigureOut">
               <a:rPr lang="en-US" smtClean="0"/>
-              <a:t>8/2/2021</a:t>
+              <a:t>8/3/2021</a:t>
             </a:fld>
             <a:endParaRPr lang="en-US"/>
           </a:p>
@@ -2395,7 +2396,7 @@
           <p:cNvPr id="6" name="Footer Placeholder 5">
             <a:extLst>
               <a:ext uri="{FF2B5EF4-FFF2-40B4-BE49-F238E27FC236}">
-                <a16:creationId xmlns:a16="http://schemas.microsoft.com/office/drawing/2014/main" xmlns="" id="{346102C5-5AE3-43CF-A686-1AB72B0790AB}"/>
+                <a16:creationId xmlns="" xmlns:a16="http://schemas.microsoft.com/office/drawing/2014/main" id="{346102C5-5AE3-43CF-A686-1AB72B0790AB}"/>
               </a:ext>
             </a:extLst>
           </p:cNvPr>
@@ -2420,7 +2421,7 @@
           <p:cNvPr id="7" name="Slide Number Placeholder 6">
             <a:extLst>
               <a:ext uri="{FF2B5EF4-FFF2-40B4-BE49-F238E27FC236}">
-                <a16:creationId xmlns:a16="http://schemas.microsoft.com/office/drawing/2014/main" xmlns="" id="{5528B3F7-462C-4500-8836-B3E5CD8DA61A}"/>
+                <a16:creationId xmlns="" xmlns:a16="http://schemas.microsoft.com/office/drawing/2014/main" id="{5528B3F7-462C-4500-8836-B3E5CD8DA61A}"/>
               </a:ext>
             </a:extLst>
           </p:cNvPr>
@@ -2479,7 +2480,7 @@
           <p:cNvPr id="2" name="Title 1">
             <a:extLst>
               <a:ext uri="{FF2B5EF4-FFF2-40B4-BE49-F238E27FC236}">
-                <a16:creationId xmlns:a16="http://schemas.microsoft.com/office/drawing/2014/main" xmlns="" id="{4BA10E59-DA48-4690-A956-9EB8E4E11EE5}"/>
+                <a16:creationId xmlns="" xmlns:a16="http://schemas.microsoft.com/office/drawing/2014/main" id="{4BA10E59-DA48-4690-A956-9EB8E4E11EE5}"/>
               </a:ext>
             </a:extLst>
           </p:cNvPr>
@@ -2516,7 +2517,7 @@
           <p:cNvPr id="3" name="Picture Placeholder 2">
             <a:extLst>
               <a:ext uri="{FF2B5EF4-FFF2-40B4-BE49-F238E27FC236}">
-                <a16:creationId xmlns:a16="http://schemas.microsoft.com/office/drawing/2014/main" xmlns="" id="{AC7AFE1E-67D1-4106-97CA-98302D42CC4D}"/>
+                <a16:creationId xmlns="" xmlns:a16="http://schemas.microsoft.com/office/drawing/2014/main" id="{AC7AFE1E-67D1-4106-97CA-98302D42CC4D}"/>
               </a:ext>
             </a:extLst>
           </p:cNvPr>
@@ -2583,7 +2584,7 @@
           <p:cNvPr id="4" name="Text Placeholder 3">
             <a:extLst>
               <a:ext uri="{FF2B5EF4-FFF2-40B4-BE49-F238E27FC236}">
-                <a16:creationId xmlns:a16="http://schemas.microsoft.com/office/drawing/2014/main" xmlns="" id="{67D8D73B-3D4D-42A7-9A3C-1D508E8A9B45}"/>
+                <a16:creationId xmlns="" xmlns:a16="http://schemas.microsoft.com/office/drawing/2014/main" id="{67D8D73B-3D4D-42A7-9A3C-1D508E8A9B45}"/>
               </a:ext>
             </a:extLst>
           </p:cNvPr>
@@ -2654,7 +2655,7 @@
           <p:cNvPr id="5" name="Date Placeholder 4">
             <a:extLst>
               <a:ext uri="{FF2B5EF4-FFF2-40B4-BE49-F238E27FC236}">
-                <a16:creationId xmlns:a16="http://schemas.microsoft.com/office/drawing/2014/main" xmlns="" id="{48C8945E-A47A-42A2-9DF6-CA6D5002F65F}"/>
+                <a16:creationId xmlns="" xmlns:a16="http://schemas.microsoft.com/office/drawing/2014/main" id="{48C8945E-A47A-42A2-9DF6-CA6D5002F65F}"/>
               </a:ext>
             </a:extLst>
           </p:cNvPr>
@@ -2672,7 +2673,7 @@
           <a:p>
             <a:fld id="{6C733091-19F0-4DD7-90FE-000B4789B4CF}" type="datetimeFigureOut">
               <a:rPr lang="en-US" smtClean="0"/>
-              <a:t>8/2/2021</a:t>
+              <a:t>8/3/2021</a:t>
             </a:fld>
             <a:endParaRPr lang="en-US"/>
           </a:p>
@@ -2683,7 +2684,7 @@
           <p:cNvPr id="6" name="Footer Placeholder 5">
             <a:extLst>
               <a:ext uri="{FF2B5EF4-FFF2-40B4-BE49-F238E27FC236}">
-                <a16:creationId xmlns:a16="http://schemas.microsoft.com/office/drawing/2014/main" xmlns="" id="{EB000DB4-2747-4297-B400-42A539FBDB42}"/>
+                <a16:creationId xmlns="" xmlns:a16="http://schemas.microsoft.com/office/drawing/2014/main" id="{EB000DB4-2747-4297-B400-42A539FBDB42}"/>
               </a:ext>
             </a:extLst>
           </p:cNvPr>
@@ -2708,7 +2709,7 @@
           <p:cNvPr id="7" name="Slide Number Placeholder 6">
             <a:extLst>
               <a:ext uri="{FF2B5EF4-FFF2-40B4-BE49-F238E27FC236}">
-                <a16:creationId xmlns:a16="http://schemas.microsoft.com/office/drawing/2014/main" xmlns="" id="{5BAD9222-F141-4803-AF73-E2DD92E2ABBC}"/>
+                <a16:creationId xmlns="" xmlns:a16="http://schemas.microsoft.com/office/drawing/2014/main" id="{5BAD9222-F141-4803-AF73-E2DD92E2ABBC}"/>
               </a:ext>
             </a:extLst>
           </p:cNvPr>
@@ -2772,7 +2773,7 @@
           <p:cNvPr id="2" name="Title Placeholder 1">
             <a:extLst>
               <a:ext uri="{FF2B5EF4-FFF2-40B4-BE49-F238E27FC236}">
-                <a16:creationId xmlns:a16="http://schemas.microsoft.com/office/drawing/2014/main" xmlns="" id="{5BF9D404-795C-4EA4-AD01-26740519239C}"/>
+                <a16:creationId xmlns="" xmlns:a16="http://schemas.microsoft.com/office/drawing/2014/main" id="{5BF9D404-795C-4EA4-AD01-26740519239C}"/>
               </a:ext>
             </a:extLst>
           </p:cNvPr>
@@ -2810,7 +2811,7 @@
           <p:cNvPr id="3" name="Text Placeholder 2">
             <a:extLst>
               <a:ext uri="{FF2B5EF4-FFF2-40B4-BE49-F238E27FC236}">
-                <a16:creationId xmlns:a16="http://schemas.microsoft.com/office/drawing/2014/main" xmlns="" id="{DE3FEC7B-48F8-4348-9BC6-68F83B859EE9}"/>
+                <a16:creationId xmlns="" xmlns:a16="http://schemas.microsoft.com/office/drawing/2014/main" id="{DE3FEC7B-48F8-4348-9BC6-68F83B859EE9}"/>
               </a:ext>
             </a:extLst>
           </p:cNvPr>
@@ -2877,7 +2878,7 @@
           <p:cNvPr id="4" name="Date Placeholder 3">
             <a:extLst>
               <a:ext uri="{FF2B5EF4-FFF2-40B4-BE49-F238E27FC236}">
-                <a16:creationId xmlns:a16="http://schemas.microsoft.com/office/drawing/2014/main" xmlns="" id="{31CA1A1D-E2F5-4161-A025-7B911965C2FE}"/>
+                <a16:creationId xmlns="" xmlns:a16="http://schemas.microsoft.com/office/drawing/2014/main" id="{31CA1A1D-E2F5-4161-A025-7B911965C2FE}"/>
               </a:ext>
             </a:extLst>
           </p:cNvPr>
@@ -2913,7 +2914,7 @@
           <a:p>
             <a:fld id="{6C733091-19F0-4DD7-90FE-000B4789B4CF}" type="datetimeFigureOut">
               <a:rPr lang="en-US" smtClean="0"/>
-              <a:t>8/2/2021</a:t>
+              <a:t>8/3/2021</a:t>
             </a:fld>
             <a:endParaRPr lang="en-US"/>
           </a:p>
@@ -2924,7 +2925,7 @@
           <p:cNvPr id="5" name="Footer Placeholder 4">
             <a:extLst>
               <a:ext uri="{FF2B5EF4-FFF2-40B4-BE49-F238E27FC236}">
-                <a16:creationId xmlns:a16="http://schemas.microsoft.com/office/drawing/2014/main" xmlns="" id="{43C7B926-18F3-4C13-AB92-764E10D324FB}"/>
+                <a16:creationId xmlns="" xmlns:a16="http://schemas.microsoft.com/office/drawing/2014/main" id="{43C7B926-18F3-4C13-AB92-764E10D324FB}"/>
               </a:ext>
             </a:extLst>
           </p:cNvPr>
@@ -2967,7 +2968,7 @@
           <p:cNvPr id="6" name="Slide Number Placeholder 5">
             <a:extLst>
               <a:ext uri="{FF2B5EF4-FFF2-40B4-BE49-F238E27FC236}">
-                <a16:creationId xmlns:a16="http://schemas.microsoft.com/office/drawing/2014/main" xmlns="" id="{734FA846-3BF6-46FD-80CF-34B300D244C0}"/>
+                <a16:creationId xmlns="" xmlns:a16="http://schemas.microsoft.com/office/drawing/2014/main" id="{734FA846-3BF6-46FD-80CF-34B300D244C0}"/>
               </a:ext>
             </a:extLst>
           </p:cNvPr>
@@ -3335,7 +3336,7 @@
           <p:cNvPr id="4" name="Rectangle 3">
             <a:extLst>
               <a:ext uri="{FF2B5EF4-FFF2-40B4-BE49-F238E27FC236}">
-                <a16:creationId xmlns:a16="http://schemas.microsoft.com/office/drawing/2014/main" xmlns="" id="{0A71868C-EF96-4004-8116-DFD1FCCEE6C3}"/>
+                <a16:creationId xmlns="" xmlns:a16="http://schemas.microsoft.com/office/drawing/2014/main" id="{0A71868C-EF96-4004-8116-DFD1FCCEE6C3}"/>
               </a:ext>
             </a:extLst>
           </p:cNvPr>
@@ -3391,7 +3392,7 @@
           <p:cNvPr id="5" name="Rectangle 4">
             <a:extLst>
               <a:ext uri="{FF2B5EF4-FFF2-40B4-BE49-F238E27FC236}">
-                <a16:creationId xmlns:a16="http://schemas.microsoft.com/office/drawing/2014/main" xmlns="" id="{67A88ADC-D070-420B-9A88-FDBA4865856A}"/>
+                <a16:creationId xmlns="" xmlns:a16="http://schemas.microsoft.com/office/drawing/2014/main" id="{67A88ADC-D070-420B-9A88-FDBA4865856A}"/>
               </a:ext>
             </a:extLst>
           </p:cNvPr>
@@ -3451,7 +3452,7 @@
           <p:cNvPr id="7" name="Straight Arrow Connector 6">
             <a:extLst>
               <a:ext uri="{FF2B5EF4-FFF2-40B4-BE49-F238E27FC236}">
-                <a16:creationId xmlns:a16="http://schemas.microsoft.com/office/drawing/2014/main" xmlns="" id="{45AD00B6-B022-4C7F-A523-E16E6292918D}"/>
+                <a16:creationId xmlns="" xmlns:a16="http://schemas.microsoft.com/office/drawing/2014/main" id="{45AD00B6-B022-4C7F-A523-E16E6292918D}"/>
               </a:ext>
             </a:extLst>
           </p:cNvPr>
@@ -3493,7 +3494,7 @@
           <p:cNvPr id="8" name="Rectangle 7">
             <a:extLst>
               <a:ext uri="{FF2B5EF4-FFF2-40B4-BE49-F238E27FC236}">
-                <a16:creationId xmlns:a16="http://schemas.microsoft.com/office/drawing/2014/main" xmlns="" id="{3C7A2B3E-B0CA-48CD-A6CB-935EF9D71843}"/>
+                <a16:creationId xmlns="" xmlns:a16="http://schemas.microsoft.com/office/drawing/2014/main" id="{3C7A2B3E-B0CA-48CD-A6CB-935EF9D71843}"/>
               </a:ext>
             </a:extLst>
           </p:cNvPr>
@@ -3553,7 +3554,7 @@
           <p:cNvPr id="9" name="TextBox 8">
             <a:extLst>
               <a:ext uri="{FF2B5EF4-FFF2-40B4-BE49-F238E27FC236}">
-                <a16:creationId xmlns:a16="http://schemas.microsoft.com/office/drawing/2014/main" xmlns="" id="{ABD7B54F-357C-489B-ADE1-DFA04BEA1686}"/>
+                <a16:creationId xmlns="" xmlns:a16="http://schemas.microsoft.com/office/drawing/2014/main" id="{ABD7B54F-357C-489B-ADE1-DFA04BEA1686}"/>
               </a:ext>
             </a:extLst>
           </p:cNvPr>
@@ -3588,7 +3589,7 @@
           <p:cNvPr id="10" name="Rectangle 9">
             <a:extLst>
               <a:ext uri="{FF2B5EF4-FFF2-40B4-BE49-F238E27FC236}">
-                <a16:creationId xmlns:a16="http://schemas.microsoft.com/office/drawing/2014/main" xmlns="" id="{21B869D6-66CB-4B38-975F-B7FEB6AA9B13}"/>
+                <a16:creationId xmlns="" xmlns:a16="http://schemas.microsoft.com/office/drawing/2014/main" id="{21B869D6-66CB-4B38-975F-B7FEB6AA9B13}"/>
               </a:ext>
             </a:extLst>
           </p:cNvPr>
@@ -3637,7 +3638,7 @@
           <p:cNvPr id="12" name="Straight Arrow Connector 11">
             <a:extLst>
               <a:ext uri="{FF2B5EF4-FFF2-40B4-BE49-F238E27FC236}">
-                <a16:creationId xmlns:a16="http://schemas.microsoft.com/office/drawing/2014/main" xmlns="" id="{78CBB1AB-C0E2-40F2-828D-F209304958AC}"/>
+                <a16:creationId xmlns="" xmlns:a16="http://schemas.microsoft.com/office/drawing/2014/main" id="{78CBB1AB-C0E2-40F2-828D-F209304958AC}"/>
               </a:ext>
             </a:extLst>
           </p:cNvPr>
@@ -3680,7 +3681,7 @@
           <p:cNvPr id="14" name="TextBox 13">
             <a:extLst>
               <a:ext uri="{FF2B5EF4-FFF2-40B4-BE49-F238E27FC236}">
-                <a16:creationId xmlns:a16="http://schemas.microsoft.com/office/drawing/2014/main" xmlns="" id="{E0BBD6C8-C8F2-40C5-AA64-85961A11ADC2}"/>
+                <a16:creationId xmlns="" xmlns:a16="http://schemas.microsoft.com/office/drawing/2014/main" id="{E0BBD6C8-C8F2-40C5-AA64-85961A11ADC2}"/>
               </a:ext>
             </a:extLst>
           </p:cNvPr>
@@ -3715,7 +3716,7 @@
           <p:cNvPr id="16" name="Straight Arrow Connector 15">
             <a:extLst>
               <a:ext uri="{FF2B5EF4-FFF2-40B4-BE49-F238E27FC236}">
-                <a16:creationId xmlns:a16="http://schemas.microsoft.com/office/drawing/2014/main" xmlns="" id="{22509349-F226-482F-AC14-E28C2411C4C3}"/>
+                <a16:creationId xmlns="" xmlns:a16="http://schemas.microsoft.com/office/drawing/2014/main" id="{22509349-F226-482F-AC14-E28C2411C4C3}"/>
               </a:ext>
             </a:extLst>
           </p:cNvPr>
@@ -3758,7 +3759,7 @@
           <p:cNvPr id="18" name="TextBox 17">
             <a:extLst>
               <a:ext uri="{FF2B5EF4-FFF2-40B4-BE49-F238E27FC236}">
-                <a16:creationId xmlns:a16="http://schemas.microsoft.com/office/drawing/2014/main" xmlns="" id="{E2DE2503-050C-47C3-BC73-C61D89CEB131}"/>
+                <a16:creationId xmlns="" xmlns:a16="http://schemas.microsoft.com/office/drawing/2014/main" id="{E2DE2503-050C-47C3-BC73-C61D89CEB131}"/>
               </a:ext>
             </a:extLst>
           </p:cNvPr>
@@ -3793,7 +3794,7 @@
           <p:cNvPr id="23" name="Straight Arrow Connector 22">
             <a:extLst>
               <a:ext uri="{FF2B5EF4-FFF2-40B4-BE49-F238E27FC236}">
-                <a16:creationId xmlns:a16="http://schemas.microsoft.com/office/drawing/2014/main" xmlns="" id="{5D314D83-3A56-4BD7-B215-19DEE4ED8C0B}"/>
+                <a16:creationId xmlns="" xmlns:a16="http://schemas.microsoft.com/office/drawing/2014/main" id="{5D314D83-3A56-4BD7-B215-19DEE4ED8C0B}"/>
               </a:ext>
             </a:extLst>
           </p:cNvPr>
@@ -3836,7 +3837,7 @@
           <p:cNvPr id="24" name="Straight Arrow Connector 23">
             <a:extLst>
               <a:ext uri="{FF2B5EF4-FFF2-40B4-BE49-F238E27FC236}">
-                <a16:creationId xmlns:a16="http://schemas.microsoft.com/office/drawing/2014/main" xmlns="" id="{874E7075-4C88-4378-99B9-DC474BE0CE65}"/>
+                <a16:creationId xmlns="" xmlns:a16="http://schemas.microsoft.com/office/drawing/2014/main" id="{874E7075-4C88-4378-99B9-DC474BE0CE65}"/>
               </a:ext>
             </a:extLst>
           </p:cNvPr>
@@ -3879,7 +3880,7 @@
           <p:cNvPr id="25" name="TextBox 24">
             <a:extLst>
               <a:ext uri="{FF2B5EF4-FFF2-40B4-BE49-F238E27FC236}">
-                <a16:creationId xmlns:a16="http://schemas.microsoft.com/office/drawing/2014/main" xmlns="" id="{171D93A1-C181-4F9C-8D75-C106DB531AB7}"/>
+                <a16:creationId xmlns="" xmlns:a16="http://schemas.microsoft.com/office/drawing/2014/main" id="{171D93A1-C181-4F9C-8D75-C106DB531AB7}"/>
               </a:ext>
             </a:extLst>
           </p:cNvPr>
@@ -3914,7 +3915,7 @@
           <p:cNvPr id="26" name="TextBox 25">
             <a:extLst>
               <a:ext uri="{FF2B5EF4-FFF2-40B4-BE49-F238E27FC236}">
-                <a16:creationId xmlns:a16="http://schemas.microsoft.com/office/drawing/2014/main" xmlns="" id="{03EAB749-77B2-435B-A0A3-02060FD4A06F}"/>
+                <a16:creationId xmlns="" xmlns:a16="http://schemas.microsoft.com/office/drawing/2014/main" id="{03EAB749-77B2-435B-A0A3-02060FD4A06F}"/>
               </a:ext>
             </a:extLst>
           </p:cNvPr>
@@ -3949,7 +3950,7 @@
           <p:cNvPr id="27" name="TextBox 26">
             <a:extLst>
               <a:ext uri="{FF2B5EF4-FFF2-40B4-BE49-F238E27FC236}">
-                <a16:creationId xmlns:a16="http://schemas.microsoft.com/office/drawing/2014/main" xmlns="" id="{7D8414B9-747D-41E7-A06D-8BBA5042C15C}"/>
+                <a16:creationId xmlns="" xmlns:a16="http://schemas.microsoft.com/office/drawing/2014/main" id="{7D8414B9-747D-41E7-A06D-8BBA5042C15C}"/>
               </a:ext>
             </a:extLst>
           </p:cNvPr>
@@ -3984,7 +3985,7 @@
           <p:cNvPr id="28" name="TextBox 27">
             <a:extLst>
               <a:ext uri="{FF2B5EF4-FFF2-40B4-BE49-F238E27FC236}">
-                <a16:creationId xmlns:a16="http://schemas.microsoft.com/office/drawing/2014/main" xmlns="" id="{F559714E-416D-4742-9901-ADC4D8BAC5FA}"/>
+                <a16:creationId xmlns="" xmlns:a16="http://schemas.microsoft.com/office/drawing/2014/main" id="{F559714E-416D-4742-9901-ADC4D8BAC5FA}"/>
               </a:ext>
             </a:extLst>
           </p:cNvPr>
@@ -4019,7 +4020,7 @@
           <p:cNvPr id="31" name="Rectangle 30">
             <a:extLst>
               <a:ext uri="{FF2B5EF4-FFF2-40B4-BE49-F238E27FC236}">
-                <a16:creationId xmlns:a16="http://schemas.microsoft.com/office/drawing/2014/main" xmlns="" id="{9061AF07-38B9-4B05-B6B2-1A74D7C0C618}"/>
+                <a16:creationId xmlns="" xmlns:a16="http://schemas.microsoft.com/office/drawing/2014/main" id="{9061AF07-38B9-4B05-B6B2-1A74D7C0C618}"/>
               </a:ext>
             </a:extLst>
           </p:cNvPr>
@@ -4079,7 +4080,7 @@
           <p:cNvPr id="33" name="Connector: Elbow 32">
             <a:extLst>
               <a:ext uri="{FF2B5EF4-FFF2-40B4-BE49-F238E27FC236}">
-                <a16:creationId xmlns:a16="http://schemas.microsoft.com/office/drawing/2014/main" xmlns="" id="{B367C937-E98B-4009-B48E-DBF7102DCFD1}"/>
+                <a16:creationId xmlns="" xmlns:a16="http://schemas.microsoft.com/office/drawing/2014/main" id="{B367C937-E98B-4009-B48E-DBF7102DCFD1}"/>
               </a:ext>
             </a:extLst>
           </p:cNvPr>
@@ -4121,7 +4122,7 @@
           <p:cNvPr id="34" name="TextBox 33">
             <a:extLst>
               <a:ext uri="{FF2B5EF4-FFF2-40B4-BE49-F238E27FC236}">
-                <a16:creationId xmlns:a16="http://schemas.microsoft.com/office/drawing/2014/main" xmlns="" id="{7FC33359-8BE1-4CD9-AD98-06C75CE8FF08}"/>
+                <a16:creationId xmlns="" xmlns:a16="http://schemas.microsoft.com/office/drawing/2014/main" id="{7FC33359-8BE1-4CD9-AD98-06C75CE8FF08}"/>
               </a:ext>
             </a:extLst>
           </p:cNvPr>
@@ -4156,7 +4157,7 @@
           <p:cNvPr id="35" name="Rectangle 34">
             <a:extLst>
               <a:ext uri="{FF2B5EF4-FFF2-40B4-BE49-F238E27FC236}">
-                <a16:creationId xmlns:a16="http://schemas.microsoft.com/office/drawing/2014/main" xmlns="" id="{85531841-C806-4F00-B17D-D19E7CE1C155}"/>
+                <a16:creationId xmlns="" xmlns:a16="http://schemas.microsoft.com/office/drawing/2014/main" id="{85531841-C806-4F00-B17D-D19E7CE1C155}"/>
               </a:ext>
             </a:extLst>
           </p:cNvPr>
@@ -4215,7 +4216,7 @@
           <p:cNvPr id="37" name="Connector: Elbow 36">
             <a:extLst>
               <a:ext uri="{FF2B5EF4-FFF2-40B4-BE49-F238E27FC236}">
-                <a16:creationId xmlns:a16="http://schemas.microsoft.com/office/drawing/2014/main" xmlns="" id="{1BFE62EC-0F5D-4135-832D-63D5DC95509C}"/>
+                <a16:creationId xmlns="" xmlns:a16="http://schemas.microsoft.com/office/drawing/2014/main" id="{1BFE62EC-0F5D-4135-832D-63D5DC95509C}"/>
               </a:ext>
             </a:extLst>
           </p:cNvPr>
@@ -4260,7 +4261,7 @@
           <p:cNvPr id="38" name="TextBox 37">
             <a:extLst>
               <a:ext uri="{FF2B5EF4-FFF2-40B4-BE49-F238E27FC236}">
-                <a16:creationId xmlns:a16="http://schemas.microsoft.com/office/drawing/2014/main" xmlns="" id="{892D5E6B-E445-4560-9C01-6D3C52FFC5AA}"/>
+                <a16:creationId xmlns="" xmlns:a16="http://schemas.microsoft.com/office/drawing/2014/main" id="{892D5E6B-E445-4560-9C01-6D3C52FFC5AA}"/>
               </a:ext>
             </a:extLst>
           </p:cNvPr>
@@ -4295,7 +4296,7 @@
           <p:cNvPr id="39" name="Rectangle 38">
             <a:extLst>
               <a:ext uri="{FF2B5EF4-FFF2-40B4-BE49-F238E27FC236}">
-                <a16:creationId xmlns:a16="http://schemas.microsoft.com/office/drawing/2014/main" xmlns="" id="{2F2BC059-EF97-4BEE-8F18-133838E3F2D8}"/>
+                <a16:creationId xmlns="" xmlns:a16="http://schemas.microsoft.com/office/drawing/2014/main" id="{2F2BC059-EF97-4BEE-8F18-133838E3F2D8}"/>
               </a:ext>
             </a:extLst>
           </p:cNvPr>
@@ -4344,7 +4345,7 @@
           <p:cNvPr id="44" name="TextBox 43">
             <a:extLst>
               <a:ext uri="{FF2B5EF4-FFF2-40B4-BE49-F238E27FC236}">
-                <a16:creationId xmlns:a16="http://schemas.microsoft.com/office/drawing/2014/main" xmlns="" id="{48B10C1F-BA7F-40E8-B79A-E87D7A3A66AB}"/>
+                <a16:creationId xmlns="" xmlns:a16="http://schemas.microsoft.com/office/drawing/2014/main" id="{48B10C1F-BA7F-40E8-B79A-E87D7A3A66AB}"/>
               </a:ext>
             </a:extLst>
           </p:cNvPr>
@@ -4565,7 +4566,7 @@
           <p:cNvPr id="11" name="TextBox 10">
             <a:extLst>
               <a:ext uri="{FF2B5EF4-FFF2-40B4-BE49-F238E27FC236}">
-                <a16:creationId xmlns:a16="http://schemas.microsoft.com/office/drawing/2014/main" xmlns="" id="{E0BBD6C8-C8F2-40C5-AA64-85961A11ADC2}"/>
+                <a16:creationId xmlns="" xmlns:a16="http://schemas.microsoft.com/office/drawing/2014/main" id="{E0BBD6C8-C8F2-40C5-AA64-85961A11ADC2}"/>
               </a:ext>
             </a:extLst>
           </p:cNvPr>
@@ -4694,7 +4695,7 @@
           <p:cNvPr id="19" name="TextBox 18">
             <a:extLst>
               <a:ext uri="{FF2B5EF4-FFF2-40B4-BE49-F238E27FC236}">
-                <a16:creationId xmlns:a16="http://schemas.microsoft.com/office/drawing/2014/main" xmlns="" id="{E0BBD6C8-C8F2-40C5-AA64-85961A11ADC2}"/>
+                <a16:creationId xmlns="" xmlns:a16="http://schemas.microsoft.com/office/drawing/2014/main" id="{E0BBD6C8-C8F2-40C5-AA64-85961A11ADC2}"/>
               </a:ext>
             </a:extLst>
           </p:cNvPr>
@@ -4817,7 +4818,7 @@
           <p:cNvPr id="23" name="TextBox 22">
             <a:extLst>
               <a:ext uri="{FF2B5EF4-FFF2-40B4-BE49-F238E27FC236}">
-                <a16:creationId xmlns:a16="http://schemas.microsoft.com/office/drawing/2014/main" xmlns="" id="{E0BBD6C8-C8F2-40C5-AA64-85961A11ADC2}"/>
+                <a16:creationId xmlns="" xmlns:a16="http://schemas.microsoft.com/office/drawing/2014/main" id="{E0BBD6C8-C8F2-40C5-AA64-85961A11ADC2}"/>
               </a:ext>
             </a:extLst>
           </p:cNvPr>
@@ -4937,7 +4938,7 @@
           <p:cNvPr id="28" name="TextBox 27">
             <a:extLst>
               <a:ext uri="{FF2B5EF4-FFF2-40B4-BE49-F238E27FC236}">
-                <a16:creationId xmlns:a16="http://schemas.microsoft.com/office/drawing/2014/main" xmlns="" id="{E0BBD6C8-C8F2-40C5-AA64-85961A11ADC2}"/>
+                <a16:creationId xmlns="" xmlns:a16="http://schemas.microsoft.com/office/drawing/2014/main" id="{E0BBD6C8-C8F2-40C5-AA64-85961A11ADC2}"/>
               </a:ext>
             </a:extLst>
           </p:cNvPr>
@@ -5066,7 +5067,7 @@
           <p:cNvPr id="34" name="TextBox 33">
             <a:extLst>
               <a:ext uri="{FF2B5EF4-FFF2-40B4-BE49-F238E27FC236}">
-                <a16:creationId xmlns:a16="http://schemas.microsoft.com/office/drawing/2014/main" xmlns="" id="{E0BBD6C8-C8F2-40C5-AA64-85961A11ADC2}"/>
+                <a16:creationId xmlns="" xmlns:a16="http://schemas.microsoft.com/office/drawing/2014/main" id="{E0BBD6C8-C8F2-40C5-AA64-85961A11ADC2}"/>
               </a:ext>
             </a:extLst>
           </p:cNvPr>
@@ -5200,7 +5201,7 @@
           <p:cNvPr id="38" name="TextBox 37">
             <a:extLst>
               <a:ext uri="{FF2B5EF4-FFF2-40B4-BE49-F238E27FC236}">
-                <a16:creationId xmlns:a16="http://schemas.microsoft.com/office/drawing/2014/main" xmlns="" id="{E0BBD6C8-C8F2-40C5-AA64-85961A11ADC2}"/>
+                <a16:creationId xmlns="" xmlns:a16="http://schemas.microsoft.com/office/drawing/2014/main" id="{E0BBD6C8-C8F2-40C5-AA64-85961A11ADC2}"/>
               </a:ext>
             </a:extLst>
           </p:cNvPr>
@@ -5375,7 +5376,7 @@
           <p:cNvPr id="44" name="TextBox 43">
             <a:extLst>
               <a:ext uri="{FF2B5EF4-FFF2-40B4-BE49-F238E27FC236}">
-                <a16:creationId xmlns:a16="http://schemas.microsoft.com/office/drawing/2014/main" xmlns="" id="{E0BBD6C8-C8F2-40C5-AA64-85961A11ADC2}"/>
+                <a16:creationId xmlns="" xmlns:a16="http://schemas.microsoft.com/office/drawing/2014/main" id="{E0BBD6C8-C8F2-40C5-AA64-85961A11ADC2}"/>
               </a:ext>
             </a:extLst>
           </p:cNvPr>
@@ -5410,7 +5411,7 @@
           <p:cNvPr id="45" name="TextBox 44">
             <a:extLst>
               <a:ext uri="{FF2B5EF4-FFF2-40B4-BE49-F238E27FC236}">
-                <a16:creationId xmlns:a16="http://schemas.microsoft.com/office/drawing/2014/main" xmlns="" id="{E0BBD6C8-C8F2-40C5-AA64-85961A11ADC2}"/>
+                <a16:creationId xmlns="" xmlns:a16="http://schemas.microsoft.com/office/drawing/2014/main" id="{E0BBD6C8-C8F2-40C5-AA64-85961A11ADC2}"/>
               </a:ext>
             </a:extLst>
           </p:cNvPr>
@@ -5445,7 +5446,7 @@
           <p:cNvPr id="26" name="TextBox 25">
             <a:extLst>
               <a:ext uri="{FF2B5EF4-FFF2-40B4-BE49-F238E27FC236}">
-                <a16:creationId xmlns:a16="http://schemas.microsoft.com/office/drawing/2014/main" xmlns="" id="{70BF22D6-D5A2-4CCC-8E2D-329E25668556}"/>
+                <a16:creationId xmlns="" xmlns:a16="http://schemas.microsoft.com/office/drawing/2014/main" id="{70BF22D6-D5A2-4CCC-8E2D-329E25668556}"/>
               </a:ext>
             </a:extLst>
           </p:cNvPr>
@@ -5474,11 +5475,7 @@
             </a:r>
             <a:r>
               <a:rPr lang="en-US" dirty="0" smtClean="0"/>
-              <a:t>HTTP Exception</a:t>
-            </a:r>
-            <a:r>
-              <a:rPr lang="en-US" dirty="0" smtClean="0"/>
-              <a:t> </a:t>
+              <a:t>HTTP Exception </a:t>
             </a:r>
             <a:r>
               <a:rPr lang="en-US" dirty="0"/>
@@ -5672,7 +5669,7 @@
           <p:cNvPr id="11" name="TextBox 10">
             <a:extLst>
               <a:ext uri="{FF2B5EF4-FFF2-40B4-BE49-F238E27FC236}">
-                <a16:creationId xmlns:a16="http://schemas.microsoft.com/office/drawing/2014/main" xmlns="" id="{E0BBD6C8-C8F2-40C5-AA64-85961A11ADC2}"/>
+                <a16:creationId xmlns="" xmlns:a16="http://schemas.microsoft.com/office/drawing/2014/main" id="{E0BBD6C8-C8F2-40C5-AA64-85961A11ADC2}"/>
               </a:ext>
             </a:extLst>
           </p:cNvPr>
@@ -5806,7 +5803,7 @@
           <p:cNvPr id="19" name="TextBox 18">
             <a:extLst>
               <a:ext uri="{FF2B5EF4-FFF2-40B4-BE49-F238E27FC236}">
-                <a16:creationId xmlns:a16="http://schemas.microsoft.com/office/drawing/2014/main" xmlns="" id="{E0BBD6C8-C8F2-40C5-AA64-85961A11ADC2}"/>
+                <a16:creationId xmlns="" xmlns:a16="http://schemas.microsoft.com/office/drawing/2014/main" id="{E0BBD6C8-C8F2-40C5-AA64-85961A11ADC2}"/>
               </a:ext>
             </a:extLst>
           </p:cNvPr>
@@ -5928,7 +5925,7 @@
           <p:cNvPr id="23" name="TextBox 22">
             <a:extLst>
               <a:ext uri="{FF2B5EF4-FFF2-40B4-BE49-F238E27FC236}">
-                <a16:creationId xmlns:a16="http://schemas.microsoft.com/office/drawing/2014/main" xmlns="" id="{E0BBD6C8-C8F2-40C5-AA64-85961A11ADC2}"/>
+                <a16:creationId xmlns="" xmlns:a16="http://schemas.microsoft.com/office/drawing/2014/main" id="{E0BBD6C8-C8F2-40C5-AA64-85961A11ADC2}"/>
               </a:ext>
             </a:extLst>
           </p:cNvPr>
@@ -6042,7 +6039,7 @@
           <p:cNvPr id="28" name="TextBox 27">
             <a:extLst>
               <a:ext uri="{FF2B5EF4-FFF2-40B4-BE49-F238E27FC236}">
-                <a16:creationId xmlns:a16="http://schemas.microsoft.com/office/drawing/2014/main" xmlns="" id="{E0BBD6C8-C8F2-40C5-AA64-85961A11ADC2}"/>
+                <a16:creationId xmlns="" xmlns:a16="http://schemas.microsoft.com/office/drawing/2014/main" id="{E0BBD6C8-C8F2-40C5-AA64-85961A11ADC2}"/>
               </a:ext>
             </a:extLst>
           </p:cNvPr>
@@ -6163,7 +6160,7 @@
           <p:cNvPr id="34" name="TextBox 33">
             <a:extLst>
               <a:ext uri="{FF2B5EF4-FFF2-40B4-BE49-F238E27FC236}">
-                <a16:creationId xmlns:a16="http://schemas.microsoft.com/office/drawing/2014/main" xmlns="" id="{E0BBD6C8-C8F2-40C5-AA64-85961A11ADC2}"/>
+                <a16:creationId xmlns="" xmlns:a16="http://schemas.microsoft.com/office/drawing/2014/main" id="{E0BBD6C8-C8F2-40C5-AA64-85961A11ADC2}"/>
               </a:ext>
             </a:extLst>
           </p:cNvPr>
@@ -6290,7 +6287,7 @@
           <p:cNvPr id="38" name="TextBox 37">
             <a:extLst>
               <a:ext uri="{FF2B5EF4-FFF2-40B4-BE49-F238E27FC236}">
-                <a16:creationId xmlns:a16="http://schemas.microsoft.com/office/drawing/2014/main" xmlns="" id="{E0BBD6C8-C8F2-40C5-AA64-85961A11ADC2}"/>
+                <a16:creationId xmlns="" xmlns:a16="http://schemas.microsoft.com/office/drawing/2014/main" id="{E0BBD6C8-C8F2-40C5-AA64-85961A11ADC2}"/>
               </a:ext>
             </a:extLst>
           </p:cNvPr>
@@ -6454,7 +6451,7 @@
           <p:cNvPr id="44" name="TextBox 43">
             <a:extLst>
               <a:ext uri="{FF2B5EF4-FFF2-40B4-BE49-F238E27FC236}">
-                <a16:creationId xmlns:a16="http://schemas.microsoft.com/office/drawing/2014/main" xmlns="" id="{E0BBD6C8-C8F2-40C5-AA64-85961A11ADC2}"/>
+                <a16:creationId xmlns="" xmlns:a16="http://schemas.microsoft.com/office/drawing/2014/main" id="{E0BBD6C8-C8F2-40C5-AA64-85961A11ADC2}"/>
               </a:ext>
             </a:extLst>
           </p:cNvPr>
@@ -6489,7 +6486,7 @@
           <p:cNvPr id="45" name="TextBox 44">
             <a:extLst>
               <a:ext uri="{FF2B5EF4-FFF2-40B4-BE49-F238E27FC236}">
-                <a16:creationId xmlns:a16="http://schemas.microsoft.com/office/drawing/2014/main" xmlns="" id="{E0BBD6C8-C8F2-40C5-AA64-85961A11ADC2}"/>
+                <a16:creationId xmlns="" xmlns:a16="http://schemas.microsoft.com/office/drawing/2014/main" id="{E0BBD6C8-C8F2-40C5-AA64-85961A11ADC2}"/>
               </a:ext>
             </a:extLst>
           </p:cNvPr>
@@ -6524,7 +6521,7 @@
           <p:cNvPr id="26" name="TextBox 25">
             <a:extLst>
               <a:ext uri="{FF2B5EF4-FFF2-40B4-BE49-F238E27FC236}">
-                <a16:creationId xmlns:a16="http://schemas.microsoft.com/office/drawing/2014/main" xmlns="" id="{70BF22D6-D5A2-4CCC-8E2D-329E25668556}"/>
+                <a16:creationId xmlns="" xmlns:a16="http://schemas.microsoft.com/office/drawing/2014/main" id="{70BF22D6-D5A2-4CCC-8E2D-329E25668556}"/>
               </a:ext>
             </a:extLst>
           </p:cNvPr>
@@ -6692,9 +6689,10 @@
           <a:p>
             <a:pPr algn="ctr"/>
             <a:r>
-              <a:rPr lang="en-US" sz="1000" dirty="0"/>
-              <a:t>com.tlw8253.mode</a:t>
-            </a:r>
+              <a:rPr lang="en-US" sz="1000" dirty="0" smtClean="0"/>
+              <a:t>com.tlw8253.model</a:t>
+            </a:r>
+            <a:endParaRPr lang="en-US" sz="1000" dirty="0"/>
           </a:p>
           <a:p>
             <a:pPr algn="ctr"/>
@@ -6754,7 +6752,7 @@
           <p:cNvPr id="11" name="TextBox 10">
             <a:extLst>
               <a:ext uri="{FF2B5EF4-FFF2-40B4-BE49-F238E27FC236}">
-                <a16:creationId xmlns:a16="http://schemas.microsoft.com/office/drawing/2014/main" xmlns="" id="{E0BBD6C8-C8F2-40C5-AA64-85961A11ADC2}"/>
+                <a16:creationId xmlns="" xmlns:a16="http://schemas.microsoft.com/office/drawing/2014/main" id="{E0BBD6C8-C8F2-40C5-AA64-85961A11ADC2}"/>
               </a:ext>
             </a:extLst>
           </p:cNvPr>
@@ -6900,7 +6898,7 @@
           <p:cNvPr id="19" name="TextBox 18">
             <a:extLst>
               <a:ext uri="{FF2B5EF4-FFF2-40B4-BE49-F238E27FC236}">
-                <a16:creationId xmlns:a16="http://schemas.microsoft.com/office/drawing/2014/main" xmlns="" id="{E0BBD6C8-C8F2-40C5-AA64-85961A11ADC2}"/>
+                <a16:creationId xmlns="" xmlns:a16="http://schemas.microsoft.com/office/drawing/2014/main" id="{E0BBD6C8-C8F2-40C5-AA64-85961A11ADC2}"/>
               </a:ext>
             </a:extLst>
           </p:cNvPr>
@@ -7025,7 +7023,7 @@
           <p:cNvPr id="23" name="TextBox 22">
             <a:extLst>
               <a:ext uri="{FF2B5EF4-FFF2-40B4-BE49-F238E27FC236}">
-                <a16:creationId xmlns:a16="http://schemas.microsoft.com/office/drawing/2014/main" xmlns="" id="{E0BBD6C8-C8F2-40C5-AA64-85961A11ADC2}"/>
+                <a16:creationId xmlns="" xmlns:a16="http://schemas.microsoft.com/office/drawing/2014/main" id="{E0BBD6C8-C8F2-40C5-AA64-85961A11ADC2}"/>
               </a:ext>
             </a:extLst>
           </p:cNvPr>
@@ -7142,7 +7140,7 @@
           <p:cNvPr id="28" name="TextBox 27">
             <a:extLst>
               <a:ext uri="{FF2B5EF4-FFF2-40B4-BE49-F238E27FC236}">
-                <a16:creationId xmlns:a16="http://schemas.microsoft.com/office/drawing/2014/main" xmlns="" id="{E0BBD6C8-C8F2-40C5-AA64-85961A11ADC2}"/>
+                <a16:creationId xmlns="" xmlns:a16="http://schemas.microsoft.com/office/drawing/2014/main" id="{E0BBD6C8-C8F2-40C5-AA64-85961A11ADC2}"/>
               </a:ext>
             </a:extLst>
           </p:cNvPr>
@@ -7219,10 +7217,14 @@
           <a:p>
             <a:pPr algn="ctr"/>
             <a:r>
-              <a:rPr lang="en-US" dirty="0" err="1"/>
-              <a:t>ClientService</a:t>
-            </a:r>
-            <a:endParaRPr lang="en-US" dirty="0"/>
+              <a:rPr lang="en-US" sz="1600" dirty="0" err="1" smtClean="0"/>
+              <a:t>Account</a:t>
+            </a:r>
+            <a:r>
+              <a:rPr lang="en-US" sz="1600" dirty="0" err="1" smtClean="0"/>
+              <a:t>Service</a:t>
+            </a:r>
+            <a:endParaRPr lang="en-US" sz="1600" dirty="0"/>
           </a:p>
         </p:txBody>
       </p:sp>
@@ -7267,7 +7269,7 @@
           <p:cNvPr id="34" name="TextBox 33">
             <a:extLst>
               <a:ext uri="{FF2B5EF4-FFF2-40B4-BE49-F238E27FC236}">
-                <a16:creationId xmlns:a16="http://schemas.microsoft.com/office/drawing/2014/main" xmlns="" id="{E0BBD6C8-C8F2-40C5-AA64-85961A11ADC2}"/>
+                <a16:creationId xmlns="" xmlns:a16="http://schemas.microsoft.com/office/drawing/2014/main" id="{E0BBD6C8-C8F2-40C5-AA64-85961A11ADC2}"/>
               </a:ext>
             </a:extLst>
           </p:cNvPr>
@@ -7399,7 +7401,7 @@
           <p:cNvPr id="38" name="TextBox 37">
             <a:extLst>
               <a:ext uri="{FF2B5EF4-FFF2-40B4-BE49-F238E27FC236}">
-                <a16:creationId xmlns:a16="http://schemas.microsoft.com/office/drawing/2014/main" xmlns="" id="{E0BBD6C8-C8F2-40C5-AA64-85961A11ADC2}"/>
+                <a16:creationId xmlns="" xmlns:a16="http://schemas.microsoft.com/office/drawing/2014/main" id="{E0BBD6C8-C8F2-40C5-AA64-85961A11ADC2}"/>
               </a:ext>
             </a:extLst>
           </p:cNvPr>
@@ -7567,7 +7569,7 @@
           <p:cNvPr id="44" name="TextBox 43">
             <a:extLst>
               <a:ext uri="{FF2B5EF4-FFF2-40B4-BE49-F238E27FC236}">
-                <a16:creationId xmlns:a16="http://schemas.microsoft.com/office/drawing/2014/main" xmlns="" id="{E0BBD6C8-C8F2-40C5-AA64-85961A11ADC2}"/>
+                <a16:creationId xmlns="" xmlns:a16="http://schemas.microsoft.com/office/drawing/2014/main" id="{E0BBD6C8-C8F2-40C5-AA64-85961A11ADC2}"/>
               </a:ext>
             </a:extLst>
           </p:cNvPr>
@@ -7602,7 +7604,7 @@
           <p:cNvPr id="45" name="TextBox 44">
             <a:extLst>
               <a:ext uri="{FF2B5EF4-FFF2-40B4-BE49-F238E27FC236}">
-                <a16:creationId xmlns:a16="http://schemas.microsoft.com/office/drawing/2014/main" xmlns="" id="{E0BBD6C8-C8F2-40C5-AA64-85961A11ADC2}"/>
+                <a16:creationId xmlns="" xmlns:a16="http://schemas.microsoft.com/office/drawing/2014/main" id="{E0BBD6C8-C8F2-40C5-AA64-85961A11ADC2}"/>
               </a:ext>
             </a:extLst>
           </p:cNvPr>
@@ -7637,7 +7639,7 @@
           <p:cNvPr id="26" name="TextBox 25">
             <a:extLst>
               <a:ext uri="{FF2B5EF4-FFF2-40B4-BE49-F238E27FC236}">
-                <a16:creationId xmlns:a16="http://schemas.microsoft.com/office/drawing/2014/main" xmlns="" id="{6C45E26E-8FEE-4439-A34B-789237C9C62C}"/>
+                <a16:creationId xmlns="" xmlns:a16="http://schemas.microsoft.com/office/drawing/2014/main" id="{6C45E26E-8FEE-4439-A34B-789237C9C62C}"/>
               </a:ext>
             </a:extLst>
           </p:cNvPr>
@@ -7672,7 +7674,7 @@
           <p:cNvPr id="31" name="Rectangle 30">
             <a:extLst>
               <a:ext uri="{FF2B5EF4-FFF2-40B4-BE49-F238E27FC236}">
-                <a16:creationId xmlns:a16="http://schemas.microsoft.com/office/drawing/2014/main" xmlns="" id="{6D396BFC-10E0-4935-903B-EDC457BD1755}"/>
+                <a16:creationId xmlns="" xmlns:a16="http://schemas.microsoft.com/office/drawing/2014/main" id="{6D396BFC-10E0-4935-903B-EDC457BD1755}"/>
               </a:ext>
             </a:extLst>
           </p:cNvPr>
@@ -7732,7 +7734,7 @@
           <p:cNvPr id="32" name="Rectangle 31">
             <a:extLst>
               <a:ext uri="{FF2B5EF4-FFF2-40B4-BE49-F238E27FC236}">
-                <a16:creationId xmlns:a16="http://schemas.microsoft.com/office/drawing/2014/main" xmlns="" id="{02A645C8-F11F-438D-92DC-F6FCCA5ECFB8}"/>
+                <a16:creationId xmlns="" xmlns:a16="http://schemas.microsoft.com/office/drawing/2014/main" id="{02A645C8-F11F-438D-92DC-F6FCCA5ECFB8}"/>
               </a:ext>
             </a:extLst>
           </p:cNvPr>
@@ -7792,7 +7794,7 @@
           <p:cNvPr id="12" name="Straight Arrow Connector 11">
             <a:extLst>
               <a:ext uri="{FF2B5EF4-FFF2-40B4-BE49-F238E27FC236}">
-                <a16:creationId xmlns:a16="http://schemas.microsoft.com/office/drawing/2014/main" xmlns="" id="{FF2076CA-F897-4293-B6CD-7408EB452156}"/>
+                <a16:creationId xmlns="" xmlns:a16="http://schemas.microsoft.com/office/drawing/2014/main" id="{FF2076CA-F897-4293-B6CD-7408EB452156}"/>
               </a:ext>
             </a:extLst>
           </p:cNvPr>
@@ -7834,7 +7836,7 @@
           <p:cNvPr id="14" name="Straight Arrow Connector 13">
             <a:extLst>
               <a:ext uri="{FF2B5EF4-FFF2-40B4-BE49-F238E27FC236}">
-                <a16:creationId xmlns:a16="http://schemas.microsoft.com/office/drawing/2014/main" xmlns="" id="{5C625B7B-4A1E-46C5-9082-4FEC89B30DA9}"/>
+                <a16:creationId xmlns="" xmlns:a16="http://schemas.microsoft.com/office/drawing/2014/main" id="{5C625B7B-4A1E-46C5-9082-4FEC89B30DA9}"/>
               </a:ext>
             </a:extLst>
           </p:cNvPr>
@@ -7915,6 +7917,9 @@
           <a:prstGeom prst="rect">
             <a:avLst/>
           </a:prstGeom>
+          <a:solidFill>
+            <a:schemeClr val="accent6"/>
+          </a:solidFill>
         </p:spPr>
         <p:style>
           <a:lnRef idx="2">
@@ -7952,8 +7957,19 @@
           <a:p>
             <a:pPr algn="ctr"/>
             <a:r>
-              <a:rPr lang="en-US" dirty="0" err="1"/>
-              <a:t>ClientDAO</a:t>
+              <a:rPr lang="en-US" sz="1200" dirty="0"/>
+              <a:t>Data Access Object</a:t>
+            </a:r>
+          </a:p>
+          <a:p>
+            <a:pPr algn="ctr"/>
+            <a:r>
+              <a:rPr lang="en-US" dirty="0" err="1" smtClean="0"/>
+              <a:t>Generic</a:t>
+            </a:r>
+            <a:r>
+              <a:rPr lang="en-US" dirty="0" err="1" smtClean="0"/>
+              <a:t>DAO</a:t>
             </a:r>
             <a:endParaRPr lang="en-US" dirty="0"/>
           </a:p>
@@ -7967,12 +7983,15 @@
         </p:nvSpPr>
         <p:spPr>
           <a:xfrm>
-            <a:off x="1039424" y="2278701"/>
+            <a:off x="619766" y="2108575"/>
             <a:ext cx="1494797" cy="991056"/>
           </a:xfrm>
           <a:prstGeom prst="rect">
             <a:avLst/>
           </a:prstGeom>
+          <a:solidFill>
+            <a:schemeClr val="accent6"/>
+          </a:solidFill>
         </p:spPr>
         <p:style>
           <a:lnRef idx="2">
@@ -7996,6 +8015,1324 @@
           <a:p>
             <a:pPr algn="ctr"/>
             <a:r>
+              <a:rPr lang="en-US" sz="1000" dirty="0" smtClean="0"/>
+              <a:t>com.tlw8253.model</a:t>
+            </a:r>
+            <a:endParaRPr lang="en-US" sz="1000" dirty="0"/>
+          </a:p>
+          <a:p>
+            <a:pPr algn="ctr"/>
+            <a:r>
+              <a:rPr lang="en-US" sz="1200" dirty="0"/>
+              <a:t>Model</a:t>
+            </a:r>
+          </a:p>
+          <a:p>
+            <a:pPr algn="ctr"/>
+            <a:r>
+              <a:rPr lang="en-US" dirty="0" smtClean="0"/>
+              <a:t>&lt;Account&gt;</a:t>
+            </a:r>
+            <a:endParaRPr lang="en-US" dirty="0"/>
+          </a:p>
+        </p:txBody>
+      </p:sp>
+      <p:cxnSp>
+        <p:nvCxnSpPr>
+          <p:cNvPr id="9" name="Straight Arrow Connector 8"/>
+          <p:cNvCxnSpPr>
+            <a:cxnSpLocks/>
+            <a:stCxn id="4" idx="1"/>
+            <a:endCxn id="5" idx="0"/>
+          </p:cNvCxnSpPr>
+          <p:nvPr/>
+        </p:nvCxnSpPr>
+        <p:spPr>
+          <a:xfrm flipH="1">
+            <a:off x="1367165" y="1327797"/>
+            <a:ext cx="2832505" cy="780778"/>
+          </a:xfrm>
+          <a:prstGeom prst="straightConnector1">
+            <a:avLst/>
+          </a:prstGeom>
+          <a:ln>
+            <a:tailEnd type="triangle"/>
+          </a:ln>
+        </p:spPr>
+        <p:style>
+          <a:lnRef idx="1">
+            <a:schemeClr val="accent1"/>
+          </a:lnRef>
+          <a:fillRef idx="0">
+            <a:schemeClr val="accent1"/>
+          </a:fillRef>
+          <a:effectRef idx="0">
+            <a:schemeClr val="accent1"/>
+          </a:effectRef>
+          <a:fontRef idx="minor">
+            <a:schemeClr val="tx1"/>
+          </a:fontRef>
+        </p:style>
+      </p:cxnSp>
+      <p:sp>
+        <p:nvSpPr>
+          <p:cNvPr id="11" name="TextBox 10">
+            <a:extLst>
+              <a:ext uri="{FF2B5EF4-FFF2-40B4-BE49-F238E27FC236}">
+                <a16:creationId xmlns="" xmlns:a16="http://schemas.microsoft.com/office/drawing/2014/main" id="{E0BBD6C8-C8F2-40C5-AA64-85961A11ADC2}"/>
+              </a:ext>
+            </a:extLst>
+          </p:cNvPr>
+          <p:cNvSpPr txBox="1"/>
+          <p:nvPr/>
+        </p:nvSpPr>
+        <p:spPr>
+          <a:xfrm>
+            <a:off x="1971030" y="1426110"/>
+            <a:ext cx="728932" cy="461665"/>
+          </a:xfrm>
+          <a:prstGeom prst="rect">
+            <a:avLst/>
+          </a:prstGeom>
+          <a:noFill/>
+        </p:spPr>
+        <p:txBody>
+          <a:bodyPr wrap="square" rtlCol="0">
+            <a:spAutoFit/>
+          </a:bodyPr>
+          <a:lstStyle/>
+          <a:p>
+            <a:r>
+              <a:rPr lang="en-US" sz="1200" dirty="0"/>
+              <a:t>contains</a:t>
+            </a:r>
+          </a:p>
+          <a:p>
+            <a:r>
+              <a:rPr lang="en-US" sz="1200" dirty="0"/>
+              <a:t>List&lt;&gt;</a:t>
+            </a:r>
+          </a:p>
+        </p:txBody>
+      </p:sp>
+      <p:sp>
+        <p:nvSpPr>
+          <p:cNvPr id="15" name="Rectangle 14"/>
+          <p:cNvSpPr/>
+          <p:nvPr/>
+        </p:nvSpPr>
+        <p:spPr>
+          <a:xfrm>
+            <a:off x="2593538" y="2923890"/>
+            <a:ext cx="1494797" cy="991056"/>
+          </a:xfrm>
+          <a:prstGeom prst="rect">
+            <a:avLst/>
+          </a:prstGeom>
+          <a:solidFill>
+            <a:schemeClr val="accent6"/>
+          </a:solidFill>
+        </p:spPr>
+        <p:style>
+          <a:lnRef idx="2">
+            <a:schemeClr val="accent1">
+              <a:shade val="50000"/>
+            </a:schemeClr>
+          </a:lnRef>
+          <a:fillRef idx="1">
+            <a:schemeClr val="accent1"/>
+          </a:fillRef>
+          <a:effectRef idx="0">
+            <a:schemeClr val="accent1"/>
+          </a:effectRef>
+          <a:fontRef idx="minor">
+            <a:schemeClr val="lt1"/>
+          </a:fontRef>
+        </p:style>
+        <p:txBody>
+          <a:bodyPr rtlCol="0" anchor="ctr"/>
+          <a:lstStyle/>
+          <a:p>
+            <a:pPr algn="ctr"/>
+            <a:r>
+              <a:rPr lang="en-US" sz="1000" dirty="0"/>
+              <a:t>com.tlw8253.dto</a:t>
+            </a:r>
+          </a:p>
+          <a:p>
+            <a:pPr algn="ctr"/>
+            <a:r>
+              <a:rPr lang="en-US" sz="1200" dirty="0"/>
+              <a:t>Data Transfer Object</a:t>
+            </a:r>
+          </a:p>
+          <a:p>
+            <a:pPr algn="ctr"/>
+            <a:r>
+              <a:rPr lang="en-US" dirty="0" err="1" smtClean="0"/>
+              <a:t>Generic</a:t>
+            </a:r>
+            <a:r>
+              <a:rPr lang="en-US" dirty="0" err="1" smtClean="0"/>
+              <a:t>DTO</a:t>
+            </a:r>
+            <a:endParaRPr lang="en-US" dirty="0"/>
+          </a:p>
+          <a:p>
+            <a:pPr algn="ctr"/>
+            <a:r>
+              <a:rPr lang="en-US" sz="1200" dirty="0" err="1" smtClean="0"/>
+              <a:t>GenericAddDTO</a:t>
+            </a:r>
+            <a:endParaRPr lang="en-US" sz="1200" dirty="0" smtClean="0"/>
+          </a:p>
+          <a:p>
+            <a:pPr algn="ctr"/>
+            <a:r>
+              <a:rPr lang="en-US" sz="1200" dirty="0" err="1" smtClean="0"/>
+              <a:t>GenericEditDTO</a:t>
+            </a:r>
+            <a:endParaRPr lang="en-US" sz="1200" dirty="0"/>
+          </a:p>
+        </p:txBody>
+      </p:sp>
+      <p:cxnSp>
+        <p:nvCxnSpPr>
+          <p:cNvPr id="17" name="Straight Arrow Connector 16"/>
+          <p:cNvCxnSpPr>
+            <a:stCxn id="4" idx="2"/>
+            <a:endCxn id="15" idx="0"/>
+          </p:cNvCxnSpPr>
+          <p:nvPr/>
+        </p:nvCxnSpPr>
+        <p:spPr>
+          <a:xfrm flipH="1">
+            <a:off x="3340937" y="1823325"/>
+            <a:ext cx="1606132" cy="1100565"/>
+          </a:xfrm>
+          <a:prstGeom prst="straightConnector1">
+            <a:avLst/>
+          </a:prstGeom>
+          <a:ln>
+            <a:tailEnd type="triangle"/>
+          </a:ln>
+        </p:spPr>
+        <p:style>
+          <a:lnRef idx="1">
+            <a:schemeClr val="accent1"/>
+          </a:lnRef>
+          <a:fillRef idx="0">
+            <a:schemeClr val="accent1"/>
+          </a:fillRef>
+          <a:effectRef idx="0">
+            <a:schemeClr val="accent1"/>
+          </a:effectRef>
+          <a:fontRef idx="minor">
+            <a:schemeClr val="tx1"/>
+          </a:fontRef>
+        </p:style>
+      </p:cxnSp>
+      <p:sp>
+        <p:nvSpPr>
+          <p:cNvPr id="19" name="TextBox 18">
+            <a:extLst>
+              <a:ext uri="{FF2B5EF4-FFF2-40B4-BE49-F238E27FC236}">
+                <a16:creationId xmlns="" xmlns:a16="http://schemas.microsoft.com/office/drawing/2014/main" id="{E0BBD6C8-C8F2-40C5-AA64-85961A11ADC2}"/>
+              </a:ext>
+            </a:extLst>
+          </p:cNvPr>
+          <p:cNvSpPr txBox="1"/>
+          <p:nvPr/>
+        </p:nvSpPr>
+        <p:spPr>
+          <a:xfrm>
+            <a:off x="3541919" y="2180353"/>
+            <a:ext cx="728932" cy="276999"/>
+          </a:xfrm>
+          <a:prstGeom prst="rect">
+            <a:avLst/>
+          </a:prstGeom>
+          <a:noFill/>
+        </p:spPr>
+        <p:txBody>
+          <a:bodyPr wrap="square" rtlCol="0">
+            <a:spAutoFit/>
+          </a:bodyPr>
+          <a:lstStyle/>
+          <a:p>
+            <a:r>
+              <a:rPr lang="en-US" sz="1200" dirty="0"/>
+              <a:t>uses</a:t>
+            </a:r>
+          </a:p>
+        </p:txBody>
+      </p:sp>
+      <p:sp>
+        <p:nvSpPr>
+          <p:cNvPr id="20" name="Rectangle 19"/>
+          <p:cNvSpPr/>
+          <p:nvPr/>
+        </p:nvSpPr>
+        <p:spPr>
+          <a:xfrm>
+            <a:off x="7319764" y="1859829"/>
+            <a:ext cx="1589922" cy="991056"/>
+          </a:xfrm>
+          <a:prstGeom prst="rect">
+            <a:avLst/>
+          </a:prstGeom>
+          <a:solidFill>
+            <a:schemeClr val="accent6"/>
+          </a:solidFill>
+        </p:spPr>
+        <p:style>
+          <a:lnRef idx="2">
+            <a:schemeClr val="accent1">
+              <a:shade val="50000"/>
+            </a:schemeClr>
+          </a:lnRef>
+          <a:fillRef idx="1">
+            <a:schemeClr val="accent1"/>
+          </a:fillRef>
+          <a:effectRef idx="0">
+            <a:schemeClr val="accent1"/>
+          </a:effectRef>
+          <a:fontRef idx="minor">
+            <a:schemeClr val="lt1"/>
+          </a:fontRef>
+        </p:style>
+        <p:txBody>
+          <a:bodyPr rtlCol="0" anchor="ctr"/>
+          <a:lstStyle/>
+          <a:p>
+            <a:pPr algn="ctr"/>
+            <a:r>
+              <a:rPr lang="en-US" sz="1000" dirty="0"/>
+              <a:t>com.tlw8253.dao</a:t>
+            </a:r>
+          </a:p>
+          <a:p>
+            <a:pPr algn="ctr"/>
+            <a:r>
+              <a:rPr lang="en-US" sz="1500" dirty="0" err="1" smtClean="0"/>
+              <a:t>AccountDAOImpl</a:t>
+            </a:r>
+            <a:endParaRPr lang="en-US" sz="1500" dirty="0"/>
+          </a:p>
+        </p:txBody>
+      </p:sp>
+      <p:cxnSp>
+        <p:nvCxnSpPr>
+          <p:cNvPr id="22" name="Straight Arrow Connector 21"/>
+          <p:cNvCxnSpPr>
+            <a:stCxn id="20" idx="1"/>
+            <a:endCxn id="4" idx="3"/>
+          </p:cNvCxnSpPr>
+          <p:nvPr/>
+        </p:nvCxnSpPr>
+        <p:spPr>
+          <a:xfrm flipH="1" flipV="1">
+            <a:off x="5694467" y="1327797"/>
+            <a:ext cx="1625297" cy="1027560"/>
+          </a:xfrm>
+          <a:prstGeom prst="straightConnector1">
+            <a:avLst/>
+          </a:prstGeom>
+          <a:ln>
+            <a:tailEnd type="triangle"/>
+          </a:ln>
+        </p:spPr>
+        <p:style>
+          <a:lnRef idx="1">
+            <a:schemeClr val="accent1"/>
+          </a:lnRef>
+          <a:fillRef idx="0">
+            <a:schemeClr val="accent1"/>
+          </a:fillRef>
+          <a:effectRef idx="0">
+            <a:schemeClr val="accent1"/>
+          </a:effectRef>
+          <a:fontRef idx="minor">
+            <a:schemeClr val="tx1"/>
+          </a:fontRef>
+        </p:style>
+      </p:cxnSp>
+      <p:sp>
+        <p:nvSpPr>
+          <p:cNvPr id="23" name="TextBox 22">
+            <a:extLst>
+              <a:ext uri="{FF2B5EF4-FFF2-40B4-BE49-F238E27FC236}">
+                <a16:creationId xmlns="" xmlns:a16="http://schemas.microsoft.com/office/drawing/2014/main" id="{E0BBD6C8-C8F2-40C5-AA64-85961A11ADC2}"/>
+              </a:ext>
+            </a:extLst>
+          </p:cNvPr>
+          <p:cNvSpPr txBox="1"/>
+          <p:nvPr/>
+        </p:nvSpPr>
+        <p:spPr>
+          <a:xfrm>
+            <a:off x="6166028" y="1299474"/>
+            <a:ext cx="1063847" cy="276999"/>
+          </a:xfrm>
+          <a:prstGeom prst="rect">
+            <a:avLst/>
+          </a:prstGeom>
+          <a:noFill/>
+        </p:spPr>
+        <p:txBody>
+          <a:bodyPr wrap="square" rtlCol="0">
+            <a:spAutoFit/>
+          </a:bodyPr>
+          <a:lstStyle/>
+          <a:p>
+            <a:r>
+              <a:rPr lang="en-US" sz="1200" dirty="0"/>
+              <a:t>implements</a:t>
+            </a:r>
+          </a:p>
+        </p:txBody>
+      </p:sp>
+      <p:sp>
+        <p:nvSpPr>
+          <p:cNvPr id="25" name="Flowchart: Magnetic Disk 24"/>
+          <p:cNvSpPr/>
+          <p:nvPr/>
+        </p:nvSpPr>
+        <p:spPr>
+          <a:xfrm>
+            <a:off x="10507387" y="2923890"/>
+            <a:ext cx="653404" cy="1018434"/>
+          </a:xfrm>
+          <a:prstGeom prst="flowChartMagneticDisk">
+            <a:avLst/>
+          </a:prstGeom>
+          <a:solidFill>
+            <a:schemeClr val="accent3"/>
+          </a:solidFill>
+        </p:spPr>
+        <p:style>
+          <a:lnRef idx="2">
+            <a:schemeClr val="accent1">
+              <a:shade val="50000"/>
+            </a:schemeClr>
+          </a:lnRef>
+          <a:fillRef idx="1">
+            <a:schemeClr val="accent1"/>
+          </a:fillRef>
+          <a:effectRef idx="0">
+            <a:schemeClr val="accent1"/>
+          </a:effectRef>
+          <a:fontRef idx="minor">
+            <a:schemeClr val="lt1"/>
+          </a:fontRef>
+        </p:style>
+        <p:txBody>
+          <a:bodyPr rtlCol="0" anchor="ctr"/>
+          <a:lstStyle/>
+          <a:p>
+            <a:pPr algn="ctr"/>
+            <a:r>
+              <a:rPr lang="en-US" dirty="0"/>
+              <a:t>DB</a:t>
+            </a:r>
+          </a:p>
+        </p:txBody>
+      </p:sp>
+      <p:cxnSp>
+        <p:nvCxnSpPr>
+          <p:cNvPr id="27" name="Straight Arrow Connector 26"/>
+          <p:cNvCxnSpPr>
+            <a:stCxn id="20" idx="3"/>
+            <a:endCxn id="25" idx="2"/>
+          </p:cNvCxnSpPr>
+          <p:nvPr/>
+        </p:nvCxnSpPr>
+        <p:spPr>
+          <a:xfrm>
+            <a:off x="8909686" y="2355357"/>
+            <a:ext cx="1597701" cy="1077750"/>
+          </a:xfrm>
+          <a:prstGeom prst="straightConnector1">
+            <a:avLst/>
+          </a:prstGeom>
+          <a:ln>
+            <a:tailEnd type="triangle"/>
+          </a:ln>
+        </p:spPr>
+        <p:style>
+          <a:lnRef idx="1">
+            <a:schemeClr val="accent1"/>
+          </a:lnRef>
+          <a:fillRef idx="0">
+            <a:schemeClr val="accent1"/>
+          </a:fillRef>
+          <a:effectRef idx="0">
+            <a:schemeClr val="accent1"/>
+          </a:effectRef>
+          <a:fontRef idx="minor">
+            <a:schemeClr val="tx1"/>
+          </a:fontRef>
+        </p:style>
+      </p:cxnSp>
+      <p:sp>
+        <p:nvSpPr>
+          <p:cNvPr id="28" name="TextBox 27">
+            <a:extLst>
+              <a:ext uri="{FF2B5EF4-FFF2-40B4-BE49-F238E27FC236}">
+                <a16:creationId xmlns="" xmlns:a16="http://schemas.microsoft.com/office/drawing/2014/main" id="{E0BBD6C8-C8F2-40C5-AA64-85961A11ADC2}"/>
+              </a:ext>
+            </a:extLst>
+          </p:cNvPr>
+          <p:cNvSpPr txBox="1"/>
+          <p:nvPr/>
+        </p:nvSpPr>
+        <p:spPr>
+          <a:xfrm>
+            <a:off x="9283733" y="2276386"/>
+            <a:ext cx="728932" cy="276999"/>
+          </a:xfrm>
+          <a:prstGeom prst="rect">
+            <a:avLst/>
+          </a:prstGeom>
+          <a:noFill/>
+        </p:spPr>
+        <p:txBody>
+          <a:bodyPr wrap="square" rtlCol="0">
+            <a:spAutoFit/>
+          </a:bodyPr>
+          <a:lstStyle/>
+          <a:p>
+            <a:r>
+              <a:rPr lang="en-US" sz="1200" dirty="0"/>
+              <a:t>access</a:t>
+            </a:r>
+          </a:p>
+        </p:txBody>
+      </p:sp>
+      <p:sp>
+        <p:nvSpPr>
+          <p:cNvPr id="29" name="Rectangle 28"/>
+          <p:cNvSpPr/>
+          <p:nvPr/>
+        </p:nvSpPr>
+        <p:spPr>
+          <a:xfrm>
+            <a:off x="7379082" y="4274502"/>
+            <a:ext cx="1494797" cy="991056"/>
+          </a:xfrm>
+          <a:prstGeom prst="rect">
+            <a:avLst/>
+          </a:prstGeom>
+          <a:solidFill>
+            <a:schemeClr val="accent6"/>
+          </a:solidFill>
+        </p:spPr>
+        <p:style>
+          <a:lnRef idx="2">
+            <a:schemeClr val="accent1">
+              <a:shade val="50000"/>
+            </a:schemeClr>
+          </a:lnRef>
+          <a:fillRef idx="1">
+            <a:schemeClr val="accent1"/>
+          </a:fillRef>
+          <a:effectRef idx="0">
+            <a:schemeClr val="accent1"/>
+          </a:effectRef>
+          <a:fontRef idx="minor">
+            <a:schemeClr val="lt1"/>
+          </a:fontRef>
+        </p:style>
+        <p:txBody>
+          <a:bodyPr rtlCol="0" anchor="ctr"/>
+          <a:lstStyle/>
+          <a:p>
+            <a:pPr algn="ctr"/>
+            <a:r>
+              <a:rPr lang="en-US" sz="1000" dirty="0"/>
+              <a:t>com.tlw8253.service</a:t>
+            </a:r>
+          </a:p>
+          <a:p>
+            <a:pPr algn="ctr"/>
+            <a:r>
+              <a:rPr lang="en-US" sz="1600" dirty="0" err="1" smtClean="0"/>
+              <a:t>AccountService</a:t>
+            </a:r>
+            <a:endParaRPr lang="en-US" sz="1600" dirty="0"/>
+          </a:p>
+        </p:txBody>
+      </p:sp>
+      <p:cxnSp>
+        <p:nvCxnSpPr>
+          <p:cNvPr id="33" name="Straight Arrow Connector 32"/>
+          <p:cNvCxnSpPr>
+            <a:stCxn id="29" idx="0"/>
+            <a:endCxn id="20" idx="2"/>
+          </p:cNvCxnSpPr>
+          <p:nvPr/>
+        </p:nvCxnSpPr>
+        <p:spPr>
+          <a:xfrm flipH="1" flipV="1">
+            <a:off x="8114725" y="2850885"/>
+            <a:ext cx="11756" cy="1423617"/>
+          </a:xfrm>
+          <a:prstGeom prst="straightConnector1">
+            <a:avLst/>
+          </a:prstGeom>
+          <a:ln>
+            <a:tailEnd type="triangle"/>
+          </a:ln>
+        </p:spPr>
+        <p:style>
+          <a:lnRef idx="1">
+            <a:schemeClr val="accent1"/>
+          </a:lnRef>
+          <a:fillRef idx="0">
+            <a:schemeClr val="accent1"/>
+          </a:fillRef>
+          <a:effectRef idx="0">
+            <a:schemeClr val="accent1"/>
+          </a:effectRef>
+          <a:fontRef idx="minor">
+            <a:schemeClr val="tx1"/>
+          </a:fontRef>
+        </p:style>
+      </p:cxnSp>
+      <p:sp>
+        <p:nvSpPr>
+          <p:cNvPr id="34" name="TextBox 33">
+            <a:extLst>
+              <a:ext uri="{FF2B5EF4-FFF2-40B4-BE49-F238E27FC236}">
+                <a16:creationId xmlns="" xmlns:a16="http://schemas.microsoft.com/office/drawing/2014/main" id="{E0BBD6C8-C8F2-40C5-AA64-85961A11ADC2}"/>
+              </a:ext>
+            </a:extLst>
+          </p:cNvPr>
+          <p:cNvSpPr txBox="1"/>
+          <p:nvPr/>
+        </p:nvSpPr>
+        <p:spPr>
+          <a:xfrm>
+            <a:off x="8221712" y="3239528"/>
+            <a:ext cx="1062021" cy="646331"/>
+          </a:xfrm>
+          <a:prstGeom prst="rect">
+            <a:avLst/>
+          </a:prstGeom>
+          <a:noFill/>
+        </p:spPr>
+        <p:txBody>
+          <a:bodyPr wrap="square" rtlCol="0">
+            <a:spAutoFit/>
+          </a:bodyPr>
+          <a:lstStyle/>
+          <a:p>
+            <a:r>
+              <a:rPr lang="en-US" sz="1200" dirty="0"/>
+              <a:t>contains</a:t>
+            </a:r>
+          </a:p>
+          <a:p>
+            <a:r>
+              <a:rPr lang="en-US" sz="1200" dirty="0"/>
+              <a:t>Implemented DAO</a:t>
+            </a:r>
+          </a:p>
+        </p:txBody>
+      </p:sp>
+      <p:sp>
+        <p:nvSpPr>
+          <p:cNvPr id="35" name="Rectangle 34"/>
+          <p:cNvSpPr/>
+          <p:nvPr/>
+        </p:nvSpPr>
+        <p:spPr>
+          <a:xfrm>
+            <a:off x="4505165" y="3447841"/>
+            <a:ext cx="1998489" cy="657053"/>
+          </a:xfrm>
+          <a:prstGeom prst="rect">
+            <a:avLst/>
+          </a:prstGeom>
+          <a:solidFill>
+            <a:schemeClr val="accent6"/>
+          </a:solidFill>
+        </p:spPr>
+        <p:style>
+          <a:lnRef idx="2">
+            <a:schemeClr val="accent1">
+              <a:shade val="50000"/>
+            </a:schemeClr>
+          </a:lnRef>
+          <a:fillRef idx="1">
+            <a:schemeClr val="accent1"/>
+          </a:fillRef>
+          <a:effectRef idx="0">
+            <a:schemeClr val="accent1"/>
+          </a:effectRef>
+          <a:fontRef idx="minor">
+            <a:schemeClr val="lt1"/>
+          </a:fontRef>
+        </p:style>
+        <p:txBody>
+          <a:bodyPr rtlCol="0" anchor="ctr"/>
+          <a:lstStyle/>
+          <a:p>
+            <a:pPr algn="ctr"/>
+            <a:r>
+              <a:rPr lang="en-US" sz="1000" dirty="0"/>
+              <a:t>com.tlw8253.exception</a:t>
+            </a:r>
+          </a:p>
+          <a:p>
+            <a:pPr algn="ctr"/>
+            <a:r>
+              <a:rPr lang="en-US" sz="1400" dirty="0" err="1"/>
+              <a:t>BadParameterException</a:t>
+            </a:r>
+            <a:endParaRPr lang="en-US" sz="1400" dirty="0"/>
+          </a:p>
+        </p:txBody>
+      </p:sp>
+      <p:cxnSp>
+        <p:nvCxnSpPr>
+          <p:cNvPr id="37" name="Straight Arrow Connector 36"/>
+          <p:cNvCxnSpPr>
+            <a:cxnSpLocks/>
+            <a:stCxn id="29" idx="1"/>
+            <a:endCxn id="35" idx="3"/>
+          </p:cNvCxnSpPr>
+          <p:nvPr/>
+        </p:nvCxnSpPr>
+        <p:spPr>
+          <a:xfrm flipH="1" flipV="1">
+            <a:off x="6503654" y="3776368"/>
+            <a:ext cx="875428" cy="993662"/>
+          </a:xfrm>
+          <a:prstGeom prst="straightConnector1">
+            <a:avLst/>
+          </a:prstGeom>
+          <a:ln>
+            <a:tailEnd type="triangle"/>
+          </a:ln>
+        </p:spPr>
+        <p:style>
+          <a:lnRef idx="1">
+            <a:schemeClr val="accent1"/>
+          </a:lnRef>
+          <a:fillRef idx="0">
+            <a:schemeClr val="accent1"/>
+          </a:fillRef>
+          <a:effectRef idx="0">
+            <a:schemeClr val="accent1"/>
+          </a:effectRef>
+          <a:fontRef idx="minor">
+            <a:schemeClr val="tx1"/>
+          </a:fontRef>
+        </p:style>
+      </p:cxnSp>
+      <p:sp>
+        <p:nvSpPr>
+          <p:cNvPr id="38" name="TextBox 37">
+            <a:extLst>
+              <a:ext uri="{FF2B5EF4-FFF2-40B4-BE49-F238E27FC236}">
+                <a16:creationId xmlns="" xmlns:a16="http://schemas.microsoft.com/office/drawing/2014/main" id="{E0BBD6C8-C8F2-40C5-AA64-85961A11ADC2}"/>
+              </a:ext>
+            </a:extLst>
+          </p:cNvPr>
+          <p:cNvSpPr txBox="1"/>
+          <p:nvPr/>
+        </p:nvSpPr>
+        <p:spPr>
+          <a:xfrm>
+            <a:off x="6700557" y="4617354"/>
+            <a:ext cx="728932" cy="276999"/>
+          </a:xfrm>
+          <a:prstGeom prst="rect">
+            <a:avLst/>
+          </a:prstGeom>
+          <a:noFill/>
+        </p:spPr>
+        <p:txBody>
+          <a:bodyPr wrap="square" rtlCol="0">
+            <a:spAutoFit/>
+          </a:bodyPr>
+          <a:lstStyle/>
+          <a:p>
+            <a:r>
+              <a:rPr lang="en-US" sz="1200" dirty="0"/>
+              <a:t>throws</a:t>
+            </a:r>
+          </a:p>
+        </p:txBody>
+      </p:sp>
+      <p:sp>
+        <p:nvSpPr>
+          <p:cNvPr id="39" name="Rectangle 38"/>
+          <p:cNvSpPr/>
+          <p:nvPr/>
+        </p:nvSpPr>
+        <p:spPr>
+          <a:xfrm>
+            <a:off x="8909686" y="472284"/>
+            <a:ext cx="1822194" cy="991056"/>
+          </a:xfrm>
+          <a:prstGeom prst="rect">
+            <a:avLst/>
+          </a:prstGeom>
+          <a:solidFill>
+            <a:schemeClr val="accent6"/>
+          </a:solidFill>
+        </p:spPr>
+        <p:style>
+          <a:lnRef idx="2">
+            <a:schemeClr val="accent1">
+              <a:shade val="50000"/>
+            </a:schemeClr>
+          </a:lnRef>
+          <a:fillRef idx="1">
+            <a:schemeClr val="accent1"/>
+          </a:fillRef>
+          <a:effectRef idx="0">
+            <a:schemeClr val="accent1"/>
+          </a:effectRef>
+          <a:fontRef idx="minor">
+            <a:schemeClr val="lt1"/>
+          </a:fontRef>
+        </p:style>
+        <p:txBody>
+          <a:bodyPr rtlCol="0" anchor="ctr"/>
+          <a:lstStyle/>
+          <a:p>
+            <a:pPr algn="ctr"/>
+            <a:r>
+              <a:rPr lang="en-US" sz="1000" dirty="0"/>
+              <a:t>com.tlw8253.utility</a:t>
+            </a:r>
+          </a:p>
+          <a:p>
+            <a:pPr algn="ctr"/>
+            <a:r>
+              <a:rPr lang="en-US" sz="1000" dirty="0"/>
+              <a:t>Utility</a:t>
+            </a:r>
+          </a:p>
+          <a:p>
+            <a:pPr algn="ctr"/>
+            <a:r>
+              <a:rPr lang="en-US" dirty="0" err="1"/>
+              <a:t>ConnectionUtility</a:t>
+            </a:r>
+            <a:endParaRPr lang="en-US" dirty="0"/>
+          </a:p>
+        </p:txBody>
+      </p:sp>
+      <p:cxnSp>
+        <p:nvCxnSpPr>
+          <p:cNvPr id="41" name="Straight Arrow Connector 40"/>
+          <p:cNvCxnSpPr>
+            <a:stCxn id="20" idx="0"/>
+            <a:endCxn id="39" idx="1"/>
+          </p:cNvCxnSpPr>
+          <p:nvPr/>
+        </p:nvCxnSpPr>
+        <p:spPr>
+          <a:xfrm flipV="1">
+            <a:off x="8114725" y="967812"/>
+            <a:ext cx="794961" cy="892017"/>
+          </a:xfrm>
+          <a:prstGeom prst="straightConnector1">
+            <a:avLst/>
+          </a:prstGeom>
+          <a:ln>
+            <a:tailEnd type="triangle"/>
+          </a:ln>
+        </p:spPr>
+        <p:style>
+          <a:lnRef idx="1">
+            <a:schemeClr val="accent1"/>
+          </a:lnRef>
+          <a:fillRef idx="0">
+            <a:schemeClr val="accent1"/>
+          </a:fillRef>
+          <a:effectRef idx="0">
+            <a:schemeClr val="accent1"/>
+          </a:effectRef>
+          <a:fontRef idx="minor">
+            <a:schemeClr val="tx1"/>
+          </a:fontRef>
+        </p:style>
+      </p:cxnSp>
+      <p:cxnSp>
+        <p:nvCxnSpPr>
+          <p:cNvPr id="43" name="Straight Arrow Connector 42"/>
+          <p:cNvCxnSpPr>
+            <a:stCxn id="39" idx="2"/>
+            <a:endCxn id="25" idx="1"/>
+          </p:cNvCxnSpPr>
+          <p:nvPr/>
+        </p:nvCxnSpPr>
+        <p:spPr>
+          <a:xfrm>
+            <a:off x="9820783" y="1463340"/>
+            <a:ext cx="1013306" cy="1460550"/>
+          </a:xfrm>
+          <a:prstGeom prst="straightConnector1">
+            <a:avLst/>
+          </a:prstGeom>
+          <a:ln>
+            <a:tailEnd type="triangle"/>
+          </a:ln>
+        </p:spPr>
+        <p:style>
+          <a:lnRef idx="1">
+            <a:schemeClr val="accent1"/>
+          </a:lnRef>
+          <a:fillRef idx="0">
+            <a:schemeClr val="accent1"/>
+          </a:fillRef>
+          <a:effectRef idx="0">
+            <a:schemeClr val="accent1"/>
+          </a:effectRef>
+          <a:fontRef idx="minor">
+            <a:schemeClr val="tx1"/>
+          </a:fontRef>
+        </p:style>
+      </p:cxnSp>
+      <p:sp>
+        <p:nvSpPr>
+          <p:cNvPr id="44" name="TextBox 43">
+            <a:extLst>
+              <a:ext uri="{FF2B5EF4-FFF2-40B4-BE49-F238E27FC236}">
+                <a16:creationId xmlns="" xmlns:a16="http://schemas.microsoft.com/office/drawing/2014/main" id="{E0BBD6C8-C8F2-40C5-AA64-85961A11ADC2}"/>
+              </a:ext>
+            </a:extLst>
+          </p:cNvPr>
+          <p:cNvSpPr txBox="1"/>
+          <p:nvPr/>
+        </p:nvSpPr>
+        <p:spPr>
+          <a:xfrm>
+            <a:off x="8023790" y="1170629"/>
+            <a:ext cx="728932" cy="276999"/>
+          </a:xfrm>
+          <a:prstGeom prst="rect">
+            <a:avLst/>
+          </a:prstGeom>
+          <a:noFill/>
+        </p:spPr>
+        <p:txBody>
+          <a:bodyPr wrap="square" rtlCol="0">
+            <a:spAutoFit/>
+          </a:bodyPr>
+          <a:lstStyle/>
+          <a:p>
+            <a:r>
+              <a:rPr lang="en-US" sz="1200" dirty="0"/>
+              <a:t>uses</a:t>
+            </a:r>
+          </a:p>
+        </p:txBody>
+      </p:sp>
+      <p:sp>
+        <p:nvSpPr>
+          <p:cNvPr id="45" name="TextBox 44">
+            <a:extLst>
+              <a:ext uri="{FF2B5EF4-FFF2-40B4-BE49-F238E27FC236}">
+                <a16:creationId xmlns="" xmlns:a16="http://schemas.microsoft.com/office/drawing/2014/main" id="{E0BBD6C8-C8F2-40C5-AA64-85961A11ADC2}"/>
+              </a:ext>
+            </a:extLst>
+          </p:cNvPr>
+          <p:cNvSpPr txBox="1"/>
+          <p:nvPr/>
+        </p:nvSpPr>
+        <p:spPr>
+          <a:xfrm>
+            <a:off x="10245586" y="1859829"/>
+            <a:ext cx="864099" cy="276999"/>
+          </a:xfrm>
+          <a:prstGeom prst="rect">
+            <a:avLst/>
+          </a:prstGeom>
+          <a:noFill/>
+        </p:spPr>
+        <p:txBody>
+          <a:bodyPr wrap="square" rtlCol="0">
+            <a:spAutoFit/>
+          </a:bodyPr>
+          <a:lstStyle/>
+          <a:p>
+            <a:r>
+              <a:rPr lang="en-US" sz="1200" dirty="0"/>
+              <a:t>connects</a:t>
+            </a:r>
+          </a:p>
+        </p:txBody>
+      </p:sp>
+      <p:sp>
+        <p:nvSpPr>
+          <p:cNvPr id="26" name="TextBox 25">
+            <a:extLst>
+              <a:ext uri="{FF2B5EF4-FFF2-40B4-BE49-F238E27FC236}">
+                <a16:creationId xmlns="" xmlns:a16="http://schemas.microsoft.com/office/drawing/2014/main" id="{6C45E26E-8FEE-4439-A34B-789237C9C62C}"/>
+              </a:ext>
+            </a:extLst>
+          </p:cNvPr>
+          <p:cNvSpPr txBox="1"/>
+          <p:nvPr/>
+        </p:nvSpPr>
+        <p:spPr>
+          <a:xfrm>
+            <a:off x="146648" y="131998"/>
+            <a:ext cx="4675518" cy="369332"/>
+          </a:xfrm>
+          <a:prstGeom prst="rect">
+            <a:avLst/>
+          </a:prstGeom>
+          <a:noFill/>
+        </p:spPr>
+        <p:txBody>
+          <a:bodyPr wrap="square" rtlCol="0">
+            <a:spAutoFit/>
+          </a:bodyPr>
+          <a:lstStyle/>
+          <a:p>
+            <a:r>
+              <a:rPr lang="en-US" dirty="0"/>
+              <a:t>Project 0 Specific Database Access Client Model</a:t>
+            </a:r>
+          </a:p>
+        </p:txBody>
+      </p:sp>
+      <p:sp>
+        <p:nvSpPr>
+          <p:cNvPr id="31" name="Rectangle 30">
+            <a:extLst>
+              <a:ext uri="{FF2B5EF4-FFF2-40B4-BE49-F238E27FC236}">
+                <a16:creationId xmlns="" xmlns:a16="http://schemas.microsoft.com/office/drawing/2014/main" id="{6D396BFC-10E0-4935-903B-EDC457BD1755}"/>
+              </a:ext>
+            </a:extLst>
+          </p:cNvPr>
+          <p:cNvSpPr/>
+          <p:nvPr/>
+        </p:nvSpPr>
+        <p:spPr>
+          <a:xfrm>
+            <a:off x="4508845" y="4540325"/>
+            <a:ext cx="1621682" cy="657053"/>
+          </a:xfrm>
+          <a:prstGeom prst="rect">
+            <a:avLst/>
+          </a:prstGeom>
+          <a:solidFill>
+            <a:schemeClr val="accent6"/>
+          </a:solidFill>
+        </p:spPr>
+        <p:style>
+          <a:lnRef idx="2">
+            <a:schemeClr val="accent1">
+              <a:shade val="50000"/>
+            </a:schemeClr>
+          </a:lnRef>
+          <a:fillRef idx="1">
+            <a:schemeClr val="accent1"/>
+          </a:fillRef>
+          <a:effectRef idx="0">
+            <a:schemeClr val="accent1"/>
+          </a:effectRef>
+          <a:fontRef idx="minor">
+            <a:schemeClr val="lt1"/>
+          </a:fontRef>
+        </p:style>
+        <p:txBody>
+          <a:bodyPr rtlCol="0" anchor="ctr"/>
+          <a:lstStyle/>
+          <a:p>
+            <a:pPr algn="ctr"/>
+            <a:r>
+              <a:rPr lang="en-US" sz="1000" dirty="0"/>
+              <a:t>com.tlw8253.exception</a:t>
+            </a:r>
+          </a:p>
+          <a:p>
+            <a:pPr algn="ctr"/>
+            <a:r>
+              <a:rPr lang="en-US" sz="1400" dirty="0" err="1"/>
+              <a:t>DatabaseException</a:t>
+            </a:r>
+            <a:endParaRPr lang="en-US" sz="1400" dirty="0"/>
+          </a:p>
+        </p:txBody>
+      </p:sp>
+      <p:sp>
+        <p:nvSpPr>
+          <p:cNvPr id="32" name="Rectangle 31">
+            <a:extLst>
+              <a:ext uri="{FF2B5EF4-FFF2-40B4-BE49-F238E27FC236}">
+                <a16:creationId xmlns="" xmlns:a16="http://schemas.microsoft.com/office/drawing/2014/main" id="{02A645C8-F11F-438D-92DC-F6FCCA5ECFB8}"/>
+              </a:ext>
+            </a:extLst>
+          </p:cNvPr>
+          <p:cNvSpPr/>
+          <p:nvPr/>
+        </p:nvSpPr>
+        <p:spPr>
+          <a:xfrm>
+            <a:off x="4342031" y="5729410"/>
+            <a:ext cx="2212030" cy="657053"/>
+          </a:xfrm>
+          <a:prstGeom prst="rect">
+            <a:avLst/>
+          </a:prstGeom>
+          <a:solidFill>
+            <a:schemeClr val="accent6"/>
+          </a:solidFill>
+        </p:spPr>
+        <p:style>
+          <a:lnRef idx="2">
+            <a:schemeClr val="accent1">
+              <a:shade val="50000"/>
+            </a:schemeClr>
+          </a:lnRef>
+          <a:fillRef idx="1">
+            <a:schemeClr val="accent1"/>
+          </a:fillRef>
+          <a:effectRef idx="0">
+            <a:schemeClr val="accent1"/>
+          </a:effectRef>
+          <a:fontRef idx="minor">
+            <a:schemeClr val="lt1"/>
+          </a:fontRef>
+        </p:style>
+        <p:txBody>
+          <a:bodyPr rtlCol="0" anchor="ctr"/>
+          <a:lstStyle/>
+          <a:p>
+            <a:pPr algn="ctr"/>
+            <a:r>
+              <a:rPr lang="en-US" sz="1000" dirty="0"/>
+              <a:t>com.tlw8253.exception</a:t>
+            </a:r>
+          </a:p>
+          <a:p>
+            <a:pPr algn="ctr"/>
+            <a:r>
+              <a:rPr lang="en-US" sz="1400" dirty="0" err="1"/>
+              <a:t>AccountNotFoundException</a:t>
+            </a:r>
+            <a:endParaRPr lang="en-US" sz="1400" dirty="0"/>
+          </a:p>
+        </p:txBody>
+      </p:sp>
+      <p:cxnSp>
+        <p:nvCxnSpPr>
+          <p:cNvPr id="12" name="Straight Arrow Connector 11">
+            <a:extLst>
+              <a:ext uri="{FF2B5EF4-FFF2-40B4-BE49-F238E27FC236}">
+                <a16:creationId xmlns="" xmlns:a16="http://schemas.microsoft.com/office/drawing/2014/main" id="{FF2076CA-F897-4293-B6CD-7408EB452156}"/>
+              </a:ext>
+            </a:extLst>
+          </p:cNvPr>
+          <p:cNvCxnSpPr>
+            <a:stCxn id="29" idx="1"/>
+            <a:endCxn id="31" idx="3"/>
+          </p:cNvCxnSpPr>
+          <p:nvPr/>
+        </p:nvCxnSpPr>
+        <p:spPr>
+          <a:xfrm flipH="1">
+            <a:off x="6130527" y="4770030"/>
+            <a:ext cx="1248555" cy="98822"/>
+          </a:xfrm>
+          <a:prstGeom prst="straightConnector1">
+            <a:avLst/>
+          </a:prstGeom>
+          <a:ln>
+            <a:tailEnd type="triangle"/>
+          </a:ln>
+        </p:spPr>
+        <p:style>
+          <a:lnRef idx="1">
+            <a:schemeClr val="accent1"/>
+          </a:lnRef>
+          <a:fillRef idx="0">
+            <a:schemeClr val="accent1"/>
+          </a:fillRef>
+          <a:effectRef idx="0">
+            <a:schemeClr val="accent1"/>
+          </a:effectRef>
+          <a:fontRef idx="minor">
+            <a:schemeClr val="tx1"/>
+          </a:fontRef>
+        </p:style>
+      </p:cxnSp>
+      <p:cxnSp>
+        <p:nvCxnSpPr>
+          <p:cNvPr id="14" name="Straight Arrow Connector 13">
+            <a:extLst>
+              <a:ext uri="{FF2B5EF4-FFF2-40B4-BE49-F238E27FC236}">
+                <a16:creationId xmlns="" xmlns:a16="http://schemas.microsoft.com/office/drawing/2014/main" id="{5C625B7B-4A1E-46C5-9082-4FEC89B30DA9}"/>
+              </a:ext>
+            </a:extLst>
+          </p:cNvPr>
+          <p:cNvCxnSpPr>
+            <a:stCxn id="29" idx="1"/>
+            <a:endCxn id="32" idx="3"/>
+          </p:cNvCxnSpPr>
+          <p:nvPr/>
+        </p:nvCxnSpPr>
+        <p:spPr>
+          <a:xfrm flipH="1">
+            <a:off x="6554061" y="4770030"/>
+            <a:ext cx="825021" cy="1287907"/>
+          </a:xfrm>
+          <a:prstGeom prst="straightConnector1">
+            <a:avLst/>
+          </a:prstGeom>
+          <a:ln>
+            <a:tailEnd type="triangle"/>
+          </a:ln>
+        </p:spPr>
+        <p:style>
+          <a:lnRef idx="1">
+            <a:schemeClr val="accent1"/>
+          </a:lnRef>
+          <a:fillRef idx="0">
+            <a:schemeClr val="accent1"/>
+          </a:fillRef>
+          <a:effectRef idx="0">
+            <a:schemeClr val="accent1"/>
+          </a:effectRef>
+          <a:fontRef idx="minor">
+            <a:schemeClr val="tx1"/>
+          </a:fontRef>
+        </p:style>
+      </p:cxnSp>
+    </p:spTree>
+    <p:extLst>
+      <p:ext uri="{BB962C8B-B14F-4D97-AF65-F5344CB8AC3E}">
+        <p14:creationId xmlns:p14="http://schemas.microsoft.com/office/powerpoint/2010/main" val="3730933740"/>
+      </p:ext>
+    </p:extLst>
+  </p:cSld>
+  <p:clrMapOvr>
+    <a:masterClrMapping/>
+  </p:clrMapOvr>
+</p:sld>
+</file>
+
+<file path=ppt/slides/slide6.xml><?xml version="1.0" encoding="utf-8"?>
+<p:sld xmlns:a="http://schemas.openxmlformats.org/drawingml/2006/main" xmlns:r="http://schemas.openxmlformats.org/officeDocument/2006/relationships" xmlns:p="http://schemas.openxmlformats.org/presentationml/2006/main">
+  <p:cSld>
+    <p:spTree>
+      <p:nvGrpSpPr>
+        <p:cNvPr id="1" name=""/>
+        <p:cNvGrpSpPr/>
+        <p:nvPr/>
+      </p:nvGrpSpPr>
+      <p:grpSpPr>
+        <a:xfrm>
+          <a:off x="0" y="0"/>
+          <a:ext cx="0" cy="0"/>
+          <a:chOff x="0" y="0"/>
+          <a:chExt cx="0" cy="0"/>
+        </a:xfrm>
+      </p:grpSpPr>
+      <p:sp>
+        <p:nvSpPr>
+          <p:cNvPr id="4" name="Rectangle 3"/>
+          <p:cNvSpPr/>
+          <p:nvPr/>
+        </p:nvSpPr>
+        <p:spPr>
+          <a:xfrm>
+            <a:off x="4199670" y="832269"/>
+            <a:ext cx="1494797" cy="991056"/>
+          </a:xfrm>
+          <a:prstGeom prst="rect">
+            <a:avLst/>
+          </a:prstGeom>
+        </p:spPr>
+        <p:style>
+          <a:lnRef idx="2">
+            <a:schemeClr val="accent1">
+              <a:shade val="50000"/>
+            </a:schemeClr>
+          </a:lnRef>
+          <a:fillRef idx="1">
+            <a:schemeClr val="accent1"/>
+          </a:fillRef>
+          <a:effectRef idx="0">
+            <a:schemeClr val="accent1"/>
+          </a:effectRef>
+          <a:fontRef idx="minor">
+            <a:schemeClr val="lt1"/>
+          </a:fontRef>
+        </p:style>
+        <p:txBody>
+          <a:bodyPr rtlCol="0" anchor="ctr"/>
+          <a:lstStyle/>
+          <a:p>
+            <a:pPr algn="ctr"/>
+            <a:r>
+              <a:rPr lang="en-US" sz="1000" dirty="0"/>
+              <a:t>com.tlw8253.dao</a:t>
+            </a:r>
+          </a:p>
+          <a:p>
+            <a:pPr algn="ctr"/>
+            <a:r>
+              <a:rPr lang="en-US" sz="1000" dirty="0"/>
+              <a:t>&lt;&lt; interface &gt;&gt;</a:t>
+            </a:r>
+          </a:p>
+          <a:p>
+            <a:pPr algn="ctr"/>
+            <a:r>
+              <a:rPr lang="en-US" dirty="0" err="1"/>
+              <a:t>ClientDAO</a:t>
+            </a:r>
+            <a:endParaRPr lang="en-US" dirty="0"/>
+          </a:p>
+        </p:txBody>
+      </p:sp>
+      <p:sp>
+        <p:nvSpPr>
+          <p:cNvPr id="5" name="Rectangle 4"/>
+          <p:cNvSpPr/>
+          <p:nvPr/>
+        </p:nvSpPr>
+        <p:spPr>
+          <a:xfrm>
+            <a:off x="1039424" y="2278701"/>
+            <a:ext cx="1494797" cy="991056"/>
+          </a:xfrm>
+          <a:prstGeom prst="rect">
+            <a:avLst/>
+          </a:prstGeom>
+        </p:spPr>
+        <p:style>
+          <a:lnRef idx="2">
+            <a:schemeClr val="accent1">
+              <a:shade val="50000"/>
+            </a:schemeClr>
+          </a:lnRef>
+          <a:fillRef idx="1">
+            <a:schemeClr val="accent1"/>
+          </a:fillRef>
+          <a:effectRef idx="0">
+            <a:schemeClr val="accent1"/>
+          </a:effectRef>
+          <a:fontRef idx="minor">
+            <a:schemeClr val="lt1"/>
+          </a:fontRef>
+        </p:style>
+        <p:txBody>
+          <a:bodyPr rtlCol="0" anchor="ctr"/>
+          <a:lstStyle/>
+          <a:p>
+            <a:pPr algn="ctr"/>
+            <a:r>
               <a:rPr lang="en-US" sz="1000" dirty="0"/>
               <a:t>com.tlw8253.model</a:t>
             </a:r>
@@ -8050,7 +9387,7 @@
           <p:cNvPr id="11" name="TextBox 10">
             <a:extLst>
               <a:ext uri="{FF2B5EF4-FFF2-40B4-BE49-F238E27FC236}">
-                <a16:creationId xmlns:a16="http://schemas.microsoft.com/office/drawing/2014/main" xmlns="" id="{E0BBD6C8-C8F2-40C5-AA64-85961A11ADC2}"/>
+                <a16:creationId xmlns="" xmlns:a16="http://schemas.microsoft.com/office/drawing/2014/main" id="{E0BBD6C8-C8F2-40C5-AA64-85961A11ADC2}"/>
               </a:ext>
             </a:extLst>
           </p:cNvPr>

</xml_diff>

<commit_message>
20210803 update to files from tlw87.
</commit_message>
<xml_diff>
--- a/docs/Project 0.pptx
+++ b/docs/Project 0.pptx
@@ -10,7 +10,8 @@
     <p:sldId id="260" r:id="rId4"/>
     <p:sldId id="259" r:id="rId5"/>
     <p:sldId id="261" r:id="rId6"/>
-    <p:sldId id="258" r:id="rId7"/>
+    <p:sldId id="262" r:id="rId7"/>
+    <p:sldId id="258" r:id="rId8"/>
   </p:sldIdLst>
   <p:sldSz cx="12192000" cy="6858000"/>
   <p:notesSz cx="6858000" cy="9144000"/>
@@ -139,7 +140,7 @@
           <p:cNvPr id="2" name="Title 1">
             <a:extLst>
               <a:ext uri="{FF2B5EF4-FFF2-40B4-BE49-F238E27FC236}">
-                <a16:creationId xmlns="" xmlns:a16="http://schemas.microsoft.com/office/drawing/2014/main" id="{67106D7E-D400-44F1-9A1A-D68CE501C73D}"/>
+                <a16:creationId xmlns:a16="http://schemas.microsoft.com/office/drawing/2014/main" id="{67106D7E-D400-44F1-9A1A-D68CE501C73D}"/>
               </a:ext>
             </a:extLst>
           </p:cNvPr>
@@ -176,7 +177,7 @@
           <p:cNvPr id="3" name="Subtitle 2">
             <a:extLst>
               <a:ext uri="{FF2B5EF4-FFF2-40B4-BE49-F238E27FC236}">
-                <a16:creationId xmlns="" xmlns:a16="http://schemas.microsoft.com/office/drawing/2014/main" id="{A5FDE527-E621-4639-A0C7-E1E9B0DFBCEC}"/>
+                <a16:creationId xmlns:a16="http://schemas.microsoft.com/office/drawing/2014/main" id="{A5FDE527-E621-4639-A0C7-E1E9B0DFBCEC}"/>
               </a:ext>
             </a:extLst>
           </p:cNvPr>
@@ -246,7 +247,7 @@
           <p:cNvPr id="4" name="Date Placeholder 3">
             <a:extLst>
               <a:ext uri="{FF2B5EF4-FFF2-40B4-BE49-F238E27FC236}">
-                <a16:creationId xmlns="" xmlns:a16="http://schemas.microsoft.com/office/drawing/2014/main" id="{E109CE88-B989-4109-89C8-36F7C245DB1C}"/>
+                <a16:creationId xmlns:a16="http://schemas.microsoft.com/office/drawing/2014/main" id="{E109CE88-B989-4109-89C8-36F7C245DB1C}"/>
               </a:ext>
             </a:extLst>
           </p:cNvPr>
@@ -275,7 +276,7 @@
           <p:cNvPr id="5" name="Footer Placeholder 4">
             <a:extLst>
               <a:ext uri="{FF2B5EF4-FFF2-40B4-BE49-F238E27FC236}">
-                <a16:creationId xmlns="" xmlns:a16="http://schemas.microsoft.com/office/drawing/2014/main" id="{0841498F-B991-43D3-B408-CC35D8EFCF37}"/>
+                <a16:creationId xmlns:a16="http://schemas.microsoft.com/office/drawing/2014/main" id="{0841498F-B991-43D3-B408-CC35D8EFCF37}"/>
               </a:ext>
             </a:extLst>
           </p:cNvPr>
@@ -300,7 +301,7 @@
           <p:cNvPr id="6" name="Slide Number Placeholder 5">
             <a:extLst>
               <a:ext uri="{FF2B5EF4-FFF2-40B4-BE49-F238E27FC236}">
-                <a16:creationId xmlns="" xmlns:a16="http://schemas.microsoft.com/office/drawing/2014/main" id="{01754CB8-17B1-45A0-AE7D-755EAA1B69D8}"/>
+                <a16:creationId xmlns:a16="http://schemas.microsoft.com/office/drawing/2014/main" id="{01754CB8-17B1-45A0-AE7D-755EAA1B69D8}"/>
               </a:ext>
             </a:extLst>
           </p:cNvPr>
@@ -359,7 +360,7 @@
           <p:cNvPr id="2" name="Title 1">
             <a:extLst>
               <a:ext uri="{FF2B5EF4-FFF2-40B4-BE49-F238E27FC236}">
-                <a16:creationId xmlns="" xmlns:a16="http://schemas.microsoft.com/office/drawing/2014/main" id="{E7A7B055-5DC2-440D-83C1-CAAE8E9A8E14}"/>
+                <a16:creationId xmlns:a16="http://schemas.microsoft.com/office/drawing/2014/main" id="{E7A7B055-5DC2-440D-83C1-CAAE8E9A8E14}"/>
               </a:ext>
             </a:extLst>
           </p:cNvPr>
@@ -387,7 +388,7 @@
           <p:cNvPr id="3" name="Vertical Text Placeholder 2">
             <a:extLst>
               <a:ext uri="{FF2B5EF4-FFF2-40B4-BE49-F238E27FC236}">
-                <a16:creationId xmlns="" xmlns:a16="http://schemas.microsoft.com/office/drawing/2014/main" id="{65710707-423D-4F9D-A49D-6C764C562553}"/>
+                <a16:creationId xmlns:a16="http://schemas.microsoft.com/office/drawing/2014/main" id="{65710707-423D-4F9D-A49D-6C764C562553}"/>
               </a:ext>
             </a:extLst>
           </p:cNvPr>
@@ -444,7 +445,7 @@
           <p:cNvPr id="4" name="Date Placeholder 3">
             <a:extLst>
               <a:ext uri="{FF2B5EF4-FFF2-40B4-BE49-F238E27FC236}">
-                <a16:creationId xmlns="" xmlns:a16="http://schemas.microsoft.com/office/drawing/2014/main" id="{98B6F7EF-D1BE-4437-85F3-99626E37E4EF}"/>
+                <a16:creationId xmlns:a16="http://schemas.microsoft.com/office/drawing/2014/main" id="{98B6F7EF-D1BE-4437-85F3-99626E37E4EF}"/>
               </a:ext>
             </a:extLst>
           </p:cNvPr>
@@ -473,7 +474,7 @@
           <p:cNvPr id="5" name="Footer Placeholder 4">
             <a:extLst>
               <a:ext uri="{FF2B5EF4-FFF2-40B4-BE49-F238E27FC236}">
-                <a16:creationId xmlns="" xmlns:a16="http://schemas.microsoft.com/office/drawing/2014/main" id="{D890AA9B-E479-4209-B245-83608F3D4013}"/>
+                <a16:creationId xmlns:a16="http://schemas.microsoft.com/office/drawing/2014/main" id="{D890AA9B-E479-4209-B245-83608F3D4013}"/>
               </a:ext>
             </a:extLst>
           </p:cNvPr>
@@ -498,7 +499,7 @@
           <p:cNvPr id="6" name="Slide Number Placeholder 5">
             <a:extLst>
               <a:ext uri="{FF2B5EF4-FFF2-40B4-BE49-F238E27FC236}">
-                <a16:creationId xmlns="" xmlns:a16="http://schemas.microsoft.com/office/drawing/2014/main" id="{0E4976E4-E15A-4296-A430-633D2BB9142B}"/>
+                <a16:creationId xmlns:a16="http://schemas.microsoft.com/office/drawing/2014/main" id="{0E4976E4-E15A-4296-A430-633D2BB9142B}"/>
               </a:ext>
             </a:extLst>
           </p:cNvPr>
@@ -557,7 +558,7 @@
           <p:cNvPr id="2" name="Vertical Title 1">
             <a:extLst>
               <a:ext uri="{FF2B5EF4-FFF2-40B4-BE49-F238E27FC236}">
-                <a16:creationId xmlns="" xmlns:a16="http://schemas.microsoft.com/office/drawing/2014/main" id="{66F63CF5-8DEE-4BB2-A2A5-5C16FEBE1AD5}"/>
+                <a16:creationId xmlns:a16="http://schemas.microsoft.com/office/drawing/2014/main" id="{66F63CF5-8DEE-4BB2-A2A5-5C16FEBE1AD5}"/>
               </a:ext>
             </a:extLst>
           </p:cNvPr>
@@ -590,7 +591,7 @@
           <p:cNvPr id="3" name="Vertical Text Placeholder 2">
             <a:extLst>
               <a:ext uri="{FF2B5EF4-FFF2-40B4-BE49-F238E27FC236}">
-                <a16:creationId xmlns="" xmlns:a16="http://schemas.microsoft.com/office/drawing/2014/main" id="{E0D5EBA5-94AF-4373-B032-A40FF73C7575}"/>
+                <a16:creationId xmlns:a16="http://schemas.microsoft.com/office/drawing/2014/main" id="{E0D5EBA5-94AF-4373-B032-A40FF73C7575}"/>
               </a:ext>
             </a:extLst>
           </p:cNvPr>
@@ -652,7 +653,7 @@
           <p:cNvPr id="4" name="Date Placeholder 3">
             <a:extLst>
               <a:ext uri="{FF2B5EF4-FFF2-40B4-BE49-F238E27FC236}">
-                <a16:creationId xmlns="" xmlns:a16="http://schemas.microsoft.com/office/drawing/2014/main" id="{7426B8E1-6758-4F5E-B618-96641332600B}"/>
+                <a16:creationId xmlns:a16="http://schemas.microsoft.com/office/drawing/2014/main" id="{7426B8E1-6758-4F5E-B618-96641332600B}"/>
               </a:ext>
             </a:extLst>
           </p:cNvPr>
@@ -681,7 +682,7 @@
           <p:cNvPr id="5" name="Footer Placeholder 4">
             <a:extLst>
               <a:ext uri="{FF2B5EF4-FFF2-40B4-BE49-F238E27FC236}">
-                <a16:creationId xmlns="" xmlns:a16="http://schemas.microsoft.com/office/drawing/2014/main" id="{F65E330E-2A7E-482D-AE0F-70EA5A29958B}"/>
+                <a16:creationId xmlns:a16="http://schemas.microsoft.com/office/drawing/2014/main" id="{F65E330E-2A7E-482D-AE0F-70EA5A29958B}"/>
               </a:ext>
             </a:extLst>
           </p:cNvPr>
@@ -706,7 +707,7 @@
           <p:cNvPr id="6" name="Slide Number Placeholder 5">
             <a:extLst>
               <a:ext uri="{FF2B5EF4-FFF2-40B4-BE49-F238E27FC236}">
-                <a16:creationId xmlns="" xmlns:a16="http://schemas.microsoft.com/office/drawing/2014/main" id="{B8000005-FC38-4A6C-9D09-7945EFA08160}"/>
+                <a16:creationId xmlns:a16="http://schemas.microsoft.com/office/drawing/2014/main" id="{B8000005-FC38-4A6C-9D09-7945EFA08160}"/>
               </a:ext>
             </a:extLst>
           </p:cNvPr>
@@ -765,7 +766,7 @@
           <p:cNvPr id="2" name="Title 1">
             <a:extLst>
               <a:ext uri="{FF2B5EF4-FFF2-40B4-BE49-F238E27FC236}">
-                <a16:creationId xmlns="" xmlns:a16="http://schemas.microsoft.com/office/drawing/2014/main" id="{91D0002C-766B-44B4-A24C-BE6DE6C7BA4C}"/>
+                <a16:creationId xmlns:a16="http://schemas.microsoft.com/office/drawing/2014/main" id="{91D0002C-766B-44B4-A24C-BE6DE6C7BA4C}"/>
               </a:ext>
             </a:extLst>
           </p:cNvPr>
@@ -793,7 +794,7 @@
           <p:cNvPr id="3" name="Content Placeholder 2">
             <a:extLst>
               <a:ext uri="{FF2B5EF4-FFF2-40B4-BE49-F238E27FC236}">
-                <a16:creationId xmlns="" xmlns:a16="http://schemas.microsoft.com/office/drawing/2014/main" id="{3455BAA9-6C7B-4874-AD76-BD466F64802D}"/>
+                <a16:creationId xmlns:a16="http://schemas.microsoft.com/office/drawing/2014/main" id="{3455BAA9-6C7B-4874-AD76-BD466F64802D}"/>
               </a:ext>
             </a:extLst>
           </p:cNvPr>
@@ -850,7 +851,7 @@
           <p:cNvPr id="4" name="Date Placeholder 3">
             <a:extLst>
               <a:ext uri="{FF2B5EF4-FFF2-40B4-BE49-F238E27FC236}">
-                <a16:creationId xmlns="" xmlns:a16="http://schemas.microsoft.com/office/drawing/2014/main" id="{8776BDAF-D8F2-4A61-904D-094BB4545702}"/>
+                <a16:creationId xmlns:a16="http://schemas.microsoft.com/office/drawing/2014/main" id="{8776BDAF-D8F2-4A61-904D-094BB4545702}"/>
               </a:ext>
             </a:extLst>
           </p:cNvPr>
@@ -879,7 +880,7 @@
           <p:cNvPr id="5" name="Footer Placeholder 4">
             <a:extLst>
               <a:ext uri="{FF2B5EF4-FFF2-40B4-BE49-F238E27FC236}">
-                <a16:creationId xmlns="" xmlns:a16="http://schemas.microsoft.com/office/drawing/2014/main" id="{F89C5665-4384-4706-9BD2-9F42B05C96BC}"/>
+                <a16:creationId xmlns:a16="http://schemas.microsoft.com/office/drawing/2014/main" id="{F89C5665-4384-4706-9BD2-9F42B05C96BC}"/>
               </a:ext>
             </a:extLst>
           </p:cNvPr>
@@ -904,7 +905,7 @@
           <p:cNvPr id="6" name="Slide Number Placeholder 5">
             <a:extLst>
               <a:ext uri="{FF2B5EF4-FFF2-40B4-BE49-F238E27FC236}">
-                <a16:creationId xmlns="" xmlns:a16="http://schemas.microsoft.com/office/drawing/2014/main" id="{7DCAD73E-CAB3-4BA7-905E-D203691D0418}"/>
+                <a16:creationId xmlns:a16="http://schemas.microsoft.com/office/drawing/2014/main" id="{7DCAD73E-CAB3-4BA7-905E-D203691D0418}"/>
               </a:ext>
             </a:extLst>
           </p:cNvPr>
@@ -963,7 +964,7 @@
           <p:cNvPr id="2" name="Title 1">
             <a:extLst>
               <a:ext uri="{FF2B5EF4-FFF2-40B4-BE49-F238E27FC236}">
-                <a16:creationId xmlns="" xmlns:a16="http://schemas.microsoft.com/office/drawing/2014/main" id="{A9880706-F7FA-4EC3-A022-9D6C7CEC3692}"/>
+                <a16:creationId xmlns:a16="http://schemas.microsoft.com/office/drawing/2014/main" id="{A9880706-F7FA-4EC3-A022-9D6C7CEC3692}"/>
               </a:ext>
             </a:extLst>
           </p:cNvPr>
@@ -1000,7 +1001,7 @@
           <p:cNvPr id="3" name="Text Placeholder 2">
             <a:extLst>
               <a:ext uri="{FF2B5EF4-FFF2-40B4-BE49-F238E27FC236}">
-                <a16:creationId xmlns="" xmlns:a16="http://schemas.microsoft.com/office/drawing/2014/main" id="{FA8A65D0-3DF5-448D-82EC-A967682A0DED}"/>
+                <a16:creationId xmlns:a16="http://schemas.microsoft.com/office/drawing/2014/main" id="{FA8A65D0-3DF5-448D-82EC-A967682A0DED}"/>
               </a:ext>
             </a:extLst>
           </p:cNvPr>
@@ -1125,7 +1126,7 @@
           <p:cNvPr id="4" name="Date Placeholder 3">
             <a:extLst>
               <a:ext uri="{FF2B5EF4-FFF2-40B4-BE49-F238E27FC236}">
-                <a16:creationId xmlns="" xmlns:a16="http://schemas.microsoft.com/office/drawing/2014/main" id="{600EA68C-01A6-487D-9D6E-1D1B4EAC0440}"/>
+                <a16:creationId xmlns:a16="http://schemas.microsoft.com/office/drawing/2014/main" id="{600EA68C-01A6-487D-9D6E-1D1B4EAC0440}"/>
               </a:ext>
             </a:extLst>
           </p:cNvPr>
@@ -1154,7 +1155,7 @@
           <p:cNvPr id="5" name="Footer Placeholder 4">
             <a:extLst>
               <a:ext uri="{FF2B5EF4-FFF2-40B4-BE49-F238E27FC236}">
-                <a16:creationId xmlns="" xmlns:a16="http://schemas.microsoft.com/office/drawing/2014/main" id="{6E6527CB-4FFD-4569-A82C-5EDC311B2CF6}"/>
+                <a16:creationId xmlns:a16="http://schemas.microsoft.com/office/drawing/2014/main" id="{6E6527CB-4FFD-4569-A82C-5EDC311B2CF6}"/>
               </a:ext>
             </a:extLst>
           </p:cNvPr>
@@ -1179,7 +1180,7 @@
           <p:cNvPr id="6" name="Slide Number Placeholder 5">
             <a:extLst>
               <a:ext uri="{FF2B5EF4-FFF2-40B4-BE49-F238E27FC236}">
-                <a16:creationId xmlns="" xmlns:a16="http://schemas.microsoft.com/office/drawing/2014/main" id="{24B19E5B-5A98-4381-A01D-01F81FD65792}"/>
+                <a16:creationId xmlns:a16="http://schemas.microsoft.com/office/drawing/2014/main" id="{24B19E5B-5A98-4381-A01D-01F81FD65792}"/>
               </a:ext>
             </a:extLst>
           </p:cNvPr>
@@ -1238,7 +1239,7 @@
           <p:cNvPr id="2" name="Title 1">
             <a:extLst>
               <a:ext uri="{FF2B5EF4-FFF2-40B4-BE49-F238E27FC236}">
-                <a16:creationId xmlns="" xmlns:a16="http://schemas.microsoft.com/office/drawing/2014/main" id="{63228B71-E923-4431-B8D2-FAE724678940}"/>
+                <a16:creationId xmlns:a16="http://schemas.microsoft.com/office/drawing/2014/main" id="{63228B71-E923-4431-B8D2-FAE724678940}"/>
               </a:ext>
             </a:extLst>
           </p:cNvPr>
@@ -1266,7 +1267,7 @@
           <p:cNvPr id="3" name="Content Placeholder 2">
             <a:extLst>
               <a:ext uri="{FF2B5EF4-FFF2-40B4-BE49-F238E27FC236}">
-                <a16:creationId xmlns="" xmlns:a16="http://schemas.microsoft.com/office/drawing/2014/main" id="{B18895E9-B7FF-4A00-955B-206CF8C73E43}"/>
+                <a16:creationId xmlns:a16="http://schemas.microsoft.com/office/drawing/2014/main" id="{B18895E9-B7FF-4A00-955B-206CF8C73E43}"/>
               </a:ext>
             </a:extLst>
           </p:cNvPr>
@@ -1328,7 +1329,7 @@
           <p:cNvPr id="4" name="Content Placeholder 3">
             <a:extLst>
               <a:ext uri="{FF2B5EF4-FFF2-40B4-BE49-F238E27FC236}">
-                <a16:creationId xmlns="" xmlns:a16="http://schemas.microsoft.com/office/drawing/2014/main" id="{DA813955-E3B9-44BC-8E1D-139269C8B48A}"/>
+                <a16:creationId xmlns:a16="http://schemas.microsoft.com/office/drawing/2014/main" id="{DA813955-E3B9-44BC-8E1D-139269C8B48A}"/>
               </a:ext>
             </a:extLst>
           </p:cNvPr>
@@ -1390,7 +1391,7 @@
           <p:cNvPr id="5" name="Date Placeholder 4">
             <a:extLst>
               <a:ext uri="{FF2B5EF4-FFF2-40B4-BE49-F238E27FC236}">
-                <a16:creationId xmlns="" xmlns:a16="http://schemas.microsoft.com/office/drawing/2014/main" id="{7E9B8EF5-28D5-4C4E-A2AB-EEA30D75DAFE}"/>
+                <a16:creationId xmlns:a16="http://schemas.microsoft.com/office/drawing/2014/main" id="{7E9B8EF5-28D5-4C4E-A2AB-EEA30D75DAFE}"/>
               </a:ext>
             </a:extLst>
           </p:cNvPr>
@@ -1419,7 +1420,7 @@
           <p:cNvPr id="6" name="Footer Placeholder 5">
             <a:extLst>
               <a:ext uri="{FF2B5EF4-FFF2-40B4-BE49-F238E27FC236}">
-                <a16:creationId xmlns="" xmlns:a16="http://schemas.microsoft.com/office/drawing/2014/main" id="{5723E678-8CB4-4335-AA04-6BD391748717}"/>
+                <a16:creationId xmlns:a16="http://schemas.microsoft.com/office/drawing/2014/main" id="{5723E678-8CB4-4335-AA04-6BD391748717}"/>
               </a:ext>
             </a:extLst>
           </p:cNvPr>
@@ -1444,7 +1445,7 @@
           <p:cNvPr id="7" name="Slide Number Placeholder 6">
             <a:extLst>
               <a:ext uri="{FF2B5EF4-FFF2-40B4-BE49-F238E27FC236}">
-                <a16:creationId xmlns="" xmlns:a16="http://schemas.microsoft.com/office/drawing/2014/main" id="{887B5567-9F4D-4AE1-92D8-769C9F7EA4F0}"/>
+                <a16:creationId xmlns:a16="http://schemas.microsoft.com/office/drawing/2014/main" id="{887B5567-9F4D-4AE1-92D8-769C9F7EA4F0}"/>
               </a:ext>
             </a:extLst>
           </p:cNvPr>
@@ -1503,7 +1504,7 @@
           <p:cNvPr id="2" name="Title 1">
             <a:extLst>
               <a:ext uri="{FF2B5EF4-FFF2-40B4-BE49-F238E27FC236}">
-                <a16:creationId xmlns="" xmlns:a16="http://schemas.microsoft.com/office/drawing/2014/main" id="{A40320A9-7C0C-45B4-BF2B-3B53B5686EBB}"/>
+                <a16:creationId xmlns:a16="http://schemas.microsoft.com/office/drawing/2014/main" id="{A40320A9-7C0C-45B4-BF2B-3B53B5686EBB}"/>
               </a:ext>
             </a:extLst>
           </p:cNvPr>
@@ -1536,7 +1537,7 @@
           <p:cNvPr id="3" name="Text Placeholder 2">
             <a:extLst>
               <a:ext uri="{FF2B5EF4-FFF2-40B4-BE49-F238E27FC236}">
-                <a16:creationId xmlns="" xmlns:a16="http://schemas.microsoft.com/office/drawing/2014/main" id="{8C440DE1-7DD6-4B1C-B961-CD2079B51F03}"/>
+                <a16:creationId xmlns:a16="http://schemas.microsoft.com/office/drawing/2014/main" id="{8C440DE1-7DD6-4B1C-B961-CD2079B51F03}"/>
               </a:ext>
             </a:extLst>
           </p:cNvPr>
@@ -1607,7 +1608,7 @@
           <p:cNvPr id="4" name="Content Placeholder 3">
             <a:extLst>
               <a:ext uri="{FF2B5EF4-FFF2-40B4-BE49-F238E27FC236}">
-                <a16:creationId xmlns="" xmlns:a16="http://schemas.microsoft.com/office/drawing/2014/main" id="{6FAFE840-CC9A-4D89-B05F-159EF756B427}"/>
+                <a16:creationId xmlns:a16="http://schemas.microsoft.com/office/drawing/2014/main" id="{6FAFE840-CC9A-4D89-B05F-159EF756B427}"/>
               </a:ext>
             </a:extLst>
           </p:cNvPr>
@@ -1669,7 +1670,7 @@
           <p:cNvPr id="5" name="Text Placeholder 4">
             <a:extLst>
               <a:ext uri="{FF2B5EF4-FFF2-40B4-BE49-F238E27FC236}">
-                <a16:creationId xmlns="" xmlns:a16="http://schemas.microsoft.com/office/drawing/2014/main" id="{4B87AADC-3401-48C6-98F6-0AB60F6DF9BE}"/>
+                <a16:creationId xmlns:a16="http://schemas.microsoft.com/office/drawing/2014/main" id="{4B87AADC-3401-48C6-98F6-0AB60F6DF9BE}"/>
               </a:ext>
             </a:extLst>
           </p:cNvPr>
@@ -1740,7 +1741,7 @@
           <p:cNvPr id="6" name="Content Placeholder 5">
             <a:extLst>
               <a:ext uri="{FF2B5EF4-FFF2-40B4-BE49-F238E27FC236}">
-                <a16:creationId xmlns="" xmlns:a16="http://schemas.microsoft.com/office/drawing/2014/main" id="{34BCF1A4-FB52-4DCD-80BC-324BA41C33CD}"/>
+                <a16:creationId xmlns:a16="http://schemas.microsoft.com/office/drawing/2014/main" id="{34BCF1A4-FB52-4DCD-80BC-324BA41C33CD}"/>
               </a:ext>
             </a:extLst>
           </p:cNvPr>
@@ -1802,7 +1803,7 @@
           <p:cNvPr id="7" name="Date Placeholder 6">
             <a:extLst>
               <a:ext uri="{FF2B5EF4-FFF2-40B4-BE49-F238E27FC236}">
-                <a16:creationId xmlns="" xmlns:a16="http://schemas.microsoft.com/office/drawing/2014/main" id="{8CFD4208-60E7-48B1-8CD0-717D5E26B827}"/>
+                <a16:creationId xmlns:a16="http://schemas.microsoft.com/office/drawing/2014/main" id="{8CFD4208-60E7-48B1-8CD0-717D5E26B827}"/>
               </a:ext>
             </a:extLst>
           </p:cNvPr>
@@ -1831,7 +1832,7 @@
           <p:cNvPr id="8" name="Footer Placeholder 7">
             <a:extLst>
               <a:ext uri="{FF2B5EF4-FFF2-40B4-BE49-F238E27FC236}">
-                <a16:creationId xmlns="" xmlns:a16="http://schemas.microsoft.com/office/drawing/2014/main" id="{94E429D1-BEB1-4D8A-91F2-CD4F80157F8D}"/>
+                <a16:creationId xmlns:a16="http://schemas.microsoft.com/office/drawing/2014/main" id="{94E429D1-BEB1-4D8A-91F2-CD4F80157F8D}"/>
               </a:ext>
             </a:extLst>
           </p:cNvPr>
@@ -1856,7 +1857,7 @@
           <p:cNvPr id="9" name="Slide Number Placeholder 8">
             <a:extLst>
               <a:ext uri="{FF2B5EF4-FFF2-40B4-BE49-F238E27FC236}">
-                <a16:creationId xmlns="" xmlns:a16="http://schemas.microsoft.com/office/drawing/2014/main" id="{6F17C19C-8370-4118-A8FC-5DDA6F84230F}"/>
+                <a16:creationId xmlns:a16="http://schemas.microsoft.com/office/drawing/2014/main" id="{6F17C19C-8370-4118-A8FC-5DDA6F84230F}"/>
               </a:ext>
             </a:extLst>
           </p:cNvPr>
@@ -1915,7 +1916,7 @@
           <p:cNvPr id="2" name="Title 1">
             <a:extLst>
               <a:ext uri="{FF2B5EF4-FFF2-40B4-BE49-F238E27FC236}">
-                <a16:creationId xmlns="" xmlns:a16="http://schemas.microsoft.com/office/drawing/2014/main" id="{252CBF36-7F99-45A9-BC35-BD2EC260CBF0}"/>
+                <a16:creationId xmlns:a16="http://schemas.microsoft.com/office/drawing/2014/main" id="{252CBF36-7F99-45A9-BC35-BD2EC260CBF0}"/>
               </a:ext>
             </a:extLst>
           </p:cNvPr>
@@ -1943,7 +1944,7 @@
           <p:cNvPr id="3" name="Date Placeholder 2">
             <a:extLst>
               <a:ext uri="{FF2B5EF4-FFF2-40B4-BE49-F238E27FC236}">
-                <a16:creationId xmlns="" xmlns:a16="http://schemas.microsoft.com/office/drawing/2014/main" id="{0D6F5F83-F07E-4501-B86B-9F96CD43993C}"/>
+                <a16:creationId xmlns:a16="http://schemas.microsoft.com/office/drawing/2014/main" id="{0D6F5F83-F07E-4501-B86B-9F96CD43993C}"/>
               </a:ext>
             </a:extLst>
           </p:cNvPr>
@@ -1972,7 +1973,7 @@
           <p:cNvPr id="4" name="Footer Placeholder 3">
             <a:extLst>
               <a:ext uri="{FF2B5EF4-FFF2-40B4-BE49-F238E27FC236}">
-                <a16:creationId xmlns="" xmlns:a16="http://schemas.microsoft.com/office/drawing/2014/main" id="{2861989B-F8E9-41FD-8E16-687424BCC266}"/>
+                <a16:creationId xmlns:a16="http://schemas.microsoft.com/office/drawing/2014/main" id="{2861989B-F8E9-41FD-8E16-687424BCC266}"/>
               </a:ext>
             </a:extLst>
           </p:cNvPr>
@@ -1997,7 +1998,7 @@
           <p:cNvPr id="5" name="Slide Number Placeholder 4">
             <a:extLst>
               <a:ext uri="{FF2B5EF4-FFF2-40B4-BE49-F238E27FC236}">
-                <a16:creationId xmlns="" xmlns:a16="http://schemas.microsoft.com/office/drawing/2014/main" id="{2026B6D7-7832-4815-95CE-5CEC39502825}"/>
+                <a16:creationId xmlns:a16="http://schemas.microsoft.com/office/drawing/2014/main" id="{2026B6D7-7832-4815-95CE-5CEC39502825}"/>
               </a:ext>
             </a:extLst>
           </p:cNvPr>
@@ -2056,7 +2057,7 @@
           <p:cNvPr id="2" name="Date Placeholder 1">
             <a:extLst>
               <a:ext uri="{FF2B5EF4-FFF2-40B4-BE49-F238E27FC236}">
-                <a16:creationId xmlns="" xmlns:a16="http://schemas.microsoft.com/office/drawing/2014/main" id="{9877919A-C4B6-46FD-A08A-9A4B867FE01A}"/>
+                <a16:creationId xmlns:a16="http://schemas.microsoft.com/office/drawing/2014/main" id="{9877919A-C4B6-46FD-A08A-9A4B867FE01A}"/>
               </a:ext>
             </a:extLst>
           </p:cNvPr>
@@ -2085,7 +2086,7 @@
           <p:cNvPr id="3" name="Footer Placeholder 2">
             <a:extLst>
               <a:ext uri="{FF2B5EF4-FFF2-40B4-BE49-F238E27FC236}">
-                <a16:creationId xmlns="" xmlns:a16="http://schemas.microsoft.com/office/drawing/2014/main" id="{9118539E-383C-4F1C-86F2-14C533A7E9FB}"/>
+                <a16:creationId xmlns:a16="http://schemas.microsoft.com/office/drawing/2014/main" id="{9118539E-383C-4F1C-86F2-14C533A7E9FB}"/>
               </a:ext>
             </a:extLst>
           </p:cNvPr>
@@ -2110,7 +2111,7 @@
           <p:cNvPr id="4" name="Slide Number Placeholder 3">
             <a:extLst>
               <a:ext uri="{FF2B5EF4-FFF2-40B4-BE49-F238E27FC236}">
-                <a16:creationId xmlns="" xmlns:a16="http://schemas.microsoft.com/office/drawing/2014/main" id="{C9A6D4E1-CA83-4214-9942-9E4617AA89BF}"/>
+                <a16:creationId xmlns:a16="http://schemas.microsoft.com/office/drawing/2014/main" id="{C9A6D4E1-CA83-4214-9942-9E4617AA89BF}"/>
               </a:ext>
             </a:extLst>
           </p:cNvPr>
@@ -2169,7 +2170,7 @@
           <p:cNvPr id="2" name="Title 1">
             <a:extLst>
               <a:ext uri="{FF2B5EF4-FFF2-40B4-BE49-F238E27FC236}">
-                <a16:creationId xmlns="" xmlns:a16="http://schemas.microsoft.com/office/drawing/2014/main" id="{046EF9B5-7A2A-4225-8817-86D028D6950C}"/>
+                <a16:creationId xmlns:a16="http://schemas.microsoft.com/office/drawing/2014/main" id="{046EF9B5-7A2A-4225-8817-86D028D6950C}"/>
               </a:ext>
             </a:extLst>
           </p:cNvPr>
@@ -2206,7 +2207,7 @@
           <p:cNvPr id="3" name="Content Placeholder 2">
             <a:extLst>
               <a:ext uri="{FF2B5EF4-FFF2-40B4-BE49-F238E27FC236}">
-                <a16:creationId xmlns="" xmlns:a16="http://schemas.microsoft.com/office/drawing/2014/main" id="{8667C390-5297-41E8-A403-22856007B051}"/>
+                <a16:creationId xmlns:a16="http://schemas.microsoft.com/office/drawing/2014/main" id="{8667C390-5297-41E8-A403-22856007B051}"/>
               </a:ext>
             </a:extLst>
           </p:cNvPr>
@@ -2296,7 +2297,7 @@
           <p:cNvPr id="4" name="Text Placeholder 3">
             <a:extLst>
               <a:ext uri="{FF2B5EF4-FFF2-40B4-BE49-F238E27FC236}">
-                <a16:creationId xmlns="" xmlns:a16="http://schemas.microsoft.com/office/drawing/2014/main" id="{8D0D2F7D-D6CD-4AB1-A3EA-CBFD2A2B3703}"/>
+                <a16:creationId xmlns:a16="http://schemas.microsoft.com/office/drawing/2014/main" id="{8D0D2F7D-D6CD-4AB1-A3EA-CBFD2A2B3703}"/>
               </a:ext>
             </a:extLst>
           </p:cNvPr>
@@ -2367,7 +2368,7 @@
           <p:cNvPr id="5" name="Date Placeholder 4">
             <a:extLst>
               <a:ext uri="{FF2B5EF4-FFF2-40B4-BE49-F238E27FC236}">
-                <a16:creationId xmlns="" xmlns:a16="http://schemas.microsoft.com/office/drawing/2014/main" id="{E17A441D-4FA7-4110-BF24-165CD3C3DAD7}"/>
+                <a16:creationId xmlns:a16="http://schemas.microsoft.com/office/drawing/2014/main" id="{E17A441D-4FA7-4110-BF24-165CD3C3DAD7}"/>
               </a:ext>
             </a:extLst>
           </p:cNvPr>
@@ -2396,7 +2397,7 @@
           <p:cNvPr id="6" name="Footer Placeholder 5">
             <a:extLst>
               <a:ext uri="{FF2B5EF4-FFF2-40B4-BE49-F238E27FC236}">
-                <a16:creationId xmlns="" xmlns:a16="http://schemas.microsoft.com/office/drawing/2014/main" id="{346102C5-5AE3-43CF-A686-1AB72B0790AB}"/>
+                <a16:creationId xmlns:a16="http://schemas.microsoft.com/office/drawing/2014/main" id="{346102C5-5AE3-43CF-A686-1AB72B0790AB}"/>
               </a:ext>
             </a:extLst>
           </p:cNvPr>
@@ -2421,7 +2422,7 @@
           <p:cNvPr id="7" name="Slide Number Placeholder 6">
             <a:extLst>
               <a:ext uri="{FF2B5EF4-FFF2-40B4-BE49-F238E27FC236}">
-                <a16:creationId xmlns="" xmlns:a16="http://schemas.microsoft.com/office/drawing/2014/main" id="{5528B3F7-462C-4500-8836-B3E5CD8DA61A}"/>
+                <a16:creationId xmlns:a16="http://schemas.microsoft.com/office/drawing/2014/main" id="{5528B3F7-462C-4500-8836-B3E5CD8DA61A}"/>
               </a:ext>
             </a:extLst>
           </p:cNvPr>
@@ -2480,7 +2481,7 @@
           <p:cNvPr id="2" name="Title 1">
             <a:extLst>
               <a:ext uri="{FF2B5EF4-FFF2-40B4-BE49-F238E27FC236}">
-                <a16:creationId xmlns="" xmlns:a16="http://schemas.microsoft.com/office/drawing/2014/main" id="{4BA10E59-DA48-4690-A956-9EB8E4E11EE5}"/>
+                <a16:creationId xmlns:a16="http://schemas.microsoft.com/office/drawing/2014/main" id="{4BA10E59-DA48-4690-A956-9EB8E4E11EE5}"/>
               </a:ext>
             </a:extLst>
           </p:cNvPr>
@@ -2517,7 +2518,7 @@
           <p:cNvPr id="3" name="Picture Placeholder 2">
             <a:extLst>
               <a:ext uri="{FF2B5EF4-FFF2-40B4-BE49-F238E27FC236}">
-                <a16:creationId xmlns="" xmlns:a16="http://schemas.microsoft.com/office/drawing/2014/main" id="{AC7AFE1E-67D1-4106-97CA-98302D42CC4D}"/>
+                <a16:creationId xmlns:a16="http://schemas.microsoft.com/office/drawing/2014/main" id="{AC7AFE1E-67D1-4106-97CA-98302D42CC4D}"/>
               </a:ext>
             </a:extLst>
           </p:cNvPr>
@@ -2584,7 +2585,7 @@
           <p:cNvPr id="4" name="Text Placeholder 3">
             <a:extLst>
               <a:ext uri="{FF2B5EF4-FFF2-40B4-BE49-F238E27FC236}">
-                <a16:creationId xmlns="" xmlns:a16="http://schemas.microsoft.com/office/drawing/2014/main" id="{67D8D73B-3D4D-42A7-9A3C-1D508E8A9B45}"/>
+                <a16:creationId xmlns:a16="http://schemas.microsoft.com/office/drawing/2014/main" id="{67D8D73B-3D4D-42A7-9A3C-1D508E8A9B45}"/>
               </a:ext>
             </a:extLst>
           </p:cNvPr>
@@ -2655,7 +2656,7 @@
           <p:cNvPr id="5" name="Date Placeholder 4">
             <a:extLst>
               <a:ext uri="{FF2B5EF4-FFF2-40B4-BE49-F238E27FC236}">
-                <a16:creationId xmlns="" xmlns:a16="http://schemas.microsoft.com/office/drawing/2014/main" id="{48C8945E-A47A-42A2-9DF6-CA6D5002F65F}"/>
+                <a16:creationId xmlns:a16="http://schemas.microsoft.com/office/drawing/2014/main" id="{48C8945E-A47A-42A2-9DF6-CA6D5002F65F}"/>
               </a:ext>
             </a:extLst>
           </p:cNvPr>
@@ -2684,7 +2685,7 @@
           <p:cNvPr id="6" name="Footer Placeholder 5">
             <a:extLst>
               <a:ext uri="{FF2B5EF4-FFF2-40B4-BE49-F238E27FC236}">
-                <a16:creationId xmlns="" xmlns:a16="http://schemas.microsoft.com/office/drawing/2014/main" id="{EB000DB4-2747-4297-B400-42A539FBDB42}"/>
+                <a16:creationId xmlns:a16="http://schemas.microsoft.com/office/drawing/2014/main" id="{EB000DB4-2747-4297-B400-42A539FBDB42}"/>
               </a:ext>
             </a:extLst>
           </p:cNvPr>
@@ -2709,7 +2710,7 @@
           <p:cNvPr id="7" name="Slide Number Placeholder 6">
             <a:extLst>
               <a:ext uri="{FF2B5EF4-FFF2-40B4-BE49-F238E27FC236}">
-                <a16:creationId xmlns="" xmlns:a16="http://schemas.microsoft.com/office/drawing/2014/main" id="{5BAD9222-F141-4803-AF73-E2DD92E2ABBC}"/>
+                <a16:creationId xmlns:a16="http://schemas.microsoft.com/office/drawing/2014/main" id="{5BAD9222-F141-4803-AF73-E2DD92E2ABBC}"/>
               </a:ext>
             </a:extLst>
           </p:cNvPr>
@@ -2773,7 +2774,7 @@
           <p:cNvPr id="2" name="Title Placeholder 1">
             <a:extLst>
               <a:ext uri="{FF2B5EF4-FFF2-40B4-BE49-F238E27FC236}">
-                <a16:creationId xmlns="" xmlns:a16="http://schemas.microsoft.com/office/drawing/2014/main" id="{5BF9D404-795C-4EA4-AD01-26740519239C}"/>
+                <a16:creationId xmlns:a16="http://schemas.microsoft.com/office/drawing/2014/main" id="{5BF9D404-795C-4EA4-AD01-26740519239C}"/>
               </a:ext>
             </a:extLst>
           </p:cNvPr>
@@ -2811,7 +2812,7 @@
           <p:cNvPr id="3" name="Text Placeholder 2">
             <a:extLst>
               <a:ext uri="{FF2B5EF4-FFF2-40B4-BE49-F238E27FC236}">
-                <a16:creationId xmlns="" xmlns:a16="http://schemas.microsoft.com/office/drawing/2014/main" id="{DE3FEC7B-48F8-4348-9BC6-68F83B859EE9}"/>
+                <a16:creationId xmlns:a16="http://schemas.microsoft.com/office/drawing/2014/main" id="{DE3FEC7B-48F8-4348-9BC6-68F83B859EE9}"/>
               </a:ext>
             </a:extLst>
           </p:cNvPr>
@@ -2878,7 +2879,7 @@
           <p:cNvPr id="4" name="Date Placeholder 3">
             <a:extLst>
               <a:ext uri="{FF2B5EF4-FFF2-40B4-BE49-F238E27FC236}">
-                <a16:creationId xmlns="" xmlns:a16="http://schemas.microsoft.com/office/drawing/2014/main" id="{31CA1A1D-E2F5-4161-A025-7B911965C2FE}"/>
+                <a16:creationId xmlns:a16="http://schemas.microsoft.com/office/drawing/2014/main" id="{31CA1A1D-E2F5-4161-A025-7B911965C2FE}"/>
               </a:ext>
             </a:extLst>
           </p:cNvPr>
@@ -2925,7 +2926,7 @@
           <p:cNvPr id="5" name="Footer Placeholder 4">
             <a:extLst>
               <a:ext uri="{FF2B5EF4-FFF2-40B4-BE49-F238E27FC236}">
-                <a16:creationId xmlns="" xmlns:a16="http://schemas.microsoft.com/office/drawing/2014/main" id="{43C7B926-18F3-4C13-AB92-764E10D324FB}"/>
+                <a16:creationId xmlns:a16="http://schemas.microsoft.com/office/drawing/2014/main" id="{43C7B926-18F3-4C13-AB92-764E10D324FB}"/>
               </a:ext>
             </a:extLst>
           </p:cNvPr>
@@ -2968,7 +2969,7 @@
           <p:cNvPr id="6" name="Slide Number Placeholder 5">
             <a:extLst>
               <a:ext uri="{FF2B5EF4-FFF2-40B4-BE49-F238E27FC236}">
-                <a16:creationId xmlns="" xmlns:a16="http://schemas.microsoft.com/office/drawing/2014/main" id="{734FA846-3BF6-46FD-80CF-34B300D244C0}"/>
+                <a16:creationId xmlns:a16="http://schemas.microsoft.com/office/drawing/2014/main" id="{734FA846-3BF6-46FD-80CF-34B300D244C0}"/>
               </a:ext>
             </a:extLst>
           </p:cNvPr>
@@ -3336,7 +3337,7 @@
           <p:cNvPr id="4" name="Rectangle 3">
             <a:extLst>
               <a:ext uri="{FF2B5EF4-FFF2-40B4-BE49-F238E27FC236}">
-                <a16:creationId xmlns="" xmlns:a16="http://schemas.microsoft.com/office/drawing/2014/main" id="{0A71868C-EF96-4004-8116-DFD1FCCEE6C3}"/>
+                <a16:creationId xmlns:a16="http://schemas.microsoft.com/office/drawing/2014/main" id="{0A71868C-EF96-4004-8116-DFD1FCCEE6C3}"/>
               </a:ext>
             </a:extLst>
           </p:cNvPr>
@@ -3392,7 +3393,7 @@
           <p:cNvPr id="5" name="Rectangle 4">
             <a:extLst>
               <a:ext uri="{FF2B5EF4-FFF2-40B4-BE49-F238E27FC236}">
-                <a16:creationId xmlns="" xmlns:a16="http://schemas.microsoft.com/office/drawing/2014/main" id="{67A88ADC-D070-420B-9A88-FDBA4865856A}"/>
+                <a16:creationId xmlns:a16="http://schemas.microsoft.com/office/drawing/2014/main" id="{67A88ADC-D070-420B-9A88-FDBA4865856A}"/>
               </a:ext>
             </a:extLst>
           </p:cNvPr>
@@ -3452,7 +3453,7 @@
           <p:cNvPr id="7" name="Straight Arrow Connector 6">
             <a:extLst>
               <a:ext uri="{FF2B5EF4-FFF2-40B4-BE49-F238E27FC236}">
-                <a16:creationId xmlns="" xmlns:a16="http://schemas.microsoft.com/office/drawing/2014/main" id="{45AD00B6-B022-4C7F-A523-E16E6292918D}"/>
+                <a16:creationId xmlns:a16="http://schemas.microsoft.com/office/drawing/2014/main" id="{45AD00B6-B022-4C7F-A523-E16E6292918D}"/>
               </a:ext>
             </a:extLst>
           </p:cNvPr>
@@ -3494,7 +3495,7 @@
           <p:cNvPr id="8" name="Rectangle 7">
             <a:extLst>
               <a:ext uri="{FF2B5EF4-FFF2-40B4-BE49-F238E27FC236}">
-                <a16:creationId xmlns="" xmlns:a16="http://schemas.microsoft.com/office/drawing/2014/main" id="{3C7A2B3E-B0CA-48CD-A6CB-935EF9D71843}"/>
+                <a16:creationId xmlns:a16="http://schemas.microsoft.com/office/drawing/2014/main" id="{3C7A2B3E-B0CA-48CD-A6CB-935EF9D71843}"/>
               </a:ext>
             </a:extLst>
           </p:cNvPr>
@@ -3554,7 +3555,7 @@
           <p:cNvPr id="9" name="TextBox 8">
             <a:extLst>
               <a:ext uri="{FF2B5EF4-FFF2-40B4-BE49-F238E27FC236}">
-                <a16:creationId xmlns="" xmlns:a16="http://schemas.microsoft.com/office/drawing/2014/main" id="{ABD7B54F-357C-489B-ADE1-DFA04BEA1686}"/>
+                <a16:creationId xmlns:a16="http://schemas.microsoft.com/office/drawing/2014/main" id="{ABD7B54F-357C-489B-ADE1-DFA04BEA1686}"/>
               </a:ext>
             </a:extLst>
           </p:cNvPr>
@@ -3589,7 +3590,7 @@
           <p:cNvPr id="10" name="Rectangle 9">
             <a:extLst>
               <a:ext uri="{FF2B5EF4-FFF2-40B4-BE49-F238E27FC236}">
-                <a16:creationId xmlns="" xmlns:a16="http://schemas.microsoft.com/office/drawing/2014/main" id="{21B869D6-66CB-4B38-975F-B7FEB6AA9B13}"/>
+                <a16:creationId xmlns:a16="http://schemas.microsoft.com/office/drawing/2014/main" id="{21B869D6-66CB-4B38-975F-B7FEB6AA9B13}"/>
               </a:ext>
             </a:extLst>
           </p:cNvPr>
@@ -3638,7 +3639,7 @@
           <p:cNvPr id="12" name="Straight Arrow Connector 11">
             <a:extLst>
               <a:ext uri="{FF2B5EF4-FFF2-40B4-BE49-F238E27FC236}">
-                <a16:creationId xmlns="" xmlns:a16="http://schemas.microsoft.com/office/drawing/2014/main" id="{78CBB1AB-C0E2-40F2-828D-F209304958AC}"/>
+                <a16:creationId xmlns:a16="http://schemas.microsoft.com/office/drawing/2014/main" id="{78CBB1AB-C0E2-40F2-828D-F209304958AC}"/>
               </a:ext>
             </a:extLst>
           </p:cNvPr>
@@ -3681,7 +3682,7 @@
           <p:cNvPr id="14" name="TextBox 13">
             <a:extLst>
               <a:ext uri="{FF2B5EF4-FFF2-40B4-BE49-F238E27FC236}">
-                <a16:creationId xmlns="" xmlns:a16="http://schemas.microsoft.com/office/drawing/2014/main" id="{E0BBD6C8-C8F2-40C5-AA64-85961A11ADC2}"/>
+                <a16:creationId xmlns:a16="http://schemas.microsoft.com/office/drawing/2014/main" id="{E0BBD6C8-C8F2-40C5-AA64-85961A11ADC2}"/>
               </a:ext>
             </a:extLst>
           </p:cNvPr>
@@ -3716,7 +3717,7 @@
           <p:cNvPr id="16" name="Straight Arrow Connector 15">
             <a:extLst>
               <a:ext uri="{FF2B5EF4-FFF2-40B4-BE49-F238E27FC236}">
-                <a16:creationId xmlns="" xmlns:a16="http://schemas.microsoft.com/office/drawing/2014/main" id="{22509349-F226-482F-AC14-E28C2411C4C3}"/>
+                <a16:creationId xmlns:a16="http://schemas.microsoft.com/office/drawing/2014/main" id="{22509349-F226-482F-AC14-E28C2411C4C3}"/>
               </a:ext>
             </a:extLst>
           </p:cNvPr>
@@ -3759,7 +3760,7 @@
           <p:cNvPr id="18" name="TextBox 17">
             <a:extLst>
               <a:ext uri="{FF2B5EF4-FFF2-40B4-BE49-F238E27FC236}">
-                <a16:creationId xmlns="" xmlns:a16="http://schemas.microsoft.com/office/drawing/2014/main" id="{E2DE2503-050C-47C3-BC73-C61D89CEB131}"/>
+                <a16:creationId xmlns:a16="http://schemas.microsoft.com/office/drawing/2014/main" id="{E2DE2503-050C-47C3-BC73-C61D89CEB131}"/>
               </a:ext>
             </a:extLst>
           </p:cNvPr>
@@ -3794,7 +3795,7 @@
           <p:cNvPr id="23" name="Straight Arrow Connector 22">
             <a:extLst>
               <a:ext uri="{FF2B5EF4-FFF2-40B4-BE49-F238E27FC236}">
-                <a16:creationId xmlns="" xmlns:a16="http://schemas.microsoft.com/office/drawing/2014/main" id="{5D314D83-3A56-4BD7-B215-19DEE4ED8C0B}"/>
+                <a16:creationId xmlns:a16="http://schemas.microsoft.com/office/drawing/2014/main" id="{5D314D83-3A56-4BD7-B215-19DEE4ED8C0B}"/>
               </a:ext>
             </a:extLst>
           </p:cNvPr>
@@ -3837,7 +3838,7 @@
           <p:cNvPr id="24" name="Straight Arrow Connector 23">
             <a:extLst>
               <a:ext uri="{FF2B5EF4-FFF2-40B4-BE49-F238E27FC236}">
-                <a16:creationId xmlns="" xmlns:a16="http://schemas.microsoft.com/office/drawing/2014/main" id="{874E7075-4C88-4378-99B9-DC474BE0CE65}"/>
+                <a16:creationId xmlns:a16="http://schemas.microsoft.com/office/drawing/2014/main" id="{874E7075-4C88-4378-99B9-DC474BE0CE65}"/>
               </a:ext>
             </a:extLst>
           </p:cNvPr>
@@ -3880,7 +3881,7 @@
           <p:cNvPr id="25" name="TextBox 24">
             <a:extLst>
               <a:ext uri="{FF2B5EF4-FFF2-40B4-BE49-F238E27FC236}">
-                <a16:creationId xmlns="" xmlns:a16="http://schemas.microsoft.com/office/drawing/2014/main" id="{171D93A1-C181-4F9C-8D75-C106DB531AB7}"/>
+                <a16:creationId xmlns:a16="http://schemas.microsoft.com/office/drawing/2014/main" id="{171D93A1-C181-4F9C-8D75-C106DB531AB7}"/>
               </a:ext>
             </a:extLst>
           </p:cNvPr>
@@ -3915,7 +3916,7 @@
           <p:cNvPr id="26" name="TextBox 25">
             <a:extLst>
               <a:ext uri="{FF2B5EF4-FFF2-40B4-BE49-F238E27FC236}">
-                <a16:creationId xmlns="" xmlns:a16="http://schemas.microsoft.com/office/drawing/2014/main" id="{03EAB749-77B2-435B-A0A3-02060FD4A06F}"/>
+                <a16:creationId xmlns:a16="http://schemas.microsoft.com/office/drawing/2014/main" id="{03EAB749-77B2-435B-A0A3-02060FD4A06F}"/>
               </a:ext>
             </a:extLst>
           </p:cNvPr>
@@ -3950,7 +3951,7 @@
           <p:cNvPr id="27" name="TextBox 26">
             <a:extLst>
               <a:ext uri="{FF2B5EF4-FFF2-40B4-BE49-F238E27FC236}">
-                <a16:creationId xmlns="" xmlns:a16="http://schemas.microsoft.com/office/drawing/2014/main" id="{7D8414B9-747D-41E7-A06D-8BBA5042C15C}"/>
+                <a16:creationId xmlns:a16="http://schemas.microsoft.com/office/drawing/2014/main" id="{7D8414B9-747D-41E7-A06D-8BBA5042C15C}"/>
               </a:ext>
             </a:extLst>
           </p:cNvPr>
@@ -3985,7 +3986,7 @@
           <p:cNvPr id="28" name="TextBox 27">
             <a:extLst>
               <a:ext uri="{FF2B5EF4-FFF2-40B4-BE49-F238E27FC236}">
-                <a16:creationId xmlns="" xmlns:a16="http://schemas.microsoft.com/office/drawing/2014/main" id="{F559714E-416D-4742-9901-ADC4D8BAC5FA}"/>
+                <a16:creationId xmlns:a16="http://schemas.microsoft.com/office/drawing/2014/main" id="{F559714E-416D-4742-9901-ADC4D8BAC5FA}"/>
               </a:ext>
             </a:extLst>
           </p:cNvPr>
@@ -4020,7 +4021,7 @@
           <p:cNvPr id="31" name="Rectangle 30">
             <a:extLst>
               <a:ext uri="{FF2B5EF4-FFF2-40B4-BE49-F238E27FC236}">
-                <a16:creationId xmlns="" xmlns:a16="http://schemas.microsoft.com/office/drawing/2014/main" id="{9061AF07-38B9-4B05-B6B2-1A74D7C0C618}"/>
+                <a16:creationId xmlns:a16="http://schemas.microsoft.com/office/drawing/2014/main" id="{9061AF07-38B9-4B05-B6B2-1A74D7C0C618}"/>
               </a:ext>
             </a:extLst>
           </p:cNvPr>
@@ -4080,7 +4081,7 @@
           <p:cNvPr id="33" name="Connector: Elbow 32">
             <a:extLst>
               <a:ext uri="{FF2B5EF4-FFF2-40B4-BE49-F238E27FC236}">
-                <a16:creationId xmlns="" xmlns:a16="http://schemas.microsoft.com/office/drawing/2014/main" id="{B367C937-E98B-4009-B48E-DBF7102DCFD1}"/>
+                <a16:creationId xmlns:a16="http://schemas.microsoft.com/office/drawing/2014/main" id="{B367C937-E98B-4009-B48E-DBF7102DCFD1}"/>
               </a:ext>
             </a:extLst>
           </p:cNvPr>
@@ -4122,7 +4123,7 @@
           <p:cNvPr id="34" name="TextBox 33">
             <a:extLst>
               <a:ext uri="{FF2B5EF4-FFF2-40B4-BE49-F238E27FC236}">
-                <a16:creationId xmlns="" xmlns:a16="http://schemas.microsoft.com/office/drawing/2014/main" id="{7FC33359-8BE1-4CD9-AD98-06C75CE8FF08}"/>
+                <a16:creationId xmlns:a16="http://schemas.microsoft.com/office/drawing/2014/main" id="{7FC33359-8BE1-4CD9-AD98-06C75CE8FF08}"/>
               </a:ext>
             </a:extLst>
           </p:cNvPr>
@@ -4157,7 +4158,7 @@
           <p:cNvPr id="35" name="Rectangle 34">
             <a:extLst>
               <a:ext uri="{FF2B5EF4-FFF2-40B4-BE49-F238E27FC236}">
-                <a16:creationId xmlns="" xmlns:a16="http://schemas.microsoft.com/office/drawing/2014/main" id="{85531841-C806-4F00-B17D-D19E7CE1C155}"/>
+                <a16:creationId xmlns:a16="http://schemas.microsoft.com/office/drawing/2014/main" id="{85531841-C806-4F00-B17D-D19E7CE1C155}"/>
               </a:ext>
             </a:extLst>
           </p:cNvPr>
@@ -4216,7 +4217,7 @@
           <p:cNvPr id="37" name="Connector: Elbow 36">
             <a:extLst>
               <a:ext uri="{FF2B5EF4-FFF2-40B4-BE49-F238E27FC236}">
-                <a16:creationId xmlns="" xmlns:a16="http://schemas.microsoft.com/office/drawing/2014/main" id="{1BFE62EC-0F5D-4135-832D-63D5DC95509C}"/>
+                <a16:creationId xmlns:a16="http://schemas.microsoft.com/office/drawing/2014/main" id="{1BFE62EC-0F5D-4135-832D-63D5DC95509C}"/>
               </a:ext>
             </a:extLst>
           </p:cNvPr>
@@ -4261,7 +4262,7 @@
           <p:cNvPr id="38" name="TextBox 37">
             <a:extLst>
               <a:ext uri="{FF2B5EF4-FFF2-40B4-BE49-F238E27FC236}">
-                <a16:creationId xmlns="" xmlns:a16="http://schemas.microsoft.com/office/drawing/2014/main" id="{892D5E6B-E445-4560-9C01-6D3C52FFC5AA}"/>
+                <a16:creationId xmlns:a16="http://schemas.microsoft.com/office/drawing/2014/main" id="{892D5E6B-E445-4560-9C01-6D3C52FFC5AA}"/>
               </a:ext>
             </a:extLst>
           </p:cNvPr>
@@ -4296,7 +4297,7 @@
           <p:cNvPr id="39" name="Rectangle 38">
             <a:extLst>
               <a:ext uri="{FF2B5EF4-FFF2-40B4-BE49-F238E27FC236}">
-                <a16:creationId xmlns="" xmlns:a16="http://schemas.microsoft.com/office/drawing/2014/main" id="{2F2BC059-EF97-4BEE-8F18-133838E3F2D8}"/>
+                <a16:creationId xmlns:a16="http://schemas.microsoft.com/office/drawing/2014/main" id="{2F2BC059-EF97-4BEE-8F18-133838E3F2D8}"/>
               </a:ext>
             </a:extLst>
           </p:cNvPr>
@@ -4345,7 +4346,7 @@
           <p:cNvPr id="44" name="TextBox 43">
             <a:extLst>
               <a:ext uri="{FF2B5EF4-FFF2-40B4-BE49-F238E27FC236}">
-                <a16:creationId xmlns="" xmlns:a16="http://schemas.microsoft.com/office/drawing/2014/main" id="{48B10C1F-BA7F-40E8-B79A-E87D7A3A66AB}"/>
+                <a16:creationId xmlns:a16="http://schemas.microsoft.com/office/drawing/2014/main" id="{48B10C1F-BA7F-40E8-B79A-E87D7A3A66AB}"/>
               </a:ext>
             </a:extLst>
           </p:cNvPr>
@@ -4442,30 +4443,24 @@
           <a:p>
             <a:pPr algn="ctr"/>
             <a:r>
-              <a:rPr lang="en-US" sz="1000" dirty="0" smtClean="0"/>
+              <a:rPr lang="en-US" sz="1000" dirty="0"/>
               <a:t>com.tlw8253.controller</a:t>
             </a:r>
-            <a:endParaRPr lang="en-US" sz="1000" dirty="0"/>
           </a:p>
           <a:p>
             <a:pPr algn="ctr"/>
             <a:r>
               <a:rPr lang="en-US" sz="1000" dirty="0"/>
-              <a:t>&lt;&lt; interface </a:t>
-            </a:r>
-            <a:r>
-              <a:rPr lang="en-US" sz="1000" dirty="0" smtClean="0"/>
-              <a:t>&gt;&gt;</a:t>
+              <a:t>&lt;&lt; interface &gt;&gt;</a:t>
             </a:r>
             <a:endParaRPr lang="en-US" sz="1200" dirty="0"/>
           </a:p>
           <a:p>
             <a:pPr algn="ctr"/>
             <a:r>
-              <a:rPr lang="en-US" dirty="0" smtClean="0"/>
+              <a:rPr lang="en-US" dirty="0"/>
               <a:t>Controller</a:t>
             </a:r>
-            <a:endParaRPr lang="en-US" dirty="0"/>
           </a:p>
         </p:txBody>
       </p:sp>
@@ -4566,7 +4561,7 @@
           <p:cNvPr id="11" name="TextBox 10">
             <a:extLst>
               <a:ext uri="{FF2B5EF4-FFF2-40B4-BE49-F238E27FC236}">
-                <a16:creationId xmlns="" xmlns:a16="http://schemas.microsoft.com/office/drawing/2014/main" id="{E0BBD6C8-C8F2-40C5-AA64-85961A11ADC2}"/>
+                <a16:creationId xmlns:a16="http://schemas.microsoft.com/office/drawing/2014/main" id="{E0BBD6C8-C8F2-40C5-AA64-85961A11ADC2}"/>
               </a:ext>
             </a:extLst>
           </p:cNvPr>
@@ -4590,10 +4585,9 @@
           <a:lstStyle/>
           <a:p>
             <a:r>
-              <a:rPr lang="en-US" sz="1200" dirty="0" smtClean="0"/>
+              <a:rPr lang="en-US" sz="1200" dirty="0"/>
               <a:t>contains</a:t>
             </a:r>
-            <a:endParaRPr lang="en-US" sz="1200" dirty="0"/>
           </a:p>
         </p:txBody>
       </p:sp>
@@ -4695,7 +4689,7 @@
           <p:cNvPr id="19" name="TextBox 18">
             <a:extLst>
               <a:ext uri="{FF2B5EF4-FFF2-40B4-BE49-F238E27FC236}">
-                <a16:creationId xmlns="" xmlns:a16="http://schemas.microsoft.com/office/drawing/2014/main" id="{E0BBD6C8-C8F2-40C5-AA64-85961A11ADC2}"/>
+                <a16:creationId xmlns:a16="http://schemas.microsoft.com/office/drawing/2014/main" id="{E0BBD6C8-C8F2-40C5-AA64-85961A11ADC2}"/>
               </a:ext>
             </a:extLst>
           </p:cNvPr>
@@ -4762,15 +4756,14 @@
           <a:p>
             <a:pPr algn="ctr"/>
             <a:r>
-              <a:rPr lang="en-US" sz="1000" dirty="0" smtClean="0"/>
+              <a:rPr lang="en-US" sz="1000" dirty="0"/>
               <a:t>com.tlw8253.controller</a:t>
             </a:r>
-            <a:endParaRPr lang="en-US" sz="1000" dirty="0"/>
-          </a:p>
-          <a:p>
-            <a:pPr algn="ctr"/>
-            <a:r>
-              <a:rPr lang="en-US" sz="1400" dirty="0" err="1" smtClean="0"/>
+          </a:p>
+          <a:p>
+            <a:pPr algn="ctr"/>
+            <a:r>
+              <a:rPr lang="en-US" sz="1400" dirty="0" err="1"/>
               <a:t>ExceptionController</a:t>
             </a:r>
             <a:endParaRPr lang="en-US" sz="1400" dirty="0"/>
@@ -4818,7 +4811,7 @@
           <p:cNvPr id="23" name="TextBox 22">
             <a:extLst>
               <a:ext uri="{FF2B5EF4-FFF2-40B4-BE49-F238E27FC236}">
-                <a16:creationId xmlns="" xmlns:a16="http://schemas.microsoft.com/office/drawing/2014/main" id="{E0BBD6C8-C8F2-40C5-AA64-85961A11ADC2}"/>
+                <a16:creationId xmlns:a16="http://schemas.microsoft.com/office/drawing/2014/main" id="{E0BBD6C8-C8F2-40C5-AA64-85961A11ADC2}"/>
               </a:ext>
             </a:extLst>
           </p:cNvPr>
@@ -4938,7 +4931,7 @@
           <p:cNvPr id="28" name="TextBox 27">
             <a:extLst>
               <a:ext uri="{FF2B5EF4-FFF2-40B4-BE49-F238E27FC236}">
-                <a16:creationId xmlns="" xmlns:a16="http://schemas.microsoft.com/office/drawing/2014/main" id="{E0BBD6C8-C8F2-40C5-AA64-85961A11ADC2}"/>
+                <a16:creationId xmlns:a16="http://schemas.microsoft.com/office/drawing/2014/main" id="{E0BBD6C8-C8F2-40C5-AA64-85961A11ADC2}"/>
               </a:ext>
             </a:extLst>
           </p:cNvPr>
@@ -5011,15 +5004,15 @@
           <a:p>
             <a:pPr algn="ctr"/>
             <a:r>
-              <a:rPr lang="en-US" sz="1000" dirty="0" err="1" smtClean="0"/>
+              <a:rPr lang="en-US" sz="1000" dirty="0" err="1"/>
               <a:t>io.javalin.http.ExceptionHandler</a:t>
             </a:r>
-            <a:endParaRPr lang="en-US" sz="1000" dirty="0" smtClean="0"/>
-          </a:p>
-          <a:p>
-            <a:pPr algn="ctr"/>
-            <a:r>
-              <a:rPr lang="en-US" dirty="0" err="1" smtClean="0"/>
+            <a:endParaRPr lang="en-US" sz="1000" dirty="0"/>
+          </a:p>
+          <a:p>
+            <a:pPr algn="ctr"/>
+            <a:r>
+              <a:rPr lang="en-US" dirty="0" err="1"/>
               <a:t>ExceptionHandler</a:t>
             </a:r>
             <a:endParaRPr lang="en-US" dirty="0"/>
@@ -5067,7 +5060,7 @@
           <p:cNvPr id="34" name="TextBox 33">
             <a:extLst>
               <a:ext uri="{FF2B5EF4-FFF2-40B4-BE49-F238E27FC236}">
-                <a16:creationId xmlns="" xmlns:a16="http://schemas.microsoft.com/office/drawing/2014/main" id="{E0BBD6C8-C8F2-40C5-AA64-85961A11ADC2}"/>
+                <a16:creationId xmlns:a16="http://schemas.microsoft.com/office/drawing/2014/main" id="{E0BBD6C8-C8F2-40C5-AA64-85961A11ADC2}"/>
               </a:ext>
             </a:extLst>
           </p:cNvPr>
@@ -5091,10 +5084,9 @@
           <a:lstStyle/>
           <a:p>
             <a:r>
-              <a:rPr lang="en-US" sz="1200" dirty="0" smtClean="0"/>
+              <a:rPr lang="en-US" sz="1200" dirty="0"/>
               <a:t>returns</a:t>
             </a:r>
-            <a:endParaRPr lang="en-US" sz="1200" dirty="0"/>
           </a:p>
         </p:txBody>
       </p:sp>
@@ -5141,22 +5133,21 @@
           <a:p>
             <a:pPr algn="ctr"/>
             <a:r>
-              <a:rPr lang="en-US" sz="1000" dirty="0" err="1" smtClean="0"/>
+              <a:rPr lang="en-US" sz="1000" dirty="0" err="1"/>
               <a:t>io.javalin.Javalin</a:t>
             </a:r>
-            <a:endParaRPr lang="en-US" sz="1000" dirty="0" smtClean="0"/>
-          </a:p>
-          <a:p>
-            <a:pPr algn="ctr"/>
-            <a:r>
-              <a:rPr lang="en-US" dirty="0" err="1" smtClean="0"/>
+            <a:endParaRPr lang="en-US" sz="1000" dirty="0"/>
+          </a:p>
+          <a:p>
+            <a:pPr algn="ctr"/>
+            <a:r>
+              <a:rPr lang="en-US" dirty="0" err="1"/>
               <a:t>Javalin</a:t>
             </a:r>
             <a:r>
-              <a:rPr lang="en-US" dirty="0" smtClean="0"/>
+              <a:rPr lang="en-US" dirty="0"/>
               <a:t> App</a:t>
             </a:r>
-            <a:endParaRPr lang="en-US" dirty="0"/>
           </a:p>
         </p:txBody>
       </p:sp>
@@ -5201,7 +5192,7 @@
           <p:cNvPr id="38" name="TextBox 37">
             <a:extLst>
               <a:ext uri="{FF2B5EF4-FFF2-40B4-BE49-F238E27FC236}">
-                <a16:creationId xmlns="" xmlns:a16="http://schemas.microsoft.com/office/drawing/2014/main" id="{E0BBD6C8-C8F2-40C5-AA64-85961A11ADC2}"/>
+                <a16:creationId xmlns:a16="http://schemas.microsoft.com/office/drawing/2014/main" id="{E0BBD6C8-C8F2-40C5-AA64-85961A11ADC2}"/>
               </a:ext>
             </a:extLst>
           </p:cNvPr>
@@ -5226,13 +5217,8 @@
           <a:p>
             <a:r>
               <a:rPr lang="en-US" sz="1200" dirty="0"/>
-              <a:t>m</a:t>
-            </a:r>
-            <a:r>
-              <a:rPr lang="en-US" sz="1200" dirty="0" smtClean="0"/>
-              <a:t>ap endpoints</a:t>
-            </a:r>
-            <a:endParaRPr lang="en-US" sz="1200" dirty="0"/>
+              <a:t>map endpoints</a:t>
+            </a:r>
           </a:p>
         </p:txBody>
       </p:sp>
@@ -5376,7 +5362,7 @@
           <p:cNvPr id="44" name="TextBox 43">
             <a:extLst>
               <a:ext uri="{FF2B5EF4-FFF2-40B4-BE49-F238E27FC236}">
-                <a16:creationId xmlns="" xmlns:a16="http://schemas.microsoft.com/office/drawing/2014/main" id="{E0BBD6C8-C8F2-40C5-AA64-85961A11ADC2}"/>
+                <a16:creationId xmlns:a16="http://schemas.microsoft.com/office/drawing/2014/main" id="{E0BBD6C8-C8F2-40C5-AA64-85961A11ADC2}"/>
               </a:ext>
             </a:extLst>
           </p:cNvPr>
@@ -5411,7 +5397,7 @@
           <p:cNvPr id="45" name="TextBox 44">
             <a:extLst>
               <a:ext uri="{FF2B5EF4-FFF2-40B4-BE49-F238E27FC236}">
-                <a16:creationId xmlns="" xmlns:a16="http://schemas.microsoft.com/office/drawing/2014/main" id="{E0BBD6C8-C8F2-40C5-AA64-85961A11ADC2}"/>
+                <a16:creationId xmlns:a16="http://schemas.microsoft.com/office/drawing/2014/main" id="{E0BBD6C8-C8F2-40C5-AA64-85961A11ADC2}"/>
               </a:ext>
             </a:extLst>
           </p:cNvPr>
@@ -5446,7 +5432,7 @@
           <p:cNvPr id="26" name="TextBox 25">
             <a:extLst>
               <a:ext uri="{FF2B5EF4-FFF2-40B4-BE49-F238E27FC236}">
-                <a16:creationId xmlns="" xmlns:a16="http://schemas.microsoft.com/office/drawing/2014/main" id="{70BF22D6-D5A2-4CCC-8E2D-329E25668556}"/>
+                <a16:creationId xmlns:a16="http://schemas.microsoft.com/office/drawing/2014/main" id="{70BF22D6-D5A2-4CCC-8E2D-329E25668556}"/>
               </a:ext>
             </a:extLst>
           </p:cNvPr>
@@ -5471,15 +5457,7 @@
           <a:p>
             <a:r>
               <a:rPr lang="en-US" dirty="0"/>
-              <a:t>Project 0 </a:t>
-            </a:r>
-            <a:r>
-              <a:rPr lang="en-US" dirty="0" smtClean="0"/>
-              <a:t>HTTP Exception </a:t>
-            </a:r>
-            <a:r>
-              <a:rPr lang="en-US" dirty="0"/>
-              <a:t>Model</a:t>
+              <a:t>Project 0 HTTP Exception Model</a:t>
             </a:r>
           </a:p>
         </p:txBody>
@@ -5586,7 +5564,7 @@
         </p:nvSpPr>
         <p:spPr>
           <a:xfrm>
-            <a:off x="619766" y="2108575"/>
+            <a:off x="2424471" y="2169255"/>
             <a:ext cx="1494797" cy="991056"/>
           </a:xfrm>
           <a:prstGeom prst="rect">
@@ -5632,15 +5610,16 @@
         <p:nvCxnSpPr>
           <p:cNvPr id="9" name="Straight Arrow Connector 8"/>
           <p:cNvCxnSpPr>
-            <a:stCxn id="5" idx="0"/>
-            <a:endCxn id="4" idx="1"/>
+            <a:cxnSpLocks/>
+            <a:stCxn id="20" idx="1"/>
+            <a:endCxn id="5" idx="3"/>
           </p:cNvCxnSpPr>
           <p:nvPr/>
         </p:nvCxnSpPr>
         <p:spPr>
-          <a:xfrm flipV="1">
-            <a:off x="1367165" y="1327797"/>
-            <a:ext cx="2832505" cy="780778"/>
+          <a:xfrm flipH="1">
+            <a:off x="3919268" y="2355357"/>
+            <a:ext cx="3400496" cy="309426"/>
           </a:xfrm>
           <a:prstGeom prst="straightConnector1">
             <a:avLst/>
@@ -5669,7 +5648,7 @@
           <p:cNvPr id="11" name="TextBox 10">
             <a:extLst>
               <a:ext uri="{FF2B5EF4-FFF2-40B4-BE49-F238E27FC236}">
-                <a16:creationId xmlns="" xmlns:a16="http://schemas.microsoft.com/office/drawing/2014/main" id="{E0BBD6C8-C8F2-40C5-AA64-85961A11ADC2}"/>
+                <a16:creationId xmlns:a16="http://schemas.microsoft.com/office/drawing/2014/main" id="{E0BBD6C8-C8F2-40C5-AA64-85961A11ADC2}"/>
               </a:ext>
             </a:extLst>
           </p:cNvPr>
@@ -5678,7 +5657,7 @@
         </p:nvSpPr>
         <p:spPr>
           <a:xfrm>
-            <a:off x="1971030" y="1426110"/>
+            <a:off x="5886806" y="1993870"/>
             <a:ext cx="728932" cy="461665"/>
           </a:xfrm>
           <a:prstGeom prst="rect">
@@ -5713,7 +5692,7 @@
         </p:nvSpPr>
         <p:spPr>
           <a:xfrm>
-            <a:off x="2593538" y="2923890"/>
+            <a:off x="5348601" y="3676774"/>
             <a:ext cx="1494797" cy="991056"/>
           </a:xfrm>
           <a:prstGeom prst="rect">
@@ -5766,15 +5745,16 @@
         <p:nvCxnSpPr>
           <p:cNvPr id="17" name="Straight Arrow Connector 16"/>
           <p:cNvCxnSpPr>
-            <a:stCxn id="4" idx="2"/>
+            <a:cxnSpLocks/>
+            <a:stCxn id="20" idx="2"/>
             <a:endCxn id="15" idx="0"/>
           </p:cNvCxnSpPr>
           <p:nvPr/>
         </p:nvCxnSpPr>
         <p:spPr>
           <a:xfrm flipH="1">
-            <a:off x="3340937" y="1823325"/>
-            <a:ext cx="1606132" cy="1100565"/>
+            <a:off x="6096000" y="2850885"/>
+            <a:ext cx="1971163" cy="825889"/>
           </a:xfrm>
           <a:prstGeom prst="straightConnector1">
             <a:avLst/>
@@ -5803,7 +5783,7 @@
           <p:cNvPr id="19" name="TextBox 18">
             <a:extLst>
               <a:ext uri="{FF2B5EF4-FFF2-40B4-BE49-F238E27FC236}">
-                <a16:creationId xmlns="" xmlns:a16="http://schemas.microsoft.com/office/drawing/2014/main" id="{E0BBD6C8-C8F2-40C5-AA64-85961A11ADC2}"/>
+                <a16:creationId xmlns:a16="http://schemas.microsoft.com/office/drawing/2014/main" id="{E0BBD6C8-C8F2-40C5-AA64-85961A11ADC2}"/>
               </a:ext>
             </a:extLst>
           </p:cNvPr>
@@ -5812,7 +5792,7 @@
         </p:nvSpPr>
         <p:spPr>
           <a:xfrm>
-            <a:off x="3541919" y="2180353"/>
+            <a:off x="6455960" y="2992266"/>
             <a:ext cx="728932" cy="276999"/>
           </a:xfrm>
           <a:prstGeom prst="rect">
@@ -5925,7 +5905,7 @@
           <p:cNvPr id="23" name="TextBox 22">
             <a:extLst>
               <a:ext uri="{FF2B5EF4-FFF2-40B4-BE49-F238E27FC236}">
-                <a16:creationId xmlns="" xmlns:a16="http://schemas.microsoft.com/office/drawing/2014/main" id="{E0BBD6C8-C8F2-40C5-AA64-85961A11ADC2}"/>
+                <a16:creationId xmlns:a16="http://schemas.microsoft.com/office/drawing/2014/main" id="{E0BBD6C8-C8F2-40C5-AA64-85961A11ADC2}"/>
               </a:ext>
             </a:extLst>
           </p:cNvPr>
@@ -6039,7 +6019,7 @@
           <p:cNvPr id="28" name="TextBox 27">
             <a:extLst>
               <a:ext uri="{FF2B5EF4-FFF2-40B4-BE49-F238E27FC236}">
-                <a16:creationId xmlns="" xmlns:a16="http://schemas.microsoft.com/office/drawing/2014/main" id="{E0BBD6C8-C8F2-40C5-AA64-85961A11ADC2}"/>
+                <a16:creationId xmlns:a16="http://schemas.microsoft.com/office/drawing/2014/main" id="{E0BBD6C8-C8F2-40C5-AA64-85961A11ADC2}"/>
               </a:ext>
             </a:extLst>
           </p:cNvPr>
@@ -6077,7 +6057,7 @@
         </p:nvSpPr>
         <p:spPr>
           <a:xfrm>
-            <a:off x="7379082" y="4274502"/>
+            <a:off x="7328788" y="5191843"/>
             <a:ext cx="1494797" cy="991056"/>
           </a:xfrm>
           <a:prstGeom prst="rect">
@@ -6131,7 +6111,7 @@
         <p:spPr>
           <a:xfrm flipH="1" flipV="1">
             <a:off x="8067163" y="2850885"/>
-            <a:ext cx="59318" cy="1423617"/>
+            <a:ext cx="9024" cy="2340958"/>
           </a:xfrm>
           <a:prstGeom prst="straightConnector1">
             <a:avLst/>
@@ -6160,7 +6140,7 @@
           <p:cNvPr id="34" name="TextBox 33">
             <a:extLst>
               <a:ext uri="{FF2B5EF4-FFF2-40B4-BE49-F238E27FC236}">
-                <a16:creationId xmlns="" xmlns:a16="http://schemas.microsoft.com/office/drawing/2014/main" id="{E0BBD6C8-C8F2-40C5-AA64-85961A11ADC2}"/>
+                <a16:creationId xmlns:a16="http://schemas.microsoft.com/office/drawing/2014/main" id="{E0BBD6C8-C8F2-40C5-AA64-85961A11ADC2}"/>
               </a:ext>
             </a:extLst>
           </p:cNvPr>
@@ -6170,7 +6150,7 @@
         <p:spPr>
           <a:xfrm>
             <a:off x="8221712" y="3239528"/>
-            <a:ext cx="1062021" cy="646331"/>
+            <a:ext cx="1062021" cy="276999"/>
           </a:xfrm>
           <a:prstGeom prst="rect">
             <a:avLst/>
@@ -6188,12 +6168,6 @@
               <a:t>contains</a:t>
             </a:r>
           </a:p>
-          <a:p>
-            <a:r>
-              <a:rPr lang="en-US" sz="1200" dirty="0"/>
-              <a:t>Implemented DAO</a:t>
-            </a:r>
-          </a:p>
         </p:txBody>
       </p:sp>
       <p:sp>
@@ -6204,7 +6178,7 @@
         </p:nvSpPr>
         <p:spPr>
           <a:xfrm>
-            <a:off x="4333820" y="4377623"/>
+            <a:off x="4088335" y="5191843"/>
             <a:ext cx="1494797" cy="991056"/>
           </a:xfrm>
           <a:prstGeom prst="rect">
@@ -6257,8 +6231,8 @@
         </p:nvCxnSpPr>
         <p:spPr>
           <a:xfrm flipH="1">
-            <a:off x="5828617" y="4770030"/>
-            <a:ext cx="1550465" cy="103121"/>
+            <a:off x="5583132" y="5687371"/>
+            <a:ext cx="1745656" cy="0"/>
           </a:xfrm>
           <a:prstGeom prst="straightConnector1">
             <a:avLst/>
@@ -6287,7 +6261,7 @@
           <p:cNvPr id="38" name="TextBox 37">
             <a:extLst>
               <a:ext uri="{FF2B5EF4-FFF2-40B4-BE49-F238E27FC236}">
-                <a16:creationId xmlns="" xmlns:a16="http://schemas.microsoft.com/office/drawing/2014/main" id="{E0BBD6C8-C8F2-40C5-AA64-85961A11ADC2}"/>
+                <a16:creationId xmlns:a16="http://schemas.microsoft.com/office/drawing/2014/main" id="{E0BBD6C8-C8F2-40C5-AA64-85961A11ADC2}"/>
               </a:ext>
             </a:extLst>
           </p:cNvPr>
@@ -6296,7 +6270,7 @@
         </p:nvSpPr>
         <p:spPr>
           <a:xfrm>
-            <a:off x="6211549" y="4503299"/>
+            <a:off x="6333485" y="5420026"/>
             <a:ext cx="728932" cy="276999"/>
           </a:xfrm>
           <a:prstGeom prst="rect">
@@ -6451,7 +6425,7 @@
           <p:cNvPr id="44" name="TextBox 43">
             <a:extLst>
               <a:ext uri="{FF2B5EF4-FFF2-40B4-BE49-F238E27FC236}">
-                <a16:creationId xmlns="" xmlns:a16="http://schemas.microsoft.com/office/drawing/2014/main" id="{E0BBD6C8-C8F2-40C5-AA64-85961A11ADC2}"/>
+                <a16:creationId xmlns:a16="http://schemas.microsoft.com/office/drawing/2014/main" id="{E0BBD6C8-C8F2-40C5-AA64-85961A11ADC2}"/>
               </a:ext>
             </a:extLst>
           </p:cNvPr>
@@ -6486,7 +6460,7 @@
           <p:cNvPr id="45" name="TextBox 44">
             <a:extLst>
               <a:ext uri="{FF2B5EF4-FFF2-40B4-BE49-F238E27FC236}">
-                <a16:creationId xmlns="" xmlns:a16="http://schemas.microsoft.com/office/drawing/2014/main" id="{E0BBD6C8-C8F2-40C5-AA64-85961A11ADC2}"/>
+                <a16:creationId xmlns:a16="http://schemas.microsoft.com/office/drawing/2014/main" id="{E0BBD6C8-C8F2-40C5-AA64-85961A11ADC2}"/>
               </a:ext>
             </a:extLst>
           </p:cNvPr>
@@ -6521,7 +6495,7 @@
           <p:cNvPr id="26" name="TextBox 25">
             <a:extLst>
               <a:ext uri="{FF2B5EF4-FFF2-40B4-BE49-F238E27FC236}">
-                <a16:creationId xmlns="" xmlns:a16="http://schemas.microsoft.com/office/drawing/2014/main" id="{70BF22D6-D5A2-4CCC-8E2D-329E25668556}"/>
+                <a16:creationId xmlns:a16="http://schemas.microsoft.com/office/drawing/2014/main" id="{70BF22D6-D5A2-4CCC-8E2D-329E25668556}"/>
               </a:ext>
             </a:extLst>
           </p:cNvPr>
@@ -6546,11 +6520,88 @@
           <a:p>
             <a:r>
               <a:rPr lang="en-US" dirty="0"/>
-              <a:t>Project 0 Generic Database Access Model</a:t>
-            </a:r>
-          </a:p>
-        </p:txBody>
-      </p:sp>
+              <a:t>Project 0 High-level Database Access Model</a:t>
+            </a:r>
+          </a:p>
+        </p:txBody>
+      </p:sp>
+      <p:sp>
+        <p:nvSpPr>
+          <p:cNvPr id="40" name="TextBox 39">
+            <a:extLst>
+              <a:ext uri="{FF2B5EF4-FFF2-40B4-BE49-F238E27FC236}">
+                <a16:creationId xmlns:a16="http://schemas.microsoft.com/office/drawing/2014/main" id="{BF7734B1-6C1B-4ADB-BBA4-2510EE97BB9D}"/>
+              </a:ext>
+            </a:extLst>
+          </p:cNvPr>
+          <p:cNvSpPr txBox="1"/>
+          <p:nvPr/>
+        </p:nvSpPr>
+        <p:spPr>
+          <a:xfrm>
+            <a:off x="4414100" y="2566142"/>
+            <a:ext cx="728932" cy="276999"/>
+          </a:xfrm>
+          <a:prstGeom prst="rect">
+            <a:avLst/>
+          </a:prstGeom>
+          <a:noFill/>
+        </p:spPr>
+        <p:txBody>
+          <a:bodyPr wrap="square" rtlCol="0">
+            <a:spAutoFit/>
+          </a:bodyPr>
+          <a:lstStyle/>
+          <a:p>
+            <a:r>
+              <a:rPr lang="en-US" sz="1200" dirty="0"/>
+              <a:t>returns </a:t>
+            </a:r>
+          </a:p>
+        </p:txBody>
+      </p:sp>
+      <p:cxnSp>
+        <p:nvCxnSpPr>
+          <p:cNvPr id="32" name="Straight Arrow Connector 31">
+            <a:extLst>
+              <a:ext uri="{FF2B5EF4-FFF2-40B4-BE49-F238E27FC236}">
+                <a16:creationId xmlns:a16="http://schemas.microsoft.com/office/drawing/2014/main" id="{5BC5C957-DD00-47FE-A727-262A8F90A864}"/>
+              </a:ext>
+            </a:extLst>
+          </p:cNvPr>
+          <p:cNvCxnSpPr>
+            <a:stCxn id="25" idx="2"/>
+            <a:endCxn id="20" idx="3"/>
+          </p:cNvCxnSpPr>
+          <p:nvPr/>
+        </p:nvCxnSpPr>
+        <p:spPr>
+          <a:xfrm flipH="1" flipV="1">
+            <a:off x="8814561" y="2355357"/>
+            <a:ext cx="1692826" cy="1077750"/>
+          </a:xfrm>
+          <a:prstGeom prst="straightConnector1">
+            <a:avLst/>
+          </a:prstGeom>
+          <a:ln>
+            <a:tailEnd type="triangle"/>
+          </a:ln>
+        </p:spPr>
+        <p:style>
+          <a:lnRef idx="1">
+            <a:schemeClr val="accent1"/>
+          </a:lnRef>
+          <a:fillRef idx="0">
+            <a:schemeClr val="accent1"/>
+          </a:fillRef>
+          <a:effectRef idx="0">
+            <a:schemeClr val="accent1"/>
+          </a:effectRef>
+          <a:fontRef idx="minor">
+            <a:schemeClr val="tx1"/>
+          </a:fontRef>
+        </p:style>
+      </p:cxnSp>
     </p:spTree>
     <p:extLst>
       <p:ext uri="{BB962C8B-B14F-4D97-AF65-F5344CB8AC3E}">
@@ -6589,7 +6640,7 @@
         </p:nvSpPr>
         <p:spPr>
           <a:xfrm>
-            <a:off x="4199670" y="832269"/>
+            <a:off x="4143775" y="723898"/>
             <a:ext cx="1494797" cy="991056"/>
           </a:xfrm>
           <a:prstGeom prst="rect">
@@ -6657,7 +6708,7 @@
         </p:nvSpPr>
         <p:spPr>
           <a:xfrm>
-            <a:off x="619766" y="2108575"/>
+            <a:off x="2462583" y="2721628"/>
             <a:ext cx="1494797" cy="991056"/>
           </a:xfrm>
           <a:prstGeom prst="rect">
@@ -6689,10 +6740,9 @@
           <a:p>
             <a:pPr algn="ctr"/>
             <a:r>
-              <a:rPr lang="en-US" sz="1000" dirty="0" smtClean="0"/>
+              <a:rPr lang="en-US" sz="1000" dirty="0"/>
               <a:t>com.tlw8253.model</a:t>
             </a:r>
-            <a:endParaRPr lang="en-US" sz="1000" dirty="0"/>
           </a:p>
           <a:p>
             <a:pPr algn="ctr"/>
@@ -6715,15 +6765,15 @@
           <p:cNvPr id="9" name="Straight Arrow Connector 8"/>
           <p:cNvCxnSpPr>
             <a:cxnSpLocks/>
-            <a:stCxn id="4" idx="1"/>
-            <a:endCxn id="5" idx="0"/>
+            <a:stCxn id="20" idx="1"/>
+            <a:endCxn id="5" idx="3"/>
           </p:cNvCxnSpPr>
           <p:nvPr/>
         </p:nvCxnSpPr>
         <p:spPr>
           <a:xfrm flipH="1">
-            <a:off x="1367165" y="1327797"/>
-            <a:ext cx="2832505" cy="780778"/>
+            <a:off x="3957380" y="2355357"/>
+            <a:ext cx="3362384" cy="861799"/>
           </a:xfrm>
           <a:prstGeom prst="straightConnector1">
             <a:avLst/>
@@ -6752,7 +6802,7 @@
           <p:cNvPr id="11" name="TextBox 10">
             <a:extLst>
               <a:ext uri="{FF2B5EF4-FFF2-40B4-BE49-F238E27FC236}">
-                <a16:creationId xmlns="" xmlns:a16="http://schemas.microsoft.com/office/drawing/2014/main" id="{E0BBD6C8-C8F2-40C5-AA64-85961A11ADC2}"/>
+                <a16:creationId xmlns:a16="http://schemas.microsoft.com/office/drawing/2014/main" id="{E0BBD6C8-C8F2-40C5-AA64-85961A11ADC2}"/>
               </a:ext>
             </a:extLst>
           </p:cNvPr>
@@ -6761,7 +6811,7 @@
         </p:nvSpPr>
         <p:spPr>
           <a:xfrm>
-            <a:off x="1971030" y="1426110"/>
+            <a:off x="4577587" y="2462225"/>
             <a:ext cx="728932" cy="461665"/>
           </a:xfrm>
           <a:prstGeom prst="rect">
@@ -6796,7 +6846,7 @@
         </p:nvSpPr>
         <p:spPr>
           <a:xfrm>
-            <a:off x="2593538" y="2923890"/>
+            <a:off x="4907226" y="3795599"/>
             <a:ext cx="1494797" cy="991056"/>
           </a:xfrm>
           <a:prstGeom prst="rect">
@@ -6861,15 +6911,16 @@
         <p:nvCxnSpPr>
           <p:cNvPr id="17" name="Straight Arrow Connector 16"/>
           <p:cNvCxnSpPr>
-            <a:stCxn id="4" idx="2"/>
+            <a:cxnSpLocks/>
+            <a:stCxn id="20" idx="1"/>
             <a:endCxn id="15" idx="0"/>
           </p:cNvCxnSpPr>
           <p:nvPr/>
         </p:nvCxnSpPr>
         <p:spPr>
           <a:xfrm flipH="1">
-            <a:off x="3340937" y="1823325"/>
-            <a:ext cx="1606132" cy="1100565"/>
+            <a:off x="5654625" y="2355357"/>
+            <a:ext cx="1665139" cy="1440242"/>
           </a:xfrm>
           <a:prstGeom prst="straightConnector1">
             <a:avLst/>
@@ -6898,7 +6949,7 @@
           <p:cNvPr id="19" name="TextBox 18">
             <a:extLst>
               <a:ext uri="{FF2B5EF4-FFF2-40B4-BE49-F238E27FC236}">
-                <a16:creationId xmlns="" xmlns:a16="http://schemas.microsoft.com/office/drawing/2014/main" id="{E0BBD6C8-C8F2-40C5-AA64-85961A11ADC2}"/>
+                <a16:creationId xmlns:a16="http://schemas.microsoft.com/office/drawing/2014/main" id="{E0BBD6C8-C8F2-40C5-AA64-85961A11ADC2}"/>
               </a:ext>
             </a:extLst>
           </p:cNvPr>
@@ -6907,7 +6958,7 @@
         </p:nvSpPr>
         <p:spPr>
           <a:xfrm>
-            <a:off x="3541919" y="2180353"/>
+            <a:off x="5777434" y="3158808"/>
             <a:ext cx="728932" cy="276999"/>
           </a:xfrm>
           <a:prstGeom prst="rect">
@@ -6986,15 +7037,16 @@
         <p:nvCxnSpPr>
           <p:cNvPr id="22" name="Straight Arrow Connector 21"/>
           <p:cNvCxnSpPr>
-            <a:stCxn id="20" idx="1"/>
+            <a:cxnSpLocks/>
+            <a:stCxn id="20" idx="0"/>
             <a:endCxn id="4" idx="3"/>
           </p:cNvCxnSpPr>
           <p:nvPr/>
         </p:nvCxnSpPr>
         <p:spPr>
           <a:xfrm flipH="1" flipV="1">
-            <a:off x="5694467" y="1327797"/>
-            <a:ext cx="1625297" cy="1027560"/>
+            <a:off x="5638572" y="1219426"/>
+            <a:ext cx="2476153" cy="640403"/>
           </a:xfrm>
           <a:prstGeom prst="straightConnector1">
             <a:avLst/>
@@ -7023,7 +7075,7 @@
           <p:cNvPr id="23" name="TextBox 22">
             <a:extLst>
               <a:ext uri="{FF2B5EF4-FFF2-40B4-BE49-F238E27FC236}">
-                <a16:creationId xmlns="" xmlns:a16="http://schemas.microsoft.com/office/drawing/2014/main" id="{E0BBD6C8-C8F2-40C5-AA64-85961A11ADC2}"/>
+                <a16:creationId xmlns:a16="http://schemas.microsoft.com/office/drawing/2014/main" id="{E0BBD6C8-C8F2-40C5-AA64-85961A11ADC2}"/>
               </a:ext>
             </a:extLst>
           </p:cNvPr>
@@ -7032,7 +7084,7 @@
         </p:nvSpPr>
         <p:spPr>
           <a:xfrm>
-            <a:off x="6166028" y="1299474"/>
+            <a:off x="6210281" y="1170628"/>
             <a:ext cx="1063847" cy="276999"/>
           </a:xfrm>
           <a:prstGeom prst="rect">
@@ -7140,7 +7192,7 @@
           <p:cNvPr id="28" name="TextBox 27">
             <a:extLst>
               <a:ext uri="{FF2B5EF4-FFF2-40B4-BE49-F238E27FC236}">
-                <a16:creationId xmlns="" xmlns:a16="http://schemas.microsoft.com/office/drawing/2014/main" id="{E0BBD6C8-C8F2-40C5-AA64-85961A11ADC2}"/>
+                <a16:creationId xmlns:a16="http://schemas.microsoft.com/office/drawing/2014/main" id="{E0BBD6C8-C8F2-40C5-AA64-85961A11ADC2}"/>
               </a:ext>
             </a:extLst>
           </p:cNvPr>
@@ -7149,7 +7201,7 @@
         </p:nvSpPr>
         <p:spPr>
           <a:xfrm>
-            <a:off x="9283733" y="2276386"/>
+            <a:off x="9315463" y="2416058"/>
             <a:ext cx="728932" cy="276999"/>
           </a:xfrm>
           <a:prstGeom prst="rect">
@@ -7178,7 +7230,7 @@
         </p:nvSpPr>
         <p:spPr>
           <a:xfrm>
-            <a:off x="7379082" y="4274502"/>
+            <a:off x="7319764" y="3583427"/>
             <a:ext cx="1494797" cy="991056"/>
           </a:xfrm>
           <a:prstGeom prst="rect">
@@ -7217,14 +7269,10 @@
           <a:p>
             <a:pPr algn="ctr"/>
             <a:r>
-              <a:rPr lang="en-US" sz="1600" dirty="0" err="1" smtClean="0"/>
-              <a:t>Account</a:t>
-            </a:r>
-            <a:r>
-              <a:rPr lang="en-US" sz="1600" dirty="0" err="1" smtClean="0"/>
-              <a:t>Service</a:t>
-            </a:r>
-            <a:endParaRPr lang="en-US" sz="1600" dirty="0"/>
+              <a:rPr lang="en-US" dirty="0" err="1"/>
+              <a:t>ClientService</a:t>
+            </a:r>
+            <a:endParaRPr lang="en-US" dirty="0"/>
           </a:p>
         </p:txBody>
       </p:sp>
@@ -7238,9 +7286,9 @@
           <p:nvPr/>
         </p:nvCxnSpPr>
         <p:spPr>
-          <a:xfrm flipH="1" flipV="1">
-            <a:off x="8114725" y="2850885"/>
-            <a:ext cx="11756" cy="1423617"/>
+          <a:xfrm flipV="1">
+            <a:off x="8067163" y="2850885"/>
+            <a:ext cx="47562" cy="732542"/>
           </a:xfrm>
           <a:prstGeom prst="straightConnector1">
             <a:avLst/>
@@ -7269,7 +7317,7 @@
           <p:cNvPr id="34" name="TextBox 33">
             <a:extLst>
               <a:ext uri="{FF2B5EF4-FFF2-40B4-BE49-F238E27FC236}">
-                <a16:creationId xmlns="" xmlns:a16="http://schemas.microsoft.com/office/drawing/2014/main" id="{E0BBD6C8-C8F2-40C5-AA64-85961A11ADC2}"/>
+                <a16:creationId xmlns:a16="http://schemas.microsoft.com/office/drawing/2014/main" id="{E0BBD6C8-C8F2-40C5-AA64-85961A11ADC2}"/>
               </a:ext>
             </a:extLst>
           </p:cNvPr>
@@ -7278,8 +7326,8 @@
         </p:nvSpPr>
         <p:spPr>
           <a:xfrm>
-            <a:off x="8221712" y="3239528"/>
-            <a:ext cx="1062021" cy="646331"/>
+            <a:off x="8138555" y="2893990"/>
+            <a:ext cx="1062021" cy="461665"/>
           </a:xfrm>
           <a:prstGeom prst="rect">
             <a:avLst/>
@@ -7298,10 +7346,7 @@
             </a:r>
           </a:p>
           <a:p>
-            <a:r>
-              <a:rPr lang="en-US" sz="1200" dirty="0"/>
-              <a:t>Implemented DAO</a:t>
-            </a:r>
+            <a:endParaRPr lang="en-US" sz="1200" dirty="0"/>
           </a:p>
         </p:txBody>
       </p:sp>
@@ -7313,7 +7358,7 @@
         </p:nvSpPr>
         <p:spPr>
           <a:xfrm>
-            <a:off x="4505165" y="3447841"/>
+            <a:off x="5066534" y="5533926"/>
             <a:ext cx="1998489" cy="657053"/>
           </a:xfrm>
           <a:prstGeom prst="rect">
@@ -7364,15 +7409,15 @@
           <p:cNvPr id="37" name="Straight Arrow Connector 36"/>
           <p:cNvCxnSpPr>
             <a:cxnSpLocks/>
-            <a:stCxn id="29" idx="1"/>
-            <a:endCxn id="35" idx="3"/>
+            <a:stCxn id="29" idx="2"/>
+            <a:endCxn id="35" idx="0"/>
           </p:cNvCxnSpPr>
           <p:nvPr/>
         </p:nvCxnSpPr>
         <p:spPr>
-          <a:xfrm flipH="1" flipV="1">
-            <a:off x="6503654" y="3776368"/>
-            <a:ext cx="875428" cy="993662"/>
+          <a:xfrm flipH="1">
+            <a:off x="6065779" y="4574483"/>
+            <a:ext cx="2001384" cy="959443"/>
           </a:xfrm>
           <a:prstGeom prst="straightConnector1">
             <a:avLst/>
@@ -7401,7 +7446,7 @@
           <p:cNvPr id="38" name="TextBox 37">
             <a:extLst>
               <a:ext uri="{FF2B5EF4-FFF2-40B4-BE49-F238E27FC236}">
-                <a16:creationId xmlns="" xmlns:a16="http://schemas.microsoft.com/office/drawing/2014/main" id="{E0BBD6C8-C8F2-40C5-AA64-85961A11ADC2}"/>
+                <a16:creationId xmlns:a16="http://schemas.microsoft.com/office/drawing/2014/main" id="{E0BBD6C8-C8F2-40C5-AA64-85961A11ADC2}"/>
               </a:ext>
             </a:extLst>
           </p:cNvPr>
@@ -7410,7 +7455,7 @@
         </p:nvSpPr>
         <p:spPr>
           <a:xfrm>
-            <a:off x="6700557" y="4617354"/>
+            <a:off x="7726478" y="4702093"/>
             <a:ext cx="728932" cy="276999"/>
           </a:xfrm>
           <a:prstGeom prst="rect">
@@ -7439,7 +7484,7 @@
         </p:nvSpPr>
         <p:spPr>
           <a:xfrm>
-            <a:off x="8909686" y="472284"/>
+            <a:off x="9588846" y="456571"/>
             <a:ext cx="1822194" cy="991056"/>
           </a:xfrm>
           <a:prstGeom prst="rect">
@@ -7496,15 +7541,16 @@
         <p:nvCxnSpPr>
           <p:cNvPr id="41" name="Straight Arrow Connector 40"/>
           <p:cNvCxnSpPr>
-            <a:stCxn id="20" idx="0"/>
+            <a:cxnSpLocks/>
+            <a:stCxn id="20" idx="3"/>
             <a:endCxn id="39" idx="1"/>
           </p:cNvCxnSpPr>
           <p:nvPr/>
         </p:nvCxnSpPr>
         <p:spPr>
           <a:xfrm flipV="1">
-            <a:off x="8114725" y="967812"/>
-            <a:ext cx="794961" cy="892017"/>
+            <a:off x="8909686" y="952099"/>
+            <a:ext cx="679160" cy="1403258"/>
           </a:xfrm>
           <a:prstGeom prst="straightConnector1">
             <a:avLst/>
@@ -7539,8 +7585,8 @@
         </p:nvCxnSpPr>
         <p:spPr>
           <a:xfrm>
-            <a:off x="9820783" y="1463340"/>
-            <a:ext cx="1013306" cy="1460550"/>
+            <a:off x="10499943" y="1447627"/>
+            <a:ext cx="334146" cy="1476263"/>
           </a:xfrm>
           <a:prstGeom prst="straightConnector1">
             <a:avLst/>
@@ -7569,7 +7615,7 @@
           <p:cNvPr id="44" name="TextBox 43">
             <a:extLst>
               <a:ext uri="{FF2B5EF4-FFF2-40B4-BE49-F238E27FC236}">
-                <a16:creationId xmlns="" xmlns:a16="http://schemas.microsoft.com/office/drawing/2014/main" id="{E0BBD6C8-C8F2-40C5-AA64-85961A11ADC2}"/>
+                <a16:creationId xmlns:a16="http://schemas.microsoft.com/office/drawing/2014/main" id="{E0BBD6C8-C8F2-40C5-AA64-85961A11ADC2}"/>
               </a:ext>
             </a:extLst>
           </p:cNvPr>
@@ -7578,7 +7624,7 @@
         </p:nvSpPr>
         <p:spPr>
           <a:xfrm>
-            <a:off x="8023790" y="1170629"/>
+            <a:off x="8764146" y="1343130"/>
             <a:ext cx="728932" cy="276999"/>
           </a:xfrm>
           <a:prstGeom prst="rect">
@@ -7604,7 +7650,7 @@
           <p:cNvPr id="45" name="TextBox 44">
             <a:extLst>
               <a:ext uri="{FF2B5EF4-FFF2-40B4-BE49-F238E27FC236}">
-                <a16:creationId xmlns="" xmlns:a16="http://schemas.microsoft.com/office/drawing/2014/main" id="{E0BBD6C8-C8F2-40C5-AA64-85961A11ADC2}"/>
+                <a16:creationId xmlns:a16="http://schemas.microsoft.com/office/drawing/2014/main" id="{E0BBD6C8-C8F2-40C5-AA64-85961A11ADC2}"/>
               </a:ext>
             </a:extLst>
           </p:cNvPr>
@@ -7613,7 +7659,7 @@
         </p:nvSpPr>
         <p:spPr>
           <a:xfrm>
-            <a:off x="10245586" y="1859829"/>
+            <a:off x="10546941" y="1826174"/>
             <a:ext cx="864099" cy="276999"/>
           </a:xfrm>
           <a:prstGeom prst="rect">
@@ -7639,7 +7685,7 @@
           <p:cNvPr id="26" name="TextBox 25">
             <a:extLst>
               <a:ext uri="{FF2B5EF4-FFF2-40B4-BE49-F238E27FC236}">
-                <a16:creationId xmlns="" xmlns:a16="http://schemas.microsoft.com/office/drawing/2014/main" id="{6C45E26E-8FEE-4439-A34B-789237C9C62C}"/>
+                <a16:creationId xmlns:a16="http://schemas.microsoft.com/office/drawing/2014/main" id="{6C45E26E-8FEE-4439-A34B-789237C9C62C}"/>
               </a:ext>
             </a:extLst>
           </p:cNvPr>
@@ -7674,7 +7720,7 @@
           <p:cNvPr id="31" name="Rectangle 30">
             <a:extLst>
               <a:ext uri="{FF2B5EF4-FFF2-40B4-BE49-F238E27FC236}">
-                <a16:creationId xmlns="" xmlns:a16="http://schemas.microsoft.com/office/drawing/2014/main" id="{6D396BFC-10E0-4935-903B-EDC457BD1755}"/>
+                <a16:creationId xmlns:a16="http://schemas.microsoft.com/office/drawing/2014/main" id="{6D396BFC-10E0-4935-903B-EDC457BD1755}"/>
               </a:ext>
             </a:extLst>
           </p:cNvPr>
@@ -7683,7 +7729,7 @@
         </p:nvSpPr>
         <p:spPr>
           <a:xfrm>
-            <a:off x="4508845" y="4540325"/>
+            <a:off x="7429489" y="5938535"/>
             <a:ext cx="1621682" cy="657053"/>
           </a:xfrm>
           <a:prstGeom prst="rect">
@@ -7734,7 +7780,7 @@
           <p:cNvPr id="32" name="Rectangle 31">
             <a:extLst>
               <a:ext uri="{FF2B5EF4-FFF2-40B4-BE49-F238E27FC236}">
-                <a16:creationId xmlns="" xmlns:a16="http://schemas.microsoft.com/office/drawing/2014/main" id="{02A645C8-F11F-438D-92DC-F6FCCA5ECFB8}"/>
+                <a16:creationId xmlns:a16="http://schemas.microsoft.com/office/drawing/2014/main" id="{02A645C8-F11F-438D-92DC-F6FCCA5ECFB8}"/>
               </a:ext>
             </a:extLst>
           </p:cNvPr>
@@ -7743,7 +7789,7 @@
         </p:nvSpPr>
         <p:spPr>
           <a:xfrm>
-            <a:off x="4505165" y="5729410"/>
+            <a:off x="9708536" y="5728663"/>
             <a:ext cx="2048896" cy="657053"/>
           </a:xfrm>
           <a:prstGeom prst="rect">
@@ -7794,20 +7840,21 @@
           <p:cNvPr id="12" name="Straight Arrow Connector 11">
             <a:extLst>
               <a:ext uri="{FF2B5EF4-FFF2-40B4-BE49-F238E27FC236}">
-                <a16:creationId xmlns="" xmlns:a16="http://schemas.microsoft.com/office/drawing/2014/main" id="{FF2076CA-F897-4293-B6CD-7408EB452156}"/>
+                <a16:creationId xmlns:a16="http://schemas.microsoft.com/office/drawing/2014/main" id="{FF2076CA-F897-4293-B6CD-7408EB452156}"/>
               </a:ext>
             </a:extLst>
           </p:cNvPr>
           <p:cNvCxnSpPr>
-            <a:stCxn id="29" idx="1"/>
-            <a:endCxn id="31" idx="3"/>
+            <a:cxnSpLocks/>
+            <a:stCxn id="29" idx="2"/>
+            <a:endCxn id="31" idx="0"/>
           </p:cNvCxnSpPr>
           <p:nvPr/>
         </p:nvCxnSpPr>
         <p:spPr>
-          <a:xfrm flipH="1">
-            <a:off x="6130527" y="4770030"/>
-            <a:ext cx="1248555" cy="98822"/>
+          <a:xfrm>
+            <a:off x="8067163" y="4574483"/>
+            <a:ext cx="173167" cy="1364052"/>
           </a:xfrm>
           <a:prstGeom prst="straightConnector1">
             <a:avLst/>
@@ -7836,20 +7883,21 @@
           <p:cNvPr id="14" name="Straight Arrow Connector 13">
             <a:extLst>
               <a:ext uri="{FF2B5EF4-FFF2-40B4-BE49-F238E27FC236}">
-                <a16:creationId xmlns="" xmlns:a16="http://schemas.microsoft.com/office/drawing/2014/main" id="{5C625B7B-4A1E-46C5-9082-4FEC89B30DA9}"/>
+                <a16:creationId xmlns:a16="http://schemas.microsoft.com/office/drawing/2014/main" id="{5C625B7B-4A1E-46C5-9082-4FEC89B30DA9}"/>
               </a:ext>
             </a:extLst>
           </p:cNvPr>
           <p:cNvCxnSpPr>
-            <a:stCxn id="29" idx="1"/>
-            <a:endCxn id="32" idx="3"/>
+            <a:cxnSpLocks/>
+            <a:stCxn id="29" idx="2"/>
+            <a:endCxn id="32" idx="0"/>
           </p:cNvCxnSpPr>
           <p:nvPr/>
         </p:nvCxnSpPr>
         <p:spPr>
-          <a:xfrm flipH="1">
-            <a:off x="6554061" y="4770030"/>
-            <a:ext cx="825021" cy="1287907"/>
+          <a:xfrm>
+            <a:off x="8067163" y="4574483"/>
+            <a:ext cx="2665821" cy="1154180"/>
           </a:xfrm>
           <a:prstGeom prst="straightConnector1">
             <a:avLst/>
@@ -7873,6 +7921,83 @@
           </a:fontRef>
         </p:style>
       </p:cxnSp>
+      <p:cxnSp>
+        <p:nvCxnSpPr>
+          <p:cNvPr id="65" name="Straight Arrow Connector 64">
+            <a:extLst>
+              <a:ext uri="{FF2B5EF4-FFF2-40B4-BE49-F238E27FC236}">
+                <a16:creationId xmlns:a16="http://schemas.microsoft.com/office/drawing/2014/main" id="{C1C9B843-1D11-4D9F-8CBF-AE00E90AA070}"/>
+              </a:ext>
+            </a:extLst>
+          </p:cNvPr>
+          <p:cNvCxnSpPr>
+            <a:stCxn id="25" idx="2"/>
+            <a:endCxn id="20" idx="3"/>
+          </p:cNvCxnSpPr>
+          <p:nvPr/>
+        </p:nvCxnSpPr>
+        <p:spPr>
+          <a:xfrm flipH="1" flipV="1">
+            <a:off x="8909686" y="2355357"/>
+            <a:ext cx="1597701" cy="1077750"/>
+          </a:xfrm>
+          <a:prstGeom prst="straightConnector1">
+            <a:avLst/>
+          </a:prstGeom>
+          <a:ln>
+            <a:tailEnd type="triangle"/>
+          </a:ln>
+        </p:spPr>
+        <p:style>
+          <a:lnRef idx="1">
+            <a:schemeClr val="accent1"/>
+          </a:lnRef>
+          <a:fillRef idx="0">
+            <a:schemeClr val="accent1"/>
+          </a:fillRef>
+          <a:effectRef idx="0">
+            <a:schemeClr val="accent1"/>
+          </a:effectRef>
+          <a:fontRef idx="minor">
+            <a:schemeClr val="tx1"/>
+          </a:fontRef>
+        </p:style>
+      </p:cxnSp>
+      <p:sp>
+        <p:nvSpPr>
+          <p:cNvPr id="66" name="TextBox 65">
+            <a:extLst>
+              <a:ext uri="{FF2B5EF4-FFF2-40B4-BE49-F238E27FC236}">
+                <a16:creationId xmlns:a16="http://schemas.microsoft.com/office/drawing/2014/main" id="{5E4B2700-0522-40EF-B035-166AA1C17D76}"/>
+              </a:ext>
+            </a:extLst>
+          </p:cNvPr>
+          <p:cNvSpPr txBox="1"/>
+          <p:nvPr/>
+        </p:nvSpPr>
+        <p:spPr>
+          <a:xfrm>
+            <a:off x="4272289" y="3075478"/>
+            <a:ext cx="728932" cy="276999"/>
+          </a:xfrm>
+          <a:prstGeom prst="rect">
+            <a:avLst/>
+          </a:prstGeom>
+          <a:noFill/>
+        </p:spPr>
+        <p:txBody>
+          <a:bodyPr wrap="square" rtlCol="0">
+            <a:spAutoFit/>
+          </a:bodyPr>
+          <a:lstStyle/>
+          <a:p>
+            <a:r>
+              <a:rPr lang="en-US" sz="1200" dirty="0"/>
+              <a:t>returns</a:t>
+            </a:r>
+          </a:p>
+        </p:txBody>
+      </p:sp>
     </p:spTree>
     <p:extLst>
       <p:ext uri="{BB962C8B-B14F-4D97-AF65-F5344CB8AC3E}">
@@ -7911,8 +8036,8 @@
         </p:nvSpPr>
         <p:spPr>
           <a:xfrm>
-            <a:off x="4199670" y="832269"/>
-            <a:ext cx="1494797" cy="991056"/>
+            <a:off x="4641012" y="340544"/>
+            <a:ext cx="1675952" cy="987253"/>
           </a:xfrm>
           <a:prstGeom prst="rect">
             <a:avLst/>
@@ -7964,14 +8089,13 @@
           <a:p>
             <a:pPr algn="ctr"/>
             <a:r>
-              <a:rPr lang="en-US" dirty="0" err="1" smtClean="0"/>
-              <a:t>Generic</a:t>
-            </a:r>
-            <a:r>
-              <a:rPr lang="en-US" dirty="0" err="1" smtClean="0"/>
-              <a:t>DAO</a:t>
-            </a:r>
-            <a:endParaRPr lang="en-US" dirty="0"/>
+              <a:rPr lang="en-US" dirty="0" err="1"/>
+              <a:t>GenericDAO</a:t>
+            </a:r>
+            <a:r>
+              <a:rPr lang="en-US" dirty="0"/>
+              <a:t>&lt;T&gt;</a:t>
+            </a:r>
           </a:p>
         </p:txBody>
       </p:sp>
@@ -7983,7 +8107,7 @@
         </p:nvSpPr>
         <p:spPr>
           <a:xfrm>
-            <a:off x="619766" y="2108575"/>
+            <a:off x="3048386" y="1998328"/>
             <a:ext cx="1494797" cy="991056"/>
           </a:xfrm>
           <a:prstGeom prst="rect">
@@ -8015,10 +8139,9 @@
           <a:p>
             <a:pPr algn="ctr"/>
             <a:r>
-              <a:rPr lang="en-US" sz="1000" dirty="0" smtClean="0"/>
+              <a:rPr lang="en-US" sz="1000" dirty="0"/>
               <a:t>com.tlw8253.model</a:t>
             </a:r>
-            <a:endParaRPr lang="en-US" sz="1000" dirty="0"/>
           </a:p>
           <a:p>
             <a:pPr algn="ctr"/>
@@ -8030,10 +8153,9 @@
           <a:p>
             <a:pPr algn="ctr"/>
             <a:r>
-              <a:rPr lang="en-US" dirty="0" smtClean="0"/>
-              <a:t>&lt;Account&gt;</a:t>
-            </a:r>
-            <a:endParaRPr lang="en-US" dirty="0"/>
+              <a:rPr lang="en-US" dirty="0"/>
+              <a:t>&lt;T&gt;</a:t>
+            </a:r>
           </a:p>
         </p:txBody>
       </p:sp>
@@ -8042,15 +8164,15 @@
           <p:cNvPr id="9" name="Straight Arrow Connector 8"/>
           <p:cNvCxnSpPr>
             <a:cxnSpLocks/>
-            <a:stCxn id="4" idx="1"/>
-            <a:endCxn id="5" idx="0"/>
+            <a:stCxn id="20" idx="1"/>
+            <a:endCxn id="5" idx="3"/>
           </p:cNvCxnSpPr>
           <p:nvPr/>
         </p:nvCxnSpPr>
         <p:spPr>
           <a:xfrm flipH="1">
-            <a:off x="1367165" y="1327797"/>
-            <a:ext cx="2832505" cy="780778"/>
+            <a:off x="4543183" y="2355357"/>
+            <a:ext cx="2776581" cy="138499"/>
           </a:xfrm>
           <a:prstGeom prst="straightConnector1">
             <a:avLst/>
@@ -8079,7 +8201,7 @@
           <p:cNvPr id="11" name="TextBox 10">
             <a:extLst>
               <a:ext uri="{FF2B5EF4-FFF2-40B4-BE49-F238E27FC236}">
-                <a16:creationId xmlns="" xmlns:a16="http://schemas.microsoft.com/office/drawing/2014/main" id="{E0BBD6C8-C8F2-40C5-AA64-85961A11ADC2}"/>
+                <a16:creationId xmlns:a16="http://schemas.microsoft.com/office/drawing/2014/main" id="{E0BBD6C8-C8F2-40C5-AA64-85961A11ADC2}"/>
               </a:ext>
             </a:extLst>
           </p:cNvPr>
@@ -8088,7 +8210,7 @@
         </p:nvSpPr>
         <p:spPr>
           <a:xfrm>
-            <a:off x="1971030" y="1426110"/>
+            <a:off x="6264130" y="1866802"/>
             <a:ext cx="728932" cy="461665"/>
           </a:xfrm>
           <a:prstGeom prst="rect">
@@ -8123,7 +8245,7 @@
         </p:nvSpPr>
         <p:spPr>
           <a:xfrm>
-            <a:off x="2593538" y="2923890"/>
+            <a:off x="2716230" y="4470786"/>
             <a:ext cx="1494797" cy="991056"/>
           </a:xfrm>
           <a:prstGeom prst="rect">
@@ -8169,28 +8291,23 @@
           <a:p>
             <a:pPr algn="ctr"/>
             <a:r>
-              <a:rPr lang="en-US" dirty="0" err="1" smtClean="0"/>
-              <a:t>Generic</a:t>
-            </a:r>
-            <a:r>
-              <a:rPr lang="en-US" dirty="0" err="1" smtClean="0"/>
+              <a:rPr lang="en-US" dirty="0"/>
               <a:t>DTO</a:t>
             </a:r>
-            <a:endParaRPr lang="en-US" dirty="0"/>
-          </a:p>
-          <a:p>
-            <a:pPr algn="ctr"/>
-            <a:r>
-              <a:rPr lang="en-US" sz="1200" dirty="0" err="1" smtClean="0"/>
-              <a:t>GenericAddDTO</a:t>
-            </a:r>
-            <a:endParaRPr lang="en-US" sz="1200" dirty="0" smtClean="0"/>
-          </a:p>
-          <a:p>
-            <a:pPr algn="ctr"/>
-            <a:r>
-              <a:rPr lang="en-US" sz="1200" dirty="0" err="1" smtClean="0"/>
-              <a:t>GenericEditDTO</a:t>
+          </a:p>
+          <a:p>
+            <a:pPr algn="ctr"/>
+            <a:r>
+              <a:rPr lang="en-US" sz="1200" dirty="0" err="1"/>
+              <a:t>AddDTO</a:t>
+            </a:r>
+            <a:endParaRPr lang="en-US" sz="1200" dirty="0"/>
+          </a:p>
+          <a:p>
+            <a:pPr algn="ctr"/>
+            <a:r>
+              <a:rPr lang="en-US" sz="1200" dirty="0" err="1"/>
+              <a:t>EditDTO</a:t>
             </a:r>
             <a:endParaRPr lang="en-US" sz="1200" dirty="0"/>
           </a:p>
@@ -8200,15 +8317,16 @@
         <p:nvCxnSpPr>
           <p:cNvPr id="17" name="Straight Arrow Connector 16"/>
           <p:cNvCxnSpPr>
-            <a:stCxn id="4" idx="2"/>
-            <a:endCxn id="15" idx="0"/>
+            <a:cxnSpLocks/>
+            <a:stCxn id="20" idx="1"/>
+            <a:endCxn id="56" idx="0"/>
           </p:cNvCxnSpPr>
           <p:nvPr/>
         </p:nvCxnSpPr>
         <p:spPr>
           <a:xfrm flipH="1">
-            <a:off x="3340937" y="1823325"/>
-            <a:ext cx="1606132" cy="1100565"/>
+            <a:off x="5893074" y="2355357"/>
+            <a:ext cx="1426690" cy="992748"/>
           </a:xfrm>
           <a:prstGeom prst="straightConnector1">
             <a:avLst/>
@@ -8237,7 +8355,7 @@
           <p:cNvPr id="19" name="TextBox 18">
             <a:extLst>
               <a:ext uri="{FF2B5EF4-FFF2-40B4-BE49-F238E27FC236}">
-                <a16:creationId xmlns="" xmlns:a16="http://schemas.microsoft.com/office/drawing/2014/main" id="{E0BBD6C8-C8F2-40C5-AA64-85961A11ADC2}"/>
+                <a16:creationId xmlns:a16="http://schemas.microsoft.com/office/drawing/2014/main" id="{E0BBD6C8-C8F2-40C5-AA64-85961A11ADC2}"/>
               </a:ext>
             </a:extLst>
           </p:cNvPr>
@@ -8246,7 +8364,7 @@
         </p:nvSpPr>
         <p:spPr>
           <a:xfrm>
-            <a:off x="3541919" y="2180353"/>
+            <a:off x="6486912" y="2833300"/>
             <a:ext cx="728932" cy="276999"/>
           </a:xfrm>
           <a:prstGeom prst="rect">
@@ -8314,8 +8432,12 @@
           <a:p>
             <a:pPr algn="ctr"/>
             <a:r>
-              <a:rPr lang="en-US" sz="1500" dirty="0" err="1" smtClean="0"/>
-              <a:t>AccountDAOImpl</a:t>
+              <a:rPr lang="en-US" sz="1500" dirty="0"/>
+              <a:t>&lt;T&gt;</a:t>
+            </a:r>
+            <a:r>
+              <a:rPr lang="en-US" sz="1500" dirty="0" err="1"/>
+              <a:t>DAOImpl</a:t>
             </a:r>
             <a:endParaRPr lang="en-US" sz="1500" dirty="0"/>
           </a:p>
@@ -8325,15 +8447,16 @@
         <p:nvCxnSpPr>
           <p:cNvPr id="22" name="Straight Arrow Connector 21"/>
           <p:cNvCxnSpPr>
-            <a:stCxn id="20" idx="1"/>
+            <a:cxnSpLocks/>
+            <a:stCxn id="20" idx="0"/>
             <a:endCxn id="4" idx="3"/>
           </p:cNvCxnSpPr>
           <p:nvPr/>
         </p:nvCxnSpPr>
         <p:spPr>
           <a:xfrm flipH="1" flipV="1">
-            <a:off x="5694467" y="1327797"/>
-            <a:ext cx="1625297" cy="1027560"/>
+            <a:off x="6316964" y="834171"/>
+            <a:ext cx="1797761" cy="1025658"/>
           </a:xfrm>
           <a:prstGeom prst="straightConnector1">
             <a:avLst/>
@@ -8362,7 +8485,7 @@
           <p:cNvPr id="23" name="TextBox 22">
             <a:extLst>
               <a:ext uri="{FF2B5EF4-FFF2-40B4-BE49-F238E27FC236}">
-                <a16:creationId xmlns="" xmlns:a16="http://schemas.microsoft.com/office/drawing/2014/main" id="{E0BBD6C8-C8F2-40C5-AA64-85961A11ADC2}"/>
+                <a16:creationId xmlns:a16="http://schemas.microsoft.com/office/drawing/2014/main" id="{E0BBD6C8-C8F2-40C5-AA64-85961A11ADC2}"/>
               </a:ext>
             </a:extLst>
           </p:cNvPr>
@@ -8372,7 +8495,7 @@
         <p:spPr>
           <a:xfrm>
             <a:off x="6166028" y="1299474"/>
-            <a:ext cx="1063847" cy="276999"/>
+            <a:ext cx="1153736" cy="276999"/>
           </a:xfrm>
           <a:prstGeom prst="rect">
             <a:avLst/>
@@ -8387,7 +8510,7 @@
           <a:p>
             <a:r>
               <a:rPr lang="en-US" sz="1200" dirty="0"/>
-              <a:t>implements</a:t>
+              <a:t>Implements&lt;T&gt;</a:t>
             </a:r>
           </a:p>
         </p:txBody>
@@ -8479,7 +8602,7 @@
           <p:cNvPr id="28" name="TextBox 27">
             <a:extLst>
               <a:ext uri="{FF2B5EF4-FFF2-40B4-BE49-F238E27FC236}">
-                <a16:creationId xmlns="" xmlns:a16="http://schemas.microsoft.com/office/drawing/2014/main" id="{E0BBD6C8-C8F2-40C5-AA64-85961A11ADC2}"/>
+                <a16:creationId xmlns:a16="http://schemas.microsoft.com/office/drawing/2014/main" id="{E0BBD6C8-C8F2-40C5-AA64-85961A11ADC2}"/>
               </a:ext>
             </a:extLst>
           </p:cNvPr>
@@ -8517,7 +8640,7 @@
         </p:nvSpPr>
         <p:spPr>
           <a:xfrm>
-            <a:off x="7379082" y="4274502"/>
+            <a:off x="7367326" y="3537028"/>
             <a:ext cx="1494797" cy="991056"/>
           </a:xfrm>
           <a:prstGeom prst="rect">
@@ -8556,10 +8679,9 @@
           <a:p>
             <a:pPr algn="ctr"/>
             <a:r>
-              <a:rPr lang="en-US" sz="1600" dirty="0" err="1" smtClean="0"/>
-              <a:t>AccountService</a:t>
-            </a:r>
-            <a:endParaRPr lang="en-US" sz="1600" dirty="0"/>
+              <a:rPr lang="en-US" sz="1600" dirty="0"/>
+              <a:t>&lt;T&gt;Service</a:t>
+            </a:r>
           </a:p>
         </p:txBody>
       </p:sp>
@@ -8573,9 +8695,9 @@
           <p:nvPr/>
         </p:nvCxnSpPr>
         <p:spPr>
-          <a:xfrm flipH="1" flipV="1">
+          <a:xfrm flipV="1">
             <a:off x="8114725" y="2850885"/>
-            <a:ext cx="11756" cy="1423617"/>
+            <a:ext cx="0" cy="686143"/>
           </a:xfrm>
           <a:prstGeom prst="straightConnector1">
             <a:avLst/>
@@ -8604,7 +8726,7 @@
           <p:cNvPr id="34" name="TextBox 33">
             <a:extLst>
               <a:ext uri="{FF2B5EF4-FFF2-40B4-BE49-F238E27FC236}">
-                <a16:creationId xmlns="" xmlns:a16="http://schemas.microsoft.com/office/drawing/2014/main" id="{E0BBD6C8-C8F2-40C5-AA64-85961A11ADC2}"/>
+                <a16:creationId xmlns:a16="http://schemas.microsoft.com/office/drawing/2014/main" id="{E0BBD6C8-C8F2-40C5-AA64-85961A11ADC2}"/>
               </a:ext>
             </a:extLst>
           </p:cNvPr>
@@ -8613,8 +8735,8 @@
         </p:nvSpPr>
         <p:spPr>
           <a:xfrm>
-            <a:off x="8221712" y="3239528"/>
-            <a:ext cx="1062021" cy="646331"/>
+            <a:off x="8051973" y="3068588"/>
+            <a:ext cx="1062021" cy="276999"/>
           </a:xfrm>
           <a:prstGeom prst="rect">
             <a:avLst/>
@@ -8632,12 +8754,6 @@
               <a:t>contains</a:t>
             </a:r>
           </a:p>
-          <a:p>
-            <a:r>
-              <a:rPr lang="en-US" sz="1200" dirty="0"/>
-              <a:t>Implemented DAO</a:t>
-            </a:r>
-          </a:p>
         </p:txBody>
       </p:sp>
       <p:sp>
@@ -8648,7 +8764,7 @@
         </p:nvSpPr>
         <p:spPr>
           <a:xfrm>
-            <a:off x="4505165" y="3447841"/>
+            <a:off x="5010221" y="5530203"/>
             <a:ext cx="1998489" cy="657053"/>
           </a:xfrm>
           <a:prstGeom prst="rect">
@@ -8699,15 +8815,15 @@
           <p:cNvPr id="37" name="Straight Arrow Connector 36"/>
           <p:cNvCxnSpPr>
             <a:cxnSpLocks/>
-            <a:stCxn id="29" idx="1"/>
-            <a:endCxn id="35" idx="3"/>
+            <a:stCxn id="29" idx="2"/>
+            <a:endCxn id="35" idx="0"/>
           </p:cNvCxnSpPr>
           <p:nvPr/>
         </p:nvCxnSpPr>
         <p:spPr>
-          <a:xfrm flipH="1" flipV="1">
-            <a:off x="6503654" y="3776368"/>
-            <a:ext cx="875428" cy="993662"/>
+          <a:xfrm flipH="1">
+            <a:off x="6009466" y="4528084"/>
+            <a:ext cx="2105259" cy="1002119"/>
           </a:xfrm>
           <a:prstGeom prst="straightConnector1">
             <a:avLst/>
@@ -8736,7 +8852,7 @@
           <p:cNvPr id="38" name="TextBox 37">
             <a:extLst>
               <a:ext uri="{FF2B5EF4-FFF2-40B4-BE49-F238E27FC236}">
-                <a16:creationId xmlns="" xmlns:a16="http://schemas.microsoft.com/office/drawing/2014/main" id="{E0BBD6C8-C8F2-40C5-AA64-85961A11ADC2}"/>
+                <a16:creationId xmlns:a16="http://schemas.microsoft.com/office/drawing/2014/main" id="{E0BBD6C8-C8F2-40C5-AA64-85961A11ADC2}"/>
               </a:ext>
             </a:extLst>
           </p:cNvPr>
@@ -8745,7 +8861,7 @@
         </p:nvSpPr>
         <p:spPr>
           <a:xfrm>
-            <a:off x="6700557" y="4617354"/>
+            <a:off x="7750258" y="4669977"/>
             <a:ext cx="728932" cy="276999"/>
           </a:xfrm>
           <a:prstGeom prst="rect">
@@ -8904,7 +9020,7 @@
           <p:cNvPr id="44" name="TextBox 43">
             <a:extLst>
               <a:ext uri="{FF2B5EF4-FFF2-40B4-BE49-F238E27FC236}">
-                <a16:creationId xmlns="" xmlns:a16="http://schemas.microsoft.com/office/drawing/2014/main" id="{E0BBD6C8-C8F2-40C5-AA64-85961A11ADC2}"/>
+                <a16:creationId xmlns:a16="http://schemas.microsoft.com/office/drawing/2014/main" id="{E0BBD6C8-C8F2-40C5-AA64-85961A11ADC2}"/>
               </a:ext>
             </a:extLst>
           </p:cNvPr>
@@ -8939,7 +9055,7 @@
           <p:cNvPr id="45" name="TextBox 44">
             <a:extLst>
               <a:ext uri="{FF2B5EF4-FFF2-40B4-BE49-F238E27FC236}">
-                <a16:creationId xmlns="" xmlns:a16="http://schemas.microsoft.com/office/drawing/2014/main" id="{E0BBD6C8-C8F2-40C5-AA64-85961A11ADC2}"/>
+                <a16:creationId xmlns:a16="http://schemas.microsoft.com/office/drawing/2014/main" id="{E0BBD6C8-C8F2-40C5-AA64-85961A11ADC2}"/>
               </a:ext>
             </a:extLst>
           </p:cNvPr>
@@ -8974,7 +9090,7 @@
           <p:cNvPr id="26" name="TextBox 25">
             <a:extLst>
               <a:ext uri="{FF2B5EF4-FFF2-40B4-BE49-F238E27FC236}">
-                <a16:creationId xmlns="" xmlns:a16="http://schemas.microsoft.com/office/drawing/2014/main" id="{6C45E26E-8FEE-4439-A34B-789237C9C62C}"/>
+                <a16:creationId xmlns:a16="http://schemas.microsoft.com/office/drawing/2014/main" id="{6C45E26E-8FEE-4439-A34B-789237C9C62C}"/>
               </a:ext>
             </a:extLst>
           </p:cNvPr>
@@ -8999,7 +9115,7 @@
           <a:p>
             <a:r>
               <a:rPr lang="en-US" dirty="0"/>
-              <a:t>Project 0 Specific Database Access Client Model</a:t>
+              <a:t>Project 0 Generic&lt;T&gt; Database Access Model</a:t>
             </a:r>
           </a:p>
         </p:txBody>
@@ -9009,7 +9125,7 @@
           <p:cNvPr id="31" name="Rectangle 30">
             <a:extLst>
               <a:ext uri="{FF2B5EF4-FFF2-40B4-BE49-F238E27FC236}">
-                <a16:creationId xmlns="" xmlns:a16="http://schemas.microsoft.com/office/drawing/2014/main" id="{6D396BFC-10E0-4935-903B-EDC457BD1755}"/>
+                <a16:creationId xmlns:a16="http://schemas.microsoft.com/office/drawing/2014/main" id="{6D396BFC-10E0-4935-903B-EDC457BD1755}"/>
               </a:ext>
             </a:extLst>
           </p:cNvPr>
@@ -9018,7 +9134,7 @@
         </p:nvSpPr>
         <p:spPr>
           <a:xfrm>
-            <a:off x="4508845" y="4540325"/>
+            <a:off x="7368605" y="5949095"/>
             <a:ext cx="1621682" cy="657053"/>
           </a:xfrm>
           <a:prstGeom prst="rect">
@@ -9069,7 +9185,7 @@
           <p:cNvPr id="32" name="Rectangle 31">
             <a:extLst>
               <a:ext uri="{FF2B5EF4-FFF2-40B4-BE49-F238E27FC236}">
-                <a16:creationId xmlns="" xmlns:a16="http://schemas.microsoft.com/office/drawing/2014/main" id="{02A645C8-F11F-438D-92DC-F6FCCA5ECFB8}"/>
+                <a16:creationId xmlns:a16="http://schemas.microsoft.com/office/drawing/2014/main" id="{02A645C8-F11F-438D-92DC-F6FCCA5ECFB8}"/>
               </a:ext>
             </a:extLst>
           </p:cNvPr>
@@ -9078,7 +9194,7 @@
         </p:nvSpPr>
         <p:spPr>
           <a:xfrm>
-            <a:off x="4342031" y="5729410"/>
+            <a:off x="9571620" y="5548255"/>
             <a:ext cx="2212030" cy="657053"/>
           </a:xfrm>
           <a:prstGeom prst="rect">
@@ -9117,8 +9233,12 @@
           <a:p>
             <a:pPr algn="ctr"/>
             <a:r>
+              <a:rPr lang="en-US" sz="1400" dirty="0"/>
+              <a:t>&lt;T&gt;</a:t>
+            </a:r>
+            <a:r>
               <a:rPr lang="en-US" sz="1400" dirty="0" err="1"/>
-              <a:t>AccountNotFoundException</a:t>
+              <a:t>NotFoundException</a:t>
             </a:r>
             <a:endParaRPr lang="en-US" sz="1400" dirty="0"/>
           </a:p>
@@ -9129,20 +9249,21 @@
           <p:cNvPr id="12" name="Straight Arrow Connector 11">
             <a:extLst>
               <a:ext uri="{FF2B5EF4-FFF2-40B4-BE49-F238E27FC236}">
-                <a16:creationId xmlns="" xmlns:a16="http://schemas.microsoft.com/office/drawing/2014/main" id="{FF2076CA-F897-4293-B6CD-7408EB452156}"/>
+                <a16:creationId xmlns:a16="http://schemas.microsoft.com/office/drawing/2014/main" id="{FF2076CA-F897-4293-B6CD-7408EB452156}"/>
               </a:ext>
             </a:extLst>
           </p:cNvPr>
           <p:cNvCxnSpPr>
-            <a:stCxn id="29" idx="1"/>
-            <a:endCxn id="31" idx="3"/>
+            <a:cxnSpLocks/>
+            <a:stCxn id="29" idx="2"/>
+            <a:endCxn id="31" idx="0"/>
           </p:cNvCxnSpPr>
           <p:nvPr/>
         </p:nvCxnSpPr>
         <p:spPr>
-          <a:xfrm flipH="1">
-            <a:off x="6130527" y="4770030"/>
-            <a:ext cx="1248555" cy="98822"/>
+          <a:xfrm>
+            <a:off x="8114725" y="4528084"/>
+            <a:ext cx="64721" cy="1421011"/>
           </a:xfrm>
           <a:prstGeom prst="straightConnector1">
             <a:avLst/>
@@ -9171,20 +9292,21 @@
           <p:cNvPr id="14" name="Straight Arrow Connector 13">
             <a:extLst>
               <a:ext uri="{FF2B5EF4-FFF2-40B4-BE49-F238E27FC236}">
-                <a16:creationId xmlns="" xmlns:a16="http://schemas.microsoft.com/office/drawing/2014/main" id="{5C625B7B-4A1E-46C5-9082-4FEC89B30DA9}"/>
+                <a16:creationId xmlns:a16="http://schemas.microsoft.com/office/drawing/2014/main" id="{5C625B7B-4A1E-46C5-9082-4FEC89B30DA9}"/>
               </a:ext>
             </a:extLst>
           </p:cNvPr>
           <p:cNvCxnSpPr>
-            <a:stCxn id="29" idx="1"/>
-            <a:endCxn id="32" idx="3"/>
+            <a:cxnSpLocks/>
+            <a:stCxn id="29" idx="2"/>
+            <a:endCxn id="32" idx="0"/>
           </p:cNvCxnSpPr>
           <p:nvPr/>
         </p:nvCxnSpPr>
         <p:spPr>
-          <a:xfrm flipH="1">
-            <a:off x="6554061" y="4770030"/>
-            <a:ext cx="825021" cy="1287907"/>
+          <a:xfrm>
+            <a:off x="8114725" y="4528084"/>
+            <a:ext cx="2562910" cy="1020171"/>
           </a:xfrm>
           <a:prstGeom prst="straightConnector1">
             <a:avLst/>
@@ -9208,6 +9330,250 @@
           </a:fontRef>
         </p:style>
       </p:cxnSp>
+      <p:cxnSp>
+        <p:nvCxnSpPr>
+          <p:cNvPr id="10" name="Straight Arrow Connector 9">
+            <a:extLst>
+              <a:ext uri="{FF2B5EF4-FFF2-40B4-BE49-F238E27FC236}">
+                <a16:creationId xmlns:a16="http://schemas.microsoft.com/office/drawing/2014/main" id="{EF2F45FB-579D-4721-9889-3C0942B8BBFD}"/>
+              </a:ext>
+            </a:extLst>
+          </p:cNvPr>
+          <p:cNvCxnSpPr>
+            <a:stCxn id="25" idx="2"/>
+            <a:endCxn id="20" idx="3"/>
+          </p:cNvCxnSpPr>
+          <p:nvPr/>
+        </p:nvCxnSpPr>
+        <p:spPr>
+          <a:xfrm flipH="1" flipV="1">
+            <a:off x="8909686" y="2355357"/>
+            <a:ext cx="1597701" cy="1077750"/>
+          </a:xfrm>
+          <a:prstGeom prst="straightConnector1">
+            <a:avLst/>
+          </a:prstGeom>
+          <a:ln>
+            <a:tailEnd type="triangle"/>
+          </a:ln>
+        </p:spPr>
+        <p:style>
+          <a:lnRef idx="1">
+            <a:schemeClr val="accent1"/>
+          </a:lnRef>
+          <a:fillRef idx="0">
+            <a:schemeClr val="accent1"/>
+          </a:fillRef>
+          <a:effectRef idx="0">
+            <a:schemeClr val="accent1"/>
+          </a:effectRef>
+          <a:fontRef idx="minor">
+            <a:schemeClr val="tx1"/>
+          </a:fontRef>
+        </p:style>
+      </p:cxnSp>
+      <p:sp>
+        <p:nvSpPr>
+          <p:cNvPr id="56" name="Rectangle 55">
+            <a:extLst>
+              <a:ext uri="{FF2B5EF4-FFF2-40B4-BE49-F238E27FC236}">
+                <a16:creationId xmlns:a16="http://schemas.microsoft.com/office/drawing/2014/main" id="{FA9C2261-AEDB-43AC-86CF-E53B84AB67B0}"/>
+              </a:ext>
+            </a:extLst>
+          </p:cNvPr>
+          <p:cNvSpPr/>
+          <p:nvPr/>
+        </p:nvSpPr>
+        <p:spPr>
+          <a:xfrm>
+            <a:off x="5145675" y="3348105"/>
+            <a:ext cx="1494797" cy="991056"/>
+          </a:xfrm>
+          <a:prstGeom prst="rect">
+            <a:avLst/>
+          </a:prstGeom>
+          <a:solidFill>
+            <a:schemeClr val="accent6"/>
+          </a:solidFill>
+        </p:spPr>
+        <p:style>
+          <a:lnRef idx="2">
+            <a:schemeClr val="accent1">
+              <a:shade val="50000"/>
+            </a:schemeClr>
+          </a:lnRef>
+          <a:fillRef idx="1">
+            <a:schemeClr val="accent1"/>
+          </a:fillRef>
+          <a:effectRef idx="0">
+            <a:schemeClr val="accent1"/>
+          </a:effectRef>
+          <a:fontRef idx="minor">
+            <a:schemeClr val="lt1"/>
+          </a:fontRef>
+        </p:style>
+        <p:txBody>
+          <a:bodyPr rtlCol="0" anchor="ctr"/>
+          <a:lstStyle/>
+          <a:p>
+            <a:pPr algn="ctr"/>
+            <a:r>
+              <a:rPr lang="en-US" sz="1000" dirty="0"/>
+              <a:t>com.tlw8253.dto</a:t>
+            </a:r>
+          </a:p>
+          <a:p>
+            <a:pPr algn="ctr"/>
+            <a:r>
+              <a:rPr lang="en-US" sz="1200" dirty="0"/>
+              <a:t>Data Transfer Object</a:t>
+            </a:r>
+          </a:p>
+          <a:p>
+            <a:pPr algn="ctr"/>
+            <a:r>
+              <a:rPr lang="en-US" dirty="0"/>
+              <a:t>&lt;T&gt;DTO</a:t>
+            </a:r>
+          </a:p>
+          <a:p>
+            <a:pPr algn="ctr"/>
+            <a:r>
+              <a:rPr lang="en-US" sz="1200" dirty="0"/>
+              <a:t>&lt;T&gt;</a:t>
+            </a:r>
+            <a:r>
+              <a:rPr lang="en-US" sz="1200" dirty="0" err="1"/>
+              <a:t>AddDTO</a:t>
+            </a:r>
+            <a:endParaRPr lang="en-US" sz="1200" dirty="0"/>
+          </a:p>
+          <a:p>
+            <a:pPr algn="ctr"/>
+            <a:r>
+              <a:rPr lang="en-US" sz="1200" dirty="0"/>
+              <a:t>&lt;T&gt;</a:t>
+            </a:r>
+            <a:r>
+              <a:rPr lang="en-US" sz="1200" dirty="0" err="1"/>
+              <a:t>EditDTO</a:t>
+            </a:r>
+            <a:endParaRPr lang="en-US" sz="1200" dirty="0"/>
+          </a:p>
+        </p:txBody>
+      </p:sp>
+      <p:cxnSp>
+        <p:nvCxnSpPr>
+          <p:cNvPr id="61" name="Straight Arrow Connector 60">
+            <a:extLst>
+              <a:ext uri="{FF2B5EF4-FFF2-40B4-BE49-F238E27FC236}">
+                <a16:creationId xmlns:a16="http://schemas.microsoft.com/office/drawing/2014/main" id="{7A03C540-BE87-4015-8AA4-52E27BB970EE}"/>
+              </a:ext>
+            </a:extLst>
+          </p:cNvPr>
+          <p:cNvCxnSpPr>
+            <a:stCxn id="56" idx="1"/>
+            <a:endCxn id="15" idx="0"/>
+          </p:cNvCxnSpPr>
+          <p:nvPr/>
+        </p:nvCxnSpPr>
+        <p:spPr>
+          <a:xfrm flipH="1">
+            <a:off x="3463629" y="3843633"/>
+            <a:ext cx="1682046" cy="627153"/>
+          </a:xfrm>
+          <a:prstGeom prst="straightConnector1">
+            <a:avLst/>
+          </a:prstGeom>
+          <a:ln>
+            <a:tailEnd type="triangle"/>
+          </a:ln>
+        </p:spPr>
+        <p:style>
+          <a:lnRef idx="1">
+            <a:schemeClr val="accent1"/>
+          </a:lnRef>
+          <a:fillRef idx="0">
+            <a:schemeClr val="accent1"/>
+          </a:fillRef>
+          <a:effectRef idx="0">
+            <a:schemeClr val="accent1"/>
+          </a:effectRef>
+          <a:fontRef idx="minor">
+            <a:schemeClr val="tx1"/>
+          </a:fontRef>
+        </p:style>
+      </p:cxnSp>
+      <p:sp>
+        <p:nvSpPr>
+          <p:cNvPr id="63" name="TextBox 62">
+            <a:extLst>
+              <a:ext uri="{FF2B5EF4-FFF2-40B4-BE49-F238E27FC236}">
+                <a16:creationId xmlns:a16="http://schemas.microsoft.com/office/drawing/2014/main" id="{6A85EB8F-D36A-4163-A076-FD01F5C08B59}"/>
+              </a:ext>
+            </a:extLst>
+          </p:cNvPr>
+          <p:cNvSpPr txBox="1"/>
+          <p:nvPr/>
+        </p:nvSpPr>
+        <p:spPr>
+          <a:xfrm>
+            <a:off x="3650878" y="3894056"/>
+            <a:ext cx="1062021" cy="276999"/>
+          </a:xfrm>
+          <a:prstGeom prst="rect">
+            <a:avLst/>
+          </a:prstGeom>
+          <a:noFill/>
+        </p:spPr>
+        <p:txBody>
+          <a:bodyPr wrap="square" rtlCol="0">
+            <a:spAutoFit/>
+          </a:bodyPr>
+          <a:lstStyle/>
+          <a:p>
+            <a:r>
+              <a:rPr lang="en-US" sz="1200" dirty="0"/>
+              <a:t>extends</a:t>
+            </a:r>
+          </a:p>
+        </p:txBody>
+      </p:sp>
+      <p:sp>
+        <p:nvSpPr>
+          <p:cNvPr id="64" name="TextBox 63">
+            <a:extLst>
+              <a:ext uri="{FF2B5EF4-FFF2-40B4-BE49-F238E27FC236}">
+                <a16:creationId xmlns:a16="http://schemas.microsoft.com/office/drawing/2014/main" id="{B306D2D8-E0F7-47AC-8F2B-DF5F03898A81}"/>
+              </a:ext>
+            </a:extLst>
+          </p:cNvPr>
+          <p:cNvSpPr txBox="1"/>
+          <p:nvPr/>
+        </p:nvSpPr>
+        <p:spPr>
+          <a:xfrm>
+            <a:off x="4817052" y="2409916"/>
+            <a:ext cx="728932" cy="276999"/>
+          </a:xfrm>
+          <a:prstGeom prst="rect">
+            <a:avLst/>
+          </a:prstGeom>
+          <a:noFill/>
+        </p:spPr>
+        <p:txBody>
+          <a:bodyPr wrap="square" rtlCol="0">
+            <a:spAutoFit/>
+          </a:bodyPr>
+          <a:lstStyle/>
+          <a:p>
+            <a:r>
+              <a:rPr lang="en-US" sz="1200" dirty="0"/>
+              <a:t>returns</a:t>
+            </a:r>
+          </a:p>
+        </p:txBody>
+      </p:sp>
     </p:spTree>
     <p:extLst>
       <p:ext uri="{BB962C8B-B14F-4D97-AF65-F5344CB8AC3E}">
@@ -9246,12 +9612,15 @@
         </p:nvSpPr>
         <p:spPr>
           <a:xfrm>
-            <a:off x="4199670" y="832269"/>
-            <a:ext cx="1494797" cy="991056"/>
-          </a:xfrm>
-          <a:prstGeom prst="rect">
-            <a:avLst/>
-          </a:prstGeom>
+            <a:off x="4494770" y="340544"/>
+            <a:ext cx="1906030" cy="991056"/>
+          </a:xfrm>
+          <a:prstGeom prst="rect">
+            <a:avLst/>
+          </a:prstGeom>
+          <a:solidFill>
+            <a:schemeClr val="accent6"/>
+          </a:solidFill>
         </p:spPr>
         <p:style>
           <a:lnRef idx="2">
@@ -9289,10 +9658,20 @@
           <a:p>
             <a:pPr algn="ctr"/>
             <a:r>
-              <a:rPr lang="en-US" dirty="0" err="1"/>
-              <a:t>ClientDAO</a:t>
-            </a:r>
-            <a:endParaRPr lang="en-US" dirty="0"/>
+              <a:rPr lang="en-US" sz="1200" dirty="0"/>
+              <a:t>Data Access Object</a:t>
+            </a:r>
+          </a:p>
+          <a:p>
+            <a:pPr algn="ctr"/>
+            <a:r>
+              <a:rPr lang="en-US" sz="1400" dirty="0" err="1"/>
+              <a:t>GenericDAO</a:t>
+            </a:r>
+            <a:r>
+              <a:rPr lang="en-US" sz="1400" dirty="0"/>
+              <a:t>&lt;Account&gt;</a:t>
+            </a:r>
           </a:p>
         </p:txBody>
       </p:sp>
@@ -9304,12 +9683,15 @@
         </p:nvSpPr>
         <p:spPr>
           <a:xfrm>
-            <a:off x="1039424" y="2278701"/>
+            <a:off x="3048386" y="1998328"/>
             <a:ext cx="1494797" cy="991056"/>
           </a:xfrm>
           <a:prstGeom prst="rect">
             <a:avLst/>
           </a:prstGeom>
+          <a:solidFill>
+            <a:schemeClr val="accent6"/>
+          </a:solidFill>
         </p:spPr>
         <p:style>
           <a:lnRef idx="2">
@@ -9340,6 +9722,1555 @@
           <a:p>
             <a:pPr algn="ctr"/>
             <a:r>
+              <a:rPr lang="en-US" sz="1200" dirty="0"/>
+              <a:t>Model</a:t>
+            </a:r>
+          </a:p>
+          <a:p>
+            <a:pPr algn="ctr"/>
+            <a:r>
+              <a:rPr lang="en-US" dirty="0"/>
+              <a:t>Account</a:t>
+            </a:r>
+          </a:p>
+        </p:txBody>
+      </p:sp>
+      <p:cxnSp>
+        <p:nvCxnSpPr>
+          <p:cNvPr id="9" name="Straight Arrow Connector 8"/>
+          <p:cNvCxnSpPr>
+            <a:cxnSpLocks/>
+            <a:stCxn id="20" idx="1"/>
+            <a:endCxn id="5" idx="3"/>
+          </p:cNvCxnSpPr>
+          <p:nvPr/>
+        </p:nvCxnSpPr>
+        <p:spPr>
+          <a:xfrm flipH="1">
+            <a:off x="4543183" y="2355357"/>
+            <a:ext cx="2776581" cy="138499"/>
+          </a:xfrm>
+          <a:prstGeom prst="straightConnector1">
+            <a:avLst/>
+          </a:prstGeom>
+          <a:ln>
+            <a:tailEnd type="triangle"/>
+          </a:ln>
+        </p:spPr>
+        <p:style>
+          <a:lnRef idx="1">
+            <a:schemeClr val="accent1"/>
+          </a:lnRef>
+          <a:fillRef idx="0">
+            <a:schemeClr val="accent1"/>
+          </a:fillRef>
+          <a:effectRef idx="0">
+            <a:schemeClr val="accent1"/>
+          </a:effectRef>
+          <a:fontRef idx="minor">
+            <a:schemeClr val="tx1"/>
+          </a:fontRef>
+        </p:style>
+      </p:cxnSp>
+      <p:sp>
+        <p:nvSpPr>
+          <p:cNvPr id="11" name="TextBox 10">
+            <a:extLst>
+              <a:ext uri="{FF2B5EF4-FFF2-40B4-BE49-F238E27FC236}">
+                <a16:creationId xmlns:a16="http://schemas.microsoft.com/office/drawing/2014/main" id="{E0BBD6C8-C8F2-40C5-AA64-85961A11ADC2}"/>
+              </a:ext>
+            </a:extLst>
+          </p:cNvPr>
+          <p:cNvSpPr txBox="1"/>
+          <p:nvPr/>
+        </p:nvSpPr>
+        <p:spPr>
+          <a:xfrm>
+            <a:off x="6188680" y="1954803"/>
+            <a:ext cx="728932" cy="461665"/>
+          </a:xfrm>
+          <a:prstGeom prst="rect">
+            <a:avLst/>
+          </a:prstGeom>
+          <a:noFill/>
+        </p:spPr>
+        <p:txBody>
+          <a:bodyPr wrap="square" rtlCol="0">
+            <a:spAutoFit/>
+          </a:bodyPr>
+          <a:lstStyle/>
+          <a:p>
+            <a:r>
+              <a:rPr lang="en-US" sz="1200" dirty="0"/>
+              <a:t>contains</a:t>
+            </a:r>
+          </a:p>
+          <a:p>
+            <a:r>
+              <a:rPr lang="en-US" sz="1200" dirty="0"/>
+              <a:t>List&lt;&gt;</a:t>
+            </a:r>
+          </a:p>
+        </p:txBody>
+      </p:sp>
+      <p:sp>
+        <p:nvSpPr>
+          <p:cNvPr id="15" name="Rectangle 14"/>
+          <p:cNvSpPr/>
+          <p:nvPr/>
+        </p:nvSpPr>
+        <p:spPr>
+          <a:xfrm>
+            <a:off x="5262066" y="3375503"/>
+            <a:ext cx="1494797" cy="991056"/>
+          </a:xfrm>
+          <a:prstGeom prst="rect">
+            <a:avLst/>
+          </a:prstGeom>
+          <a:solidFill>
+            <a:schemeClr val="bg1">
+              <a:lumMod val="65000"/>
+            </a:schemeClr>
+          </a:solidFill>
+        </p:spPr>
+        <p:style>
+          <a:lnRef idx="2">
+            <a:schemeClr val="accent1">
+              <a:shade val="50000"/>
+            </a:schemeClr>
+          </a:lnRef>
+          <a:fillRef idx="1">
+            <a:schemeClr val="accent1"/>
+          </a:fillRef>
+          <a:effectRef idx="0">
+            <a:schemeClr val="accent1"/>
+          </a:effectRef>
+          <a:fontRef idx="minor">
+            <a:schemeClr val="lt1"/>
+          </a:fontRef>
+        </p:style>
+        <p:txBody>
+          <a:bodyPr rtlCol="0" anchor="ctr"/>
+          <a:lstStyle/>
+          <a:p>
+            <a:pPr algn="ctr"/>
+            <a:r>
+              <a:rPr lang="en-US" sz="1000" dirty="0"/>
+              <a:t>com.tlw8253.dto</a:t>
+            </a:r>
+          </a:p>
+          <a:p>
+            <a:pPr algn="ctr"/>
+            <a:r>
+              <a:rPr lang="en-US" sz="1200" dirty="0"/>
+              <a:t>Data Transfer Object</a:t>
+            </a:r>
+          </a:p>
+          <a:p>
+            <a:pPr algn="ctr"/>
+            <a:r>
+              <a:rPr lang="en-US" dirty="0" err="1"/>
+              <a:t>AccountDTO</a:t>
+            </a:r>
+            <a:endParaRPr lang="en-US" dirty="0"/>
+          </a:p>
+          <a:p>
+            <a:pPr algn="ctr"/>
+            <a:r>
+              <a:rPr lang="en-US" sz="1200" dirty="0" err="1"/>
+              <a:t>AccountAddDTO</a:t>
+            </a:r>
+            <a:endParaRPr lang="en-US" sz="1200" dirty="0"/>
+          </a:p>
+          <a:p>
+            <a:pPr algn="ctr"/>
+            <a:r>
+              <a:rPr lang="en-US" sz="1200" dirty="0" err="1"/>
+              <a:t>AccountEditDTO</a:t>
+            </a:r>
+            <a:endParaRPr lang="en-US" sz="1200" dirty="0"/>
+          </a:p>
+        </p:txBody>
+      </p:sp>
+      <p:cxnSp>
+        <p:nvCxnSpPr>
+          <p:cNvPr id="17" name="Straight Arrow Connector 16"/>
+          <p:cNvCxnSpPr>
+            <a:cxnSpLocks/>
+            <a:stCxn id="20" idx="1"/>
+            <a:endCxn id="15" idx="0"/>
+          </p:cNvCxnSpPr>
+          <p:nvPr/>
+        </p:nvCxnSpPr>
+        <p:spPr>
+          <a:xfrm flipH="1">
+            <a:off x="6009465" y="2355357"/>
+            <a:ext cx="1310299" cy="1020146"/>
+          </a:xfrm>
+          <a:prstGeom prst="straightConnector1">
+            <a:avLst/>
+          </a:prstGeom>
+          <a:ln>
+            <a:tailEnd type="triangle"/>
+          </a:ln>
+        </p:spPr>
+        <p:style>
+          <a:lnRef idx="1">
+            <a:schemeClr val="accent1"/>
+          </a:lnRef>
+          <a:fillRef idx="0">
+            <a:schemeClr val="accent1"/>
+          </a:fillRef>
+          <a:effectRef idx="0">
+            <a:schemeClr val="accent1"/>
+          </a:effectRef>
+          <a:fontRef idx="minor">
+            <a:schemeClr val="tx1"/>
+          </a:fontRef>
+        </p:style>
+      </p:cxnSp>
+      <p:sp>
+        <p:nvSpPr>
+          <p:cNvPr id="19" name="TextBox 18">
+            <a:extLst>
+              <a:ext uri="{FF2B5EF4-FFF2-40B4-BE49-F238E27FC236}">
+                <a16:creationId xmlns:a16="http://schemas.microsoft.com/office/drawing/2014/main" id="{E0BBD6C8-C8F2-40C5-AA64-85961A11ADC2}"/>
+              </a:ext>
+            </a:extLst>
+          </p:cNvPr>
+          <p:cNvSpPr txBox="1"/>
+          <p:nvPr/>
+        </p:nvSpPr>
+        <p:spPr>
+          <a:xfrm>
+            <a:off x="6486912" y="2833300"/>
+            <a:ext cx="728932" cy="276999"/>
+          </a:xfrm>
+          <a:prstGeom prst="rect">
+            <a:avLst/>
+          </a:prstGeom>
+          <a:noFill/>
+        </p:spPr>
+        <p:txBody>
+          <a:bodyPr wrap="square" rtlCol="0">
+            <a:spAutoFit/>
+          </a:bodyPr>
+          <a:lstStyle/>
+          <a:p>
+            <a:r>
+              <a:rPr lang="en-US" sz="1200" dirty="0"/>
+              <a:t>uses</a:t>
+            </a:r>
+          </a:p>
+        </p:txBody>
+      </p:sp>
+      <p:sp>
+        <p:nvSpPr>
+          <p:cNvPr id="20" name="Rectangle 19"/>
+          <p:cNvSpPr/>
+          <p:nvPr/>
+        </p:nvSpPr>
+        <p:spPr>
+          <a:xfrm>
+            <a:off x="7319764" y="1859829"/>
+            <a:ext cx="1589922" cy="991056"/>
+          </a:xfrm>
+          <a:prstGeom prst="rect">
+            <a:avLst/>
+          </a:prstGeom>
+          <a:solidFill>
+            <a:schemeClr val="accent6"/>
+          </a:solidFill>
+        </p:spPr>
+        <p:style>
+          <a:lnRef idx="2">
+            <a:schemeClr val="accent1">
+              <a:shade val="50000"/>
+            </a:schemeClr>
+          </a:lnRef>
+          <a:fillRef idx="1">
+            <a:schemeClr val="accent1"/>
+          </a:fillRef>
+          <a:effectRef idx="0">
+            <a:schemeClr val="accent1"/>
+          </a:effectRef>
+          <a:fontRef idx="minor">
+            <a:schemeClr val="lt1"/>
+          </a:fontRef>
+        </p:style>
+        <p:txBody>
+          <a:bodyPr rtlCol="0" anchor="ctr"/>
+          <a:lstStyle/>
+          <a:p>
+            <a:pPr algn="ctr"/>
+            <a:r>
+              <a:rPr lang="en-US" sz="1000" dirty="0"/>
+              <a:t>com.tlw8253.dao</a:t>
+            </a:r>
+          </a:p>
+          <a:p>
+            <a:pPr algn="ctr"/>
+            <a:r>
+              <a:rPr lang="en-US" sz="1500" dirty="0" err="1"/>
+              <a:t>AccountDAOImpl</a:t>
+            </a:r>
+            <a:endParaRPr lang="en-US" sz="1500" dirty="0"/>
+          </a:p>
+        </p:txBody>
+      </p:sp>
+      <p:cxnSp>
+        <p:nvCxnSpPr>
+          <p:cNvPr id="22" name="Straight Arrow Connector 21"/>
+          <p:cNvCxnSpPr>
+            <a:cxnSpLocks/>
+            <a:stCxn id="20" idx="0"/>
+            <a:endCxn id="4" idx="3"/>
+          </p:cNvCxnSpPr>
+          <p:nvPr/>
+        </p:nvCxnSpPr>
+        <p:spPr>
+          <a:xfrm flipH="1" flipV="1">
+            <a:off x="6400800" y="836072"/>
+            <a:ext cx="1713925" cy="1023757"/>
+          </a:xfrm>
+          <a:prstGeom prst="straightConnector1">
+            <a:avLst/>
+          </a:prstGeom>
+          <a:ln>
+            <a:tailEnd type="triangle"/>
+          </a:ln>
+        </p:spPr>
+        <p:style>
+          <a:lnRef idx="1">
+            <a:schemeClr val="accent1"/>
+          </a:lnRef>
+          <a:fillRef idx="0">
+            <a:schemeClr val="accent1"/>
+          </a:fillRef>
+          <a:effectRef idx="0">
+            <a:schemeClr val="accent1"/>
+          </a:effectRef>
+          <a:fontRef idx="minor">
+            <a:schemeClr val="tx1"/>
+          </a:fontRef>
+        </p:style>
+      </p:cxnSp>
+      <p:sp>
+        <p:nvSpPr>
+          <p:cNvPr id="23" name="TextBox 22">
+            <a:extLst>
+              <a:ext uri="{FF2B5EF4-FFF2-40B4-BE49-F238E27FC236}">
+                <a16:creationId xmlns:a16="http://schemas.microsoft.com/office/drawing/2014/main" id="{E0BBD6C8-C8F2-40C5-AA64-85961A11ADC2}"/>
+              </a:ext>
+            </a:extLst>
+          </p:cNvPr>
+          <p:cNvSpPr txBox="1"/>
+          <p:nvPr/>
+        </p:nvSpPr>
+        <p:spPr>
+          <a:xfrm>
+            <a:off x="6166028" y="1299474"/>
+            <a:ext cx="1645732" cy="276999"/>
+          </a:xfrm>
+          <a:prstGeom prst="rect">
+            <a:avLst/>
+          </a:prstGeom>
+          <a:noFill/>
+        </p:spPr>
+        <p:txBody>
+          <a:bodyPr wrap="square" rtlCol="0">
+            <a:spAutoFit/>
+          </a:bodyPr>
+          <a:lstStyle/>
+          <a:p>
+            <a:r>
+              <a:rPr lang="en-US" sz="1200" dirty="0"/>
+              <a:t>Implements&lt;Account&gt;</a:t>
+            </a:r>
+          </a:p>
+        </p:txBody>
+      </p:sp>
+      <p:sp>
+        <p:nvSpPr>
+          <p:cNvPr id="25" name="Flowchart: Magnetic Disk 24"/>
+          <p:cNvSpPr/>
+          <p:nvPr/>
+        </p:nvSpPr>
+        <p:spPr>
+          <a:xfrm>
+            <a:off x="10507387" y="2923890"/>
+            <a:ext cx="653404" cy="1018434"/>
+          </a:xfrm>
+          <a:prstGeom prst="flowChartMagneticDisk">
+            <a:avLst/>
+          </a:prstGeom>
+          <a:solidFill>
+            <a:schemeClr val="accent3"/>
+          </a:solidFill>
+        </p:spPr>
+        <p:style>
+          <a:lnRef idx="2">
+            <a:schemeClr val="accent1">
+              <a:shade val="50000"/>
+            </a:schemeClr>
+          </a:lnRef>
+          <a:fillRef idx="1">
+            <a:schemeClr val="accent1"/>
+          </a:fillRef>
+          <a:effectRef idx="0">
+            <a:schemeClr val="accent1"/>
+          </a:effectRef>
+          <a:fontRef idx="minor">
+            <a:schemeClr val="lt1"/>
+          </a:fontRef>
+        </p:style>
+        <p:txBody>
+          <a:bodyPr rtlCol="0" anchor="ctr"/>
+          <a:lstStyle/>
+          <a:p>
+            <a:pPr algn="ctr"/>
+            <a:r>
+              <a:rPr lang="en-US" dirty="0"/>
+              <a:t>DB</a:t>
+            </a:r>
+          </a:p>
+        </p:txBody>
+      </p:sp>
+      <p:cxnSp>
+        <p:nvCxnSpPr>
+          <p:cNvPr id="27" name="Straight Arrow Connector 26"/>
+          <p:cNvCxnSpPr>
+            <a:stCxn id="20" idx="3"/>
+            <a:endCxn id="25" idx="2"/>
+          </p:cNvCxnSpPr>
+          <p:nvPr/>
+        </p:nvCxnSpPr>
+        <p:spPr>
+          <a:xfrm>
+            <a:off x="8909686" y="2355357"/>
+            <a:ext cx="1597701" cy="1077750"/>
+          </a:xfrm>
+          <a:prstGeom prst="straightConnector1">
+            <a:avLst/>
+          </a:prstGeom>
+          <a:ln>
+            <a:tailEnd type="triangle"/>
+          </a:ln>
+        </p:spPr>
+        <p:style>
+          <a:lnRef idx="1">
+            <a:schemeClr val="accent1"/>
+          </a:lnRef>
+          <a:fillRef idx="0">
+            <a:schemeClr val="accent1"/>
+          </a:fillRef>
+          <a:effectRef idx="0">
+            <a:schemeClr val="accent1"/>
+          </a:effectRef>
+          <a:fontRef idx="minor">
+            <a:schemeClr val="tx1"/>
+          </a:fontRef>
+        </p:style>
+      </p:cxnSp>
+      <p:sp>
+        <p:nvSpPr>
+          <p:cNvPr id="28" name="TextBox 27">
+            <a:extLst>
+              <a:ext uri="{FF2B5EF4-FFF2-40B4-BE49-F238E27FC236}">
+                <a16:creationId xmlns:a16="http://schemas.microsoft.com/office/drawing/2014/main" id="{E0BBD6C8-C8F2-40C5-AA64-85961A11ADC2}"/>
+              </a:ext>
+            </a:extLst>
+          </p:cNvPr>
+          <p:cNvSpPr txBox="1"/>
+          <p:nvPr/>
+        </p:nvSpPr>
+        <p:spPr>
+          <a:xfrm>
+            <a:off x="9283733" y="2276386"/>
+            <a:ext cx="728932" cy="276999"/>
+          </a:xfrm>
+          <a:prstGeom prst="rect">
+            <a:avLst/>
+          </a:prstGeom>
+          <a:noFill/>
+        </p:spPr>
+        <p:txBody>
+          <a:bodyPr wrap="square" rtlCol="0">
+            <a:spAutoFit/>
+          </a:bodyPr>
+          <a:lstStyle/>
+          <a:p>
+            <a:r>
+              <a:rPr lang="en-US" sz="1200" dirty="0"/>
+              <a:t>access</a:t>
+            </a:r>
+          </a:p>
+        </p:txBody>
+      </p:sp>
+      <p:sp>
+        <p:nvSpPr>
+          <p:cNvPr id="29" name="Rectangle 28"/>
+          <p:cNvSpPr/>
+          <p:nvPr/>
+        </p:nvSpPr>
+        <p:spPr>
+          <a:xfrm>
+            <a:off x="7367326" y="3537028"/>
+            <a:ext cx="1494797" cy="991056"/>
+          </a:xfrm>
+          <a:prstGeom prst="rect">
+            <a:avLst/>
+          </a:prstGeom>
+          <a:solidFill>
+            <a:schemeClr val="accent6"/>
+          </a:solidFill>
+        </p:spPr>
+        <p:style>
+          <a:lnRef idx="2">
+            <a:schemeClr val="accent1">
+              <a:shade val="50000"/>
+            </a:schemeClr>
+          </a:lnRef>
+          <a:fillRef idx="1">
+            <a:schemeClr val="accent1"/>
+          </a:fillRef>
+          <a:effectRef idx="0">
+            <a:schemeClr val="accent1"/>
+          </a:effectRef>
+          <a:fontRef idx="minor">
+            <a:schemeClr val="lt1"/>
+          </a:fontRef>
+        </p:style>
+        <p:txBody>
+          <a:bodyPr rtlCol="0" anchor="ctr"/>
+          <a:lstStyle/>
+          <a:p>
+            <a:pPr algn="ctr"/>
+            <a:r>
+              <a:rPr lang="en-US" sz="1000" dirty="0"/>
+              <a:t>com.tlw8253.service</a:t>
+            </a:r>
+          </a:p>
+          <a:p>
+            <a:pPr algn="ctr"/>
+            <a:r>
+              <a:rPr lang="en-US" sz="1600" dirty="0" err="1"/>
+              <a:t>AccountService</a:t>
+            </a:r>
+            <a:endParaRPr lang="en-US" sz="1600" dirty="0"/>
+          </a:p>
+        </p:txBody>
+      </p:sp>
+      <p:cxnSp>
+        <p:nvCxnSpPr>
+          <p:cNvPr id="33" name="Straight Arrow Connector 32"/>
+          <p:cNvCxnSpPr>
+            <a:stCxn id="29" idx="0"/>
+            <a:endCxn id="20" idx="2"/>
+          </p:cNvCxnSpPr>
+          <p:nvPr/>
+        </p:nvCxnSpPr>
+        <p:spPr>
+          <a:xfrm flipV="1">
+            <a:off x="8114725" y="2850885"/>
+            <a:ext cx="0" cy="686143"/>
+          </a:xfrm>
+          <a:prstGeom prst="straightConnector1">
+            <a:avLst/>
+          </a:prstGeom>
+          <a:ln>
+            <a:tailEnd type="triangle"/>
+          </a:ln>
+        </p:spPr>
+        <p:style>
+          <a:lnRef idx="1">
+            <a:schemeClr val="accent1"/>
+          </a:lnRef>
+          <a:fillRef idx="0">
+            <a:schemeClr val="accent1"/>
+          </a:fillRef>
+          <a:effectRef idx="0">
+            <a:schemeClr val="accent1"/>
+          </a:effectRef>
+          <a:fontRef idx="minor">
+            <a:schemeClr val="tx1"/>
+          </a:fontRef>
+        </p:style>
+      </p:cxnSp>
+      <p:sp>
+        <p:nvSpPr>
+          <p:cNvPr id="34" name="TextBox 33">
+            <a:extLst>
+              <a:ext uri="{FF2B5EF4-FFF2-40B4-BE49-F238E27FC236}">
+                <a16:creationId xmlns:a16="http://schemas.microsoft.com/office/drawing/2014/main" id="{E0BBD6C8-C8F2-40C5-AA64-85961A11ADC2}"/>
+              </a:ext>
+            </a:extLst>
+          </p:cNvPr>
+          <p:cNvSpPr txBox="1"/>
+          <p:nvPr/>
+        </p:nvSpPr>
+        <p:spPr>
+          <a:xfrm>
+            <a:off x="8051973" y="3068588"/>
+            <a:ext cx="1062021" cy="276999"/>
+          </a:xfrm>
+          <a:prstGeom prst="rect">
+            <a:avLst/>
+          </a:prstGeom>
+          <a:noFill/>
+        </p:spPr>
+        <p:txBody>
+          <a:bodyPr wrap="square" rtlCol="0">
+            <a:spAutoFit/>
+          </a:bodyPr>
+          <a:lstStyle/>
+          <a:p>
+            <a:r>
+              <a:rPr lang="en-US" sz="1200" dirty="0"/>
+              <a:t>contains</a:t>
+            </a:r>
+          </a:p>
+        </p:txBody>
+      </p:sp>
+      <p:sp>
+        <p:nvSpPr>
+          <p:cNvPr id="35" name="Rectangle 34"/>
+          <p:cNvSpPr/>
+          <p:nvPr/>
+        </p:nvSpPr>
+        <p:spPr>
+          <a:xfrm>
+            <a:off x="5010221" y="5530203"/>
+            <a:ext cx="1998489" cy="657053"/>
+          </a:xfrm>
+          <a:prstGeom prst="rect">
+            <a:avLst/>
+          </a:prstGeom>
+          <a:solidFill>
+            <a:schemeClr val="accent6"/>
+          </a:solidFill>
+        </p:spPr>
+        <p:style>
+          <a:lnRef idx="2">
+            <a:schemeClr val="accent1">
+              <a:shade val="50000"/>
+            </a:schemeClr>
+          </a:lnRef>
+          <a:fillRef idx="1">
+            <a:schemeClr val="accent1"/>
+          </a:fillRef>
+          <a:effectRef idx="0">
+            <a:schemeClr val="accent1"/>
+          </a:effectRef>
+          <a:fontRef idx="minor">
+            <a:schemeClr val="lt1"/>
+          </a:fontRef>
+        </p:style>
+        <p:txBody>
+          <a:bodyPr rtlCol="0" anchor="ctr"/>
+          <a:lstStyle/>
+          <a:p>
+            <a:pPr algn="ctr"/>
+            <a:r>
+              <a:rPr lang="en-US" sz="1000" dirty="0"/>
+              <a:t>com.tlw8253.exception</a:t>
+            </a:r>
+          </a:p>
+          <a:p>
+            <a:pPr algn="ctr"/>
+            <a:r>
+              <a:rPr lang="en-US" sz="1400" dirty="0" err="1"/>
+              <a:t>BadParameterException</a:t>
+            </a:r>
+            <a:endParaRPr lang="en-US" sz="1400" dirty="0"/>
+          </a:p>
+        </p:txBody>
+      </p:sp>
+      <p:cxnSp>
+        <p:nvCxnSpPr>
+          <p:cNvPr id="37" name="Straight Arrow Connector 36"/>
+          <p:cNvCxnSpPr>
+            <a:cxnSpLocks/>
+            <a:stCxn id="29" idx="2"/>
+            <a:endCxn id="35" idx="0"/>
+          </p:cNvCxnSpPr>
+          <p:nvPr/>
+        </p:nvCxnSpPr>
+        <p:spPr>
+          <a:xfrm flipH="1">
+            <a:off x="6009466" y="4528084"/>
+            <a:ext cx="2105259" cy="1002119"/>
+          </a:xfrm>
+          <a:prstGeom prst="straightConnector1">
+            <a:avLst/>
+          </a:prstGeom>
+          <a:ln>
+            <a:tailEnd type="triangle"/>
+          </a:ln>
+        </p:spPr>
+        <p:style>
+          <a:lnRef idx="1">
+            <a:schemeClr val="accent1"/>
+          </a:lnRef>
+          <a:fillRef idx="0">
+            <a:schemeClr val="accent1"/>
+          </a:fillRef>
+          <a:effectRef idx="0">
+            <a:schemeClr val="accent1"/>
+          </a:effectRef>
+          <a:fontRef idx="minor">
+            <a:schemeClr val="tx1"/>
+          </a:fontRef>
+        </p:style>
+      </p:cxnSp>
+      <p:sp>
+        <p:nvSpPr>
+          <p:cNvPr id="38" name="TextBox 37">
+            <a:extLst>
+              <a:ext uri="{FF2B5EF4-FFF2-40B4-BE49-F238E27FC236}">
+                <a16:creationId xmlns:a16="http://schemas.microsoft.com/office/drawing/2014/main" id="{E0BBD6C8-C8F2-40C5-AA64-85961A11ADC2}"/>
+              </a:ext>
+            </a:extLst>
+          </p:cNvPr>
+          <p:cNvSpPr txBox="1"/>
+          <p:nvPr/>
+        </p:nvSpPr>
+        <p:spPr>
+          <a:xfrm>
+            <a:off x="7750258" y="4669977"/>
+            <a:ext cx="728932" cy="276999"/>
+          </a:xfrm>
+          <a:prstGeom prst="rect">
+            <a:avLst/>
+          </a:prstGeom>
+          <a:noFill/>
+        </p:spPr>
+        <p:txBody>
+          <a:bodyPr wrap="square" rtlCol="0">
+            <a:spAutoFit/>
+          </a:bodyPr>
+          <a:lstStyle/>
+          <a:p>
+            <a:r>
+              <a:rPr lang="en-US" sz="1200" dirty="0"/>
+              <a:t>throws</a:t>
+            </a:r>
+          </a:p>
+        </p:txBody>
+      </p:sp>
+      <p:sp>
+        <p:nvSpPr>
+          <p:cNvPr id="39" name="Rectangle 38"/>
+          <p:cNvSpPr/>
+          <p:nvPr/>
+        </p:nvSpPr>
+        <p:spPr>
+          <a:xfrm>
+            <a:off x="8909686" y="472284"/>
+            <a:ext cx="1822194" cy="991056"/>
+          </a:xfrm>
+          <a:prstGeom prst="rect">
+            <a:avLst/>
+          </a:prstGeom>
+          <a:solidFill>
+            <a:schemeClr val="accent6"/>
+          </a:solidFill>
+        </p:spPr>
+        <p:style>
+          <a:lnRef idx="2">
+            <a:schemeClr val="accent1">
+              <a:shade val="50000"/>
+            </a:schemeClr>
+          </a:lnRef>
+          <a:fillRef idx="1">
+            <a:schemeClr val="accent1"/>
+          </a:fillRef>
+          <a:effectRef idx="0">
+            <a:schemeClr val="accent1"/>
+          </a:effectRef>
+          <a:fontRef idx="minor">
+            <a:schemeClr val="lt1"/>
+          </a:fontRef>
+        </p:style>
+        <p:txBody>
+          <a:bodyPr rtlCol="0" anchor="ctr"/>
+          <a:lstStyle/>
+          <a:p>
+            <a:pPr algn="ctr"/>
+            <a:r>
+              <a:rPr lang="en-US" sz="1000" dirty="0"/>
+              <a:t>com.tlw8253.utility</a:t>
+            </a:r>
+          </a:p>
+          <a:p>
+            <a:pPr algn="ctr"/>
+            <a:r>
+              <a:rPr lang="en-US" sz="1000" dirty="0"/>
+              <a:t>Utility</a:t>
+            </a:r>
+          </a:p>
+          <a:p>
+            <a:pPr algn="ctr"/>
+            <a:r>
+              <a:rPr lang="en-US" dirty="0" err="1"/>
+              <a:t>ConnectionUtility</a:t>
+            </a:r>
+            <a:endParaRPr lang="en-US" dirty="0"/>
+          </a:p>
+        </p:txBody>
+      </p:sp>
+      <p:cxnSp>
+        <p:nvCxnSpPr>
+          <p:cNvPr id="41" name="Straight Arrow Connector 40"/>
+          <p:cNvCxnSpPr>
+            <a:stCxn id="20" idx="0"/>
+            <a:endCxn id="39" idx="1"/>
+          </p:cNvCxnSpPr>
+          <p:nvPr/>
+        </p:nvCxnSpPr>
+        <p:spPr>
+          <a:xfrm flipV="1">
+            <a:off x="8114725" y="967812"/>
+            <a:ext cx="794961" cy="892017"/>
+          </a:xfrm>
+          <a:prstGeom prst="straightConnector1">
+            <a:avLst/>
+          </a:prstGeom>
+          <a:ln>
+            <a:tailEnd type="triangle"/>
+          </a:ln>
+        </p:spPr>
+        <p:style>
+          <a:lnRef idx="1">
+            <a:schemeClr val="accent1"/>
+          </a:lnRef>
+          <a:fillRef idx="0">
+            <a:schemeClr val="accent1"/>
+          </a:fillRef>
+          <a:effectRef idx="0">
+            <a:schemeClr val="accent1"/>
+          </a:effectRef>
+          <a:fontRef idx="minor">
+            <a:schemeClr val="tx1"/>
+          </a:fontRef>
+        </p:style>
+      </p:cxnSp>
+      <p:cxnSp>
+        <p:nvCxnSpPr>
+          <p:cNvPr id="43" name="Straight Arrow Connector 42"/>
+          <p:cNvCxnSpPr>
+            <a:stCxn id="39" idx="2"/>
+            <a:endCxn id="25" idx="1"/>
+          </p:cNvCxnSpPr>
+          <p:nvPr/>
+        </p:nvCxnSpPr>
+        <p:spPr>
+          <a:xfrm>
+            <a:off x="9820783" y="1463340"/>
+            <a:ext cx="1013306" cy="1460550"/>
+          </a:xfrm>
+          <a:prstGeom prst="straightConnector1">
+            <a:avLst/>
+          </a:prstGeom>
+          <a:ln>
+            <a:tailEnd type="triangle"/>
+          </a:ln>
+        </p:spPr>
+        <p:style>
+          <a:lnRef idx="1">
+            <a:schemeClr val="accent1"/>
+          </a:lnRef>
+          <a:fillRef idx="0">
+            <a:schemeClr val="accent1"/>
+          </a:fillRef>
+          <a:effectRef idx="0">
+            <a:schemeClr val="accent1"/>
+          </a:effectRef>
+          <a:fontRef idx="minor">
+            <a:schemeClr val="tx1"/>
+          </a:fontRef>
+        </p:style>
+      </p:cxnSp>
+      <p:sp>
+        <p:nvSpPr>
+          <p:cNvPr id="44" name="TextBox 43">
+            <a:extLst>
+              <a:ext uri="{FF2B5EF4-FFF2-40B4-BE49-F238E27FC236}">
+                <a16:creationId xmlns:a16="http://schemas.microsoft.com/office/drawing/2014/main" id="{E0BBD6C8-C8F2-40C5-AA64-85961A11ADC2}"/>
+              </a:ext>
+            </a:extLst>
+          </p:cNvPr>
+          <p:cNvSpPr txBox="1"/>
+          <p:nvPr/>
+        </p:nvSpPr>
+        <p:spPr>
+          <a:xfrm>
+            <a:off x="8023790" y="1170629"/>
+            <a:ext cx="728932" cy="276999"/>
+          </a:xfrm>
+          <a:prstGeom prst="rect">
+            <a:avLst/>
+          </a:prstGeom>
+          <a:noFill/>
+        </p:spPr>
+        <p:txBody>
+          <a:bodyPr wrap="square" rtlCol="0">
+            <a:spAutoFit/>
+          </a:bodyPr>
+          <a:lstStyle/>
+          <a:p>
+            <a:r>
+              <a:rPr lang="en-US" sz="1200" dirty="0"/>
+              <a:t>uses</a:t>
+            </a:r>
+          </a:p>
+        </p:txBody>
+      </p:sp>
+      <p:sp>
+        <p:nvSpPr>
+          <p:cNvPr id="45" name="TextBox 44">
+            <a:extLst>
+              <a:ext uri="{FF2B5EF4-FFF2-40B4-BE49-F238E27FC236}">
+                <a16:creationId xmlns:a16="http://schemas.microsoft.com/office/drawing/2014/main" id="{E0BBD6C8-C8F2-40C5-AA64-85961A11ADC2}"/>
+              </a:ext>
+            </a:extLst>
+          </p:cNvPr>
+          <p:cNvSpPr txBox="1"/>
+          <p:nvPr/>
+        </p:nvSpPr>
+        <p:spPr>
+          <a:xfrm>
+            <a:off x="10245586" y="1859829"/>
+            <a:ext cx="864099" cy="276999"/>
+          </a:xfrm>
+          <a:prstGeom prst="rect">
+            <a:avLst/>
+          </a:prstGeom>
+          <a:noFill/>
+        </p:spPr>
+        <p:txBody>
+          <a:bodyPr wrap="square" rtlCol="0">
+            <a:spAutoFit/>
+          </a:bodyPr>
+          <a:lstStyle/>
+          <a:p>
+            <a:r>
+              <a:rPr lang="en-US" sz="1200" dirty="0"/>
+              <a:t>connects</a:t>
+            </a:r>
+          </a:p>
+        </p:txBody>
+      </p:sp>
+      <p:sp>
+        <p:nvSpPr>
+          <p:cNvPr id="26" name="TextBox 25">
+            <a:extLst>
+              <a:ext uri="{FF2B5EF4-FFF2-40B4-BE49-F238E27FC236}">
+                <a16:creationId xmlns:a16="http://schemas.microsoft.com/office/drawing/2014/main" id="{6C45E26E-8FEE-4439-A34B-789237C9C62C}"/>
+              </a:ext>
+            </a:extLst>
+          </p:cNvPr>
+          <p:cNvSpPr txBox="1"/>
+          <p:nvPr/>
+        </p:nvSpPr>
+        <p:spPr>
+          <a:xfrm>
+            <a:off x="146648" y="131998"/>
+            <a:ext cx="4675518" cy="646331"/>
+          </a:xfrm>
+          <a:prstGeom prst="rect">
+            <a:avLst/>
+          </a:prstGeom>
+          <a:noFill/>
+        </p:spPr>
+        <p:txBody>
+          <a:bodyPr wrap="square" rtlCol="0">
+            <a:spAutoFit/>
+          </a:bodyPr>
+          <a:lstStyle/>
+          <a:p>
+            <a:r>
+              <a:rPr lang="en-US" dirty="0"/>
+              <a:t>Project 0 Generic&lt;Account&gt; Database Access Model</a:t>
+            </a:r>
+          </a:p>
+        </p:txBody>
+      </p:sp>
+      <p:sp>
+        <p:nvSpPr>
+          <p:cNvPr id="31" name="Rectangle 30">
+            <a:extLst>
+              <a:ext uri="{FF2B5EF4-FFF2-40B4-BE49-F238E27FC236}">
+                <a16:creationId xmlns:a16="http://schemas.microsoft.com/office/drawing/2014/main" id="{6D396BFC-10E0-4935-903B-EDC457BD1755}"/>
+              </a:ext>
+            </a:extLst>
+          </p:cNvPr>
+          <p:cNvSpPr/>
+          <p:nvPr/>
+        </p:nvSpPr>
+        <p:spPr>
+          <a:xfrm>
+            <a:off x="7368605" y="5949095"/>
+            <a:ext cx="1621682" cy="657053"/>
+          </a:xfrm>
+          <a:prstGeom prst="rect">
+            <a:avLst/>
+          </a:prstGeom>
+          <a:solidFill>
+            <a:schemeClr val="accent6"/>
+          </a:solidFill>
+        </p:spPr>
+        <p:style>
+          <a:lnRef idx="2">
+            <a:schemeClr val="accent1">
+              <a:shade val="50000"/>
+            </a:schemeClr>
+          </a:lnRef>
+          <a:fillRef idx="1">
+            <a:schemeClr val="accent1"/>
+          </a:fillRef>
+          <a:effectRef idx="0">
+            <a:schemeClr val="accent1"/>
+          </a:effectRef>
+          <a:fontRef idx="minor">
+            <a:schemeClr val="lt1"/>
+          </a:fontRef>
+        </p:style>
+        <p:txBody>
+          <a:bodyPr rtlCol="0" anchor="ctr"/>
+          <a:lstStyle/>
+          <a:p>
+            <a:pPr algn="ctr"/>
+            <a:r>
+              <a:rPr lang="en-US" sz="1000" dirty="0"/>
+              <a:t>com.tlw8253.exception</a:t>
+            </a:r>
+          </a:p>
+          <a:p>
+            <a:pPr algn="ctr"/>
+            <a:r>
+              <a:rPr lang="en-US" sz="1400" dirty="0" err="1"/>
+              <a:t>DatabaseException</a:t>
+            </a:r>
+            <a:endParaRPr lang="en-US" sz="1400" dirty="0"/>
+          </a:p>
+        </p:txBody>
+      </p:sp>
+      <p:sp>
+        <p:nvSpPr>
+          <p:cNvPr id="32" name="Rectangle 31">
+            <a:extLst>
+              <a:ext uri="{FF2B5EF4-FFF2-40B4-BE49-F238E27FC236}">
+                <a16:creationId xmlns:a16="http://schemas.microsoft.com/office/drawing/2014/main" id="{02A645C8-F11F-438D-92DC-F6FCCA5ECFB8}"/>
+              </a:ext>
+            </a:extLst>
+          </p:cNvPr>
+          <p:cNvSpPr/>
+          <p:nvPr/>
+        </p:nvSpPr>
+        <p:spPr>
+          <a:xfrm>
+            <a:off x="9571620" y="5548255"/>
+            <a:ext cx="2212030" cy="657053"/>
+          </a:xfrm>
+          <a:prstGeom prst="rect">
+            <a:avLst/>
+          </a:prstGeom>
+          <a:solidFill>
+            <a:schemeClr val="accent6"/>
+          </a:solidFill>
+        </p:spPr>
+        <p:style>
+          <a:lnRef idx="2">
+            <a:schemeClr val="accent1">
+              <a:shade val="50000"/>
+            </a:schemeClr>
+          </a:lnRef>
+          <a:fillRef idx="1">
+            <a:schemeClr val="accent1"/>
+          </a:fillRef>
+          <a:effectRef idx="0">
+            <a:schemeClr val="accent1"/>
+          </a:effectRef>
+          <a:fontRef idx="minor">
+            <a:schemeClr val="lt1"/>
+          </a:fontRef>
+        </p:style>
+        <p:txBody>
+          <a:bodyPr rtlCol="0" anchor="ctr"/>
+          <a:lstStyle/>
+          <a:p>
+            <a:pPr algn="ctr"/>
+            <a:r>
+              <a:rPr lang="en-US" sz="1000" dirty="0"/>
+              <a:t>com.tlw8253.exception</a:t>
+            </a:r>
+          </a:p>
+          <a:p>
+            <a:pPr algn="ctr"/>
+            <a:r>
+              <a:rPr lang="en-US" sz="1400" dirty="0" err="1"/>
+              <a:t>AccountNotFoundException</a:t>
+            </a:r>
+            <a:endParaRPr lang="en-US" sz="1400" dirty="0"/>
+          </a:p>
+        </p:txBody>
+      </p:sp>
+      <p:cxnSp>
+        <p:nvCxnSpPr>
+          <p:cNvPr id="12" name="Straight Arrow Connector 11">
+            <a:extLst>
+              <a:ext uri="{FF2B5EF4-FFF2-40B4-BE49-F238E27FC236}">
+                <a16:creationId xmlns:a16="http://schemas.microsoft.com/office/drawing/2014/main" id="{FF2076CA-F897-4293-B6CD-7408EB452156}"/>
+              </a:ext>
+            </a:extLst>
+          </p:cNvPr>
+          <p:cNvCxnSpPr>
+            <a:cxnSpLocks/>
+            <a:stCxn id="29" idx="2"/>
+            <a:endCxn id="31" idx="0"/>
+          </p:cNvCxnSpPr>
+          <p:nvPr/>
+        </p:nvCxnSpPr>
+        <p:spPr>
+          <a:xfrm>
+            <a:off x="8114725" y="4528084"/>
+            <a:ext cx="64721" cy="1421011"/>
+          </a:xfrm>
+          <a:prstGeom prst="straightConnector1">
+            <a:avLst/>
+          </a:prstGeom>
+          <a:ln>
+            <a:tailEnd type="triangle"/>
+          </a:ln>
+        </p:spPr>
+        <p:style>
+          <a:lnRef idx="1">
+            <a:schemeClr val="accent1"/>
+          </a:lnRef>
+          <a:fillRef idx="0">
+            <a:schemeClr val="accent1"/>
+          </a:fillRef>
+          <a:effectRef idx="0">
+            <a:schemeClr val="accent1"/>
+          </a:effectRef>
+          <a:fontRef idx="minor">
+            <a:schemeClr val="tx1"/>
+          </a:fontRef>
+        </p:style>
+      </p:cxnSp>
+      <p:cxnSp>
+        <p:nvCxnSpPr>
+          <p:cNvPr id="14" name="Straight Arrow Connector 13">
+            <a:extLst>
+              <a:ext uri="{FF2B5EF4-FFF2-40B4-BE49-F238E27FC236}">
+                <a16:creationId xmlns:a16="http://schemas.microsoft.com/office/drawing/2014/main" id="{5C625B7B-4A1E-46C5-9082-4FEC89B30DA9}"/>
+              </a:ext>
+            </a:extLst>
+          </p:cNvPr>
+          <p:cNvCxnSpPr>
+            <a:cxnSpLocks/>
+            <a:stCxn id="29" idx="2"/>
+            <a:endCxn id="32" idx="0"/>
+          </p:cNvCxnSpPr>
+          <p:nvPr/>
+        </p:nvCxnSpPr>
+        <p:spPr>
+          <a:xfrm>
+            <a:off x="8114725" y="4528084"/>
+            <a:ext cx="2562910" cy="1020171"/>
+          </a:xfrm>
+          <a:prstGeom prst="straightConnector1">
+            <a:avLst/>
+          </a:prstGeom>
+          <a:ln>
+            <a:tailEnd type="triangle"/>
+          </a:ln>
+        </p:spPr>
+        <p:style>
+          <a:lnRef idx="1">
+            <a:schemeClr val="accent1"/>
+          </a:lnRef>
+          <a:fillRef idx="0">
+            <a:schemeClr val="accent1"/>
+          </a:fillRef>
+          <a:effectRef idx="0">
+            <a:schemeClr val="accent1"/>
+          </a:effectRef>
+          <a:fontRef idx="minor">
+            <a:schemeClr val="tx1"/>
+          </a:fontRef>
+        </p:style>
+      </p:cxnSp>
+      <p:cxnSp>
+        <p:nvCxnSpPr>
+          <p:cNvPr id="10" name="Straight Arrow Connector 9">
+            <a:extLst>
+              <a:ext uri="{FF2B5EF4-FFF2-40B4-BE49-F238E27FC236}">
+                <a16:creationId xmlns:a16="http://schemas.microsoft.com/office/drawing/2014/main" id="{EF2F45FB-579D-4721-9889-3C0942B8BBFD}"/>
+              </a:ext>
+            </a:extLst>
+          </p:cNvPr>
+          <p:cNvCxnSpPr>
+            <a:stCxn id="25" idx="2"/>
+            <a:endCxn id="20" idx="3"/>
+          </p:cNvCxnSpPr>
+          <p:nvPr/>
+        </p:nvCxnSpPr>
+        <p:spPr>
+          <a:xfrm flipH="1" flipV="1">
+            <a:off x="8909686" y="2355357"/>
+            <a:ext cx="1597701" cy="1077750"/>
+          </a:xfrm>
+          <a:prstGeom prst="straightConnector1">
+            <a:avLst/>
+          </a:prstGeom>
+          <a:ln>
+            <a:tailEnd type="triangle"/>
+          </a:ln>
+        </p:spPr>
+        <p:style>
+          <a:lnRef idx="1">
+            <a:schemeClr val="accent1"/>
+          </a:lnRef>
+          <a:fillRef idx="0">
+            <a:schemeClr val="accent1"/>
+          </a:fillRef>
+          <a:effectRef idx="0">
+            <a:schemeClr val="accent1"/>
+          </a:effectRef>
+          <a:fontRef idx="minor">
+            <a:schemeClr val="tx1"/>
+          </a:fontRef>
+        </p:style>
+      </p:cxnSp>
+      <p:sp>
+        <p:nvSpPr>
+          <p:cNvPr id="36" name="Rectangle 35">
+            <a:extLst>
+              <a:ext uri="{FF2B5EF4-FFF2-40B4-BE49-F238E27FC236}">
+                <a16:creationId xmlns:a16="http://schemas.microsoft.com/office/drawing/2014/main" id="{93FBA679-F71B-47BD-BE29-21E7C2262CEB}"/>
+              </a:ext>
+            </a:extLst>
+          </p:cNvPr>
+          <p:cNvSpPr/>
+          <p:nvPr/>
+        </p:nvSpPr>
+        <p:spPr>
+          <a:xfrm>
+            <a:off x="2832621" y="4478037"/>
+            <a:ext cx="1494797" cy="991056"/>
+          </a:xfrm>
+          <a:prstGeom prst="rect">
+            <a:avLst/>
+          </a:prstGeom>
+          <a:solidFill>
+            <a:schemeClr val="accent6"/>
+          </a:solidFill>
+        </p:spPr>
+        <p:style>
+          <a:lnRef idx="2">
+            <a:schemeClr val="accent1">
+              <a:shade val="50000"/>
+            </a:schemeClr>
+          </a:lnRef>
+          <a:fillRef idx="1">
+            <a:schemeClr val="accent1"/>
+          </a:fillRef>
+          <a:effectRef idx="0">
+            <a:schemeClr val="accent1"/>
+          </a:effectRef>
+          <a:fontRef idx="minor">
+            <a:schemeClr val="lt1"/>
+          </a:fontRef>
+        </p:style>
+        <p:txBody>
+          <a:bodyPr rtlCol="0" anchor="ctr"/>
+          <a:lstStyle/>
+          <a:p>
+            <a:pPr algn="ctr"/>
+            <a:r>
+              <a:rPr lang="en-US" sz="1000" dirty="0"/>
+              <a:t>com.tlw8253.dto</a:t>
+            </a:r>
+          </a:p>
+          <a:p>
+            <a:pPr algn="ctr"/>
+            <a:r>
+              <a:rPr lang="en-US" sz="1200" dirty="0"/>
+              <a:t>Data Transfer Object</a:t>
+            </a:r>
+          </a:p>
+          <a:p>
+            <a:pPr algn="ctr"/>
+            <a:r>
+              <a:rPr lang="en-US" dirty="0"/>
+              <a:t>DTO</a:t>
+            </a:r>
+          </a:p>
+          <a:p>
+            <a:pPr algn="ctr"/>
+            <a:r>
+              <a:rPr lang="en-US" sz="1200" dirty="0" err="1"/>
+              <a:t>AddDTO</a:t>
+            </a:r>
+            <a:endParaRPr lang="en-US" sz="1200" dirty="0"/>
+          </a:p>
+          <a:p>
+            <a:pPr algn="ctr"/>
+            <a:r>
+              <a:rPr lang="en-US" sz="1200" dirty="0" err="1"/>
+              <a:t>EditDTO</a:t>
+            </a:r>
+            <a:endParaRPr lang="en-US" sz="1200" dirty="0"/>
+          </a:p>
+        </p:txBody>
+      </p:sp>
+      <p:cxnSp>
+        <p:nvCxnSpPr>
+          <p:cNvPr id="40" name="Straight Arrow Connector 39">
+            <a:extLst>
+              <a:ext uri="{FF2B5EF4-FFF2-40B4-BE49-F238E27FC236}">
+                <a16:creationId xmlns:a16="http://schemas.microsoft.com/office/drawing/2014/main" id="{4EB51AD1-53A9-412E-933D-8DFB38C76755}"/>
+              </a:ext>
+            </a:extLst>
+          </p:cNvPr>
+          <p:cNvCxnSpPr>
+            <a:cxnSpLocks/>
+            <a:stCxn id="15" idx="1"/>
+            <a:endCxn id="36" idx="0"/>
+          </p:cNvCxnSpPr>
+          <p:nvPr/>
+        </p:nvCxnSpPr>
+        <p:spPr>
+          <a:xfrm flipH="1">
+            <a:off x="3580020" y="3871031"/>
+            <a:ext cx="1682046" cy="607006"/>
+          </a:xfrm>
+          <a:prstGeom prst="straightConnector1">
+            <a:avLst/>
+          </a:prstGeom>
+          <a:ln>
+            <a:tailEnd type="triangle"/>
+          </a:ln>
+        </p:spPr>
+        <p:style>
+          <a:lnRef idx="1">
+            <a:schemeClr val="accent1"/>
+          </a:lnRef>
+          <a:fillRef idx="0">
+            <a:schemeClr val="accent1"/>
+          </a:fillRef>
+          <a:effectRef idx="0">
+            <a:schemeClr val="accent1"/>
+          </a:effectRef>
+          <a:fontRef idx="minor">
+            <a:schemeClr val="tx1"/>
+          </a:fontRef>
+        </p:style>
+      </p:cxnSp>
+      <p:sp>
+        <p:nvSpPr>
+          <p:cNvPr id="42" name="TextBox 41">
+            <a:extLst>
+              <a:ext uri="{FF2B5EF4-FFF2-40B4-BE49-F238E27FC236}">
+                <a16:creationId xmlns:a16="http://schemas.microsoft.com/office/drawing/2014/main" id="{42986CB5-3F27-4531-B052-275C80DE06A9}"/>
+              </a:ext>
+            </a:extLst>
+          </p:cNvPr>
+          <p:cNvSpPr txBox="1"/>
+          <p:nvPr/>
+        </p:nvSpPr>
+        <p:spPr>
+          <a:xfrm>
+            <a:off x="3767269" y="3901307"/>
+            <a:ext cx="1062021" cy="276999"/>
+          </a:xfrm>
+          <a:prstGeom prst="rect">
+            <a:avLst/>
+          </a:prstGeom>
+          <a:noFill/>
+        </p:spPr>
+        <p:txBody>
+          <a:bodyPr wrap="square" rtlCol="0">
+            <a:spAutoFit/>
+          </a:bodyPr>
+          <a:lstStyle/>
+          <a:p>
+            <a:r>
+              <a:rPr lang="en-US" sz="1200" dirty="0"/>
+              <a:t>extends</a:t>
+            </a:r>
+          </a:p>
+        </p:txBody>
+      </p:sp>
+      <p:sp>
+        <p:nvSpPr>
+          <p:cNvPr id="46" name="TextBox 45">
+            <a:extLst>
+              <a:ext uri="{FF2B5EF4-FFF2-40B4-BE49-F238E27FC236}">
+                <a16:creationId xmlns:a16="http://schemas.microsoft.com/office/drawing/2014/main" id="{5EBBC5A0-26BA-4B6E-A551-6AD1BA1617D0}"/>
+              </a:ext>
+            </a:extLst>
+          </p:cNvPr>
+          <p:cNvSpPr txBox="1"/>
+          <p:nvPr/>
+        </p:nvSpPr>
+        <p:spPr>
+          <a:xfrm>
+            <a:off x="4817052" y="2409916"/>
+            <a:ext cx="728932" cy="276999"/>
+          </a:xfrm>
+          <a:prstGeom prst="rect">
+            <a:avLst/>
+          </a:prstGeom>
+          <a:noFill/>
+        </p:spPr>
+        <p:txBody>
+          <a:bodyPr wrap="square" rtlCol="0">
+            <a:spAutoFit/>
+          </a:bodyPr>
+          <a:lstStyle/>
+          <a:p>
+            <a:r>
+              <a:rPr lang="en-US" sz="1200" dirty="0"/>
+              <a:t>returns</a:t>
+            </a:r>
+          </a:p>
+        </p:txBody>
+      </p:sp>
+    </p:spTree>
+    <p:extLst>
+      <p:ext uri="{BB962C8B-B14F-4D97-AF65-F5344CB8AC3E}">
+        <p14:creationId xmlns:p14="http://schemas.microsoft.com/office/powerpoint/2010/main" val="3439315533"/>
+      </p:ext>
+    </p:extLst>
+  </p:cSld>
+  <p:clrMapOvr>
+    <a:masterClrMapping/>
+  </p:clrMapOvr>
+</p:sld>
+</file>
+
+<file path=ppt/slides/slide7.xml><?xml version="1.0" encoding="utf-8"?>
+<p:sld xmlns:a="http://schemas.openxmlformats.org/drawingml/2006/main" xmlns:r="http://schemas.openxmlformats.org/officeDocument/2006/relationships" xmlns:p="http://schemas.openxmlformats.org/presentationml/2006/main">
+  <p:cSld>
+    <p:spTree>
+      <p:nvGrpSpPr>
+        <p:cNvPr id="1" name=""/>
+        <p:cNvGrpSpPr/>
+        <p:nvPr/>
+      </p:nvGrpSpPr>
+      <p:grpSpPr>
+        <a:xfrm>
+          <a:off x="0" y="0"/>
+          <a:ext cx="0" cy="0"/>
+          <a:chOff x="0" y="0"/>
+          <a:chExt cx="0" cy="0"/>
+        </a:xfrm>
+      </p:grpSpPr>
+      <p:sp>
+        <p:nvSpPr>
+          <p:cNvPr id="4" name="Rectangle 3"/>
+          <p:cNvSpPr/>
+          <p:nvPr/>
+        </p:nvSpPr>
+        <p:spPr>
+          <a:xfrm>
+            <a:off x="4199670" y="832269"/>
+            <a:ext cx="1494797" cy="991056"/>
+          </a:xfrm>
+          <a:prstGeom prst="rect">
+            <a:avLst/>
+          </a:prstGeom>
+        </p:spPr>
+        <p:style>
+          <a:lnRef idx="2">
+            <a:schemeClr val="accent1">
+              <a:shade val="50000"/>
+            </a:schemeClr>
+          </a:lnRef>
+          <a:fillRef idx="1">
+            <a:schemeClr val="accent1"/>
+          </a:fillRef>
+          <a:effectRef idx="0">
+            <a:schemeClr val="accent1"/>
+          </a:effectRef>
+          <a:fontRef idx="minor">
+            <a:schemeClr val="lt1"/>
+          </a:fontRef>
+        </p:style>
+        <p:txBody>
+          <a:bodyPr rtlCol="0" anchor="ctr"/>
+          <a:lstStyle/>
+          <a:p>
+            <a:pPr algn="ctr"/>
+            <a:r>
+              <a:rPr lang="en-US" sz="1000" dirty="0"/>
+              <a:t>com.tlw8253.dao</a:t>
+            </a:r>
+          </a:p>
+          <a:p>
+            <a:pPr algn="ctr"/>
+            <a:r>
+              <a:rPr lang="en-US" sz="1000" dirty="0"/>
+              <a:t>&lt;&lt; interface &gt;&gt;</a:t>
+            </a:r>
+          </a:p>
+          <a:p>
+            <a:pPr algn="ctr"/>
+            <a:r>
+              <a:rPr lang="en-US" dirty="0" err="1"/>
+              <a:t>ClientDAO</a:t>
+            </a:r>
+            <a:endParaRPr lang="en-US" dirty="0"/>
+          </a:p>
+        </p:txBody>
+      </p:sp>
+      <p:sp>
+        <p:nvSpPr>
+          <p:cNvPr id="5" name="Rectangle 4"/>
+          <p:cNvSpPr/>
+          <p:nvPr/>
+        </p:nvSpPr>
+        <p:spPr>
+          <a:xfrm>
+            <a:off x="1039424" y="2278701"/>
+            <a:ext cx="1494797" cy="991056"/>
+          </a:xfrm>
+          <a:prstGeom prst="rect">
+            <a:avLst/>
+          </a:prstGeom>
+        </p:spPr>
+        <p:style>
+          <a:lnRef idx="2">
+            <a:schemeClr val="accent1">
+              <a:shade val="50000"/>
+            </a:schemeClr>
+          </a:lnRef>
+          <a:fillRef idx="1">
+            <a:schemeClr val="accent1"/>
+          </a:fillRef>
+          <a:effectRef idx="0">
+            <a:schemeClr val="accent1"/>
+          </a:effectRef>
+          <a:fontRef idx="minor">
+            <a:schemeClr val="lt1"/>
+          </a:fontRef>
+        </p:style>
+        <p:txBody>
+          <a:bodyPr rtlCol="0" anchor="ctr"/>
+          <a:lstStyle/>
+          <a:p>
+            <a:pPr algn="ctr"/>
+            <a:r>
+              <a:rPr lang="en-US" sz="1000" dirty="0"/>
+              <a:t>com.tlw8253.model</a:t>
+            </a:r>
+          </a:p>
+          <a:p>
+            <a:pPr algn="ctr"/>
+            <a:r>
               <a:rPr lang="en-US" dirty="0"/>
               <a:t>Client</a:t>
             </a:r>
@@ -9387,7 +11318,7 @@
           <p:cNvPr id="11" name="TextBox 10">
             <a:extLst>
               <a:ext uri="{FF2B5EF4-FFF2-40B4-BE49-F238E27FC236}">
-                <a16:creationId xmlns="" xmlns:a16="http://schemas.microsoft.com/office/drawing/2014/main" id="{E0BBD6C8-C8F2-40C5-AA64-85961A11ADC2}"/>
+                <a16:creationId xmlns:a16="http://schemas.microsoft.com/office/drawing/2014/main" id="{E0BBD6C8-C8F2-40C5-AA64-85961A11ADC2}"/>
               </a:ext>
             </a:extLst>
           </p:cNvPr>

</xml_diff>

<commit_message>
20210804 update to files from tlw8748253.
</commit_message>
<xml_diff>
--- a/docs/Project 0.pptx
+++ b/docs/Project 0.pptx
@@ -140,7 +140,7 @@
           <p:cNvPr id="2" name="Title 1">
             <a:extLst>
               <a:ext uri="{FF2B5EF4-FFF2-40B4-BE49-F238E27FC236}">
-                <a16:creationId xmlns:a16="http://schemas.microsoft.com/office/drawing/2014/main" id="{67106D7E-D400-44F1-9A1A-D68CE501C73D}"/>
+                <a16:creationId xmlns:a16="http://schemas.microsoft.com/office/drawing/2014/main" xmlns="" id="{67106D7E-D400-44F1-9A1A-D68CE501C73D}"/>
               </a:ext>
             </a:extLst>
           </p:cNvPr>
@@ -177,7 +177,7 @@
           <p:cNvPr id="3" name="Subtitle 2">
             <a:extLst>
               <a:ext uri="{FF2B5EF4-FFF2-40B4-BE49-F238E27FC236}">
-                <a16:creationId xmlns:a16="http://schemas.microsoft.com/office/drawing/2014/main" id="{A5FDE527-E621-4639-A0C7-E1E9B0DFBCEC}"/>
+                <a16:creationId xmlns:a16="http://schemas.microsoft.com/office/drawing/2014/main" xmlns="" id="{A5FDE527-E621-4639-A0C7-E1E9B0DFBCEC}"/>
               </a:ext>
             </a:extLst>
           </p:cNvPr>
@@ -247,7 +247,7 @@
           <p:cNvPr id="4" name="Date Placeholder 3">
             <a:extLst>
               <a:ext uri="{FF2B5EF4-FFF2-40B4-BE49-F238E27FC236}">
-                <a16:creationId xmlns:a16="http://schemas.microsoft.com/office/drawing/2014/main" id="{E109CE88-B989-4109-89C8-36F7C245DB1C}"/>
+                <a16:creationId xmlns:a16="http://schemas.microsoft.com/office/drawing/2014/main" xmlns="" id="{E109CE88-B989-4109-89C8-36F7C245DB1C}"/>
               </a:ext>
             </a:extLst>
           </p:cNvPr>
@@ -265,7 +265,7 @@
           <a:p>
             <a:fld id="{6C733091-19F0-4DD7-90FE-000B4789B4CF}" type="datetimeFigureOut">
               <a:rPr lang="en-US" smtClean="0"/>
-              <a:t>8/3/2021</a:t>
+              <a:t>8/4/2021</a:t>
             </a:fld>
             <a:endParaRPr lang="en-US"/>
           </a:p>
@@ -276,7 +276,7 @@
           <p:cNvPr id="5" name="Footer Placeholder 4">
             <a:extLst>
               <a:ext uri="{FF2B5EF4-FFF2-40B4-BE49-F238E27FC236}">
-                <a16:creationId xmlns:a16="http://schemas.microsoft.com/office/drawing/2014/main" id="{0841498F-B991-43D3-B408-CC35D8EFCF37}"/>
+                <a16:creationId xmlns:a16="http://schemas.microsoft.com/office/drawing/2014/main" xmlns="" id="{0841498F-B991-43D3-B408-CC35D8EFCF37}"/>
               </a:ext>
             </a:extLst>
           </p:cNvPr>
@@ -301,7 +301,7 @@
           <p:cNvPr id="6" name="Slide Number Placeholder 5">
             <a:extLst>
               <a:ext uri="{FF2B5EF4-FFF2-40B4-BE49-F238E27FC236}">
-                <a16:creationId xmlns:a16="http://schemas.microsoft.com/office/drawing/2014/main" id="{01754CB8-17B1-45A0-AE7D-755EAA1B69D8}"/>
+                <a16:creationId xmlns:a16="http://schemas.microsoft.com/office/drawing/2014/main" xmlns="" id="{01754CB8-17B1-45A0-AE7D-755EAA1B69D8}"/>
               </a:ext>
             </a:extLst>
           </p:cNvPr>
@@ -360,7 +360,7 @@
           <p:cNvPr id="2" name="Title 1">
             <a:extLst>
               <a:ext uri="{FF2B5EF4-FFF2-40B4-BE49-F238E27FC236}">
-                <a16:creationId xmlns:a16="http://schemas.microsoft.com/office/drawing/2014/main" id="{E7A7B055-5DC2-440D-83C1-CAAE8E9A8E14}"/>
+                <a16:creationId xmlns:a16="http://schemas.microsoft.com/office/drawing/2014/main" xmlns="" id="{E7A7B055-5DC2-440D-83C1-CAAE8E9A8E14}"/>
               </a:ext>
             </a:extLst>
           </p:cNvPr>
@@ -388,7 +388,7 @@
           <p:cNvPr id="3" name="Vertical Text Placeholder 2">
             <a:extLst>
               <a:ext uri="{FF2B5EF4-FFF2-40B4-BE49-F238E27FC236}">
-                <a16:creationId xmlns:a16="http://schemas.microsoft.com/office/drawing/2014/main" id="{65710707-423D-4F9D-A49D-6C764C562553}"/>
+                <a16:creationId xmlns:a16="http://schemas.microsoft.com/office/drawing/2014/main" xmlns="" id="{65710707-423D-4F9D-A49D-6C764C562553}"/>
               </a:ext>
             </a:extLst>
           </p:cNvPr>
@@ -445,7 +445,7 @@
           <p:cNvPr id="4" name="Date Placeholder 3">
             <a:extLst>
               <a:ext uri="{FF2B5EF4-FFF2-40B4-BE49-F238E27FC236}">
-                <a16:creationId xmlns:a16="http://schemas.microsoft.com/office/drawing/2014/main" id="{98B6F7EF-D1BE-4437-85F3-99626E37E4EF}"/>
+                <a16:creationId xmlns:a16="http://schemas.microsoft.com/office/drawing/2014/main" xmlns="" id="{98B6F7EF-D1BE-4437-85F3-99626E37E4EF}"/>
               </a:ext>
             </a:extLst>
           </p:cNvPr>
@@ -463,7 +463,7 @@
           <a:p>
             <a:fld id="{6C733091-19F0-4DD7-90FE-000B4789B4CF}" type="datetimeFigureOut">
               <a:rPr lang="en-US" smtClean="0"/>
-              <a:t>8/3/2021</a:t>
+              <a:t>8/4/2021</a:t>
             </a:fld>
             <a:endParaRPr lang="en-US"/>
           </a:p>
@@ -474,7 +474,7 @@
           <p:cNvPr id="5" name="Footer Placeholder 4">
             <a:extLst>
               <a:ext uri="{FF2B5EF4-FFF2-40B4-BE49-F238E27FC236}">
-                <a16:creationId xmlns:a16="http://schemas.microsoft.com/office/drawing/2014/main" id="{D890AA9B-E479-4209-B245-83608F3D4013}"/>
+                <a16:creationId xmlns:a16="http://schemas.microsoft.com/office/drawing/2014/main" xmlns="" id="{D890AA9B-E479-4209-B245-83608F3D4013}"/>
               </a:ext>
             </a:extLst>
           </p:cNvPr>
@@ -499,7 +499,7 @@
           <p:cNvPr id="6" name="Slide Number Placeholder 5">
             <a:extLst>
               <a:ext uri="{FF2B5EF4-FFF2-40B4-BE49-F238E27FC236}">
-                <a16:creationId xmlns:a16="http://schemas.microsoft.com/office/drawing/2014/main" id="{0E4976E4-E15A-4296-A430-633D2BB9142B}"/>
+                <a16:creationId xmlns:a16="http://schemas.microsoft.com/office/drawing/2014/main" xmlns="" id="{0E4976E4-E15A-4296-A430-633D2BB9142B}"/>
               </a:ext>
             </a:extLst>
           </p:cNvPr>
@@ -558,7 +558,7 @@
           <p:cNvPr id="2" name="Vertical Title 1">
             <a:extLst>
               <a:ext uri="{FF2B5EF4-FFF2-40B4-BE49-F238E27FC236}">
-                <a16:creationId xmlns:a16="http://schemas.microsoft.com/office/drawing/2014/main" id="{66F63CF5-8DEE-4BB2-A2A5-5C16FEBE1AD5}"/>
+                <a16:creationId xmlns:a16="http://schemas.microsoft.com/office/drawing/2014/main" xmlns="" id="{66F63CF5-8DEE-4BB2-A2A5-5C16FEBE1AD5}"/>
               </a:ext>
             </a:extLst>
           </p:cNvPr>
@@ -591,7 +591,7 @@
           <p:cNvPr id="3" name="Vertical Text Placeholder 2">
             <a:extLst>
               <a:ext uri="{FF2B5EF4-FFF2-40B4-BE49-F238E27FC236}">
-                <a16:creationId xmlns:a16="http://schemas.microsoft.com/office/drawing/2014/main" id="{E0D5EBA5-94AF-4373-B032-A40FF73C7575}"/>
+                <a16:creationId xmlns:a16="http://schemas.microsoft.com/office/drawing/2014/main" xmlns="" id="{E0D5EBA5-94AF-4373-B032-A40FF73C7575}"/>
               </a:ext>
             </a:extLst>
           </p:cNvPr>
@@ -653,7 +653,7 @@
           <p:cNvPr id="4" name="Date Placeholder 3">
             <a:extLst>
               <a:ext uri="{FF2B5EF4-FFF2-40B4-BE49-F238E27FC236}">
-                <a16:creationId xmlns:a16="http://schemas.microsoft.com/office/drawing/2014/main" id="{7426B8E1-6758-4F5E-B618-96641332600B}"/>
+                <a16:creationId xmlns:a16="http://schemas.microsoft.com/office/drawing/2014/main" xmlns="" id="{7426B8E1-6758-4F5E-B618-96641332600B}"/>
               </a:ext>
             </a:extLst>
           </p:cNvPr>
@@ -671,7 +671,7 @@
           <a:p>
             <a:fld id="{6C733091-19F0-4DD7-90FE-000B4789B4CF}" type="datetimeFigureOut">
               <a:rPr lang="en-US" smtClean="0"/>
-              <a:t>8/3/2021</a:t>
+              <a:t>8/4/2021</a:t>
             </a:fld>
             <a:endParaRPr lang="en-US"/>
           </a:p>
@@ -682,7 +682,7 @@
           <p:cNvPr id="5" name="Footer Placeholder 4">
             <a:extLst>
               <a:ext uri="{FF2B5EF4-FFF2-40B4-BE49-F238E27FC236}">
-                <a16:creationId xmlns:a16="http://schemas.microsoft.com/office/drawing/2014/main" id="{F65E330E-2A7E-482D-AE0F-70EA5A29958B}"/>
+                <a16:creationId xmlns:a16="http://schemas.microsoft.com/office/drawing/2014/main" xmlns="" id="{F65E330E-2A7E-482D-AE0F-70EA5A29958B}"/>
               </a:ext>
             </a:extLst>
           </p:cNvPr>
@@ -707,7 +707,7 @@
           <p:cNvPr id="6" name="Slide Number Placeholder 5">
             <a:extLst>
               <a:ext uri="{FF2B5EF4-FFF2-40B4-BE49-F238E27FC236}">
-                <a16:creationId xmlns:a16="http://schemas.microsoft.com/office/drawing/2014/main" id="{B8000005-FC38-4A6C-9D09-7945EFA08160}"/>
+                <a16:creationId xmlns:a16="http://schemas.microsoft.com/office/drawing/2014/main" xmlns="" id="{B8000005-FC38-4A6C-9D09-7945EFA08160}"/>
               </a:ext>
             </a:extLst>
           </p:cNvPr>
@@ -766,7 +766,7 @@
           <p:cNvPr id="2" name="Title 1">
             <a:extLst>
               <a:ext uri="{FF2B5EF4-FFF2-40B4-BE49-F238E27FC236}">
-                <a16:creationId xmlns:a16="http://schemas.microsoft.com/office/drawing/2014/main" id="{91D0002C-766B-44B4-A24C-BE6DE6C7BA4C}"/>
+                <a16:creationId xmlns:a16="http://schemas.microsoft.com/office/drawing/2014/main" xmlns="" id="{91D0002C-766B-44B4-A24C-BE6DE6C7BA4C}"/>
               </a:ext>
             </a:extLst>
           </p:cNvPr>
@@ -794,7 +794,7 @@
           <p:cNvPr id="3" name="Content Placeholder 2">
             <a:extLst>
               <a:ext uri="{FF2B5EF4-FFF2-40B4-BE49-F238E27FC236}">
-                <a16:creationId xmlns:a16="http://schemas.microsoft.com/office/drawing/2014/main" id="{3455BAA9-6C7B-4874-AD76-BD466F64802D}"/>
+                <a16:creationId xmlns:a16="http://schemas.microsoft.com/office/drawing/2014/main" xmlns="" id="{3455BAA9-6C7B-4874-AD76-BD466F64802D}"/>
               </a:ext>
             </a:extLst>
           </p:cNvPr>
@@ -851,7 +851,7 @@
           <p:cNvPr id="4" name="Date Placeholder 3">
             <a:extLst>
               <a:ext uri="{FF2B5EF4-FFF2-40B4-BE49-F238E27FC236}">
-                <a16:creationId xmlns:a16="http://schemas.microsoft.com/office/drawing/2014/main" id="{8776BDAF-D8F2-4A61-904D-094BB4545702}"/>
+                <a16:creationId xmlns:a16="http://schemas.microsoft.com/office/drawing/2014/main" xmlns="" id="{8776BDAF-D8F2-4A61-904D-094BB4545702}"/>
               </a:ext>
             </a:extLst>
           </p:cNvPr>
@@ -869,7 +869,7 @@
           <a:p>
             <a:fld id="{6C733091-19F0-4DD7-90FE-000B4789B4CF}" type="datetimeFigureOut">
               <a:rPr lang="en-US" smtClean="0"/>
-              <a:t>8/3/2021</a:t>
+              <a:t>8/4/2021</a:t>
             </a:fld>
             <a:endParaRPr lang="en-US"/>
           </a:p>
@@ -880,7 +880,7 @@
           <p:cNvPr id="5" name="Footer Placeholder 4">
             <a:extLst>
               <a:ext uri="{FF2B5EF4-FFF2-40B4-BE49-F238E27FC236}">
-                <a16:creationId xmlns:a16="http://schemas.microsoft.com/office/drawing/2014/main" id="{F89C5665-4384-4706-9BD2-9F42B05C96BC}"/>
+                <a16:creationId xmlns:a16="http://schemas.microsoft.com/office/drawing/2014/main" xmlns="" id="{F89C5665-4384-4706-9BD2-9F42B05C96BC}"/>
               </a:ext>
             </a:extLst>
           </p:cNvPr>
@@ -905,7 +905,7 @@
           <p:cNvPr id="6" name="Slide Number Placeholder 5">
             <a:extLst>
               <a:ext uri="{FF2B5EF4-FFF2-40B4-BE49-F238E27FC236}">
-                <a16:creationId xmlns:a16="http://schemas.microsoft.com/office/drawing/2014/main" id="{7DCAD73E-CAB3-4BA7-905E-D203691D0418}"/>
+                <a16:creationId xmlns:a16="http://schemas.microsoft.com/office/drawing/2014/main" xmlns="" id="{7DCAD73E-CAB3-4BA7-905E-D203691D0418}"/>
               </a:ext>
             </a:extLst>
           </p:cNvPr>
@@ -964,7 +964,7 @@
           <p:cNvPr id="2" name="Title 1">
             <a:extLst>
               <a:ext uri="{FF2B5EF4-FFF2-40B4-BE49-F238E27FC236}">
-                <a16:creationId xmlns:a16="http://schemas.microsoft.com/office/drawing/2014/main" id="{A9880706-F7FA-4EC3-A022-9D6C7CEC3692}"/>
+                <a16:creationId xmlns:a16="http://schemas.microsoft.com/office/drawing/2014/main" xmlns="" id="{A9880706-F7FA-4EC3-A022-9D6C7CEC3692}"/>
               </a:ext>
             </a:extLst>
           </p:cNvPr>
@@ -1001,7 +1001,7 @@
           <p:cNvPr id="3" name="Text Placeholder 2">
             <a:extLst>
               <a:ext uri="{FF2B5EF4-FFF2-40B4-BE49-F238E27FC236}">
-                <a16:creationId xmlns:a16="http://schemas.microsoft.com/office/drawing/2014/main" id="{FA8A65D0-3DF5-448D-82EC-A967682A0DED}"/>
+                <a16:creationId xmlns:a16="http://schemas.microsoft.com/office/drawing/2014/main" xmlns="" id="{FA8A65D0-3DF5-448D-82EC-A967682A0DED}"/>
               </a:ext>
             </a:extLst>
           </p:cNvPr>
@@ -1126,7 +1126,7 @@
           <p:cNvPr id="4" name="Date Placeholder 3">
             <a:extLst>
               <a:ext uri="{FF2B5EF4-FFF2-40B4-BE49-F238E27FC236}">
-                <a16:creationId xmlns:a16="http://schemas.microsoft.com/office/drawing/2014/main" id="{600EA68C-01A6-487D-9D6E-1D1B4EAC0440}"/>
+                <a16:creationId xmlns:a16="http://schemas.microsoft.com/office/drawing/2014/main" xmlns="" id="{600EA68C-01A6-487D-9D6E-1D1B4EAC0440}"/>
               </a:ext>
             </a:extLst>
           </p:cNvPr>
@@ -1144,7 +1144,7 @@
           <a:p>
             <a:fld id="{6C733091-19F0-4DD7-90FE-000B4789B4CF}" type="datetimeFigureOut">
               <a:rPr lang="en-US" smtClean="0"/>
-              <a:t>8/3/2021</a:t>
+              <a:t>8/4/2021</a:t>
             </a:fld>
             <a:endParaRPr lang="en-US"/>
           </a:p>
@@ -1155,7 +1155,7 @@
           <p:cNvPr id="5" name="Footer Placeholder 4">
             <a:extLst>
               <a:ext uri="{FF2B5EF4-FFF2-40B4-BE49-F238E27FC236}">
-                <a16:creationId xmlns:a16="http://schemas.microsoft.com/office/drawing/2014/main" id="{6E6527CB-4FFD-4569-A82C-5EDC311B2CF6}"/>
+                <a16:creationId xmlns:a16="http://schemas.microsoft.com/office/drawing/2014/main" xmlns="" id="{6E6527CB-4FFD-4569-A82C-5EDC311B2CF6}"/>
               </a:ext>
             </a:extLst>
           </p:cNvPr>
@@ -1180,7 +1180,7 @@
           <p:cNvPr id="6" name="Slide Number Placeholder 5">
             <a:extLst>
               <a:ext uri="{FF2B5EF4-FFF2-40B4-BE49-F238E27FC236}">
-                <a16:creationId xmlns:a16="http://schemas.microsoft.com/office/drawing/2014/main" id="{24B19E5B-5A98-4381-A01D-01F81FD65792}"/>
+                <a16:creationId xmlns:a16="http://schemas.microsoft.com/office/drawing/2014/main" xmlns="" id="{24B19E5B-5A98-4381-A01D-01F81FD65792}"/>
               </a:ext>
             </a:extLst>
           </p:cNvPr>
@@ -1239,7 +1239,7 @@
           <p:cNvPr id="2" name="Title 1">
             <a:extLst>
               <a:ext uri="{FF2B5EF4-FFF2-40B4-BE49-F238E27FC236}">
-                <a16:creationId xmlns:a16="http://schemas.microsoft.com/office/drawing/2014/main" id="{63228B71-E923-4431-B8D2-FAE724678940}"/>
+                <a16:creationId xmlns:a16="http://schemas.microsoft.com/office/drawing/2014/main" xmlns="" id="{63228B71-E923-4431-B8D2-FAE724678940}"/>
               </a:ext>
             </a:extLst>
           </p:cNvPr>
@@ -1267,7 +1267,7 @@
           <p:cNvPr id="3" name="Content Placeholder 2">
             <a:extLst>
               <a:ext uri="{FF2B5EF4-FFF2-40B4-BE49-F238E27FC236}">
-                <a16:creationId xmlns:a16="http://schemas.microsoft.com/office/drawing/2014/main" id="{B18895E9-B7FF-4A00-955B-206CF8C73E43}"/>
+                <a16:creationId xmlns:a16="http://schemas.microsoft.com/office/drawing/2014/main" xmlns="" id="{B18895E9-B7FF-4A00-955B-206CF8C73E43}"/>
               </a:ext>
             </a:extLst>
           </p:cNvPr>
@@ -1329,7 +1329,7 @@
           <p:cNvPr id="4" name="Content Placeholder 3">
             <a:extLst>
               <a:ext uri="{FF2B5EF4-FFF2-40B4-BE49-F238E27FC236}">
-                <a16:creationId xmlns:a16="http://schemas.microsoft.com/office/drawing/2014/main" id="{DA813955-E3B9-44BC-8E1D-139269C8B48A}"/>
+                <a16:creationId xmlns:a16="http://schemas.microsoft.com/office/drawing/2014/main" xmlns="" id="{DA813955-E3B9-44BC-8E1D-139269C8B48A}"/>
               </a:ext>
             </a:extLst>
           </p:cNvPr>
@@ -1391,7 +1391,7 @@
           <p:cNvPr id="5" name="Date Placeholder 4">
             <a:extLst>
               <a:ext uri="{FF2B5EF4-FFF2-40B4-BE49-F238E27FC236}">
-                <a16:creationId xmlns:a16="http://schemas.microsoft.com/office/drawing/2014/main" id="{7E9B8EF5-28D5-4C4E-A2AB-EEA30D75DAFE}"/>
+                <a16:creationId xmlns:a16="http://schemas.microsoft.com/office/drawing/2014/main" xmlns="" id="{7E9B8EF5-28D5-4C4E-A2AB-EEA30D75DAFE}"/>
               </a:ext>
             </a:extLst>
           </p:cNvPr>
@@ -1409,7 +1409,7 @@
           <a:p>
             <a:fld id="{6C733091-19F0-4DD7-90FE-000B4789B4CF}" type="datetimeFigureOut">
               <a:rPr lang="en-US" smtClean="0"/>
-              <a:t>8/3/2021</a:t>
+              <a:t>8/4/2021</a:t>
             </a:fld>
             <a:endParaRPr lang="en-US"/>
           </a:p>
@@ -1420,7 +1420,7 @@
           <p:cNvPr id="6" name="Footer Placeholder 5">
             <a:extLst>
               <a:ext uri="{FF2B5EF4-FFF2-40B4-BE49-F238E27FC236}">
-                <a16:creationId xmlns:a16="http://schemas.microsoft.com/office/drawing/2014/main" id="{5723E678-8CB4-4335-AA04-6BD391748717}"/>
+                <a16:creationId xmlns:a16="http://schemas.microsoft.com/office/drawing/2014/main" xmlns="" id="{5723E678-8CB4-4335-AA04-6BD391748717}"/>
               </a:ext>
             </a:extLst>
           </p:cNvPr>
@@ -1445,7 +1445,7 @@
           <p:cNvPr id="7" name="Slide Number Placeholder 6">
             <a:extLst>
               <a:ext uri="{FF2B5EF4-FFF2-40B4-BE49-F238E27FC236}">
-                <a16:creationId xmlns:a16="http://schemas.microsoft.com/office/drawing/2014/main" id="{887B5567-9F4D-4AE1-92D8-769C9F7EA4F0}"/>
+                <a16:creationId xmlns:a16="http://schemas.microsoft.com/office/drawing/2014/main" xmlns="" id="{887B5567-9F4D-4AE1-92D8-769C9F7EA4F0}"/>
               </a:ext>
             </a:extLst>
           </p:cNvPr>
@@ -1504,7 +1504,7 @@
           <p:cNvPr id="2" name="Title 1">
             <a:extLst>
               <a:ext uri="{FF2B5EF4-FFF2-40B4-BE49-F238E27FC236}">
-                <a16:creationId xmlns:a16="http://schemas.microsoft.com/office/drawing/2014/main" id="{A40320A9-7C0C-45B4-BF2B-3B53B5686EBB}"/>
+                <a16:creationId xmlns:a16="http://schemas.microsoft.com/office/drawing/2014/main" xmlns="" id="{A40320A9-7C0C-45B4-BF2B-3B53B5686EBB}"/>
               </a:ext>
             </a:extLst>
           </p:cNvPr>
@@ -1537,7 +1537,7 @@
           <p:cNvPr id="3" name="Text Placeholder 2">
             <a:extLst>
               <a:ext uri="{FF2B5EF4-FFF2-40B4-BE49-F238E27FC236}">
-                <a16:creationId xmlns:a16="http://schemas.microsoft.com/office/drawing/2014/main" id="{8C440DE1-7DD6-4B1C-B961-CD2079B51F03}"/>
+                <a16:creationId xmlns:a16="http://schemas.microsoft.com/office/drawing/2014/main" xmlns="" id="{8C440DE1-7DD6-4B1C-B961-CD2079B51F03}"/>
               </a:ext>
             </a:extLst>
           </p:cNvPr>
@@ -1608,7 +1608,7 @@
           <p:cNvPr id="4" name="Content Placeholder 3">
             <a:extLst>
               <a:ext uri="{FF2B5EF4-FFF2-40B4-BE49-F238E27FC236}">
-                <a16:creationId xmlns:a16="http://schemas.microsoft.com/office/drawing/2014/main" id="{6FAFE840-CC9A-4D89-B05F-159EF756B427}"/>
+                <a16:creationId xmlns:a16="http://schemas.microsoft.com/office/drawing/2014/main" xmlns="" id="{6FAFE840-CC9A-4D89-B05F-159EF756B427}"/>
               </a:ext>
             </a:extLst>
           </p:cNvPr>
@@ -1670,7 +1670,7 @@
           <p:cNvPr id="5" name="Text Placeholder 4">
             <a:extLst>
               <a:ext uri="{FF2B5EF4-FFF2-40B4-BE49-F238E27FC236}">
-                <a16:creationId xmlns:a16="http://schemas.microsoft.com/office/drawing/2014/main" id="{4B87AADC-3401-48C6-98F6-0AB60F6DF9BE}"/>
+                <a16:creationId xmlns:a16="http://schemas.microsoft.com/office/drawing/2014/main" xmlns="" id="{4B87AADC-3401-48C6-98F6-0AB60F6DF9BE}"/>
               </a:ext>
             </a:extLst>
           </p:cNvPr>
@@ -1741,7 +1741,7 @@
           <p:cNvPr id="6" name="Content Placeholder 5">
             <a:extLst>
               <a:ext uri="{FF2B5EF4-FFF2-40B4-BE49-F238E27FC236}">
-                <a16:creationId xmlns:a16="http://schemas.microsoft.com/office/drawing/2014/main" id="{34BCF1A4-FB52-4DCD-80BC-324BA41C33CD}"/>
+                <a16:creationId xmlns:a16="http://schemas.microsoft.com/office/drawing/2014/main" xmlns="" id="{34BCF1A4-FB52-4DCD-80BC-324BA41C33CD}"/>
               </a:ext>
             </a:extLst>
           </p:cNvPr>
@@ -1803,7 +1803,7 @@
           <p:cNvPr id="7" name="Date Placeholder 6">
             <a:extLst>
               <a:ext uri="{FF2B5EF4-FFF2-40B4-BE49-F238E27FC236}">
-                <a16:creationId xmlns:a16="http://schemas.microsoft.com/office/drawing/2014/main" id="{8CFD4208-60E7-48B1-8CD0-717D5E26B827}"/>
+                <a16:creationId xmlns:a16="http://schemas.microsoft.com/office/drawing/2014/main" xmlns="" id="{8CFD4208-60E7-48B1-8CD0-717D5E26B827}"/>
               </a:ext>
             </a:extLst>
           </p:cNvPr>
@@ -1821,7 +1821,7 @@
           <a:p>
             <a:fld id="{6C733091-19F0-4DD7-90FE-000B4789B4CF}" type="datetimeFigureOut">
               <a:rPr lang="en-US" smtClean="0"/>
-              <a:t>8/3/2021</a:t>
+              <a:t>8/4/2021</a:t>
             </a:fld>
             <a:endParaRPr lang="en-US"/>
           </a:p>
@@ -1832,7 +1832,7 @@
           <p:cNvPr id="8" name="Footer Placeholder 7">
             <a:extLst>
               <a:ext uri="{FF2B5EF4-FFF2-40B4-BE49-F238E27FC236}">
-                <a16:creationId xmlns:a16="http://schemas.microsoft.com/office/drawing/2014/main" id="{94E429D1-BEB1-4D8A-91F2-CD4F80157F8D}"/>
+                <a16:creationId xmlns:a16="http://schemas.microsoft.com/office/drawing/2014/main" xmlns="" id="{94E429D1-BEB1-4D8A-91F2-CD4F80157F8D}"/>
               </a:ext>
             </a:extLst>
           </p:cNvPr>
@@ -1857,7 +1857,7 @@
           <p:cNvPr id="9" name="Slide Number Placeholder 8">
             <a:extLst>
               <a:ext uri="{FF2B5EF4-FFF2-40B4-BE49-F238E27FC236}">
-                <a16:creationId xmlns:a16="http://schemas.microsoft.com/office/drawing/2014/main" id="{6F17C19C-8370-4118-A8FC-5DDA6F84230F}"/>
+                <a16:creationId xmlns:a16="http://schemas.microsoft.com/office/drawing/2014/main" xmlns="" id="{6F17C19C-8370-4118-A8FC-5DDA6F84230F}"/>
               </a:ext>
             </a:extLst>
           </p:cNvPr>
@@ -1916,7 +1916,7 @@
           <p:cNvPr id="2" name="Title 1">
             <a:extLst>
               <a:ext uri="{FF2B5EF4-FFF2-40B4-BE49-F238E27FC236}">
-                <a16:creationId xmlns:a16="http://schemas.microsoft.com/office/drawing/2014/main" id="{252CBF36-7F99-45A9-BC35-BD2EC260CBF0}"/>
+                <a16:creationId xmlns:a16="http://schemas.microsoft.com/office/drawing/2014/main" xmlns="" id="{252CBF36-7F99-45A9-BC35-BD2EC260CBF0}"/>
               </a:ext>
             </a:extLst>
           </p:cNvPr>
@@ -1944,7 +1944,7 @@
           <p:cNvPr id="3" name="Date Placeholder 2">
             <a:extLst>
               <a:ext uri="{FF2B5EF4-FFF2-40B4-BE49-F238E27FC236}">
-                <a16:creationId xmlns:a16="http://schemas.microsoft.com/office/drawing/2014/main" id="{0D6F5F83-F07E-4501-B86B-9F96CD43993C}"/>
+                <a16:creationId xmlns:a16="http://schemas.microsoft.com/office/drawing/2014/main" xmlns="" id="{0D6F5F83-F07E-4501-B86B-9F96CD43993C}"/>
               </a:ext>
             </a:extLst>
           </p:cNvPr>
@@ -1962,7 +1962,7 @@
           <a:p>
             <a:fld id="{6C733091-19F0-4DD7-90FE-000B4789B4CF}" type="datetimeFigureOut">
               <a:rPr lang="en-US" smtClean="0"/>
-              <a:t>8/3/2021</a:t>
+              <a:t>8/4/2021</a:t>
             </a:fld>
             <a:endParaRPr lang="en-US"/>
           </a:p>
@@ -1973,7 +1973,7 @@
           <p:cNvPr id="4" name="Footer Placeholder 3">
             <a:extLst>
               <a:ext uri="{FF2B5EF4-FFF2-40B4-BE49-F238E27FC236}">
-                <a16:creationId xmlns:a16="http://schemas.microsoft.com/office/drawing/2014/main" id="{2861989B-F8E9-41FD-8E16-687424BCC266}"/>
+                <a16:creationId xmlns:a16="http://schemas.microsoft.com/office/drawing/2014/main" xmlns="" id="{2861989B-F8E9-41FD-8E16-687424BCC266}"/>
               </a:ext>
             </a:extLst>
           </p:cNvPr>
@@ -1998,7 +1998,7 @@
           <p:cNvPr id="5" name="Slide Number Placeholder 4">
             <a:extLst>
               <a:ext uri="{FF2B5EF4-FFF2-40B4-BE49-F238E27FC236}">
-                <a16:creationId xmlns:a16="http://schemas.microsoft.com/office/drawing/2014/main" id="{2026B6D7-7832-4815-95CE-5CEC39502825}"/>
+                <a16:creationId xmlns:a16="http://schemas.microsoft.com/office/drawing/2014/main" xmlns="" id="{2026B6D7-7832-4815-95CE-5CEC39502825}"/>
               </a:ext>
             </a:extLst>
           </p:cNvPr>
@@ -2057,7 +2057,7 @@
           <p:cNvPr id="2" name="Date Placeholder 1">
             <a:extLst>
               <a:ext uri="{FF2B5EF4-FFF2-40B4-BE49-F238E27FC236}">
-                <a16:creationId xmlns:a16="http://schemas.microsoft.com/office/drawing/2014/main" id="{9877919A-C4B6-46FD-A08A-9A4B867FE01A}"/>
+                <a16:creationId xmlns:a16="http://schemas.microsoft.com/office/drawing/2014/main" xmlns="" id="{9877919A-C4B6-46FD-A08A-9A4B867FE01A}"/>
               </a:ext>
             </a:extLst>
           </p:cNvPr>
@@ -2075,7 +2075,7 @@
           <a:p>
             <a:fld id="{6C733091-19F0-4DD7-90FE-000B4789B4CF}" type="datetimeFigureOut">
               <a:rPr lang="en-US" smtClean="0"/>
-              <a:t>8/3/2021</a:t>
+              <a:t>8/4/2021</a:t>
             </a:fld>
             <a:endParaRPr lang="en-US"/>
           </a:p>
@@ -2086,7 +2086,7 @@
           <p:cNvPr id="3" name="Footer Placeholder 2">
             <a:extLst>
               <a:ext uri="{FF2B5EF4-FFF2-40B4-BE49-F238E27FC236}">
-                <a16:creationId xmlns:a16="http://schemas.microsoft.com/office/drawing/2014/main" id="{9118539E-383C-4F1C-86F2-14C533A7E9FB}"/>
+                <a16:creationId xmlns:a16="http://schemas.microsoft.com/office/drawing/2014/main" xmlns="" id="{9118539E-383C-4F1C-86F2-14C533A7E9FB}"/>
               </a:ext>
             </a:extLst>
           </p:cNvPr>
@@ -2111,7 +2111,7 @@
           <p:cNvPr id="4" name="Slide Number Placeholder 3">
             <a:extLst>
               <a:ext uri="{FF2B5EF4-FFF2-40B4-BE49-F238E27FC236}">
-                <a16:creationId xmlns:a16="http://schemas.microsoft.com/office/drawing/2014/main" id="{C9A6D4E1-CA83-4214-9942-9E4617AA89BF}"/>
+                <a16:creationId xmlns:a16="http://schemas.microsoft.com/office/drawing/2014/main" xmlns="" id="{C9A6D4E1-CA83-4214-9942-9E4617AA89BF}"/>
               </a:ext>
             </a:extLst>
           </p:cNvPr>
@@ -2170,7 +2170,7 @@
           <p:cNvPr id="2" name="Title 1">
             <a:extLst>
               <a:ext uri="{FF2B5EF4-FFF2-40B4-BE49-F238E27FC236}">
-                <a16:creationId xmlns:a16="http://schemas.microsoft.com/office/drawing/2014/main" id="{046EF9B5-7A2A-4225-8817-86D028D6950C}"/>
+                <a16:creationId xmlns:a16="http://schemas.microsoft.com/office/drawing/2014/main" xmlns="" id="{046EF9B5-7A2A-4225-8817-86D028D6950C}"/>
               </a:ext>
             </a:extLst>
           </p:cNvPr>
@@ -2207,7 +2207,7 @@
           <p:cNvPr id="3" name="Content Placeholder 2">
             <a:extLst>
               <a:ext uri="{FF2B5EF4-FFF2-40B4-BE49-F238E27FC236}">
-                <a16:creationId xmlns:a16="http://schemas.microsoft.com/office/drawing/2014/main" id="{8667C390-5297-41E8-A403-22856007B051}"/>
+                <a16:creationId xmlns:a16="http://schemas.microsoft.com/office/drawing/2014/main" xmlns="" id="{8667C390-5297-41E8-A403-22856007B051}"/>
               </a:ext>
             </a:extLst>
           </p:cNvPr>
@@ -2297,7 +2297,7 @@
           <p:cNvPr id="4" name="Text Placeholder 3">
             <a:extLst>
               <a:ext uri="{FF2B5EF4-FFF2-40B4-BE49-F238E27FC236}">
-                <a16:creationId xmlns:a16="http://schemas.microsoft.com/office/drawing/2014/main" id="{8D0D2F7D-D6CD-4AB1-A3EA-CBFD2A2B3703}"/>
+                <a16:creationId xmlns:a16="http://schemas.microsoft.com/office/drawing/2014/main" xmlns="" id="{8D0D2F7D-D6CD-4AB1-A3EA-CBFD2A2B3703}"/>
               </a:ext>
             </a:extLst>
           </p:cNvPr>
@@ -2368,7 +2368,7 @@
           <p:cNvPr id="5" name="Date Placeholder 4">
             <a:extLst>
               <a:ext uri="{FF2B5EF4-FFF2-40B4-BE49-F238E27FC236}">
-                <a16:creationId xmlns:a16="http://schemas.microsoft.com/office/drawing/2014/main" id="{E17A441D-4FA7-4110-BF24-165CD3C3DAD7}"/>
+                <a16:creationId xmlns:a16="http://schemas.microsoft.com/office/drawing/2014/main" xmlns="" id="{E17A441D-4FA7-4110-BF24-165CD3C3DAD7}"/>
               </a:ext>
             </a:extLst>
           </p:cNvPr>
@@ -2386,7 +2386,7 @@
           <a:p>
             <a:fld id="{6C733091-19F0-4DD7-90FE-000B4789B4CF}" type="datetimeFigureOut">
               <a:rPr lang="en-US" smtClean="0"/>
-              <a:t>8/3/2021</a:t>
+              <a:t>8/4/2021</a:t>
             </a:fld>
             <a:endParaRPr lang="en-US"/>
           </a:p>
@@ -2397,7 +2397,7 @@
           <p:cNvPr id="6" name="Footer Placeholder 5">
             <a:extLst>
               <a:ext uri="{FF2B5EF4-FFF2-40B4-BE49-F238E27FC236}">
-                <a16:creationId xmlns:a16="http://schemas.microsoft.com/office/drawing/2014/main" id="{346102C5-5AE3-43CF-A686-1AB72B0790AB}"/>
+                <a16:creationId xmlns:a16="http://schemas.microsoft.com/office/drawing/2014/main" xmlns="" id="{346102C5-5AE3-43CF-A686-1AB72B0790AB}"/>
               </a:ext>
             </a:extLst>
           </p:cNvPr>
@@ -2422,7 +2422,7 @@
           <p:cNvPr id="7" name="Slide Number Placeholder 6">
             <a:extLst>
               <a:ext uri="{FF2B5EF4-FFF2-40B4-BE49-F238E27FC236}">
-                <a16:creationId xmlns:a16="http://schemas.microsoft.com/office/drawing/2014/main" id="{5528B3F7-462C-4500-8836-B3E5CD8DA61A}"/>
+                <a16:creationId xmlns:a16="http://schemas.microsoft.com/office/drawing/2014/main" xmlns="" id="{5528B3F7-462C-4500-8836-B3E5CD8DA61A}"/>
               </a:ext>
             </a:extLst>
           </p:cNvPr>
@@ -2481,7 +2481,7 @@
           <p:cNvPr id="2" name="Title 1">
             <a:extLst>
               <a:ext uri="{FF2B5EF4-FFF2-40B4-BE49-F238E27FC236}">
-                <a16:creationId xmlns:a16="http://schemas.microsoft.com/office/drawing/2014/main" id="{4BA10E59-DA48-4690-A956-9EB8E4E11EE5}"/>
+                <a16:creationId xmlns:a16="http://schemas.microsoft.com/office/drawing/2014/main" xmlns="" id="{4BA10E59-DA48-4690-A956-9EB8E4E11EE5}"/>
               </a:ext>
             </a:extLst>
           </p:cNvPr>
@@ -2518,7 +2518,7 @@
           <p:cNvPr id="3" name="Picture Placeholder 2">
             <a:extLst>
               <a:ext uri="{FF2B5EF4-FFF2-40B4-BE49-F238E27FC236}">
-                <a16:creationId xmlns:a16="http://schemas.microsoft.com/office/drawing/2014/main" id="{AC7AFE1E-67D1-4106-97CA-98302D42CC4D}"/>
+                <a16:creationId xmlns:a16="http://schemas.microsoft.com/office/drawing/2014/main" xmlns="" id="{AC7AFE1E-67D1-4106-97CA-98302D42CC4D}"/>
               </a:ext>
             </a:extLst>
           </p:cNvPr>
@@ -2585,7 +2585,7 @@
           <p:cNvPr id="4" name="Text Placeholder 3">
             <a:extLst>
               <a:ext uri="{FF2B5EF4-FFF2-40B4-BE49-F238E27FC236}">
-                <a16:creationId xmlns:a16="http://schemas.microsoft.com/office/drawing/2014/main" id="{67D8D73B-3D4D-42A7-9A3C-1D508E8A9B45}"/>
+                <a16:creationId xmlns:a16="http://schemas.microsoft.com/office/drawing/2014/main" xmlns="" id="{67D8D73B-3D4D-42A7-9A3C-1D508E8A9B45}"/>
               </a:ext>
             </a:extLst>
           </p:cNvPr>
@@ -2656,7 +2656,7 @@
           <p:cNvPr id="5" name="Date Placeholder 4">
             <a:extLst>
               <a:ext uri="{FF2B5EF4-FFF2-40B4-BE49-F238E27FC236}">
-                <a16:creationId xmlns:a16="http://schemas.microsoft.com/office/drawing/2014/main" id="{48C8945E-A47A-42A2-9DF6-CA6D5002F65F}"/>
+                <a16:creationId xmlns:a16="http://schemas.microsoft.com/office/drawing/2014/main" xmlns="" id="{48C8945E-A47A-42A2-9DF6-CA6D5002F65F}"/>
               </a:ext>
             </a:extLst>
           </p:cNvPr>
@@ -2674,7 +2674,7 @@
           <a:p>
             <a:fld id="{6C733091-19F0-4DD7-90FE-000B4789B4CF}" type="datetimeFigureOut">
               <a:rPr lang="en-US" smtClean="0"/>
-              <a:t>8/3/2021</a:t>
+              <a:t>8/4/2021</a:t>
             </a:fld>
             <a:endParaRPr lang="en-US"/>
           </a:p>
@@ -2685,7 +2685,7 @@
           <p:cNvPr id="6" name="Footer Placeholder 5">
             <a:extLst>
               <a:ext uri="{FF2B5EF4-FFF2-40B4-BE49-F238E27FC236}">
-                <a16:creationId xmlns:a16="http://schemas.microsoft.com/office/drawing/2014/main" id="{EB000DB4-2747-4297-B400-42A539FBDB42}"/>
+                <a16:creationId xmlns:a16="http://schemas.microsoft.com/office/drawing/2014/main" xmlns="" id="{EB000DB4-2747-4297-B400-42A539FBDB42}"/>
               </a:ext>
             </a:extLst>
           </p:cNvPr>
@@ -2710,7 +2710,7 @@
           <p:cNvPr id="7" name="Slide Number Placeholder 6">
             <a:extLst>
               <a:ext uri="{FF2B5EF4-FFF2-40B4-BE49-F238E27FC236}">
-                <a16:creationId xmlns:a16="http://schemas.microsoft.com/office/drawing/2014/main" id="{5BAD9222-F141-4803-AF73-E2DD92E2ABBC}"/>
+                <a16:creationId xmlns:a16="http://schemas.microsoft.com/office/drawing/2014/main" xmlns="" id="{5BAD9222-F141-4803-AF73-E2DD92E2ABBC}"/>
               </a:ext>
             </a:extLst>
           </p:cNvPr>
@@ -2774,7 +2774,7 @@
           <p:cNvPr id="2" name="Title Placeholder 1">
             <a:extLst>
               <a:ext uri="{FF2B5EF4-FFF2-40B4-BE49-F238E27FC236}">
-                <a16:creationId xmlns:a16="http://schemas.microsoft.com/office/drawing/2014/main" id="{5BF9D404-795C-4EA4-AD01-26740519239C}"/>
+                <a16:creationId xmlns:a16="http://schemas.microsoft.com/office/drawing/2014/main" xmlns="" id="{5BF9D404-795C-4EA4-AD01-26740519239C}"/>
               </a:ext>
             </a:extLst>
           </p:cNvPr>
@@ -2812,7 +2812,7 @@
           <p:cNvPr id="3" name="Text Placeholder 2">
             <a:extLst>
               <a:ext uri="{FF2B5EF4-FFF2-40B4-BE49-F238E27FC236}">
-                <a16:creationId xmlns:a16="http://schemas.microsoft.com/office/drawing/2014/main" id="{DE3FEC7B-48F8-4348-9BC6-68F83B859EE9}"/>
+                <a16:creationId xmlns:a16="http://schemas.microsoft.com/office/drawing/2014/main" xmlns="" id="{DE3FEC7B-48F8-4348-9BC6-68F83B859EE9}"/>
               </a:ext>
             </a:extLst>
           </p:cNvPr>
@@ -2879,7 +2879,7 @@
           <p:cNvPr id="4" name="Date Placeholder 3">
             <a:extLst>
               <a:ext uri="{FF2B5EF4-FFF2-40B4-BE49-F238E27FC236}">
-                <a16:creationId xmlns:a16="http://schemas.microsoft.com/office/drawing/2014/main" id="{31CA1A1D-E2F5-4161-A025-7B911965C2FE}"/>
+                <a16:creationId xmlns:a16="http://schemas.microsoft.com/office/drawing/2014/main" xmlns="" id="{31CA1A1D-E2F5-4161-A025-7B911965C2FE}"/>
               </a:ext>
             </a:extLst>
           </p:cNvPr>
@@ -2915,7 +2915,7 @@
           <a:p>
             <a:fld id="{6C733091-19F0-4DD7-90FE-000B4789B4CF}" type="datetimeFigureOut">
               <a:rPr lang="en-US" smtClean="0"/>
-              <a:t>8/3/2021</a:t>
+              <a:t>8/4/2021</a:t>
             </a:fld>
             <a:endParaRPr lang="en-US"/>
           </a:p>
@@ -2926,7 +2926,7 @@
           <p:cNvPr id="5" name="Footer Placeholder 4">
             <a:extLst>
               <a:ext uri="{FF2B5EF4-FFF2-40B4-BE49-F238E27FC236}">
-                <a16:creationId xmlns:a16="http://schemas.microsoft.com/office/drawing/2014/main" id="{43C7B926-18F3-4C13-AB92-764E10D324FB}"/>
+                <a16:creationId xmlns:a16="http://schemas.microsoft.com/office/drawing/2014/main" xmlns="" id="{43C7B926-18F3-4C13-AB92-764E10D324FB}"/>
               </a:ext>
             </a:extLst>
           </p:cNvPr>
@@ -2969,7 +2969,7 @@
           <p:cNvPr id="6" name="Slide Number Placeholder 5">
             <a:extLst>
               <a:ext uri="{FF2B5EF4-FFF2-40B4-BE49-F238E27FC236}">
-                <a16:creationId xmlns:a16="http://schemas.microsoft.com/office/drawing/2014/main" id="{734FA846-3BF6-46FD-80CF-34B300D244C0}"/>
+                <a16:creationId xmlns:a16="http://schemas.microsoft.com/office/drawing/2014/main" xmlns="" id="{734FA846-3BF6-46FD-80CF-34B300D244C0}"/>
               </a:ext>
             </a:extLst>
           </p:cNvPr>
@@ -3337,7 +3337,7 @@
           <p:cNvPr id="4" name="Rectangle 3">
             <a:extLst>
               <a:ext uri="{FF2B5EF4-FFF2-40B4-BE49-F238E27FC236}">
-                <a16:creationId xmlns:a16="http://schemas.microsoft.com/office/drawing/2014/main" id="{0A71868C-EF96-4004-8116-DFD1FCCEE6C3}"/>
+                <a16:creationId xmlns:a16="http://schemas.microsoft.com/office/drawing/2014/main" xmlns="" id="{0A71868C-EF96-4004-8116-DFD1FCCEE6C3}"/>
               </a:ext>
             </a:extLst>
           </p:cNvPr>
@@ -3393,7 +3393,7 @@
           <p:cNvPr id="5" name="Rectangle 4">
             <a:extLst>
               <a:ext uri="{FF2B5EF4-FFF2-40B4-BE49-F238E27FC236}">
-                <a16:creationId xmlns:a16="http://schemas.microsoft.com/office/drawing/2014/main" id="{67A88ADC-D070-420B-9A88-FDBA4865856A}"/>
+                <a16:creationId xmlns:a16="http://schemas.microsoft.com/office/drawing/2014/main" xmlns="" id="{67A88ADC-D070-420B-9A88-FDBA4865856A}"/>
               </a:ext>
             </a:extLst>
           </p:cNvPr>
@@ -3453,7 +3453,7 @@
           <p:cNvPr id="7" name="Straight Arrow Connector 6">
             <a:extLst>
               <a:ext uri="{FF2B5EF4-FFF2-40B4-BE49-F238E27FC236}">
-                <a16:creationId xmlns:a16="http://schemas.microsoft.com/office/drawing/2014/main" id="{45AD00B6-B022-4C7F-A523-E16E6292918D}"/>
+                <a16:creationId xmlns:a16="http://schemas.microsoft.com/office/drawing/2014/main" xmlns="" id="{45AD00B6-B022-4C7F-A523-E16E6292918D}"/>
               </a:ext>
             </a:extLst>
           </p:cNvPr>
@@ -3495,7 +3495,7 @@
           <p:cNvPr id="8" name="Rectangle 7">
             <a:extLst>
               <a:ext uri="{FF2B5EF4-FFF2-40B4-BE49-F238E27FC236}">
-                <a16:creationId xmlns:a16="http://schemas.microsoft.com/office/drawing/2014/main" id="{3C7A2B3E-B0CA-48CD-A6CB-935EF9D71843}"/>
+                <a16:creationId xmlns:a16="http://schemas.microsoft.com/office/drawing/2014/main" xmlns="" id="{3C7A2B3E-B0CA-48CD-A6CB-935EF9D71843}"/>
               </a:ext>
             </a:extLst>
           </p:cNvPr>
@@ -3555,7 +3555,7 @@
           <p:cNvPr id="9" name="TextBox 8">
             <a:extLst>
               <a:ext uri="{FF2B5EF4-FFF2-40B4-BE49-F238E27FC236}">
-                <a16:creationId xmlns:a16="http://schemas.microsoft.com/office/drawing/2014/main" id="{ABD7B54F-357C-489B-ADE1-DFA04BEA1686}"/>
+                <a16:creationId xmlns:a16="http://schemas.microsoft.com/office/drawing/2014/main" xmlns="" id="{ABD7B54F-357C-489B-ADE1-DFA04BEA1686}"/>
               </a:ext>
             </a:extLst>
           </p:cNvPr>
@@ -3590,7 +3590,7 @@
           <p:cNvPr id="10" name="Rectangle 9">
             <a:extLst>
               <a:ext uri="{FF2B5EF4-FFF2-40B4-BE49-F238E27FC236}">
-                <a16:creationId xmlns:a16="http://schemas.microsoft.com/office/drawing/2014/main" id="{21B869D6-66CB-4B38-975F-B7FEB6AA9B13}"/>
+                <a16:creationId xmlns:a16="http://schemas.microsoft.com/office/drawing/2014/main" xmlns="" id="{21B869D6-66CB-4B38-975F-B7FEB6AA9B13}"/>
               </a:ext>
             </a:extLst>
           </p:cNvPr>
@@ -3639,7 +3639,7 @@
           <p:cNvPr id="12" name="Straight Arrow Connector 11">
             <a:extLst>
               <a:ext uri="{FF2B5EF4-FFF2-40B4-BE49-F238E27FC236}">
-                <a16:creationId xmlns:a16="http://schemas.microsoft.com/office/drawing/2014/main" id="{78CBB1AB-C0E2-40F2-828D-F209304958AC}"/>
+                <a16:creationId xmlns:a16="http://schemas.microsoft.com/office/drawing/2014/main" xmlns="" id="{78CBB1AB-C0E2-40F2-828D-F209304958AC}"/>
               </a:ext>
             </a:extLst>
           </p:cNvPr>
@@ -3682,7 +3682,7 @@
           <p:cNvPr id="14" name="TextBox 13">
             <a:extLst>
               <a:ext uri="{FF2B5EF4-FFF2-40B4-BE49-F238E27FC236}">
-                <a16:creationId xmlns:a16="http://schemas.microsoft.com/office/drawing/2014/main" id="{E0BBD6C8-C8F2-40C5-AA64-85961A11ADC2}"/>
+                <a16:creationId xmlns:a16="http://schemas.microsoft.com/office/drawing/2014/main" xmlns="" id="{E0BBD6C8-C8F2-40C5-AA64-85961A11ADC2}"/>
               </a:ext>
             </a:extLst>
           </p:cNvPr>
@@ -3717,7 +3717,7 @@
           <p:cNvPr id="16" name="Straight Arrow Connector 15">
             <a:extLst>
               <a:ext uri="{FF2B5EF4-FFF2-40B4-BE49-F238E27FC236}">
-                <a16:creationId xmlns:a16="http://schemas.microsoft.com/office/drawing/2014/main" id="{22509349-F226-482F-AC14-E28C2411C4C3}"/>
+                <a16:creationId xmlns:a16="http://schemas.microsoft.com/office/drawing/2014/main" xmlns="" id="{22509349-F226-482F-AC14-E28C2411C4C3}"/>
               </a:ext>
             </a:extLst>
           </p:cNvPr>
@@ -3760,7 +3760,7 @@
           <p:cNvPr id="18" name="TextBox 17">
             <a:extLst>
               <a:ext uri="{FF2B5EF4-FFF2-40B4-BE49-F238E27FC236}">
-                <a16:creationId xmlns:a16="http://schemas.microsoft.com/office/drawing/2014/main" id="{E2DE2503-050C-47C3-BC73-C61D89CEB131}"/>
+                <a16:creationId xmlns:a16="http://schemas.microsoft.com/office/drawing/2014/main" xmlns="" id="{E2DE2503-050C-47C3-BC73-C61D89CEB131}"/>
               </a:ext>
             </a:extLst>
           </p:cNvPr>
@@ -3795,7 +3795,7 @@
           <p:cNvPr id="23" name="Straight Arrow Connector 22">
             <a:extLst>
               <a:ext uri="{FF2B5EF4-FFF2-40B4-BE49-F238E27FC236}">
-                <a16:creationId xmlns:a16="http://schemas.microsoft.com/office/drawing/2014/main" id="{5D314D83-3A56-4BD7-B215-19DEE4ED8C0B}"/>
+                <a16:creationId xmlns:a16="http://schemas.microsoft.com/office/drawing/2014/main" xmlns="" id="{5D314D83-3A56-4BD7-B215-19DEE4ED8C0B}"/>
               </a:ext>
             </a:extLst>
           </p:cNvPr>
@@ -3838,7 +3838,7 @@
           <p:cNvPr id="24" name="Straight Arrow Connector 23">
             <a:extLst>
               <a:ext uri="{FF2B5EF4-FFF2-40B4-BE49-F238E27FC236}">
-                <a16:creationId xmlns:a16="http://schemas.microsoft.com/office/drawing/2014/main" id="{874E7075-4C88-4378-99B9-DC474BE0CE65}"/>
+                <a16:creationId xmlns:a16="http://schemas.microsoft.com/office/drawing/2014/main" xmlns="" id="{874E7075-4C88-4378-99B9-DC474BE0CE65}"/>
               </a:ext>
             </a:extLst>
           </p:cNvPr>
@@ -3881,7 +3881,7 @@
           <p:cNvPr id="25" name="TextBox 24">
             <a:extLst>
               <a:ext uri="{FF2B5EF4-FFF2-40B4-BE49-F238E27FC236}">
-                <a16:creationId xmlns:a16="http://schemas.microsoft.com/office/drawing/2014/main" id="{171D93A1-C181-4F9C-8D75-C106DB531AB7}"/>
+                <a16:creationId xmlns:a16="http://schemas.microsoft.com/office/drawing/2014/main" xmlns="" id="{171D93A1-C181-4F9C-8D75-C106DB531AB7}"/>
               </a:ext>
             </a:extLst>
           </p:cNvPr>
@@ -3916,7 +3916,7 @@
           <p:cNvPr id="26" name="TextBox 25">
             <a:extLst>
               <a:ext uri="{FF2B5EF4-FFF2-40B4-BE49-F238E27FC236}">
-                <a16:creationId xmlns:a16="http://schemas.microsoft.com/office/drawing/2014/main" id="{03EAB749-77B2-435B-A0A3-02060FD4A06F}"/>
+                <a16:creationId xmlns:a16="http://schemas.microsoft.com/office/drawing/2014/main" xmlns="" id="{03EAB749-77B2-435B-A0A3-02060FD4A06F}"/>
               </a:ext>
             </a:extLst>
           </p:cNvPr>
@@ -3951,7 +3951,7 @@
           <p:cNvPr id="27" name="TextBox 26">
             <a:extLst>
               <a:ext uri="{FF2B5EF4-FFF2-40B4-BE49-F238E27FC236}">
-                <a16:creationId xmlns:a16="http://schemas.microsoft.com/office/drawing/2014/main" id="{7D8414B9-747D-41E7-A06D-8BBA5042C15C}"/>
+                <a16:creationId xmlns:a16="http://schemas.microsoft.com/office/drawing/2014/main" xmlns="" id="{7D8414B9-747D-41E7-A06D-8BBA5042C15C}"/>
               </a:ext>
             </a:extLst>
           </p:cNvPr>
@@ -3986,7 +3986,7 @@
           <p:cNvPr id="28" name="TextBox 27">
             <a:extLst>
               <a:ext uri="{FF2B5EF4-FFF2-40B4-BE49-F238E27FC236}">
-                <a16:creationId xmlns:a16="http://schemas.microsoft.com/office/drawing/2014/main" id="{F559714E-416D-4742-9901-ADC4D8BAC5FA}"/>
+                <a16:creationId xmlns:a16="http://schemas.microsoft.com/office/drawing/2014/main" xmlns="" id="{F559714E-416D-4742-9901-ADC4D8BAC5FA}"/>
               </a:ext>
             </a:extLst>
           </p:cNvPr>
@@ -4021,7 +4021,7 @@
           <p:cNvPr id="31" name="Rectangle 30">
             <a:extLst>
               <a:ext uri="{FF2B5EF4-FFF2-40B4-BE49-F238E27FC236}">
-                <a16:creationId xmlns:a16="http://schemas.microsoft.com/office/drawing/2014/main" id="{9061AF07-38B9-4B05-B6B2-1A74D7C0C618}"/>
+                <a16:creationId xmlns:a16="http://schemas.microsoft.com/office/drawing/2014/main" xmlns="" id="{9061AF07-38B9-4B05-B6B2-1A74D7C0C618}"/>
               </a:ext>
             </a:extLst>
           </p:cNvPr>
@@ -4081,7 +4081,7 @@
           <p:cNvPr id="33" name="Connector: Elbow 32">
             <a:extLst>
               <a:ext uri="{FF2B5EF4-FFF2-40B4-BE49-F238E27FC236}">
-                <a16:creationId xmlns:a16="http://schemas.microsoft.com/office/drawing/2014/main" id="{B367C937-E98B-4009-B48E-DBF7102DCFD1}"/>
+                <a16:creationId xmlns:a16="http://schemas.microsoft.com/office/drawing/2014/main" xmlns="" id="{B367C937-E98B-4009-B48E-DBF7102DCFD1}"/>
               </a:ext>
             </a:extLst>
           </p:cNvPr>
@@ -4123,7 +4123,7 @@
           <p:cNvPr id="34" name="TextBox 33">
             <a:extLst>
               <a:ext uri="{FF2B5EF4-FFF2-40B4-BE49-F238E27FC236}">
-                <a16:creationId xmlns:a16="http://schemas.microsoft.com/office/drawing/2014/main" id="{7FC33359-8BE1-4CD9-AD98-06C75CE8FF08}"/>
+                <a16:creationId xmlns:a16="http://schemas.microsoft.com/office/drawing/2014/main" xmlns="" id="{7FC33359-8BE1-4CD9-AD98-06C75CE8FF08}"/>
               </a:ext>
             </a:extLst>
           </p:cNvPr>
@@ -4158,7 +4158,7 @@
           <p:cNvPr id="35" name="Rectangle 34">
             <a:extLst>
               <a:ext uri="{FF2B5EF4-FFF2-40B4-BE49-F238E27FC236}">
-                <a16:creationId xmlns:a16="http://schemas.microsoft.com/office/drawing/2014/main" id="{85531841-C806-4F00-B17D-D19E7CE1C155}"/>
+                <a16:creationId xmlns:a16="http://schemas.microsoft.com/office/drawing/2014/main" xmlns="" id="{85531841-C806-4F00-B17D-D19E7CE1C155}"/>
               </a:ext>
             </a:extLst>
           </p:cNvPr>
@@ -4217,7 +4217,7 @@
           <p:cNvPr id="37" name="Connector: Elbow 36">
             <a:extLst>
               <a:ext uri="{FF2B5EF4-FFF2-40B4-BE49-F238E27FC236}">
-                <a16:creationId xmlns:a16="http://schemas.microsoft.com/office/drawing/2014/main" id="{1BFE62EC-0F5D-4135-832D-63D5DC95509C}"/>
+                <a16:creationId xmlns:a16="http://schemas.microsoft.com/office/drawing/2014/main" xmlns="" id="{1BFE62EC-0F5D-4135-832D-63D5DC95509C}"/>
               </a:ext>
             </a:extLst>
           </p:cNvPr>
@@ -4262,7 +4262,7 @@
           <p:cNvPr id="38" name="TextBox 37">
             <a:extLst>
               <a:ext uri="{FF2B5EF4-FFF2-40B4-BE49-F238E27FC236}">
-                <a16:creationId xmlns:a16="http://schemas.microsoft.com/office/drawing/2014/main" id="{892D5E6B-E445-4560-9C01-6D3C52FFC5AA}"/>
+                <a16:creationId xmlns:a16="http://schemas.microsoft.com/office/drawing/2014/main" xmlns="" id="{892D5E6B-E445-4560-9C01-6D3C52FFC5AA}"/>
               </a:ext>
             </a:extLst>
           </p:cNvPr>
@@ -4297,7 +4297,7 @@
           <p:cNvPr id="39" name="Rectangle 38">
             <a:extLst>
               <a:ext uri="{FF2B5EF4-FFF2-40B4-BE49-F238E27FC236}">
-                <a16:creationId xmlns:a16="http://schemas.microsoft.com/office/drawing/2014/main" id="{2F2BC059-EF97-4BEE-8F18-133838E3F2D8}"/>
+                <a16:creationId xmlns:a16="http://schemas.microsoft.com/office/drawing/2014/main" xmlns="" id="{2F2BC059-EF97-4BEE-8F18-133838E3F2D8}"/>
               </a:ext>
             </a:extLst>
           </p:cNvPr>
@@ -4346,7 +4346,7 @@
           <p:cNvPr id="44" name="TextBox 43">
             <a:extLst>
               <a:ext uri="{FF2B5EF4-FFF2-40B4-BE49-F238E27FC236}">
-                <a16:creationId xmlns:a16="http://schemas.microsoft.com/office/drawing/2014/main" id="{48B10C1F-BA7F-40E8-B79A-E87D7A3A66AB}"/>
+                <a16:creationId xmlns:a16="http://schemas.microsoft.com/office/drawing/2014/main" xmlns="" id="{48B10C1F-BA7F-40E8-B79A-E87D7A3A66AB}"/>
               </a:ext>
             </a:extLst>
           </p:cNvPr>
@@ -4561,7 +4561,7 @@
           <p:cNvPr id="11" name="TextBox 10">
             <a:extLst>
               <a:ext uri="{FF2B5EF4-FFF2-40B4-BE49-F238E27FC236}">
-                <a16:creationId xmlns:a16="http://schemas.microsoft.com/office/drawing/2014/main" id="{E0BBD6C8-C8F2-40C5-AA64-85961A11ADC2}"/>
+                <a16:creationId xmlns:a16="http://schemas.microsoft.com/office/drawing/2014/main" xmlns="" id="{E0BBD6C8-C8F2-40C5-AA64-85961A11ADC2}"/>
               </a:ext>
             </a:extLst>
           </p:cNvPr>
@@ -4689,7 +4689,7 @@
           <p:cNvPr id="19" name="TextBox 18">
             <a:extLst>
               <a:ext uri="{FF2B5EF4-FFF2-40B4-BE49-F238E27FC236}">
-                <a16:creationId xmlns:a16="http://schemas.microsoft.com/office/drawing/2014/main" id="{E0BBD6C8-C8F2-40C5-AA64-85961A11ADC2}"/>
+                <a16:creationId xmlns:a16="http://schemas.microsoft.com/office/drawing/2014/main" xmlns="" id="{E0BBD6C8-C8F2-40C5-AA64-85961A11ADC2}"/>
               </a:ext>
             </a:extLst>
           </p:cNvPr>
@@ -4811,7 +4811,7 @@
           <p:cNvPr id="23" name="TextBox 22">
             <a:extLst>
               <a:ext uri="{FF2B5EF4-FFF2-40B4-BE49-F238E27FC236}">
-                <a16:creationId xmlns:a16="http://schemas.microsoft.com/office/drawing/2014/main" id="{E0BBD6C8-C8F2-40C5-AA64-85961A11ADC2}"/>
+                <a16:creationId xmlns:a16="http://schemas.microsoft.com/office/drawing/2014/main" xmlns="" id="{E0BBD6C8-C8F2-40C5-AA64-85961A11ADC2}"/>
               </a:ext>
             </a:extLst>
           </p:cNvPr>
@@ -4931,7 +4931,7 @@
           <p:cNvPr id="28" name="TextBox 27">
             <a:extLst>
               <a:ext uri="{FF2B5EF4-FFF2-40B4-BE49-F238E27FC236}">
-                <a16:creationId xmlns:a16="http://schemas.microsoft.com/office/drawing/2014/main" id="{E0BBD6C8-C8F2-40C5-AA64-85961A11ADC2}"/>
+                <a16:creationId xmlns:a16="http://schemas.microsoft.com/office/drawing/2014/main" xmlns="" id="{E0BBD6C8-C8F2-40C5-AA64-85961A11ADC2}"/>
               </a:ext>
             </a:extLst>
           </p:cNvPr>
@@ -5060,7 +5060,7 @@
           <p:cNvPr id="34" name="TextBox 33">
             <a:extLst>
               <a:ext uri="{FF2B5EF4-FFF2-40B4-BE49-F238E27FC236}">
-                <a16:creationId xmlns:a16="http://schemas.microsoft.com/office/drawing/2014/main" id="{E0BBD6C8-C8F2-40C5-AA64-85961A11ADC2}"/>
+                <a16:creationId xmlns:a16="http://schemas.microsoft.com/office/drawing/2014/main" xmlns="" id="{E0BBD6C8-C8F2-40C5-AA64-85961A11ADC2}"/>
               </a:ext>
             </a:extLst>
           </p:cNvPr>
@@ -5192,7 +5192,7 @@
           <p:cNvPr id="38" name="TextBox 37">
             <a:extLst>
               <a:ext uri="{FF2B5EF4-FFF2-40B4-BE49-F238E27FC236}">
-                <a16:creationId xmlns:a16="http://schemas.microsoft.com/office/drawing/2014/main" id="{E0BBD6C8-C8F2-40C5-AA64-85961A11ADC2}"/>
+                <a16:creationId xmlns:a16="http://schemas.microsoft.com/office/drawing/2014/main" xmlns="" id="{E0BBD6C8-C8F2-40C5-AA64-85961A11ADC2}"/>
               </a:ext>
             </a:extLst>
           </p:cNvPr>
@@ -5362,7 +5362,7 @@
           <p:cNvPr id="44" name="TextBox 43">
             <a:extLst>
               <a:ext uri="{FF2B5EF4-FFF2-40B4-BE49-F238E27FC236}">
-                <a16:creationId xmlns:a16="http://schemas.microsoft.com/office/drawing/2014/main" id="{E0BBD6C8-C8F2-40C5-AA64-85961A11ADC2}"/>
+                <a16:creationId xmlns:a16="http://schemas.microsoft.com/office/drawing/2014/main" xmlns="" id="{E0BBD6C8-C8F2-40C5-AA64-85961A11ADC2}"/>
               </a:ext>
             </a:extLst>
           </p:cNvPr>
@@ -5397,7 +5397,7 @@
           <p:cNvPr id="45" name="TextBox 44">
             <a:extLst>
               <a:ext uri="{FF2B5EF4-FFF2-40B4-BE49-F238E27FC236}">
-                <a16:creationId xmlns:a16="http://schemas.microsoft.com/office/drawing/2014/main" id="{E0BBD6C8-C8F2-40C5-AA64-85961A11ADC2}"/>
+                <a16:creationId xmlns:a16="http://schemas.microsoft.com/office/drawing/2014/main" xmlns="" id="{E0BBD6C8-C8F2-40C5-AA64-85961A11ADC2}"/>
               </a:ext>
             </a:extLst>
           </p:cNvPr>
@@ -5432,7 +5432,7 @@
           <p:cNvPr id="26" name="TextBox 25">
             <a:extLst>
               <a:ext uri="{FF2B5EF4-FFF2-40B4-BE49-F238E27FC236}">
-                <a16:creationId xmlns:a16="http://schemas.microsoft.com/office/drawing/2014/main" id="{70BF22D6-D5A2-4CCC-8E2D-329E25668556}"/>
+                <a16:creationId xmlns:a16="http://schemas.microsoft.com/office/drawing/2014/main" xmlns="" id="{70BF22D6-D5A2-4CCC-8E2D-329E25668556}"/>
               </a:ext>
             </a:extLst>
           </p:cNvPr>
@@ -5648,7 +5648,7 @@
           <p:cNvPr id="11" name="TextBox 10">
             <a:extLst>
               <a:ext uri="{FF2B5EF4-FFF2-40B4-BE49-F238E27FC236}">
-                <a16:creationId xmlns:a16="http://schemas.microsoft.com/office/drawing/2014/main" id="{E0BBD6C8-C8F2-40C5-AA64-85961A11ADC2}"/>
+                <a16:creationId xmlns:a16="http://schemas.microsoft.com/office/drawing/2014/main" xmlns="" id="{E0BBD6C8-C8F2-40C5-AA64-85961A11ADC2}"/>
               </a:ext>
             </a:extLst>
           </p:cNvPr>
@@ -5783,7 +5783,7 @@
           <p:cNvPr id="19" name="TextBox 18">
             <a:extLst>
               <a:ext uri="{FF2B5EF4-FFF2-40B4-BE49-F238E27FC236}">
-                <a16:creationId xmlns:a16="http://schemas.microsoft.com/office/drawing/2014/main" id="{E0BBD6C8-C8F2-40C5-AA64-85961A11ADC2}"/>
+                <a16:creationId xmlns:a16="http://schemas.microsoft.com/office/drawing/2014/main" xmlns="" id="{E0BBD6C8-C8F2-40C5-AA64-85961A11ADC2}"/>
               </a:ext>
             </a:extLst>
           </p:cNvPr>
@@ -5905,7 +5905,7 @@
           <p:cNvPr id="23" name="TextBox 22">
             <a:extLst>
               <a:ext uri="{FF2B5EF4-FFF2-40B4-BE49-F238E27FC236}">
-                <a16:creationId xmlns:a16="http://schemas.microsoft.com/office/drawing/2014/main" id="{E0BBD6C8-C8F2-40C5-AA64-85961A11ADC2}"/>
+                <a16:creationId xmlns:a16="http://schemas.microsoft.com/office/drawing/2014/main" xmlns="" id="{E0BBD6C8-C8F2-40C5-AA64-85961A11ADC2}"/>
               </a:ext>
             </a:extLst>
           </p:cNvPr>
@@ -6019,7 +6019,7 @@
           <p:cNvPr id="28" name="TextBox 27">
             <a:extLst>
               <a:ext uri="{FF2B5EF4-FFF2-40B4-BE49-F238E27FC236}">
-                <a16:creationId xmlns:a16="http://schemas.microsoft.com/office/drawing/2014/main" id="{E0BBD6C8-C8F2-40C5-AA64-85961A11ADC2}"/>
+                <a16:creationId xmlns:a16="http://schemas.microsoft.com/office/drawing/2014/main" xmlns="" id="{E0BBD6C8-C8F2-40C5-AA64-85961A11ADC2}"/>
               </a:ext>
             </a:extLst>
           </p:cNvPr>
@@ -6140,7 +6140,7 @@
           <p:cNvPr id="34" name="TextBox 33">
             <a:extLst>
               <a:ext uri="{FF2B5EF4-FFF2-40B4-BE49-F238E27FC236}">
-                <a16:creationId xmlns:a16="http://schemas.microsoft.com/office/drawing/2014/main" id="{E0BBD6C8-C8F2-40C5-AA64-85961A11ADC2}"/>
+                <a16:creationId xmlns:a16="http://schemas.microsoft.com/office/drawing/2014/main" xmlns="" id="{E0BBD6C8-C8F2-40C5-AA64-85961A11ADC2}"/>
               </a:ext>
             </a:extLst>
           </p:cNvPr>
@@ -6261,7 +6261,7 @@
           <p:cNvPr id="38" name="TextBox 37">
             <a:extLst>
               <a:ext uri="{FF2B5EF4-FFF2-40B4-BE49-F238E27FC236}">
-                <a16:creationId xmlns:a16="http://schemas.microsoft.com/office/drawing/2014/main" id="{E0BBD6C8-C8F2-40C5-AA64-85961A11ADC2}"/>
+                <a16:creationId xmlns:a16="http://schemas.microsoft.com/office/drawing/2014/main" xmlns="" id="{E0BBD6C8-C8F2-40C5-AA64-85961A11ADC2}"/>
               </a:ext>
             </a:extLst>
           </p:cNvPr>
@@ -6425,7 +6425,7 @@
           <p:cNvPr id="44" name="TextBox 43">
             <a:extLst>
               <a:ext uri="{FF2B5EF4-FFF2-40B4-BE49-F238E27FC236}">
-                <a16:creationId xmlns:a16="http://schemas.microsoft.com/office/drawing/2014/main" id="{E0BBD6C8-C8F2-40C5-AA64-85961A11ADC2}"/>
+                <a16:creationId xmlns:a16="http://schemas.microsoft.com/office/drawing/2014/main" xmlns="" id="{E0BBD6C8-C8F2-40C5-AA64-85961A11ADC2}"/>
               </a:ext>
             </a:extLst>
           </p:cNvPr>
@@ -6460,7 +6460,7 @@
           <p:cNvPr id="45" name="TextBox 44">
             <a:extLst>
               <a:ext uri="{FF2B5EF4-FFF2-40B4-BE49-F238E27FC236}">
-                <a16:creationId xmlns:a16="http://schemas.microsoft.com/office/drawing/2014/main" id="{E0BBD6C8-C8F2-40C5-AA64-85961A11ADC2}"/>
+                <a16:creationId xmlns:a16="http://schemas.microsoft.com/office/drawing/2014/main" xmlns="" id="{E0BBD6C8-C8F2-40C5-AA64-85961A11ADC2}"/>
               </a:ext>
             </a:extLst>
           </p:cNvPr>
@@ -6495,7 +6495,7 @@
           <p:cNvPr id="26" name="TextBox 25">
             <a:extLst>
               <a:ext uri="{FF2B5EF4-FFF2-40B4-BE49-F238E27FC236}">
-                <a16:creationId xmlns:a16="http://schemas.microsoft.com/office/drawing/2014/main" id="{70BF22D6-D5A2-4CCC-8E2D-329E25668556}"/>
+                <a16:creationId xmlns:a16="http://schemas.microsoft.com/office/drawing/2014/main" xmlns="" id="{70BF22D6-D5A2-4CCC-8E2D-329E25668556}"/>
               </a:ext>
             </a:extLst>
           </p:cNvPr>
@@ -6530,7 +6530,7 @@
           <p:cNvPr id="40" name="TextBox 39">
             <a:extLst>
               <a:ext uri="{FF2B5EF4-FFF2-40B4-BE49-F238E27FC236}">
-                <a16:creationId xmlns:a16="http://schemas.microsoft.com/office/drawing/2014/main" id="{BF7734B1-6C1B-4ADB-BBA4-2510EE97BB9D}"/>
+                <a16:creationId xmlns:a16="http://schemas.microsoft.com/office/drawing/2014/main" xmlns="" id="{BF7734B1-6C1B-4ADB-BBA4-2510EE97BB9D}"/>
               </a:ext>
             </a:extLst>
           </p:cNvPr>
@@ -6565,7 +6565,7 @@
           <p:cNvPr id="32" name="Straight Arrow Connector 31">
             <a:extLst>
               <a:ext uri="{FF2B5EF4-FFF2-40B4-BE49-F238E27FC236}">
-                <a16:creationId xmlns:a16="http://schemas.microsoft.com/office/drawing/2014/main" id="{5BC5C957-DD00-47FE-A727-262A8F90A864}"/>
+                <a16:creationId xmlns:a16="http://schemas.microsoft.com/office/drawing/2014/main" xmlns="" id="{5BC5C957-DD00-47FE-A727-262A8F90A864}"/>
               </a:ext>
             </a:extLst>
           </p:cNvPr>
@@ -6640,7 +6640,7 @@
         </p:nvSpPr>
         <p:spPr>
           <a:xfrm>
-            <a:off x="4143775" y="723898"/>
+            <a:off x="1844087" y="515831"/>
             <a:ext cx="1494797" cy="991056"/>
           </a:xfrm>
           <a:prstGeom prst="rect">
@@ -6708,7 +6708,7 @@
         </p:nvSpPr>
         <p:spPr>
           <a:xfrm>
-            <a:off x="2462583" y="2721628"/>
+            <a:off x="162895" y="2513561"/>
             <a:ext cx="1494797" cy="991056"/>
           </a:xfrm>
           <a:prstGeom prst="rect">
@@ -6772,7 +6772,7 @@
         </p:nvCxnSpPr>
         <p:spPr>
           <a:xfrm flipH="1">
-            <a:off x="3957380" y="2355357"/>
+            <a:off x="1657692" y="2147290"/>
             <a:ext cx="3362384" cy="861799"/>
           </a:xfrm>
           <a:prstGeom prst="straightConnector1">
@@ -6802,7 +6802,7 @@
           <p:cNvPr id="11" name="TextBox 10">
             <a:extLst>
               <a:ext uri="{FF2B5EF4-FFF2-40B4-BE49-F238E27FC236}">
-                <a16:creationId xmlns:a16="http://schemas.microsoft.com/office/drawing/2014/main" id="{E0BBD6C8-C8F2-40C5-AA64-85961A11ADC2}"/>
+                <a16:creationId xmlns:a16="http://schemas.microsoft.com/office/drawing/2014/main" xmlns="" id="{E0BBD6C8-C8F2-40C5-AA64-85961A11ADC2}"/>
               </a:ext>
             </a:extLst>
           </p:cNvPr>
@@ -6811,7 +6811,7 @@
         </p:nvSpPr>
         <p:spPr>
           <a:xfrm>
-            <a:off x="4577587" y="2462225"/>
+            <a:off x="2277899" y="2254158"/>
             <a:ext cx="728932" cy="461665"/>
           </a:xfrm>
           <a:prstGeom prst="rect">
@@ -6846,7 +6846,7 @@
         </p:nvSpPr>
         <p:spPr>
           <a:xfrm>
-            <a:off x="4907226" y="3795599"/>
+            <a:off x="2607538" y="3587532"/>
             <a:ext cx="1494797" cy="991056"/>
           </a:xfrm>
           <a:prstGeom prst="rect">
@@ -6919,7 +6919,7 @@
         </p:nvCxnSpPr>
         <p:spPr>
           <a:xfrm flipH="1">
-            <a:off x="5654625" y="2355357"/>
+            <a:off x="3354937" y="2147290"/>
             <a:ext cx="1665139" cy="1440242"/>
           </a:xfrm>
           <a:prstGeom prst="straightConnector1">
@@ -6949,7 +6949,7 @@
           <p:cNvPr id="19" name="TextBox 18">
             <a:extLst>
               <a:ext uri="{FF2B5EF4-FFF2-40B4-BE49-F238E27FC236}">
-                <a16:creationId xmlns:a16="http://schemas.microsoft.com/office/drawing/2014/main" id="{E0BBD6C8-C8F2-40C5-AA64-85961A11ADC2}"/>
+                <a16:creationId xmlns:a16="http://schemas.microsoft.com/office/drawing/2014/main" xmlns="" id="{E0BBD6C8-C8F2-40C5-AA64-85961A11ADC2}"/>
               </a:ext>
             </a:extLst>
           </p:cNvPr>
@@ -6958,7 +6958,7 @@
         </p:nvSpPr>
         <p:spPr>
           <a:xfrm>
-            <a:off x="5777434" y="3158808"/>
+            <a:off x="3477746" y="2950741"/>
             <a:ext cx="728932" cy="276999"/>
           </a:xfrm>
           <a:prstGeom prst="rect">
@@ -6987,7 +6987,7 @@
         </p:nvSpPr>
         <p:spPr>
           <a:xfrm>
-            <a:off x="7319764" y="1859829"/>
+            <a:off x="5020076" y="1651762"/>
             <a:ext cx="1589922" cy="991056"/>
           </a:xfrm>
           <a:prstGeom prst="rect">
@@ -7045,7 +7045,7 @@
         </p:nvCxnSpPr>
         <p:spPr>
           <a:xfrm flipH="1" flipV="1">
-            <a:off x="5638572" y="1219426"/>
+            <a:off x="3338884" y="1011359"/>
             <a:ext cx="2476153" cy="640403"/>
           </a:xfrm>
           <a:prstGeom prst="straightConnector1">
@@ -7075,7 +7075,7 @@
           <p:cNvPr id="23" name="TextBox 22">
             <a:extLst>
               <a:ext uri="{FF2B5EF4-FFF2-40B4-BE49-F238E27FC236}">
-                <a16:creationId xmlns:a16="http://schemas.microsoft.com/office/drawing/2014/main" id="{E0BBD6C8-C8F2-40C5-AA64-85961A11ADC2}"/>
+                <a16:creationId xmlns:a16="http://schemas.microsoft.com/office/drawing/2014/main" xmlns="" id="{E0BBD6C8-C8F2-40C5-AA64-85961A11ADC2}"/>
               </a:ext>
             </a:extLst>
           </p:cNvPr>
@@ -7084,7 +7084,7 @@
         </p:nvSpPr>
         <p:spPr>
           <a:xfrm>
-            <a:off x="6210281" y="1170628"/>
+            <a:off x="3910593" y="962561"/>
             <a:ext cx="1063847" cy="276999"/>
           </a:xfrm>
           <a:prstGeom prst="rect">
@@ -7113,7 +7113,7 @@
         </p:nvSpPr>
         <p:spPr>
           <a:xfrm>
-            <a:off x="10507387" y="2923890"/>
+            <a:off x="9318978" y="1618107"/>
             <a:ext cx="653404" cy="1018434"/>
           </a:xfrm>
           <a:prstGeom prst="flowChartMagneticDisk">
@@ -7161,9 +7161,9 @@
           <p:nvPr/>
         </p:nvCxnSpPr>
         <p:spPr>
-          <a:xfrm>
-            <a:off x="8909686" y="2355357"/>
-            <a:ext cx="1597701" cy="1077750"/>
+          <a:xfrm flipV="1">
+            <a:off x="6609998" y="2127324"/>
+            <a:ext cx="2708980" cy="19966"/>
           </a:xfrm>
           <a:prstGeom prst="straightConnector1">
             <a:avLst/>
@@ -7192,7 +7192,7 @@
           <p:cNvPr id="28" name="TextBox 27">
             <a:extLst>
               <a:ext uri="{FF2B5EF4-FFF2-40B4-BE49-F238E27FC236}">
-                <a16:creationId xmlns:a16="http://schemas.microsoft.com/office/drawing/2014/main" id="{E0BBD6C8-C8F2-40C5-AA64-85961A11ADC2}"/>
+                <a16:creationId xmlns:a16="http://schemas.microsoft.com/office/drawing/2014/main" xmlns="" id="{E0BBD6C8-C8F2-40C5-AA64-85961A11ADC2}"/>
               </a:ext>
             </a:extLst>
           </p:cNvPr>
@@ -7201,7 +7201,7 @@
         </p:nvSpPr>
         <p:spPr>
           <a:xfrm>
-            <a:off x="9315463" y="2416058"/>
+            <a:off x="7289158" y="2139607"/>
             <a:ext cx="728932" cy="276999"/>
           </a:xfrm>
           <a:prstGeom prst="rect">
@@ -7230,7 +7230,7 @@
         </p:nvSpPr>
         <p:spPr>
           <a:xfrm>
-            <a:off x="7319764" y="3583427"/>
+            <a:off x="5020076" y="3375360"/>
             <a:ext cx="1494797" cy="991056"/>
           </a:xfrm>
           <a:prstGeom prst="rect">
@@ -7287,7 +7287,7 @@
         </p:nvCxnSpPr>
         <p:spPr>
           <a:xfrm flipV="1">
-            <a:off x="8067163" y="2850885"/>
+            <a:off x="5767475" y="2642818"/>
             <a:ext cx="47562" cy="732542"/>
           </a:xfrm>
           <a:prstGeom prst="straightConnector1">
@@ -7317,7 +7317,7 @@
           <p:cNvPr id="34" name="TextBox 33">
             <a:extLst>
               <a:ext uri="{FF2B5EF4-FFF2-40B4-BE49-F238E27FC236}">
-                <a16:creationId xmlns:a16="http://schemas.microsoft.com/office/drawing/2014/main" id="{E0BBD6C8-C8F2-40C5-AA64-85961A11ADC2}"/>
+                <a16:creationId xmlns:a16="http://schemas.microsoft.com/office/drawing/2014/main" xmlns="" id="{E0BBD6C8-C8F2-40C5-AA64-85961A11ADC2}"/>
               </a:ext>
             </a:extLst>
           </p:cNvPr>
@@ -7326,7 +7326,7 @@
         </p:nvSpPr>
         <p:spPr>
           <a:xfrm>
-            <a:off x="8138555" y="2893990"/>
+            <a:off x="5838867" y="2685923"/>
             <a:ext cx="1062021" cy="461665"/>
           </a:xfrm>
           <a:prstGeom prst="rect">
@@ -7358,7 +7358,7 @@
         </p:nvSpPr>
         <p:spPr>
           <a:xfrm>
-            <a:off x="5066534" y="5533926"/>
+            <a:off x="2103846" y="5021710"/>
             <a:ext cx="1998489" cy="657053"/>
           </a:xfrm>
           <a:prstGeom prst="rect">
@@ -7416,8 +7416,8 @@
         </p:nvCxnSpPr>
         <p:spPr>
           <a:xfrm flipH="1">
-            <a:off x="6065779" y="4574483"/>
-            <a:ext cx="2001384" cy="959443"/>
+            <a:off x="3103091" y="4366416"/>
+            <a:ext cx="2664384" cy="655294"/>
           </a:xfrm>
           <a:prstGeom prst="straightConnector1">
             <a:avLst/>
@@ -7446,7 +7446,7 @@
           <p:cNvPr id="38" name="TextBox 37">
             <a:extLst>
               <a:ext uri="{FF2B5EF4-FFF2-40B4-BE49-F238E27FC236}">
-                <a16:creationId xmlns:a16="http://schemas.microsoft.com/office/drawing/2014/main" id="{E0BBD6C8-C8F2-40C5-AA64-85961A11ADC2}"/>
+                <a16:creationId xmlns:a16="http://schemas.microsoft.com/office/drawing/2014/main" xmlns="" id="{E0BBD6C8-C8F2-40C5-AA64-85961A11ADC2}"/>
               </a:ext>
             </a:extLst>
           </p:cNvPr>
@@ -7455,7 +7455,7 @@
         </p:nvSpPr>
         <p:spPr>
           <a:xfrm>
-            <a:off x="7726478" y="4702093"/>
+            <a:off x="5426790" y="4494026"/>
             <a:ext cx="728932" cy="276999"/>
           </a:xfrm>
           <a:prstGeom prst="rect">
@@ -7484,7 +7484,7 @@
         </p:nvSpPr>
         <p:spPr>
           <a:xfrm>
-            <a:off x="9588846" y="456571"/>
+            <a:off x="7289158" y="248504"/>
             <a:ext cx="1822194" cy="991056"/>
           </a:xfrm>
           <a:prstGeom prst="rect">
@@ -7549,7 +7549,7 @@
         </p:nvCxnSpPr>
         <p:spPr>
           <a:xfrm flipV="1">
-            <a:off x="8909686" y="952099"/>
+            <a:off x="6609998" y="744032"/>
             <a:ext cx="679160" cy="1403258"/>
           </a:xfrm>
           <a:prstGeom prst="straightConnector1">
@@ -7585,8 +7585,8 @@
         </p:nvCxnSpPr>
         <p:spPr>
           <a:xfrm>
-            <a:off x="10499943" y="1447627"/>
-            <a:ext cx="334146" cy="1476263"/>
+            <a:off x="8200255" y="1239560"/>
+            <a:ext cx="1445425" cy="378547"/>
           </a:xfrm>
           <a:prstGeom prst="straightConnector1">
             <a:avLst/>
@@ -7615,7 +7615,7 @@
           <p:cNvPr id="44" name="TextBox 43">
             <a:extLst>
               <a:ext uri="{FF2B5EF4-FFF2-40B4-BE49-F238E27FC236}">
-                <a16:creationId xmlns:a16="http://schemas.microsoft.com/office/drawing/2014/main" id="{E0BBD6C8-C8F2-40C5-AA64-85961A11ADC2}"/>
+                <a16:creationId xmlns:a16="http://schemas.microsoft.com/office/drawing/2014/main" xmlns="" id="{E0BBD6C8-C8F2-40C5-AA64-85961A11ADC2}"/>
               </a:ext>
             </a:extLst>
           </p:cNvPr>
@@ -7624,7 +7624,7 @@
         </p:nvSpPr>
         <p:spPr>
           <a:xfrm>
-            <a:off x="8764146" y="1343130"/>
+            <a:off x="6464458" y="1135063"/>
             <a:ext cx="728932" cy="276999"/>
           </a:xfrm>
           <a:prstGeom prst="rect">
@@ -7650,7 +7650,7 @@
           <p:cNvPr id="45" name="TextBox 44">
             <a:extLst>
               <a:ext uri="{FF2B5EF4-FFF2-40B4-BE49-F238E27FC236}">
-                <a16:creationId xmlns:a16="http://schemas.microsoft.com/office/drawing/2014/main" id="{E0BBD6C8-C8F2-40C5-AA64-85961A11ADC2}"/>
+                <a16:creationId xmlns:a16="http://schemas.microsoft.com/office/drawing/2014/main" xmlns="" id="{E0BBD6C8-C8F2-40C5-AA64-85961A11ADC2}"/>
               </a:ext>
             </a:extLst>
           </p:cNvPr>
@@ -7659,7 +7659,7 @@
         </p:nvSpPr>
         <p:spPr>
           <a:xfrm>
-            <a:off x="10546941" y="1826174"/>
+            <a:off x="9073102" y="1135062"/>
             <a:ext cx="864099" cy="276999"/>
           </a:xfrm>
           <a:prstGeom prst="rect">
@@ -7685,7 +7685,7 @@
           <p:cNvPr id="26" name="TextBox 25">
             <a:extLst>
               <a:ext uri="{FF2B5EF4-FFF2-40B4-BE49-F238E27FC236}">
-                <a16:creationId xmlns:a16="http://schemas.microsoft.com/office/drawing/2014/main" id="{6C45E26E-8FEE-4439-A34B-789237C9C62C}"/>
+                <a16:creationId xmlns:a16="http://schemas.microsoft.com/office/drawing/2014/main" xmlns="" id="{6C45E26E-8FEE-4439-A34B-789237C9C62C}"/>
               </a:ext>
             </a:extLst>
           </p:cNvPr>
@@ -7694,7 +7694,7 @@
         </p:nvSpPr>
         <p:spPr>
           <a:xfrm>
-            <a:off x="146648" y="131998"/>
+            <a:off x="0" y="-59298"/>
             <a:ext cx="4675518" cy="369332"/>
           </a:xfrm>
           <a:prstGeom prst="rect">
@@ -7720,7 +7720,7 @@
           <p:cNvPr id="31" name="Rectangle 30">
             <a:extLst>
               <a:ext uri="{FF2B5EF4-FFF2-40B4-BE49-F238E27FC236}">
-                <a16:creationId xmlns:a16="http://schemas.microsoft.com/office/drawing/2014/main" id="{6D396BFC-10E0-4935-903B-EDC457BD1755}"/>
+                <a16:creationId xmlns:a16="http://schemas.microsoft.com/office/drawing/2014/main" xmlns="" id="{6D396BFC-10E0-4935-903B-EDC457BD1755}"/>
               </a:ext>
             </a:extLst>
           </p:cNvPr>
@@ -7729,7 +7729,7 @@
         </p:nvSpPr>
         <p:spPr>
           <a:xfrm>
-            <a:off x="7429489" y="5938535"/>
+            <a:off x="4091638" y="5803741"/>
             <a:ext cx="1621682" cy="657053"/>
           </a:xfrm>
           <a:prstGeom prst="rect">
@@ -7780,7 +7780,7 @@
           <p:cNvPr id="32" name="Rectangle 31">
             <a:extLst>
               <a:ext uri="{FF2B5EF4-FFF2-40B4-BE49-F238E27FC236}">
-                <a16:creationId xmlns:a16="http://schemas.microsoft.com/office/drawing/2014/main" id="{02A645C8-F11F-438D-92DC-F6FCCA5ECFB8}"/>
+                <a16:creationId xmlns:a16="http://schemas.microsoft.com/office/drawing/2014/main" xmlns="" id="{02A645C8-F11F-438D-92DC-F6FCCA5ECFB8}"/>
               </a:ext>
             </a:extLst>
           </p:cNvPr>
@@ -7789,7 +7789,7 @@
         </p:nvSpPr>
         <p:spPr>
           <a:xfrm>
-            <a:off x="9708536" y="5728663"/>
+            <a:off x="6264710" y="5931255"/>
             <a:ext cx="2048896" cy="657053"/>
           </a:xfrm>
           <a:prstGeom prst="rect">
@@ -7840,7 +7840,7 @@
           <p:cNvPr id="12" name="Straight Arrow Connector 11">
             <a:extLst>
               <a:ext uri="{FF2B5EF4-FFF2-40B4-BE49-F238E27FC236}">
-                <a16:creationId xmlns:a16="http://schemas.microsoft.com/office/drawing/2014/main" id="{FF2076CA-F897-4293-B6CD-7408EB452156}"/>
+                <a16:creationId xmlns:a16="http://schemas.microsoft.com/office/drawing/2014/main" xmlns="" id="{FF2076CA-F897-4293-B6CD-7408EB452156}"/>
               </a:ext>
             </a:extLst>
           </p:cNvPr>
@@ -7852,9 +7852,9 @@
           <p:nvPr/>
         </p:nvCxnSpPr>
         <p:spPr>
-          <a:xfrm>
-            <a:off x="8067163" y="4574483"/>
-            <a:ext cx="173167" cy="1364052"/>
+          <a:xfrm flipH="1">
+            <a:off x="4902479" y="4366416"/>
+            <a:ext cx="864996" cy="1437325"/>
           </a:xfrm>
           <a:prstGeom prst="straightConnector1">
             <a:avLst/>
@@ -7883,7 +7883,7 @@
           <p:cNvPr id="14" name="Straight Arrow Connector 13">
             <a:extLst>
               <a:ext uri="{FF2B5EF4-FFF2-40B4-BE49-F238E27FC236}">
-                <a16:creationId xmlns:a16="http://schemas.microsoft.com/office/drawing/2014/main" id="{5C625B7B-4A1E-46C5-9082-4FEC89B30DA9}"/>
+                <a16:creationId xmlns:a16="http://schemas.microsoft.com/office/drawing/2014/main" xmlns="" id="{5C625B7B-4A1E-46C5-9082-4FEC89B30DA9}"/>
               </a:ext>
             </a:extLst>
           </p:cNvPr>
@@ -7896,8 +7896,8 @@
         </p:nvCxnSpPr>
         <p:spPr>
           <a:xfrm>
-            <a:off x="8067163" y="4574483"/>
-            <a:ext cx="2665821" cy="1154180"/>
+            <a:off x="5767475" y="4366416"/>
+            <a:ext cx="1521683" cy="1564839"/>
           </a:xfrm>
           <a:prstGeom prst="straightConnector1">
             <a:avLst/>
@@ -7926,7 +7926,7 @@
           <p:cNvPr id="65" name="Straight Arrow Connector 64">
             <a:extLst>
               <a:ext uri="{FF2B5EF4-FFF2-40B4-BE49-F238E27FC236}">
-                <a16:creationId xmlns:a16="http://schemas.microsoft.com/office/drawing/2014/main" id="{C1C9B843-1D11-4D9F-8CBF-AE00E90AA070}"/>
+                <a16:creationId xmlns:a16="http://schemas.microsoft.com/office/drawing/2014/main" xmlns="" id="{C1C9B843-1D11-4D9F-8CBF-AE00E90AA070}"/>
               </a:ext>
             </a:extLst>
           </p:cNvPr>
@@ -7937,9 +7937,9 @@
           <p:nvPr/>
         </p:nvCxnSpPr>
         <p:spPr>
-          <a:xfrm flipH="1" flipV="1">
-            <a:off x="8909686" y="2355357"/>
-            <a:ext cx="1597701" cy="1077750"/>
+          <a:xfrm flipH="1">
+            <a:off x="6609998" y="2127324"/>
+            <a:ext cx="2708980" cy="19966"/>
           </a:xfrm>
           <a:prstGeom prst="straightConnector1">
             <a:avLst/>
@@ -7968,7 +7968,7 @@
           <p:cNvPr id="66" name="TextBox 65">
             <a:extLst>
               <a:ext uri="{FF2B5EF4-FFF2-40B4-BE49-F238E27FC236}">
-                <a16:creationId xmlns:a16="http://schemas.microsoft.com/office/drawing/2014/main" id="{5E4B2700-0522-40EF-B035-166AA1C17D76}"/>
+                <a16:creationId xmlns:a16="http://schemas.microsoft.com/office/drawing/2014/main" xmlns="" id="{5E4B2700-0522-40EF-B035-166AA1C17D76}"/>
               </a:ext>
             </a:extLst>
           </p:cNvPr>
@@ -7977,7 +7977,7 @@
         </p:nvSpPr>
         <p:spPr>
           <a:xfrm>
-            <a:off x="4272289" y="3075478"/>
+            <a:off x="1972601" y="2867411"/>
             <a:ext cx="728932" cy="276999"/>
           </a:xfrm>
           <a:prstGeom prst="rect">
@@ -7995,6 +7995,426 @@
               <a:rPr lang="en-US" sz="1200" dirty="0"/>
               <a:t>returns</a:t>
             </a:r>
+          </a:p>
+        </p:txBody>
+      </p:sp>
+      <p:sp>
+        <p:nvSpPr>
+          <p:cNvPr id="36" name="Rectangle 35"/>
+          <p:cNvSpPr/>
+          <p:nvPr/>
+        </p:nvSpPr>
+        <p:spPr>
+          <a:xfrm>
+            <a:off x="7578305" y="4589550"/>
+            <a:ext cx="1494797" cy="991056"/>
+          </a:xfrm>
+          <a:prstGeom prst="rect">
+            <a:avLst/>
+          </a:prstGeom>
+          <a:solidFill>
+            <a:schemeClr val="accent6"/>
+          </a:solidFill>
+        </p:spPr>
+        <p:style>
+          <a:lnRef idx="2">
+            <a:schemeClr val="accent1">
+              <a:shade val="50000"/>
+            </a:schemeClr>
+          </a:lnRef>
+          <a:fillRef idx="1">
+            <a:schemeClr val="accent1"/>
+          </a:fillRef>
+          <a:effectRef idx="0">
+            <a:schemeClr val="accent1"/>
+          </a:effectRef>
+          <a:fontRef idx="minor">
+            <a:schemeClr val="lt1"/>
+          </a:fontRef>
+        </p:style>
+        <p:txBody>
+          <a:bodyPr rtlCol="0" anchor="ctr"/>
+          <a:lstStyle/>
+          <a:p>
+            <a:pPr algn="ctr"/>
+            <a:r>
+              <a:rPr lang="en-US" sz="1000" dirty="0"/>
+              <a:t>com.tlw8253.service</a:t>
+            </a:r>
+          </a:p>
+          <a:p>
+            <a:pPr algn="ctr"/>
+            <a:r>
+              <a:rPr lang="en-US" sz="1600" dirty="0" err="1"/>
+              <a:t>AccountService</a:t>
+            </a:r>
+            <a:endParaRPr lang="en-US" sz="1600" dirty="0"/>
+          </a:p>
+        </p:txBody>
+      </p:sp>
+      <p:cxnSp>
+        <p:nvCxnSpPr>
+          <p:cNvPr id="8" name="Straight Arrow Connector 7"/>
+          <p:cNvCxnSpPr>
+            <a:stCxn id="29" idx="3"/>
+            <a:endCxn id="36" idx="1"/>
+          </p:cNvCxnSpPr>
+          <p:nvPr/>
+        </p:nvCxnSpPr>
+        <p:spPr>
+          <a:xfrm>
+            <a:off x="6514873" y="3870888"/>
+            <a:ext cx="1063432" cy="1214190"/>
+          </a:xfrm>
+          <a:prstGeom prst="straightConnector1">
+            <a:avLst/>
+          </a:prstGeom>
+          <a:ln>
+            <a:tailEnd type="triangle"/>
+          </a:ln>
+        </p:spPr>
+        <p:style>
+          <a:lnRef idx="1">
+            <a:schemeClr val="accent1"/>
+          </a:lnRef>
+          <a:fillRef idx="0">
+            <a:schemeClr val="accent1"/>
+          </a:fillRef>
+          <a:effectRef idx="0">
+            <a:schemeClr val="accent1"/>
+          </a:effectRef>
+          <a:fontRef idx="minor">
+            <a:schemeClr val="tx1"/>
+          </a:fontRef>
+        </p:style>
+      </p:cxnSp>
+      <p:sp>
+        <p:nvSpPr>
+          <p:cNvPr id="40" name="TextBox 39">
+            <a:extLst>
+              <a:ext uri="{FF2B5EF4-FFF2-40B4-BE49-F238E27FC236}">
+                <a16:creationId xmlns:a16="http://schemas.microsoft.com/office/drawing/2014/main" xmlns="" id="{E0BBD6C8-C8F2-40C5-AA64-85961A11ADC2}"/>
+              </a:ext>
+            </a:extLst>
+          </p:cNvPr>
+          <p:cNvSpPr txBox="1"/>
+          <p:nvPr/>
+        </p:nvSpPr>
+        <p:spPr>
+          <a:xfrm>
+            <a:off x="7044445" y="4366416"/>
+            <a:ext cx="728932" cy="276999"/>
+          </a:xfrm>
+          <a:prstGeom prst="rect">
+            <a:avLst/>
+          </a:prstGeom>
+          <a:noFill/>
+        </p:spPr>
+        <p:txBody>
+          <a:bodyPr wrap="square" rtlCol="0">
+            <a:spAutoFit/>
+          </a:bodyPr>
+          <a:lstStyle/>
+          <a:p>
+            <a:r>
+              <a:rPr lang="en-US" sz="1200" dirty="0"/>
+              <a:t>uses</a:t>
+            </a:r>
+          </a:p>
+        </p:txBody>
+      </p:sp>
+      <p:sp>
+        <p:nvSpPr>
+          <p:cNvPr id="46" name="Rectangle 45"/>
+          <p:cNvSpPr/>
+          <p:nvPr/>
+        </p:nvSpPr>
+        <p:spPr>
+          <a:xfrm>
+            <a:off x="7937456" y="3359871"/>
+            <a:ext cx="1678916" cy="991056"/>
+          </a:xfrm>
+          <a:prstGeom prst="rect">
+            <a:avLst/>
+          </a:prstGeom>
+          <a:solidFill>
+            <a:schemeClr val="accent2"/>
+          </a:solidFill>
+        </p:spPr>
+        <p:style>
+          <a:lnRef idx="2">
+            <a:schemeClr val="accent1">
+              <a:shade val="50000"/>
+            </a:schemeClr>
+          </a:lnRef>
+          <a:fillRef idx="1">
+            <a:schemeClr val="accent1"/>
+          </a:fillRef>
+          <a:effectRef idx="0">
+            <a:schemeClr val="accent1"/>
+          </a:effectRef>
+          <a:fontRef idx="minor">
+            <a:schemeClr val="lt1"/>
+          </a:fontRef>
+        </p:style>
+        <p:txBody>
+          <a:bodyPr rtlCol="0" anchor="ctr"/>
+          <a:lstStyle/>
+          <a:p>
+            <a:pPr algn="ctr"/>
+            <a:r>
+              <a:rPr lang="en-US" sz="1000" dirty="0" smtClean="0"/>
+              <a:t>com.tlw8253.controller</a:t>
+            </a:r>
+            <a:endParaRPr lang="en-US" sz="1000" dirty="0"/>
+          </a:p>
+          <a:p>
+            <a:pPr algn="ctr"/>
+            <a:r>
+              <a:rPr lang="en-US" dirty="0" err="1" smtClean="0"/>
+              <a:t>ClientController</a:t>
+            </a:r>
+            <a:endParaRPr lang="en-US" dirty="0"/>
+          </a:p>
+        </p:txBody>
+      </p:sp>
+      <p:cxnSp>
+        <p:nvCxnSpPr>
+          <p:cNvPr id="47" name="Straight Arrow Connector 46"/>
+          <p:cNvCxnSpPr>
+            <a:stCxn id="46" idx="1"/>
+            <a:endCxn id="29" idx="3"/>
+          </p:cNvCxnSpPr>
+          <p:nvPr/>
+        </p:nvCxnSpPr>
+        <p:spPr>
+          <a:xfrm flipH="1">
+            <a:off x="6514873" y="3855399"/>
+            <a:ext cx="1422583" cy="15489"/>
+          </a:xfrm>
+          <a:prstGeom prst="straightConnector1">
+            <a:avLst/>
+          </a:prstGeom>
+          <a:ln>
+            <a:tailEnd type="triangle"/>
+          </a:ln>
+        </p:spPr>
+        <p:style>
+          <a:lnRef idx="1">
+            <a:schemeClr val="accent1"/>
+          </a:lnRef>
+          <a:fillRef idx="0">
+            <a:schemeClr val="accent1"/>
+          </a:fillRef>
+          <a:effectRef idx="0">
+            <a:schemeClr val="accent1"/>
+          </a:effectRef>
+          <a:fontRef idx="minor">
+            <a:schemeClr val="tx1"/>
+          </a:fontRef>
+        </p:style>
+      </p:cxnSp>
+      <p:sp>
+        <p:nvSpPr>
+          <p:cNvPr id="48" name="TextBox 47">
+            <a:extLst>
+              <a:ext uri="{FF2B5EF4-FFF2-40B4-BE49-F238E27FC236}">
+                <a16:creationId xmlns:a16="http://schemas.microsoft.com/office/drawing/2014/main" xmlns="" id="{E0BBD6C8-C8F2-40C5-AA64-85961A11ADC2}"/>
+              </a:ext>
+            </a:extLst>
+          </p:cNvPr>
+          <p:cNvSpPr txBox="1"/>
+          <p:nvPr/>
+        </p:nvSpPr>
+        <p:spPr>
+          <a:xfrm>
+            <a:off x="6902467" y="3620700"/>
+            <a:ext cx="1062021" cy="461665"/>
+          </a:xfrm>
+          <a:prstGeom prst="rect">
+            <a:avLst/>
+          </a:prstGeom>
+          <a:noFill/>
+        </p:spPr>
+        <p:txBody>
+          <a:bodyPr wrap="square" rtlCol="0">
+            <a:spAutoFit/>
+          </a:bodyPr>
+          <a:lstStyle/>
+          <a:p>
+            <a:r>
+              <a:rPr lang="en-US" sz="1200" dirty="0" smtClean="0"/>
+              <a:t>contains</a:t>
+            </a:r>
+          </a:p>
+          <a:p>
+            <a:r>
+              <a:rPr lang="en-US" sz="1200" dirty="0" smtClean="0"/>
+              <a:t>controls</a:t>
+            </a:r>
+            <a:endParaRPr lang="en-US" sz="1200" dirty="0"/>
+          </a:p>
+        </p:txBody>
+      </p:sp>
+      <p:sp>
+        <p:nvSpPr>
+          <p:cNvPr id="52" name="Rectangle 51">
+            <a:extLst>
+              <a:ext uri="{FF2B5EF4-FFF2-40B4-BE49-F238E27FC236}">
+                <a16:creationId xmlns:a16="http://schemas.microsoft.com/office/drawing/2014/main" xmlns="" id="{21B869D6-66CB-4B38-975F-B7FEB6AA9B13}"/>
+              </a:ext>
+            </a:extLst>
+          </p:cNvPr>
+          <p:cNvSpPr/>
+          <p:nvPr/>
+        </p:nvSpPr>
+        <p:spPr>
+          <a:xfrm>
+            <a:off x="8998997" y="2805761"/>
+            <a:ext cx="2866644" cy="224286"/>
+          </a:xfrm>
+          <a:prstGeom prst="rect">
+            <a:avLst/>
+          </a:prstGeom>
+        </p:spPr>
+        <p:style>
+          <a:lnRef idx="2">
+            <a:schemeClr val="accent3">
+              <a:shade val="50000"/>
+            </a:schemeClr>
+          </a:lnRef>
+          <a:fillRef idx="1">
+            <a:schemeClr val="accent3"/>
+          </a:fillRef>
+          <a:effectRef idx="0">
+            <a:schemeClr val="accent3"/>
+          </a:effectRef>
+          <a:fontRef idx="minor">
+            <a:schemeClr val="lt1"/>
+          </a:fontRef>
+        </p:style>
+        <p:txBody>
+          <a:bodyPr rtlCol="0" anchor="ctr"/>
+          <a:lstStyle/>
+          <a:p>
+            <a:pPr algn="ctr"/>
+            <a:r>
+              <a:rPr lang="en-US" dirty="0"/>
+              <a:t>HTTP </a:t>
+            </a:r>
+            <a:r>
+              <a:rPr lang="en-US" dirty="0" smtClean="0"/>
+              <a:t>Request / Response</a:t>
+            </a:r>
+            <a:endParaRPr lang="en-US" dirty="0"/>
+          </a:p>
+        </p:txBody>
+      </p:sp>
+      <p:cxnSp>
+        <p:nvCxnSpPr>
+          <p:cNvPr id="51" name="Straight Arrow Connector 50"/>
+          <p:cNvCxnSpPr>
+            <a:stCxn id="46" idx="3"/>
+            <a:endCxn id="52" idx="2"/>
+          </p:cNvCxnSpPr>
+          <p:nvPr/>
+        </p:nvCxnSpPr>
+        <p:spPr>
+          <a:xfrm flipV="1">
+            <a:off x="9616372" y="3030047"/>
+            <a:ext cx="815947" cy="825352"/>
+          </a:xfrm>
+          <a:prstGeom prst="straightConnector1">
+            <a:avLst/>
+          </a:prstGeom>
+          <a:ln>
+            <a:tailEnd type="triangle"/>
+          </a:ln>
+        </p:spPr>
+        <p:style>
+          <a:lnRef idx="1">
+            <a:schemeClr val="accent1"/>
+          </a:lnRef>
+          <a:fillRef idx="0">
+            <a:schemeClr val="accent1"/>
+          </a:fillRef>
+          <a:effectRef idx="0">
+            <a:schemeClr val="accent1"/>
+          </a:effectRef>
+          <a:fontRef idx="minor">
+            <a:schemeClr val="tx1"/>
+          </a:fontRef>
+        </p:style>
+      </p:cxnSp>
+      <p:cxnSp>
+        <p:nvCxnSpPr>
+          <p:cNvPr id="55" name="Straight Arrow Connector 54"/>
+          <p:cNvCxnSpPr>
+            <a:stCxn id="52" idx="2"/>
+            <a:endCxn id="46" idx="3"/>
+          </p:cNvCxnSpPr>
+          <p:nvPr/>
+        </p:nvCxnSpPr>
+        <p:spPr>
+          <a:xfrm flipH="1">
+            <a:off x="9616372" y="3030047"/>
+            <a:ext cx="815947" cy="825352"/>
+          </a:xfrm>
+          <a:prstGeom prst="straightConnector1">
+            <a:avLst/>
+          </a:prstGeom>
+          <a:ln>
+            <a:tailEnd type="triangle"/>
+          </a:ln>
+        </p:spPr>
+        <p:style>
+          <a:lnRef idx="1">
+            <a:schemeClr val="accent1"/>
+          </a:lnRef>
+          <a:fillRef idx="0">
+            <a:schemeClr val="accent1"/>
+          </a:fillRef>
+          <a:effectRef idx="0">
+            <a:schemeClr val="accent1"/>
+          </a:effectRef>
+          <a:fontRef idx="minor">
+            <a:schemeClr val="tx1"/>
+          </a:fontRef>
+        </p:style>
+      </p:cxnSp>
+      <p:sp>
+        <p:nvSpPr>
+          <p:cNvPr id="58" name="TextBox 57">
+            <a:extLst>
+              <a:ext uri="{FF2B5EF4-FFF2-40B4-BE49-F238E27FC236}">
+                <a16:creationId xmlns:a16="http://schemas.microsoft.com/office/drawing/2014/main" xmlns="" id="{E0BBD6C8-C8F2-40C5-AA64-85961A11ADC2}"/>
+              </a:ext>
+            </a:extLst>
+          </p:cNvPr>
+          <p:cNvSpPr txBox="1"/>
+          <p:nvPr/>
+        </p:nvSpPr>
+        <p:spPr>
+          <a:xfrm>
+            <a:off x="9937201" y="3411519"/>
+            <a:ext cx="1063847" cy="276999"/>
+          </a:xfrm>
+          <a:prstGeom prst="rect">
+            <a:avLst/>
+          </a:prstGeom>
+          <a:noFill/>
+        </p:spPr>
+        <p:txBody>
+          <a:bodyPr wrap="square" rtlCol="0">
+            <a:spAutoFit/>
+          </a:bodyPr>
+          <a:lstStyle/>
+          <a:p>
+            <a:r>
+              <a:rPr lang="en-US" sz="1200" dirty="0" smtClean="0"/>
+              <a:t>processes</a:t>
+            </a:r>
+            <a:endParaRPr lang="en-US" sz="1200" dirty="0"/>
           </a:p>
         </p:txBody>
       </p:sp>
@@ -8036,7 +8456,7 @@
         </p:nvSpPr>
         <p:spPr>
           <a:xfrm>
-            <a:off x="4641012" y="340544"/>
+            <a:off x="2286569" y="428151"/>
             <a:ext cx="1675952" cy="987253"/>
           </a:xfrm>
           <a:prstGeom prst="rect">
@@ -8107,7 +8527,7 @@
         </p:nvSpPr>
         <p:spPr>
           <a:xfrm>
-            <a:off x="3048386" y="1998328"/>
+            <a:off x="693943" y="2085935"/>
             <a:ext cx="1494797" cy="991056"/>
           </a:xfrm>
           <a:prstGeom prst="rect">
@@ -8171,7 +8591,7 @@
         </p:nvCxnSpPr>
         <p:spPr>
           <a:xfrm flipH="1">
-            <a:off x="4543183" y="2355357"/>
+            <a:off x="2188740" y="2442964"/>
             <a:ext cx="2776581" cy="138499"/>
           </a:xfrm>
           <a:prstGeom prst="straightConnector1">
@@ -8201,7 +8621,7 @@
           <p:cNvPr id="11" name="TextBox 10">
             <a:extLst>
               <a:ext uri="{FF2B5EF4-FFF2-40B4-BE49-F238E27FC236}">
-                <a16:creationId xmlns:a16="http://schemas.microsoft.com/office/drawing/2014/main" id="{E0BBD6C8-C8F2-40C5-AA64-85961A11ADC2}"/>
+                <a16:creationId xmlns:a16="http://schemas.microsoft.com/office/drawing/2014/main" xmlns="" id="{E0BBD6C8-C8F2-40C5-AA64-85961A11ADC2}"/>
               </a:ext>
             </a:extLst>
           </p:cNvPr>
@@ -8210,7 +8630,7 @@
         </p:nvSpPr>
         <p:spPr>
           <a:xfrm>
-            <a:off x="6264130" y="1866802"/>
+            <a:off x="3909687" y="1954409"/>
             <a:ext cx="728932" cy="461665"/>
           </a:xfrm>
           <a:prstGeom prst="rect">
@@ -8245,7 +8665,7 @@
         </p:nvSpPr>
         <p:spPr>
           <a:xfrm>
-            <a:off x="2716230" y="4470786"/>
+            <a:off x="361787" y="4558393"/>
             <a:ext cx="1494797" cy="991056"/>
           </a:xfrm>
           <a:prstGeom prst="rect">
@@ -8325,7 +8745,7 @@
         </p:nvCxnSpPr>
         <p:spPr>
           <a:xfrm flipH="1">
-            <a:off x="5893074" y="2355357"/>
+            <a:off x="3538631" y="2442964"/>
             <a:ext cx="1426690" cy="992748"/>
           </a:xfrm>
           <a:prstGeom prst="straightConnector1">
@@ -8355,7 +8775,7 @@
           <p:cNvPr id="19" name="TextBox 18">
             <a:extLst>
               <a:ext uri="{FF2B5EF4-FFF2-40B4-BE49-F238E27FC236}">
-                <a16:creationId xmlns:a16="http://schemas.microsoft.com/office/drawing/2014/main" id="{E0BBD6C8-C8F2-40C5-AA64-85961A11ADC2}"/>
+                <a16:creationId xmlns:a16="http://schemas.microsoft.com/office/drawing/2014/main" xmlns="" id="{E0BBD6C8-C8F2-40C5-AA64-85961A11ADC2}"/>
               </a:ext>
             </a:extLst>
           </p:cNvPr>
@@ -8364,7 +8784,7 @@
         </p:nvSpPr>
         <p:spPr>
           <a:xfrm>
-            <a:off x="6486912" y="2833300"/>
+            <a:off x="4132469" y="2920907"/>
             <a:ext cx="728932" cy="276999"/>
           </a:xfrm>
           <a:prstGeom prst="rect">
@@ -8393,7 +8813,7 @@
         </p:nvSpPr>
         <p:spPr>
           <a:xfrm>
-            <a:off x="7319764" y="1859829"/>
+            <a:off x="4965321" y="1947436"/>
             <a:ext cx="1589922" cy="991056"/>
           </a:xfrm>
           <a:prstGeom prst="rect">
@@ -8455,7 +8875,7 @@
         </p:nvCxnSpPr>
         <p:spPr>
           <a:xfrm flipH="1" flipV="1">
-            <a:off x="6316964" y="834171"/>
+            <a:off x="3962521" y="921778"/>
             <a:ext cx="1797761" cy="1025658"/>
           </a:xfrm>
           <a:prstGeom prst="straightConnector1">
@@ -8485,7 +8905,7 @@
           <p:cNvPr id="23" name="TextBox 22">
             <a:extLst>
               <a:ext uri="{FF2B5EF4-FFF2-40B4-BE49-F238E27FC236}">
-                <a16:creationId xmlns:a16="http://schemas.microsoft.com/office/drawing/2014/main" id="{E0BBD6C8-C8F2-40C5-AA64-85961A11ADC2}"/>
+                <a16:creationId xmlns:a16="http://schemas.microsoft.com/office/drawing/2014/main" xmlns="" id="{E0BBD6C8-C8F2-40C5-AA64-85961A11ADC2}"/>
               </a:ext>
             </a:extLst>
           </p:cNvPr>
@@ -8494,7 +8914,7 @@
         </p:nvSpPr>
         <p:spPr>
           <a:xfrm>
-            <a:off x="6166028" y="1299474"/>
+            <a:off x="3811585" y="1387081"/>
             <a:ext cx="1153736" cy="276999"/>
           </a:xfrm>
           <a:prstGeom prst="rect">
@@ -8523,7 +8943,7 @@
         </p:nvSpPr>
         <p:spPr>
           <a:xfrm>
-            <a:off x="10507387" y="2923890"/>
+            <a:off x="8994122" y="2058557"/>
             <a:ext cx="653404" cy="1018434"/>
           </a:xfrm>
           <a:prstGeom prst="flowChartMagneticDisk">
@@ -8572,8 +8992,8 @@
         </p:nvCxnSpPr>
         <p:spPr>
           <a:xfrm>
-            <a:off x="8909686" y="2355357"/>
-            <a:ext cx="1597701" cy="1077750"/>
+            <a:off x="6555243" y="2442964"/>
+            <a:ext cx="2438879" cy="124810"/>
           </a:xfrm>
           <a:prstGeom prst="straightConnector1">
             <a:avLst/>
@@ -8602,7 +9022,7 @@
           <p:cNvPr id="28" name="TextBox 27">
             <a:extLst>
               <a:ext uri="{FF2B5EF4-FFF2-40B4-BE49-F238E27FC236}">
-                <a16:creationId xmlns:a16="http://schemas.microsoft.com/office/drawing/2014/main" id="{E0BBD6C8-C8F2-40C5-AA64-85961A11ADC2}"/>
+                <a16:creationId xmlns:a16="http://schemas.microsoft.com/office/drawing/2014/main" xmlns="" id="{E0BBD6C8-C8F2-40C5-AA64-85961A11ADC2}"/>
               </a:ext>
             </a:extLst>
           </p:cNvPr>
@@ -8611,7 +9031,7 @@
         </p:nvSpPr>
         <p:spPr>
           <a:xfrm>
-            <a:off x="9283733" y="2276386"/>
+            <a:off x="7012970" y="2195200"/>
             <a:ext cx="728932" cy="276999"/>
           </a:xfrm>
           <a:prstGeom prst="rect">
@@ -8640,7 +9060,7 @@
         </p:nvSpPr>
         <p:spPr>
           <a:xfrm>
-            <a:off x="7367326" y="3537028"/>
+            <a:off x="5012883" y="3624635"/>
             <a:ext cx="1494797" cy="991056"/>
           </a:xfrm>
           <a:prstGeom prst="rect">
@@ -8696,7 +9116,7 @@
         </p:nvCxnSpPr>
         <p:spPr>
           <a:xfrm flipV="1">
-            <a:off x="8114725" y="2850885"/>
+            <a:off x="5760282" y="2938492"/>
             <a:ext cx="0" cy="686143"/>
           </a:xfrm>
           <a:prstGeom prst="straightConnector1">
@@ -8726,7 +9146,7 @@
           <p:cNvPr id="34" name="TextBox 33">
             <a:extLst>
               <a:ext uri="{FF2B5EF4-FFF2-40B4-BE49-F238E27FC236}">
-                <a16:creationId xmlns:a16="http://schemas.microsoft.com/office/drawing/2014/main" id="{E0BBD6C8-C8F2-40C5-AA64-85961A11ADC2}"/>
+                <a16:creationId xmlns:a16="http://schemas.microsoft.com/office/drawing/2014/main" xmlns="" id="{E0BBD6C8-C8F2-40C5-AA64-85961A11ADC2}"/>
               </a:ext>
             </a:extLst>
           </p:cNvPr>
@@ -8735,7 +9155,7 @@
         </p:nvSpPr>
         <p:spPr>
           <a:xfrm>
-            <a:off x="8051973" y="3068588"/>
+            <a:off x="5697530" y="3156195"/>
             <a:ext cx="1062021" cy="276999"/>
           </a:xfrm>
           <a:prstGeom prst="rect">
@@ -8764,7 +9184,7 @@
         </p:nvSpPr>
         <p:spPr>
           <a:xfrm>
-            <a:off x="5010221" y="5530203"/>
+            <a:off x="2655778" y="5617810"/>
             <a:ext cx="1998489" cy="657053"/>
           </a:xfrm>
           <a:prstGeom prst="rect">
@@ -8822,7 +9242,7 @@
         </p:nvCxnSpPr>
         <p:spPr>
           <a:xfrm flipH="1">
-            <a:off x="6009466" y="4528084"/>
+            <a:off x="3655023" y="4615691"/>
             <a:ext cx="2105259" cy="1002119"/>
           </a:xfrm>
           <a:prstGeom prst="straightConnector1">
@@ -8852,7 +9272,7 @@
           <p:cNvPr id="38" name="TextBox 37">
             <a:extLst>
               <a:ext uri="{FF2B5EF4-FFF2-40B4-BE49-F238E27FC236}">
-                <a16:creationId xmlns:a16="http://schemas.microsoft.com/office/drawing/2014/main" id="{E0BBD6C8-C8F2-40C5-AA64-85961A11ADC2}"/>
+                <a16:creationId xmlns:a16="http://schemas.microsoft.com/office/drawing/2014/main" xmlns="" id="{E0BBD6C8-C8F2-40C5-AA64-85961A11ADC2}"/>
               </a:ext>
             </a:extLst>
           </p:cNvPr>
@@ -8861,7 +9281,7 @@
         </p:nvSpPr>
         <p:spPr>
           <a:xfrm>
-            <a:off x="7750258" y="4669977"/>
+            <a:off x="5395815" y="4757584"/>
             <a:ext cx="728932" cy="276999"/>
           </a:xfrm>
           <a:prstGeom prst="rect">
@@ -8890,7 +9310,7 @@
         </p:nvSpPr>
         <p:spPr>
           <a:xfrm>
-            <a:off x="8909686" y="472284"/>
+            <a:off x="6555243" y="559891"/>
             <a:ext cx="1822194" cy="991056"/>
           </a:xfrm>
           <a:prstGeom prst="rect">
@@ -8954,7 +9374,7 @@
         </p:nvCxnSpPr>
         <p:spPr>
           <a:xfrm flipV="1">
-            <a:off x="8114725" y="967812"/>
+            <a:off x="5760282" y="1055419"/>
             <a:ext cx="794961" cy="892017"/>
           </a:xfrm>
           <a:prstGeom prst="straightConnector1">
@@ -8990,8 +9410,8 @@
         </p:nvCxnSpPr>
         <p:spPr>
           <a:xfrm>
-            <a:off x="9820783" y="1463340"/>
-            <a:ext cx="1013306" cy="1460550"/>
+            <a:off x="7466340" y="1550947"/>
+            <a:ext cx="1854484" cy="507610"/>
           </a:xfrm>
           <a:prstGeom prst="straightConnector1">
             <a:avLst/>
@@ -9020,7 +9440,7 @@
           <p:cNvPr id="44" name="TextBox 43">
             <a:extLst>
               <a:ext uri="{FF2B5EF4-FFF2-40B4-BE49-F238E27FC236}">
-                <a16:creationId xmlns:a16="http://schemas.microsoft.com/office/drawing/2014/main" id="{E0BBD6C8-C8F2-40C5-AA64-85961A11ADC2}"/>
+                <a16:creationId xmlns:a16="http://schemas.microsoft.com/office/drawing/2014/main" xmlns="" id="{E0BBD6C8-C8F2-40C5-AA64-85961A11ADC2}"/>
               </a:ext>
             </a:extLst>
           </p:cNvPr>
@@ -9029,7 +9449,7 @@
         </p:nvSpPr>
         <p:spPr>
           <a:xfrm>
-            <a:off x="8023790" y="1170629"/>
+            <a:off x="5669347" y="1258236"/>
             <a:ext cx="728932" cy="276999"/>
           </a:xfrm>
           <a:prstGeom prst="rect">
@@ -9055,7 +9475,7 @@
           <p:cNvPr id="45" name="TextBox 44">
             <a:extLst>
               <a:ext uri="{FF2B5EF4-FFF2-40B4-BE49-F238E27FC236}">
-                <a16:creationId xmlns:a16="http://schemas.microsoft.com/office/drawing/2014/main" id="{E0BBD6C8-C8F2-40C5-AA64-85961A11ADC2}"/>
+                <a16:creationId xmlns:a16="http://schemas.microsoft.com/office/drawing/2014/main" xmlns="" id="{E0BBD6C8-C8F2-40C5-AA64-85961A11ADC2}"/>
               </a:ext>
             </a:extLst>
           </p:cNvPr>
@@ -9064,7 +9484,7 @@
         </p:nvSpPr>
         <p:spPr>
           <a:xfrm>
-            <a:off x="10245586" y="1859829"/>
+            <a:off x="8377437" y="1597806"/>
             <a:ext cx="864099" cy="276999"/>
           </a:xfrm>
           <a:prstGeom prst="rect">
@@ -9090,7 +9510,7 @@
           <p:cNvPr id="26" name="TextBox 25">
             <a:extLst>
               <a:ext uri="{FF2B5EF4-FFF2-40B4-BE49-F238E27FC236}">
-                <a16:creationId xmlns:a16="http://schemas.microsoft.com/office/drawing/2014/main" id="{6C45E26E-8FEE-4439-A34B-789237C9C62C}"/>
+                <a16:creationId xmlns:a16="http://schemas.microsoft.com/office/drawing/2014/main" xmlns="" id="{6C45E26E-8FEE-4439-A34B-789237C9C62C}"/>
               </a:ext>
             </a:extLst>
           </p:cNvPr>
@@ -9099,7 +9519,7 @@
         </p:nvSpPr>
         <p:spPr>
           <a:xfrm>
-            <a:off x="146648" y="131998"/>
+            <a:off x="32134" y="17332"/>
             <a:ext cx="4675518" cy="369332"/>
           </a:xfrm>
           <a:prstGeom prst="rect">
@@ -9125,7 +9545,7 @@
           <p:cNvPr id="31" name="Rectangle 30">
             <a:extLst>
               <a:ext uri="{FF2B5EF4-FFF2-40B4-BE49-F238E27FC236}">
-                <a16:creationId xmlns:a16="http://schemas.microsoft.com/office/drawing/2014/main" id="{6D396BFC-10E0-4935-903B-EDC457BD1755}"/>
+                <a16:creationId xmlns:a16="http://schemas.microsoft.com/office/drawing/2014/main" xmlns="" id="{6D396BFC-10E0-4935-903B-EDC457BD1755}"/>
               </a:ext>
             </a:extLst>
           </p:cNvPr>
@@ -9134,7 +9554,7 @@
         </p:nvSpPr>
         <p:spPr>
           <a:xfrm>
-            <a:off x="7368605" y="5949095"/>
+            <a:off x="5014162" y="6036702"/>
             <a:ext cx="1621682" cy="657053"/>
           </a:xfrm>
           <a:prstGeom prst="rect">
@@ -9185,7 +9605,7 @@
           <p:cNvPr id="32" name="Rectangle 31">
             <a:extLst>
               <a:ext uri="{FF2B5EF4-FFF2-40B4-BE49-F238E27FC236}">
-                <a16:creationId xmlns:a16="http://schemas.microsoft.com/office/drawing/2014/main" id="{02A645C8-F11F-438D-92DC-F6FCCA5ECFB8}"/>
+                <a16:creationId xmlns:a16="http://schemas.microsoft.com/office/drawing/2014/main" xmlns="" id="{02A645C8-F11F-438D-92DC-F6FCCA5ECFB8}"/>
               </a:ext>
             </a:extLst>
           </p:cNvPr>
@@ -9194,7 +9614,7 @@
         </p:nvSpPr>
         <p:spPr>
           <a:xfrm>
-            <a:off x="9571620" y="5548255"/>
+            <a:off x="7217177" y="5635862"/>
             <a:ext cx="2212030" cy="657053"/>
           </a:xfrm>
           <a:prstGeom prst="rect">
@@ -9249,7 +9669,7 @@
           <p:cNvPr id="12" name="Straight Arrow Connector 11">
             <a:extLst>
               <a:ext uri="{FF2B5EF4-FFF2-40B4-BE49-F238E27FC236}">
-                <a16:creationId xmlns:a16="http://schemas.microsoft.com/office/drawing/2014/main" id="{FF2076CA-F897-4293-B6CD-7408EB452156}"/>
+                <a16:creationId xmlns:a16="http://schemas.microsoft.com/office/drawing/2014/main" xmlns="" id="{FF2076CA-F897-4293-B6CD-7408EB452156}"/>
               </a:ext>
             </a:extLst>
           </p:cNvPr>
@@ -9262,7 +9682,7 @@
         </p:nvCxnSpPr>
         <p:spPr>
           <a:xfrm>
-            <a:off x="8114725" y="4528084"/>
+            <a:off x="5760282" y="4615691"/>
             <a:ext cx="64721" cy="1421011"/>
           </a:xfrm>
           <a:prstGeom prst="straightConnector1">
@@ -9292,7 +9712,7 @@
           <p:cNvPr id="14" name="Straight Arrow Connector 13">
             <a:extLst>
               <a:ext uri="{FF2B5EF4-FFF2-40B4-BE49-F238E27FC236}">
-                <a16:creationId xmlns:a16="http://schemas.microsoft.com/office/drawing/2014/main" id="{5C625B7B-4A1E-46C5-9082-4FEC89B30DA9}"/>
+                <a16:creationId xmlns:a16="http://schemas.microsoft.com/office/drawing/2014/main" xmlns="" id="{5C625B7B-4A1E-46C5-9082-4FEC89B30DA9}"/>
               </a:ext>
             </a:extLst>
           </p:cNvPr>
@@ -9305,7 +9725,7 @@
         </p:nvCxnSpPr>
         <p:spPr>
           <a:xfrm>
-            <a:off x="8114725" y="4528084"/>
+            <a:off x="5760282" y="4615691"/>
             <a:ext cx="2562910" cy="1020171"/>
           </a:xfrm>
           <a:prstGeom prst="straightConnector1">
@@ -9335,7 +9755,7 @@
           <p:cNvPr id="10" name="Straight Arrow Connector 9">
             <a:extLst>
               <a:ext uri="{FF2B5EF4-FFF2-40B4-BE49-F238E27FC236}">
-                <a16:creationId xmlns:a16="http://schemas.microsoft.com/office/drawing/2014/main" id="{EF2F45FB-579D-4721-9889-3C0942B8BBFD}"/>
+                <a16:creationId xmlns:a16="http://schemas.microsoft.com/office/drawing/2014/main" xmlns="" id="{EF2F45FB-579D-4721-9889-3C0942B8BBFD}"/>
               </a:ext>
             </a:extLst>
           </p:cNvPr>
@@ -9347,8 +9767,8 @@
         </p:nvCxnSpPr>
         <p:spPr>
           <a:xfrm flipH="1" flipV="1">
-            <a:off x="8909686" y="2355357"/>
-            <a:ext cx="1597701" cy="1077750"/>
+            <a:off x="6555243" y="2442964"/>
+            <a:ext cx="2438879" cy="124810"/>
           </a:xfrm>
           <a:prstGeom prst="straightConnector1">
             <a:avLst/>
@@ -9377,7 +9797,7 @@
           <p:cNvPr id="56" name="Rectangle 55">
             <a:extLst>
               <a:ext uri="{FF2B5EF4-FFF2-40B4-BE49-F238E27FC236}">
-                <a16:creationId xmlns:a16="http://schemas.microsoft.com/office/drawing/2014/main" id="{FA9C2261-AEDB-43AC-86CF-E53B84AB67B0}"/>
+                <a16:creationId xmlns:a16="http://schemas.microsoft.com/office/drawing/2014/main" xmlns="" id="{FA9C2261-AEDB-43AC-86CF-E53B84AB67B0}"/>
               </a:ext>
             </a:extLst>
           </p:cNvPr>
@@ -9386,7 +9806,7 @@
         </p:nvSpPr>
         <p:spPr>
           <a:xfrm>
-            <a:off x="5145675" y="3348105"/>
+            <a:off x="2791232" y="3435712"/>
             <a:ext cx="1494797" cy="991056"/>
           </a:xfrm>
           <a:prstGeom prst="rect">
@@ -9467,7 +9887,7 @@
           <p:cNvPr id="61" name="Straight Arrow Connector 60">
             <a:extLst>
               <a:ext uri="{FF2B5EF4-FFF2-40B4-BE49-F238E27FC236}">
-                <a16:creationId xmlns:a16="http://schemas.microsoft.com/office/drawing/2014/main" id="{7A03C540-BE87-4015-8AA4-52E27BB970EE}"/>
+                <a16:creationId xmlns:a16="http://schemas.microsoft.com/office/drawing/2014/main" xmlns="" id="{7A03C540-BE87-4015-8AA4-52E27BB970EE}"/>
               </a:ext>
             </a:extLst>
           </p:cNvPr>
@@ -9479,7 +9899,7 @@
         </p:nvCxnSpPr>
         <p:spPr>
           <a:xfrm flipH="1">
-            <a:off x="3463629" y="3843633"/>
+            <a:off x="1109186" y="3931240"/>
             <a:ext cx="1682046" cy="627153"/>
           </a:xfrm>
           <a:prstGeom prst="straightConnector1">
@@ -9509,7 +9929,7 @@
           <p:cNvPr id="63" name="TextBox 62">
             <a:extLst>
               <a:ext uri="{FF2B5EF4-FFF2-40B4-BE49-F238E27FC236}">
-                <a16:creationId xmlns:a16="http://schemas.microsoft.com/office/drawing/2014/main" id="{6A85EB8F-D36A-4163-A076-FD01F5C08B59}"/>
+                <a16:creationId xmlns:a16="http://schemas.microsoft.com/office/drawing/2014/main" xmlns="" id="{6A85EB8F-D36A-4163-A076-FD01F5C08B59}"/>
               </a:ext>
             </a:extLst>
           </p:cNvPr>
@@ -9518,7 +9938,7 @@
         </p:nvSpPr>
         <p:spPr>
           <a:xfrm>
-            <a:off x="3650878" y="3894056"/>
+            <a:off x="1296435" y="3981663"/>
             <a:ext cx="1062021" cy="276999"/>
           </a:xfrm>
           <a:prstGeom prst="rect">
@@ -9544,7 +9964,7 @@
           <p:cNvPr id="64" name="TextBox 63">
             <a:extLst>
               <a:ext uri="{FF2B5EF4-FFF2-40B4-BE49-F238E27FC236}">
-                <a16:creationId xmlns:a16="http://schemas.microsoft.com/office/drawing/2014/main" id="{B306D2D8-E0F7-47AC-8F2B-DF5F03898A81}"/>
+                <a16:creationId xmlns:a16="http://schemas.microsoft.com/office/drawing/2014/main" xmlns="" id="{B306D2D8-E0F7-47AC-8F2B-DF5F03898A81}"/>
               </a:ext>
             </a:extLst>
           </p:cNvPr>
@@ -9553,7 +9973,7 @@
         </p:nvSpPr>
         <p:spPr>
           <a:xfrm>
-            <a:off x="4817052" y="2409916"/>
+            <a:off x="2462609" y="2497523"/>
             <a:ext cx="728932" cy="276999"/>
           </a:xfrm>
           <a:prstGeom prst="rect">
@@ -9571,6 +9991,145 @@
               <a:rPr lang="en-US" sz="1200" dirty="0"/>
               <a:t>returns</a:t>
             </a:r>
+          </a:p>
+        </p:txBody>
+      </p:sp>
+      <p:sp>
+        <p:nvSpPr>
+          <p:cNvPr id="40" name="Rectangle 39"/>
+          <p:cNvSpPr/>
+          <p:nvPr/>
+        </p:nvSpPr>
+        <p:spPr>
+          <a:xfrm>
+            <a:off x="7931539" y="3665412"/>
+            <a:ext cx="1732440" cy="967221"/>
+          </a:xfrm>
+          <a:prstGeom prst="rect">
+            <a:avLst/>
+          </a:prstGeom>
+          <a:solidFill>
+            <a:schemeClr val="accent6">
+              <a:lumMod val="50000"/>
+            </a:schemeClr>
+          </a:solidFill>
+        </p:spPr>
+        <p:style>
+          <a:lnRef idx="2">
+            <a:schemeClr val="accent1">
+              <a:shade val="50000"/>
+            </a:schemeClr>
+          </a:lnRef>
+          <a:fillRef idx="1">
+            <a:schemeClr val="accent1"/>
+          </a:fillRef>
+          <a:effectRef idx="0">
+            <a:schemeClr val="accent1"/>
+          </a:effectRef>
+          <a:fontRef idx="minor">
+            <a:schemeClr val="lt1"/>
+          </a:fontRef>
+        </p:style>
+        <p:txBody>
+          <a:bodyPr rtlCol="0" anchor="ctr"/>
+          <a:lstStyle/>
+          <a:p>
+            <a:pPr algn="ctr"/>
+            <a:r>
+              <a:rPr lang="en-US" sz="1000" dirty="0" smtClean="0"/>
+              <a:t>com.tlw8253.controller</a:t>
+            </a:r>
+            <a:endParaRPr lang="en-US" sz="1000" dirty="0"/>
+          </a:p>
+          <a:p>
+            <a:pPr algn="ctr"/>
+            <a:r>
+              <a:rPr lang="en-US" sz="1600" dirty="0" smtClean="0"/>
+              <a:t>&lt;T&gt;</a:t>
+            </a:r>
+            <a:r>
+              <a:rPr lang="en-US" sz="1600" dirty="0" smtClean="0"/>
+              <a:t>Controller</a:t>
+            </a:r>
+            <a:endParaRPr lang="en-US" sz="1600" dirty="0"/>
+          </a:p>
+        </p:txBody>
+      </p:sp>
+      <p:cxnSp>
+        <p:nvCxnSpPr>
+          <p:cNvPr id="42" name="Straight Arrow Connector 41"/>
+          <p:cNvCxnSpPr>
+            <a:stCxn id="40" idx="1"/>
+            <a:endCxn id="29" idx="3"/>
+          </p:cNvCxnSpPr>
+          <p:nvPr/>
+        </p:nvCxnSpPr>
+        <p:spPr>
+          <a:xfrm flipH="1" flipV="1">
+            <a:off x="6507680" y="4120163"/>
+            <a:ext cx="1423859" cy="28860"/>
+          </a:xfrm>
+          <a:prstGeom prst="straightConnector1">
+            <a:avLst/>
+          </a:prstGeom>
+          <a:ln>
+            <a:tailEnd type="triangle"/>
+          </a:ln>
+        </p:spPr>
+        <p:style>
+          <a:lnRef idx="1">
+            <a:schemeClr val="accent1"/>
+          </a:lnRef>
+          <a:fillRef idx="0">
+            <a:schemeClr val="accent1"/>
+          </a:fillRef>
+          <a:effectRef idx="0">
+            <a:schemeClr val="accent1"/>
+          </a:effectRef>
+          <a:fontRef idx="minor">
+            <a:schemeClr val="tx1"/>
+          </a:fontRef>
+        </p:style>
+      </p:cxnSp>
+      <p:sp>
+        <p:nvSpPr>
+          <p:cNvPr id="46" name="TextBox 45">
+            <a:extLst>
+              <a:ext uri="{FF2B5EF4-FFF2-40B4-BE49-F238E27FC236}">
+                <a16:creationId xmlns:a16="http://schemas.microsoft.com/office/drawing/2014/main" xmlns="" id="{E0BBD6C8-C8F2-40C5-AA64-85961A11ADC2}"/>
+              </a:ext>
+            </a:extLst>
+          </p:cNvPr>
+          <p:cNvSpPr txBox="1"/>
+          <p:nvPr/>
+        </p:nvSpPr>
+        <p:spPr>
+          <a:xfrm>
+            <a:off x="6802557" y="3938886"/>
+            <a:ext cx="1062021" cy="461665"/>
+          </a:xfrm>
+          <a:prstGeom prst="rect">
+            <a:avLst/>
+          </a:prstGeom>
+          <a:noFill/>
+        </p:spPr>
+        <p:txBody>
+          <a:bodyPr wrap="square" rtlCol="0">
+            <a:spAutoFit/>
+          </a:bodyPr>
+          <a:lstStyle/>
+          <a:p>
+            <a:r>
+              <a:rPr lang="en-US" sz="1200" dirty="0" smtClean="0"/>
+              <a:t>contains</a:t>
+            </a:r>
+          </a:p>
+          <a:p>
+            <a:r>
+              <a:rPr lang="en-US" sz="1200" dirty="0" smtClean="0"/>
+              <a:t>controls</a:t>
+            </a:r>
+            <a:endParaRPr lang="en-US" sz="1200" dirty="0"/>
           </a:p>
         </p:txBody>
       </p:sp>
@@ -9612,7 +10171,7 @@
         </p:nvSpPr>
         <p:spPr>
           <a:xfrm>
-            <a:off x="4494770" y="340544"/>
+            <a:off x="2036293" y="466480"/>
             <a:ext cx="1906030" cy="991056"/>
           </a:xfrm>
           <a:prstGeom prst="rect">
@@ -9683,7 +10242,7 @@
         </p:nvSpPr>
         <p:spPr>
           <a:xfrm>
-            <a:off x="3048386" y="1998328"/>
+            <a:off x="589909" y="2124264"/>
             <a:ext cx="1494797" cy="991056"/>
           </a:xfrm>
           <a:prstGeom prst="rect">
@@ -9747,7 +10306,7 @@
         </p:nvCxnSpPr>
         <p:spPr>
           <a:xfrm flipH="1">
-            <a:off x="4543183" y="2355357"/>
+            <a:off x="2084706" y="2481293"/>
             <a:ext cx="2776581" cy="138499"/>
           </a:xfrm>
           <a:prstGeom prst="straightConnector1">
@@ -9777,7 +10336,7 @@
           <p:cNvPr id="11" name="TextBox 10">
             <a:extLst>
               <a:ext uri="{FF2B5EF4-FFF2-40B4-BE49-F238E27FC236}">
-                <a16:creationId xmlns:a16="http://schemas.microsoft.com/office/drawing/2014/main" id="{E0BBD6C8-C8F2-40C5-AA64-85961A11ADC2}"/>
+                <a16:creationId xmlns:a16="http://schemas.microsoft.com/office/drawing/2014/main" xmlns="" id="{E0BBD6C8-C8F2-40C5-AA64-85961A11ADC2}"/>
               </a:ext>
             </a:extLst>
           </p:cNvPr>
@@ -9786,7 +10345,7 @@
         </p:nvSpPr>
         <p:spPr>
           <a:xfrm>
-            <a:off x="6188680" y="1954803"/>
+            <a:off x="3730203" y="2080739"/>
             <a:ext cx="728932" cy="461665"/>
           </a:xfrm>
           <a:prstGeom prst="rect">
@@ -9821,7 +10380,7 @@
         </p:nvSpPr>
         <p:spPr>
           <a:xfrm>
-            <a:off x="5262066" y="3375503"/>
+            <a:off x="2803589" y="3501439"/>
             <a:ext cx="1494797" cy="991056"/>
           </a:xfrm>
           <a:prstGeom prst="rect">
@@ -9904,7 +10463,7 @@
         </p:nvCxnSpPr>
         <p:spPr>
           <a:xfrm flipH="1">
-            <a:off x="6009465" y="2355357"/>
+            <a:off x="3550988" y="2481293"/>
             <a:ext cx="1310299" cy="1020146"/>
           </a:xfrm>
           <a:prstGeom prst="straightConnector1">
@@ -9934,7 +10493,7 @@
           <p:cNvPr id="19" name="TextBox 18">
             <a:extLst>
               <a:ext uri="{FF2B5EF4-FFF2-40B4-BE49-F238E27FC236}">
-                <a16:creationId xmlns:a16="http://schemas.microsoft.com/office/drawing/2014/main" id="{E0BBD6C8-C8F2-40C5-AA64-85961A11ADC2}"/>
+                <a16:creationId xmlns:a16="http://schemas.microsoft.com/office/drawing/2014/main" xmlns="" id="{E0BBD6C8-C8F2-40C5-AA64-85961A11ADC2}"/>
               </a:ext>
             </a:extLst>
           </p:cNvPr>
@@ -9943,7 +10502,7 @@
         </p:nvSpPr>
         <p:spPr>
           <a:xfrm>
-            <a:off x="6486912" y="2833300"/>
+            <a:off x="4028435" y="2959236"/>
             <a:ext cx="728932" cy="276999"/>
           </a:xfrm>
           <a:prstGeom prst="rect">
@@ -9972,7 +10531,7 @@
         </p:nvSpPr>
         <p:spPr>
           <a:xfrm>
-            <a:off x="7319764" y="1859829"/>
+            <a:off x="4861287" y="1985765"/>
             <a:ext cx="1589922" cy="991056"/>
           </a:xfrm>
           <a:prstGeom prst="rect">
@@ -10030,7 +10589,7 @@
         </p:nvCxnSpPr>
         <p:spPr>
           <a:xfrm flipH="1" flipV="1">
-            <a:off x="6400800" y="836072"/>
+            <a:off x="3942323" y="962008"/>
             <a:ext cx="1713925" cy="1023757"/>
           </a:xfrm>
           <a:prstGeom prst="straightConnector1">
@@ -10060,7 +10619,7 @@
           <p:cNvPr id="23" name="TextBox 22">
             <a:extLst>
               <a:ext uri="{FF2B5EF4-FFF2-40B4-BE49-F238E27FC236}">
-                <a16:creationId xmlns:a16="http://schemas.microsoft.com/office/drawing/2014/main" id="{E0BBD6C8-C8F2-40C5-AA64-85961A11ADC2}"/>
+                <a16:creationId xmlns:a16="http://schemas.microsoft.com/office/drawing/2014/main" xmlns="" id="{E0BBD6C8-C8F2-40C5-AA64-85961A11ADC2}"/>
               </a:ext>
             </a:extLst>
           </p:cNvPr>
@@ -10069,7 +10628,7 @@
         </p:nvSpPr>
         <p:spPr>
           <a:xfrm>
-            <a:off x="6166028" y="1299474"/>
+            <a:off x="3707551" y="1425410"/>
             <a:ext cx="1645732" cy="276999"/>
           </a:xfrm>
           <a:prstGeom prst="rect">
@@ -10098,7 +10657,7 @@
         </p:nvSpPr>
         <p:spPr>
           <a:xfrm>
-            <a:off x="10507387" y="2923890"/>
+            <a:off x="8671769" y="2079301"/>
             <a:ext cx="653404" cy="1018434"/>
           </a:xfrm>
           <a:prstGeom prst="flowChartMagneticDisk">
@@ -10147,8 +10706,8 @@
         </p:nvCxnSpPr>
         <p:spPr>
           <a:xfrm>
-            <a:off x="8909686" y="2355357"/>
-            <a:ext cx="1597701" cy="1077750"/>
+            <a:off x="6451209" y="2481293"/>
+            <a:ext cx="2220560" cy="107225"/>
           </a:xfrm>
           <a:prstGeom prst="straightConnector1">
             <a:avLst/>
@@ -10177,7 +10736,7 @@
           <p:cNvPr id="28" name="TextBox 27">
             <a:extLst>
               <a:ext uri="{FF2B5EF4-FFF2-40B4-BE49-F238E27FC236}">
-                <a16:creationId xmlns:a16="http://schemas.microsoft.com/office/drawing/2014/main" id="{E0BBD6C8-C8F2-40C5-AA64-85961A11ADC2}"/>
+                <a16:creationId xmlns:a16="http://schemas.microsoft.com/office/drawing/2014/main" xmlns="" id="{E0BBD6C8-C8F2-40C5-AA64-85961A11ADC2}"/>
               </a:ext>
             </a:extLst>
           </p:cNvPr>
@@ -10186,7 +10745,7 @@
         </p:nvSpPr>
         <p:spPr>
           <a:xfrm>
-            <a:off x="9283733" y="2276386"/>
+            <a:off x="6999106" y="2204294"/>
             <a:ext cx="728932" cy="276999"/>
           </a:xfrm>
           <a:prstGeom prst="rect">
@@ -10215,7 +10774,7 @@
         </p:nvSpPr>
         <p:spPr>
           <a:xfrm>
-            <a:off x="7367326" y="3537028"/>
+            <a:off x="4908849" y="3662964"/>
             <a:ext cx="1494797" cy="991056"/>
           </a:xfrm>
           <a:prstGeom prst="rect">
@@ -10272,7 +10831,7 @@
         </p:nvCxnSpPr>
         <p:spPr>
           <a:xfrm flipV="1">
-            <a:off x="8114725" y="2850885"/>
+            <a:off x="5656248" y="2976821"/>
             <a:ext cx="0" cy="686143"/>
           </a:xfrm>
           <a:prstGeom prst="straightConnector1">
@@ -10302,7 +10861,7 @@
           <p:cNvPr id="34" name="TextBox 33">
             <a:extLst>
               <a:ext uri="{FF2B5EF4-FFF2-40B4-BE49-F238E27FC236}">
-                <a16:creationId xmlns:a16="http://schemas.microsoft.com/office/drawing/2014/main" id="{E0BBD6C8-C8F2-40C5-AA64-85961A11ADC2}"/>
+                <a16:creationId xmlns:a16="http://schemas.microsoft.com/office/drawing/2014/main" xmlns="" id="{E0BBD6C8-C8F2-40C5-AA64-85961A11ADC2}"/>
               </a:ext>
             </a:extLst>
           </p:cNvPr>
@@ -10311,7 +10870,7 @@
         </p:nvSpPr>
         <p:spPr>
           <a:xfrm>
-            <a:off x="8051973" y="3068588"/>
+            <a:off x="5593496" y="3194524"/>
             <a:ext cx="1062021" cy="276999"/>
           </a:xfrm>
           <a:prstGeom prst="rect">
@@ -10340,7 +10899,7 @@
         </p:nvSpPr>
         <p:spPr>
           <a:xfrm>
-            <a:off x="5010221" y="5530203"/>
+            <a:off x="2551744" y="5656139"/>
             <a:ext cx="1998489" cy="657053"/>
           </a:xfrm>
           <a:prstGeom prst="rect">
@@ -10398,7 +10957,7 @@
         </p:nvCxnSpPr>
         <p:spPr>
           <a:xfrm flipH="1">
-            <a:off x="6009466" y="4528084"/>
+            <a:off x="3550989" y="4654020"/>
             <a:ext cx="2105259" cy="1002119"/>
           </a:xfrm>
           <a:prstGeom prst="straightConnector1">
@@ -10428,7 +10987,7 @@
           <p:cNvPr id="38" name="TextBox 37">
             <a:extLst>
               <a:ext uri="{FF2B5EF4-FFF2-40B4-BE49-F238E27FC236}">
-                <a16:creationId xmlns:a16="http://schemas.microsoft.com/office/drawing/2014/main" id="{E0BBD6C8-C8F2-40C5-AA64-85961A11ADC2}"/>
+                <a16:creationId xmlns:a16="http://schemas.microsoft.com/office/drawing/2014/main" xmlns="" id="{E0BBD6C8-C8F2-40C5-AA64-85961A11ADC2}"/>
               </a:ext>
             </a:extLst>
           </p:cNvPr>
@@ -10437,7 +10996,7 @@
         </p:nvSpPr>
         <p:spPr>
           <a:xfrm>
-            <a:off x="7750258" y="4669977"/>
+            <a:off x="5291781" y="4795913"/>
             <a:ext cx="728932" cy="276999"/>
           </a:xfrm>
           <a:prstGeom prst="rect">
@@ -10466,7 +11025,7 @@
         </p:nvSpPr>
         <p:spPr>
           <a:xfrm>
-            <a:off x="8909686" y="472284"/>
+            <a:off x="6451209" y="598220"/>
             <a:ext cx="1822194" cy="991056"/>
           </a:xfrm>
           <a:prstGeom prst="rect">
@@ -10530,7 +11089,7 @@
         </p:nvCxnSpPr>
         <p:spPr>
           <a:xfrm flipV="1">
-            <a:off x="8114725" y="967812"/>
+            <a:off x="5656248" y="1093748"/>
             <a:ext cx="794961" cy="892017"/>
           </a:xfrm>
           <a:prstGeom prst="straightConnector1">
@@ -10566,8 +11125,8 @@
         </p:nvCxnSpPr>
         <p:spPr>
           <a:xfrm>
-            <a:off x="9820783" y="1463340"/>
-            <a:ext cx="1013306" cy="1460550"/>
+            <a:off x="7362306" y="1589276"/>
+            <a:ext cx="1636165" cy="490025"/>
           </a:xfrm>
           <a:prstGeom prst="straightConnector1">
             <a:avLst/>
@@ -10596,7 +11155,7 @@
           <p:cNvPr id="44" name="TextBox 43">
             <a:extLst>
               <a:ext uri="{FF2B5EF4-FFF2-40B4-BE49-F238E27FC236}">
-                <a16:creationId xmlns:a16="http://schemas.microsoft.com/office/drawing/2014/main" id="{E0BBD6C8-C8F2-40C5-AA64-85961A11ADC2}"/>
+                <a16:creationId xmlns:a16="http://schemas.microsoft.com/office/drawing/2014/main" xmlns="" id="{E0BBD6C8-C8F2-40C5-AA64-85961A11ADC2}"/>
               </a:ext>
             </a:extLst>
           </p:cNvPr>
@@ -10605,7 +11164,7 @@
         </p:nvSpPr>
         <p:spPr>
           <a:xfrm>
-            <a:off x="8023790" y="1170629"/>
+            <a:off x="5565313" y="1296565"/>
             <a:ext cx="728932" cy="276999"/>
           </a:xfrm>
           <a:prstGeom prst="rect">
@@ -10631,7 +11190,7 @@
           <p:cNvPr id="45" name="TextBox 44">
             <a:extLst>
               <a:ext uri="{FF2B5EF4-FFF2-40B4-BE49-F238E27FC236}">
-                <a16:creationId xmlns:a16="http://schemas.microsoft.com/office/drawing/2014/main" id="{E0BBD6C8-C8F2-40C5-AA64-85961A11ADC2}"/>
+                <a16:creationId xmlns:a16="http://schemas.microsoft.com/office/drawing/2014/main" xmlns="" id="{E0BBD6C8-C8F2-40C5-AA64-85961A11ADC2}"/>
               </a:ext>
             </a:extLst>
           </p:cNvPr>
@@ -10640,7 +11199,7 @@
         </p:nvSpPr>
         <p:spPr>
           <a:xfrm>
-            <a:off x="10245586" y="1859829"/>
+            <a:off x="8180388" y="1640803"/>
             <a:ext cx="864099" cy="276999"/>
           </a:xfrm>
           <a:prstGeom prst="rect">
@@ -10666,7 +11225,7 @@
           <p:cNvPr id="26" name="TextBox 25">
             <a:extLst>
               <a:ext uri="{FF2B5EF4-FFF2-40B4-BE49-F238E27FC236}">
-                <a16:creationId xmlns:a16="http://schemas.microsoft.com/office/drawing/2014/main" id="{6C45E26E-8FEE-4439-A34B-789237C9C62C}"/>
+                <a16:creationId xmlns:a16="http://schemas.microsoft.com/office/drawing/2014/main" xmlns="" id="{6C45E26E-8FEE-4439-A34B-789237C9C62C}"/>
               </a:ext>
             </a:extLst>
           </p:cNvPr>
@@ -10675,8 +11234,8 @@
         </p:nvSpPr>
         <p:spPr>
           <a:xfrm>
-            <a:off x="146648" y="131998"/>
-            <a:ext cx="4675518" cy="646331"/>
+            <a:off x="2442" y="-29048"/>
+            <a:ext cx="5718527" cy="369332"/>
           </a:xfrm>
           <a:prstGeom prst="rect">
             <a:avLst/>
@@ -10701,7 +11260,7 @@
           <p:cNvPr id="31" name="Rectangle 30">
             <a:extLst>
               <a:ext uri="{FF2B5EF4-FFF2-40B4-BE49-F238E27FC236}">
-                <a16:creationId xmlns:a16="http://schemas.microsoft.com/office/drawing/2014/main" id="{6D396BFC-10E0-4935-903B-EDC457BD1755}"/>
+                <a16:creationId xmlns:a16="http://schemas.microsoft.com/office/drawing/2014/main" xmlns="" id="{6D396BFC-10E0-4935-903B-EDC457BD1755}"/>
               </a:ext>
             </a:extLst>
           </p:cNvPr>
@@ -10710,7 +11269,7 @@
         </p:nvSpPr>
         <p:spPr>
           <a:xfrm>
-            <a:off x="7368605" y="5949095"/>
+            <a:off x="4910128" y="6075031"/>
             <a:ext cx="1621682" cy="657053"/>
           </a:xfrm>
           <a:prstGeom prst="rect">
@@ -10761,7 +11320,7 @@
           <p:cNvPr id="32" name="Rectangle 31">
             <a:extLst>
               <a:ext uri="{FF2B5EF4-FFF2-40B4-BE49-F238E27FC236}">
-                <a16:creationId xmlns:a16="http://schemas.microsoft.com/office/drawing/2014/main" id="{02A645C8-F11F-438D-92DC-F6FCCA5ECFB8}"/>
+                <a16:creationId xmlns:a16="http://schemas.microsoft.com/office/drawing/2014/main" xmlns="" id="{02A645C8-F11F-438D-92DC-F6FCCA5ECFB8}"/>
               </a:ext>
             </a:extLst>
           </p:cNvPr>
@@ -10770,7 +11329,7 @@
         </p:nvSpPr>
         <p:spPr>
           <a:xfrm>
-            <a:off x="9571620" y="5548255"/>
+            <a:off x="7113143" y="5674191"/>
             <a:ext cx="2212030" cy="657053"/>
           </a:xfrm>
           <a:prstGeom prst="rect">
@@ -10821,7 +11380,7 @@
           <p:cNvPr id="12" name="Straight Arrow Connector 11">
             <a:extLst>
               <a:ext uri="{FF2B5EF4-FFF2-40B4-BE49-F238E27FC236}">
-                <a16:creationId xmlns:a16="http://schemas.microsoft.com/office/drawing/2014/main" id="{FF2076CA-F897-4293-B6CD-7408EB452156}"/>
+                <a16:creationId xmlns:a16="http://schemas.microsoft.com/office/drawing/2014/main" xmlns="" id="{FF2076CA-F897-4293-B6CD-7408EB452156}"/>
               </a:ext>
             </a:extLst>
           </p:cNvPr>
@@ -10834,7 +11393,7 @@
         </p:nvCxnSpPr>
         <p:spPr>
           <a:xfrm>
-            <a:off x="8114725" y="4528084"/>
+            <a:off x="5656248" y="4654020"/>
             <a:ext cx="64721" cy="1421011"/>
           </a:xfrm>
           <a:prstGeom prst="straightConnector1">
@@ -10864,7 +11423,7 @@
           <p:cNvPr id="14" name="Straight Arrow Connector 13">
             <a:extLst>
               <a:ext uri="{FF2B5EF4-FFF2-40B4-BE49-F238E27FC236}">
-                <a16:creationId xmlns:a16="http://schemas.microsoft.com/office/drawing/2014/main" id="{5C625B7B-4A1E-46C5-9082-4FEC89B30DA9}"/>
+                <a16:creationId xmlns:a16="http://schemas.microsoft.com/office/drawing/2014/main" xmlns="" id="{5C625B7B-4A1E-46C5-9082-4FEC89B30DA9}"/>
               </a:ext>
             </a:extLst>
           </p:cNvPr>
@@ -10877,7 +11436,7 @@
         </p:nvCxnSpPr>
         <p:spPr>
           <a:xfrm>
-            <a:off x="8114725" y="4528084"/>
+            <a:off x="5656248" y="4654020"/>
             <a:ext cx="2562910" cy="1020171"/>
           </a:xfrm>
           <a:prstGeom prst="straightConnector1">
@@ -10907,7 +11466,7 @@
           <p:cNvPr id="10" name="Straight Arrow Connector 9">
             <a:extLst>
               <a:ext uri="{FF2B5EF4-FFF2-40B4-BE49-F238E27FC236}">
-                <a16:creationId xmlns:a16="http://schemas.microsoft.com/office/drawing/2014/main" id="{EF2F45FB-579D-4721-9889-3C0942B8BBFD}"/>
+                <a16:creationId xmlns:a16="http://schemas.microsoft.com/office/drawing/2014/main" xmlns="" id="{EF2F45FB-579D-4721-9889-3C0942B8BBFD}"/>
               </a:ext>
             </a:extLst>
           </p:cNvPr>
@@ -10919,8 +11478,8 @@
         </p:nvCxnSpPr>
         <p:spPr>
           <a:xfrm flipH="1" flipV="1">
-            <a:off x="8909686" y="2355357"/>
-            <a:ext cx="1597701" cy="1077750"/>
+            <a:off x="6451209" y="2481293"/>
+            <a:ext cx="2220560" cy="107225"/>
           </a:xfrm>
           <a:prstGeom prst="straightConnector1">
             <a:avLst/>
@@ -10949,7 +11508,7 @@
           <p:cNvPr id="36" name="Rectangle 35">
             <a:extLst>
               <a:ext uri="{FF2B5EF4-FFF2-40B4-BE49-F238E27FC236}">
-                <a16:creationId xmlns:a16="http://schemas.microsoft.com/office/drawing/2014/main" id="{93FBA679-F71B-47BD-BE29-21E7C2262CEB}"/>
+                <a16:creationId xmlns:a16="http://schemas.microsoft.com/office/drawing/2014/main" xmlns="" id="{93FBA679-F71B-47BD-BE29-21E7C2262CEB}"/>
               </a:ext>
             </a:extLst>
           </p:cNvPr>
@@ -10958,7 +11517,7 @@
         </p:nvSpPr>
         <p:spPr>
           <a:xfrm>
-            <a:off x="2832621" y="4478037"/>
+            <a:off x="374144" y="4603973"/>
             <a:ext cx="1494797" cy="991056"/>
           </a:xfrm>
           <a:prstGeom prst="rect">
@@ -11031,7 +11590,7 @@
           <p:cNvPr id="40" name="Straight Arrow Connector 39">
             <a:extLst>
               <a:ext uri="{FF2B5EF4-FFF2-40B4-BE49-F238E27FC236}">
-                <a16:creationId xmlns:a16="http://schemas.microsoft.com/office/drawing/2014/main" id="{4EB51AD1-53A9-412E-933D-8DFB38C76755}"/>
+                <a16:creationId xmlns:a16="http://schemas.microsoft.com/office/drawing/2014/main" xmlns="" id="{4EB51AD1-53A9-412E-933D-8DFB38C76755}"/>
               </a:ext>
             </a:extLst>
           </p:cNvPr>
@@ -11044,7 +11603,7 @@
         </p:nvCxnSpPr>
         <p:spPr>
           <a:xfrm flipH="1">
-            <a:off x="3580020" y="3871031"/>
+            <a:off x="1121543" y="3996967"/>
             <a:ext cx="1682046" cy="607006"/>
           </a:xfrm>
           <a:prstGeom prst="straightConnector1">
@@ -11074,7 +11633,7 @@
           <p:cNvPr id="42" name="TextBox 41">
             <a:extLst>
               <a:ext uri="{FF2B5EF4-FFF2-40B4-BE49-F238E27FC236}">
-                <a16:creationId xmlns:a16="http://schemas.microsoft.com/office/drawing/2014/main" id="{42986CB5-3F27-4531-B052-275C80DE06A9}"/>
+                <a16:creationId xmlns:a16="http://schemas.microsoft.com/office/drawing/2014/main" xmlns="" id="{42986CB5-3F27-4531-B052-275C80DE06A9}"/>
               </a:ext>
             </a:extLst>
           </p:cNvPr>
@@ -11083,7 +11642,7 @@
         </p:nvSpPr>
         <p:spPr>
           <a:xfrm>
-            <a:off x="3767269" y="3901307"/>
+            <a:off x="1308792" y="4027243"/>
             <a:ext cx="1062021" cy="276999"/>
           </a:xfrm>
           <a:prstGeom prst="rect">
@@ -11109,7 +11668,7 @@
           <p:cNvPr id="46" name="TextBox 45">
             <a:extLst>
               <a:ext uri="{FF2B5EF4-FFF2-40B4-BE49-F238E27FC236}">
-                <a16:creationId xmlns:a16="http://schemas.microsoft.com/office/drawing/2014/main" id="{5EBBC5A0-26BA-4B6E-A551-6AD1BA1617D0}"/>
+                <a16:creationId xmlns:a16="http://schemas.microsoft.com/office/drawing/2014/main" xmlns="" id="{5EBBC5A0-26BA-4B6E-A551-6AD1BA1617D0}"/>
               </a:ext>
             </a:extLst>
           </p:cNvPr>
@@ -11118,7 +11677,7 @@
         </p:nvSpPr>
         <p:spPr>
           <a:xfrm>
-            <a:off x="4817052" y="2409916"/>
+            <a:off x="2358575" y="2535852"/>
             <a:ext cx="728932" cy="276999"/>
           </a:xfrm>
           <a:prstGeom prst="rect">
@@ -11136,6 +11695,141 @@
               <a:rPr lang="en-US" sz="1200" dirty="0"/>
               <a:t>returns</a:t>
             </a:r>
+          </a:p>
+        </p:txBody>
+      </p:sp>
+      <p:sp>
+        <p:nvSpPr>
+          <p:cNvPr id="47" name="Rectangle 46"/>
+          <p:cNvSpPr/>
+          <p:nvPr/>
+        </p:nvSpPr>
+        <p:spPr>
+          <a:xfrm>
+            <a:off x="7711114" y="3654185"/>
+            <a:ext cx="1732440" cy="967221"/>
+          </a:xfrm>
+          <a:prstGeom prst="rect">
+            <a:avLst/>
+          </a:prstGeom>
+          <a:solidFill>
+            <a:schemeClr val="accent6">
+              <a:lumMod val="50000"/>
+            </a:schemeClr>
+          </a:solidFill>
+        </p:spPr>
+        <p:style>
+          <a:lnRef idx="2">
+            <a:schemeClr val="accent1">
+              <a:shade val="50000"/>
+            </a:schemeClr>
+          </a:lnRef>
+          <a:fillRef idx="1">
+            <a:schemeClr val="accent1"/>
+          </a:fillRef>
+          <a:effectRef idx="0">
+            <a:schemeClr val="accent1"/>
+          </a:effectRef>
+          <a:fontRef idx="minor">
+            <a:schemeClr val="lt1"/>
+          </a:fontRef>
+        </p:style>
+        <p:txBody>
+          <a:bodyPr rtlCol="0" anchor="ctr"/>
+          <a:lstStyle/>
+          <a:p>
+            <a:pPr algn="ctr"/>
+            <a:r>
+              <a:rPr lang="en-US" sz="1000" dirty="0" smtClean="0"/>
+              <a:t>com.tlw8253.controller</a:t>
+            </a:r>
+            <a:endParaRPr lang="en-US" sz="1000" dirty="0"/>
+          </a:p>
+          <a:p>
+            <a:pPr algn="ctr"/>
+            <a:r>
+              <a:rPr lang="en-US" sz="1600" dirty="0" err="1" smtClean="0"/>
+              <a:t>AccountController</a:t>
+            </a:r>
+            <a:endParaRPr lang="en-US" sz="1600" dirty="0"/>
+          </a:p>
+        </p:txBody>
+      </p:sp>
+      <p:cxnSp>
+        <p:nvCxnSpPr>
+          <p:cNvPr id="8" name="Straight Arrow Connector 7"/>
+          <p:cNvCxnSpPr>
+            <a:stCxn id="47" idx="1"/>
+            <a:endCxn id="29" idx="3"/>
+          </p:cNvCxnSpPr>
+          <p:nvPr/>
+        </p:nvCxnSpPr>
+        <p:spPr>
+          <a:xfrm flipH="1">
+            <a:off x="6403646" y="4137796"/>
+            <a:ext cx="1307468" cy="20696"/>
+          </a:xfrm>
+          <a:prstGeom prst="straightConnector1">
+            <a:avLst/>
+          </a:prstGeom>
+          <a:ln>
+            <a:tailEnd type="triangle"/>
+          </a:ln>
+        </p:spPr>
+        <p:style>
+          <a:lnRef idx="1">
+            <a:schemeClr val="accent1"/>
+          </a:lnRef>
+          <a:fillRef idx="0">
+            <a:schemeClr val="accent1"/>
+          </a:fillRef>
+          <a:effectRef idx="0">
+            <a:schemeClr val="accent1"/>
+          </a:effectRef>
+          <a:fontRef idx="minor">
+            <a:schemeClr val="tx1"/>
+          </a:fontRef>
+        </p:style>
+      </p:cxnSp>
+      <p:sp>
+        <p:nvSpPr>
+          <p:cNvPr id="48" name="TextBox 47">
+            <a:extLst>
+              <a:ext uri="{FF2B5EF4-FFF2-40B4-BE49-F238E27FC236}">
+                <a16:creationId xmlns:a16="http://schemas.microsoft.com/office/drawing/2014/main" xmlns="" id="{E0BBD6C8-C8F2-40C5-AA64-85961A11ADC2}"/>
+              </a:ext>
+            </a:extLst>
+          </p:cNvPr>
+          <p:cNvSpPr txBox="1"/>
+          <p:nvPr/>
+        </p:nvSpPr>
+        <p:spPr>
+          <a:xfrm>
+            <a:off x="6582132" y="3927659"/>
+            <a:ext cx="1062021" cy="461665"/>
+          </a:xfrm>
+          <a:prstGeom prst="rect">
+            <a:avLst/>
+          </a:prstGeom>
+          <a:noFill/>
+        </p:spPr>
+        <p:txBody>
+          <a:bodyPr wrap="square" rtlCol="0">
+            <a:spAutoFit/>
+          </a:bodyPr>
+          <a:lstStyle/>
+          <a:p>
+            <a:r>
+              <a:rPr lang="en-US" sz="1200" dirty="0" smtClean="0"/>
+              <a:t>contains</a:t>
+            </a:r>
+          </a:p>
+          <a:p>
+            <a:r>
+              <a:rPr lang="en-US" sz="1200" dirty="0" smtClean="0"/>
+              <a:t>controls</a:t>
+            </a:r>
+            <a:endParaRPr lang="en-US" sz="1200" dirty="0"/>
           </a:p>
         </p:txBody>
       </p:sp>
@@ -11318,7 +12012,7 @@
           <p:cNvPr id="11" name="TextBox 10">
             <a:extLst>
               <a:ext uri="{FF2B5EF4-FFF2-40B4-BE49-F238E27FC236}">
-                <a16:creationId xmlns:a16="http://schemas.microsoft.com/office/drawing/2014/main" id="{E0BBD6C8-C8F2-40C5-AA64-85961A11ADC2}"/>
+                <a16:creationId xmlns:a16="http://schemas.microsoft.com/office/drawing/2014/main" xmlns="" id="{E0BBD6C8-C8F2-40C5-AA64-85961A11ADC2}"/>
               </a:ext>
             </a:extLst>
           </p:cNvPr>

</xml_diff>

<commit_message>
20210805 1740 update to files from tlw8748253.
</commit_message>
<xml_diff>
--- a/docs/Project 0.pptx
+++ b/docs/Project 0.pptx
@@ -140,7 +140,7 @@
           <p:cNvPr id="2" name="Title 1">
             <a:extLst>
               <a:ext uri="{FF2B5EF4-FFF2-40B4-BE49-F238E27FC236}">
-                <a16:creationId xmlns:a16="http://schemas.microsoft.com/office/drawing/2014/main" xmlns="" id="{67106D7E-D400-44F1-9A1A-D68CE501C73D}"/>
+                <a16:creationId xmlns="" xmlns:a16="http://schemas.microsoft.com/office/drawing/2014/main" id="{67106D7E-D400-44F1-9A1A-D68CE501C73D}"/>
               </a:ext>
             </a:extLst>
           </p:cNvPr>
@@ -177,7 +177,7 @@
           <p:cNvPr id="3" name="Subtitle 2">
             <a:extLst>
               <a:ext uri="{FF2B5EF4-FFF2-40B4-BE49-F238E27FC236}">
-                <a16:creationId xmlns:a16="http://schemas.microsoft.com/office/drawing/2014/main" xmlns="" id="{A5FDE527-E621-4639-A0C7-E1E9B0DFBCEC}"/>
+                <a16:creationId xmlns="" xmlns:a16="http://schemas.microsoft.com/office/drawing/2014/main" id="{A5FDE527-E621-4639-A0C7-E1E9B0DFBCEC}"/>
               </a:ext>
             </a:extLst>
           </p:cNvPr>
@@ -247,7 +247,7 @@
           <p:cNvPr id="4" name="Date Placeholder 3">
             <a:extLst>
               <a:ext uri="{FF2B5EF4-FFF2-40B4-BE49-F238E27FC236}">
-                <a16:creationId xmlns:a16="http://schemas.microsoft.com/office/drawing/2014/main" xmlns="" id="{E109CE88-B989-4109-89C8-36F7C245DB1C}"/>
+                <a16:creationId xmlns="" xmlns:a16="http://schemas.microsoft.com/office/drawing/2014/main" id="{E109CE88-B989-4109-89C8-36F7C245DB1C}"/>
               </a:ext>
             </a:extLst>
           </p:cNvPr>
@@ -265,7 +265,7 @@
           <a:p>
             <a:fld id="{6C733091-19F0-4DD7-90FE-000B4789B4CF}" type="datetimeFigureOut">
               <a:rPr lang="en-US" smtClean="0"/>
-              <a:t>8/4/2021</a:t>
+              <a:t>8/5/2021</a:t>
             </a:fld>
             <a:endParaRPr lang="en-US"/>
           </a:p>
@@ -276,7 +276,7 @@
           <p:cNvPr id="5" name="Footer Placeholder 4">
             <a:extLst>
               <a:ext uri="{FF2B5EF4-FFF2-40B4-BE49-F238E27FC236}">
-                <a16:creationId xmlns:a16="http://schemas.microsoft.com/office/drawing/2014/main" xmlns="" id="{0841498F-B991-43D3-B408-CC35D8EFCF37}"/>
+                <a16:creationId xmlns="" xmlns:a16="http://schemas.microsoft.com/office/drawing/2014/main" id="{0841498F-B991-43D3-B408-CC35D8EFCF37}"/>
               </a:ext>
             </a:extLst>
           </p:cNvPr>
@@ -301,7 +301,7 @@
           <p:cNvPr id="6" name="Slide Number Placeholder 5">
             <a:extLst>
               <a:ext uri="{FF2B5EF4-FFF2-40B4-BE49-F238E27FC236}">
-                <a16:creationId xmlns:a16="http://schemas.microsoft.com/office/drawing/2014/main" xmlns="" id="{01754CB8-17B1-45A0-AE7D-755EAA1B69D8}"/>
+                <a16:creationId xmlns="" xmlns:a16="http://schemas.microsoft.com/office/drawing/2014/main" id="{01754CB8-17B1-45A0-AE7D-755EAA1B69D8}"/>
               </a:ext>
             </a:extLst>
           </p:cNvPr>
@@ -360,7 +360,7 @@
           <p:cNvPr id="2" name="Title 1">
             <a:extLst>
               <a:ext uri="{FF2B5EF4-FFF2-40B4-BE49-F238E27FC236}">
-                <a16:creationId xmlns:a16="http://schemas.microsoft.com/office/drawing/2014/main" xmlns="" id="{E7A7B055-5DC2-440D-83C1-CAAE8E9A8E14}"/>
+                <a16:creationId xmlns="" xmlns:a16="http://schemas.microsoft.com/office/drawing/2014/main" id="{E7A7B055-5DC2-440D-83C1-CAAE8E9A8E14}"/>
               </a:ext>
             </a:extLst>
           </p:cNvPr>
@@ -388,7 +388,7 @@
           <p:cNvPr id="3" name="Vertical Text Placeholder 2">
             <a:extLst>
               <a:ext uri="{FF2B5EF4-FFF2-40B4-BE49-F238E27FC236}">
-                <a16:creationId xmlns:a16="http://schemas.microsoft.com/office/drawing/2014/main" xmlns="" id="{65710707-423D-4F9D-A49D-6C764C562553}"/>
+                <a16:creationId xmlns="" xmlns:a16="http://schemas.microsoft.com/office/drawing/2014/main" id="{65710707-423D-4F9D-A49D-6C764C562553}"/>
               </a:ext>
             </a:extLst>
           </p:cNvPr>
@@ -445,7 +445,7 @@
           <p:cNvPr id="4" name="Date Placeholder 3">
             <a:extLst>
               <a:ext uri="{FF2B5EF4-FFF2-40B4-BE49-F238E27FC236}">
-                <a16:creationId xmlns:a16="http://schemas.microsoft.com/office/drawing/2014/main" xmlns="" id="{98B6F7EF-D1BE-4437-85F3-99626E37E4EF}"/>
+                <a16:creationId xmlns="" xmlns:a16="http://schemas.microsoft.com/office/drawing/2014/main" id="{98B6F7EF-D1BE-4437-85F3-99626E37E4EF}"/>
               </a:ext>
             </a:extLst>
           </p:cNvPr>
@@ -463,7 +463,7 @@
           <a:p>
             <a:fld id="{6C733091-19F0-4DD7-90FE-000B4789B4CF}" type="datetimeFigureOut">
               <a:rPr lang="en-US" smtClean="0"/>
-              <a:t>8/4/2021</a:t>
+              <a:t>8/5/2021</a:t>
             </a:fld>
             <a:endParaRPr lang="en-US"/>
           </a:p>
@@ -474,7 +474,7 @@
           <p:cNvPr id="5" name="Footer Placeholder 4">
             <a:extLst>
               <a:ext uri="{FF2B5EF4-FFF2-40B4-BE49-F238E27FC236}">
-                <a16:creationId xmlns:a16="http://schemas.microsoft.com/office/drawing/2014/main" xmlns="" id="{D890AA9B-E479-4209-B245-83608F3D4013}"/>
+                <a16:creationId xmlns="" xmlns:a16="http://schemas.microsoft.com/office/drawing/2014/main" id="{D890AA9B-E479-4209-B245-83608F3D4013}"/>
               </a:ext>
             </a:extLst>
           </p:cNvPr>
@@ -499,7 +499,7 @@
           <p:cNvPr id="6" name="Slide Number Placeholder 5">
             <a:extLst>
               <a:ext uri="{FF2B5EF4-FFF2-40B4-BE49-F238E27FC236}">
-                <a16:creationId xmlns:a16="http://schemas.microsoft.com/office/drawing/2014/main" xmlns="" id="{0E4976E4-E15A-4296-A430-633D2BB9142B}"/>
+                <a16:creationId xmlns="" xmlns:a16="http://schemas.microsoft.com/office/drawing/2014/main" id="{0E4976E4-E15A-4296-A430-633D2BB9142B}"/>
               </a:ext>
             </a:extLst>
           </p:cNvPr>
@@ -558,7 +558,7 @@
           <p:cNvPr id="2" name="Vertical Title 1">
             <a:extLst>
               <a:ext uri="{FF2B5EF4-FFF2-40B4-BE49-F238E27FC236}">
-                <a16:creationId xmlns:a16="http://schemas.microsoft.com/office/drawing/2014/main" xmlns="" id="{66F63CF5-8DEE-4BB2-A2A5-5C16FEBE1AD5}"/>
+                <a16:creationId xmlns="" xmlns:a16="http://schemas.microsoft.com/office/drawing/2014/main" id="{66F63CF5-8DEE-4BB2-A2A5-5C16FEBE1AD5}"/>
               </a:ext>
             </a:extLst>
           </p:cNvPr>
@@ -591,7 +591,7 @@
           <p:cNvPr id="3" name="Vertical Text Placeholder 2">
             <a:extLst>
               <a:ext uri="{FF2B5EF4-FFF2-40B4-BE49-F238E27FC236}">
-                <a16:creationId xmlns:a16="http://schemas.microsoft.com/office/drawing/2014/main" xmlns="" id="{E0D5EBA5-94AF-4373-B032-A40FF73C7575}"/>
+                <a16:creationId xmlns="" xmlns:a16="http://schemas.microsoft.com/office/drawing/2014/main" id="{E0D5EBA5-94AF-4373-B032-A40FF73C7575}"/>
               </a:ext>
             </a:extLst>
           </p:cNvPr>
@@ -653,7 +653,7 @@
           <p:cNvPr id="4" name="Date Placeholder 3">
             <a:extLst>
               <a:ext uri="{FF2B5EF4-FFF2-40B4-BE49-F238E27FC236}">
-                <a16:creationId xmlns:a16="http://schemas.microsoft.com/office/drawing/2014/main" xmlns="" id="{7426B8E1-6758-4F5E-B618-96641332600B}"/>
+                <a16:creationId xmlns="" xmlns:a16="http://schemas.microsoft.com/office/drawing/2014/main" id="{7426B8E1-6758-4F5E-B618-96641332600B}"/>
               </a:ext>
             </a:extLst>
           </p:cNvPr>
@@ -671,7 +671,7 @@
           <a:p>
             <a:fld id="{6C733091-19F0-4DD7-90FE-000B4789B4CF}" type="datetimeFigureOut">
               <a:rPr lang="en-US" smtClean="0"/>
-              <a:t>8/4/2021</a:t>
+              <a:t>8/5/2021</a:t>
             </a:fld>
             <a:endParaRPr lang="en-US"/>
           </a:p>
@@ -682,7 +682,7 @@
           <p:cNvPr id="5" name="Footer Placeholder 4">
             <a:extLst>
               <a:ext uri="{FF2B5EF4-FFF2-40B4-BE49-F238E27FC236}">
-                <a16:creationId xmlns:a16="http://schemas.microsoft.com/office/drawing/2014/main" xmlns="" id="{F65E330E-2A7E-482D-AE0F-70EA5A29958B}"/>
+                <a16:creationId xmlns="" xmlns:a16="http://schemas.microsoft.com/office/drawing/2014/main" id="{F65E330E-2A7E-482D-AE0F-70EA5A29958B}"/>
               </a:ext>
             </a:extLst>
           </p:cNvPr>
@@ -707,7 +707,7 @@
           <p:cNvPr id="6" name="Slide Number Placeholder 5">
             <a:extLst>
               <a:ext uri="{FF2B5EF4-FFF2-40B4-BE49-F238E27FC236}">
-                <a16:creationId xmlns:a16="http://schemas.microsoft.com/office/drawing/2014/main" xmlns="" id="{B8000005-FC38-4A6C-9D09-7945EFA08160}"/>
+                <a16:creationId xmlns="" xmlns:a16="http://schemas.microsoft.com/office/drawing/2014/main" id="{B8000005-FC38-4A6C-9D09-7945EFA08160}"/>
               </a:ext>
             </a:extLst>
           </p:cNvPr>
@@ -766,7 +766,7 @@
           <p:cNvPr id="2" name="Title 1">
             <a:extLst>
               <a:ext uri="{FF2B5EF4-FFF2-40B4-BE49-F238E27FC236}">
-                <a16:creationId xmlns:a16="http://schemas.microsoft.com/office/drawing/2014/main" xmlns="" id="{91D0002C-766B-44B4-A24C-BE6DE6C7BA4C}"/>
+                <a16:creationId xmlns="" xmlns:a16="http://schemas.microsoft.com/office/drawing/2014/main" id="{91D0002C-766B-44B4-A24C-BE6DE6C7BA4C}"/>
               </a:ext>
             </a:extLst>
           </p:cNvPr>
@@ -794,7 +794,7 @@
           <p:cNvPr id="3" name="Content Placeholder 2">
             <a:extLst>
               <a:ext uri="{FF2B5EF4-FFF2-40B4-BE49-F238E27FC236}">
-                <a16:creationId xmlns:a16="http://schemas.microsoft.com/office/drawing/2014/main" xmlns="" id="{3455BAA9-6C7B-4874-AD76-BD466F64802D}"/>
+                <a16:creationId xmlns="" xmlns:a16="http://schemas.microsoft.com/office/drawing/2014/main" id="{3455BAA9-6C7B-4874-AD76-BD466F64802D}"/>
               </a:ext>
             </a:extLst>
           </p:cNvPr>
@@ -851,7 +851,7 @@
           <p:cNvPr id="4" name="Date Placeholder 3">
             <a:extLst>
               <a:ext uri="{FF2B5EF4-FFF2-40B4-BE49-F238E27FC236}">
-                <a16:creationId xmlns:a16="http://schemas.microsoft.com/office/drawing/2014/main" xmlns="" id="{8776BDAF-D8F2-4A61-904D-094BB4545702}"/>
+                <a16:creationId xmlns="" xmlns:a16="http://schemas.microsoft.com/office/drawing/2014/main" id="{8776BDAF-D8F2-4A61-904D-094BB4545702}"/>
               </a:ext>
             </a:extLst>
           </p:cNvPr>
@@ -869,7 +869,7 @@
           <a:p>
             <a:fld id="{6C733091-19F0-4DD7-90FE-000B4789B4CF}" type="datetimeFigureOut">
               <a:rPr lang="en-US" smtClean="0"/>
-              <a:t>8/4/2021</a:t>
+              <a:t>8/5/2021</a:t>
             </a:fld>
             <a:endParaRPr lang="en-US"/>
           </a:p>
@@ -880,7 +880,7 @@
           <p:cNvPr id="5" name="Footer Placeholder 4">
             <a:extLst>
               <a:ext uri="{FF2B5EF4-FFF2-40B4-BE49-F238E27FC236}">
-                <a16:creationId xmlns:a16="http://schemas.microsoft.com/office/drawing/2014/main" xmlns="" id="{F89C5665-4384-4706-9BD2-9F42B05C96BC}"/>
+                <a16:creationId xmlns="" xmlns:a16="http://schemas.microsoft.com/office/drawing/2014/main" id="{F89C5665-4384-4706-9BD2-9F42B05C96BC}"/>
               </a:ext>
             </a:extLst>
           </p:cNvPr>
@@ -905,7 +905,7 @@
           <p:cNvPr id="6" name="Slide Number Placeholder 5">
             <a:extLst>
               <a:ext uri="{FF2B5EF4-FFF2-40B4-BE49-F238E27FC236}">
-                <a16:creationId xmlns:a16="http://schemas.microsoft.com/office/drawing/2014/main" xmlns="" id="{7DCAD73E-CAB3-4BA7-905E-D203691D0418}"/>
+                <a16:creationId xmlns="" xmlns:a16="http://schemas.microsoft.com/office/drawing/2014/main" id="{7DCAD73E-CAB3-4BA7-905E-D203691D0418}"/>
               </a:ext>
             </a:extLst>
           </p:cNvPr>
@@ -964,7 +964,7 @@
           <p:cNvPr id="2" name="Title 1">
             <a:extLst>
               <a:ext uri="{FF2B5EF4-FFF2-40B4-BE49-F238E27FC236}">
-                <a16:creationId xmlns:a16="http://schemas.microsoft.com/office/drawing/2014/main" xmlns="" id="{A9880706-F7FA-4EC3-A022-9D6C7CEC3692}"/>
+                <a16:creationId xmlns="" xmlns:a16="http://schemas.microsoft.com/office/drawing/2014/main" id="{A9880706-F7FA-4EC3-A022-9D6C7CEC3692}"/>
               </a:ext>
             </a:extLst>
           </p:cNvPr>
@@ -1001,7 +1001,7 @@
           <p:cNvPr id="3" name="Text Placeholder 2">
             <a:extLst>
               <a:ext uri="{FF2B5EF4-FFF2-40B4-BE49-F238E27FC236}">
-                <a16:creationId xmlns:a16="http://schemas.microsoft.com/office/drawing/2014/main" xmlns="" id="{FA8A65D0-3DF5-448D-82EC-A967682A0DED}"/>
+                <a16:creationId xmlns="" xmlns:a16="http://schemas.microsoft.com/office/drawing/2014/main" id="{FA8A65D0-3DF5-448D-82EC-A967682A0DED}"/>
               </a:ext>
             </a:extLst>
           </p:cNvPr>
@@ -1126,7 +1126,7 @@
           <p:cNvPr id="4" name="Date Placeholder 3">
             <a:extLst>
               <a:ext uri="{FF2B5EF4-FFF2-40B4-BE49-F238E27FC236}">
-                <a16:creationId xmlns:a16="http://schemas.microsoft.com/office/drawing/2014/main" xmlns="" id="{600EA68C-01A6-487D-9D6E-1D1B4EAC0440}"/>
+                <a16:creationId xmlns="" xmlns:a16="http://schemas.microsoft.com/office/drawing/2014/main" id="{600EA68C-01A6-487D-9D6E-1D1B4EAC0440}"/>
               </a:ext>
             </a:extLst>
           </p:cNvPr>
@@ -1144,7 +1144,7 @@
           <a:p>
             <a:fld id="{6C733091-19F0-4DD7-90FE-000B4789B4CF}" type="datetimeFigureOut">
               <a:rPr lang="en-US" smtClean="0"/>
-              <a:t>8/4/2021</a:t>
+              <a:t>8/5/2021</a:t>
             </a:fld>
             <a:endParaRPr lang="en-US"/>
           </a:p>
@@ -1155,7 +1155,7 @@
           <p:cNvPr id="5" name="Footer Placeholder 4">
             <a:extLst>
               <a:ext uri="{FF2B5EF4-FFF2-40B4-BE49-F238E27FC236}">
-                <a16:creationId xmlns:a16="http://schemas.microsoft.com/office/drawing/2014/main" xmlns="" id="{6E6527CB-4FFD-4569-A82C-5EDC311B2CF6}"/>
+                <a16:creationId xmlns="" xmlns:a16="http://schemas.microsoft.com/office/drawing/2014/main" id="{6E6527CB-4FFD-4569-A82C-5EDC311B2CF6}"/>
               </a:ext>
             </a:extLst>
           </p:cNvPr>
@@ -1180,7 +1180,7 @@
           <p:cNvPr id="6" name="Slide Number Placeholder 5">
             <a:extLst>
               <a:ext uri="{FF2B5EF4-FFF2-40B4-BE49-F238E27FC236}">
-                <a16:creationId xmlns:a16="http://schemas.microsoft.com/office/drawing/2014/main" xmlns="" id="{24B19E5B-5A98-4381-A01D-01F81FD65792}"/>
+                <a16:creationId xmlns="" xmlns:a16="http://schemas.microsoft.com/office/drawing/2014/main" id="{24B19E5B-5A98-4381-A01D-01F81FD65792}"/>
               </a:ext>
             </a:extLst>
           </p:cNvPr>
@@ -1239,7 +1239,7 @@
           <p:cNvPr id="2" name="Title 1">
             <a:extLst>
               <a:ext uri="{FF2B5EF4-FFF2-40B4-BE49-F238E27FC236}">
-                <a16:creationId xmlns:a16="http://schemas.microsoft.com/office/drawing/2014/main" xmlns="" id="{63228B71-E923-4431-B8D2-FAE724678940}"/>
+                <a16:creationId xmlns="" xmlns:a16="http://schemas.microsoft.com/office/drawing/2014/main" id="{63228B71-E923-4431-B8D2-FAE724678940}"/>
               </a:ext>
             </a:extLst>
           </p:cNvPr>
@@ -1267,7 +1267,7 @@
           <p:cNvPr id="3" name="Content Placeholder 2">
             <a:extLst>
               <a:ext uri="{FF2B5EF4-FFF2-40B4-BE49-F238E27FC236}">
-                <a16:creationId xmlns:a16="http://schemas.microsoft.com/office/drawing/2014/main" xmlns="" id="{B18895E9-B7FF-4A00-955B-206CF8C73E43}"/>
+                <a16:creationId xmlns="" xmlns:a16="http://schemas.microsoft.com/office/drawing/2014/main" id="{B18895E9-B7FF-4A00-955B-206CF8C73E43}"/>
               </a:ext>
             </a:extLst>
           </p:cNvPr>
@@ -1329,7 +1329,7 @@
           <p:cNvPr id="4" name="Content Placeholder 3">
             <a:extLst>
               <a:ext uri="{FF2B5EF4-FFF2-40B4-BE49-F238E27FC236}">
-                <a16:creationId xmlns:a16="http://schemas.microsoft.com/office/drawing/2014/main" xmlns="" id="{DA813955-E3B9-44BC-8E1D-139269C8B48A}"/>
+                <a16:creationId xmlns="" xmlns:a16="http://schemas.microsoft.com/office/drawing/2014/main" id="{DA813955-E3B9-44BC-8E1D-139269C8B48A}"/>
               </a:ext>
             </a:extLst>
           </p:cNvPr>
@@ -1391,7 +1391,7 @@
           <p:cNvPr id="5" name="Date Placeholder 4">
             <a:extLst>
               <a:ext uri="{FF2B5EF4-FFF2-40B4-BE49-F238E27FC236}">
-                <a16:creationId xmlns:a16="http://schemas.microsoft.com/office/drawing/2014/main" xmlns="" id="{7E9B8EF5-28D5-4C4E-A2AB-EEA30D75DAFE}"/>
+                <a16:creationId xmlns="" xmlns:a16="http://schemas.microsoft.com/office/drawing/2014/main" id="{7E9B8EF5-28D5-4C4E-A2AB-EEA30D75DAFE}"/>
               </a:ext>
             </a:extLst>
           </p:cNvPr>
@@ -1409,7 +1409,7 @@
           <a:p>
             <a:fld id="{6C733091-19F0-4DD7-90FE-000B4789B4CF}" type="datetimeFigureOut">
               <a:rPr lang="en-US" smtClean="0"/>
-              <a:t>8/4/2021</a:t>
+              <a:t>8/5/2021</a:t>
             </a:fld>
             <a:endParaRPr lang="en-US"/>
           </a:p>
@@ -1420,7 +1420,7 @@
           <p:cNvPr id="6" name="Footer Placeholder 5">
             <a:extLst>
               <a:ext uri="{FF2B5EF4-FFF2-40B4-BE49-F238E27FC236}">
-                <a16:creationId xmlns:a16="http://schemas.microsoft.com/office/drawing/2014/main" xmlns="" id="{5723E678-8CB4-4335-AA04-6BD391748717}"/>
+                <a16:creationId xmlns="" xmlns:a16="http://schemas.microsoft.com/office/drawing/2014/main" id="{5723E678-8CB4-4335-AA04-6BD391748717}"/>
               </a:ext>
             </a:extLst>
           </p:cNvPr>
@@ -1445,7 +1445,7 @@
           <p:cNvPr id="7" name="Slide Number Placeholder 6">
             <a:extLst>
               <a:ext uri="{FF2B5EF4-FFF2-40B4-BE49-F238E27FC236}">
-                <a16:creationId xmlns:a16="http://schemas.microsoft.com/office/drawing/2014/main" xmlns="" id="{887B5567-9F4D-4AE1-92D8-769C9F7EA4F0}"/>
+                <a16:creationId xmlns="" xmlns:a16="http://schemas.microsoft.com/office/drawing/2014/main" id="{887B5567-9F4D-4AE1-92D8-769C9F7EA4F0}"/>
               </a:ext>
             </a:extLst>
           </p:cNvPr>
@@ -1504,7 +1504,7 @@
           <p:cNvPr id="2" name="Title 1">
             <a:extLst>
               <a:ext uri="{FF2B5EF4-FFF2-40B4-BE49-F238E27FC236}">
-                <a16:creationId xmlns:a16="http://schemas.microsoft.com/office/drawing/2014/main" xmlns="" id="{A40320A9-7C0C-45B4-BF2B-3B53B5686EBB}"/>
+                <a16:creationId xmlns="" xmlns:a16="http://schemas.microsoft.com/office/drawing/2014/main" id="{A40320A9-7C0C-45B4-BF2B-3B53B5686EBB}"/>
               </a:ext>
             </a:extLst>
           </p:cNvPr>
@@ -1537,7 +1537,7 @@
           <p:cNvPr id="3" name="Text Placeholder 2">
             <a:extLst>
               <a:ext uri="{FF2B5EF4-FFF2-40B4-BE49-F238E27FC236}">
-                <a16:creationId xmlns:a16="http://schemas.microsoft.com/office/drawing/2014/main" xmlns="" id="{8C440DE1-7DD6-4B1C-B961-CD2079B51F03}"/>
+                <a16:creationId xmlns="" xmlns:a16="http://schemas.microsoft.com/office/drawing/2014/main" id="{8C440DE1-7DD6-4B1C-B961-CD2079B51F03}"/>
               </a:ext>
             </a:extLst>
           </p:cNvPr>
@@ -1608,7 +1608,7 @@
           <p:cNvPr id="4" name="Content Placeholder 3">
             <a:extLst>
               <a:ext uri="{FF2B5EF4-FFF2-40B4-BE49-F238E27FC236}">
-                <a16:creationId xmlns:a16="http://schemas.microsoft.com/office/drawing/2014/main" xmlns="" id="{6FAFE840-CC9A-4D89-B05F-159EF756B427}"/>
+                <a16:creationId xmlns="" xmlns:a16="http://schemas.microsoft.com/office/drawing/2014/main" id="{6FAFE840-CC9A-4D89-B05F-159EF756B427}"/>
               </a:ext>
             </a:extLst>
           </p:cNvPr>
@@ -1670,7 +1670,7 @@
           <p:cNvPr id="5" name="Text Placeholder 4">
             <a:extLst>
               <a:ext uri="{FF2B5EF4-FFF2-40B4-BE49-F238E27FC236}">
-                <a16:creationId xmlns:a16="http://schemas.microsoft.com/office/drawing/2014/main" xmlns="" id="{4B87AADC-3401-48C6-98F6-0AB60F6DF9BE}"/>
+                <a16:creationId xmlns="" xmlns:a16="http://schemas.microsoft.com/office/drawing/2014/main" id="{4B87AADC-3401-48C6-98F6-0AB60F6DF9BE}"/>
               </a:ext>
             </a:extLst>
           </p:cNvPr>
@@ -1741,7 +1741,7 @@
           <p:cNvPr id="6" name="Content Placeholder 5">
             <a:extLst>
               <a:ext uri="{FF2B5EF4-FFF2-40B4-BE49-F238E27FC236}">
-                <a16:creationId xmlns:a16="http://schemas.microsoft.com/office/drawing/2014/main" xmlns="" id="{34BCF1A4-FB52-4DCD-80BC-324BA41C33CD}"/>
+                <a16:creationId xmlns="" xmlns:a16="http://schemas.microsoft.com/office/drawing/2014/main" id="{34BCF1A4-FB52-4DCD-80BC-324BA41C33CD}"/>
               </a:ext>
             </a:extLst>
           </p:cNvPr>
@@ -1803,7 +1803,7 @@
           <p:cNvPr id="7" name="Date Placeholder 6">
             <a:extLst>
               <a:ext uri="{FF2B5EF4-FFF2-40B4-BE49-F238E27FC236}">
-                <a16:creationId xmlns:a16="http://schemas.microsoft.com/office/drawing/2014/main" xmlns="" id="{8CFD4208-60E7-48B1-8CD0-717D5E26B827}"/>
+                <a16:creationId xmlns="" xmlns:a16="http://schemas.microsoft.com/office/drawing/2014/main" id="{8CFD4208-60E7-48B1-8CD0-717D5E26B827}"/>
               </a:ext>
             </a:extLst>
           </p:cNvPr>
@@ -1821,7 +1821,7 @@
           <a:p>
             <a:fld id="{6C733091-19F0-4DD7-90FE-000B4789B4CF}" type="datetimeFigureOut">
               <a:rPr lang="en-US" smtClean="0"/>
-              <a:t>8/4/2021</a:t>
+              <a:t>8/5/2021</a:t>
             </a:fld>
             <a:endParaRPr lang="en-US"/>
           </a:p>
@@ -1832,7 +1832,7 @@
           <p:cNvPr id="8" name="Footer Placeholder 7">
             <a:extLst>
               <a:ext uri="{FF2B5EF4-FFF2-40B4-BE49-F238E27FC236}">
-                <a16:creationId xmlns:a16="http://schemas.microsoft.com/office/drawing/2014/main" xmlns="" id="{94E429D1-BEB1-4D8A-91F2-CD4F80157F8D}"/>
+                <a16:creationId xmlns="" xmlns:a16="http://schemas.microsoft.com/office/drawing/2014/main" id="{94E429D1-BEB1-4D8A-91F2-CD4F80157F8D}"/>
               </a:ext>
             </a:extLst>
           </p:cNvPr>
@@ -1857,7 +1857,7 @@
           <p:cNvPr id="9" name="Slide Number Placeholder 8">
             <a:extLst>
               <a:ext uri="{FF2B5EF4-FFF2-40B4-BE49-F238E27FC236}">
-                <a16:creationId xmlns:a16="http://schemas.microsoft.com/office/drawing/2014/main" xmlns="" id="{6F17C19C-8370-4118-A8FC-5DDA6F84230F}"/>
+                <a16:creationId xmlns="" xmlns:a16="http://schemas.microsoft.com/office/drawing/2014/main" id="{6F17C19C-8370-4118-A8FC-5DDA6F84230F}"/>
               </a:ext>
             </a:extLst>
           </p:cNvPr>
@@ -1916,7 +1916,7 @@
           <p:cNvPr id="2" name="Title 1">
             <a:extLst>
               <a:ext uri="{FF2B5EF4-FFF2-40B4-BE49-F238E27FC236}">
-                <a16:creationId xmlns:a16="http://schemas.microsoft.com/office/drawing/2014/main" xmlns="" id="{252CBF36-7F99-45A9-BC35-BD2EC260CBF0}"/>
+                <a16:creationId xmlns="" xmlns:a16="http://schemas.microsoft.com/office/drawing/2014/main" id="{252CBF36-7F99-45A9-BC35-BD2EC260CBF0}"/>
               </a:ext>
             </a:extLst>
           </p:cNvPr>
@@ -1944,7 +1944,7 @@
           <p:cNvPr id="3" name="Date Placeholder 2">
             <a:extLst>
               <a:ext uri="{FF2B5EF4-FFF2-40B4-BE49-F238E27FC236}">
-                <a16:creationId xmlns:a16="http://schemas.microsoft.com/office/drawing/2014/main" xmlns="" id="{0D6F5F83-F07E-4501-B86B-9F96CD43993C}"/>
+                <a16:creationId xmlns="" xmlns:a16="http://schemas.microsoft.com/office/drawing/2014/main" id="{0D6F5F83-F07E-4501-B86B-9F96CD43993C}"/>
               </a:ext>
             </a:extLst>
           </p:cNvPr>
@@ -1962,7 +1962,7 @@
           <a:p>
             <a:fld id="{6C733091-19F0-4DD7-90FE-000B4789B4CF}" type="datetimeFigureOut">
               <a:rPr lang="en-US" smtClean="0"/>
-              <a:t>8/4/2021</a:t>
+              <a:t>8/5/2021</a:t>
             </a:fld>
             <a:endParaRPr lang="en-US"/>
           </a:p>
@@ -1973,7 +1973,7 @@
           <p:cNvPr id="4" name="Footer Placeholder 3">
             <a:extLst>
               <a:ext uri="{FF2B5EF4-FFF2-40B4-BE49-F238E27FC236}">
-                <a16:creationId xmlns:a16="http://schemas.microsoft.com/office/drawing/2014/main" xmlns="" id="{2861989B-F8E9-41FD-8E16-687424BCC266}"/>
+                <a16:creationId xmlns="" xmlns:a16="http://schemas.microsoft.com/office/drawing/2014/main" id="{2861989B-F8E9-41FD-8E16-687424BCC266}"/>
               </a:ext>
             </a:extLst>
           </p:cNvPr>
@@ -1998,7 +1998,7 @@
           <p:cNvPr id="5" name="Slide Number Placeholder 4">
             <a:extLst>
               <a:ext uri="{FF2B5EF4-FFF2-40B4-BE49-F238E27FC236}">
-                <a16:creationId xmlns:a16="http://schemas.microsoft.com/office/drawing/2014/main" xmlns="" id="{2026B6D7-7832-4815-95CE-5CEC39502825}"/>
+                <a16:creationId xmlns="" xmlns:a16="http://schemas.microsoft.com/office/drawing/2014/main" id="{2026B6D7-7832-4815-95CE-5CEC39502825}"/>
               </a:ext>
             </a:extLst>
           </p:cNvPr>
@@ -2057,7 +2057,7 @@
           <p:cNvPr id="2" name="Date Placeholder 1">
             <a:extLst>
               <a:ext uri="{FF2B5EF4-FFF2-40B4-BE49-F238E27FC236}">
-                <a16:creationId xmlns:a16="http://schemas.microsoft.com/office/drawing/2014/main" xmlns="" id="{9877919A-C4B6-46FD-A08A-9A4B867FE01A}"/>
+                <a16:creationId xmlns="" xmlns:a16="http://schemas.microsoft.com/office/drawing/2014/main" id="{9877919A-C4B6-46FD-A08A-9A4B867FE01A}"/>
               </a:ext>
             </a:extLst>
           </p:cNvPr>
@@ -2075,7 +2075,7 @@
           <a:p>
             <a:fld id="{6C733091-19F0-4DD7-90FE-000B4789B4CF}" type="datetimeFigureOut">
               <a:rPr lang="en-US" smtClean="0"/>
-              <a:t>8/4/2021</a:t>
+              <a:t>8/5/2021</a:t>
             </a:fld>
             <a:endParaRPr lang="en-US"/>
           </a:p>
@@ -2086,7 +2086,7 @@
           <p:cNvPr id="3" name="Footer Placeholder 2">
             <a:extLst>
               <a:ext uri="{FF2B5EF4-FFF2-40B4-BE49-F238E27FC236}">
-                <a16:creationId xmlns:a16="http://schemas.microsoft.com/office/drawing/2014/main" xmlns="" id="{9118539E-383C-4F1C-86F2-14C533A7E9FB}"/>
+                <a16:creationId xmlns="" xmlns:a16="http://schemas.microsoft.com/office/drawing/2014/main" id="{9118539E-383C-4F1C-86F2-14C533A7E9FB}"/>
               </a:ext>
             </a:extLst>
           </p:cNvPr>
@@ -2111,7 +2111,7 @@
           <p:cNvPr id="4" name="Slide Number Placeholder 3">
             <a:extLst>
               <a:ext uri="{FF2B5EF4-FFF2-40B4-BE49-F238E27FC236}">
-                <a16:creationId xmlns:a16="http://schemas.microsoft.com/office/drawing/2014/main" xmlns="" id="{C9A6D4E1-CA83-4214-9942-9E4617AA89BF}"/>
+                <a16:creationId xmlns="" xmlns:a16="http://schemas.microsoft.com/office/drawing/2014/main" id="{C9A6D4E1-CA83-4214-9942-9E4617AA89BF}"/>
               </a:ext>
             </a:extLst>
           </p:cNvPr>
@@ -2170,7 +2170,7 @@
           <p:cNvPr id="2" name="Title 1">
             <a:extLst>
               <a:ext uri="{FF2B5EF4-FFF2-40B4-BE49-F238E27FC236}">
-                <a16:creationId xmlns:a16="http://schemas.microsoft.com/office/drawing/2014/main" xmlns="" id="{046EF9B5-7A2A-4225-8817-86D028D6950C}"/>
+                <a16:creationId xmlns="" xmlns:a16="http://schemas.microsoft.com/office/drawing/2014/main" id="{046EF9B5-7A2A-4225-8817-86D028D6950C}"/>
               </a:ext>
             </a:extLst>
           </p:cNvPr>
@@ -2207,7 +2207,7 @@
           <p:cNvPr id="3" name="Content Placeholder 2">
             <a:extLst>
               <a:ext uri="{FF2B5EF4-FFF2-40B4-BE49-F238E27FC236}">
-                <a16:creationId xmlns:a16="http://schemas.microsoft.com/office/drawing/2014/main" xmlns="" id="{8667C390-5297-41E8-A403-22856007B051}"/>
+                <a16:creationId xmlns="" xmlns:a16="http://schemas.microsoft.com/office/drawing/2014/main" id="{8667C390-5297-41E8-A403-22856007B051}"/>
               </a:ext>
             </a:extLst>
           </p:cNvPr>
@@ -2297,7 +2297,7 @@
           <p:cNvPr id="4" name="Text Placeholder 3">
             <a:extLst>
               <a:ext uri="{FF2B5EF4-FFF2-40B4-BE49-F238E27FC236}">
-                <a16:creationId xmlns:a16="http://schemas.microsoft.com/office/drawing/2014/main" xmlns="" id="{8D0D2F7D-D6CD-4AB1-A3EA-CBFD2A2B3703}"/>
+                <a16:creationId xmlns="" xmlns:a16="http://schemas.microsoft.com/office/drawing/2014/main" id="{8D0D2F7D-D6CD-4AB1-A3EA-CBFD2A2B3703}"/>
               </a:ext>
             </a:extLst>
           </p:cNvPr>
@@ -2368,7 +2368,7 @@
           <p:cNvPr id="5" name="Date Placeholder 4">
             <a:extLst>
               <a:ext uri="{FF2B5EF4-FFF2-40B4-BE49-F238E27FC236}">
-                <a16:creationId xmlns:a16="http://schemas.microsoft.com/office/drawing/2014/main" xmlns="" id="{E17A441D-4FA7-4110-BF24-165CD3C3DAD7}"/>
+                <a16:creationId xmlns="" xmlns:a16="http://schemas.microsoft.com/office/drawing/2014/main" id="{E17A441D-4FA7-4110-BF24-165CD3C3DAD7}"/>
               </a:ext>
             </a:extLst>
           </p:cNvPr>
@@ -2386,7 +2386,7 @@
           <a:p>
             <a:fld id="{6C733091-19F0-4DD7-90FE-000B4789B4CF}" type="datetimeFigureOut">
               <a:rPr lang="en-US" smtClean="0"/>
-              <a:t>8/4/2021</a:t>
+              <a:t>8/5/2021</a:t>
             </a:fld>
             <a:endParaRPr lang="en-US"/>
           </a:p>
@@ -2397,7 +2397,7 @@
           <p:cNvPr id="6" name="Footer Placeholder 5">
             <a:extLst>
               <a:ext uri="{FF2B5EF4-FFF2-40B4-BE49-F238E27FC236}">
-                <a16:creationId xmlns:a16="http://schemas.microsoft.com/office/drawing/2014/main" xmlns="" id="{346102C5-5AE3-43CF-A686-1AB72B0790AB}"/>
+                <a16:creationId xmlns="" xmlns:a16="http://schemas.microsoft.com/office/drawing/2014/main" id="{346102C5-5AE3-43CF-A686-1AB72B0790AB}"/>
               </a:ext>
             </a:extLst>
           </p:cNvPr>
@@ -2422,7 +2422,7 @@
           <p:cNvPr id="7" name="Slide Number Placeholder 6">
             <a:extLst>
               <a:ext uri="{FF2B5EF4-FFF2-40B4-BE49-F238E27FC236}">
-                <a16:creationId xmlns:a16="http://schemas.microsoft.com/office/drawing/2014/main" xmlns="" id="{5528B3F7-462C-4500-8836-B3E5CD8DA61A}"/>
+                <a16:creationId xmlns="" xmlns:a16="http://schemas.microsoft.com/office/drawing/2014/main" id="{5528B3F7-462C-4500-8836-B3E5CD8DA61A}"/>
               </a:ext>
             </a:extLst>
           </p:cNvPr>
@@ -2481,7 +2481,7 @@
           <p:cNvPr id="2" name="Title 1">
             <a:extLst>
               <a:ext uri="{FF2B5EF4-FFF2-40B4-BE49-F238E27FC236}">
-                <a16:creationId xmlns:a16="http://schemas.microsoft.com/office/drawing/2014/main" xmlns="" id="{4BA10E59-DA48-4690-A956-9EB8E4E11EE5}"/>
+                <a16:creationId xmlns="" xmlns:a16="http://schemas.microsoft.com/office/drawing/2014/main" id="{4BA10E59-DA48-4690-A956-9EB8E4E11EE5}"/>
               </a:ext>
             </a:extLst>
           </p:cNvPr>
@@ -2518,7 +2518,7 @@
           <p:cNvPr id="3" name="Picture Placeholder 2">
             <a:extLst>
               <a:ext uri="{FF2B5EF4-FFF2-40B4-BE49-F238E27FC236}">
-                <a16:creationId xmlns:a16="http://schemas.microsoft.com/office/drawing/2014/main" xmlns="" id="{AC7AFE1E-67D1-4106-97CA-98302D42CC4D}"/>
+                <a16:creationId xmlns="" xmlns:a16="http://schemas.microsoft.com/office/drawing/2014/main" id="{AC7AFE1E-67D1-4106-97CA-98302D42CC4D}"/>
               </a:ext>
             </a:extLst>
           </p:cNvPr>
@@ -2585,7 +2585,7 @@
           <p:cNvPr id="4" name="Text Placeholder 3">
             <a:extLst>
               <a:ext uri="{FF2B5EF4-FFF2-40B4-BE49-F238E27FC236}">
-                <a16:creationId xmlns:a16="http://schemas.microsoft.com/office/drawing/2014/main" xmlns="" id="{67D8D73B-3D4D-42A7-9A3C-1D508E8A9B45}"/>
+                <a16:creationId xmlns="" xmlns:a16="http://schemas.microsoft.com/office/drawing/2014/main" id="{67D8D73B-3D4D-42A7-9A3C-1D508E8A9B45}"/>
               </a:ext>
             </a:extLst>
           </p:cNvPr>
@@ -2656,7 +2656,7 @@
           <p:cNvPr id="5" name="Date Placeholder 4">
             <a:extLst>
               <a:ext uri="{FF2B5EF4-FFF2-40B4-BE49-F238E27FC236}">
-                <a16:creationId xmlns:a16="http://schemas.microsoft.com/office/drawing/2014/main" xmlns="" id="{48C8945E-A47A-42A2-9DF6-CA6D5002F65F}"/>
+                <a16:creationId xmlns="" xmlns:a16="http://schemas.microsoft.com/office/drawing/2014/main" id="{48C8945E-A47A-42A2-9DF6-CA6D5002F65F}"/>
               </a:ext>
             </a:extLst>
           </p:cNvPr>
@@ -2674,7 +2674,7 @@
           <a:p>
             <a:fld id="{6C733091-19F0-4DD7-90FE-000B4789B4CF}" type="datetimeFigureOut">
               <a:rPr lang="en-US" smtClean="0"/>
-              <a:t>8/4/2021</a:t>
+              <a:t>8/5/2021</a:t>
             </a:fld>
             <a:endParaRPr lang="en-US"/>
           </a:p>
@@ -2685,7 +2685,7 @@
           <p:cNvPr id="6" name="Footer Placeholder 5">
             <a:extLst>
               <a:ext uri="{FF2B5EF4-FFF2-40B4-BE49-F238E27FC236}">
-                <a16:creationId xmlns:a16="http://schemas.microsoft.com/office/drawing/2014/main" xmlns="" id="{EB000DB4-2747-4297-B400-42A539FBDB42}"/>
+                <a16:creationId xmlns="" xmlns:a16="http://schemas.microsoft.com/office/drawing/2014/main" id="{EB000DB4-2747-4297-B400-42A539FBDB42}"/>
               </a:ext>
             </a:extLst>
           </p:cNvPr>
@@ -2710,7 +2710,7 @@
           <p:cNvPr id="7" name="Slide Number Placeholder 6">
             <a:extLst>
               <a:ext uri="{FF2B5EF4-FFF2-40B4-BE49-F238E27FC236}">
-                <a16:creationId xmlns:a16="http://schemas.microsoft.com/office/drawing/2014/main" xmlns="" id="{5BAD9222-F141-4803-AF73-E2DD92E2ABBC}"/>
+                <a16:creationId xmlns="" xmlns:a16="http://schemas.microsoft.com/office/drawing/2014/main" id="{5BAD9222-F141-4803-AF73-E2DD92E2ABBC}"/>
               </a:ext>
             </a:extLst>
           </p:cNvPr>
@@ -2774,7 +2774,7 @@
           <p:cNvPr id="2" name="Title Placeholder 1">
             <a:extLst>
               <a:ext uri="{FF2B5EF4-FFF2-40B4-BE49-F238E27FC236}">
-                <a16:creationId xmlns:a16="http://schemas.microsoft.com/office/drawing/2014/main" xmlns="" id="{5BF9D404-795C-4EA4-AD01-26740519239C}"/>
+                <a16:creationId xmlns="" xmlns:a16="http://schemas.microsoft.com/office/drawing/2014/main" id="{5BF9D404-795C-4EA4-AD01-26740519239C}"/>
               </a:ext>
             </a:extLst>
           </p:cNvPr>
@@ -2812,7 +2812,7 @@
           <p:cNvPr id="3" name="Text Placeholder 2">
             <a:extLst>
               <a:ext uri="{FF2B5EF4-FFF2-40B4-BE49-F238E27FC236}">
-                <a16:creationId xmlns:a16="http://schemas.microsoft.com/office/drawing/2014/main" xmlns="" id="{DE3FEC7B-48F8-4348-9BC6-68F83B859EE9}"/>
+                <a16:creationId xmlns="" xmlns:a16="http://schemas.microsoft.com/office/drawing/2014/main" id="{DE3FEC7B-48F8-4348-9BC6-68F83B859EE9}"/>
               </a:ext>
             </a:extLst>
           </p:cNvPr>
@@ -2879,7 +2879,7 @@
           <p:cNvPr id="4" name="Date Placeholder 3">
             <a:extLst>
               <a:ext uri="{FF2B5EF4-FFF2-40B4-BE49-F238E27FC236}">
-                <a16:creationId xmlns:a16="http://schemas.microsoft.com/office/drawing/2014/main" xmlns="" id="{31CA1A1D-E2F5-4161-A025-7B911965C2FE}"/>
+                <a16:creationId xmlns="" xmlns:a16="http://schemas.microsoft.com/office/drawing/2014/main" id="{31CA1A1D-E2F5-4161-A025-7B911965C2FE}"/>
               </a:ext>
             </a:extLst>
           </p:cNvPr>
@@ -2915,7 +2915,7 @@
           <a:p>
             <a:fld id="{6C733091-19F0-4DD7-90FE-000B4789B4CF}" type="datetimeFigureOut">
               <a:rPr lang="en-US" smtClean="0"/>
-              <a:t>8/4/2021</a:t>
+              <a:t>8/5/2021</a:t>
             </a:fld>
             <a:endParaRPr lang="en-US"/>
           </a:p>
@@ -2926,7 +2926,7 @@
           <p:cNvPr id="5" name="Footer Placeholder 4">
             <a:extLst>
               <a:ext uri="{FF2B5EF4-FFF2-40B4-BE49-F238E27FC236}">
-                <a16:creationId xmlns:a16="http://schemas.microsoft.com/office/drawing/2014/main" xmlns="" id="{43C7B926-18F3-4C13-AB92-764E10D324FB}"/>
+                <a16:creationId xmlns="" xmlns:a16="http://schemas.microsoft.com/office/drawing/2014/main" id="{43C7B926-18F3-4C13-AB92-764E10D324FB}"/>
               </a:ext>
             </a:extLst>
           </p:cNvPr>
@@ -2969,7 +2969,7 @@
           <p:cNvPr id="6" name="Slide Number Placeholder 5">
             <a:extLst>
               <a:ext uri="{FF2B5EF4-FFF2-40B4-BE49-F238E27FC236}">
-                <a16:creationId xmlns:a16="http://schemas.microsoft.com/office/drawing/2014/main" xmlns="" id="{734FA846-3BF6-46FD-80CF-34B300D244C0}"/>
+                <a16:creationId xmlns="" xmlns:a16="http://schemas.microsoft.com/office/drawing/2014/main" id="{734FA846-3BF6-46FD-80CF-34B300D244C0}"/>
               </a:ext>
             </a:extLst>
           </p:cNvPr>
@@ -3337,7 +3337,7 @@
           <p:cNvPr id="4" name="Rectangle 3">
             <a:extLst>
               <a:ext uri="{FF2B5EF4-FFF2-40B4-BE49-F238E27FC236}">
-                <a16:creationId xmlns:a16="http://schemas.microsoft.com/office/drawing/2014/main" xmlns="" id="{0A71868C-EF96-4004-8116-DFD1FCCEE6C3}"/>
+                <a16:creationId xmlns="" xmlns:a16="http://schemas.microsoft.com/office/drawing/2014/main" id="{0A71868C-EF96-4004-8116-DFD1FCCEE6C3}"/>
               </a:ext>
             </a:extLst>
           </p:cNvPr>
@@ -3393,7 +3393,7 @@
           <p:cNvPr id="5" name="Rectangle 4">
             <a:extLst>
               <a:ext uri="{FF2B5EF4-FFF2-40B4-BE49-F238E27FC236}">
-                <a16:creationId xmlns:a16="http://schemas.microsoft.com/office/drawing/2014/main" xmlns="" id="{67A88ADC-D070-420B-9A88-FDBA4865856A}"/>
+                <a16:creationId xmlns="" xmlns:a16="http://schemas.microsoft.com/office/drawing/2014/main" id="{67A88ADC-D070-420B-9A88-FDBA4865856A}"/>
               </a:ext>
             </a:extLst>
           </p:cNvPr>
@@ -3453,7 +3453,7 @@
           <p:cNvPr id="7" name="Straight Arrow Connector 6">
             <a:extLst>
               <a:ext uri="{FF2B5EF4-FFF2-40B4-BE49-F238E27FC236}">
-                <a16:creationId xmlns:a16="http://schemas.microsoft.com/office/drawing/2014/main" xmlns="" id="{45AD00B6-B022-4C7F-A523-E16E6292918D}"/>
+                <a16:creationId xmlns="" xmlns:a16="http://schemas.microsoft.com/office/drawing/2014/main" id="{45AD00B6-B022-4C7F-A523-E16E6292918D}"/>
               </a:ext>
             </a:extLst>
           </p:cNvPr>
@@ -3495,7 +3495,7 @@
           <p:cNvPr id="8" name="Rectangle 7">
             <a:extLst>
               <a:ext uri="{FF2B5EF4-FFF2-40B4-BE49-F238E27FC236}">
-                <a16:creationId xmlns:a16="http://schemas.microsoft.com/office/drawing/2014/main" xmlns="" id="{3C7A2B3E-B0CA-48CD-A6CB-935EF9D71843}"/>
+                <a16:creationId xmlns="" xmlns:a16="http://schemas.microsoft.com/office/drawing/2014/main" id="{3C7A2B3E-B0CA-48CD-A6CB-935EF9D71843}"/>
               </a:ext>
             </a:extLst>
           </p:cNvPr>
@@ -3555,7 +3555,7 @@
           <p:cNvPr id="9" name="TextBox 8">
             <a:extLst>
               <a:ext uri="{FF2B5EF4-FFF2-40B4-BE49-F238E27FC236}">
-                <a16:creationId xmlns:a16="http://schemas.microsoft.com/office/drawing/2014/main" xmlns="" id="{ABD7B54F-357C-489B-ADE1-DFA04BEA1686}"/>
+                <a16:creationId xmlns="" xmlns:a16="http://schemas.microsoft.com/office/drawing/2014/main" id="{ABD7B54F-357C-489B-ADE1-DFA04BEA1686}"/>
               </a:ext>
             </a:extLst>
           </p:cNvPr>
@@ -3590,7 +3590,7 @@
           <p:cNvPr id="10" name="Rectangle 9">
             <a:extLst>
               <a:ext uri="{FF2B5EF4-FFF2-40B4-BE49-F238E27FC236}">
-                <a16:creationId xmlns:a16="http://schemas.microsoft.com/office/drawing/2014/main" xmlns="" id="{21B869D6-66CB-4B38-975F-B7FEB6AA9B13}"/>
+                <a16:creationId xmlns="" xmlns:a16="http://schemas.microsoft.com/office/drawing/2014/main" id="{21B869D6-66CB-4B38-975F-B7FEB6AA9B13}"/>
               </a:ext>
             </a:extLst>
           </p:cNvPr>
@@ -3639,7 +3639,7 @@
           <p:cNvPr id="12" name="Straight Arrow Connector 11">
             <a:extLst>
               <a:ext uri="{FF2B5EF4-FFF2-40B4-BE49-F238E27FC236}">
-                <a16:creationId xmlns:a16="http://schemas.microsoft.com/office/drawing/2014/main" xmlns="" id="{78CBB1AB-C0E2-40F2-828D-F209304958AC}"/>
+                <a16:creationId xmlns="" xmlns:a16="http://schemas.microsoft.com/office/drawing/2014/main" id="{78CBB1AB-C0E2-40F2-828D-F209304958AC}"/>
               </a:ext>
             </a:extLst>
           </p:cNvPr>
@@ -3682,7 +3682,7 @@
           <p:cNvPr id="14" name="TextBox 13">
             <a:extLst>
               <a:ext uri="{FF2B5EF4-FFF2-40B4-BE49-F238E27FC236}">
-                <a16:creationId xmlns:a16="http://schemas.microsoft.com/office/drawing/2014/main" xmlns="" id="{E0BBD6C8-C8F2-40C5-AA64-85961A11ADC2}"/>
+                <a16:creationId xmlns="" xmlns:a16="http://schemas.microsoft.com/office/drawing/2014/main" id="{E0BBD6C8-C8F2-40C5-AA64-85961A11ADC2}"/>
               </a:ext>
             </a:extLst>
           </p:cNvPr>
@@ -3717,7 +3717,7 @@
           <p:cNvPr id="16" name="Straight Arrow Connector 15">
             <a:extLst>
               <a:ext uri="{FF2B5EF4-FFF2-40B4-BE49-F238E27FC236}">
-                <a16:creationId xmlns:a16="http://schemas.microsoft.com/office/drawing/2014/main" xmlns="" id="{22509349-F226-482F-AC14-E28C2411C4C3}"/>
+                <a16:creationId xmlns="" xmlns:a16="http://schemas.microsoft.com/office/drawing/2014/main" id="{22509349-F226-482F-AC14-E28C2411C4C3}"/>
               </a:ext>
             </a:extLst>
           </p:cNvPr>
@@ -3760,7 +3760,7 @@
           <p:cNvPr id="18" name="TextBox 17">
             <a:extLst>
               <a:ext uri="{FF2B5EF4-FFF2-40B4-BE49-F238E27FC236}">
-                <a16:creationId xmlns:a16="http://schemas.microsoft.com/office/drawing/2014/main" xmlns="" id="{E2DE2503-050C-47C3-BC73-C61D89CEB131}"/>
+                <a16:creationId xmlns="" xmlns:a16="http://schemas.microsoft.com/office/drawing/2014/main" id="{E2DE2503-050C-47C3-BC73-C61D89CEB131}"/>
               </a:ext>
             </a:extLst>
           </p:cNvPr>
@@ -3795,7 +3795,7 @@
           <p:cNvPr id="23" name="Straight Arrow Connector 22">
             <a:extLst>
               <a:ext uri="{FF2B5EF4-FFF2-40B4-BE49-F238E27FC236}">
-                <a16:creationId xmlns:a16="http://schemas.microsoft.com/office/drawing/2014/main" xmlns="" id="{5D314D83-3A56-4BD7-B215-19DEE4ED8C0B}"/>
+                <a16:creationId xmlns="" xmlns:a16="http://schemas.microsoft.com/office/drawing/2014/main" id="{5D314D83-3A56-4BD7-B215-19DEE4ED8C0B}"/>
               </a:ext>
             </a:extLst>
           </p:cNvPr>
@@ -3838,7 +3838,7 @@
           <p:cNvPr id="24" name="Straight Arrow Connector 23">
             <a:extLst>
               <a:ext uri="{FF2B5EF4-FFF2-40B4-BE49-F238E27FC236}">
-                <a16:creationId xmlns:a16="http://schemas.microsoft.com/office/drawing/2014/main" xmlns="" id="{874E7075-4C88-4378-99B9-DC474BE0CE65}"/>
+                <a16:creationId xmlns="" xmlns:a16="http://schemas.microsoft.com/office/drawing/2014/main" id="{874E7075-4C88-4378-99B9-DC474BE0CE65}"/>
               </a:ext>
             </a:extLst>
           </p:cNvPr>
@@ -3881,7 +3881,7 @@
           <p:cNvPr id="25" name="TextBox 24">
             <a:extLst>
               <a:ext uri="{FF2B5EF4-FFF2-40B4-BE49-F238E27FC236}">
-                <a16:creationId xmlns:a16="http://schemas.microsoft.com/office/drawing/2014/main" xmlns="" id="{171D93A1-C181-4F9C-8D75-C106DB531AB7}"/>
+                <a16:creationId xmlns="" xmlns:a16="http://schemas.microsoft.com/office/drawing/2014/main" id="{171D93A1-C181-4F9C-8D75-C106DB531AB7}"/>
               </a:ext>
             </a:extLst>
           </p:cNvPr>
@@ -3916,7 +3916,7 @@
           <p:cNvPr id="26" name="TextBox 25">
             <a:extLst>
               <a:ext uri="{FF2B5EF4-FFF2-40B4-BE49-F238E27FC236}">
-                <a16:creationId xmlns:a16="http://schemas.microsoft.com/office/drawing/2014/main" xmlns="" id="{03EAB749-77B2-435B-A0A3-02060FD4A06F}"/>
+                <a16:creationId xmlns="" xmlns:a16="http://schemas.microsoft.com/office/drawing/2014/main" id="{03EAB749-77B2-435B-A0A3-02060FD4A06F}"/>
               </a:ext>
             </a:extLst>
           </p:cNvPr>
@@ -3951,7 +3951,7 @@
           <p:cNvPr id="27" name="TextBox 26">
             <a:extLst>
               <a:ext uri="{FF2B5EF4-FFF2-40B4-BE49-F238E27FC236}">
-                <a16:creationId xmlns:a16="http://schemas.microsoft.com/office/drawing/2014/main" xmlns="" id="{7D8414B9-747D-41E7-A06D-8BBA5042C15C}"/>
+                <a16:creationId xmlns="" xmlns:a16="http://schemas.microsoft.com/office/drawing/2014/main" id="{7D8414B9-747D-41E7-A06D-8BBA5042C15C}"/>
               </a:ext>
             </a:extLst>
           </p:cNvPr>
@@ -3986,7 +3986,7 @@
           <p:cNvPr id="28" name="TextBox 27">
             <a:extLst>
               <a:ext uri="{FF2B5EF4-FFF2-40B4-BE49-F238E27FC236}">
-                <a16:creationId xmlns:a16="http://schemas.microsoft.com/office/drawing/2014/main" xmlns="" id="{F559714E-416D-4742-9901-ADC4D8BAC5FA}"/>
+                <a16:creationId xmlns="" xmlns:a16="http://schemas.microsoft.com/office/drawing/2014/main" id="{F559714E-416D-4742-9901-ADC4D8BAC5FA}"/>
               </a:ext>
             </a:extLst>
           </p:cNvPr>
@@ -4021,7 +4021,7 @@
           <p:cNvPr id="31" name="Rectangle 30">
             <a:extLst>
               <a:ext uri="{FF2B5EF4-FFF2-40B4-BE49-F238E27FC236}">
-                <a16:creationId xmlns:a16="http://schemas.microsoft.com/office/drawing/2014/main" xmlns="" id="{9061AF07-38B9-4B05-B6B2-1A74D7C0C618}"/>
+                <a16:creationId xmlns="" xmlns:a16="http://schemas.microsoft.com/office/drawing/2014/main" id="{9061AF07-38B9-4B05-B6B2-1A74D7C0C618}"/>
               </a:ext>
             </a:extLst>
           </p:cNvPr>
@@ -4081,7 +4081,7 @@
           <p:cNvPr id="33" name="Connector: Elbow 32">
             <a:extLst>
               <a:ext uri="{FF2B5EF4-FFF2-40B4-BE49-F238E27FC236}">
-                <a16:creationId xmlns:a16="http://schemas.microsoft.com/office/drawing/2014/main" xmlns="" id="{B367C937-E98B-4009-B48E-DBF7102DCFD1}"/>
+                <a16:creationId xmlns="" xmlns:a16="http://schemas.microsoft.com/office/drawing/2014/main" id="{B367C937-E98B-4009-B48E-DBF7102DCFD1}"/>
               </a:ext>
             </a:extLst>
           </p:cNvPr>
@@ -4123,7 +4123,7 @@
           <p:cNvPr id="34" name="TextBox 33">
             <a:extLst>
               <a:ext uri="{FF2B5EF4-FFF2-40B4-BE49-F238E27FC236}">
-                <a16:creationId xmlns:a16="http://schemas.microsoft.com/office/drawing/2014/main" xmlns="" id="{7FC33359-8BE1-4CD9-AD98-06C75CE8FF08}"/>
+                <a16:creationId xmlns="" xmlns:a16="http://schemas.microsoft.com/office/drawing/2014/main" id="{7FC33359-8BE1-4CD9-AD98-06C75CE8FF08}"/>
               </a:ext>
             </a:extLst>
           </p:cNvPr>
@@ -4158,7 +4158,7 @@
           <p:cNvPr id="35" name="Rectangle 34">
             <a:extLst>
               <a:ext uri="{FF2B5EF4-FFF2-40B4-BE49-F238E27FC236}">
-                <a16:creationId xmlns:a16="http://schemas.microsoft.com/office/drawing/2014/main" xmlns="" id="{85531841-C806-4F00-B17D-D19E7CE1C155}"/>
+                <a16:creationId xmlns="" xmlns:a16="http://schemas.microsoft.com/office/drawing/2014/main" id="{85531841-C806-4F00-B17D-D19E7CE1C155}"/>
               </a:ext>
             </a:extLst>
           </p:cNvPr>
@@ -4217,7 +4217,7 @@
           <p:cNvPr id="37" name="Connector: Elbow 36">
             <a:extLst>
               <a:ext uri="{FF2B5EF4-FFF2-40B4-BE49-F238E27FC236}">
-                <a16:creationId xmlns:a16="http://schemas.microsoft.com/office/drawing/2014/main" xmlns="" id="{1BFE62EC-0F5D-4135-832D-63D5DC95509C}"/>
+                <a16:creationId xmlns="" xmlns:a16="http://schemas.microsoft.com/office/drawing/2014/main" id="{1BFE62EC-0F5D-4135-832D-63D5DC95509C}"/>
               </a:ext>
             </a:extLst>
           </p:cNvPr>
@@ -4262,7 +4262,7 @@
           <p:cNvPr id="38" name="TextBox 37">
             <a:extLst>
               <a:ext uri="{FF2B5EF4-FFF2-40B4-BE49-F238E27FC236}">
-                <a16:creationId xmlns:a16="http://schemas.microsoft.com/office/drawing/2014/main" xmlns="" id="{892D5E6B-E445-4560-9C01-6D3C52FFC5AA}"/>
+                <a16:creationId xmlns="" xmlns:a16="http://schemas.microsoft.com/office/drawing/2014/main" id="{892D5E6B-E445-4560-9C01-6D3C52FFC5AA}"/>
               </a:ext>
             </a:extLst>
           </p:cNvPr>
@@ -4297,7 +4297,7 @@
           <p:cNvPr id="39" name="Rectangle 38">
             <a:extLst>
               <a:ext uri="{FF2B5EF4-FFF2-40B4-BE49-F238E27FC236}">
-                <a16:creationId xmlns:a16="http://schemas.microsoft.com/office/drawing/2014/main" xmlns="" id="{2F2BC059-EF97-4BEE-8F18-133838E3F2D8}"/>
+                <a16:creationId xmlns="" xmlns:a16="http://schemas.microsoft.com/office/drawing/2014/main" id="{2F2BC059-EF97-4BEE-8F18-133838E3F2D8}"/>
               </a:ext>
             </a:extLst>
           </p:cNvPr>
@@ -4346,7 +4346,7 @@
           <p:cNvPr id="44" name="TextBox 43">
             <a:extLst>
               <a:ext uri="{FF2B5EF4-FFF2-40B4-BE49-F238E27FC236}">
-                <a16:creationId xmlns:a16="http://schemas.microsoft.com/office/drawing/2014/main" xmlns="" id="{48B10C1F-BA7F-40E8-B79A-E87D7A3A66AB}"/>
+                <a16:creationId xmlns="" xmlns:a16="http://schemas.microsoft.com/office/drawing/2014/main" id="{48B10C1F-BA7F-40E8-B79A-E87D7A3A66AB}"/>
               </a:ext>
             </a:extLst>
           </p:cNvPr>
@@ -4561,7 +4561,7 @@
           <p:cNvPr id="11" name="TextBox 10">
             <a:extLst>
               <a:ext uri="{FF2B5EF4-FFF2-40B4-BE49-F238E27FC236}">
-                <a16:creationId xmlns:a16="http://schemas.microsoft.com/office/drawing/2014/main" xmlns="" id="{E0BBD6C8-C8F2-40C5-AA64-85961A11ADC2}"/>
+                <a16:creationId xmlns="" xmlns:a16="http://schemas.microsoft.com/office/drawing/2014/main" id="{E0BBD6C8-C8F2-40C5-AA64-85961A11ADC2}"/>
               </a:ext>
             </a:extLst>
           </p:cNvPr>
@@ -4689,7 +4689,7 @@
           <p:cNvPr id="19" name="TextBox 18">
             <a:extLst>
               <a:ext uri="{FF2B5EF4-FFF2-40B4-BE49-F238E27FC236}">
-                <a16:creationId xmlns:a16="http://schemas.microsoft.com/office/drawing/2014/main" xmlns="" id="{E0BBD6C8-C8F2-40C5-AA64-85961A11ADC2}"/>
+                <a16:creationId xmlns="" xmlns:a16="http://schemas.microsoft.com/office/drawing/2014/main" id="{E0BBD6C8-C8F2-40C5-AA64-85961A11ADC2}"/>
               </a:ext>
             </a:extLst>
           </p:cNvPr>
@@ -4811,7 +4811,7 @@
           <p:cNvPr id="23" name="TextBox 22">
             <a:extLst>
               <a:ext uri="{FF2B5EF4-FFF2-40B4-BE49-F238E27FC236}">
-                <a16:creationId xmlns:a16="http://schemas.microsoft.com/office/drawing/2014/main" xmlns="" id="{E0BBD6C8-C8F2-40C5-AA64-85961A11ADC2}"/>
+                <a16:creationId xmlns="" xmlns:a16="http://schemas.microsoft.com/office/drawing/2014/main" id="{E0BBD6C8-C8F2-40C5-AA64-85961A11ADC2}"/>
               </a:ext>
             </a:extLst>
           </p:cNvPr>
@@ -4931,7 +4931,7 @@
           <p:cNvPr id="28" name="TextBox 27">
             <a:extLst>
               <a:ext uri="{FF2B5EF4-FFF2-40B4-BE49-F238E27FC236}">
-                <a16:creationId xmlns:a16="http://schemas.microsoft.com/office/drawing/2014/main" xmlns="" id="{E0BBD6C8-C8F2-40C5-AA64-85961A11ADC2}"/>
+                <a16:creationId xmlns="" xmlns:a16="http://schemas.microsoft.com/office/drawing/2014/main" id="{E0BBD6C8-C8F2-40C5-AA64-85961A11ADC2}"/>
               </a:ext>
             </a:extLst>
           </p:cNvPr>
@@ -5060,7 +5060,7 @@
           <p:cNvPr id="34" name="TextBox 33">
             <a:extLst>
               <a:ext uri="{FF2B5EF4-FFF2-40B4-BE49-F238E27FC236}">
-                <a16:creationId xmlns:a16="http://schemas.microsoft.com/office/drawing/2014/main" xmlns="" id="{E0BBD6C8-C8F2-40C5-AA64-85961A11ADC2}"/>
+                <a16:creationId xmlns="" xmlns:a16="http://schemas.microsoft.com/office/drawing/2014/main" id="{E0BBD6C8-C8F2-40C5-AA64-85961A11ADC2}"/>
               </a:ext>
             </a:extLst>
           </p:cNvPr>
@@ -5192,7 +5192,7 @@
           <p:cNvPr id="38" name="TextBox 37">
             <a:extLst>
               <a:ext uri="{FF2B5EF4-FFF2-40B4-BE49-F238E27FC236}">
-                <a16:creationId xmlns:a16="http://schemas.microsoft.com/office/drawing/2014/main" xmlns="" id="{E0BBD6C8-C8F2-40C5-AA64-85961A11ADC2}"/>
+                <a16:creationId xmlns="" xmlns:a16="http://schemas.microsoft.com/office/drawing/2014/main" id="{E0BBD6C8-C8F2-40C5-AA64-85961A11ADC2}"/>
               </a:ext>
             </a:extLst>
           </p:cNvPr>
@@ -5362,7 +5362,7 @@
           <p:cNvPr id="44" name="TextBox 43">
             <a:extLst>
               <a:ext uri="{FF2B5EF4-FFF2-40B4-BE49-F238E27FC236}">
-                <a16:creationId xmlns:a16="http://schemas.microsoft.com/office/drawing/2014/main" xmlns="" id="{E0BBD6C8-C8F2-40C5-AA64-85961A11ADC2}"/>
+                <a16:creationId xmlns="" xmlns:a16="http://schemas.microsoft.com/office/drawing/2014/main" id="{E0BBD6C8-C8F2-40C5-AA64-85961A11ADC2}"/>
               </a:ext>
             </a:extLst>
           </p:cNvPr>
@@ -5397,7 +5397,7 @@
           <p:cNvPr id="45" name="TextBox 44">
             <a:extLst>
               <a:ext uri="{FF2B5EF4-FFF2-40B4-BE49-F238E27FC236}">
-                <a16:creationId xmlns:a16="http://schemas.microsoft.com/office/drawing/2014/main" xmlns="" id="{E0BBD6C8-C8F2-40C5-AA64-85961A11ADC2}"/>
+                <a16:creationId xmlns="" xmlns:a16="http://schemas.microsoft.com/office/drawing/2014/main" id="{E0BBD6C8-C8F2-40C5-AA64-85961A11ADC2}"/>
               </a:ext>
             </a:extLst>
           </p:cNvPr>
@@ -5432,7 +5432,7 @@
           <p:cNvPr id="26" name="TextBox 25">
             <a:extLst>
               <a:ext uri="{FF2B5EF4-FFF2-40B4-BE49-F238E27FC236}">
-                <a16:creationId xmlns:a16="http://schemas.microsoft.com/office/drawing/2014/main" xmlns="" id="{70BF22D6-D5A2-4CCC-8E2D-329E25668556}"/>
+                <a16:creationId xmlns="" xmlns:a16="http://schemas.microsoft.com/office/drawing/2014/main" id="{70BF22D6-D5A2-4CCC-8E2D-329E25668556}"/>
               </a:ext>
             </a:extLst>
           </p:cNvPr>
@@ -5648,7 +5648,7 @@
           <p:cNvPr id="11" name="TextBox 10">
             <a:extLst>
               <a:ext uri="{FF2B5EF4-FFF2-40B4-BE49-F238E27FC236}">
-                <a16:creationId xmlns:a16="http://schemas.microsoft.com/office/drawing/2014/main" xmlns="" id="{E0BBD6C8-C8F2-40C5-AA64-85961A11ADC2}"/>
+                <a16:creationId xmlns="" xmlns:a16="http://schemas.microsoft.com/office/drawing/2014/main" id="{E0BBD6C8-C8F2-40C5-AA64-85961A11ADC2}"/>
               </a:ext>
             </a:extLst>
           </p:cNvPr>
@@ -5783,7 +5783,7 @@
           <p:cNvPr id="19" name="TextBox 18">
             <a:extLst>
               <a:ext uri="{FF2B5EF4-FFF2-40B4-BE49-F238E27FC236}">
-                <a16:creationId xmlns:a16="http://schemas.microsoft.com/office/drawing/2014/main" xmlns="" id="{E0BBD6C8-C8F2-40C5-AA64-85961A11ADC2}"/>
+                <a16:creationId xmlns="" xmlns:a16="http://schemas.microsoft.com/office/drawing/2014/main" id="{E0BBD6C8-C8F2-40C5-AA64-85961A11ADC2}"/>
               </a:ext>
             </a:extLst>
           </p:cNvPr>
@@ -5905,7 +5905,7 @@
           <p:cNvPr id="23" name="TextBox 22">
             <a:extLst>
               <a:ext uri="{FF2B5EF4-FFF2-40B4-BE49-F238E27FC236}">
-                <a16:creationId xmlns:a16="http://schemas.microsoft.com/office/drawing/2014/main" xmlns="" id="{E0BBD6C8-C8F2-40C5-AA64-85961A11ADC2}"/>
+                <a16:creationId xmlns="" xmlns:a16="http://schemas.microsoft.com/office/drawing/2014/main" id="{E0BBD6C8-C8F2-40C5-AA64-85961A11ADC2}"/>
               </a:ext>
             </a:extLst>
           </p:cNvPr>
@@ -6019,7 +6019,7 @@
           <p:cNvPr id="28" name="TextBox 27">
             <a:extLst>
               <a:ext uri="{FF2B5EF4-FFF2-40B4-BE49-F238E27FC236}">
-                <a16:creationId xmlns:a16="http://schemas.microsoft.com/office/drawing/2014/main" xmlns="" id="{E0BBD6C8-C8F2-40C5-AA64-85961A11ADC2}"/>
+                <a16:creationId xmlns="" xmlns:a16="http://schemas.microsoft.com/office/drawing/2014/main" id="{E0BBD6C8-C8F2-40C5-AA64-85961A11ADC2}"/>
               </a:ext>
             </a:extLst>
           </p:cNvPr>
@@ -6140,7 +6140,7 @@
           <p:cNvPr id="34" name="TextBox 33">
             <a:extLst>
               <a:ext uri="{FF2B5EF4-FFF2-40B4-BE49-F238E27FC236}">
-                <a16:creationId xmlns:a16="http://schemas.microsoft.com/office/drawing/2014/main" xmlns="" id="{E0BBD6C8-C8F2-40C5-AA64-85961A11ADC2}"/>
+                <a16:creationId xmlns="" xmlns:a16="http://schemas.microsoft.com/office/drawing/2014/main" id="{E0BBD6C8-C8F2-40C5-AA64-85961A11ADC2}"/>
               </a:ext>
             </a:extLst>
           </p:cNvPr>
@@ -6261,7 +6261,7 @@
           <p:cNvPr id="38" name="TextBox 37">
             <a:extLst>
               <a:ext uri="{FF2B5EF4-FFF2-40B4-BE49-F238E27FC236}">
-                <a16:creationId xmlns:a16="http://schemas.microsoft.com/office/drawing/2014/main" xmlns="" id="{E0BBD6C8-C8F2-40C5-AA64-85961A11ADC2}"/>
+                <a16:creationId xmlns="" xmlns:a16="http://schemas.microsoft.com/office/drawing/2014/main" id="{E0BBD6C8-C8F2-40C5-AA64-85961A11ADC2}"/>
               </a:ext>
             </a:extLst>
           </p:cNvPr>
@@ -6425,7 +6425,7 @@
           <p:cNvPr id="44" name="TextBox 43">
             <a:extLst>
               <a:ext uri="{FF2B5EF4-FFF2-40B4-BE49-F238E27FC236}">
-                <a16:creationId xmlns:a16="http://schemas.microsoft.com/office/drawing/2014/main" xmlns="" id="{E0BBD6C8-C8F2-40C5-AA64-85961A11ADC2}"/>
+                <a16:creationId xmlns="" xmlns:a16="http://schemas.microsoft.com/office/drawing/2014/main" id="{E0BBD6C8-C8F2-40C5-AA64-85961A11ADC2}"/>
               </a:ext>
             </a:extLst>
           </p:cNvPr>
@@ -6460,7 +6460,7 @@
           <p:cNvPr id="45" name="TextBox 44">
             <a:extLst>
               <a:ext uri="{FF2B5EF4-FFF2-40B4-BE49-F238E27FC236}">
-                <a16:creationId xmlns:a16="http://schemas.microsoft.com/office/drawing/2014/main" xmlns="" id="{E0BBD6C8-C8F2-40C5-AA64-85961A11ADC2}"/>
+                <a16:creationId xmlns="" xmlns:a16="http://schemas.microsoft.com/office/drawing/2014/main" id="{E0BBD6C8-C8F2-40C5-AA64-85961A11ADC2}"/>
               </a:ext>
             </a:extLst>
           </p:cNvPr>
@@ -6495,7 +6495,7 @@
           <p:cNvPr id="26" name="TextBox 25">
             <a:extLst>
               <a:ext uri="{FF2B5EF4-FFF2-40B4-BE49-F238E27FC236}">
-                <a16:creationId xmlns:a16="http://schemas.microsoft.com/office/drawing/2014/main" xmlns="" id="{70BF22D6-D5A2-4CCC-8E2D-329E25668556}"/>
+                <a16:creationId xmlns="" xmlns:a16="http://schemas.microsoft.com/office/drawing/2014/main" id="{70BF22D6-D5A2-4CCC-8E2D-329E25668556}"/>
               </a:ext>
             </a:extLst>
           </p:cNvPr>
@@ -6530,7 +6530,7 @@
           <p:cNvPr id="40" name="TextBox 39">
             <a:extLst>
               <a:ext uri="{FF2B5EF4-FFF2-40B4-BE49-F238E27FC236}">
-                <a16:creationId xmlns:a16="http://schemas.microsoft.com/office/drawing/2014/main" xmlns="" id="{BF7734B1-6C1B-4ADB-BBA4-2510EE97BB9D}"/>
+                <a16:creationId xmlns="" xmlns:a16="http://schemas.microsoft.com/office/drawing/2014/main" id="{BF7734B1-6C1B-4ADB-BBA4-2510EE97BB9D}"/>
               </a:ext>
             </a:extLst>
           </p:cNvPr>
@@ -6565,7 +6565,7 @@
           <p:cNvPr id="32" name="Straight Arrow Connector 31">
             <a:extLst>
               <a:ext uri="{FF2B5EF4-FFF2-40B4-BE49-F238E27FC236}">
-                <a16:creationId xmlns:a16="http://schemas.microsoft.com/office/drawing/2014/main" xmlns="" id="{5BC5C957-DD00-47FE-A727-262A8F90A864}"/>
+                <a16:creationId xmlns="" xmlns:a16="http://schemas.microsoft.com/office/drawing/2014/main" id="{5BC5C957-DD00-47FE-A727-262A8F90A864}"/>
               </a:ext>
             </a:extLst>
           </p:cNvPr>
@@ -6708,7 +6708,7 @@
         </p:nvSpPr>
         <p:spPr>
           <a:xfrm>
-            <a:off x="162895" y="2513561"/>
+            <a:off x="264281" y="2803441"/>
             <a:ext cx="1494797" cy="991056"/>
           </a:xfrm>
           <a:prstGeom prst="rect">
@@ -6772,8 +6772,8 @@
         </p:nvCxnSpPr>
         <p:spPr>
           <a:xfrm flipH="1">
-            <a:off x="1657692" y="2147290"/>
-            <a:ext cx="3362384" cy="861799"/>
+            <a:off x="1759078" y="2147290"/>
+            <a:ext cx="3260998" cy="1151679"/>
           </a:xfrm>
           <a:prstGeom prst="straightConnector1">
             <a:avLst/>
@@ -6802,7 +6802,7 @@
           <p:cNvPr id="11" name="TextBox 10">
             <a:extLst>
               <a:ext uri="{FF2B5EF4-FFF2-40B4-BE49-F238E27FC236}">
-                <a16:creationId xmlns:a16="http://schemas.microsoft.com/office/drawing/2014/main" xmlns="" id="{E0BBD6C8-C8F2-40C5-AA64-85961A11ADC2}"/>
+                <a16:creationId xmlns="" xmlns:a16="http://schemas.microsoft.com/office/drawing/2014/main" id="{E0BBD6C8-C8F2-40C5-AA64-85961A11ADC2}"/>
               </a:ext>
             </a:extLst>
           </p:cNvPr>
@@ -6811,7 +6811,7 @@
         </p:nvSpPr>
         <p:spPr>
           <a:xfrm>
-            <a:off x="2277899" y="2254158"/>
+            <a:off x="3717699" y="2455090"/>
             <a:ext cx="728932" cy="461665"/>
           </a:xfrm>
           <a:prstGeom prst="rect">
@@ -6846,7 +6846,7 @@
         </p:nvSpPr>
         <p:spPr>
           <a:xfrm>
-            <a:off x="2607538" y="3587532"/>
+            <a:off x="7404749" y="2622404"/>
             <a:ext cx="1494797" cy="991056"/>
           </a:xfrm>
           <a:prstGeom prst="rect">
@@ -6918,9 +6918,9 @@
           <p:nvPr/>
         </p:nvCxnSpPr>
         <p:spPr>
-          <a:xfrm flipH="1">
-            <a:off x="3354937" y="2147290"/>
-            <a:ext cx="1665139" cy="1440242"/>
+          <a:xfrm>
+            <a:off x="5020076" y="2147290"/>
+            <a:ext cx="3132072" cy="475114"/>
           </a:xfrm>
           <a:prstGeom prst="straightConnector1">
             <a:avLst/>
@@ -6949,7 +6949,7 @@
           <p:cNvPr id="19" name="TextBox 18">
             <a:extLst>
               <a:ext uri="{FF2B5EF4-FFF2-40B4-BE49-F238E27FC236}">
-                <a16:creationId xmlns:a16="http://schemas.microsoft.com/office/drawing/2014/main" xmlns="" id="{E0BBD6C8-C8F2-40C5-AA64-85961A11ADC2}"/>
+                <a16:creationId xmlns="" xmlns:a16="http://schemas.microsoft.com/office/drawing/2014/main" id="{E0BBD6C8-C8F2-40C5-AA64-85961A11ADC2}"/>
               </a:ext>
             </a:extLst>
           </p:cNvPr>
@@ -6958,7 +6958,7 @@
         </p:nvSpPr>
         <p:spPr>
           <a:xfrm>
-            <a:off x="3477746" y="2950741"/>
+            <a:off x="6717985" y="2200161"/>
             <a:ext cx="728932" cy="276999"/>
           </a:xfrm>
           <a:prstGeom prst="rect">
@@ -7075,7 +7075,7 @@
           <p:cNvPr id="23" name="TextBox 22">
             <a:extLst>
               <a:ext uri="{FF2B5EF4-FFF2-40B4-BE49-F238E27FC236}">
-                <a16:creationId xmlns:a16="http://schemas.microsoft.com/office/drawing/2014/main" xmlns="" id="{E0BBD6C8-C8F2-40C5-AA64-85961A11ADC2}"/>
+                <a16:creationId xmlns="" xmlns:a16="http://schemas.microsoft.com/office/drawing/2014/main" id="{E0BBD6C8-C8F2-40C5-AA64-85961A11ADC2}"/>
               </a:ext>
             </a:extLst>
           </p:cNvPr>
@@ -7192,7 +7192,7 @@
           <p:cNvPr id="28" name="TextBox 27">
             <a:extLst>
               <a:ext uri="{FF2B5EF4-FFF2-40B4-BE49-F238E27FC236}">
-                <a16:creationId xmlns:a16="http://schemas.microsoft.com/office/drawing/2014/main" xmlns="" id="{E0BBD6C8-C8F2-40C5-AA64-85961A11ADC2}"/>
+                <a16:creationId xmlns="" xmlns:a16="http://schemas.microsoft.com/office/drawing/2014/main" id="{E0BBD6C8-C8F2-40C5-AA64-85961A11ADC2}"/>
               </a:ext>
             </a:extLst>
           </p:cNvPr>
@@ -7201,7 +7201,7 @@
         </p:nvSpPr>
         <p:spPr>
           <a:xfrm>
-            <a:off x="7289158" y="2139607"/>
+            <a:off x="7289158" y="1867046"/>
             <a:ext cx="728932" cy="276999"/>
           </a:xfrm>
           <a:prstGeom prst="rect">
@@ -7230,7 +7230,7 @@
         </p:nvSpPr>
         <p:spPr>
           <a:xfrm>
-            <a:off x="5020076" y="3375360"/>
+            <a:off x="5067428" y="3851532"/>
             <a:ext cx="1494797" cy="991056"/>
           </a:xfrm>
           <a:prstGeom prst="rect">
@@ -7287,8 +7287,8 @@
         </p:nvCxnSpPr>
         <p:spPr>
           <a:xfrm flipV="1">
-            <a:off x="5767475" y="2642818"/>
-            <a:ext cx="47562" cy="732542"/>
+            <a:off x="5814827" y="2642818"/>
+            <a:ext cx="210" cy="1208714"/>
           </a:xfrm>
           <a:prstGeom prst="straightConnector1">
             <a:avLst/>
@@ -7317,7 +7317,7 @@
           <p:cNvPr id="34" name="TextBox 33">
             <a:extLst>
               <a:ext uri="{FF2B5EF4-FFF2-40B4-BE49-F238E27FC236}">
-                <a16:creationId xmlns:a16="http://schemas.microsoft.com/office/drawing/2014/main" xmlns="" id="{E0BBD6C8-C8F2-40C5-AA64-85961A11ADC2}"/>
+                <a16:creationId xmlns="" xmlns:a16="http://schemas.microsoft.com/office/drawing/2014/main" id="{E0BBD6C8-C8F2-40C5-AA64-85961A11ADC2}"/>
               </a:ext>
             </a:extLst>
           </p:cNvPr>
@@ -7358,7 +7358,7 @@
         </p:nvSpPr>
         <p:spPr>
           <a:xfrm>
-            <a:off x="2103846" y="5021710"/>
+            <a:off x="2389427" y="3425312"/>
             <a:ext cx="1998489" cy="657053"/>
           </a:xfrm>
           <a:prstGeom prst="rect">
@@ -7409,15 +7409,15 @@
           <p:cNvPr id="37" name="Straight Arrow Connector 36"/>
           <p:cNvCxnSpPr>
             <a:cxnSpLocks/>
-            <a:stCxn id="29" idx="2"/>
-            <a:endCxn id="35" idx="0"/>
+            <a:stCxn id="29" idx="1"/>
+            <a:endCxn id="35" idx="3"/>
           </p:cNvCxnSpPr>
           <p:nvPr/>
         </p:nvCxnSpPr>
         <p:spPr>
-          <a:xfrm flipH="1">
-            <a:off x="3103091" y="4366416"/>
-            <a:ext cx="2664384" cy="655294"/>
+          <a:xfrm flipH="1" flipV="1">
+            <a:off x="4387916" y="3753839"/>
+            <a:ext cx="679512" cy="593221"/>
           </a:xfrm>
           <a:prstGeom prst="straightConnector1">
             <a:avLst/>
@@ -7446,7 +7446,7 @@
           <p:cNvPr id="38" name="TextBox 37">
             <a:extLst>
               <a:ext uri="{FF2B5EF4-FFF2-40B4-BE49-F238E27FC236}">
-                <a16:creationId xmlns:a16="http://schemas.microsoft.com/office/drawing/2014/main" xmlns="" id="{E0BBD6C8-C8F2-40C5-AA64-85961A11ADC2}"/>
+                <a16:creationId xmlns="" xmlns:a16="http://schemas.microsoft.com/office/drawing/2014/main" id="{E0BBD6C8-C8F2-40C5-AA64-85961A11ADC2}"/>
               </a:ext>
             </a:extLst>
           </p:cNvPr>
@@ -7455,7 +7455,7 @@
         </p:nvSpPr>
         <p:spPr>
           <a:xfrm>
-            <a:off x="5426790" y="4494026"/>
+            <a:off x="4382601" y="3999476"/>
             <a:ext cx="728932" cy="276999"/>
           </a:xfrm>
           <a:prstGeom prst="rect">
@@ -7615,7 +7615,7 @@
           <p:cNvPr id="44" name="TextBox 43">
             <a:extLst>
               <a:ext uri="{FF2B5EF4-FFF2-40B4-BE49-F238E27FC236}">
-                <a16:creationId xmlns:a16="http://schemas.microsoft.com/office/drawing/2014/main" xmlns="" id="{E0BBD6C8-C8F2-40C5-AA64-85961A11ADC2}"/>
+                <a16:creationId xmlns="" xmlns:a16="http://schemas.microsoft.com/office/drawing/2014/main" id="{E0BBD6C8-C8F2-40C5-AA64-85961A11ADC2}"/>
               </a:ext>
             </a:extLst>
           </p:cNvPr>
@@ -7650,7 +7650,7 @@
           <p:cNvPr id="45" name="TextBox 44">
             <a:extLst>
               <a:ext uri="{FF2B5EF4-FFF2-40B4-BE49-F238E27FC236}">
-                <a16:creationId xmlns:a16="http://schemas.microsoft.com/office/drawing/2014/main" xmlns="" id="{E0BBD6C8-C8F2-40C5-AA64-85961A11ADC2}"/>
+                <a16:creationId xmlns="" xmlns:a16="http://schemas.microsoft.com/office/drawing/2014/main" id="{E0BBD6C8-C8F2-40C5-AA64-85961A11ADC2}"/>
               </a:ext>
             </a:extLst>
           </p:cNvPr>
@@ -7685,7 +7685,7 @@
           <p:cNvPr id="26" name="TextBox 25">
             <a:extLst>
               <a:ext uri="{FF2B5EF4-FFF2-40B4-BE49-F238E27FC236}">
-                <a16:creationId xmlns:a16="http://schemas.microsoft.com/office/drawing/2014/main" xmlns="" id="{6C45E26E-8FEE-4439-A34B-789237C9C62C}"/>
+                <a16:creationId xmlns="" xmlns:a16="http://schemas.microsoft.com/office/drawing/2014/main" id="{6C45E26E-8FEE-4439-A34B-789237C9C62C}"/>
               </a:ext>
             </a:extLst>
           </p:cNvPr>
@@ -7720,7 +7720,7 @@
           <p:cNvPr id="31" name="Rectangle 30">
             <a:extLst>
               <a:ext uri="{FF2B5EF4-FFF2-40B4-BE49-F238E27FC236}">
-                <a16:creationId xmlns:a16="http://schemas.microsoft.com/office/drawing/2014/main" xmlns="" id="{6D396BFC-10E0-4935-903B-EDC457BD1755}"/>
+                <a16:creationId xmlns="" xmlns:a16="http://schemas.microsoft.com/office/drawing/2014/main" id="{6D396BFC-10E0-4935-903B-EDC457BD1755}"/>
               </a:ext>
             </a:extLst>
           </p:cNvPr>
@@ -7729,7 +7729,7 @@
         </p:nvSpPr>
         <p:spPr>
           <a:xfrm>
-            <a:off x="4091638" y="5803741"/>
+            <a:off x="2337759" y="4542883"/>
             <a:ext cx="1621682" cy="657053"/>
           </a:xfrm>
           <a:prstGeom prst="rect">
@@ -7780,7 +7780,7 @@
           <p:cNvPr id="32" name="Rectangle 31">
             <a:extLst>
               <a:ext uri="{FF2B5EF4-FFF2-40B4-BE49-F238E27FC236}">
-                <a16:creationId xmlns:a16="http://schemas.microsoft.com/office/drawing/2014/main" xmlns="" id="{02A645C8-F11F-438D-92DC-F6FCCA5ECFB8}"/>
+                <a16:creationId xmlns="" xmlns:a16="http://schemas.microsoft.com/office/drawing/2014/main" id="{02A645C8-F11F-438D-92DC-F6FCCA5ECFB8}"/>
               </a:ext>
             </a:extLst>
           </p:cNvPr>
@@ -7789,7 +7789,7 @@
         </p:nvSpPr>
         <p:spPr>
           <a:xfrm>
-            <a:off x="6264710" y="5931255"/>
+            <a:off x="2741933" y="5738847"/>
             <a:ext cx="2048896" cy="657053"/>
           </a:xfrm>
           <a:prstGeom prst="rect">
@@ -7840,21 +7840,21 @@
           <p:cNvPr id="12" name="Straight Arrow Connector 11">
             <a:extLst>
               <a:ext uri="{FF2B5EF4-FFF2-40B4-BE49-F238E27FC236}">
-                <a16:creationId xmlns:a16="http://schemas.microsoft.com/office/drawing/2014/main" xmlns="" id="{FF2076CA-F897-4293-B6CD-7408EB452156}"/>
+                <a16:creationId xmlns="" xmlns:a16="http://schemas.microsoft.com/office/drawing/2014/main" id="{FF2076CA-F897-4293-B6CD-7408EB452156}"/>
               </a:ext>
             </a:extLst>
           </p:cNvPr>
           <p:cNvCxnSpPr>
             <a:cxnSpLocks/>
-            <a:stCxn id="29" idx="2"/>
-            <a:endCxn id="31" idx="0"/>
+            <a:stCxn id="29" idx="1"/>
+            <a:endCxn id="31" idx="3"/>
           </p:cNvCxnSpPr>
           <p:nvPr/>
         </p:nvCxnSpPr>
         <p:spPr>
           <a:xfrm flipH="1">
-            <a:off x="4902479" y="4366416"/>
-            <a:ext cx="864996" cy="1437325"/>
+            <a:off x="3959441" y="4347060"/>
+            <a:ext cx="1107987" cy="524350"/>
           </a:xfrm>
           <a:prstGeom prst="straightConnector1">
             <a:avLst/>
@@ -7883,21 +7883,21 @@
           <p:cNvPr id="14" name="Straight Arrow Connector 13">
             <a:extLst>
               <a:ext uri="{FF2B5EF4-FFF2-40B4-BE49-F238E27FC236}">
-                <a16:creationId xmlns:a16="http://schemas.microsoft.com/office/drawing/2014/main" xmlns="" id="{5C625B7B-4A1E-46C5-9082-4FEC89B30DA9}"/>
+                <a16:creationId xmlns="" xmlns:a16="http://schemas.microsoft.com/office/drawing/2014/main" id="{5C625B7B-4A1E-46C5-9082-4FEC89B30DA9}"/>
               </a:ext>
             </a:extLst>
           </p:cNvPr>
           <p:cNvCxnSpPr>
             <a:cxnSpLocks/>
-            <a:stCxn id="29" idx="2"/>
+            <a:stCxn id="29" idx="1"/>
             <a:endCxn id="32" idx="0"/>
           </p:cNvCxnSpPr>
           <p:nvPr/>
         </p:nvCxnSpPr>
         <p:spPr>
-          <a:xfrm>
-            <a:off x="5767475" y="4366416"/>
-            <a:ext cx="1521683" cy="1564839"/>
+          <a:xfrm flipH="1">
+            <a:off x="3766381" y="4347060"/>
+            <a:ext cx="1301047" cy="1391787"/>
           </a:xfrm>
           <a:prstGeom prst="straightConnector1">
             <a:avLst/>
@@ -7926,7 +7926,7 @@
           <p:cNvPr id="65" name="Straight Arrow Connector 64">
             <a:extLst>
               <a:ext uri="{FF2B5EF4-FFF2-40B4-BE49-F238E27FC236}">
-                <a16:creationId xmlns:a16="http://schemas.microsoft.com/office/drawing/2014/main" xmlns="" id="{C1C9B843-1D11-4D9F-8CBF-AE00E90AA070}"/>
+                <a16:creationId xmlns="" xmlns:a16="http://schemas.microsoft.com/office/drawing/2014/main" id="{C1C9B843-1D11-4D9F-8CBF-AE00E90AA070}"/>
               </a:ext>
             </a:extLst>
           </p:cNvPr>
@@ -7968,7 +7968,7 @@
           <p:cNvPr id="66" name="TextBox 65">
             <a:extLst>
               <a:ext uri="{FF2B5EF4-FFF2-40B4-BE49-F238E27FC236}">
-                <a16:creationId xmlns:a16="http://schemas.microsoft.com/office/drawing/2014/main" xmlns="" id="{5E4B2700-0522-40EF-B035-166AA1C17D76}"/>
+                <a16:creationId xmlns="" xmlns:a16="http://schemas.microsoft.com/office/drawing/2014/main" id="{5E4B2700-0522-40EF-B035-166AA1C17D76}"/>
               </a:ext>
             </a:extLst>
           </p:cNvPr>
@@ -7977,7 +7977,7 @@
         </p:nvSpPr>
         <p:spPr>
           <a:xfrm>
-            <a:off x="1972601" y="2867411"/>
+            <a:off x="2013001" y="3069920"/>
             <a:ext cx="728932" cy="276999"/>
           </a:xfrm>
           <a:prstGeom prst="rect">
@@ -8006,7 +8006,7 @@
         </p:nvSpPr>
         <p:spPr>
           <a:xfrm>
-            <a:off x="7578305" y="4589550"/>
+            <a:off x="5026286" y="5546532"/>
             <a:ext cx="1494797" cy="991056"/>
           </a:xfrm>
           <a:prstGeom prst="rect">
@@ -8056,15 +8056,15 @@
         <p:nvCxnSpPr>
           <p:cNvPr id="8" name="Straight Arrow Connector 7"/>
           <p:cNvCxnSpPr>
-            <a:stCxn id="29" idx="3"/>
-            <a:endCxn id="36" idx="1"/>
+            <a:stCxn id="29" idx="2"/>
+            <a:endCxn id="36" idx="0"/>
           </p:cNvCxnSpPr>
           <p:nvPr/>
         </p:nvCxnSpPr>
         <p:spPr>
-          <a:xfrm>
-            <a:off x="6514873" y="3870888"/>
-            <a:ext cx="1063432" cy="1214190"/>
+          <a:xfrm flipH="1">
+            <a:off x="5773685" y="4842588"/>
+            <a:ext cx="41142" cy="703944"/>
           </a:xfrm>
           <a:prstGeom prst="straightConnector1">
             <a:avLst/>
@@ -8093,7 +8093,7 @@
           <p:cNvPr id="40" name="TextBox 39">
             <a:extLst>
               <a:ext uri="{FF2B5EF4-FFF2-40B4-BE49-F238E27FC236}">
-                <a16:creationId xmlns:a16="http://schemas.microsoft.com/office/drawing/2014/main" xmlns="" id="{E0BBD6C8-C8F2-40C5-AA64-85961A11ADC2}"/>
+                <a16:creationId xmlns="" xmlns:a16="http://schemas.microsoft.com/office/drawing/2014/main" id="{E0BBD6C8-C8F2-40C5-AA64-85961A11ADC2}"/>
               </a:ext>
             </a:extLst>
           </p:cNvPr>
@@ -8102,7 +8102,7 @@
         </p:nvSpPr>
         <p:spPr>
           <a:xfrm>
-            <a:off x="7044445" y="4366416"/>
+            <a:off x="5362944" y="5025434"/>
             <a:ext cx="728932" cy="276999"/>
           </a:xfrm>
           <a:prstGeom prst="rect">
@@ -8131,7 +8131,7 @@
         </p:nvSpPr>
         <p:spPr>
           <a:xfrm>
-            <a:off x="7937456" y="3359871"/>
+            <a:off x="8331609" y="4203504"/>
             <a:ext cx="1678916" cy="991056"/>
           </a:xfrm>
           <a:prstGeom prst="rect">
@@ -8188,9 +8188,9 @@
           <p:nvPr/>
         </p:nvCxnSpPr>
         <p:spPr>
-          <a:xfrm flipH="1">
-            <a:off x="6514873" y="3855399"/>
-            <a:ext cx="1422583" cy="15489"/>
+          <a:xfrm flipH="1" flipV="1">
+            <a:off x="6562225" y="4347060"/>
+            <a:ext cx="1769384" cy="351972"/>
           </a:xfrm>
           <a:prstGeom prst="straightConnector1">
             <a:avLst/>
@@ -8219,7 +8219,7 @@
           <p:cNvPr id="48" name="TextBox 47">
             <a:extLst>
               <a:ext uri="{FF2B5EF4-FFF2-40B4-BE49-F238E27FC236}">
-                <a16:creationId xmlns:a16="http://schemas.microsoft.com/office/drawing/2014/main" xmlns="" id="{E0BBD6C8-C8F2-40C5-AA64-85961A11ADC2}"/>
+                <a16:creationId xmlns="" xmlns:a16="http://schemas.microsoft.com/office/drawing/2014/main" id="{E0BBD6C8-C8F2-40C5-AA64-85961A11ADC2}"/>
               </a:ext>
             </a:extLst>
           </p:cNvPr>
@@ -8228,7 +8228,7 @@
         </p:nvSpPr>
         <p:spPr>
           <a:xfrm>
-            <a:off x="6902467" y="3620700"/>
+            <a:off x="6737471" y="4395029"/>
             <a:ext cx="1062021" cy="461665"/>
           </a:xfrm>
           <a:prstGeom prst="rect">
@@ -8261,7 +8261,7 @@
           <p:cNvPr id="52" name="Rectangle 51">
             <a:extLst>
               <a:ext uri="{FF2B5EF4-FFF2-40B4-BE49-F238E27FC236}">
-                <a16:creationId xmlns:a16="http://schemas.microsoft.com/office/drawing/2014/main" xmlns="" id="{21B869D6-66CB-4B38-975F-B7FEB6AA9B13}"/>
+                <a16:creationId xmlns="" xmlns:a16="http://schemas.microsoft.com/office/drawing/2014/main" id="{21B869D6-66CB-4B38-975F-B7FEB6AA9B13}"/>
               </a:ext>
             </a:extLst>
           </p:cNvPr>
@@ -8270,8 +8270,8 @@
         </p:nvSpPr>
         <p:spPr>
           <a:xfrm>
-            <a:off x="8998997" y="2805761"/>
-            <a:ext cx="2866644" cy="224286"/>
+            <a:off x="7748867" y="6138579"/>
+            <a:ext cx="2844400" cy="224286"/>
           </a:xfrm>
           <a:prstGeom prst="rect">
             <a:avLst/>
@@ -8314,15 +8314,15 @@
         <p:nvCxnSpPr>
           <p:cNvPr id="51" name="Straight Arrow Connector 50"/>
           <p:cNvCxnSpPr>
-            <a:stCxn id="46" idx="3"/>
-            <a:endCxn id="52" idx="2"/>
+            <a:stCxn id="46" idx="2"/>
+            <a:endCxn id="52" idx="0"/>
           </p:cNvCxnSpPr>
           <p:nvPr/>
         </p:nvCxnSpPr>
         <p:spPr>
-          <a:xfrm flipV="1">
-            <a:off x="9616372" y="3030047"/>
-            <a:ext cx="815947" cy="825352"/>
+          <a:xfrm>
+            <a:off x="9171067" y="5194560"/>
+            <a:ext cx="0" cy="944019"/>
           </a:xfrm>
           <a:prstGeom prst="straightConnector1">
             <a:avLst/>
@@ -8350,15 +8350,15 @@
         <p:nvCxnSpPr>
           <p:cNvPr id="55" name="Straight Arrow Connector 54"/>
           <p:cNvCxnSpPr>
-            <a:stCxn id="52" idx="2"/>
-            <a:endCxn id="46" idx="3"/>
+            <a:stCxn id="52" idx="0"/>
+            <a:endCxn id="46" idx="2"/>
           </p:cNvCxnSpPr>
           <p:nvPr/>
         </p:nvCxnSpPr>
         <p:spPr>
-          <a:xfrm flipH="1">
-            <a:off x="9616372" y="3030047"/>
-            <a:ext cx="815947" cy="825352"/>
+          <a:xfrm flipV="1">
+            <a:off x="9171067" y="5194560"/>
+            <a:ext cx="0" cy="944019"/>
           </a:xfrm>
           <a:prstGeom prst="straightConnector1">
             <a:avLst/>
@@ -8387,7 +8387,7 @@
           <p:cNvPr id="58" name="TextBox 57">
             <a:extLst>
               <a:ext uri="{FF2B5EF4-FFF2-40B4-BE49-F238E27FC236}">
-                <a16:creationId xmlns:a16="http://schemas.microsoft.com/office/drawing/2014/main" xmlns="" id="{E0BBD6C8-C8F2-40C5-AA64-85961A11ADC2}"/>
+                <a16:creationId xmlns="" xmlns:a16="http://schemas.microsoft.com/office/drawing/2014/main" id="{E0BBD6C8-C8F2-40C5-AA64-85961A11ADC2}"/>
               </a:ext>
             </a:extLst>
           </p:cNvPr>
@@ -8396,7 +8396,7 @@
         </p:nvSpPr>
         <p:spPr>
           <a:xfrm>
-            <a:off x="9937201" y="3411519"/>
+            <a:off x="9171067" y="5480936"/>
             <a:ext cx="1063847" cy="276999"/>
           </a:xfrm>
           <a:prstGeom prst="rect">
@@ -8415,6 +8415,273 @@
               <a:t>processes</a:t>
             </a:r>
             <a:endParaRPr lang="en-US" sz="1200" dirty="0"/>
+          </a:p>
+        </p:txBody>
+      </p:sp>
+      <p:sp>
+        <p:nvSpPr>
+          <p:cNvPr id="49" name="Rectangle 48"/>
+          <p:cNvSpPr/>
+          <p:nvPr/>
+        </p:nvSpPr>
+        <p:spPr>
+          <a:xfrm>
+            <a:off x="1218040" y="1666279"/>
+            <a:ext cx="1589922" cy="991056"/>
+          </a:xfrm>
+          <a:prstGeom prst="rect">
+            <a:avLst/>
+          </a:prstGeom>
+          <a:solidFill>
+            <a:schemeClr val="accent6"/>
+          </a:solidFill>
+        </p:spPr>
+        <p:style>
+          <a:lnRef idx="2">
+            <a:schemeClr val="accent1">
+              <a:shade val="50000"/>
+            </a:schemeClr>
+          </a:lnRef>
+          <a:fillRef idx="1">
+            <a:schemeClr val="accent1"/>
+          </a:fillRef>
+          <a:effectRef idx="0">
+            <a:schemeClr val="accent1"/>
+          </a:effectRef>
+          <a:fontRef idx="minor">
+            <a:schemeClr val="lt1"/>
+          </a:fontRef>
+        </p:style>
+        <p:txBody>
+          <a:bodyPr rtlCol="0" anchor="ctr"/>
+          <a:lstStyle/>
+          <a:p>
+            <a:pPr algn="ctr"/>
+            <a:r>
+              <a:rPr lang="en-US" sz="1000" dirty="0"/>
+              <a:t>com.tlw8253.dao</a:t>
+            </a:r>
+          </a:p>
+          <a:p>
+            <a:pPr algn="ctr"/>
+            <a:r>
+              <a:rPr lang="en-US" sz="1500" dirty="0" err="1"/>
+              <a:t>AccountDAOImpl</a:t>
+            </a:r>
+            <a:endParaRPr lang="en-US" sz="1500" dirty="0"/>
+          </a:p>
+        </p:txBody>
+      </p:sp>
+      <p:cxnSp>
+        <p:nvCxnSpPr>
+          <p:cNvPr id="7" name="Straight Arrow Connector 6"/>
+          <p:cNvCxnSpPr>
+            <a:stCxn id="20" idx="1"/>
+            <a:endCxn id="49" idx="3"/>
+          </p:cNvCxnSpPr>
+          <p:nvPr/>
+        </p:nvCxnSpPr>
+        <p:spPr>
+          <a:xfrm flipH="1">
+            <a:off x="2807962" y="2147290"/>
+            <a:ext cx="2212114" cy="14517"/>
+          </a:xfrm>
+          <a:prstGeom prst="straightConnector1">
+            <a:avLst/>
+          </a:prstGeom>
+          <a:ln>
+            <a:tailEnd type="triangle"/>
+          </a:ln>
+        </p:spPr>
+        <p:style>
+          <a:lnRef idx="1">
+            <a:schemeClr val="accent1"/>
+          </a:lnRef>
+          <a:fillRef idx="0">
+            <a:schemeClr val="accent1"/>
+          </a:fillRef>
+          <a:effectRef idx="0">
+            <a:schemeClr val="accent1"/>
+          </a:effectRef>
+          <a:fontRef idx="minor">
+            <a:schemeClr val="tx1"/>
+          </a:fontRef>
+        </p:style>
+      </p:cxnSp>
+      <p:sp>
+        <p:nvSpPr>
+          <p:cNvPr id="50" name="TextBox 49">
+            <a:extLst>
+              <a:ext uri="{FF2B5EF4-FFF2-40B4-BE49-F238E27FC236}">
+                <a16:creationId xmlns="" xmlns:a16="http://schemas.microsoft.com/office/drawing/2014/main" id="{E0BBD6C8-C8F2-40C5-AA64-85961A11ADC2}"/>
+              </a:ext>
+            </a:extLst>
+          </p:cNvPr>
+          <p:cNvSpPr txBox="1"/>
+          <p:nvPr/>
+        </p:nvSpPr>
+        <p:spPr>
+          <a:xfrm>
+            <a:off x="4002206" y="1879944"/>
+            <a:ext cx="728932" cy="276999"/>
+          </a:xfrm>
+          <a:prstGeom prst="rect">
+            <a:avLst/>
+          </a:prstGeom>
+          <a:noFill/>
+        </p:spPr>
+        <p:txBody>
+          <a:bodyPr wrap="square" rtlCol="0">
+            <a:spAutoFit/>
+          </a:bodyPr>
+          <a:lstStyle/>
+          <a:p>
+            <a:r>
+              <a:rPr lang="en-US" sz="1200" dirty="0"/>
+              <a:t>uses</a:t>
+            </a:r>
+          </a:p>
+        </p:txBody>
+      </p:sp>
+      <p:cxnSp>
+        <p:nvCxnSpPr>
+          <p:cNvPr id="91" name="Straight Arrow Connector 90"/>
+          <p:cNvCxnSpPr>
+            <a:stCxn id="29" idx="0"/>
+            <a:endCxn id="15" idx="1"/>
+          </p:cNvCxnSpPr>
+          <p:nvPr/>
+        </p:nvCxnSpPr>
+        <p:spPr>
+          <a:xfrm flipV="1">
+            <a:off x="5814827" y="3117932"/>
+            <a:ext cx="1589922" cy="733600"/>
+          </a:xfrm>
+          <a:prstGeom prst="straightConnector1">
+            <a:avLst/>
+          </a:prstGeom>
+          <a:ln>
+            <a:tailEnd type="triangle"/>
+          </a:ln>
+        </p:spPr>
+        <p:style>
+          <a:lnRef idx="1">
+            <a:schemeClr val="accent1"/>
+          </a:lnRef>
+          <a:fillRef idx="0">
+            <a:schemeClr val="accent1"/>
+          </a:fillRef>
+          <a:effectRef idx="0">
+            <a:schemeClr val="accent1"/>
+          </a:effectRef>
+          <a:fontRef idx="minor">
+            <a:schemeClr val="tx1"/>
+          </a:fontRef>
+        </p:style>
+      </p:cxnSp>
+      <p:cxnSp>
+        <p:nvCxnSpPr>
+          <p:cNvPr id="93" name="Straight Arrow Connector 92"/>
+          <p:cNvCxnSpPr>
+            <a:stCxn id="46" idx="0"/>
+            <a:endCxn id="15" idx="2"/>
+          </p:cNvCxnSpPr>
+          <p:nvPr/>
+        </p:nvCxnSpPr>
+        <p:spPr>
+          <a:xfrm flipH="1" flipV="1">
+            <a:off x="8152148" y="3613460"/>
+            <a:ext cx="1018919" cy="590044"/>
+          </a:xfrm>
+          <a:prstGeom prst="straightConnector1">
+            <a:avLst/>
+          </a:prstGeom>
+          <a:ln>
+            <a:tailEnd type="triangle"/>
+          </a:ln>
+        </p:spPr>
+        <p:style>
+          <a:lnRef idx="1">
+            <a:schemeClr val="accent1"/>
+          </a:lnRef>
+          <a:fillRef idx="0">
+            <a:schemeClr val="accent1"/>
+          </a:fillRef>
+          <a:effectRef idx="0">
+            <a:schemeClr val="accent1"/>
+          </a:effectRef>
+          <a:fontRef idx="minor">
+            <a:schemeClr val="tx1"/>
+          </a:fontRef>
+        </p:style>
+      </p:cxnSp>
+      <p:sp>
+        <p:nvSpPr>
+          <p:cNvPr id="94" name="TextBox 93">
+            <a:extLst>
+              <a:ext uri="{FF2B5EF4-FFF2-40B4-BE49-F238E27FC236}">
+                <a16:creationId xmlns="" xmlns:a16="http://schemas.microsoft.com/office/drawing/2014/main" id="{E0BBD6C8-C8F2-40C5-AA64-85961A11ADC2}"/>
+              </a:ext>
+            </a:extLst>
+          </p:cNvPr>
+          <p:cNvSpPr txBox="1"/>
+          <p:nvPr/>
+        </p:nvSpPr>
+        <p:spPr>
+          <a:xfrm>
+            <a:off x="8861864" y="3761336"/>
+            <a:ext cx="728932" cy="276999"/>
+          </a:xfrm>
+          <a:prstGeom prst="rect">
+            <a:avLst/>
+          </a:prstGeom>
+          <a:noFill/>
+        </p:spPr>
+        <p:txBody>
+          <a:bodyPr wrap="square" rtlCol="0">
+            <a:spAutoFit/>
+          </a:bodyPr>
+          <a:lstStyle/>
+          <a:p>
+            <a:r>
+              <a:rPr lang="en-US" sz="1200" dirty="0"/>
+              <a:t>uses</a:t>
+            </a:r>
+          </a:p>
+        </p:txBody>
+      </p:sp>
+      <p:sp>
+        <p:nvSpPr>
+          <p:cNvPr id="95" name="TextBox 94">
+            <a:extLst>
+              <a:ext uri="{FF2B5EF4-FFF2-40B4-BE49-F238E27FC236}">
+                <a16:creationId xmlns="" xmlns:a16="http://schemas.microsoft.com/office/drawing/2014/main" id="{E0BBD6C8-C8F2-40C5-AA64-85961A11ADC2}"/>
+              </a:ext>
+            </a:extLst>
+          </p:cNvPr>
+          <p:cNvSpPr txBox="1"/>
+          <p:nvPr/>
+        </p:nvSpPr>
+        <p:spPr>
+          <a:xfrm>
+            <a:off x="6505919" y="3378345"/>
+            <a:ext cx="728932" cy="276999"/>
+          </a:xfrm>
+          <a:prstGeom prst="rect">
+            <a:avLst/>
+          </a:prstGeom>
+          <a:noFill/>
+        </p:spPr>
+        <p:txBody>
+          <a:bodyPr wrap="square" rtlCol="0">
+            <a:spAutoFit/>
+          </a:bodyPr>
+          <a:lstStyle/>
+          <a:p>
+            <a:r>
+              <a:rPr lang="en-US" sz="1200" dirty="0"/>
+              <a:t>uses</a:t>
+            </a:r>
           </a:p>
         </p:txBody>
       </p:sp>
@@ -8621,7 +8888,7 @@
           <p:cNvPr id="11" name="TextBox 10">
             <a:extLst>
               <a:ext uri="{FF2B5EF4-FFF2-40B4-BE49-F238E27FC236}">
-                <a16:creationId xmlns:a16="http://schemas.microsoft.com/office/drawing/2014/main" xmlns="" id="{E0BBD6C8-C8F2-40C5-AA64-85961A11ADC2}"/>
+                <a16:creationId xmlns="" xmlns:a16="http://schemas.microsoft.com/office/drawing/2014/main" id="{E0BBD6C8-C8F2-40C5-AA64-85961A11ADC2}"/>
               </a:ext>
             </a:extLst>
           </p:cNvPr>
@@ -8775,7 +9042,7 @@
           <p:cNvPr id="19" name="TextBox 18">
             <a:extLst>
               <a:ext uri="{FF2B5EF4-FFF2-40B4-BE49-F238E27FC236}">
-                <a16:creationId xmlns:a16="http://schemas.microsoft.com/office/drawing/2014/main" xmlns="" id="{E0BBD6C8-C8F2-40C5-AA64-85961A11ADC2}"/>
+                <a16:creationId xmlns="" xmlns:a16="http://schemas.microsoft.com/office/drawing/2014/main" id="{E0BBD6C8-C8F2-40C5-AA64-85961A11ADC2}"/>
               </a:ext>
             </a:extLst>
           </p:cNvPr>
@@ -8905,7 +9172,7 @@
           <p:cNvPr id="23" name="TextBox 22">
             <a:extLst>
               <a:ext uri="{FF2B5EF4-FFF2-40B4-BE49-F238E27FC236}">
-                <a16:creationId xmlns:a16="http://schemas.microsoft.com/office/drawing/2014/main" xmlns="" id="{E0BBD6C8-C8F2-40C5-AA64-85961A11ADC2}"/>
+                <a16:creationId xmlns="" xmlns:a16="http://schemas.microsoft.com/office/drawing/2014/main" id="{E0BBD6C8-C8F2-40C5-AA64-85961A11ADC2}"/>
               </a:ext>
             </a:extLst>
           </p:cNvPr>
@@ -9022,7 +9289,7 @@
           <p:cNvPr id="28" name="TextBox 27">
             <a:extLst>
               <a:ext uri="{FF2B5EF4-FFF2-40B4-BE49-F238E27FC236}">
-                <a16:creationId xmlns:a16="http://schemas.microsoft.com/office/drawing/2014/main" xmlns="" id="{E0BBD6C8-C8F2-40C5-AA64-85961A11ADC2}"/>
+                <a16:creationId xmlns="" xmlns:a16="http://schemas.microsoft.com/office/drawing/2014/main" id="{E0BBD6C8-C8F2-40C5-AA64-85961A11ADC2}"/>
               </a:ext>
             </a:extLst>
           </p:cNvPr>
@@ -9146,7 +9413,7 @@
           <p:cNvPr id="34" name="TextBox 33">
             <a:extLst>
               <a:ext uri="{FF2B5EF4-FFF2-40B4-BE49-F238E27FC236}">
-                <a16:creationId xmlns:a16="http://schemas.microsoft.com/office/drawing/2014/main" xmlns="" id="{E0BBD6C8-C8F2-40C5-AA64-85961A11ADC2}"/>
+                <a16:creationId xmlns="" xmlns:a16="http://schemas.microsoft.com/office/drawing/2014/main" id="{E0BBD6C8-C8F2-40C5-AA64-85961A11ADC2}"/>
               </a:ext>
             </a:extLst>
           </p:cNvPr>
@@ -9272,7 +9539,7 @@
           <p:cNvPr id="38" name="TextBox 37">
             <a:extLst>
               <a:ext uri="{FF2B5EF4-FFF2-40B4-BE49-F238E27FC236}">
-                <a16:creationId xmlns:a16="http://schemas.microsoft.com/office/drawing/2014/main" xmlns="" id="{E0BBD6C8-C8F2-40C5-AA64-85961A11ADC2}"/>
+                <a16:creationId xmlns="" xmlns:a16="http://schemas.microsoft.com/office/drawing/2014/main" id="{E0BBD6C8-C8F2-40C5-AA64-85961A11ADC2}"/>
               </a:ext>
             </a:extLst>
           </p:cNvPr>
@@ -9440,7 +9707,7 @@
           <p:cNvPr id="44" name="TextBox 43">
             <a:extLst>
               <a:ext uri="{FF2B5EF4-FFF2-40B4-BE49-F238E27FC236}">
-                <a16:creationId xmlns:a16="http://schemas.microsoft.com/office/drawing/2014/main" xmlns="" id="{E0BBD6C8-C8F2-40C5-AA64-85961A11ADC2}"/>
+                <a16:creationId xmlns="" xmlns:a16="http://schemas.microsoft.com/office/drawing/2014/main" id="{E0BBD6C8-C8F2-40C5-AA64-85961A11ADC2}"/>
               </a:ext>
             </a:extLst>
           </p:cNvPr>
@@ -9475,7 +9742,7 @@
           <p:cNvPr id="45" name="TextBox 44">
             <a:extLst>
               <a:ext uri="{FF2B5EF4-FFF2-40B4-BE49-F238E27FC236}">
-                <a16:creationId xmlns:a16="http://schemas.microsoft.com/office/drawing/2014/main" xmlns="" id="{E0BBD6C8-C8F2-40C5-AA64-85961A11ADC2}"/>
+                <a16:creationId xmlns="" xmlns:a16="http://schemas.microsoft.com/office/drawing/2014/main" id="{E0BBD6C8-C8F2-40C5-AA64-85961A11ADC2}"/>
               </a:ext>
             </a:extLst>
           </p:cNvPr>
@@ -9510,7 +9777,7 @@
           <p:cNvPr id="26" name="TextBox 25">
             <a:extLst>
               <a:ext uri="{FF2B5EF4-FFF2-40B4-BE49-F238E27FC236}">
-                <a16:creationId xmlns:a16="http://schemas.microsoft.com/office/drawing/2014/main" xmlns="" id="{6C45E26E-8FEE-4439-A34B-789237C9C62C}"/>
+                <a16:creationId xmlns="" xmlns:a16="http://schemas.microsoft.com/office/drawing/2014/main" id="{6C45E26E-8FEE-4439-A34B-789237C9C62C}"/>
               </a:ext>
             </a:extLst>
           </p:cNvPr>
@@ -9545,7 +9812,7 @@
           <p:cNvPr id="31" name="Rectangle 30">
             <a:extLst>
               <a:ext uri="{FF2B5EF4-FFF2-40B4-BE49-F238E27FC236}">
-                <a16:creationId xmlns:a16="http://schemas.microsoft.com/office/drawing/2014/main" xmlns="" id="{6D396BFC-10E0-4935-903B-EDC457BD1755}"/>
+                <a16:creationId xmlns="" xmlns:a16="http://schemas.microsoft.com/office/drawing/2014/main" id="{6D396BFC-10E0-4935-903B-EDC457BD1755}"/>
               </a:ext>
             </a:extLst>
           </p:cNvPr>
@@ -9605,7 +9872,7 @@
           <p:cNvPr id="32" name="Rectangle 31">
             <a:extLst>
               <a:ext uri="{FF2B5EF4-FFF2-40B4-BE49-F238E27FC236}">
-                <a16:creationId xmlns:a16="http://schemas.microsoft.com/office/drawing/2014/main" xmlns="" id="{02A645C8-F11F-438D-92DC-F6FCCA5ECFB8}"/>
+                <a16:creationId xmlns="" xmlns:a16="http://schemas.microsoft.com/office/drawing/2014/main" id="{02A645C8-F11F-438D-92DC-F6FCCA5ECFB8}"/>
               </a:ext>
             </a:extLst>
           </p:cNvPr>
@@ -9669,7 +9936,7 @@
           <p:cNvPr id="12" name="Straight Arrow Connector 11">
             <a:extLst>
               <a:ext uri="{FF2B5EF4-FFF2-40B4-BE49-F238E27FC236}">
-                <a16:creationId xmlns:a16="http://schemas.microsoft.com/office/drawing/2014/main" xmlns="" id="{FF2076CA-F897-4293-B6CD-7408EB452156}"/>
+                <a16:creationId xmlns="" xmlns:a16="http://schemas.microsoft.com/office/drawing/2014/main" id="{FF2076CA-F897-4293-B6CD-7408EB452156}"/>
               </a:ext>
             </a:extLst>
           </p:cNvPr>
@@ -9712,7 +9979,7 @@
           <p:cNvPr id="14" name="Straight Arrow Connector 13">
             <a:extLst>
               <a:ext uri="{FF2B5EF4-FFF2-40B4-BE49-F238E27FC236}">
-                <a16:creationId xmlns:a16="http://schemas.microsoft.com/office/drawing/2014/main" xmlns="" id="{5C625B7B-4A1E-46C5-9082-4FEC89B30DA9}"/>
+                <a16:creationId xmlns="" xmlns:a16="http://schemas.microsoft.com/office/drawing/2014/main" id="{5C625B7B-4A1E-46C5-9082-4FEC89B30DA9}"/>
               </a:ext>
             </a:extLst>
           </p:cNvPr>
@@ -9755,7 +10022,7 @@
           <p:cNvPr id="10" name="Straight Arrow Connector 9">
             <a:extLst>
               <a:ext uri="{FF2B5EF4-FFF2-40B4-BE49-F238E27FC236}">
-                <a16:creationId xmlns:a16="http://schemas.microsoft.com/office/drawing/2014/main" xmlns="" id="{EF2F45FB-579D-4721-9889-3C0942B8BBFD}"/>
+                <a16:creationId xmlns="" xmlns:a16="http://schemas.microsoft.com/office/drawing/2014/main" id="{EF2F45FB-579D-4721-9889-3C0942B8BBFD}"/>
               </a:ext>
             </a:extLst>
           </p:cNvPr>
@@ -9797,7 +10064,7 @@
           <p:cNvPr id="56" name="Rectangle 55">
             <a:extLst>
               <a:ext uri="{FF2B5EF4-FFF2-40B4-BE49-F238E27FC236}">
-                <a16:creationId xmlns:a16="http://schemas.microsoft.com/office/drawing/2014/main" xmlns="" id="{FA9C2261-AEDB-43AC-86CF-E53B84AB67B0}"/>
+                <a16:creationId xmlns="" xmlns:a16="http://schemas.microsoft.com/office/drawing/2014/main" id="{FA9C2261-AEDB-43AC-86CF-E53B84AB67B0}"/>
               </a:ext>
             </a:extLst>
           </p:cNvPr>
@@ -9887,7 +10154,7 @@
           <p:cNvPr id="61" name="Straight Arrow Connector 60">
             <a:extLst>
               <a:ext uri="{FF2B5EF4-FFF2-40B4-BE49-F238E27FC236}">
-                <a16:creationId xmlns:a16="http://schemas.microsoft.com/office/drawing/2014/main" xmlns="" id="{7A03C540-BE87-4015-8AA4-52E27BB970EE}"/>
+                <a16:creationId xmlns="" xmlns:a16="http://schemas.microsoft.com/office/drawing/2014/main" id="{7A03C540-BE87-4015-8AA4-52E27BB970EE}"/>
               </a:ext>
             </a:extLst>
           </p:cNvPr>
@@ -9929,7 +10196,7 @@
           <p:cNvPr id="63" name="TextBox 62">
             <a:extLst>
               <a:ext uri="{FF2B5EF4-FFF2-40B4-BE49-F238E27FC236}">
-                <a16:creationId xmlns:a16="http://schemas.microsoft.com/office/drawing/2014/main" xmlns="" id="{6A85EB8F-D36A-4163-A076-FD01F5C08B59}"/>
+                <a16:creationId xmlns="" xmlns:a16="http://schemas.microsoft.com/office/drawing/2014/main" id="{6A85EB8F-D36A-4163-A076-FD01F5C08B59}"/>
               </a:ext>
             </a:extLst>
           </p:cNvPr>
@@ -9964,7 +10231,7 @@
           <p:cNvPr id="64" name="TextBox 63">
             <a:extLst>
               <a:ext uri="{FF2B5EF4-FFF2-40B4-BE49-F238E27FC236}">
-                <a16:creationId xmlns:a16="http://schemas.microsoft.com/office/drawing/2014/main" xmlns="" id="{B306D2D8-E0F7-47AC-8F2B-DF5F03898A81}"/>
+                <a16:creationId xmlns="" xmlns:a16="http://schemas.microsoft.com/office/drawing/2014/main" id="{B306D2D8-E0F7-47AC-8F2B-DF5F03898A81}"/>
               </a:ext>
             </a:extLst>
           </p:cNvPr>
@@ -10045,11 +10312,7 @@
             <a:pPr algn="ctr"/>
             <a:r>
               <a:rPr lang="en-US" sz="1600" dirty="0" smtClean="0"/>
-              <a:t>&lt;T&gt;</a:t>
-            </a:r>
-            <a:r>
-              <a:rPr lang="en-US" sz="1600" dirty="0" smtClean="0"/>
-              <a:t>Controller</a:t>
+              <a:t>&lt;T&gt;Controller</a:t>
             </a:r>
             <a:endParaRPr lang="en-US" sz="1600" dirty="0"/>
           </a:p>
@@ -10096,7 +10359,7 @@
           <p:cNvPr id="46" name="TextBox 45">
             <a:extLst>
               <a:ext uri="{FF2B5EF4-FFF2-40B4-BE49-F238E27FC236}">
-                <a16:creationId xmlns:a16="http://schemas.microsoft.com/office/drawing/2014/main" xmlns="" id="{E0BBD6C8-C8F2-40C5-AA64-85961A11ADC2}"/>
+                <a16:creationId xmlns="" xmlns:a16="http://schemas.microsoft.com/office/drawing/2014/main" id="{E0BBD6C8-C8F2-40C5-AA64-85961A11ADC2}"/>
               </a:ext>
             </a:extLst>
           </p:cNvPr>
@@ -10336,7 +10599,7 @@
           <p:cNvPr id="11" name="TextBox 10">
             <a:extLst>
               <a:ext uri="{FF2B5EF4-FFF2-40B4-BE49-F238E27FC236}">
-                <a16:creationId xmlns:a16="http://schemas.microsoft.com/office/drawing/2014/main" xmlns="" id="{E0BBD6C8-C8F2-40C5-AA64-85961A11ADC2}"/>
+                <a16:creationId xmlns="" xmlns:a16="http://schemas.microsoft.com/office/drawing/2014/main" id="{E0BBD6C8-C8F2-40C5-AA64-85961A11ADC2}"/>
               </a:ext>
             </a:extLst>
           </p:cNvPr>
@@ -10493,7 +10756,7 @@
           <p:cNvPr id="19" name="TextBox 18">
             <a:extLst>
               <a:ext uri="{FF2B5EF4-FFF2-40B4-BE49-F238E27FC236}">
-                <a16:creationId xmlns:a16="http://schemas.microsoft.com/office/drawing/2014/main" xmlns="" id="{E0BBD6C8-C8F2-40C5-AA64-85961A11ADC2}"/>
+                <a16:creationId xmlns="" xmlns:a16="http://schemas.microsoft.com/office/drawing/2014/main" id="{E0BBD6C8-C8F2-40C5-AA64-85961A11ADC2}"/>
               </a:ext>
             </a:extLst>
           </p:cNvPr>
@@ -10619,7 +10882,7 @@
           <p:cNvPr id="23" name="TextBox 22">
             <a:extLst>
               <a:ext uri="{FF2B5EF4-FFF2-40B4-BE49-F238E27FC236}">
-                <a16:creationId xmlns:a16="http://schemas.microsoft.com/office/drawing/2014/main" xmlns="" id="{E0BBD6C8-C8F2-40C5-AA64-85961A11ADC2}"/>
+                <a16:creationId xmlns="" xmlns:a16="http://schemas.microsoft.com/office/drawing/2014/main" id="{E0BBD6C8-C8F2-40C5-AA64-85961A11ADC2}"/>
               </a:ext>
             </a:extLst>
           </p:cNvPr>
@@ -10736,7 +10999,7 @@
           <p:cNvPr id="28" name="TextBox 27">
             <a:extLst>
               <a:ext uri="{FF2B5EF4-FFF2-40B4-BE49-F238E27FC236}">
-                <a16:creationId xmlns:a16="http://schemas.microsoft.com/office/drawing/2014/main" xmlns="" id="{E0BBD6C8-C8F2-40C5-AA64-85961A11ADC2}"/>
+                <a16:creationId xmlns="" xmlns:a16="http://schemas.microsoft.com/office/drawing/2014/main" id="{E0BBD6C8-C8F2-40C5-AA64-85961A11ADC2}"/>
               </a:ext>
             </a:extLst>
           </p:cNvPr>
@@ -10861,7 +11124,7 @@
           <p:cNvPr id="34" name="TextBox 33">
             <a:extLst>
               <a:ext uri="{FF2B5EF4-FFF2-40B4-BE49-F238E27FC236}">
-                <a16:creationId xmlns:a16="http://schemas.microsoft.com/office/drawing/2014/main" xmlns="" id="{E0BBD6C8-C8F2-40C5-AA64-85961A11ADC2}"/>
+                <a16:creationId xmlns="" xmlns:a16="http://schemas.microsoft.com/office/drawing/2014/main" id="{E0BBD6C8-C8F2-40C5-AA64-85961A11ADC2}"/>
               </a:ext>
             </a:extLst>
           </p:cNvPr>
@@ -10987,7 +11250,7 @@
           <p:cNvPr id="38" name="TextBox 37">
             <a:extLst>
               <a:ext uri="{FF2B5EF4-FFF2-40B4-BE49-F238E27FC236}">
-                <a16:creationId xmlns:a16="http://schemas.microsoft.com/office/drawing/2014/main" xmlns="" id="{E0BBD6C8-C8F2-40C5-AA64-85961A11ADC2}"/>
+                <a16:creationId xmlns="" xmlns:a16="http://schemas.microsoft.com/office/drawing/2014/main" id="{E0BBD6C8-C8F2-40C5-AA64-85961A11ADC2}"/>
               </a:ext>
             </a:extLst>
           </p:cNvPr>
@@ -11155,7 +11418,7 @@
           <p:cNvPr id="44" name="TextBox 43">
             <a:extLst>
               <a:ext uri="{FF2B5EF4-FFF2-40B4-BE49-F238E27FC236}">
-                <a16:creationId xmlns:a16="http://schemas.microsoft.com/office/drawing/2014/main" xmlns="" id="{E0BBD6C8-C8F2-40C5-AA64-85961A11ADC2}"/>
+                <a16:creationId xmlns="" xmlns:a16="http://schemas.microsoft.com/office/drawing/2014/main" id="{E0BBD6C8-C8F2-40C5-AA64-85961A11ADC2}"/>
               </a:ext>
             </a:extLst>
           </p:cNvPr>
@@ -11190,7 +11453,7 @@
           <p:cNvPr id="45" name="TextBox 44">
             <a:extLst>
               <a:ext uri="{FF2B5EF4-FFF2-40B4-BE49-F238E27FC236}">
-                <a16:creationId xmlns:a16="http://schemas.microsoft.com/office/drawing/2014/main" xmlns="" id="{E0BBD6C8-C8F2-40C5-AA64-85961A11ADC2}"/>
+                <a16:creationId xmlns="" xmlns:a16="http://schemas.microsoft.com/office/drawing/2014/main" id="{E0BBD6C8-C8F2-40C5-AA64-85961A11ADC2}"/>
               </a:ext>
             </a:extLst>
           </p:cNvPr>
@@ -11225,7 +11488,7 @@
           <p:cNvPr id="26" name="TextBox 25">
             <a:extLst>
               <a:ext uri="{FF2B5EF4-FFF2-40B4-BE49-F238E27FC236}">
-                <a16:creationId xmlns:a16="http://schemas.microsoft.com/office/drawing/2014/main" xmlns="" id="{6C45E26E-8FEE-4439-A34B-789237C9C62C}"/>
+                <a16:creationId xmlns="" xmlns:a16="http://schemas.microsoft.com/office/drawing/2014/main" id="{6C45E26E-8FEE-4439-A34B-789237C9C62C}"/>
               </a:ext>
             </a:extLst>
           </p:cNvPr>
@@ -11260,7 +11523,7 @@
           <p:cNvPr id="31" name="Rectangle 30">
             <a:extLst>
               <a:ext uri="{FF2B5EF4-FFF2-40B4-BE49-F238E27FC236}">
-                <a16:creationId xmlns:a16="http://schemas.microsoft.com/office/drawing/2014/main" xmlns="" id="{6D396BFC-10E0-4935-903B-EDC457BD1755}"/>
+                <a16:creationId xmlns="" xmlns:a16="http://schemas.microsoft.com/office/drawing/2014/main" id="{6D396BFC-10E0-4935-903B-EDC457BD1755}"/>
               </a:ext>
             </a:extLst>
           </p:cNvPr>
@@ -11320,7 +11583,7 @@
           <p:cNvPr id="32" name="Rectangle 31">
             <a:extLst>
               <a:ext uri="{FF2B5EF4-FFF2-40B4-BE49-F238E27FC236}">
-                <a16:creationId xmlns:a16="http://schemas.microsoft.com/office/drawing/2014/main" xmlns="" id="{02A645C8-F11F-438D-92DC-F6FCCA5ECFB8}"/>
+                <a16:creationId xmlns="" xmlns:a16="http://schemas.microsoft.com/office/drawing/2014/main" id="{02A645C8-F11F-438D-92DC-F6FCCA5ECFB8}"/>
               </a:ext>
             </a:extLst>
           </p:cNvPr>
@@ -11380,7 +11643,7 @@
           <p:cNvPr id="12" name="Straight Arrow Connector 11">
             <a:extLst>
               <a:ext uri="{FF2B5EF4-FFF2-40B4-BE49-F238E27FC236}">
-                <a16:creationId xmlns:a16="http://schemas.microsoft.com/office/drawing/2014/main" xmlns="" id="{FF2076CA-F897-4293-B6CD-7408EB452156}"/>
+                <a16:creationId xmlns="" xmlns:a16="http://schemas.microsoft.com/office/drawing/2014/main" id="{FF2076CA-F897-4293-B6CD-7408EB452156}"/>
               </a:ext>
             </a:extLst>
           </p:cNvPr>
@@ -11423,7 +11686,7 @@
           <p:cNvPr id="14" name="Straight Arrow Connector 13">
             <a:extLst>
               <a:ext uri="{FF2B5EF4-FFF2-40B4-BE49-F238E27FC236}">
-                <a16:creationId xmlns:a16="http://schemas.microsoft.com/office/drawing/2014/main" xmlns="" id="{5C625B7B-4A1E-46C5-9082-4FEC89B30DA9}"/>
+                <a16:creationId xmlns="" xmlns:a16="http://schemas.microsoft.com/office/drawing/2014/main" id="{5C625B7B-4A1E-46C5-9082-4FEC89B30DA9}"/>
               </a:ext>
             </a:extLst>
           </p:cNvPr>
@@ -11466,7 +11729,7 @@
           <p:cNvPr id="10" name="Straight Arrow Connector 9">
             <a:extLst>
               <a:ext uri="{FF2B5EF4-FFF2-40B4-BE49-F238E27FC236}">
-                <a16:creationId xmlns:a16="http://schemas.microsoft.com/office/drawing/2014/main" xmlns="" id="{EF2F45FB-579D-4721-9889-3C0942B8BBFD}"/>
+                <a16:creationId xmlns="" xmlns:a16="http://schemas.microsoft.com/office/drawing/2014/main" id="{EF2F45FB-579D-4721-9889-3C0942B8BBFD}"/>
               </a:ext>
             </a:extLst>
           </p:cNvPr>
@@ -11508,7 +11771,7 @@
           <p:cNvPr id="36" name="Rectangle 35">
             <a:extLst>
               <a:ext uri="{FF2B5EF4-FFF2-40B4-BE49-F238E27FC236}">
-                <a16:creationId xmlns:a16="http://schemas.microsoft.com/office/drawing/2014/main" xmlns="" id="{93FBA679-F71B-47BD-BE29-21E7C2262CEB}"/>
+                <a16:creationId xmlns="" xmlns:a16="http://schemas.microsoft.com/office/drawing/2014/main" id="{93FBA679-F71B-47BD-BE29-21E7C2262CEB}"/>
               </a:ext>
             </a:extLst>
           </p:cNvPr>
@@ -11590,7 +11853,7 @@
           <p:cNvPr id="40" name="Straight Arrow Connector 39">
             <a:extLst>
               <a:ext uri="{FF2B5EF4-FFF2-40B4-BE49-F238E27FC236}">
-                <a16:creationId xmlns:a16="http://schemas.microsoft.com/office/drawing/2014/main" xmlns="" id="{4EB51AD1-53A9-412E-933D-8DFB38C76755}"/>
+                <a16:creationId xmlns="" xmlns:a16="http://schemas.microsoft.com/office/drawing/2014/main" id="{4EB51AD1-53A9-412E-933D-8DFB38C76755}"/>
               </a:ext>
             </a:extLst>
           </p:cNvPr>
@@ -11633,7 +11896,7 @@
           <p:cNvPr id="42" name="TextBox 41">
             <a:extLst>
               <a:ext uri="{FF2B5EF4-FFF2-40B4-BE49-F238E27FC236}">
-                <a16:creationId xmlns:a16="http://schemas.microsoft.com/office/drawing/2014/main" xmlns="" id="{42986CB5-3F27-4531-B052-275C80DE06A9}"/>
+                <a16:creationId xmlns="" xmlns:a16="http://schemas.microsoft.com/office/drawing/2014/main" id="{42986CB5-3F27-4531-B052-275C80DE06A9}"/>
               </a:ext>
             </a:extLst>
           </p:cNvPr>
@@ -11668,7 +11931,7 @@
           <p:cNvPr id="46" name="TextBox 45">
             <a:extLst>
               <a:ext uri="{FF2B5EF4-FFF2-40B4-BE49-F238E27FC236}">
-                <a16:creationId xmlns:a16="http://schemas.microsoft.com/office/drawing/2014/main" xmlns="" id="{5EBBC5A0-26BA-4B6E-A551-6AD1BA1617D0}"/>
+                <a16:creationId xmlns="" xmlns:a16="http://schemas.microsoft.com/office/drawing/2014/main" id="{5EBBC5A0-26BA-4B6E-A551-6AD1BA1617D0}"/>
               </a:ext>
             </a:extLst>
           </p:cNvPr>
@@ -11796,7 +12059,7 @@
           <p:cNvPr id="48" name="TextBox 47">
             <a:extLst>
               <a:ext uri="{FF2B5EF4-FFF2-40B4-BE49-F238E27FC236}">
-                <a16:creationId xmlns:a16="http://schemas.microsoft.com/office/drawing/2014/main" xmlns="" id="{E0BBD6C8-C8F2-40C5-AA64-85961A11ADC2}"/>
+                <a16:creationId xmlns="" xmlns:a16="http://schemas.microsoft.com/office/drawing/2014/main" id="{E0BBD6C8-C8F2-40C5-AA64-85961A11ADC2}"/>
               </a:ext>
             </a:extLst>
           </p:cNvPr>
@@ -12012,7 +12275,7 @@
           <p:cNvPr id="11" name="TextBox 10">
             <a:extLst>
               <a:ext uri="{FF2B5EF4-FFF2-40B4-BE49-F238E27FC236}">
-                <a16:creationId xmlns:a16="http://schemas.microsoft.com/office/drawing/2014/main" xmlns="" id="{E0BBD6C8-C8F2-40C5-AA64-85961A11ADC2}"/>
+                <a16:creationId xmlns="" xmlns:a16="http://schemas.microsoft.com/office/drawing/2014/main" id="{E0BBD6C8-C8F2-40C5-AA64-85961A11ADC2}"/>
               </a:ext>
             </a:extLst>
           </p:cNvPr>

</xml_diff>

<commit_message>
20210806 1836 update to files from tlw8748253.
</commit_message>
<xml_diff>
--- a/docs/Project 0.pptx
+++ b/docs/Project 0.pptx
@@ -140,7 +140,7 @@
           <p:cNvPr id="2" name="Title 1">
             <a:extLst>
               <a:ext uri="{FF2B5EF4-FFF2-40B4-BE49-F238E27FC236}">
-                <a16:creationId xmlns="" xmlns:a16="http://schemas.microsoft.com/office/drawing/2014/main" id="{67106D7E-D400-44F1-9A1A-D68CE501C73D}"/>
+                <a16:creationId xmlns:a16="http://schemas.microsoft.com/office/drawing/2014/main" xmlns="" id="{67106D7E-D400-44F1-9A1A-D68CE501C73D}"/>
               </a:ext>
             </a:extLst>
           </p:cNvPr>
@@ -177,7 +177,7 @@
           <p:cNvPr id="3" name="Subtitle 2">
             <a:extLst>
               <a:ext uri="{FF2B5EF4-FFF2-40B4-BE49-F238E27FC236}">
-                <a16:creationId xmlns="" xmlns:a16="http://schemas.microsoft.com/office/drawing/2014/main" id="{A5FDE527-E621-4639-A0C7-E1E9B0DFBCEC}"/>
+                <a16:creationId xmlns:a16="http://schemas.microsoft.com/office/drawing/2014/main" xmlns="" id="{A5FDE527-E621-4639-A0C7-E1E9B0DFBCEC}"/>
               </a:ext>
             </a:extLst>
           </p:cNvPr>
@@ -247,7 +247,7 @@
           <p:cNvPr id="4" name="Date Placeholder 3">
             <a:extLst>
               <a:ext uri="{FF2B5EF4-FFF2-40B4-BE49-F238E27FC236}">
-                <a16:creationId xmlns="" xmlns:a16="http://schemas.microsoft.com/office/drawing/2014/main" id="{E109CE88-B989-4109-89C8-36F7C245DB1C}"/>
+                <a16:creationId xmlns:a16="http://schemas.microsoft.com/office/drawing/2014/main" xmlns="" id="{E109CE88-B989-4109-89C8-36F7C245DB1C}"/>
               </a:ext>
             </a:extLst>
           </p:cNvPr>
@@ -265,7 +265,7 @@
           <a:p>
             <a:fld id="{6C733091-19F0-4DD7-90FE-000B4789B4CF}" type="datetimeFigureOut">
               <a:rPr lang="en-US" smtClean="0"/>
-              <a:t>8/5/2021</a:t>
+              <a:t>8/6/2021</a:t>
             </a:fld>
             <a:endParaRPr lang="en-US"/>
           </a:p>
@@ -276,7 +276,7 @@
           <p:cNvPr id="5" name="Footer Placeholder 4">
             <a:extLst>
               <a:ext uri="{FF2B5EF4-FFF2-40B4-BE49-F238E27FC236}">
-                <a16:creationId xmlns="" xmlns:a16="http://schemas.microsoft.com/office/drawing/2014/main" id="{0841498F-B991-43D3-B408-CC35D8EFCF37}"/>
+                <a16:creationId xmlns:a16="http://schemas.microsoft.com/office/drawing/2014/main" xmlns="" id="{0841498F-B991-43D3-B408-CC35D8EFCF37}"/>
               </a:ext>
             </a:extLst>
           </p:cNvPr>
@@ -301,7 +301,7 @@
           <p:cNvPr id="6" name="Slide Number Placeholder 5">
             <a:extLst>
               <a:ext uri="{FF2B5EF4-FFF2-40B4-BE49-F238E27FC236}">
-                <a16:creationId xmlns="" xmlns:a16="http://schemas.microsoft.com/office/drawing/2014/main" id="{01754CB8-17B1-45A0-AE7D-755EAA1B69D8}"/>
+                <a16:creationId xmlns:a16="http://schemas.microsoft.com/office/drawing/2014/main" xmlns="" id="{01754CB8-17B1-45A0-AE7D-755EAA1B69D8}"/>
               </a:ext>
             </a:extLst>
           </p:cNvPr>
@@ -360,7 +360,7 @@
           <p:cNvPr id="2" name="Title 1">
             <a:extLst>
               <a:ext uri="{FF2B5EF4-FFF2-40B4-BE49-F238E27FC236}">
-                <a16:creationId xmlns="" xmlns:a16="http://schemas.microsoft.com/office/drawing/2014/main" id="{E7A7B055-5DC2-440D-83C1-CAAE8E9A8E14}"/>
+                <a16:creationId xmlns:a16="http://schemas.microsoft.com/office/drawing/2014/main" xmlns="" id="{E7A7B055-5DC2-440D-83C1-CAAE8E9A8E14}"/>
               </a:ext>
             </a:extLst>
           </p:cNvPr>
@@ -388,7 +388,7 @@
           <p:cNvPr id="3" name="Vertical Text Placeholder 2">
             <a:extLst>
               <a:ext uri="{FF2B5EF4-FFF2-40B4-BE49-F238E27FC236}">
-                <a16:creationId xmlns="" xmlns:a16="http://schemas.microsoft.com/office/drawing/2014/main" id="{65710707-423D-4F9D-A49D-6C764C562553}"/>
+                <a16:creationId xmlns:a16="http://schemas.microsoft.com/office/drawing/2014/main" xmlns="" id="{65710707-423D-4F9D-A49D-6C764C562553}"/>
               </a:ext>
             </a:extLst>
           </p:cNvPr>
@@ -445,7 +445,7 @@
           <p:cNvPr id="4" name="Date Placeholder 3">
             <a:extLst>
               <a:ext uri="{FF2B5EF4-FFF2-40B4-BE49-F238E27FC236}">
-                <a16:creationId xmlns="" xmlns:a16="http://schemas.microsoft.com/office/drawing/2014/main" id="{98B6F7EF-D1BE-4437-85F3-99626E37E4EF}"/>
+                <a16:creationId xmlns:a16="http://schemas.microsoft.com/office/drawing/2014/main" xmlns="" id="{98B6F7EF-D1BE-4437-85F3-99626E37E4EF}"/>
               </a:ext>
             </a:extLst>
           </p:cNvPr>
@@ -463,7 +463,7 @@
           <a:p>
             <a:fld id="{6C733091-19F0-4DD7-90FE-000B4789B4CF}" type="datetimeFigureOut">
               <a:rPr lang="en-US" smtClean="0"/>
-              <a:t>8/5/2021</a:t>
+              <a:t>8/6/2021</a:t>
             </a:fld>
             <a:endParaRPr lang="en-US"/>
           </a:p>
@@ -474,7 +474,7 @@
           <p:cNvPr id="5" name="Footer Placeholder 4">
             <a:extLst>
               <a:ext uri="{FF2B5EF4-FFF2-40B4-BE49-F238E27FC236}">
-                <a16:creationId xmlns="" xmlns:a16="http://schemas.microsoft.com/office/drawing/2014/main" id="{D890AA9B-E479-4209-B245-83608F3D4013}"/>
+                <a16:creationId xmlns:a16="http://schemas.microsoft.com/office/drawing/2014/main" xmlns="" id="{D890AA9B-E479-4209-B245-83608F3D4013}"/>
               </a:ext>
             </a:extLst>
           </p:cNvPr>
@@ -499,7 +499,7 @@
           <p:cNvPr id="6" name="Slide Number Placeholder 5">
             <a:extLst>
               <a:ext uri="{FF2B5EF4-FFF2-40B4-BE49-F238E27FC236}">
-                <a16:creationId xmlns="" xmlns:a16="http://schemas.microsoft.com/office/drawing/2014/main" id="{0E4976E4-E15A-4296-A430-633D2BB9142B}"/>
+                <a16:creationId xmlns:a16="http://schemas.microsoft.com/office/drawing/2014/main" xmlns="" id="{0E4976E4-E15A-4296-A430-633D2BB9142B}"/>
               </a:ext>
             </a:extLst>
           </p:cNvPr>
@@ -558,7 +558,7 @@
           <p:cNvPr id="2" name="Vertical Title 1">
             <a:extLst>
               <a:ext uri="{FF2B5EF4-FFF2-40B4-BE49-F238E27FC236}">
-                <a16:creationId xmlns="" xmlns:a16="http://schemas.microsoft.com/office/drawing/2014/main" id="{66F63CF5-8DEE-4BB2-A2A5-5C16FEBE1AD5}"/>
+                <a16:creationId xmlns:a16="http://schemas.microsoft.com/office/drawing/2014/main" xmlns="" id="{66F63CF5-8DEE-4BB2-A2A5-5C16FEBE1AD5}"/>
               </a:ext>
             </a:extLst>
           </p:cNvPr>
@@ -591,7 +591,7 @@
           <p:cNvPr id="3" name="Vertical Text Placeholder 2">
             <a:extLst>
               <a:ext uri="{FF2B5EF4-FFF2-40B4-BE49-F238E27FC236}">
-                <a16:creationId xmlns="" xmlns:a16="http://schemas.microsoft.com/office/drawing/2014/main" id="{E0D5EBA5-94AF-4373-B032-A40FF73C7575}"/>
+                <a16:creationId xmlns:a16="http://schemas.microsoft.com/office/drawing/2014/main" xmlns="" id="{E0D5EBA5-94AF-4373-B032-A40FF73C7575}"/>
               </a:ext>
             </a:extLst>
           </p:cNvPr>
@@ -653,7 +653,7 @@
           <p:cNvPr id="4" name="Date Placeholder 3">
             <a:extLst>
               <a:ext uri="{FF2B5EF4-FFF2-40B4-BE49-F238E27FC236}">
-                <a16:creationId xmlns="" xmlns:a16="http://schemas.microsoft.com/office/drawing/2014/main" id="{7426B8E1-6758-4F5E-B618-96641332600B}"/>
+                <a16:creationId xmlns:a16="http://schemas.microsoft.com/office/drawing/2014/main" xmlns="" id="{7426B8E1-6758-4F5E-B618-96641332600B}"/>
               </a:ext>
             </a:extLst>
           </p:cNvPr>
@@ -671,7 +671,7 @@
           <a:p>
             <a:fld id="{6C733091-19F0-4DD7-90FE-000B4789B4CF}" type="datetimeFigureOut">
               <a:rPr lang="en-US" smtClean="0"/>
-              <a:t>8/5/2021</a:t>
+              <a:t>8/6/2021</a:t>
             </a:fld>
             <a:endParaRPr lang="en-US"/>
           </a:p>
@@ -682,7 +682,7 @@
           <p:cNvPr id="5" name="Footer Placeholder 4">
             <a:extLst>
               <a:ext uri="{FF2B5EF4-FFF2-40B4-BE49-F238E27FC236}">
-                <a16:creationId xmlns="" xmlns:a16="http://schemas.microsoft.com/office/drawing/2014/main" id="{F65E330E-2A7E-482D-AE0F-70EA5A29958B}"/>
+                <a16:creationId xmlns:a16="http://schemas.microsoft.com/office/drawing/2014/main" xmlns="" id="{F65E330E-2A7E-482D-AE0F-70EA5A29958B}"/>
               </a:ext>
             </a:extLst>
           </p:cNvPr>
@@ -707,7 +707,7 @@
           <p:cNvPr id="6" name="Slide Number Placeholder 5">
             <a:extLst>
               <a:ext uri="{FF2B5EF4-FFF2-40B4-BE49-F238E27FC236}">
-                <a16:creationId xmlns="" xmlns:a16="http://schemas.microsoft.com/office/drawing/2014/main" id="{B8000005-FC38-4A6C-9D09-7945EFA08160}"/>
+                <a16:creationId xmlns:a16="http://schemas.microsoft.com/office/drawing/2014/main" xmlns="" id="{B8000005-FC38-4A6C-9D09-7945EFA08160}"/>
               </a:ext>
             </a:extLst>
           </p:cNvPr>
@@ -766,7 +766,7 @@
           <p:cNvPr id="2" name="Title 1">
             <a:extLst>
               <a:ext uri="{FF2B5EF4-FFF2-40B4-BE49-F238E27FC236}">
-                <a16:creationId xmlns="" xmlns:a16="http://schemas.microsoft.com/office/drawing/2014/main" id="{91D0002C-766B-44B4-A24C-BE6DE6C7BA4C}"/>
+                <a16:creationId xmlns:a16="http://schemas.microsoft.com/office/drawing/2014/main" xmlns="" id="{91D0002C-766B-44B4-A24C-BE6DE6C7BA4C}"/>
               </a:ext>
             </a:extLst>
           </p:cNvPr>
@@ -794,7 +794,7 @@
           <p:cNvPr id="3" name="Content Placeholder 2">
             <a:extLst>
               <a:ext uri="{FF2B5EF4-FFF2-40B4-BE49-F238E27FC236}">
-                <a16:creationId xmlns="" xmlns:a16="http://schemas.microsoft.com/office/drawing/2014/main" id="{3455BAA9-6C7B-4874-AD76-BD466F64802D}"/>
+                <a16:creationId xmlns:a16="http://schemas.microsoft.com/office/drawing/2014/main" xmlns="" id="{3455BAA9-6C7B-4874-AD76-BD466F64802D}"/>
               </a:ext>
             </a:extLst>
           </p:cNvPr>
@@ -851,7 +851,7 @@
           <p:cNvPr id="4" name="Date Placeholder 3">
             <a:extLst>
               <a:ext uri="{FF2B5EF4-FFF2-40B4-BE49-F238E27FC236}">
-                <a16:creationId xmlns="" xmlns:a16="http://schemas.microsoft.com/office/drawing/2014/main" id="{8776BDAF-D8F2-4A61-904D-094BB4545702}"/>
+                <a16:creationId xmlns:a16="http://schemas.microsoft.com/office/drawing/2014/main" xmlns="" id="{8776BDAF-D8F2-4A61-904D-094BB4545702}"/>
               </a:ext>
             </a:extLst>
           </p:cNvPr>
@@ -869,7 +869,7 @@
           <a:p>
             <a:fld id="{6C733091-19F0-4DD7-90FE-000B4789B4CF}" type="datetimeFigureOut">
               <a:rPr lang="en-US" smtClean="0"/>
-              <a:t>8/5/2021</a:t>
+              <a:t>8/6/2021</a:t>
             </a:fld>
             <a:endParaRPr lang="en-US"/>
           </a:p>
@@ -880,7 +880,7 @@
           <p:cNvPr id="5" name="Footer Placeholder 4">
             <a:extLst>
               <a:ext uri="{FF2B5EF4-FFF2-40B4-BE49-F238E27FC236}">
-                <a16:creationId xmlns="" xmlns:a16="http://schemas.microsoft.com/office/drawing/2014/main" id="{F89C5665-4384-4706-9BD2-9F42B05C96BC}"/>
+                <a16:creationId xmlns:a16="http://schemas.microsoft.com/office/drawing/2014/main" xmlns="" id="{F89C5665-4384-4706-9BD2-9F42B05C96BC}"/>
               </a:ext>
             </a:extLst>
           </p:cNvPr>
@@ -905,7 +905,7 @@
           <p:cNvPr id="6" name="Slide Number Placeholder 5">
             <a:extLst>
               <a:ext uri="{FF2B5EF4-FFF2-40B4-BE49-F238E27FC236}">
-                <a16:creationId xmlns="" xmlns:a16="http://schemas.microsoft.com/office/drawing/2014/main" id="{7DCAD73E-CAB3-4BA7-905E-D203691D0418}"/>
+                <a16:creationId xmlns:a16="http://schemas.microsoft.com/office/drawing/2014/main" xmlns="" id="{7DCAD73E-CAB3-4BA7-905E-D203691D0418}"/>
               </a:ext>
             </a:extLst>
           </p:cNvPr>
@@ -964,7 +964,7 @@
           <p:cNvPr id="2" name="Title 1">
             <a:extLst>
               <a:ext uri="{FF2B5EF4-FFF2-40B4-BE49-F238E27FC236}">
-                <a16:creationId xmlns="" xmlns:a16="http://schemas.microsoft.com/office/drawing/2014/main" id="{A9880706-F7FA-4EC3-A022-9D6C7CEC3692}"/>
+                <a16:creationId xmlns:a16="http://schemas.microsoft.com/office/drawing/2014/main" xmlns="" id="{A9880706-F7FA-4EC3-A022-9D6C7CEC3692}"/>
               </a:ext>
             </a:extLst>
           </p:cNvPr>
@@ -1001,7 +1001,7 @@
           <p:cNvPr id="3" name="Text Placeholder 2">
             <a:extLst>
               <a:ext uri="{FF2B5EF4-FFF2-40B4-BE49-F238E27FC236}">
-                <a16:creationId xmlns="" xmlns:a16="http://schemas.microsoft.com/office/drawing/2014/main" id="{FA8A65D0-3DF5-448D-82EC-A967682A0DED}"/>
+                <a16:creationId xmlns:a16="http://schemas.microsoft.com/office/drawing/2014/main" xmlns="" id="{FA8A65D0-3DF5-448D-82EC-A967682A0DED}"/>
               </a:ext>
             </a:extLst>
           </p:cNvPr>
@@ -1126,7 +1126,7 @@
           <p:cNvPr id="4" name="Date Placeholder 3">
             <a:extLst>
               <a:ext uri="{FF2B5EF4-FFF2-40B4-BE49-F238E27FC236}">
-                <a16:creationId xmlns="" xmlns:a16="http://schemas.microsoft.com/office/drawing/2014/main" id="{600EA68C-01A6-487D-9D6E-1D1B4EAC0440}"/>
+                <a16:creationId xmlns:a16="http://schemas.microsoft.com/office/drawing/2014/main" xmlns="" id="{600EA68C-01A6-487D-9D6E-1D1B4EAC0440}"/>
               </a:ext>
             </a:extLst>
           </p:cNvPr>
@@ -1144,7 +1144,7 @@
           <a:p>
             <a:fld id="{6C733091-19F0-4DD7-90FE-000B4789B4CF}" type="datetimeFigureOut">
               <a:rPr lang="en-US" smtClean="0"/>
-              <a:t>8/5/2021</a:t>
+              <a:t>8/6/2021</a:t>
             </a:fld>
             <a:endParaRPr lang="en-US"/>
           </a:p>
@@ -1155,7 +1155,7 @@
           <p:cNvPr id="5" name="Footer Placeholder 4">
             <a:extLst>
               <a:ext uri="{FF2B5EF4-FFF2-40B4-BE49-F238E27FC236}">
-                <a16:creationId xmlns="" xmlns:a16="http://schemas.microsoft.com/office/drawing/2014/main" id="{6E6527CB-4FFD-4569-A82C-5EDC311B2CF6}"/>
+                <a16:creationId xmlns:a16="http://schemas.microsoft.com/office/drawing/2014/main" xmlns="" id="{6E6527CB-4FFD-4569-A82C-5EDC311B2CF6}"/>
               </a:ext>
             </a:extLst>
           </p:cNvPr>
@@ -1180,7 +1180,7 @@
           <p:cNvPr id="6" name="Slide Number Placeholder 5">
             <a:extLst>
               <a:ext uri="{FF2B5EF4-FFF2-40B4-BE49-F238E27FC236}">
-                <a16:creationId xmlns="" xmlns:a16="http://schemas.microsoft.com/office/drawing/2014/main" id="{24B19E5B-5A98-4381-A01D-01F81FD65792}"/>
+                <a16:creationId xmlns:a16="http://schemas.microsoft.com/office/drawing/2014/main" xmlns="" id="{24B19E5B-5A98-4381-A01D-01F81FD65792}"/>
               </a:ext>
             </a:extLst>
           </p:cNvPr>
@@ -1239,7 +1239,7 @@
           <p:cNvPr id="2" name="Title 1">
             <a:extLst>
               <a:ext uri="{FF2B5EF4-FFF2-40B4-BE49-F238E27FC236}">
-                <a16:creationId xmlns="" xmlns:a16="http://schemas.microsoft.com/office/drawing/2014/main" id="{63228B71-E923-4431-B8D2-FAE724678940}"/>
+                <a16:creationId xmlns:a16="http://schemas.microsoft.com/office/drawing/2014/main" xmlns="" id="{63228B71-E923-4431-B8D2-FAE724678940}"/>
               </a:ext>
             </a:extLst>
           </p:cNvPr>
@@ -1267,7 +1267,7 @@
           <p:cNvPr id="3" name="Content Placeholder 2">
             <a:extLst>
               <a:ext uri="{FF2B5EF4-FFF2-40B4-BE49-F238E27FC236}">
-                <a16:creationId xmlns="" xmlns:a16="http://schemas.microsoft.com/office/drawing/2014/main" id="{B18895E9-B7FF-4A00-955B-206CF8C73E43}"/>
+                <a16:creationId xmlns:a16="http://schemas.microsoft.com/office/drawing/2014/main" xmlns="" id="{B18895E9-B7FF-4A00-955B-206CF8C73E43}"/>
               </a:ext>
             </a:extLst>
           </p:cNvPr>
@@ -1329,7 +1329,7 @@
           <p:cNvPr id="4" name="Content Placeholder 3">
             <a:extLst>
               <a:ext uri="{FF2B5EF4-FFF2-40B4-BE49-F238E27FC236}">
-                <a16:creationId xmlns="" xmlns:a16="http://schemas.microsoft.com/office/drawing/2014/main" id="{DA813955-E3B9-44BC-8E1D-139269C8B48A}"/>
+                <a16:creationId xmlns:a16="http://schemas.microsoft.com/office/drawing/2014/main" xmlns="" id="{DA813955-E3B9-44BC-8E1D-139269C8B48A}"/>
               </a:ext>
             </a:extLst>
           </p:cNvPr>
@@ -1391,7 +1391,7 @@
           <p:cNvPr id="5" name="Date Placeholder 4">
             <a:extLst>
               <a:ext uri="{FF2B5EF4-FFF2-40B4-BE49-F238E27FC236}">
-                <a16:creationId xmlns="" xmlns:a16="http://schemas.microsoft.com/office/drawing/2014/main" id="{7E9B8EF5-28D5-4C4E-A2AB-EEA30D75DAFE}"/>
+                <a16:creationId xmlns:a16="http://schemas.microsoft.com/office/drawing/2014/main" xmlns="" id="{7E9B8EF5-28D5-4C4E-A2AB-EEA30D75DAFE}"/>
               </a:ext>
             </a:extLst>
           </p:cNvPr>
@@ -1409,7 +1409,7 @@
           <a:p>
             <a:fld id="{6C733091-19F0-4DD7-90FE-000B4789B4CF}" type="datetimeFigureOut">
               <a:rPr lang="en-US" smtClean="0"/>
-              <a:t>8/5/2021</a:t>
+              <a:t>8/6/2021</a:t>
             </a:fld>
             <a:endParaRPr lang="en-US"/>
           </a:p>
@@ -1420,7 +1420,7 @@
           <p:cNvPr id="6" name="Footer Placeholder 5">
             <a:extLst>
               <a:ext uri="{FF2B5EF4-FFF2-40B4-BE49-F238E27FC236}">
-                <a16:creationId xmlns="" xmlns:a16="http://schemas.microsoft.com/office/drawing/2014/main" id="{5723E678-8CB4-4335-AA04-6BD391748717}"/>
+                <a16:creationId xmlns:a16="http://schemas.microsoft.com/office/drawing/2014/main" xmlns="" id="{5723E678-8CB4-4335-AA04-6BD391748717}"/>
               </a:ext>
             </a:extLst>
           </p:cNvPr>
@@ -1445,7 +1445,7 @@
           <p:cNvPr id="7" name="Slide Number Placeholder 6">
             <a:extLst>
               <a:ext uri="{FF2B5EF4-FFF2-40B4-BE49-F238E27FC236}">
-                <a16:creationId xmlns="" xmlns:a16="http://schemas.microsoft.com/office/drawing/2014/main" id="{887B5567-9F4D-4AE1-92D8-769C9F7EA4F0}"/>
+                <a16:creationId xmlns:a16="http://schemas.microsoft.com/office/drawing/2014/main" xmlns="" id="{887B5567-9F4D-4AE1-92D8-769C9F7EA4F0}"/>
               </a:ext>
             </a:extLst>
           </p:cNvPr>
@@ -1504,7 +1504,7 @@
           <p:cNvPr id="2" name="Title 1">
             <a:extLst>
               <a:ext uri="{FF2B5EF4-FFF2-40B4-BE49-F238E27FC236}">
-                <a16:creationId xmlns="" xmlns:a16="http://schemas.microsoft.com/office/drawing/2014/main" id="{A40320A9-7C0C-45B4-BF2B-3B53B5686EBB}"/>
+                <a16:creationId xmlns:a16="http://schemas.microsoft.com/office/drawing/2014/main" xmlns="" id="{A40320A9-7C0C-45B4-BF2B-3B53B5686EBB}"/>
               </a:ext>
             </a:extLst>
           </p:cNvPr>
@@ -1537,7 +1537,7 @@
           <p:cNvPr id="3" name="Text Placeholder 2">
             <a:extLst>
               <a:ext uri="{FF2B5EF4-FFF2-40B4-BE49-F238E27FC236}">
-                <a16:creationId xmlns="" xmlns:a16="http://schemas.microsoft.com/office/drawing/2014/main" id="{8C440DE1-7DD6-4B1C-B961-CD2079B51F03}"/>
+                <a16:creationId xmlns:a16="http://schemas.microsoft.com/office/drawing/2014/main" xmlns="" id="{8C440DE1-7DD6-4B1C-B961-CD2079B51F03}"/>
               </a:ext>
             </a:extLst>
           </p:cNvPr>
@@ -1608,7 +1608,7 @@
           <p:cNvPr id="4" name="Content Placeholder 3">
             <a:extLst>
               <a:ext uri="{FF2B5EF4-FFF2-40B4-BE49-F238E27FC236}">
-                <a16:creationId xmlns="" xmlns:a16="http://schemas.microsoft.com/office/drawing/2014/main" id="{6FAFE840-CC9A-4D89-B05F-159EF756B427}"/>
+                <a16:creationId xmlns:a16="http://schemas.microsoft.com/office/drawing/2014/main" xmlns="" id="{6FAFE840-CC9A-4D89-B05F-159EF756B427}"/>
               </a:ext>
             </a:extLst>
           </p:cNvPr>
@@ -1670,7 +1670,7 @@
           <p:cNvPr id="5" name="Text Placeholder 4">
             <a:extLst>
               <a:ext uri="{FF2B5EF4-FFF2-40B4-BE49-F238E27FC236}">
-                <a16:creationId xmlns="" xmlns:a16="http://schemas.microsoft.com/office/drawing/2014/main" id="{4B87AADC-3401-48C6-98F6-0AB60F6DF9BE}"/>
+                <a16:creationId xmlns:a16="http://schemas.microsoft.com/office/drawing/2014/main" xmlns="" id="{4B87AADC-3401-48C6-98F6-0AB60F6DF9BE}"/>
               </a:ext>
             </a:extLst>
           </p:cNvPr>
@@ -1741,7 +1741,7 @@
           <p:cNvPr id="6" name="Content Placeholder 5">
             <a:extLst>
               <a:ext uri="{FF2B5EF4-FFF2-40B4-BE49-F238E27FC236}">
-                <a16:creationId xmlns="" xmlns:a16="http://schemas.microsoft.com/office/drawing/2014/main" id="{34BCF1A4-FB52-4DCD-80BC-324BA41C33CD}"/>
+                <a16:creationId xmlns:a16="http://schemas.microsoft.com/office/drawing/2014/main" xmlns="" id="{34BCF1A4-FB52-4DCD-80BC-324BA41C33CD}"/>
               </a:ext>
             </a:extLst>
           </p:cNvPr>
@@ -1803,7 +1803,7 @@
           <p:cNvPr id="7" name="Date Placeholder 6">
             <a:extLst>
               <a:ext uri="{FF2B5EF4-FFF2-40B4-BE49-F238E27FC236}">
-                <a16:creationId xmlns="" xmlns:a16="http://schemas.microsoft.com/office/drawing/2014/main" id="{8CFD4208-60E7-48B1-8CD0-717D5E26B827}"/>
+                <a16:creationId xmlns:a16="http://schemas.microsoft.com/office/drawing/2014/main" xmlns="" id="{8CFD4208-60E7-48B1-8CD0-717D5E26B827}"/>
               </a:ext>
             </a:extLst>
           </p:cNvPr>
@@ -1821,7 +1821,7 @@
           <a:p>
             <a:fld id="{6C733091-19F0-4DD7-90FE-000B4789B4CF}" type="datetimeFigureOut">
               <a:rPr lang="en-US" smtClean="0"/>
-              <a:t>8/5/2021</a:t>
+              <a:t>8/6/2021</a:t>
             </a:fld>
             <a:endParaRPr lang="en-US"/>
           </a:p>
@@ -1832,7 +1832,7 @@
           <p:cNvPr id="8" name="Footer Placeholder 7">
             <a:extLst>
               <a:ext uri="{FF2B5EF4-FFF2-40B4-BE49-F238E27FC236}">
-                <a16:creationId xmlns="" xmlns:a16="http://schemas.microsoft.com/office/drawing/2014/main" id="{94E429D1-BEB1-4D8A-91F2-CD4F80157F8D}"/>
+                <a16:creationId xmlns:a16="http://schemas.microsoft.com/office/drawing/2014/main" xmlns="" id="{94E429D1-BEB1-4D8A-91F2-CD4F80157F8D}"/>
               </a:ext>
             </a:extLst>
           </p:cNvPr>
@@ -1857,7 +1857,7 @@
           <p:cNvPr id="9" name="Slide Number Placeholder 8">
             <a:extLst>
               <a:ext uri="{FF2B5EF4-FFF2-40B4-BE49-F238E27FC236}">
-                <a16:creationId xmlns="" xmlns:a16="http://schemas.microsoft.com/office/drawing/2014/main" id="{6F17C19C-8370-4118-A8FC-5DDA6F84230F}"/>
+                <a16:creationId xmlns:a16="http://schemas.microsoft.com/office/drawing/2014/main" xmlns="" id="{6F17C19C-8370-4118-A8FC-5DDA6F84230F}"/>
               </a:ext>
             </a:extLst>
           </p:cNvPr>
@@ -1916,7 +1916,7 @@
           <p:cNvPr id="2" name="Title 1">
             <a:extLst>
               <a:ext uri="{FF2B5EF4-FFF2-40B4-BE49-F238E27FC236}">
-                <a16:creationId xmlns="" xmlns:a16="http://schemas.microsoft.com/office/drawing/2014/main" id="{252CBF36-7F99-45A9-BC35-BD2EC260CBF0}"/>
+                <a16:creationId xmlns:a16="http://schemas.microsoft.com/office/drawing/2014/main" xmlns="" id="{252CBF36-7F99-45A9-BC35-BD2EC260CBF0}"/>
               </a:ext>
             </a:extLst>
           </p:cNvPr>
@@ -1944,7 +1944,7 @@
           <p:cNvPr id="3" name="Date Placeholder 2">
             <a:extLst>
               <a:ext uri="{FF2B5EF4-FFF2-40B4-BE49-F238E27FC236}">
-                <a16:creationId xmlns="" xmlns:a16="http://schemas.microsoft.com/office/drawing/2014/main" id="{0D6F5F83-F07E-4501-B86B-9F96CD43993C}"/>
+                <a16:creationId xmlns:a16="http://schemas.microsoft.com/office/drawing/2014/main" xmlns="" id="{0D6F5F83-F07E-4501-B86B-9F96CD43993C}"/>
               </a:ext>
             </a:extLst>
           </p:cNvPr>
@@ -1962,7 +1962,7 @@
           <a:p>
             <a:fld id="{6C733091-19F0-4DD7-90FE-000B4789B4CF}" type="datetimeFigureOut">
               <a:rPr lang="en-US" smtClean="0"/>
-              <a:t>8/5/2021</a:t>
+              <a:t>8/6/2021</a:t>
             </a:fld>
             <a:endParaRPr lang="en-US"/>
           </a:p>
@@ -1973,7 +1973,7 @@
           <p:cNvPr id="4" name="Footer Placeholder 3">
             <a:extLst>
               <a:ext uri="{FF2B5EF4-FFF2-40B4-BE49-F238E27FC236}">
-                <a16:creationId xmlns="" xmlns:a16="http://schemas.microsoft.com/office/drawing/2014/main" id="{2861989B-F8E9-41FD-8E16-687424BCC266}"/>
+                <a16:creationId xmlns:a16="http://schemas.microsoft.com/office/drawing/2014/main" xmlns="" id="{2861989B-F8E9-41FD-8E16-687424BCC266}"/>
               </a:ext>
             </a:extLst>
           </p:cNvPr>
@@ -1998,7 +1998,7 @@
           <p:cNvPr id="5" name="Slide Number Placeholder 4">
             <a:extLst>
               <a:ext uri="{FF2B5EF4-FFF2-40B4-BE49-F238E27FC236}">
-                <a16:creationId xmlns="" xmlns:a16="http://schemas.microsoft.com/office/drawing/2014/main" id="{2026B6D7-7832-4815-95CE-5CEC39502825}"/>
+                <a16:creationId xmlns:a16="http://schemas.microsoft.com/office/drawing/2014/main" xmlns="" id="{2026B6D7-7832-4815-95CE-5CEC39502825}"/>
               </a:ext>
             </a:extLst>
           </p:cNvPr>
@@ -2057,7 +2057,7 @@
           <p:cNvPr id="2" name="Date Placeholder 1">
             <a:extLst>
               <a:ext uri="{FF2B5EF4-FFF2-40B4-BE49-F238E27FC236}">
-                <a16:creationId xmlns="" xmlns:a16="http://schemas.microsoft.com/office/drawing/2014/main" id="{9877919A-C4B6-46FD-A08A-9A4B867FE01A}"/>
+                <a16:creationId xmlns:a16="http://schemas.microsoft.com/office/drawing/2014/main" xmlns="" id="{9877919A-C4B6-46FD-A08A-9A4B867FE01A}"/>
               </a:ext>
             </a:extLst>
           </p:cNvPr>
@@ -2075,7 +2075,7 @@
           <a:p>
             <a:fld id="{6C733091-19F0-4DD7-90FE-000B4789B4CF}" type="datetimeFigureOut">
               <a:rPr lang="en-US" smtClean="0"/>
-              <a:t>8/5/2021</a:t>
+              <a:t>8/6/2021</a:t>
             </a:fld>
             <a:endParaRPr lang="en-US"/>
           </a:p>
@@ -2086,7 +2086,7 @@
           <p:cNvPr id="3" name="Footer Placeholder 2">
             <a:extLst>
               <a:ext uri="{FF2B5EF4-FFF2-40B4-BE49-F238E27FC236}">
-                <a16:creationId xmlns="" xmlns:a16="http://schemas.microsoft.com/office/drawing/2014/main" id="{9118539E-383C-4F1C-86F2-14C533A7E9FB}"/>
+                <a16:creationId xmlns:a16="http://schemas.microsoft.com/office/drawing/2014/main" xmlns="" id="{9118539E-383C-4F1C-86F2-14C533A7E9FB}"/>
               </a:ext>
             </a:extLst>
           </p:cNvPr>
@@ -2111,7 +2111,7 @@
           <p:cNvPr id="4" name="Slide Number Placeholder 3">
             <a:extLst>
               <a:ext uri="{FF2B5EF4-FFF2-40B4-BE49-F238E27FC236}">
-                <a16:creationId xmlns="" xmlns:a16="http://schemas.microsoft.com/office/drawing/2014/main" id="{C9A6D4E1-CA83-4214-9942-9E4617AA89BF}"/>
+                <a16:creationId xmlns:a16="http://schemas.microsoft.com/office/drawing/2014/main" xmlns="" id="{C9A6D4E1-CA83-4214-9942-9E4617AA89BF}"/>
               </a:ext>
             </a:extLst>
           </p:cNvPr>
@@ -2170,7 +2170,7 @@
           <p:cNvPr id="2" name="Title 1">
             <a:extLst>
               <a:ext uri="{FF2B5EF4-FFF2-40B4-BE49-F238E27FC236}">
-                <a16:creationId xmlns="" xmlns:a16="http://schemas.microsoft.com/office/drawing/2014/main" id="{046EF9B5-7A2A-4225-8817-86D028D6950C}"/>
+                <a16:creationId xmlns:a16="http://schemas.microsoft.com/office/drawing/2014/main" xmlns="" id="{046EF9B5-7A2A-4225-8817-86D028D6950C}"/>
               </a:ext>
             </a:extLst>
           </p:cNvPr>
@@ -2207,7 +2207,7 @@
           <p:cNvPr id="3" name="Content Placeholder 2">
             <a:extLst>
               <a:ext uri="{FF2B5EF4-FFF2-40B4-BE49-F238E27FC236}">
-                <a16:creationId xmlns="" xmlns:a16="http://schemas.microsoft.com/office/drawing/2014/main" id="{8667C390-5297-41E8-A403-22856007B051}"/>
+                <a16:creationId xmlns:a16="http://schemas.microsoft.com/office/drawing/2014/main" xmlns="" id="{8667C390-5297-41E8-A403-22856007B051}"/>
               </a:ext>
             </a:extLst>
           </p:cNvPr>
@@ -2297,7 +2297,7 @@
           <p:cNvPr id="4" name="Text Placeholder 3">
             <a:extLst>
               <a:ext uri="{FF2B5EF4-FFF2-40B4-BE49-F238E27FC236}">
-                <a16:creationId xmlns="" xmlns:a16="http://schemas.microsoft.com/office/drawing/2014/main" id="{8D0D2F7D-D6CD-4AB1-A3EA-CBFD2A2B3703}"/>
+                <a16:creationId xmlns:a16="http://schemas.microsoft.com/office/drawing/2014/main" xmlns="" id="{8D0D2F7D-D6CD-4AB1-A3EA-CBFD2A2B3703}"/>
               </a:ext>
             </a:extLst>
           </p:cNvPr>
@@ -2368,7 +2368,7 @@
           <p:cNvPr id="5" name="Date Placeholder 4">
             <a:extLst>
               <a:ext uri="{FF2B5EF4-FFF2-40B4-BE49-F238E27FC236}">
-                <a16:creationId xmlns="" xmlns:a16="http://schemas.microsoft.com/office/drawing/2014/main" id="{E17A441D-4FA7-4110-BF24-165CD3C3DAD7}"/>
+                <a16:creationId xmlns:a16="http://schemas.microsoft.com/office/drawing/2014/main" xmlns="" id="{E17A441D-4FA7-4110-BF24-165CD3C3DAD7}"/>
               </a:ext>
             </a:extLst>
           </p:cNvPr>
@@ -2386,7 +2386,7 @@
           <a:p>
             <a:fld id="{6C733091-19F0-4DD7-90FE-000B4789B4CF}" type="datetimeFigureOut">
               <a:rPr lang="en-US" smtClean="0"/>
-              <a:t>8/5/2021</a:t>
+              <a:t>8/6/2021</a:t>
             </a:fld>
             <a:endParaRPr lang="en-US"/>
           </a:p>
@@ -2397,7 +2397,7 @@
           <p:cNvPr id="6" name="Footer Placeholder 5">
             <a:extLst>
               <a:ext uri="{FF2B5EF4-FFF2-40B4-BE49-F238E27FC236}">
-                <a16:creationId xmlns="" xmlns:a16="http://schemas.microsoft.com/office/drawing/2014/main" id="{346102C5-5AE3-43CF-A686-1AB72B0790AB}"/>
+                <a16:creationId xmlns:a16="http://schemas.microsoft.com/office/drawing/2014/main" xmlns="" id="{346102C5-5AE3-43CF-A686-1AB72B0790AB}"/>
               </a:ext>
             </a:extLst>
           </p:cNvPr>
@@ -2422,7 +2422,7 @@
           <p:cNvPr id="7" name="Slide Number Placeholder 6">
             <a:extLst>
               <a:ext uri="{FF2B5EF4-FFF2-40B4-BE49-F238E27FC236}">
-                <a16:creationId xmlns="" xmlns:a16="http://schemas.microsoft.com/office/drawing/2014/main" id="{5528B3F7-462C-4500-8836-B3E5CD8DA61A}"/>
+                <a16:creationId xmlns:a16="http://schemas.microsoft.com/office/drawing/2014/main" xmlns="" id="{5528B3F7-462C-4500-8836-B3E5CD8DA61A}"/>
               </a:ext>
             </a:extLst>
           </p:cNvPr>
@@ -2481,7 +2481,7 @@
           <p:cNvPr id="2" name="Title 1">
             <a:extLst>
               <a:ext uri="{FF2B5EF4-FFF2-40B4-BE49-F238E27FC236}">
-                <a16:creationId xmlns="" xmlns:a16="http://schemas.microsoft.com/office/drawing/2014/main" id="{4BA10E59-DA48-4690-A956-9EB8E4E11EE5}"/>
+                <a16:creationId xmlns:a16="http://schemas.microsoft.com/office/drawing/2014/main" xmlns="" id="{4BA10E59-DA48-4690-A956-9EB8E4E11EE5}"/>
               </a:ext>
             </a:extLst>
           </p:cNvPr>
@@ -2518,7 +2518,7 @@
           <p:cNvPr id="3" name="Picture Placeholder 2">
             <a:extLst>
               <a:ext uri="{FF2B5EF4-FFF2-40B4-BE49-F238E27FC236}">
-                <a16:creationId xmlns="" xmlns:a16="http://schemas.microsoft.com/office/drawing/2014/main" id="{AC7AFE1E-67D1-4106-97CA-98302D42CC4D}"/>
+                <a16:creationId xmlns:a16="http://schemas.microsoft.com/office/drawing/2014/main" xmlns="" id="{AC7AFE1E-67D1-4106-97CA-98302D42CC4D}"/>
               </a:ext>
             </a:extLst>
           </p:cNvPr>
@@ -2585,7 +2585,7 @@
           <p:cNvPr id="4" name="Text Placeholder 3">
             <a:extLst>
               <a:ext uri="{FF2B5EF4-FFF2-40B4-BE49-F238E27FC236}">
-                <a16:creationId xmlns="" xmlns:a16="http://schemas.microsoft.com/office/drawing/2014/main" id="{67D8D73B-3D4D-42A7-9A3C-1D508E8A9B45}"/>
+                <a16:creationId xmlns:a16="http://schemas.microsoft.com/office/drawing/2014/main" xmlns="" id="{67D8D73B-3D4D-42A7-9A3C-1D508E8A9B45}"/>
               </a:ext>
             </a:extLst>
           </p:cNvPr>
@@ -2656,7 +2656,7 @@
           <p:cNvPr id="5" name="Date Placeholder 4">
             <a:extLst>
               <a:ext uri="{FF2B5EF4-FFF2-40B4-BE49-F238E27FC236}">
-                <a16:creationId xmlns="" xmlns:a16="http://schemas.microsoft.com/office/drawing/2014/main" id="{48C8945E-A47A-42A2-9DF6-CA6D5002F65F}"/>
+                <a16:creationId xmlns:a16="http://schemas.microsoft.com/office/drawing/2014/main" xmlns="" id="{48C8945E-A47A-42A2-9DF6-CA6D5002F65F}"/>
               </a:ext>
             </a:extLst>
           </p:cNvPr>
@@ -2674,7 +2674,7 @@
           <a:p>
             <a:fld id="{6C733091-19F0-4DD7-90FE-000B4789B4CF}" type="datetimeFigureOut">
               <a:rPr lang="en-US" smtClean="0"/>
-              <a:t>8/5/2021</a:t>
+              <a:t>8/6/2021</a:t>
             </a:fld>
             <a:endParaRPr lang="en-US"/>
           </a:p>
@@ -2685,7 +2685,7 @@
           <p:cNvPr id="6" name="Footer Placeholder 5">
             <a:extLst>
               <a:ext uri="{FF2B5EF4-FFF2-40B4-BE49-F238E27FC236}">
-                <a16:creationId xmlns="" xmlns:a16="http://schemas.microsoft.com/office/drawing/2014/main" id="{EB000DB4-2747-4297-B400-42A539FBDB42}"/>
+                <a16:creationId xmlns:a16="http://schemas.microsoft.com/office/drawing/2014/main" xmlns="" id="{EB000DB4-2747-4297-B400-42A539FBDB42}"/>
               </a:ext>
             </a:extLst>
           </p:cNvPr>
@@ -2710,7 +2710,7 @@
           <p:cNvPr id="7" name="Slide Number Placeholder 6">
             <a:extLst>
               <a:ext uri="{FF2B5EF4-FFF2-40B4-BE49-F238E27FC236}">
-                <a16:creationId xmlns="" xmlns:a16="http://schemas.microsoft.com/office/drawing/2014/main" id="{5BAD9222-F141-4803-AF73-E2DD92E2ABBC}"/>
+                <a16:creationId xmlns:a16="http://schemas.microsoft.com/office/drawing/2014/main" xmlns="" id="{5BAD9222-F141-4803-AF73-E2DD92E2ABBC}"/>
               </a:ext>
             </a:extLst>
           </p:cNvPr>
@@ -2774,7 +2774,7 @@
           <p:cNvPr id="2" name="Title Placeholder 1">
             <a:extLst>
               <a:ext uri="{FF2B5EF4-FFF2-40B4-BE49-F238E27FC236}">
-                <a16:creationId xmlns="" xmlns:a16="http://schemas.microsoft.com/office/drawing/2014/main" id="{5BF9D404-795C-4EA4-AD01-26740519239C}"/>
+                <a16:creationId xmlns:a16="http://schemas.microsoft.com/office/drawing/2014/main" xmlns="" id="{5BF9D404-795C-4EA4-AD01-26740519239C}"/>
               </a:ext>
             </a:extLst>
           </p:cNvPr>
@@ -2812,7 +2812,7 @@
           <p:cNvPr id="3" name="Text Placeholder 2">
             <a:extLst>
               <a:ext uri="{FF2B5EF4-FFF2-40B4-BE49-F238E27FC236}">
-                <a16:creationId xmlns="" xmlns:a16="http://schemas.microsoft.com/office/drawing/2014/main" id="{DE3FEC7B-48F8-4348-9BC6-68F83B859EE9}"/>
+                <a16:creationId xmlns:a16="http://schemas.microsoft.com/office/drawing/2014/main" xmlns="" id="{DE3FEC7B-48F8-4348-9BC6-68F83B859EE9}"/>
               </a:ext>
             </a:extLst>
           </p:cNvPr>
@@ -2879,7 +2879,7 @@
           <p:cNvPr id="4" name="Date Placeholder 3">
             <a:extLst>
               <a:ext uri="{FF2B5EF4-FFF2-40B4-BE49-F238E27FC236}">
-                <a16:creationId xmlns="" xmlns:a16="http://schemas.microsoft.com/office/drawing/2014/main" id="{31CA1A1D-E2F5-4161-A025-7B911965C2FE}"/>
+                <a16:creationId xmlns:a16="http://schemas.microsoft.com/office/drawing/2014/main" xmlns="" id="{31CA1A1D-E2F5-4161-A025-7B911965C2FE}"/>
               </a:ext>
             </a:extLst>
           </p:cNvPr>
@@ -2915,7 +2915,7 @@
           <a:p>
             <a:fld id="{6C733091-19F0-4DD7-90FE-000B4789B4CF}" type="datetimeFigureOut">
               <a:rPr lang="en-US" smtClean="0"/>
-              <a:t>8/5/2021</a:t>
+              <a:t>8/6/2021</a:t>
             </a:fld>
             <a:endParaRPr lang="en-US"/>
           </a:p>
@@ -2926,7 +2926,7 @@
           <p:cNvPr id="5" name="Footer Placeholder 4">
             <a:extLst>
               <a:ext uri="{FF2B5EF4-FFF2-40B4-BE49-F238E27FC236}">
-                <a16:creationId xmlns="" xmlns:a16="http://schemas.microsoft.com/office/drawing/2014/main" id="{43C7B926-18F3-4C13-AB92-764E10D324FB}"/>
+                <a16:creationId xmlns:a16="http://schemas.microsoft.com/office/drawing/2014/main" xmlns="" id="{43C7B926-18F3-4C13-AB92-764E10D324FB}"/>
               </a:ext>
             </a:extLst>
           </p:cNvPr>
@@ -2969,7 +2969,7 @@
           <p:cNvPr id="6" name="Slide Number Placeholder 5">
             <a:extLst>
               <a:ext uri="{FF2B5EF4-FFF2-40B4-BE49-F238E27FC236}">
-                <a16:creationId xmlns="" xmlns:a16="http://schemas.microsoft.com/office/drawing/2014/main" id="{734FA846-3BF6-46FD-80CF-34B300D244C0}"/>
+                <a16:creationId xmlns:a16="http://schemas.microsoft.com/office/drawing/2014/main" xmlns="" id="{734FA846-3BF6-46FD-80CF-34B300D244C0}"/>
               </a:ext>
             </a:extLst>
           </p:cNvPr>
@@ -3337,7 +3337,7 @@
           <p:cNvPr id="4" name="Rectangle 3">
             <a:extLst>
               <a:ext uri="{FF2B5EF4-FFF2-40B4-BE49-F238E27FC236}">
-                <a16:creationId xmlns="" xmlns:a16="http://schemas.microsoft.com/office/drawing/2014/main" id="{0A71868C-EF96-4004-8116-DFD1FCCEE6C3}"/>
+                <a16:creationId xmlns:a16="http://schemas.microsoft.com/office/drawing/2014/main" xmlns="" id="{0A71868C-EF96-4004-8116-DFD1FCCEE6C3}"/>
               </a:ext>
             </a:extLst>
           </p:cNvPr>
@@ -3393,7 +3393,7 @@
           <p:cNvPr id="5" name="Rectangle 4">
             <a:extLst>
               <a:ext uri="{FF2B5EF4-FFF2-40B4-BE49-F238E27FC236}">
-                <a16:creationId xmlns="" xmlns:a16="http://schemas.microsoft.com/office/drawing/2014/main" id="{67A88ADC-D070-420B-9A88-FDBA4865856A}"/>
+                <a16:creationId xmlns:a16="http://schemas.microsoft.com/office/drawing/2014/main" xmlns="" id="{67A88ADC-D070-420B-9A88-FDBA4865856A}"/>
               </a:ext>
             </a:extLst>
           </p:cNvPr>
@@ -3453,7 +3453,7 @@
           <p:cNvPr id="7" name="Straight Arrow Connector 6">
             <a:extLst>
               <a:ext uri="{FF2B5EF4-FFF2-40B4-BE49-F238E27FC236}">
-                <a16:creationId xmlns="" xmlns:a16="http://schemas.microsoft.com/office/drawing/2014/main" id="{45AD00B6-B022-4C7F-A523-E16E6292918D}"/>
+                <a16:creationId xmlns:a16="http://schemas.microsoft.com/office/drawing/2014/main" xmlns="" id="{45AD00B6-B022-4C7F-A523-E16E6292918D}"/>
               </a:ext>
             </a:extLst>
           </p:cNvPr>
@@ -3495,7 +3495,7 @@
           <p:cNvPr id="8" name="Rectangle 7">
             <a:extLst>
               <a:ext uri="{FF2B5EF4-FFF2-40B4-BE49-F238E27FC236}">
-                <a16:creationId xmlns="" xmlns:a16="http://schemas.microsoft.com/office/drawing/2014/main" id="{3C7A2B3E-B0CA-48CD-A6CB-935EF9D71843}"/>
+                <a16:creationId xmlns:a16="http://schemas.microsoft.com/office/drawing/2014/main" xmlns="" id="{3C7A2B3E-B0CA-48CD-A6CB-935EF9D71843}"/>
               </a:ext>
             </a:extLst>
           </p:cNvPr>
@@ -3555,7 +3555,7 @@
           <p:cNvPr id="9" name="TextBox 8">
             <a:extLst>
               <a:ext uri="{FF2B5EF4-FFF2-40B4-BE49-F238E27FC236}">
-                <a16:creationId xmlns="" xmlns:a16="http://schemas.microsoft.com/office/drawing/2014/main" id="{ABD7B54F-357C-489B-ADE1-DFA04BEA1686}"/>
+                <a16:creationId xmlns:a16="http://schemas.microsoft.com/office/drawing/2014/main" xmlns="" id="{ABD7B54F-357C-489B-ADE1-DFA04BEA1686}"/>
               </a:ext>
             </a:extLst>
           </p:cNvPr>
@@ -3590,7 +3590,7 @@
           <p:cNvPr id="10" name="Rectangle 9">
             <a:extLst>
               <a:ext uri="{FF2B5EF4-FFF2-40B4-BE49-F238E27FC236}">
-                <a16:creationId xmlns="" xmlns:a16="http://schemas.microsoft.com/office/drawing/2014/main" id="{21B869D6-66CB-4B38-975F-B7FEB6AA9B13}"/>
+                <a16:creationId xmlns:a16="http://schemas.microsoft.com/office/drawing/2014/main" xmlns="" id="{21B869D6-66CB-4B38-975F-B7FEB6AA9B13}"/>
               </a:ext>
             </a:extLst>
           </p:cNvPr>
@@ -3639,7 +3639,7 @@
           <p:cNvPr id="12" name="Straight Arrow Connector 11">
             <a:extLst>
               <a:ext uri="{FF2B5EF4-FFF2-40B4-BE49-F238E27FC236}">
-                <a16:creationId xmlns="" xmlns:a16="http://schemas.microsoft.com/office/drawing/2014/main" id="{78CBB1AB-C0E2-40F2-828D-F209304958AC}"/>
+                <a16:creationId xmlns:a16="http://schemas.microsoft.com/office/drawing/2014/main" xmlns="" id="{78CBB1AB-C0E2-40F2-828D-F209304958AC}"/>
               </a:ext>
             </a:extLst>
           </p:cNvPr>
@@ -3682,7 +3682,7 @@
           <p:cNvPr id="14" name="TextBox 13">
             <a:extLst>
               <a:ext uri="{FF2B5EF4-FFF2-40B4-BE49-F238E27FC236}">
-                <a16:creationId xmlns="" xmlns:a16="http://schemas.microsoft.com/office/drawing/2014/main" id="{E0BBD6C8-C8F2-40C5-AA64-85961A11ADC2}"/>
+                <a16:creationId xmlns:a16="http://schemas.microsoft.com/office/drawing/2014/main" xmlns="" id="{E0BBD6C8-C8F2-40C5-AA64-85961A11ADC2}"/>
               </a:ext>
             </a:extLst>
           </p:cNvPr>
@@ -3717,7 +3717,7 @@
           <p:cNvPr id="16" name="Straight Arrow Connector 15">
             <a:extLst>
               <a:ext uri="{FF2B5EF4-FFF2-40B4-BE49-F238E27FC236}">
-                <a16:creationId xmlns="" xmlns:a16="http://schemas.microsoft.com/office/drawing/2014/main" id="{22509349-F226-482F-AC14-E28C2411C4C3}"/>
+                <a16:creationId xmlns:a16="http://schemas.microsoft.com/office/drawing/2014/main" xmlns="" id="{22509349-F226-482F-AC14-E28C2411C4C3}"/>
               </a:ext>
             </a:extLst>
           </p:cNvPr>
@@ -3760,7 +3760,7 @@
           <p:cNvPr id="18" name="TextBox 17">
             <a:extLst>
               <a:ext uri="{FF2B5EF4-FFF2-40B4-BE49-F238E27FC236}">
-                <a16:creationId xmlns="" xmlns:a16="http://schemas.microsoft.com/office/drawing/2014/main" id="{E2DE2503-050C-47C3-BC73-C61D89CEB131}"/>
+                <a16:creationId xmlns:a16="http://schemas.microsoft.com/office/drawing/2014/main" xmlns="" id="{E2DE2503-050C-47C3-BC73-C61D89CEB131}"/>
               </a:ext>
             </a:extLst>
           </p:cNvPr>
@@ -3795,7 +3795,7 @@
           <p:cNvPr id="23" name="Straight Arrow Connector 22">
             <a:extLst>
               <a:ext uri="{FF2B5EF4-FFF2-40B4-BE49-F238E27FC236}">
-                <a16:creationId xmlns="" xmlns:a16="http://schemas.microsoft.com/office/drawing/2014/main" id="{5D314D83-3A56-4BD7-B215-19DEE4ED8C0B}"/>
+                <a16:creationId xmlns:a16="http://schemas.microsoft.com/office/drawing/2014/main" xmlns="" id="{5D314D83-3A56-4BD7-B215-19DEE4ED8C0B}"/>
               </a:ext>
             </a:extLst>
           </p:cNvPr>
@@ -3838,7 +3838,7 @@
           <p:cNvPr id="24" name="Straight Arrow Connector 23">
             <a:extLst>
               <a:ext uri="{FF2B5EF4-FFF2-40B4-BE49-F238E27FC236}">
-                <a16:creationId xmlns="" xmlns:a16="http://schemas.microsoft.com/office/drawing/2014/main" id="{874E7075-4C88-4378-99B9-DC474BE0CE65}"/>
+                <a16:creationId xmlns:a16="http://schemas.microsoft.com/office/drawing/2014/main" xmlns="" id="{874E7075-4C88-4378-99B9-DC474BE0CE65}"/>
               </a:ext>
             </a:extLst>
           </p:cNvPr>
@@ -3881,7 +3881,7 @@
           <p:cNvPr id="25" name="TextBox 24">
             <a:extLst>
               <a:ext uri="{FF2B5EF4-FFF2-40B4-BE49-F238E27FC236}">
-                <a16:creationId xmlns="" xmlns:a16="http://schemas.microsoft.com/office/drawing/2014/main" id="{171D93A1-C181-4F9C-8D75-C106DB531AB7}"/>
+                <a16:creationId xmlns:a16="http://schemas.microsoft.com/office/drawing/2014/main" xmlns="" id="{171D93A1-C181-4F9C-8D75-C106DB531AB7}"/>
               </a:ext>
             </a:extLst>
           </p:cNvPr>
@@ -3916,7 +3916,7 @@
           <p:cNvPr id="26" name="TextBox 25">
             <a:extLst>
               <a:ext uri="{FF2B5EF4-FFF2-40B4-BE49-F238E27FC236}">
-                <a16:creationId xmlns="" xmlns:a16="http://schemas.microsoft.com/office/drawing/2014/main" id="{03EAB749-77B2-435B-A0A3-02060FD4A06F}"/>
+                <a16:creationId xmlns:a16="http://schemas.microsoft.com/office/drawing/2014/main" xmlns="" id="{03EAB749-77B2-435B-A0A3-02060FD4A06F}"/>
               </a:ext>
             </a:extLst>
           </p:cNvPr>
@@ -3951,7 +3951,7 @@
           <p:cNvPr id="27" name="TextBox 26">
             <a:extLst>
               <a:ext uri="{FF2B5EF4-FFF2-40B4-BE49-F238E27FC236}">
-                <a16:creationId xmlns="" xmlns:a16="http://schemas.microsoft.com/office/drawing/2014/main" id="{7D8414B9-747D-41E7-A06D-8BBA5042C15C}"/>
+                <a16:creationId xmlns:a16="http://schemas.microsoft.com/office/drawing/2014/main" xmlns="" id="{7D8414B9-747D-41E7-A06D-8BBA5042C15C}"/>
               </a:ext>
             </a:extLst>
           </p:cNvPr>
@@ -3986,7 +3986,7 @@
           <p:cNvPr id="28" name="TextBox 27">
             <a:extLst>
               <a:ext uri="{FF2B5EF4-FFF2-40B4-BE49-F238E27FC236}">
-                <a16:creationId xmlns="" xmlns:a16="http://schemas.microsoft.com/office/drawing/2014/main" id="{F559714E-416D-4742-9901-ADC4D8BAC5FA}"/>
+                <a16:creationId xmlns:a16="http://schemas.microsoft.com/office/drawing/2014/main" xmlns="" id="{F559714E-416D-4742-9901-ADC4D8BAC5FA}"/>
               </a:ext>
             </a:extLst>
           </p:cNvPr>
@@ -4021,7 +4021,7 @@
           <p:cNvPr id="31" name="Rectangle 30">
             <a:extLst>
               <a:ext uri="{FF2B5EF4-FFF2-40B4-BE49-F238E27FC236}">
-                <a16:creationId xmlns="" xmlns:a16="http://schemas.microsoft.com/office/drawing/2014/main" id="{9061AF07-38B9-4B05-B6B2-1A74D7C0C618}"/>
+                <a16:creationId xmlns:a16="http://schemas.microsoft.com/office/drawing/2014/main" xmlns="" id="{9061AF07-38B9-4B05-B6B2-1A74D7C0C618}"/>
               </a:ext>
             </a:extLst>
           </p:cNvPr>
@@ -4081,7 +4081,7 @@
           <p:cNvPr id="33" name="Connector: Elbow 32">
             <a:extLst>
               <a:ext uri="{FF2B5EF4-FFF2-40B4-BE49-F238E27FC236}">
-                <a16:creationId xmlns="" xmlns:a16="http://schemas.microsoft.com/office/drawing/2014/main" id="{B367C937-E98B-4009-B48E-DBF7102DCFD1}"/>
+                <a16:creationId xmlns:a16="http://schemas.microsoft.com/office/drawing/2014/main" xmlns="" id="{B367C937-E98B-4009-B48E-DBF7102DCFD1}"/>
               </a:ext>
             </a:extLst>
           </p:cNvPr>
@@ -4123,7 +4123,7 @@
           <p:cNvPr id="34" name="TextBox 33">
             <a:extLst>
               <a:ext uri="{FF2B5EF4-FFF2-40B4-BE49-F238E27FC236}">
-                <a16:creationId xmlns="" xmlns:a16="http://schemas.microsoft.com/office/drawing/2014/main" id="{7FC33359-8BE1-4CD9-AD98-06C75CE8FF08}"/>
+                <a16:creationId xmlns:a16="http://schemas.microsoft.com/office/drawing/2014/main" xmlns="" id="{7FC33359-8BE1-4CD9-AD98-06C75CE8FF08}"/>
               </a:ext>
             </a:extLst>
           </p:cNvPr>
@@ -4158,7 +4158,7 @@
           <p:cNvPr id="35" name="Rectangle 34">
             <a:extLst>
               <a:ext uri="{FF2B5EF4-FFF2-40B4-BE49-F238E27FC236}">
-                <a16:creationId xmlns="" xmlns:a16="http://schemas.microsoft.com/office/drawing/2014/main" id="{85531841-C806-4F00-B17D-D19E7CE1C155}"/>
+                <a16:creationId xmlns:a16="http://schemas.microsoft.com/office/drawing/2014/main" xmlns="" id="{85531841-C806-4F00-B17D-D19E7CE1C155}"/>
               </a:ext>
             </a:extLst>
           </p:cNvPr>
@@ -4217,7 +4217,7 @@
           <p:cNvPr id="37" name="Connector: Elbow 36">
             <a:extLst>
               <a:ext uri="{FF2B5EF4-FFF2-40B4-BE49-F238E27FC236}">
-                <a16:creationId xmlns="" xmlns:a16="http://schemas.microsoft.com/office/drawing/2014/main" id="{1BFE62EC-0F5D-4135-832D-63D5DC95509C}"/>
+                <a16:creationId xmlns:a16="http://schemas.microsoft.com/office/drawing/2014/main" xmlns="" id="{1BFE62EC-0F5D-4135-832D-63D5DC95509C}"/>
               </a:ext>
             </a:extLst>
           </p:cNvPr>
@@ -4262,7 +4262,7 @@
           <p:cNvPr id="38" name="TextBox 37">
             <a:extLst>
               <a:ext uri="{FF2B5EF4-FFF2-40B4-BE49-F238E27FC236}">
-                <a16:creationId xmlns="" xmlns:a16="http://schemas.microsoft.com/office/drawing/2014/main" id="{892D5E6B-E445-4560-9C01-6D3C52FFC5AA}"/>
+                <a16:creationId xmlns:a16="http://schemas.microsoft.com/office/drawing/2014/main" xmlns="" id="{892D5E6B-E445-4560-9C01-6D3C52FFC5AA}"/>
               </a:ext>
             </a:extLst>
           </p:cNvPr>
@@ -4297,7 +4297,7 @@
           <p:cNvPr id="39" name="Rectangle 38">
             <a:extLst>
               <a:ext uri="{FF2B5EF4-FFF2-40B4-BE49-F238E27FC236}">
-                <a16:creationId xmlns="" xmlns:a16="http://schemas.microsoft.com/office/drawing/2014/main" id="{2F2BC059-EF97-4BEE-8F18-133838E3F2D8}"/>
+                <a16:creationId xmlns:a16="http://schemas.microsoft.com/office/drawing/2014/main" xmlns="" id="{2F2BC059-EF97-4BEE-8F18-133838E3F2D8}"/>
               </a:ext>
             </a:extLst>
           </p:cNvPr>
@@ -4346,7 +4346,7 @@
           <p:cNvPr id="44" name="TextBox 43">
             <a:extLst>
               <a:ext uri="{FF2B5EF4-FFF2-40B4-BE49-F238E27FC236}">
-                <a16:creationId xmlns="" xmlns:a16="http://schemas.microsoft.com/office/drawing/2014/main" id="{48B10C1F-BA7F-40E8-B79A-E87D7A3A66AB}"/>
+                <a16:creationId xmlns:a16="http://schemas.microsoft.com/office/drawing/2014/main" xmlns="" id="{48B10C1F-BA7F-40E8-B79A-E87D7A3A66AB}"/>
               </a:ext>
             </a:extLst>
           </p:cNvPr>
@@ -4561,7 +4561,7 @@
           <p:cNvPr id="11" name="TextBox 10">
             <a:extLst>
               <a:ext uri="{FF2B5EF4-FFF2-40B4-BE49-F238E27FC236}">
-                <a16:creationId xmlns="" xmlns:a16="http://schemas.microsoft.com/office/drawing/2014/main" id="{E0BBD6C8-C8F2-40C5-AA64-85961A11ADC2}"/>
+                <a16:creationId xmlns:a16="http://schemas.microsoft.com/office/drawing/2014/main" xmlns="" id="{E0BBD6C8-C8F2-40C5-AA64-85961A11ADC2}"/>
               </a:ext>
             </a:extLst>
           </p:cNvPr>
@@ -4689,7 +4689,7 @@
           <p:cNvPr id="19" name="TextBox 18">
             <a:extLst>
               <a:ext uri="{FF2B5EF4-FFF2-40B4-BE49-F238E27FC236}">
-                <a16:creationId xmlns="" xmlns:a16="http://schemas.microsoft.com/office/drawing/2014/main" id="{E0BBD6C8-C8F2-40C5-AA64-85961A11ADC2}"/>
+                <a16:creationId xmlns:a16="http://schemas.microsoft.com/office/drawing/2014/main" xmlns="" id="{E0BBD6C8-C8F2-40C5-AA64-85961A11ADC2}"/>
               </a:ext>
             </a:extLst>
           </p:cNvPr>
@@ -4811,7 +4811,7 @@
           <p:cNvPr id="23" name="TextBox 22">
             <a:extLst>
               <a:ext uri="{FF2B5EF4-FFF2-40B4-BE49-F238E27FC236}">
-                <a16:creationId xmlns="" xmlns:a16="http://schemas.microsoft.com/office/drawing/2014/main" id="{E0BBD6C8-C8F2-40C5-AA64-85961A11ADC2}"/>
+                <a16:creationId xmlns:a16="http://schemas.microsoft.com/office/drawing/2014/main" xmlns="" id="{E0BBD6C8-C8F2-40C5-AA64-85961A11ADC2}"/>
               </a:ext>
             </a:extLst>
           </p:cNvPr>
@@ -4931,7 +4931,7 @@
           <p:cNvPr id="28" name="TextBox 27">
             <a:extLst>
               <a:ext uri="{FF2B5EF4-FFF2-40B4-BE49-F238E27FC236}">
-                <a16:creationId xmlns="" xmlns:a16="http://schemas.microsoft.com/office/drawing/2014/main" id="{E0BBD6C8-C8F2-40C5-AA64-85961A11ADC2}"/>
+                <a16:creationId xmlns:a16="http://schemas.microsoft.com/office/drawing/2014/main" xmlns="" id="{E0BBD6C8-C8F2-40C5-AA64-85961A11ADC2}"/>
               </a:ext>
             </a:extLst>
           </p:cNvPr>
@@ -5060,7 +5060,7 @@
           <p:cNvPr id="34" name="TextBox 33">
             <a:extLst>
               <a:ext uri="{FF2B5EF4-FFF2-40B4-BE49-F238E27FC236}">
-                <a16:creationId xmlns="" xmlns:a16="http://schemas.microsoft.com/office/drawing/2014/main" id="{E0BBD6C8-C8F2-40C5-AA64-85961A11ADC2}"/>
+                <a16:creationId xmlns:a16="http://schemas.microsoft.com/office/drawing/2014/main" xmlns="" id="{E0BBD6C8-C8F2-40C5-AA64-85961A11ADC2}"/>
               </a:ext>
             </a:extLst>
           </p:cNvPr>
@@ -5192,7 +5192,7 @@
           <p:cNvPr id="38" name="TextBox 37">
             <a:extLst>
               <a:ext uri="{FF2B5EF4-FFF2-40B4-BE49-F238E27FC236}">
-                <a16:creationId xmlns="" xmlns:a16="http://schemas.microsoft.com/office/drawing/2014/main" id="{E0BBD6C8-C8F2-40C5-AA64-85961A11ADC2}"/>
+                <a16:creationId xmlns:a16="http://schemas.microsoft.com/office/drawing/2014/main" xmlns="" id="{E0BBD6C8-C8F2-40C5-AA64-85961A11ADC2}"/>
               </a:ext>
             </a:extLst>
           </p:cNvPr>
@@ -5362,7 +5362,7 @@
           <p:cNvPr id="44" name="TextBox 43">
             <a:extLst>
               <a:ext uri="{FF2B5EF4-FFF2-40B4-BE49-F238E27FC236}">
-                <a16:creationId xmlns="" xmlns:a16="http://schemas.microsoft.com/office/drawing/2014/main" id="{E0BBD6C8-C8F2-40C5-AA64-85961A11ADC2}"/>
+                <a16:creationId xmlns:a16="http://schemas.microsoft.com/office/drawing/2014/main" xmlns="" id="{E0BBD6C8-C8F2-40C5-AA64-85961A11ADC2}"/>
               </a:ext>
             </a:extLst>
           </p:cNvPr>
@@ -5397,7 +5397,7 @@
           <p:cNvPr id="45" name="TextBox 44">
             <a:extLst>
               <a:ext uri="{FF2B5EF4-FFF2-40B4-BE49-F238E27FC236}">
-                <a16:creationId xmlns="" xmlns:a16="http://schemas.microsoft.com/office/drawing/2014/main" id="{E0BBD6C8-C8F2-40C5-AA64-85961A11ADC2}"/>
+                <a16:creationId xmlns:a16="http://schemas.microsoft.com/office/drawing/2014/main" xmlns="" id="{E0BBD6C8-C8F2-40C5-AA64-85961A11ADC2}"/>
               </a:ext>
             </a:extLst>
           </p:cNvPr>
@@ -5432,7 +5432,7 @@
           <p:cNvPr id="26" name="TextBox 25">
             <a:extLst>
               <a:ext uri="{FF2B5EF4-FFF2-40B4-BE49-F238E27FC236}">
-                <a16:creationId xmlns="" xmlns:a16="http://schemas.microsoft.com/office/drawing/2014/main" id="{70BF22D6-D5A2-4CCC-8E2D-329E25668556}"/>
+                <a16:creationId xmlns:a16="http://schemas.microsoft.com/office/drawing/2014/main" xmlns="" id="{70BF22D6-D5A2-4CCC-8E2D-329E25668556}"/>
               </a:ext>
             </a:extLst>
           </p:cNvPr>
@@ -5648,7 +5648,7 @@
           <p:cNvPr id="11" name="TextBox 10">
             <a:extLst>
               <a:ext uri="{FF2B5EF4-FFF2-40B4-BE49-F238E27FC236}">
-                <a16:creationId xmlns="" xmlns:a16="http://schemas.microsoft.com/office/drawing/2014/main" id="{E0BBD6C8-C8F2-40C5-AA64-85961A11ADC2}"/>
+                <a16:creationId xmlns:a16="http://schemas.microsoft.com/office/drawing/2014/main" xmlns="" id="{E0BBD6C8-C8F2-40C5-AA64-85961A11ADC2}"/>
               </a:ext>
             </a:extLst>
           </p:cNvPr>
@@ -5783,7 +5783,7 @@
           <p:cNvPr id="19" name="TextBox 18">
             <a:extLst>
               <a:ext uri="{FF2B5EF4-FFF2-40B4-BE49-F238E27FC236}">
-                <a16:creationId xmlns="" xmlns:a16="http://schemas.microsoft.com/office/drawing/2014/main" id="{E0BBD6C8-C8F2-40C5-AA64-85961A11ADC2}"/>
+                <a16:creationId xmlns:a16="http://schemas.microsoft.com/office/drawing/2014/main" xmlns="" id="{E0BBD6C8-C8F2-40C5-AA64-85961A11ADC2}"/>
               </a:ext>
             </a:extLst>
           </p:cNvPr>
@@ -5905,7 +5905,7 @@
           <p:cNvPr id="23" name="TextBox 22">
             <a:extLst>
               <a:ext uri="{FF2B5EF4-FFF2-40B4-BE49-F238E27FC236}">
-                <a16:creationId xmlns="" xmlns:a16="http://schemas.microsoft.com/office/drawing/2014/main" id="{E0BBD6C8-C8F2-40C5-AA64-85961A11ADC2}"/>
+                <a16:creationId xmlns:a16="http://schemas.microsoft.com/office/drawing/2014/main" xmlns="" id="{E0BBD6C8-C8F2-40C5-AA64-85961A11ADC2}"/>
               </a:ext>
             </a:extLst>
           </p:cNvPr>
@@ -6019,7 +6019,7 @@
           <p:cNvPr id="28" name="TextBox 27">
             <a:extLst>
               <a:ext uri="{FF2B5EF4-FFF2-40B4-BE49-F238E27FC236}">
-                <a16:creationId xmlns="" xmlns:a16="http://schemas.microsoft.com/office/drawing/2014/main" id="{E0BBD6C8-C8F2-40C5-AA64-85961A11ADC2}"/>
+                <a16:creationId xmlns:a16="http://schemas.microsoft.com/office/drawing/2014/main" xmlns="" id="{E0BBD6C8-C8F2-40C5-AA64-85961A11ADC2}"/>
               </a:ext>
             </a:extLst>
           </p:cNvPr>
@@ -6140,7 +6140,7 @@
           <p:cNvPr id="34" name="TextBox 33">
             <a:extLst>
               <a:ext uri="{FF2B5EF4-FFF2-40B4-BE49-F238E27FC236}">
-                <a16:creationId xmlns="" xmlns:a16="http://schemas.microsoft.com/office/drawing/2014/main" id="{E0BBD6C8-C8F2-40C5-AA64-85961A11ADC2}"/>
+                <a16:creationId xmlns:a16="http://schemas.microsoft.com/office/drawing/2014/main" xmlns="" id="{E0BBD6C8-C8F2-40C5-AA64-85961A11ADC2}"/>
               </a:ext>
             </a:extLst>
           </p:cNvPr>
@@ -6261,7 +6261,7 @@
           <p:cNvPr id="38" name="TextBox 37">
             <a:extLst>
               <a:ext uri="{FF2B5EF4-FFF2-40B4-BE49-F238E27FC236}">
-                <a16:creationId xmlns="" xmlns:a16="http://schemas.microsoft.com/office/drawing/2014/main" id="{E0BBD6C8-C8F2-40C5-AA64-85961A11ADC2}"/>
+                <a16:creationId xmlns:a16="http://schemas.microsoft.com/office/drawing/2014/main" xmlns="" id="{E0BBD6C8-C8F2-40C5-AA64-85961A11ADC2}"/>
               </a:ext>
             </a:extLst>
           </p:cNvPr>
@@ -6425,7 +6425,7 @@
           <p:cNvPr id="44" name="TextBox 43">
             <a:extLst>
               <a:ext uri="{FF2B5EF4-FFF2-40B4-BE49-F238E27FC236}">
-                <a16:creationId xmlns="" xmlns:a16="http://schemas.microsoft.com/office/drawing/2014/main" id="{E0BBD6C8-C8F2-40C5-AA64-85961A11ADC2}"/>
+                <a16:creationId xmlns:a16="http://schemas.microsoft.com/office/drawing/2014/main" xmlns="" id="{E0BBD6C8-C8F2-40C5-AA64-85961A11ADC2}"/>
               </a:ext>
             </a:extLst>
           </p:cNvPr>
@@ -6460,7 +6460,7 @@
           <p:cNvPr id="45" name="TextBox 44">
             <a:extLst>
               <a:ext uri="{FF2B5EF4-FFF2-40B4-BE49-F238E27FC236}">
-                <a16:creationId xmlns="" xmlns:a16="http://schemas.microsoft.com/office/drawing/2014/main" id="{E0BBD6C8-C8F2-40C5-AA64-85961A11ADC2}"/>
+                <a16:creationId xmlns:a16="http://schemas.microsoft.com/office/drawing/2014/main" xmlns="" id="{E0BBD6C8-C8F2-40C5-AA64-85961A11ADC2}"/>
               </a:ext>
             </a:extLst>
           </p:cNvPr>
@@ -6495,7 +6495,7 @@
           <p:cNvPr id="26" name="TextBox 25">
             <a:extLst>
               <a:ext uri="{FF2B5EF4-FFF2-40B4-BE49-F238E27FC236}">
-                <a16:creationId xmlns="" xmlns:a16="http://schemas.microsoft.com/office/drawing/2014/main" id="{70BF22D6-D5A2-4CCC-8E2D-329E25668556}"/>
+                <a16:creationId xmlns:a16="http://schemas.microsoft.com/office/drawing/2014/main" xmlns="" id="{70BF22D6-D5A2-4CCC-8E2D-329E25668556}"/>
               </a:ext>
             </a:extLst>
           </p:cNvPr>
@@ -6530,7 +6530,7 @@
           <p:cNvPr id="40" name="TextBox 39">
             <a:extLst>
               <a:ext uri="{FF2B5EF4-FFF2-40B4-BE49-F238E27FC236}">
-                <a16:creationId xmlns="" xmlns:a16="http://schemas.microsoft.com/office/drawing/2014/main" id="{BF7734B1-6C1B-4ADB-BBA4-2510EE97BB9D}"/>
+                <a16:creationId xmlns:a16="http://schemas.microsoft.com/office/drawing/2014/main" xmlns="" id="{BF7734B1-6C1B-4ADB-BBA4-2510EE97BB9D}"/>
               </a:ext>
             </a:extLst>
           </p:cNvPr>
@@ -6565,7 +6565,7 @@
           <p:cNvPr id="32" name="Straight Arrow Connector 31">
             <a:extLst>
               <a:ext uri="{FF2B5EF4-FFF2-40B4-BE49-F238E27FC236}">
-                <a16:creationId xmlns="" xmlns:a16="http://schemas.microsoft.com/office/drawing/2014/main" id="{5BC5C957-DD00-47FE-A727-262A8F90A864}"/>
+                <a16:creationId xmlns:a16="http://schemas.microsoft.com/office/drawing/2014/main" xmlns="" id="{5BC5C957-DD00-47FE-A727-262A8F90A864}"/>
               </a:ext>
             </a:extLst>
           </p:cNvPr>
@@ -6802,7 +6802,7 @@
           <p:cNvPr id="11" name="TextBox 10">
             <a:extLst>
               <a:ext uri="{FF2B5EF4-FFF2-40B4-BE49-F238E27FC236}">
-                <a16:creationId xmlns="" xmlns:a16="http://schemas.microsoft.com/office/drawing/2014/main" id="{E0BBD6C8-C8F2-40C5-AA64-85961A11ADC2}"/>
+                <a16:creationId xmlns:a16="http://schemas.microsoft.com/office/drawing/2014/main" xmlns="" id="{E0BBD6C8-C8F2-40C5-AA64-85961A11ADC2}"/>
               </a:ext>
             </a:extLst>
           </p:cNvPr>
@@ -6949,7 +6949,7 @@
           <p:cNvPr id="19" name="TextBox 18">
             <a:extLst>
               <a:ext uri="{FF2B5EF4-FFF2-40B4-BE49-F238E27FC236}">
-                <a16:creationId xmlns="" xmlns:a16="http://schemas.microsoft.com/office/drawing/2014/main" id="{E0BBD6C8-C8F2-40C5-AA64-85961A11ADC2}"/>
+                <a16:creationId xmlns:a16="http://schemas.microsoft.com/office/drawing/2014/main" xmlns="" id="{E0BBD6C8-C8F2-40C5-AA64-85961A11ADC2}"/>
               </a:ext>
             </a:extLst>
           </p:cNvPr>
@@ -7075,7 +7075,7 @@
           <p:cNvPr id="23" name="TextBox 22">
             <a:extLst>
               <a:ext uri="{FF2B5EF4-FFF2-40B4-BE49-F238E27FC236}">
-                <a16:creationId xmlns="" xmlns:a16="http://schemas.microsoft.com/office/drawing/2014/main" id="{E0BBD6C8-C8F2-40C5-AA64-85961A11ADC2}"/>
+                <a16:creationId xmlns:a16="http://schemas.microsoft.com/office/drawing/2014/main" xmlns="" id="{E0BBD6C8-C8F2-40C5-AA64-85961A11ADC2}"/>
               </a:ext>
             </a:extLst>
           </p:cNvPr>
@@ -7192,7 +7192,7 @@
           <p:cNvPr id="28" name="TextBox 27">
             <a:extLst>
               <a:ext uri="{FF2B5EF4-FFF2-40B4-BE49-F238E27FC236}">
-                <a16:creationId xmlns="" xmlns:a16="http://schemas.microsoft.com/office/drawing/2014/main" id="{E0BBD6C8-C8F2-40C5-AA64-85961A11ADC2}"/>
+                <a16:creationId xmlns:a16="http://schemas.microsoft.com/office/drawing/2014/main" xmlns="" id="{E0BBD6C8-C8F2-40C5-AA64-85961A11ADC2}"/>
               </a:ext>
             </a:extLst>
           </p:cNvPr>
@@ -7317,7 +7317,7 @@
           <p:cNvPr id="34" name="TextBox 33">
             <a:extLst>
               <a:ext uri="{FF2B5EF4-FFF2-40B4-BE49-F238E27FC236}">
-                <a16:creationId xmlns="" xmlns:a16="http://schemas.microsoft.com/office/drawing/2014/main" id="{E0BBD6C8-C8F2-40C5-AA64-85961A11ADC2}"/>
+                <a16:creationId xmlns:a16="http://schemas.microsoft.com/office/drawing/2014/main" xmlns="" id="{E0BBD6C8-C8F2-40C5-AA64-85961A11ADC2}"/>
               </a:ext>
             </a:extLst>
           </p:cNvPr>
@@ -7446,7 +7446,7 @@
           <p:cNvPr id="38" name="TextBox 37">
             <a:extLst>
               <a:ext uri="{FF2B5EF4-FFF2-40B4-BE49-F238E27FC236}">
-                <a16:creationId xmlns="" xmlns:a16="http://schemas.microsoft.com/office/drawing/2014/main" id="{E0BBD6C8-C8F2-40C5-AA64-85961A11ADC2}"/>
+                <a16:creationId xmlns:a16="http://schemas.microsoft.com/office/drawing/2014/main" xmlns="" id="{E0BBD6C8-C8F2-40C5-AA64-85961A11ADC2}"/>
               </a:ext>
             </a:extLst>
           </p:cNvPr>
@@ -7615,7 +7615,7 @@
           <p:cNvPr id="44" name="TextBox 43">
             <a:extLst>
               <a:ext uri="{FF2B5EF4-FFF2-40B4-BE49-F238E27FC236}">
-                <a16:creationId xmlns="" xmlns:a16="http://schemas.microsoft.com/office/drawing/2014/main" id="{E0BBD6C8-C8F2-40C5-AA64-85961A11ADC2}"/>
+                <a16:creationId xmlns:a16="http://schemas.microsoft.com/office/drawing/2014/main" xmlns="" id="{E0BBD6C8-C8F2-40C5-AA64-85961A11ADC2}"/>
               </a:ext>
             </a:extLst>
           </p:cNvPr>
@@ -7650,7 +7650,7 @@
           <p:cNvPr id="45" name="TextBox 44">
             <a:extLst>
               <a:ext uri="{FF2B5EF4-FFF2-40B4-BE49-F238E27FC236}">
-                <a16:creationId xmlns="" xmlns:a16="http://schemas.microsoft.com/office/drawing/2014/main" id="{E0BBD6C8-C8F2-40C5-AA64-85961A11ADC2}"/>
+                <a16:creationId xmlns:a16="http://schemas.microsoft.com/office/drawing/2014/main" xmlns="" id="{E0BBD6C8-C8F2-40C5-AA64-85961A11ADC2}"/>
               </a:ext>
             </a:extLst>
           </p:cNvPr>
@@ -7685,7 +7685,7 @@
           <p:cNvPr id="26" name="TextBox 25">
             <a:extLst>
               <a:ext uri="{FF2B5EF4-FFF2-40B4-BE49-F238E27FC236}">
-                <a16:creationId xmlns="" xmlns:a16="http://schemas.microsoft.com/office/drawing/2014/main" id="{6C45E26E-8FEE-4439-A34B-789237C9C62C}"/>
+                <a16:creationId xmlns:a16="http://schemas.microsoft.com/office/drawing/2014/main" xmlns="" id="{6C45E26E-8FEE-4439-A34B-789237C9C62C}"/>
               </a:ext>
             </a:extLst>
           </p:cNvPr>
@@ -7720,7 +7720,7 @@
           <p:cNvPr id="31" name="Rectangle 30">
             <a:extLst>
               <a:ext uri="{FF2B5EF4-FFF2-40B4-BE49-F238E27FC236}">
-                <a16:creationId xmlns="" xmlns:a16="http://schemas.microsoft.com/office/drawing/2014/main" id="{6D396BFC-10E0-4935-903B-EDC457BD1755}"/>
+                <a16:creationId xmlns:a16="http://schemas.microsoft.com/office/drawing/2014/main" xmlns="" id="{6D396BFC-10E0-4935-903B-EDC457BD1755}"/>
               </a:ext>
             </a:extLst>
           </p:cNvPr>
@@ -7780,7 +7780,7 @@
           <p:cNvPr id="32" name="Rectangle 31">
             <a:extLst>
               <a:ext uri="{FF2B5EF4-FFF2-40B4-BE49-F238E27FC236}">
-                <a16:creationId xmlns="" xmlns:a16="http://schemas.microsoft.com/office/drawing/2014/main" id="{02A645C8-F11F-438D-92DC-F6FCCA5ECFB8}"/>
+                <a16:creationId xmlns:a16="http://schemas.microsoft.com/office/drawing/2014/main" xmlns="" id="{02A645C8-F11F-438D-92DC-F6FCCA5ECFB8}"/>
               </a:ext>
             </a:extLst>
           </p:cNvPr>
@@ -7840,7 +7840,7 @@
           <p:cNvPr id="12" name="Straight Arrow Connector 11">
             <a:extLst>
               <a:ext uri="{FF2B5EF4-FFF2-40B4-BE49-F238E27FC236}">
-                <a16:creationId xmlns="" xmlns:a16="http://schemas.microsoft.com/office/drawing/2014/main" id="{FF2076CA-F897-4293-B6CD-7408EB452156}"/>
+                <a16:creationId xmlns:a16="http://schemas.microsoft.com/office/drawing/2014/main" xmlns="" id="{FF2076CA-F897-4293-B6CD-7408EB452156}"/>
               </a:ext>
             </a:extLst>
           </p:cNvPr>
@@ -7883,7 +7883,7 @@
           <p:cNvPr id="14" name="Straight Arrow Connector 13">
             <a:extLst>
               <a:ext uri="{FF2B5EF4-FFF2-40B4-BE49-F238E27FC236}">
-                <a16:creationId xmlns="" xmlns:a16="http://schemas.microsoft.com/office/drawing/2014/main" id="{5C625B7B-4A1E-46C5-9082-4FEC89B30DA9}"/>
+                <a16:creationId xmlns:a16="http://schemas.microsoft.com/office/drawing/2014/main" xmlns="" id="{5C625B7B-4A1E-46C5-9082-4FEC89B30DA9}"/>
               </a:ext>
             </a:extLst>
           </p:cNvPr>
@@ -7926,7 +7926,7 @@
           <p:cNvPr id="65" name="Straight Arrow Connector 64">
             <a:extLst>
               <a:ext uri="{FF2B5EF4-FFF2-40B4-BE49-F238E27FC236}">
-                <a16:creationId xmlns="" xmlns:a16="http://schemas.microsoft.com/office/drawing/2014/main" id="{C1C9B843-1D11-4D9F-8CBF-AE00E90AA070}"/>
+                <a16:creationId xmlns:a16="http://schemas.microsoft.com/office/drawing/2014/main" xmlns="" id="{C1C9B843-1D11-4D9F-8CBF-AE00E90AA070}"/>
               </a:ext>
             </a:extLst>
           </p:cNvPr>
@@ -7968,7 +7968,7 @@
           <p:cNvPr id="66" name="TextBox 65">
             <a:extLst>
               <a:ext uri="{FF2B5EF4-FFF2-40B4-BE49-F238E27FC236}">
-                <a16:creationId xmlns="" xmlns:a16="http://schemas.microsoft.com/office/drawing/2014/main" id="{5E4B2700-0522-40EF-B035-166AA1C17D76}"/>
+                <a16:creationId xmlns:a16="http://schemas.microsoft.com/office/drawing/2014/main" xmlns="" id="{5E4B2700-0522-40EF-B035-166AA1C17D76}"/>
               </a:ext>
             </a:extLst>
           </p:cNvPr>
@@ -8052,48 +8052,12 @@
           </a:p>
         </p:txBody>
       </p:sp>
-      <p:cxnSp>
-        <p:nvCxnSpPr>
-          <p:cNvPr id="8" name="Straight Arrow Connector 7"/>
-          <p:cNvCxnSpPr>
-            <a:stCxn id="29" idx="2"/>
-            <a:endCxn id="36" idx="0"/>
-          </p:cNvCxnSpPr>
-          <p:nvPr/>
-        </p:nvCxnSpPr>
-        <p:spPr>
-          <a:xfrm flipH="1">
-            <a:off x="5773685" y="4842588"/>
-            <a:ext cx="41142" cy="703944"/>
-          </a:xfrm>
-          <a:prstGeom prst="straightConnector1">
-            <a:avLst/>
-          </a:prstGeom>
-          <a:ln>
-            <a:tailEnd type="triangle"/>
-          </a:ln>
-        </p:spPr>
-        <p:style>
-          <a:lnRef idx="1">
-            <a:schemeClr val="accent1"/>
-          </a:lnRef>
-          <a:fillRef idx="0">
-            <a:schemeClr val="accent1"/>
-          </a:fillRef>
-          <a:effectRef idx="0">
-            <a:schemeClr val="accent1"/>
-          </a:effectRef>
-          <a:fontRef idx="minor">
-            <a:schemeClr val="tx1"/>
-          </a:fontRef>
-        </p:style>
-      </p:cxnSp>
       <p:sp>
         <p:nvSpPr>
           <p:cNvPr id="40" name="TextBox 39">
             <a:extLst>
               <a:ext uri="{FF2B5EF4-FFF2-40B4-BE49-F238E27FC236}">
-                <a16:creationId xmlns="" xmlns:a16="http://schemas.microsoft.com/office/drawing/2014/main" id="{E0BBD6C8-C8F2-40C5-AA64-85961A11ADC2}"/>
+                <a16:creationId xmlns:a16="http://schemas.microsoft.com/office/drawing/2014/main" xmlns="" id="{E0BBD6C8-C8F2-40C5-AA64-85961A11ADC2}"/>
               </a:ext>
             </a:extLst>
           </p:cNvPr>
@@ -8102,7 +8066,7 @@
         </p:nvSpPr>
         <p:spPr>
           <a:xfrm>
-            <a:off x="5362944" y="5025434"/>
+            <a:off x="6945158" y="5232046"/>
             <a:ext cx="728932" cy="276999"/>
           </a:xfrm>
           <a:prstGeom prst="rect">
@@ -8138,7 +8102,9 @@
             <a:avLst/>
           </a:prstGeom>
           <a:solidFill>
-            <a:schemeClr val="accent2"/>
+            <a:schemeClr val="accent2">
+              <a:lumMod val="75000"/>
+            </a:schemeClr>
           </a:solidFill>
         </p:spPr>
         <p:style>
@@ -8219,7 +8185,7 @@
           <p:cNvPr id="48" name="TextBox 47">
             <a:extLst>
               <a:ext uri="{FF2B5EF4-FFF2-40B4-BE49-F238E27FC236}">
-                <a16:creationId xmlns="" xmlns:a16="http://schemas.microsoft.com/office/drawing/2014/main" id="{E0BBD6C8-C8F2-40C5-AA64-85961A11ADC2}"/>
+                <a16:creationId xmlns:a16="http://schemas.microsoft.com/office/drawing/2014/main" xmlns="" id="{E0BBD6C8-C8F2-40C5-AA64-85961A11ADC2}"/>
               </a:ext>
             </a:extLst>
           </p:cNvPr>
@@ -8261,7 +8227,7 @@
           <p:cNvPr id="52" name="Rectangle 51">
             <a:extLst>
               <a:ext uri="{FF2B5EF4-FFF2-40B4-BE49-F238E27FC236}">
-                <a16:creationId xmlns="" xmlns:a16="http://schemas.microsoft.com/office/drawing/2014/main" id="{21B869D6-66CB-4B38-975F-B7FEB6AA9B13}"/>
+                <a16:creationId xmlns:a16="http://schemas.microsoft.com/office/drawing/2014/main" xmlns="" id="{21B869D6-66CB-4B38-975F-B7FEB6AA9B13}"/>
               </a:ext>
             </a:extLst>
           </p:cNvPr>
@@ -8387,7 +8353,7 @@
           <p:cNvPr id="58" name="TextBox 57">
             <a:extLst>
               <a:ext uri="{FF2B5EF4-FFF2-40B4-BE49-F238E27FC236}">
-                <a16:creationId xmlns="" xmlns:a16="http://schemas.microsoft.com/office/drawing/2014/main" id="{E0BBD6C8-C8F2-40C5-AA64-85961A11ADC2}"/>
+                <a16:creationId xmlns:a16="http://schemas.microsoft.com/office/drawing/2014/main" xmlns="" id="{E0BBD6C8-C8F2-40C5-AA64-85961A11ADC2}"/>
               </a:ext>
             </a:extLst>
           </p:cNvPr>
@@ -8513,7 +8479,7 @@
           <p:cNvPr id="50" name="TextBox 49">
             <a:extLst>
               <a:ext uri="{FF2B5EF4-FFF2-40B4-BE49-F238E27FC236}">
-                <a16:creationId xmlns="" xmlns:a16="http://schemas.microsoft.com/office/drawing/2014/main" id="{E0BBD6C8-C8F2-40C5-AA64-85961A11ADC2}"/>
+                <a16:creationId xmlns:a16="http://schemas.microsoft.com/office/drawing/2014/main" xmlns="" id="{E0BBD6C8-C8F2-40C5-AA64-85961A11ADC2}"/>
               </a:ext>
             </a:extLst>
           </p:cNvPr>
@@ -8620,7 +8586,7 @@
           <p:cNvPr id="94" name="TextBox 93">
             <a:extLst>
               <a:ext uri="{FF2B5EF4-FFF2-40B4-BE49-F238E27FC236}">
-                <a16:creationId xmlns="" xmlns:a16="http://schemas.microsoft.com/office/drawing/2014/main" id="{E0BBD6C8-C8F2-40C5-AA64-85961A11ADC2}"/>
+                <a16:creationId xmlns:a16="http://schemas.microsoft.com/office/drawing/2014/main" xmlns="" id="{E0BBD6C8-C8F2-40C5-AA64-85961A11ADC2}"/>
               </a:ext>
             </a:extLst>
           </p:cNvPr>
@@ -8655,7 +8621,7 @@
           <p:cNvPr id="95" name="TextBox 94">
             <a:extLst>
               <a:ext uri="{FF2B5EF4-FFF2-40B4-BE49-F238E27FC236}">
-                <a16:creationId xmlns="" xmlns:a16="http://schemas.microsoft.com/office/drawing/2014/main" id="{E0BBD6C8-C8F2-40C5-AA64-85961A11ADC2}"/>
+                <a16:creationId xmlns:a16="http://schemas.microsoft.com/office/drawing/2014/main" xmlns="" id="{E0BBD6C8-C8F2-40C5-AA64-85961A11ADC2}"/>
               </a:ext>
             </a:extLst>
           </p:cNvPr>
@@ -8685,6 +8651,42 @@
           </a:p>
         </p:txBody>
       </p:sp>
+      <p:cxnSp>
+        <p:nvCxnSpPr>
+          <p:cNvPr id="3" name="Straight Arrow Connector 2"/>
+          <p:cNvCxnSpPr>
+            <a:stCxn id="46" idx="1"/>
+            <a:endCxn id="36" idx="3"/>
+          </p:cNvCxnSpPr>
+          <p:nvPr/>
+        </p:nvCxnSpPr>
+        <p:spPr>
+          <a:xfrm flipH="1">
+            <a:off x="6521083" y="4699032"/>
+            <a:ext cx="1810526" cy="1343028"/>
+          </a:xfrm>
+          <a:prstGeom prst="straightConnector1">
+            <a:avLst/>
+          </a:prstGeom>
+          <a:ln>
+            <a:tailEnd type="triangle"/>
+          </a:ln>
+        </p:spPr>
+        <p:style>
+          <a:lnRef idx="1">
+            <a:schemeClr val="accent1"/>
+          </a:lnRef>
+          <a:fillRef idx="0">
+            <a:schemeClr val="accent1"/>
+          </a:fillRef>
+          <a:effectRef idx="0">
+            <a:schemeClr val="accent1"/>
+          </a:effectRef>
+          <a:fontRef idx="minor">
+            <a:schemeClr val="tx1"/>
+          </a:fontRef>
+        </p:style>
+      </p:cxnSp>
     </p:spTree>
     <p:extLst>
       <p:ext uri="{BB962C8B-B14F-4D97-AF65-F5344CB8AC3E}">
@@ -8888,7 +8890,7 @@
           <p:cNvPr id="11" name="TextBox 10">
             <a:extLst>
               <a:ext uri="{FF2B5EF4-FFF2-40B4-BE49-F238E27FC236}">
-                <a16:creationId xmlns="" xmlns:a16="http://schemas.microsoft.com/office/drawing/2014/main" id="{E0BBD6C8-C8F2-40C5-AA64-85961A11ADC2}"/>
+                <a16:creationId xmlns:a16="http://schemas.microsoft.com/office/drawing/2014/main" xmlns="" id="{E0BBD6C8-C8F2-40C5-AA64-85961A11ADC2}"/>
               </a:ext>
             </a:extLst>
           </p:cNvPr>
@@ -9042,7 +9044,7 @@
           <p:cNvPr id="19" name="TextBox 18">
             <a:extLst>
               <a:ext uri="{FF2B5EF4-FFF2-40B4-BE49-F238E27FC236}">
-                <a16:creationId xmlns="" xmlns:a16="http://schemas.microsoft.com/office/drawing/2014/main" id="{E0BBD6C8-C8F2-40C5-AA64-85961A11ADC2}"/>
+                <a16:creationId xmlns:a16="http://schemas.microsoft.com/office/drawing/2014/main" xmlns="" id="{E0BBD6C8-C8F2-40C5-AA64-85961A11ADC2}"/>
               </a:ext>
             </a:extLst>
           </p:cNvPr>
@@ -9172,7 +9174,7 @@
           <p:cNvPr id="23" name="TextBox 22">
             <a:extLst>
               <a:ext uri="{FF2B5EF4-FFF2-40B4-BE49-F238E27FC236}">
-                <a16:creationId xmlns="" xmlns:a16="http://schemas.microsoft.com/office/drawing/2014/main" id="{E0BBD6C8-C8F2-40C5-AA64-85961A11ADC2}"/>
+                <a16:creationId xmlns:a16="http://schemas.microsoft.com/office/drawing/2014/main" xmlns="" id="{E0BBD6C8-C8F2-40C5-AA64-85961A11ADC2}"/>
               </a:ext>
             </a:extLst>
           </p:cNvPr>
@@ -9289,7 +9291,7 @@
           <p:cNvPr id="28" name="TextBox 27">
             <a:extLst>
               <a:ext uri="{FF2B5EF4-FFF2-40B4-BE49-F238E27FC236}">
-                <a16:creationId xmlns="" xmlns:a16="http://schemas.microsoft.com/office/drawing/2014/main" id="{E0BBD6C8-C8F2-40C5-AA64-85961A11ADC2}"/>
+                <a16:creationId xmlns:a16="http://schemas.microsoft.com/office/drawing/2014/main" xmlns="" id="{E0BBD6C8-C8F2-40C5-AA64-85961A11ADC2}"/>
               </a:ext>
             </a:extLst>
           </p:cNvPr>
@@ -9413,7 +9415,7 @@
           <p:cNvPr id="34" name="TextBox 33">
             <a:extLst>
               <a:ext uri="{FF2B5EF4-FFF2-40B4-BE49-F238E27FC236}">
-                <a16:creationId xmlns="" xmlns:a16="http://schemas.microsoft.com/office/drawing/2014/main" id="{E0BBD6C8-C8F2-40C5-AA64-85961A11ADC2}"/>
+                <a16:creationId xmlns:a16="http://schemas.microsoft.com/office/drawing/2014/main" xmlns="" id="{E0BBD6C8-C8F2-40C5-AA64-85961A11ADC2}"/>
               </a:ext>
             </a:extLst>
           </p:cNvPr>
@@ -9539,7 +9541,7 @@
           <p:cNvPr id="38" name="TextBox 37">
             <a:extLst>
               <a:ext uri="{FF2B5EF4-FFF2-40B4-BE49-F238E27FC236}">
-                <a16:creationId xmlns="" xmlns:a16="http://schemas.microsoft.com/office/drawing/2014/main" id="{E0BBD6C8-C8F2-40C5-AA64-85961A11ADC2}"/>
+                <a16:creationId xmlns:a16="http://schemas.microsoft.com/office/drawing/2014/main" xmlns="" id="{E0BBD6C8-C8F2-40C5-AA64-85961A11ADC2}"/>
               </a:ext>
             </a:extLst>
           </p:cNvPr>
@@ -9707,7 +9709,7 @@
           <p:cNvPr id="44" name="TextBox 43">
             <a:extLst>
               <a:ext uri="{FF2B5EF4-FFF2-40B4-BE49-F238E27FC236}">
-                <a16:creationId xmlns="" xmlns:a16="http://schemas.microsoft.com/office/drawing/2014/main" id="{E0BBD6C8-C8F2-40C5-AA64-85961A11ADC2}"/>
+                <a16:creationId xmlns:a16="http://schemas.microsoft.com/office/drawing/2014/main" xmlns="" id="{E0BBD6C8-C8F2-40C5-AA64-85961A11ADC2}"/>
               </a:ext>
             </a:extLst>
           </p:cNvPr>
@@ -9742,7 +9744,7 @@
           <p:cNvPr id="45" name="TextBox 44">
             <a:extLst>
               <a:ext uri="{FF2B5EF4-FFF2-40B4-BE49-F238E27FC236}">
-                <a16:creationId xmlns="" xmlns:a16="http://schemas.microsoft.com/office/drawing/2014/main" id="{E0BBD6C8-C8F2-40C5-AA64-85961A11ADC2}"/>
+                <a16:creationId xmlns:a16="http://schemas.microsoft.com/office/drawing/2014/main" xmlns="" id="{E0BBD6C8-C8F2-40C5-AA64-85961A11ADC2}"/>
               </a:ext>
             </a:extLst>
           </p:cNvPr>
@@ -9777,7 +9779,7 @@
           <p:cNvPr id="26" name="TextBox 25">
             <a:extLst>
               <a:ext uri="{FF2B5EF4-FFF2-40B4-BE49-F238E27FC236}">
-                <a16:creationId xmlns="" xmlns:a16="http://schemas.microsoft.com/office/drawing/2014/main" id="{6C45E26E-8FEE-4439-A34B-789237C9C62C}"/>
+                <a16:creationId xmlns:a16="http://schemas.microsoft.com/office/drawing/2014/main" xmlns="" id="{6C45E26E-8FEE-4439-A34B-789237C9C62C}"/>
               </a:ext>
             </a:extLst>
           </p:cNvPr>
@@ -9812,7 +9814,7 @@
           <p:cNvPr id="31" name="Rectangle 30">
             <a:extLst>
               <a:ext uri="{FF2B5EF4-FFF2-40B4-BE49-F238E27FC236}">
-                <a16:creationId xmlns="" xmlns:a16="http://schemas.microsoft.com/office/drawing/2014/main" id="{6D396BFC-10E0-4935-903B-EDC457BD1755}"/>
+                <a16:creationId xmlns:a16="http://schemas.microsoft.com/office/drawing/2014/main" xmlns="" id="{6D396BFC-10E0-4935-903B-EDC457BD1755}"/>
               </a:ext>
             </a:extLst>
           </p:cNvPr>
@@ -9872,7 +9874,7 @@
           <p:cNvPr id="32" name="Rectangle 31">
             <a:extLst>
               <a:ext uri="{FF2B5EF4-FFF2-40B4-BE49-F238E27FC236}">
-                <a16:creationId xmlns="" xmlns:a16="http://schemas.microsoft.com/office/drawing/2014/main" id="{02A645C8-F11F-438D-92DC-F6FCCA5ECFB8}"/>
+                <a16:creationId xmlns:a16="http://schemas.microsoft.com/office/drawing/2014/main" xmlns="" id="{02A645C8-F11F-438D-92DC-F6FCCA5ECFB8}"/>
               </a:ext>
             </a:extLst>
           </p:cNvPr>
@@ -9936,7 +9938,7 @@
           <p:cNvPr id="12" name="Straight Arrow Connector 11">
             <a:extLst>
               <a:ext uri="{FF2B5EF4-FFF2-40B4-BE49-F238E27FC236}">
-                <a16:creationId xmlns="" xmlns:a16="http://schemas.microsoft.com/office/drawing/2014/main" id="{FF2076CA-F897-4293-B6CD-7408EB452156}"/>
+                <a16:creationId xmlns:a16="http://schemas.microsoft.com/office/drawing/2014/main" xmlns="" id="{FF2076CA-F897-4293-B6CD-7408EB452156}"/>
               </a:ext>
             </a:extLst>
           </p:cNvPr>
@@ -9979,7 +9981,7 @@
           <p:cNvPr id="14" name="Straight Arrow Connector 13">
             <a:extLst>
               <a:ext uri="{FF2B5EF4-FFF2-40B4-BE49-F238E27FC236}">
-                <a16:creationId xmlns="" xmlns:a16="http://schemas.microsoft.com/office/drawing/2014/main" id="{5C625B7B-4A1E-46C5-9082-4FEC89B30DA9}"/>
+                <a16:creationId xmlns:a16="http://schemas.microsoft.com/office/drawing/2014/main" xmlns="" id="{5C625B7B-4A1E-46C5-9082-4FEC89B30DA9}"/>
               </a:ext>
             </a:extLst>
           </p:cNvPr>
@@ -10022,7 +10024,7 @@
           <p:cNvPr id="10" name="Straight Arrow Connector 9">
             <a:extLst>
               <a:ext uri="{FF2B5EF4-FFF2-40B4-BE49-F238E27FC236}">
-                <a16:creationId xmlns="" xmlns:a16="http://schemas.microsoft.com/office/drawing/2014/main" id="{EF2F45FB-579D-4721-9889-3C0942B8BBFD}"/>
+                <a16:creationId xmlns:a16="http://schemas.microsoft.com/office/drawing/2014/main" xmlns="" id="{EF2F45FB-579D-4721-9889-3C0942B8BBFD}"/>
               </a:ext>
             </a:extLst>
           </p:cNvPr>
@@ -10064,7 +10066,7 @@
           <p:cNvPr id="56" name="Rectangle 55">
             <a:extLst>
               <a:ext uri="{FF2B5EF4-FFF2-40B4-BE49-F238E27FC236}">
-                <a16:creationId xmlns="" xmlns:a16="http://schemas.microsoft.com/office/drawing/2014/main" id="{FA9C2261-AEDB-43AC-86CF-E53B84AB67B0}"/>
+                <a16:creationId xmlns:a16="http://schemas.microsoft.com/office/drawing/2014/main" xmlns="" id="{FA9C2261-AEDB-43AC-86CF-E53B84AB67B0}"/>
               </a:ext>
             </a:extLst>
           </p:cNvPr>
@@ -10154,7 +10156,7 @@
           <p:cNvPr id="61" name="Straight Arrow Connector 60">
             <a:extLst>
               <a:ext uri="{FF2B5EF4-FFF2-40B4-BE49-F238E27FC236}">
-                <a16:creationId xmlns="" xmlns:a16="http://schemas.microsoft.com/office/drawing/2014/main" id="{7A03C540-BE87-4015-8AA4-52E27BB970EE}"/>
+                <a16:creationId xmlns:a16="http://schemas.microsoft.com/office/drawing/2014/main" xmlns="" id="{7A03C540-BE87-4015-8AA4-52E27BB970EE}"/>
               </a:ext>
             </a:extLst>
           </p:cNvPr>
@@ -10196,7 +10198,7 @@
           <p:cNvPr id="63" name="TextBox 62">
             <a:extLst>
               <a:ext uri="{FF2B5EF4-FFF2-40B4-BE49-F238E27FC236}">
-                <a16:creationId xmlns="" xmlns:a16="http://schemas.microsoft.com/office/drawing/2014/main" id="{6A85EB8F-D36A-4163-A076-FD01F5C08B59}"/>
+                <a16:creationId xmlns:a16="http://schemas.microsoft.com/office/drawing/2014/main" xmlns="" id="{6A85EB8F-D36A-4163-A076-FD01F5C08B59}"/>
               </a:ext>
             </a:extLst>
           </p:cNvPr>
@@ -10231,7 +10233,7 @@
           <p:cNvPr id="64" name="TextBox 63">
             <a:extLst>
               <a:ext uri="{FF2B5EF4-FFF2-40B4-BE49-F238E27FC236}">
-                <a16:creationId xmlns="" xmlns:a16="http://schemas.microsoft.com/office/drawing/2014/main" id="{B306D2D8-E0F7-47AC-8F2B-DF5F03898A81}"/>
+                <a16:creationId xmlns:a16="http://schemas.microsoft.com/office/drawing/2014/main" xmlns="" id="{B306D2D8-E0F7-47AC-8F2B-DF5F03898A81}"/>
               </a:ext>
             </a:extLst>
           </p:cNvPr>
@@ -10359,7 +10361,7 @@
           <p:cNvPr id="46" name="TextBox 45">
             <a:extLst>
               <a:ext uri="{FF2B5EF4-FFF2-40B4-BE49-F238E27FC236}">
-                <a16:creationId xmlns="" xmlns:a16="http://schemas.microsoft.com/office/drawing/2014/main" id="{E0BBD6C8-C8F2-40C5-AA64-85961A11ADC2}"/>
+                <a16:creationId xmlns:a16="http://schemas.microsoft.com/office/drawing/2014/main" xmlns="" id="{E0BBD6C8-C8F2-40C5-AA64-85961A11ADC2}"/>
               </a:ext>
             </a:extLst>
           </p:cNvPr>
@@ -10599,7 +10601,7 @@
           <p:cNvPr id="11" name="TextBox 10">
             <a:extLst>
               <a:ext uri="{FF2B5EF4-FFF2-40B4-BE49-F238E27FC236}">
-                <a16:creationId xmlns="" xmlns:a16="http://schemas.microsoft.com/office/drawing/2014/main" id="{E0BBD6C8-C8F2-40C5-AA64-85961A11ADC2}"/>
+                <a16:creationId xmlns:a16="http://schemas.microsoft.com/office/drawing/2014/main" xmlns="" id="{E0BBD6C8-C8F2-40C5-AA64-85961A11ADC2}"/>
               </a:ext>
             </a:extLst>
           </p:cNvPr>
@@ -10756,7 +10758,7 @@
           <p:cNvPr id="19" name="TextBox 18">
             <a:extLst>
               <a:ext uri="{FF2B5EF4-FFF2-40B4-BE49-F238E27FC236}">
-                <a16:creationId xmlns="" xmlns:a16="http://schemas.microsoft.com/office/drawing/2014/main" id="{E0BBD6C8-C8F2-40C5-AA64-85961A11ADC2}"/>
+                <a16:creationId xmlns:a16="http://schemas.microsoft.com/office/drawing/2014/main" xmlns="" id="{E0BBD6C8-C8F2-40C5-AA64-85961A11ADC2}"/>
               </a:ext>
             </a:extLst>
           </p:cNvPr>
@@ -10882,7 +10884,7 @@
           <p:cNvPr id="23" name="TextBox 22">
             <a:extLst>
               <a:ext uri="{FF2B5EF4-FFF2-40B4-BE49-F238E27FC236}">
-                <a16:creationId xmlns="" xmlns:a16="http://schemas.microsoft.com/office/drawing/2014/main" id="{E0BBD6C8-C8F2-40C5-AA64-85961A11ADC2}"/>
+                <a16:creationId xmlns:a16="http://schemas.microsoft.com/office/drawing/2014/main" xmlns="" id="{E0BBD6C8-C8F2-40C5-AA64-85961A11ADC2}"/>
               </a:ext>
             </a:extLst>
           </p:cNvPr>
@@ -10999,7 +11001,7 @@
           <p:cNvPr id="28" name="TextBox 27">
             <a:extLst>
               <a:ext uri="{FF2B5EF4-FFF2-40B4-BE49-F238E27FC236}">
-                <a16:creationId xmlns="" xmlns:a16="http://schemas.microsoft.com/office/drawing/2014/main" id="{E0BBD6C8-C8F2-40C5-AA64-85961A11ADC2}"/>
+                <a16:creationId xmlns:a16="http://schemas.microsoft.com/office/drawing/2014/main" xmlns="" id="{E0BBD6C8-C8F2-40C5-AA64-85961A11ADC2}"/>
               </a:ext>
             </a:extLst>
           </p:cNvPr>
@@ -11124,7 +11126,7 @@
           <p:cNvPr id="34" name="TextBox 33">
             <a:extLst>
               <a:ext uri="{FF2B5EF4-FFF2-40B4-BE49-F238E27FC236}">
-                <a16:creationId xmlns="" xmlns:a16="http://schemas.microsoft.com/office/drawing/2014/main" id="{E0BBD6C8-C8F2-40C5-AA64-85961A11ADC2}"/>
+                <a16:creationId xmlns:a16="http://schemas.microsoft.com/office/drawing/2014/main" xmlns="" id="{E0BBD6C8-C8F2-40C5-AA64-85961A11ADC2}"/>
               </a:ext>
             </a:extLst>
           </p:cNvPr>
@@ -11250,7 +11252,7 @@
           <p:cNvPr id="38" name="TextBox 37">
             <a:extLst>
               <a:ext uri="{FF2B5EF4-FFF2-40B4-BE49-F238E27FC236}">
-                <a16:creationId xmlns="" xmlns:a16="http://schemas.microsoft.com/office/drawing/2014/main" id="{E0BBD6C8-C8F2-40C5-AA64-85961A11ADC2}"/>
+                <a16:creationId xmlns:a16="http://schemas.microsoft.com/office/drawing/2014/main" xmlns="" id="{E0BBD6C8-C8F2-40C5-AA64-85961A11ADC2}"/>
               </a:ext>
             </a:extLst>
           </p:cNvPr>
@@ -11418,7 +11420,7 @@
           <p:cNvPr id="44" name="TextBox 43">
             <a:extLst>
               <a:ext uri="{FF2B5EF4-FFF2-40B4-BE49-F238E27FC236}">
-                <a16:creationId xmlns="" xmlns:a16="http://schemas.microsoft.com/office/drawing/2014/main" id="{E0BBD6C8-C8F2-40C5-AA64-85961A11ADC2}"/>
+                <a16:creationId xmlns:a16="http://schemas.microsoft.com/office/drawing/2014/main" xmlns="" id="{E0BBD6C8-C8F2-40C5-AA64-85961A11ADC2}"/>
               </a:ext>
             </a:extLst>
           </p:cNvPr>
@@ -11453,7 +11455,7 @@
           <p:cNvPr id="45" name="TextBox 44">
             <a:extLst>
               <a:ext uri="{FF2B5EF4-FFF2-40B4-BE49-F238E27FC236}">
-                <a16:creationId xmlns="" xmlns:a16="http://schemas.microsoft.com/office/drawing/2014/main" id="{E0BBD6C8-C8F2-40C5-AA64-85961A11ADC2}"/>
+                <a16:creationId xmlns:a16="http://schemas.microsoft.com/office/drawing/2014/main" xmlns="" id="{E0BBD6C8-C8F2-40C5-AA64-85961A11ADC2}"/>
               </a:ext>
             </a:extLst>
           </p:cNvPr>
@@ -11488,7 +11490,7 @@
           <p:cNvPr id="26" name="TextBox 25">
             <a:extLst>
               <a:ext uri="{FF2B5EF4-FFF2-40B4-BE49-F238E27FC236}">
-                <a16:creationId xmlns="" xmlns:a16="http://schemas.microsoft.com/office/drawing/2014/main" id="{6C45E26E-8FEE-4439-A34B-789237C9C62C}"/>
+                <a16:creationId xmlns:a16="http://schemas.microsoft.com/office/drawing/2014/main" xmlns="" id="{6C45E26E-8FEE-4439-A34B-789237C9C62C}"/>
               </a:ext>
             </a:extLst>
           </p:cNvPr>
@@ -11523,7 +11525,7 @@
           <p:cNvPr id="31" name="Rectangle 30">
             <a:extLst>
               <a:ext uri="{FF2B5EF4-FFF2-40B4-BE49-F238E27FC236}">
-                <a16:creationId xmlns="" xmlns:a16="http://schemas.microsoft.com/office/drawing/2014/main" id="{6D396BFC-10E0-4935-903B-EDC457BD1755}"/>
+                <a16:creationId xmlns:a16="http://schemas.microsoft.com/office/drawing/2014/main" xmlns="" id="{6D396BFC-10E0-4935-903B-EDC457BD1755}"/>
               </a:ext>
             </a:extLst>
           </p:cNvPr>
@@ -11583,7 +11585,7 @@
           <p:cNvPr id="32" name="Rectangle 31">
             <a:extLst>
               <a:ext uri="{FF2B5EF4-FFF2-40B4-BE49-F238E27FC236}">
-                <a16:creationId xmlns="" xmlns:a16="http://schemas.microsoft.com/office/drawing/2014/main" id="{02A645C8-F11F-438D-92DC-F6FCCA5ECFB8}"/>
+                <a16:creationId xmlns:a16="http://schemas.microsoft.com/office/drawing/2014/main" xmlns="" id="{02A645C8-F11F-438D-92DC-F6FCCA5ECFB8}"/>
               </a:ext>
             </a:extLst>
           </p:cNvPr>
@@ -11643,7 +11645,7 @@
           <p:cNvPr id="12" name="Straight Arrow Connector 11">
             <a:extLst>
               <a:ext uri="{FF2B5EF4-FFF2-40B4-BE49-F238E27FC236}">
-                <a16:creationId xmlns="" xmlns:a16="http://schemas.microsoft.com/office/drawing/2014/main" id="{FF2076CA-F897-4293-B6CD-7408EB452156}"/>
+                <a16:creationId xmlns:a16="http://schemas.microsoft.com/office/drawing/2014/main" xmlns="" id="{FF2076CA-F897-4293-B6CD-7408EB452156}"/>
               </a:ext>
             </a:extLst>
           </p:cNvPr>
@@ -11686,7 +11688,7 @@
           <p:cNvPr id="14" name="Straight Arrow Connector 13">
             <a:extLst>
               <a:ext uri="{FF2B5EF4-FFF2-40B4-BE49-F238E27FC236}">
-                <a16:creationId xmlns="" xmlns:a16="http://schemas.microsoft.com/office/drawing/2014/main" id="{5C625B7B-4A1E-46C5-9082-4FEC89B30DA9}"/>
+                <a16:creationId xmlns:a16="http://schemas.microsoft.com/office/drawing/2014/main" xmlns="" id="{5C625B7B-4A1E-46C5-9082-4FEC89B30DA9}"/>
               </a:ext>
             </a:extLst>
           </p:cNvPr>
@@ -11729,7 +11731,7 @@
           <p:cNvPr id="10" name="Straight Arrow Connector 9">
             <a:extLst>
               <a:ext uri="{FF2B5EF4-FFF2-40B4-BE49-F238E27FC236}">
-                <a16:creationId xmlns="" xmlns:a16="http://schemas.microsoft.com/office/drawing/2014/main" id="{EF2F45FB-579D-4721-9889-3C0942B8BBFD}"/>
+                <a16:creationId xmlns:a16="http://schemas.microsoft.com/office/drawing/2014/main" xmlns="" id="{EF2F45FB-579D-4721-9889-3C0942B8BBFD}"/>
               </a:ext>
             </a:extLst>
           </p:cNvPr>
@@ -11771,7 +11773,7 @@
           <p:cNvPr id="36" name="Rectangle 35">
             <a:extLst>
               <a:ext uri="{FF2B5EF4-FFF2-40B4-BE49-F238E27FC236}">
-                <a16:creationId xmlns="" xmlns:a16="http://schemas.microsoft.com/office/drawing/2014/main" id="{93FBA679-F71B-47BD-BE29-21E7C2262CEB}"/>
+                <a16:creationId xmlns:a16="http://schemas.microsoft.com/office/drawing/2014/main" xmlns="" id="{93FBA679-F71B-47BD-BE29-21E7C2262CEB}"/>
               </a:ext>
             </a:extLst>
           </p:cNvPr>
@@ -11853,7 +11855,7 @@
           <p:cNvPr id="40" name="Straight Arrow Connector 39">
             <a:extLst>
               <a:ext uri="{FF2B5EF4-FFF2-40B4-BE49-F238E27FC236}">
-                <a16:creationId xmlns="" xmlns:a16="http://schemas.microsoft.com/office/drawing/2014/main" id="{4EB51AD1-53A9-412E-933D-8DFB38C76755}"/>
+                <a16:creationId xmlns:a16="http://schemas.microsoft.com/office/drawing/2014/main" xmlns="" id="{4EB51AD1-53A9-412E-933D-8DFB38C76755}"/>
               </a:ext>
             </a:extLst>
           </p:cNvPr>
@@ -11896,7 +11898,7 @@
           <p:cNvPr id="42" name="TextBox 41">
             <a:extLst>
               <a:ext uri="{FF2B5EF4-FFF2-40B4-BE49-F238E27FC236}">
-                <a16:creationId xmlns="" xmlns:a16="http://schemas.microsoft.com/office/drawing/2014/main" id="{42986CB5-3F27-4531-B052-275C80DE06A9}"/>
+                <a16:creationId xmlns:a16="http://schemas.microsoft.com/office/drawing/2014/main" xmlns="" id="{42986CB5-3F27-4531-B052-275C80DE06A9}"/>
               </a:ext>
             </a:extLst>
           </p:cNvPr>
@@ -11931,7 +11933,7 @@
           <p:cNvPr id="46" name="TextBox 45">
             <a:extLst>
               <a:ext uri="{FF2B5EF4-FFF2-40B4-BE49-F238E27FC236}">
-                <a16:creationId xmlns="" xmlns:a16="http://schemas.microsoft.com/office/drawing/2014/main" id="{5EBBC5A0-26BA-4B6E-A551-6AD1BA1617D0}"/>
+                <a16:creationId xmlns:a16="http://schemas.microsoft.com/office/drawing/2014/main" xmlns="" id="{5EBBC5A0-26BA-4B6E-A551-6AD1BA1617D0}"/>
               </a:ext>
             </a:extLst>
           </p:cNvPr>
@@ -12059,7 +12061,7 @@
           <p:cNvPr id="48" name="TextBox 47">
             <a:extLst>
               <a:ext uri="{FF2B5EF4-FFF2-40B4-BE49-F238E27FC236}">
-                <a16:creationId xmlns="" xmlns:a16="http://schemas.microsoft.com/office/drawing/2014/main" id="{E0BBD6C8-C8F2-40C5-AA64-85961A11ADC2}"/>
+                <a16:creationId xmlns:a16="http://schemas.microsoft.com/office/drawing/2014/main" xmlns="" id="{E0BBD6C8-C8F2-40C5-AA64-85961A11ADC2}"/>
               </a:ext>
             </a:extLst>
           </p:cNvPr>
@@ -12275,7 +12277,7 @@
           <p:cNvPr id="11" name="TextBox 10">
             <a:extLst>
               <a:ext uri="{FF2B5EF4-FFF2-40B4-BE49-F238E27FC236}">
-                <a16:creationId xmlns="" xmlns:a16="http://schemas.microsoft.com/office/drawing/2014/main" id="{E0BBD6C8-C8F2-40C5-AA64-85961A11ADC2}"/>
+                <a16:creationId xmlns:a16="http://schemas.microsoft.com/office/drawing/2014/main" xmlns="" id="{E0BBD6C8-C8F2-40C5-AA64-85961A11ADC2}"/>
               </a:ext>
             </a:extLst>
           </p:cNvPr>

</xml_diff>

<commit_message>
20210806 2340 update to files from tlw87, checkpoint add account with random number generator.
</commit_message>
<xml_diff>
--- a/docs/Project 0.pptx
+++ b/docs/Project 0.pptx
@@ -140,7 +140,7 @@
           <p:cNvPr id="2" name="Title 1">
             <a:extLst>
               <a:ext uri="{FF2B5EF4-FFF2-40B4-BE49-F238E27FC236}">
-                <a16:creationId xmlns:a16="http://schemas.microsoft.com/office/drawing/2014/main" xmlns="" id="{67106D7E-D400-44F1-9A1A-D68CE501C73D}"/>
+                <a16:creationId xmlns:a16="http://schemas.microsoft.com/office/drawing/2014/main" id="{67106D7E-D400-44F1-9A1A-D68CE501C73D}"/>
               </a:ext>
             </a:extLst>
           </p:cNvPr>
@@ -177,7 +177,7 @@
           <p:cNvPr id="3" name="Subtitle 2">
             <a:extLst>
               <a:ext uri="{FF2B5EF4-FFF2-40B4-BE49-F238E27FC236}">
-                <a16:creationId xmlns:a16="http://schemas.microsoft.com/office/drawing/2014/main" xmlns="" id="{A5FDE527-E621-4639-A0C7-E1E9B0DFBCEC}"/>
+                <a16:creationId xmlns:a16="http://schemas.microsoft.com/office/drawing/2014/main" id="{A5FDE527-E621-4639-A0C7-E1E9B0DFBCEC}"/>
               </a:ext>
             </a:extLst>
           </p:cNvPr>
@@ -247,7 +247,7 @@
           <p:cNvPr id="4" name="Date Placeholder 3">
             <a:extLst>
               <a:ext uri="{FF2B5EF4-FFF2-40B4-BE49-F238E27FC236}">
-                <a16:creationId xmlns:a16="http://schemas.microsoft.com/office/drawing/2014/main" xmlns="" id="{E109CE88-B989-4109-89C8-36F7C245DB1C}"/>
+                <a16:creationId xmlns:a16="http://schemas.microsoft.com/office/drawing/2014/main" id="{E109CE88-B989-4109-89C8-36F7C245DB1C}"/>
               </a:ext>
             </a:extLst>
           </p:cNvPr>
@@ -276,7 +276,7 @@
           <p:cNvPr id="5" name="Footer Placeholder 4">
             <a:extLst>
               <a:ext uri="{FF2B5EF4-FFF2-40B4-BE49-F238E27FC236}">
-                <a16:creationId xmlns:a16="http://schemas.microsoft.com/office/drawing/2014/main" xmlns="" id="{0841498F-B991-43D3-B408-CC35D8EFCF37}"/>
+                <a16:creationId xmlns:a16="http://schemas.microsoft.com/office/drawing/2014/main" id="{0841498F-B991-43D3-B408-CC35D8EFCF37}"/>
               </a:ext>
             </a:extLst>
           </p:cNvPr>
@@ -301,7 +301,7 @@
           <p:cNvPr id="6" name="Slide Number Placeholder 5">
             <a:extLst>
               <a:ext uri="{FF2B5EF4-FFF2-40B4-BE49-F238E27FC236}">
-                <a16:creationId xmlns:a16="http://schemas.microsoft.com/office/drawing/2014/main" xmlns="" id="{01754CB8-17B1-45A0-AE7D-755EAA1B69D8}"/>
+                <a16:creationId xmlns:a16="http://schemas.microsoft.com/office/drawing/2014/main" id="{01754CB8-17B1-45A0-AE7D-755EAA1B69D8}"/>
               </a:ext>
             </a:extLst>
           </p:cNvPr>
@@ -360,7 +360,7 @@
           <p:cNvPr id="2" name="Title 1">
             <a:extLst>
               <a:ext uri="{FF2B5EF4-FFF2-40B4-BE49-F238E27FC236}">
-                <a16:creationId xmlns:a16="http://schemas.microsoft.com/office/drawing/2014/main" xmlns="" id="{E7A7B055-5DC2-440D-83C1-CAAE8E9A8E14}"/>
+                <a16:creationId xmlns:a16="http://schemas.microsoft.com/office/drawing/2014/main" id="{E7A7B055-5DC2-440D-83C1-CAAE8E9A8E14}"/>
               </a:ext>
             </a:extLst>
           </p:cNvPr>
@@ -388,7 +388,7 @@
           <p:cNvPr id="3" name="Vertical Text Placeholder 2">
             <a:extLst>
               <a:ext uri="{FF2B5EF4-FFF2-40B4-BE49-F238E27FC236}">
-                <a16:creationId xmlns:a16="http://schemas.microsoft.com/office/drawing/2014/main" xmlns="" id="{65710707-423D-4F9D-A49D-6C764C562553}"/>
+                <a16:creationId xmlns:a16="http://schemas.microsoft.com/office/drawing/2014/main" id="{65710707-423D-4F9D-A49D-6C764C562553}"/>
               </a:ext>
             </a:extLst>
           </p:cNvPr>
@@ -445,7 +445,7 @@
           <p:cNvPr id="4" name="Date Placeholder 3">
             <a:extLst>
               <a:ext uri="{FF2B5EF4-FFF2-40B4-BE49-F238E27FC236}">
-                <a16:creationId xmlns:a16="http://schemas.microsoft.com/office/drawing/2014/main" xmlns="" id="{98B6F7EF-D1BE-4437-85F3-99626E37E4EF}"/>
+                <a16:creationId xmlns:a16="http://schemas.microsoft.com/office/drawing/2014/main" id="{98B6F7EF-D1BE-4437-85F3-99626E37E4EF}"/>
               </a:ext>
             </a:extLst>
           </p:cNvPr>
@@ -474,7 +474,7 @@
           <p:cNvPr id="5" name="Footer Placeholder 4">
             <a:extLst>
               <a:ext uri="{FF2B5EF4-FFF2-40B4-BE49-F238E27FC236}">
-                <a16:creationId xmlns:a16="http://schemas.microsoft.com/office/drawing/2014/main" xmlns="" id="{D890AA9B-E479-4209-B245-83608F3D4013}"/>
+                <a16:creationId xmlns:a16="http://schemas.microsoft.com/office/drawing/2014/main" id="{D890AA9B-E479-4209-B245-83608F3D4013}"/>
               </a:ext>
             </a:extLst>
           </p:cNvPr>
@@ -499,7 +499,7 @@
           <p:cNvPr id="6" name="Slide Number Placeholder 5">
             <a:extLst>
               <a:ext uri="{FF2B5EF4-FFF2-40B4-BE49-F238E27FC236}">
-                <a16:creationId xmlns:a16="http://schemas.microsoft.com/office/drawing/2014/main" xmlns="" id="{0E4976E4-E15A-4296-A430-633D2BB9142B}"/>
+                <a16:creationId xmlns:a16="http://schemas.microsoft.com/office/drawing/2014/main" id="{0E4976E4-E15A-4296-A430-633D2BB9142B}"/>
               </a:ext>
             </a:extLst>
           </p:cNvPr>
@@ -558,7 +558,7 @@
           <p:cNvPr id="2" name="Vertical Title 1">
             <a:extLst>
               <a:ext uri="{FF2B5EF4-FFF2-40B4-BE49-F238E27FC236}">
-                <a16:creationId xmlns:a16="http://schemas.microsoft.com/office/drawing/2014/main" xmlns="" id="{66F63CF5-8DEE-4BB2-A2A5-5C16FEBE1AD5}"/>
+                <a16:creationId xmlns:a16="http://schemas.microsoft.com/office/drawing/2014/main" id="{66F63CF5-8DEE-4BB2-A2A5-5C16FEBE1AD5}"/>
               </a:ext>
             </a:extLst>
           </p:cNvPr>
@@ -591,7 +591,7 @@
           <p:cNvPr id="3" name="Vertical Text Placeholder 2">
             <a:extLst>
               <a:ext uri="{FF2B5EF4-FFF2-40B4-BE49-F238E27FC236}">
-                <a16:creationId xmlns:a16="http://schemas.microsoft.com/office/drawing/2014/main" xmlns="" id="{E0D5EBA5-94AF-4373-B032-A40FF73C7575}"/>
+                <a16:creationId xmlns:a16="http://schemas.microsoft.com/office/drawing/2014/main" id="{E0D5EBA5-94AF-4373-B032-A40FF73C7575}"/>
               </a:ext>
             </a:extLst>
           </p:cNvPr>
@@ -653,7 +653,7 @@
           <p:cNvPr id="4" name="Date Placeholder 3">
             <a:extLst>
               <a:ext uri="{FF2B5EF4-FFF2-40B4-BE49-F238E27FC236}">
-                <a16:creationId xmlns:a16="http://schemas.microsoft.com/office/drawing/2014/main" xmlns="" id="{7426B8E1-6758-4F5E-B618-96641332600B}"/>
+                <a16:creationId xmlns:a16="http://schemas.microsoft.com/office/drawing/2014/main" id="{7426B8E1-6758-4F5E-B618-96641332600B}"/>
               </a:ext>
             </a:extLst>
           </p:cNvPr>
@@ -682,7 +682,7 @@
           <p:cNvPr id="5" name="Footer Placeholder 4">
             <a:extLst>
               <a:ext uri="{FF2B5EF4-FFF2-40B4-BE49-F238E27FC236}">
-                <a16:creationId xmlns:a16="http://schemas.microsoft.com/office/drawing/2014/main" xmlns="" id="{F65E330E-2A7E-482D-AE0F-70EA5A29958B}"/>
+                <a16:creationId xmlns:a16="http://schemas.microsoft.com/office/drawing/2014/main" id="{F65E330E-2A7E-482D-AE0F-70EA5A29958B}"/>
               </a:ext>
             </a:extLst>
           </p:cNvPr>
@@ -707,7 +707,7 @@
           <p:cNvPr id="6" name="Slide Number Placeholder 5">
             <a:extLst>
               <a:ext uri="{FF2B5EF4-FFF2-40B4-BE49-F238E27FC236}">
-                <a16:creationId xmlns:a16="http://schemas.microsoft.com/office/drawing/2014/main" xmlns="" id="{B8000005-FC38-4A6C-9D09-7945EFA08160}"/>
+                <a16:creationId xmlns:a16="http://schemas.microsoft.com/office/drawing/2014/main" id="{B8000005-FC38-4A6C-9D09-7945EFA08160}"/>
               </a:ext>
             </a:extLst>
           </p:cNvPr>
@@ -766,7 +766,7 @@
           <p:cNvPr id="2" name="Title 1">
             <a:extLst>
               <a:ext uri="{FF2B5EF4-FFF2-40B4-BE49-F238E27FC236}">
-                <a16:creationId xmlns:a16="http://schemas.microsoft.com/office/drawing/2014/main" xmlns="" id="{91D0002C-766B-44B4-A24C-BE6DE6C7BA4C}"/>
+                <a16:creationId xmlns:a16="http://schemas.microsoft.com/office/drawing/2014/main" id="{91D0002C-766B-44B4-A24C-BE6DE6C7BA4C}"/>
               </a:ext>
             </a:extLst>
           </p:cNvPr>
@@ -794,7 +794,7 @@
           <p:cNvPr id="3" name="Content Placeholder 2">
             <a:extLst>
               <a:ext uri="{FF2B5EF4-FFF2-40B4-BE49-F238E27FC236}">
-                <a16:creationId xmlns:a16="http://schemas.microsoft.com/office/drawing/2014/main" xmlns="" id="{3455BAA9-6C7B-4874-AD76-BD466F64802D}"/>
+                <a16:creationId xmlns:a16="http://schemas.microsoft.com/office/drawing/2014/main" id="{3455BAA9-6C7B-4874-AD76-BD466F64802D}"/>
               </a:ext>
             </a:extLst>
           </p:cNvPr>
@@ -851,7 +851,7 @@
           <p:cNvPr id="4" name="Date Placeholder 3">
             <a:extLst>
               <a:ext uri="{FF2B5EF4-FFF2-40B4-BE49-F238E27FC236}">
-                <a16:creationId xmlns:a16="http://schemas.microsoft.com/office/drawing/2014/main" xmlns="" id="{8776BDAF-D8F2-4A61-904D-094BB4545702}"/>
+                <a16:creationId xmlns:a16="http://schemas.microsoft.com/office/drawing/2014/main" id="{8776BDAF-D8F2-4A61-904D-094BB4545702}"/>
               </a:ext>
             </a:extLst>
           </p:cNvPr>
@@ -880,7 +880,7 @@
           <p:cNvPr id="5" name="Footer Placeholder 4">
             <a:extLst>
               <a:ext uri="{FF2B5EF4-FFF2-40B4-BE49-F238E27FC236}">
-                <a16:creationId xmlns:a16="http://schemas.microsoft.com/office/drawing/2014/main" xmlns="" id="{F89C5665-4384-4706-9BD2-9F42B05C96BC}"/>
+                <a16:creationId xmlns:a16="http://schemas.microsoft.com/office/drawing/2014/main" id="{F89C5665-4384-4706-9BD2-9F42B05C96BC}"/>
               </a:ext>
             </a:extLst>
           </p:cNvPr>
@@ -905,7 +905,7 @@
           <p:cNvPr id="6" name="Slide Number Placeholder 5">
             <a:extLst>
               <a:ext uri="{FF2B5EF4-FFF2-40B4-BE49-F238E27FC236}">
-                <a16:creationId xmlns:a16="http://schemas.microsoft.com/office/drawing/2014/main" xmlns="" id="{7DCAD73E-CAB3-4BA7-905E-D203691D0418}"/>
+                <a16:creationId xmlns:a16="http://schemas.microsoft.com/office/drawing/2014/main" id="{7DCAD73E-CAB3-4BA7-905E-D203691D0418}"/>
               </a:ext>
             </a:extLst>
           </p:cNvPr>
@@ -964,7 +964,7 @@
           <p:cNvPr id="2" name="Title 1">
             <a:extLst>
               <a:ext uri="{FF2B5EF4-FFF2-40B4-BE49-F238E27FC236}">
-                <a16:creationId xmlns:a16="http://schemas.microsoft.com/office/drawing/2014/main" xmlns="" id="{A9880706-F7FA-4EC3-A022-9D6C7CEC3692}"/>
+                <a16:creationId xmlns:a16="http://schemas.microsoft.com/office/drawing/2014/main" id="{A9880706-F7FA-4EC3-A022-9D6C7CEC3692}"/>
               </a:ext>
             </a:extLst>
           </p:cNvPr>
@@ -1001,7 +1001,7 @@
           <p:cNvPr id="3" name="Text Placeholder 2">
             <a:extLst>
               <a:ext uri="{FF2B5EF4-FFF2-40B4-BE49-F238E27FC236}">
-                <a16:creationId xmlns:a16="http://schemas.microsoft.com/office/drawing/2014/main" xmlns="" id="{FA8A65D0-3DF5-448D-82EC-A967682A0DED}"/>
+                <a16:creationId xmlns:a16="http://schemas.microsoft.com/office/drawing/2014/main" id="{FA8A65D0-3DF5-448D-82EC-A967682A0DED}"/>
               </a:ext>
             </a:extLst>
           </p:cNvPr>
@@ -1126,7 +1126,7 @@
           <p:cNvPr id="4" name="Date Placeholder 3">
             <a:extLst>
               <a:ext uri="{FF2B5EF4-FFF2-40B4-BE49-F238E27FC236}">
-                <a16:creationId xmlns:a16="http://schemas.microsoft.com/office/drawing/2014/main" xmlns="" id="{600EA68C-01A6-487D-9D6E-1D1B4EAC0440}"/>
+                <a16:creationId xmlns:a16="http://schemas.microsoft.com/office/drawing/2014/main" id="{600EA68C-01A6-487D-9D6E-1D1B4EAC0440}"/>
               </a:ext>
             </a:extLst>
           </p:cNvPr>
@@ -1155,7 +1155,7 @@
           <p:cNvPr id="5" name="Footer Placeholder 4">
             <a:extLst>
               <a:ext uri="{FF2B5EF4-FFF2-40B4-BE49-F238E27FC236}">
-                <a16:creationId xmlns:a16="http://schemas.microsoft.com/office/drawing/2014/main" xmlns="" id="{6E6527CB-4FFD-4569-A82C-5EDC311B2CF6}"/>
+                <a16:creationId xmlns:a16="http://schemas.microsoft.com/office/drawing/2014/main" id="{6E6527CB-4FFD-4569-A82C-5EDC311B2CF6}"/>
               </a:ext>
             </a:extLst>
           </p:cNvPr>
@@ -1180,7 +1180,7 @@
           <p:cNvPr id="6" name="Slide Number Placeholder 5">
             <a:extLst>
               <a:ext uri="{FF2B5EF4-FFF2-40B4-BE49-F238E27FC236}">
-                <a16:creationId xmlns:a16="http://schemas.microsoft.com/office/drawing/2014/main" xmlns="" id="{24B19E5B-5A98-4381-A01D-01F81FD65792}"/>
+                <a16:creationId xmlns:a16="http://schemas.microsoft.com/office/drawing/2014/main" id="{24B19E5B-5A98-4381-A01D-01F81FD65792}"/>
               </a:ext>
             </a:extLst>
           </p:cNvPr>
@@ -1239,7 +1239,7 @@
           <p:cNvPr id="2" name="Title 1">
             <a:extLst>
               <a:ext uri="{FF2B5EF4-FFF2-40B4-BE49-F238E27FC236}">
-                <a16:creationId xmlns:a16="http://schemas.microsoft.com/office/drawing/2014/main" xmlns="" id="{63228B71-E923-4431-B8D2-FAE724678940}"/>
+                <a16:creationId xmlns:a16="http://schemas.microsoft.com/office/drawing/2014/main" id="{63228B71-E923-4431-B8D2-FAE724678940}"/>
               </a:ext>
             </a:extLst>
           </p:cNvPr>
@@ -1267,7 +1267,7 @@
           <p:cNvPr id="3" name="Content Placeholder 2">
             <a:extLst>
               <a:ext uri="{FF2B5EF4-FFF2-40B4-BE49-F238E27FC236}">
-                <a16:creationId xmlns:a16="http://schemas.microsoft.com/office/drawing/2014/main" xmlns="" id="{B18895E9-B7FF-4A00-955B-206CF8C73E43}"/>
+                <a16:creationId xmlns:a16="http://schemas.microsoft.com/office/drawing/2014/main" id="{B18895E9-B7FF-4A00-955B-206CF8C73E43}"/>
               </a:ext>
             </a:extLst>
           </p:cNvPr>
@@ -1329,7 +1329,7 @@
           <p:cNvPr id="4" name="Content Placeholder 3">
             <a:extLst>
               <a:ext uri="{FF2B5EF4-FFF2-40B4-BE49-F238E27FC236}">
-                <a16:creationId xmlns:a16="http://schemas.microsoft.com/office/drawing/2014/main" xmlns="" id="{DA813955-E3B9-44BC-8E1D-139269C8B48A}"/>
+                <a16:creationId xmlns:a16="http://schemas.microsoft.com/office/drawing/2014/main" id="{DA813955-E3B9-44BC-8E1D-139269C8B48A}"/>
               </a:ext>
             </a:extLst>
           </p:cNvPr>
@@ -1391,7 +1391,7 @@
           <p:cNvPr id="5" name="Date Placeholder 4">
             <a:extLst>
               <a:ext uri="{FF2B5EF4-FFF2-40B4-BE49-F238E27FC236}">
-                <a16:creationId xmlns:a16="http://schemas.microsoft.com/office/drawing/2014/main" xmlns="" id="{7E9B8EF5-28D5-4C4E-A2AB-EEA30D75DAFE}"/>
+                <a16:creationId xmlns:a16="http://schemas.microsoft.com/office/drawing/2014/main" id="{7E9B8EF5-28D5-4C4E-A2AB-EEA30D75DAFE}"/>
               </a:ext>
             </a:extLst>
           </p:cNvPr>
@@ -1420,7 +1420,7 @@
           <p:cNvPr id="6" name="Footer Placeholder 5">
             <a:extLst>
               <a:ext uri="{FF2B5EF4-FFF2-40B4-BE49-F238E27FC236}">
-                <a16:creationId xmlns:a16="http://schemas.microsoft.com/office/drawing/2014/main" xmlns="" id="{5723E678-8CB4-4335-AA04-6BD391748717}"/>
+                <a16:creationId xmlns:a16="http://schemas.microsoft.com/office/drawing/2014/main" id="{5723E678-8CB4-4335-AA04-6BD391748717}"/>
               </a:ext>
             </a:extLst>
           </p:cNvPr>
@@ -1445,7 +1445,7 @@
           <p:cNvPr id="7" name="Slide Number Placeholder 6">
             <a:extLst>
               <a:ext uri="{FF2B5EF4-FFF2-40B4-BE49-F238E27FC236}">
-                <a16:creationId xmlns:a16="http://schemas.microsoft.com/office/drawing/2014/main" xmlns="" id="{887B5567-9F4D-4AE1-92D8-769C9F7EA4F0}"/>
+                <a16:creationId xmlns:a16="http://schemas.microsoft.com/office/drawing/2014/main" id="{887B5567-9F4D-4AE1-92D8-769C9F7EA4F0}"/>
               </a:ext>
             </a:extLst>
           </p:cNvPr>
@@ -1504,7 +1504,7 @@
           <p:cNvPr id="2" name="Title 1">
             <a:extLst>
               <a:ext uri="{FF2B5EF4-FFF2-40B4-BE49-F238E27FC236}">
-                <a16:creationId xmlns:a16="http://schemas.microsoft.com/office/drawing/2014/main" xmlns="" id="{A40320A9-7C0C-45B4-BF2B-3B53B5686EBB}"/>
+                <a16:creationId xmlns:a16="http://schemas.microsoft.com/office/drawing/2014/main" id="{A40320A9-7C0C-45B4-BF2B-3B53B5686EBB}"/>
               </a:ext>
             </a:extLst>
           </p:cNvPr>
@@ -1537,7 +1537,7 @@
           <p:cNvPr id="3" name="Text Placeholder 2">
             <a:extLst>
               <a:ext uri="{FF2B5EF4-FFF2-40B4-BE49-F238E27FC236}">
-                <a16:creationId xmlns:a16="http://schemas.microsoft.com/office/drawing/2014/main" xmlns="" id="{8C440DE1-7DD6-4B1C-B961-CD2079B51F03}"/>
+                <a16:creationId xmlns:a16="http://schemas.microsoft.com/office/drawing/2014/main" id="{8C440DE1-7DD6-4B1C-B961-CD2079B51F03}"/>
               </a:ext>
             </a:extLst>
           </p:cNvPr>
@@ -1608,7 +1608,7 @@
           <p:cNvPr id="4" name="Content Placeholder 3">
             <a:extLst>
               <a:ext uri="{FF2B5EF4-FFF2-40B4-BE49-F238E27FC236}">
-                <a16:creationId xmlns:a16="http://schemas.microsoft.com/office/drawing/2014/main" xmlns="" id="{6FAFE840-CC9A-4D89-B05F-159EF756B427}"/>
+                <a16:creationId xmlns:a16="http://schemas.microsoft.com/office/drawing/2014/main" id="{6FAFE840-CC9A-4D89-B05F-159EF756B427}"/>
               </a:ext>
             </a:extLst>
           </p:cNvPr>
@@ -1670,7 +1670,7 @@
           <p:cNvPr id="5" name="Text Placeholder 4">
             <a:extLst>
               <a:ext uri="{FF2B5EF4-FFF2-40B4-BE49-F238E27FC236}">
-                <a16:creationId xmlns:a16="http://schemas.microsoft.com/office/drawing/2014/main" xmlns="" id="{4B87AADC-3401-48C6-98F6-0AB60F6DF9BE}"/>
+                <a16:creationId xmlns:a16="http://schemas.microsoft.com/office/drawing/2014/main" id="{4B87AADC-3401-48C6-98F6-0AB60F6DF9BE}"/>
               </a:ext>
             </a:extLst>
           </p:cNvPr>
@@ -1741,7 +1741,7 @@
           <p:cNvPr id="6" name="Content Placeholder 5">
             <a:extLst>
               <a:ext uri="{FF2B5EF4-FFF2-40B4-BE49-F238E27FC236}">
-                <a16:creationId xmlns:a16="http://schemas.microsoft.com/office/drawing/2014/main" xmlns="" id="{34BCF1A4-FB52-4DCD-80BC-324BA41C33CD}"/>
+                <a16:creationId xmlns:a16="http://schemas.microsoft.com/office/drawing/2014/main" id="{34BCF1A4-FB52-4DCD-80BC-324BA41C33CD}"/>
               </a:ext>
             </a:extLst>
           </p:cNvPr>
@@ -1803,7 +1803,7 @@
           <p:cNvPr id="7" name="Date Placeholder 6">
             <a:extLst>
               <a:ext uri="{FF2B5EF4-FFF2-40B4-BE49-F238E27FC236}">
-                <a16:creationId xmlns:a16="http://schemas.microsoft.com/office/drawing/2014/main" xmlns="" id="{8CFD4208-60E7-48B1-8CD0-717D5E26B827}"/>
+                <a16:creationId xmlns:a16="http://schemas.microsoft.com/office/drawing/2014/main" id="{8CFD4208-60E7-48B1-8CD0-717D5E26B827}"/>
               </a:ext>
             </a:extLst>
           </p:cNvPr>
@@ -1832,7 +1832,7 @@
           <p:cNvPr id="8" name="Footer Placeholder 7">
             <a:extLst>
               <a:ext uri="{FF2B5EF4-FFF2-40B4-BE49-F238E27FC236}">
-                <a16:creationId xmlns:a16="http://schemas.microsoft.com/office/drawing/2014/main" xmlns="" id="{94E429D1-BEB1-4D8A-91F2-CD4F80157F8D}"/>
+                <a16:creationId xmlns:a16="http://schemas.microsoft.com/office/drawing/2014/main" id="{94E429D1-BEB1-4D8A-91F2-CD4F80157F8D}"/>
               </a:ext>
             </a:extLst>
           </p:cNvPr>
@@ -1857,7 +1857,7 @@
           <p:cNvPr id="9" name="Slide Number Placeholder 8">
             <a:extLst>
               <a:ext uri="{FF2B5EF4-FFF2-40B4-BE49-F238E27FC236}">
-                <a16:creationId xmlns:a16="http://schemas.microsoft.com/office/drawing/2014/main" xmlns="" id="{6F17C19C-8370-4118-A8FC-5DDA6F84230F}"/>
+                <a16:creationId xmlns:a16="http://schemas.microsoft.com/office/drawing/2014/main" id="{6F17C19C-8370-4118-A8FC-5DDA6F84230F}"/>
               </a:ext>
             </a:extLst>
           </p:cNvPr>
@@ -1916,7 +1916,7 @@
           <p:cNvPr id="2" name="Title 1">
             <a:extLst>
               <a:ext uri="{FF2B5EF4-FFF2-40B4-BE49-F238E27FC236}">
-                <a16:creationId xmlns:a16="http://schemas.microsoft.com/office/drawing/2014/main" xmlns="" id="{252CBF36-7F99-45A9-BC35-BD2EC260CBF0}"/>
+                <a16:creationId xmlns:a16="http://schemas.microsoft.com/office/drawing/2014/main" id="{252CBF36-7F99-45A9-BC35-BD2EC260CBF0}"/>
               </a:ext>
             </a:extLst>
           </p:cNvPr>
@@ -1944,7 +1944,7 @@
           <p:cNvPr id="3" name="Date Placeholder 2">
             <a:extLst>
               <a:ext uri="{FF2B5EF4-FFF2-40B4-BE49-F238E27FC236}">
-                <a16:creationId xmlns:a16="http://schemas.microsoft.com/office/drawing/2014/main" xmlns="" id="{0D6F5F83-F07E-4501-B86B-9F96CD43993C}"/>
+                <a16:creationId xmlns:a16="http://schemas.microsoft.com/office/drawing/2014/main" id="{0D6F5F83-F07E-4501-B86B-9F96CD43993C}"/>
               </a:ext>
             </a:extLst>
           </p:cNvPr>
@@ -1973,7 +1973,7 @@
           <p:cNvPr id="4" name="Footer Placeholder 3">
             <a:extLst>
               <a:ext uri="{FF2B5EF4-FFF2-40B4-BE49-F238E27FC236}">
-                <a16:creationId xmlns:a16="http://schemas.microsoft.com/office/drawing/2014/main" xmlns="" id="{2861989B-F8E9-41FD-8E16-687424BCC266}"/>
+                <a16:creationId xmlns:a16="http://schemas.microsoft.com/office/drawing/2014/main" id="{2861989B-F8E9-41FD-8E16-687424BCC266}"/>
               </a:ext>
             </a:extLst>
           </p:cNvPr>
@@ -1998,7 +1998,7 @@
           <p:cNvPr id="5" name="Slide Number Placeholder 4">
             <a:extLst>
               <a:ext uri="{FF2B5EF4-FFF2-40B4-BE49-F238E27FC236}">
-                <a16:creationId xmlns:a16="http://schemas.microsoft.com/office/drawing/2014/main" xmlns="" id="{2026B6D7-7832-4815-95CE-5CEC39502825}"/>
+                <a16:creationId xmlns:a16="http://schemas.microsoft.com/office/drawing/2014/main" id="{2026B6D7-7832-4815-95CE-5CEC39502825}"/>
               </a:ext>
             </a:extLst>
           </p:cNvPr>
@@ -2057,7 +2057,7 @@
           <p:cNvPr id="2" name="Date Placeholder 1">
             <a:extLst>
               <a:ext uri="{FF2B5EF4-FFF2-40B4-BE49-F238E27FC236}">
-                <a16:creationId xmlns:a16="http://schemas.microsoft.com/office/drawing/2014/main" xmlns="" id="{9877919A-C4B6-46FD-A08A-9A4B867FE01A}"/>
+                <a16:creationId xmlns:a16="http://schemas.microsoft.com/office/drawing/2014/main" id="{9877919A-C4B6-46FD-A08A-9A4B867FE01A}"/>
               </a:ext>
             </a:extLst>
           </p:cNvPr>
@@ -2086,7 +2086,7 @@
           <p:cNvPr id="3" name="Footer Placeholder 2">
             <a:extLst>
               <a:ext uri="{FF2B5EF4-FFF2-40B4-BE49-F238E27FC236}">
-                <a16:creationId xmlns:a16="http://schemas.microsoft.com/office/drawing/2014/main" xmlns="" id="{9118539E-383C-4F1C-86F2-14C533A7E9FB}"/>
+                <a16:creationId xmlns:a16="http://schemas.microsoft.com/office/drawing/2014/main" id="{9118539E-383C-4F1C-86F2-14C533A7E9FB}"/>
               </a:ext>
             </a:extLst>
           </p:cNvPr>
@@ -2111,7 +2111,7 @@
           <p:cNvPr id="4" name="Slide Number Placeholder 3">
             <a:extLst>
               <a:ext uri="{FF2B5EF4-FFF2-40B4-BE49-F238E27FC236}">
-                <a16:creationId xmlns:a16="http://schemas.microsoft.com/office/drawing/2014/main" xmlns="" id="{C9A6D4E1-CA83-4214-9942-9E4617AA89BF}"/>
+                <a16:creationId xmlns:a16="http://schemas.microsoft.com/office/drawing/2014/main" id="{C9A6D4E1-CA83-4214-9942-9E4617AA89BF}"/>
               </a:ext>
             </a:extLst>
           </p:cNvPr>
@@ -2170,7 +2170,7 @@
           <p:cNvPr id="2" name="Title 1">
             <a:extLst>
               <a:ext uri="{FF2B5EF4-FFF2-40B4-BE49-F238E27FC236}">
-                <a16:creationId xmlns:a16="http://schemas.microsoft.com/office/drawing/2014/main" xmlns="" id="{046EF9B5-7A2A-4225-8817-86D028D6950C}"/>
+                <a16:creationId xmlns:a16="http://schemas.microsoft.com/office/drawing/2014/main" id="{046EF9B5-7A2A-4225-8817-86D028D6950C}"/>
               </a:ext>
             </a:extLst>
           </p:cNvPr>
@@ -2207,7 +2207,7 @@
           <p:cNvPr id="3" name="Content Placeholder 2">
             <a:extLst>
               <a:ext uri="{FF2B5EF4-FFF2-40B4-BE49-F238E27FC236}">
-                <a16:creationId xmlns:a16="http://schemas.microsoft.com/office/drawing/2014/main" xmlns="" id="{8667C390-5297-41E8-A403-22856007B051}"/>
+                <a16:creationId xmlns:a16="http://schemas.microsoft.com/office/drawing/2014/main" id="{8667C390-5297-41E8-A403-22856007B051}"/>
               </a:ext>
             </a:extLst>
           </p:cNvPr>
@@ -2297,7 +2297,7 @@
           <p:cNvPr id="4" name="Text Placeholder 3">
             <a:extLst>
               <a:ext uri="{FF2B5EF4-FFF2-40B4-BE49-F238E27FC236}">
-                <a16:creationId xmlns:a16="http://schemas.microsoft.com/office/drawing/2014/main" xmlns="" id="{8D0D2F7D-D6CD-4AB1-A3EA-CBFD2A2B3703}"/>
+                <a16:creationId xmlns:a16="http://schemas.microsoft.com/office/drawing/2014/main" id="{8D0D2F7D-D6CD-4AB1-A3EA-CBFD2A2B3703}"/>
               </a:ext>
             </a:extLst>
           </p:cNvPr>
@@ -2368,7 +2368,7 @@
           <p:cNvPr id="5" name="Date Placeholder 4">
             <a:extLst>
               <a:ext uri="{FF2B5EF4-FFF2-40B4-BE49-F238E27FC236}">
-                <a16:creationId xmlns:a16="http://schemas.microsoft.com/office/drawing/2014/main" xmlns="" id="{E17A441D-4FA7-4110-BF24-165CD3C3DAD7}"/>
+                <a16:creationId xmlns:a16="http://schemas.microsoft.com/office/drawing/2014/main" id="{E17A441D-4FA7-4110-BF24-165CD3C3DAD7}"/>
               </a:ext>
             </a:extLst>
           </p:cNvPr>
@@ -2397,7 +2397,7 @@
           <p:cNvPr id="6" name="Footer Placeholder 5">
             <a:extLst>
               <a:ext uri="{FF2B5EF4-FFF2-40B4-BE49-F238E27FC236}">
-                <a16:creationId xmlns:a16="http://schemas.microsoft.com/office/drawing/2014/main" xmlns="" id="{346102C5-5AE3-43CF-A686-1AB72B0790AB}"/>
+                <a16:creationId xmlns:a16="http://schemas.microsoft.com/office/drawing/2014/main" id="{346102C5-5AE3-43CF-A686-1AB72B0790AB}"/>
               </a:ext>
             </a:extLst>
           </p:cNvPr>
@@ -2422,7 +2422,7 @@
           <p:cNvPr id="7" name="Slide Number Placeholder 6">
             <a:extLst>
               <a:ext uri="{FF2B5EF4-FFF2-40B4-BE49-F238E27FC236}">
-                <a16:creationId xmlns:a16="http://schemas.microsoft.com/office/drawing/2014/main" xmlns="" id="{5528B3F7-462C-4500-8836-B3E5CD8DA61A}"/>
+                <a16:creationId xmlns:a16="http://schemas.microsoft.com/office/drawing/2014/main" id="{5528B3F7-462C-4500-8836-B3E5CD8DA61A}"/>
               </a:ext>
             </a:extLst>
           </p:cNvPr>
@@ -2481,7 +2481,7 @@
           <p:cNvPr id="2" name="Title 1">
             <a:extLst>
               <a:ext uri="{FF2B5EF4-FFF2-40B4-BE49-F238E27FC236}">
-                <a16:creationId xmlns:a16="http://schemas.microsoft.com/office/drawing/2014/main" xmlns="" id="{4BA10E59-DA48-4690-A956-9EB8E4E11EE5}"/>
+                <a16:creationId xmlns:a16="http://schemas.microsoft.com/office/drawing/2014/main" id="{4BA10E59-DA48-4690-A956-9EB8E4E11EE5}"/>
               </a:ext>
             </a:extLst>
           </p:cNvPr>
@@ -2518,7 +2518,7 @@
           <p:cNvPr id="3" name="Picture Placeholder 2">
             <a:extLst>
               <a:ext uri="{FF2B5EF4-FFF2-40B4-BE49-F238E27FC236}">
-                <a16:creationId xmlns:a16="http://schemas.microsoft.com/office/drawing/2014/main" xmlns="" id="{AC7AFE1E-67D1-4106-97CA-98302D42CC4D}"/>
+                <a16:creationId xmlns:a16="http://schemas.microsoft.com/office/drawing/2014/main" id="{AC7AFE1E-67D1-4106-97CA-98302D42CC4D}"/>
               </a:ext>
             </a:extLst>
           </p:cNvPr>
@@ -2585,7 +2585,7 @@
           <p:cNvPr id="4" name="Text Placeholder 3">
             <a:extLst>
               <a:ext uri="{FF2B5EF4-FFF2-40B4-BE49-F238E27FC236}">
-                <a16:creationId xmlns:a16="http://schemas.microsoft.com/office/drawing/2014/main" xmlns="" id="{67D8D73B-3D4D-42A7-9A3C-1D508E8A9B45}"/>
+                <a16:creationId xmlns:a16="http://schemas.microsoft.com/office/drawing/2014/main" id="{67D8D73B-3D4D-42A7-9A3C-1D508E8A9B45}"/>
               </a:ext>
             </a:extLst>
           </p:cNvPr>
@@ -2656,7 +2656,7 @@
           <p:cNvPr id="5" name="Date Placeholder 4">
             <a:extLst>
               <a:ext uri="{FF2B5EF4-FFF2-40B4-BE49-F238E27FC236}">
-                <a16:creationId xmlns:a16="http://schemas.microsoft.com/office/drawing/2014/main" xmlns="" id="{48C8945E-A47A-42A2-9DF6-CA6D5002F65F}"/>
+                <a16:creationId xmlns:a16="http://schemas.microsoft.com/office/drawing/2014/main" id="{48C8945E-A47A-42A2-9DF6-CA6D5002F65F}"/>
               </a:ext>
             </a:extLst>
           </p:cNvPr>
@@ -2685,7 +2685,7 @@
           <p:cNvPr id="6" name="Footer Placeholder 5">
             <a:extLst>
               <a:ext uri="{FF2B5EF4-FFF2-40B4-BE49-F238E27FC236}">
-                <a16:creationId xmlns:a16="http://schemas.microsoft.com/office/drawing/2014/main" xmlns="" id="{EB000DB4-2747-4297-B400-42A539FBDB42}"/>
+                <a16:creationId xmlns:a16="http://schemas.microsoft.com/office/drawing/2014/main" id="{EB000DB4-2747-4297-B400-42A539FBDB42}"/>
               </a:ext>
             </a:extLst>
           </p:cNvPr>
@@ -2710,7 +2710,7 @@
           <p:cNvPr id="7" name="Slide Number Placeholder 6">
             <a:extLst>
               <a:ext uri="{FF2B5EF4-FFF2-40B4-BE49-F238E27FC236}">
-                <a16:creationId xmlns:a16="http://schemas.microsoft.com/office/drawing/2014/main" xmlns="" id="{5BAD9222-F141-4803-AF73-E2DD92E2ABBC}"/>
+                <a16:creationId xmlns:a16="http://schemas.microsoft.com/office/drawing/2014/main" id="{5BAD9222-F141-4803-AF73-E2DD92E2ABBC}"/>
               </a:ext>
             </a:extLst>
           </p:cNvPr>
@@ -2774,7 +2774,7 @@
           <p:cNvPr id="2" name="Title Placeholder 1">
             <a:extLst>
               <a:ext uri="{FF2B5EF4-FFF2-40B4-BE49-F238E27FC236}">
-                <a16:creationId xmlns:a16="http://schemas.microsoft.com/office/drawing/2014/main" xmlns="" id="{5BF9D404-795C-4EA4-AD01-26740519239C}"/>
+                <a16:creationId xmlns:a16="http://schemas.microsoft.com/office/drawing/2014/main" id="{5BF9D404-795C-4EA4-AD01-26740519239C}"/>
               </a:ext>
             </a:extLst>
           </p:cNvPr>
@@ -2812,7 +2812,7 @@
           <p:cNvPr id="3" name="Text Placeholder 2">
             <a:extLst>
               <a:ext uri="{FF2B5EF4-FFF2-40B4-BE49-F238E27FC236}">
-                <a16:creationId xmlns:a16="http://schemas.microsoft.com/office/drawing/2014/main" xmlns="" id="{DE3FEC7B-48F8-4348-9BC6-68F83B859EE9}"/>
+                <a16:creationId xmlns:a16="http://schemas.microsoft.com/office/drawing/2014/main" id="{DE3FEC7B-48F8-4348-9BC6-68F83B859EE9}"/>
               </a:ext>
             </a:extLst>
           </p:cNvPr>
@@ -2879,7 +2879,7 @@
           <p:cNvPr id="4" name="Date Placeholder 3">
             <a:extLst>
               <a:ext uri="{FF2B5EF4-FFF2-40B4-BE49-F238E27FC236}">
-                <a16:creationId xmlns:a16="http://schemas.microsoft.com/office/drawing/2014/main" xmlns="" id="{31CA1A1D-E2F5-4161-A025-7B911965C2FE}"/>
+                <a16:creationId xmlns:a16="http://schemas.microsoft.com/office/drawing/2014/main" id="{31CA1A1D-E2F5-4161-A025-7B911965C2FE}"/>
               </a:ext>
             </a:extLst>
           </p:cNvPr>
@@ -2926,7 +2926,7 @@
           <p:cNvPr id="5" name="Footer Placeholder 4">
             <a:extLst>
               <a:ext uri="{FF2B5EF4-FFF2-40B4-BE49-F238E27FC236}">
-                <a16:creationId xmlns:a16="http://schemas.microsoft.com/office/drawing/2014/main" xmlns="" id="{43C7B926-18F3-4C13-AB92-764E10D324FB}"/>
+                <a16:creationId xmlns:a16="http://schemas.microsoft.com/office/drawing/2014/main" id="{43C7B926-18F3-4C13-AB92-764E10D324FB}"/>
               </a:ext>
             </a:extLst>
           </p:cNvPr>
@@ -2969,7 +2969,7 @@
           <p:cNvPr id="6" name="Slide Number Placeholder 5">
             <a:extLst>
               <a:ext uri="{FF2B5EF4-FFF2-40B4-BE49-F238E27FC236}">
-                <a16:creationId xmlns:a16="http://schemas.microsoft.com/office/drawing/2014/main" xmlns="" id="{734FA846-3BF6-46FD-80CF-34B300D244C0}"/>
+                <a16:creationId xmlns:a16="http://schemas.microsoft.com/office/drawing/2014/main" id="{734FA846-3BF6-46FD-80CF-34B300D244C0}"/>
               </a:ext>
             </a:extLst>
           </p:cNvPr>
@@ -3337,7 +3337,7 @@
           <p:cNvPr id="4" name="Rectangle 3">
             <a:extLst>
               <a:ext uri="{FF2B5EF4-FFF2-40B4-BE49-F238E27FC236}">
-                <a16:creationId xmlns:a16="http://schemas.microsoft.com/office/drawing/2014/main" xmlns="" id="{0A71868C-EF96-4004-8116-DFD1FCCEE6C3}"/>
+                <a16:creationId xmlns:a16="http://schemas.microsoft.com/office/drawing/2014/main" id="{0A71868C-EF96-4004-8116-DFD1FCCEE6C3}"/>
               </a:ext>
             </a:extLst>
           </p:cNvPr>
@@ -3393,7 +3393,7 @@
           <p:cNvPr id="5" name="Rectangle 4">
             <a:extLst>
               <a:ext uri="{FF2B5EF4-FFF2-40B4-BE49-F238E27FC236}">
-                <a16:creationId xmlns:a16="http://schemas.microsoft.com/office/drawing/2014/main" xmlns="" id="{67A88ADC-D070-420B-9A88-FDBA4865856A}"/>
+                <a16:creationId xmlns:a16="http://schemas.microsoft.com/office/drawing/2014/main" id="{67A88ADC-D070-420B-9A88-FDBA4865856A}"/>
               </a:ext>
             </a:extLst>
           </p:cNvPr>
@@ -3453,7 +3453,7 @@
           <p:cNvPr id="7" name="Straight Arrow Connector 6">
             <a:extLst>
               <a:ext uri="{FF2B5EF4-FFF2-40B4-BE49-F238E27FC236}">
-                <a16:creationId xmlns:a16="http://schemas.microsoft.com/office/drawing/2014/main" xmlns="" id="{45AD00B6-B022-4C7F-A523-E16E6292918D}"/>
+                <a16:creationId xmlns:a16="http://schemas.microsoft.com/office/drawing/2014/main" id="{45AD00B6-B022-4C7F-A523-E16E6292918D}"/>
               </a:ext>
             </a:extLst>
           </p:cNvPr>
@@ -3495,7 +3495,7 @@
           <p:cNvPr id="8" name="Rectangle 7">
             <a:extLst>
               <a:ext uri="{FF2B5EF4-FFF2-40B4-BE49-F238E27FC236}">
-                <a16:creationId xmlns:a16="http://schemas.microsoft.com/office/drawing/2014/main" xmlns="" id="{3C7A2B3E-B0CA-48CD-A6CB-935EF9D71843}"/>
+                <a16:creationId xmlns:a16="http://schemas.microsoft.com/office/drawing/2014/main" id="{3C7A2B3E-B0CA-48CD-A6CB-935EF9D71843}"/>
               </a:ext>
             </a:extLst>
           </p:cNvPr>
@@ -3555,7 +3555,7 @@
           <p:cNvPr id="9" name="TextBox 8">
             <a:extLst>
               <a:ext uri="{FF2B5EF4-FFF2-40B4-BE49-F238E27FC236}">
-                <a16:creationId xmlns:a16="http://schemas.microsoft.com/office/drawing/2014/main" xmlns="" id="{ABD7B54F-357C-489B-ADE1-DFA04BEA1686}"/>
+                <a16:creationId xmlns:a16="http://schemas.microsoft.com/office/drawing/2014/main" id="{ABD7B54F-357C-489B-ADE1-DFA04BEA1686}"/>
               </a:ext>
             </a:extLst>
           </p:cNvPr>
@@ -3590,7 +3590,7 @@
           <p:cNvPr id="10" name="Rectangle 9">
             <a:extLst>
               <a:ext uri="{FF2B5EF4-FFF2-40B4-BE49-F238E27FC236}">
-                <a16:creationId xmlns:a16="http://schemas.microsoft.com/office/drawing/2014/main" xmlns="" id="{21B869D6-66CB-4B38-975F-B7FEB6AA9B13}"/>
+                <a16:creationId xmlns:a16="http://schemas.microsoft.com/office/drawing/2014/main" id="{21B869D6-66CB-4B38-975F-B7FEB6AA9B13}"/>
               </a:ext>
             </a:extLst>
           </p:cNvPr>
@@ -3639,7 +3639,7 @@
           <p:cNvPr id="12" name="Straight Arrow Connector 11">
             <a:extLst>
               <a:ext uri="{FF2B5EF4-FFF2-40B4-BE49-F238E27FC236}">
-                <a16:creationId xmlns:a16="http://schemas.microsoft.com/office/drawing/2014/main" xmlns="" id="{78CBB1AB-C0E2-40F2-828D-F209304958AC}"/>
+                <a16:creationId xmlns:a16="http://schemas.microsoft.com/office/drawing/2014/main" id="{78CBB1AB-C0E2-40F2-828D-F209304958AC}"/>
               </a:ext>
             </a:extLst>
           </p:cNvPr>
@@ -3682,7 +3682,7 @@
           <p:cNvPr id="14" name="TextBox 13">
             <a:extLst>
               <a:ext uri="{FF2B5EF4-FFF2-40B4-BE49-F238E27FC236}">
-                <a16:creationId xmlns:a16="http://schemas.microsoft.com/office/drawing/2014/main" xmlns="" id="{E0BBD6C8-C8F2-40C5-AA64-85961A11ADC2}"/>
+                <a16:creationId xmlns:a16="http://schemas.microsoft.com/office/drawing/2014/main" id="{E0BBD6C8-C8F2-40C5-AA64-85961A11ADC2}"/>
               </a:ext>
             </a:extLst>
           </p:cNvPr>
@@ -3717,7 +3717,7 @@
           <p:cNvPr id="16" name="Straight Arrow Connector 15">
             <a:extLst>
               <a:ext uri="{FF2B5EF4-FFF2-40B4-BE49-F238E27FC236}">
-                <a16:creationId xmlns:a16="http://schemas.microsoft.com/office/drawing/2014/main" xmlns="" id="{22509349-F226-482F-AC14-E28C2411C4C3}"/>
+                <a16:creationId xmlns:a16="http://schemas.microsoft.com/office/drawing/2014/main" id="{22509349-F226-482F-AC14-E28C2411C4C3}"/>
               </a:ext>
             </a:extLst>
           </p:cNvPr>
@@ -3760,7 +3760,7 @@
           <p:cNvPr id="18" name="TextBox 17">
             <a:extLst>
               <a:ext uri="{FF2B5EF4-FFF2-40B4-BE49-F238E27FC236}">
-                <a16:creationId xmlns:a16="http://schemas.microsoft.com/office/drawing/2014/main" xmlns="" id="{E2DE2503-050C-47C3-BC73-C61D89CEB131}"/>
+                <a16:creationId xmlns:a16="http://schemas.microsoft.com/office/drawing/2014/main" id="{E2DE2503-050C-47C3-BC73-C61D89CEB131}"/>
               </a:ext>
             </a:extLst>
           </p:cNvPr>
@@ -3795,7 +3795,7 @@
           <p:cNvPr id="23" name="Straight Arrow Connector 22">
             <a:extLst>
               <a:ext uri="{FF2B5EF4-FFF2-40B4-BE49-F238E27FC236}">
-                <a16:creationId xmlns:a16="http://schemas.microsoft.com/office/drawing/2014/main" xmlns="" id="{5D314D83-3A56-4BD7-B215-19DEE4ED8C0B}"/>
+                <a16:creationId xmlns:a16="http://schemas.microsoft.com/office/drawing/2014/main" id="{5D314D83-3A56-4BD7-B215-19DEE4ED8C0B}"/>
               </a:ext>
             </a:extLst>
           </p:cNvPr>
@@ -3838,7 +3838,7 @@
           <p:cNvPr id="24" name="Straight Arrow Connector 23">
             <a:extLst>
               <a:ext uri="{FF2B5EF4-FFF2-40B4-BE49-F238E27FC236}">
-                <a16:creationId xmlns:a16="http://schemas.microsoft.com/office/drawing/2014/main" xmlns="" id="{874E7075-4C88-4378-99B9-DC474BE0CE65}"/>
+                <a16:creationId xmlns:a16="http://schemas.microsoft.com/office/drawing/2014/main" id="{874E7075-4C88-4378-99B9-DC474BE0CE65}"/>
               </a:ext>
             </a:extLst>
           </p:cNvPr>
@@ -3881,7 +3881,7 @@
           <p:cNvPr id="25" name="TextBox 24">
             <a:extLst>
               <a:ext uri="{FF2B5EF4-FFF2-40B4-BE49-F238E27FC236}">
-                <a16:creationId xmlns:a16="http://schemas.microsoft.com/office/drawing/2014/main" xmlns="" id="{171D93A1-C181-4F9C-8D75-C106DB531AB7}"/>
+                <a16:creationId xmlns:a16="http://schemas.microsoft.com/office/drawing/2014/main" id="{171D93A1-C181-4F9C-8D75-C106DB531AB7}"/>
               </a:ext>
             </a:extLst>
           </p:cNvPr>
@@ -3916,7 +3916,7 @@
           <p:cNvPr id="26" name="TextBox 25">
             <a:extLst>
               <a:ext uri="{FF2B5EF4-FFF2-40B4-BE49-F238E27FC236}">
-                <a16:creationId xmlns:a16="http://schemas.microsoft.com/office/drawing/2014/main" xmlns="" id="{03EAB749-77B2-435B-A0A3-02060FD4A06F}"/>
+                <a16:creationId xmlns:a16="http://schemas.microsoft.com/office/drawing/2014/main" id="{03EAB749-77B2-435B-A0A3-02060FD4A06F}"/>
               </a:ext>
             </a:extLst>
           </p:cNvPr>
@@ -3951,7 +3951,7 @@
           <p:cNvPr id="27" name="TextBox 26">
             <a:extLst>
               <a:ext uri="{FF2B5EF4-FFF2-40B4-BE49-F238E27FC236}">
-                <a16:creationId xmlns:a16="http://schemas.microsoft.com/office/drawing/2014/main" xmlns="" id="{7D8414B9-747D-41E7-A06D-8BBA5042C15C}"/>
+                <a16:creationId xmlns:a16="http://schemas.microsoft.com/office/drawing/2014/main" id="{7D8414B9-747D-41E7-A06D-8BBA5042C15C}"/>
               </a:ext>
             </a:extLst>
           </p:cNvPr>
@@ -3986,7 +3986,7 @@
           <p:cNvPr id="28" name="TextBox 27">
             <a:extLst>
               <a:ext uri="{FF2B5EF4-FFF2-40B4-BE49-F238E27FC236}">
-                <a16:creationId xmlns:a16="http://schemas.microsoft.com/office/drawing/2014/main" xmlns="" id="{F559714E-416D-4742-9901-ADC4D8BAC5FA}"/>
+                <a16:creationId xmlns:a16="http://schemas.microsoft.com/office/drawing/2014/main" id="{F559714E-416D-4742-9901-ADC4D8BAC5FA}"/>
               </a:ext>
             </a:extLst>
           </p:cNvPr>
@@ -4021,7 +4021,7 @@
           <p:cNvPr id="31" name="Rectangle 30">
             <a:extLst>
               <a:ext uri="{FF2B5EF4-FFF2-40B4-BE49-F238E27FC236}">
-                <a16:creationId xmlns:a16="http://schemas.microsoft.com/office/drawing/2014/main" xmlns="" id="{9061AF07-38B9-4B05-B6B2-1A74D7C0C618}"/>
+                <a16:creationId xmlns:a16="http://schemas.microsoft.com/office/drawing/2014/main" id="{9061AF07-38B9-4B05-B6B2-1A74D7C0C618}"/>
               </a:ext>
             </a:extLst>
           </p:cNvPr>
@@ -4081,7 +4081,7 @@
           <p:cNvPr id="33" name="Connector: Elbow 32">
             <a:extLst>
               <a:ext uri="{FF2B5EF4-FFF2-40B4-BE49-F238E27FC236}">
-                <a16:creationId xmlns:a16="http://schemas.microsoft.com/office/drawing/2014/main" xmlns="" id="{B367C937-E98B-4009-B48E-DBF7102DCFD1}"/>
+                <a16:creationId xmlns:a16="http://schemas.microsoft.com/office/drawing/2014/main" id="{B367C937-E98B-4009-B48E-DBF7102DCFD1}"/>
               </a:ext>
             </a:extLst>
           </p:cNvPr>
@@ -4123,7 +4123,7 @@
           <p:cNvPr id="34" name="TextBox 33">
             <a:extLst>
               <a:ext uri="{FF2B5EF4-FFF2-40B4-BE49-F238E27FC236}">
-                <a16:creationId xmlns:a16="http://schemas.microsoft.com/office/drawing/2014/main" xmlns="" id="{7FC33359-8BE1-4CD9-AD98-06C75CE8FF08}"/>
+                <a16:creationId xmlns:a16="http://schemas.microsoft.com/office/drawing/2014/main" id="{7FC33359-8BE1-4CD9-AD98-06C75CE8FF08}"/>
               </a:ext>
             </a:extLst>
           </p:cNvPr>
@@ -4158,7 +4158,7 @@
           <p:cNvPr id="35" name="Rectangle 34">
             <a:extLst>
               <a:ext uri="{FF2B5EF4-FFF2-40B4-BE49-F238E27FC236}">
-                <a16:creationId xmlns:a16="http://schemas.microsoft.com/office/drawing/2014/main" xmlns="" id="{85531841-C806-4F00-B17D-D19E7CE1C155}"/>
+                <a16:creationId xmlns:a16="http://schemas.microsoft.com/office/drawing/2014/main" id="{85531841-C806-4F00-B17D-D19E7CE1C155}"/>
               </a:ext>
             </a:extLst>
           </p:cNvPr>
@@ -4217,7 +4217,7 @@
           <p:cNvPr id="37" name="Connector: Elbow 36">
             <a:extLst>
               <a:ext uri="{FF2B5EF4-FFF2-40B4-BE49-F238E27FC236}">
-                <a16:creationId xmlns:a16="http://schemas.microsoft.com/office/drawing/2014/main" xmlns="" id="{1BFE62EC-0F5D-4135-832D-63D5DC95509C}"/>
+                <a16:creationId xmlns:a16="http://schemas.microsoft.com/office/drawing/2014/main" id="{1BFE62EC-0F5D-4135-832D-63D5DC95509C}"/>
               </a:ext>
             </a:extLst>
           </p:cNvPr>
@@ -4262,7 +4262,7 @@
           <p:cNvPr id="38" name="TextBox 37">
             <a:extLst>
               <a:ext uri="{FF2B5EF4-FFF2-40B4-BE49-F238E27FC236}">
-                <a16:creationId xmlns:a16="http://schemas.microsoft.com/office/drawing/2014/main" xmlns="" id="{892D5E6B-E445-4560-9C01-6D3C52FFC5AA}"/>
+                <a16:creationId xmlns:a16="http://schemas.microsoft.com/office/drawing/2014/main" id="{892D5E6B-E445-4560-9C01-6D3C52FFC5AA}"/>
               </a:ext>
             </a:extLst>
           </p:cNvPr>
@@ -4297,7 +4297,7 @@
           <p:cNvPr id="39" name="Rectangle 38">
             <a:extLst>
               <a:ext uri="{FF2B5EF4-FFF2-40B4-BE49-F238E27FC236}">
-                <a16:creationId xmlns:a16="http://schemas.microsoft.com/office/drawing/2014/main" xmlns="" id="{2F2BC059-EF97-4BEE-8F18-133838E3F2D8}"/>
+                <a16:creationId xmlns:a16="http://schemas.microsoft.com/office/drawing/2014/main" id="{2F2BC059-EF97-4BEE-8F18-133838E3F2D8}"/>
               </a:ext>
             </a:extLst>
           </p:cNvPr>
@@ -4346,7 +4346,7 @@
           <p:cNvPr id="44" name="TextBox 43">
             <a:extLst>
               <a:ext uri="{FF2B5EF4-FFF2-40B4-BE49-F238E27FC236}">
-                <a16:creationId xmlns:a16="http://schemas.microsoft.com/office/drawing/2014/main" xmlns="" id="{48B10C1F-BA7F-40E8-B79A-E87D7A3A66AB}"/>
+                <a16:creationId xmlns:a16="http://schemas.microsoft.com/office/drawing/2014/main" id="{48B10C1F-BA7F-40E8-B79A-E87D7A3A66AB}"/>
               </a:ext>
             </a:extLst>
           </p:cNvPr>
@@ -4561,7 +4561,7 @@
           <p:cNvPr id="11" name="TextBox 10">
             <a:extLst>
               <a:ext uri="{FF2B5EF4-FFF2-40B4-BE49-F238E27FC236}">
-                <a16:creationId xmlns:a16="http://schemas.microsoft.com/office/drawing/2014/main" xmlns="" id="{E0BBD6C8-C8F2-40C5-AA64-85961A11ADC2}"/>
+                <a16:creationId xmlns:a16="http://schemas.microsoft.com/office/drawing/2014/main" id="{E0BBD6C8-C8F2-40C5-AA64-85961A11ADC2}"/>
               </a:ext>
             </a:extLst>
           </p:cNvPr>
@@ -4689,7 +4689,7 @@
           <p:cNvPr id="19" name="TextBox 18">
             <a:extLst>
               <a:ext uri="{FF2B5EF4-FFF2-40B4-BE49-F238E27FC236}">
-                <a16:creationId xmlns:a16="http://schemas.microsoft.com/office/drawing/2014/main" xmlns="" id="{E0BBD6C8-C8F2-40C5-AA64-85961A11ADC2}"/>
+                <a16:creationId xmlns:a16="http://schemas.microsoft.com/office/drawing/2014/main" id="{E0BBD6C8-C8F2-40C5-AA64-85961A11ADC2}"/>
               </a:ext>
             </a:extLst>
           </p:cNvPr>
@@ -4811,7 +4811,7 @@
           <p:cNvPr id="23" name="TextBox 22">
             <a:extLst>
               <a:ext uri="{FF2B5EF4-FFF2-40B4-BE49-F238E27FC236}">
-                <a16:creationId xmlns:a16="http://schemas.microsoft.com/office/drawing/2014/main" xmlns="" id="{E0BBD6C8-C8F2-40C5-AA64-85961A11ADC2}"/>
+                <a16:creationId xmlns:a16="http://schemas.microsoft.com/office/drawing/2014/main" id="{E0BBD6C8-C8F2-40C5-AA64-85961A11ADC2}"/>
               </a:ext>
             </a:extLst>
           </p:cNvPr>
@@ -4931,7 +4931,7 @@
           <p:cNvPr id="28" name="TextBox 27">
             <a:extLst>
               <a:ext uri="{FF2B5EF4-FFF2-40B4-BE49-F238E27FC236}">
-                <a16:creationId xmlns:a16="http://schemas.microsoft.com/office/drawing/2014/main" xmlns="" id="{E0BBD6C8-C8F2-40C5-AA64-85961A11ADC2}"/>
+                <a16:creationId xmlns:a16="http://schemas.microsoft.com/office/drawing/2014/main" id="{E0BBD6C8-C8F2-40C5-AA64-85961A11ADC2}"/>
               </a:ext>
             </a:extLst>
           </p:cNvPr>
@@ -5060,7 +5060,7 @@
           <p:cNvPr id="34" name="TextBox 33">
             <a:extLst>
               <a:ext uri="{FF2B5EF4-FFF2-40B4-BE49-F238E27FC236}">
-                <a16:creationId xmlns:a16="http://schemas.microsoft.com/office/drawing/2014/main" xmlns="" id="{E0BBD6C8-C8F2-40C5-AA64-85961A11ADC2}"/>
+                <a16:creationId xmlns:a16="http://schemas.microsoft.com/office/drawing/2014/main" id="{E0BBD6C8-C8F2-40C5-AA64-85961A11ADC2}"/>
               </a:ext>
             </a:extLst>
           </p:cNvPr>
@@ -5192,7 +5192,7 @@
           <p:cNvPr id="38" name="TextBox 37">
             <a:extLst>
               <a:ext uri="{FF2B5EF4-FFF2-40B4-BE49-F238E27FC236}">
-                <a16:creationId xmlns:a16="http://schemas.microsoft.com/office/drawing/2014/main" xmlns="" id="{E0BBD6C8-C8F2-40C5-AA64-85961A11ADC2}"/>
+                <a16:creationId xmlns:a16="http://schemas.microsoft.com/office/drawing/2014/main" id="{E0BBD6C8-C8F2-40C5-AA64-85961A11ADC2}"/>
               </a:ext>
             </a:extLst>
           </p:cNvPr>
@@ -5362,7 +5362,7 @@
           <p:cNvPr id="44" name="TextBox 43">
             <a:extLst>
               <a:ext uri="{FF2B5EF4-FFF2-40B4-BE49-F238E27FC236}">
-                <a16:creationId xmlns:a16="http://schemas.microsoft.com/office/drawing/2014/main" xmlns="" id="{E0BBD6C8-C8F2-40C5-AA64-85961A11ADC2}"/>
+                <a16:creationId xmlns:a16="http://schemas.microsoft.com/office/drawing/2014/main" id="{E0BBD6C8-C8F2-40C5-AA64-85961A11ADC2}"/>
               </a:ext>
             </a:extLst>
           </p:cNvPr>
@@ -5397,7 +5397,7 @@
           <p:cNvPr id="45" name="TextBox 44">
             <a:extLst>
               <a:ext uri="{FF2B5EF4-FFF2-40B4-BE49-F238E27FC236}">
-                <a16:creationId xmlns:a16="http://schemas.microsoft.com/office/drawing/2014/main" xmlns="" id="{E0BBD6C8-C8F2-40C5-AA64-85961A11ADC2}"/>
+                <a16:creationId xmlns:a16="http://schemas.microsoft.com/office/drawing/2014/main" id="{E0BBD6C8-C8F2-40C5-AA64-85961A11ADC2}"/>
               </a:ext>
             </a:extLst>
           </p:cNvPr>
@@ -5432,7 +5432,7 @@
           <p:cNvPr id="26" name="TextBox 25">
             <a:extLst>
               <a:ext uri="{FF2B5EF4-FFF2-40B4-BE49-F238E27FC236}">
-                <a16:creationId xmlns:a16="http://schemas.microsoft.com/office/drawing/2014/main" xmlns="" id="{70BF22D6-D5A2-4CCC-8E2D-329E25668556}"/>
+                <a16:creationId xmlns:a16="http://schemas.microsoft.com/office/drawing/2014/main" id="{70BF22D6-D5A2-4CCC-8E2D-329E25668556}"/>
               </a:ext>
             </a:extLst>
           </p:cNvPr>
@@ -5648,7 +5648,7 @@
           <p:cNvPr id="11" name="TextBox 10">
             <a:extLst>
               <a:ext uri="{FF2B5EF4-FFF2-40B4-BE49-F238E27FC236}">
-                <a16:creationId xmlns:a16="http://schemas.microsoft.com/office/drawing/2014/main" xmlns="" id="{E0BBD6C8-C8F2-40C5-AA64-85961A11ADC2}"/>
+                <a16:creationId xmlns:a16="http://schemas.microsoft.com/office/drawing/2014/main" id="{E0BBD6C8-C8F2-40C5-AA64-85961A11ADC2}"/>
               </a:ext>
             </a:extLst>
           </p:cNvPr>
@@ -5783,7 +5783,7 @@
           <p:cNvPr id="19" name="TextBox 18">
             <a:extLst>
               <a:ext uri="{FF2B5EF4-FFF2-40B4-BE49-F238E27FC236}">
-                <a16:creationId xmlns:a16="http://schemas.microsoft.com/office/drawing/2014/main" xmlns="" id="{E0BBD6C8-C8F2-40C5-AA64-85961A11ADC2}"/>
+                <a16:creationId xmlns:a16="http://schemas.microsoft.com/office/drawing/2014/main" id="{E0BBD6C8-C8F2-40C5-AA64-85961A11ADC2}"/>
               </a:ext>
             </a:extLst>
           </p:cNvPr>
@@ -5905,7 +5905,7 @@
           <p:cNvPr id="23" name="TextBox 22">
             <a:extLst>
               <a:ext uri="{FF2B5EF4-FFF2-40B4-BE49-F238E27FC236}">
-                <a16:creationId xmlns:a16="http://schemas.microsoft.com/office/drawing/2014/main" xmlns="" id="{E0BBD6C8-C8F2-40C5-AA64-85961A11ADC2}"/>
+                <a16:creationId xmlns:a16="http://schemas.microsoft.com/office/drawing/2014/main" id="{E0BBD6C8-C8F2-40C5-AA64-85961A11ADC2}"/>
               </a:ext>
             </a:extLst>
           </p:cNvPr>
@@ -6019,7 +6019,7 @@
           <p:cNvPr id="28" name="TextBox 27">
             <a:extLst>
               <a:ext uri="{FF2B5EF4-FFF2-40B4-BE49-F238E27FC236}">
-                <a16:creationId xmlns:a16="http://schemas.microsoft.com/office/drawing/2014/main" xmlns="" id="{E0BBD6C8-C8F2-40C5-AA64-85961A11ADC2}"/>
+                <a16:creationId xmlns:a16="http://schemas.microsoft.com/office/drawing/2014/main" id="{E0BBD6C8-C8F2-40C5-AA64-85961A11ADC2}"/>
               </a:ext>
             </a:extLst>
           </p:cNvPr>
@@ -6140,7 +6140,7 @@
           <p:cNvPr id="34" name="TextBox 33">
             <a:extLst>
               <a:ext uri="{FF2B5EF4-FFF2-40B4-BE49-F238E27FC236}">
-                <a16:creationId xmlns:a16="http://schemas.microsoft.com/office/drawing/2014/main" xmlns="" id="{E0BBD6C8-C8F2-40C5-AA64-85961A11ADC2}"/>
+                <a16:creationId xmlns:a16="http://schemas.microsoft.com/office/drawing/2014/main" id="{E0BBD6C8-C8F2-40C5-AA64-85961A11ADC2}"/>
               </a:ext>
             </a:extLst>
           </p:cNvPr>
@@ -6261,7 +6261,7 @@
           <p:cNvPr id="38" name="TextBox 37">
             <a:extLst>
               <a:ext uri="{FF2B5EF4-FFF2-40B4-BE49-F238E27FC236}">
-                <a16:creationId xmlns:a16="http://schemas.microsoft.com/office/drawing/2014/main" xmlns="" id="{E0BBD6C8-C8F2-40C5-AA64-85961A11ADC2}"/>
+                <a16:creationId xmlns:a16="http://schemas.microsoft.com/office/drawing/2014/main" id="{E0BBD6C8-C8F2-40C5-AA64-85961A11ADC2}"/>
               </a:ext>
             </a:extLst>
           </p:cNvPr>
@@ -6425,7 +6425,7 @@
           <p:cNvPr id="44" name="TextBox 43">
             <a:extLst>
               <a:ext uri="{FF2B5EF4-FFF2-40B4-BE49-F238E27FC236}">
-                <a16:creationId xmlns:a16="http://schemas.microsoft.com/office/drawing/2014/main" xmlns="" id="{E0BBD6C8-C8F2-40C5-AA64-85961A11ADC2}"/>
+                <a16:creationId xmlns:a16="http://schemas.microsoft.com/office/drawing/2014/main" id="{E0BBD6C8-C8F2-40C5-AA64-85961A11ADC2}"/>
               </a:ext>
             </a:extLst>
           </p:cNvPr>
@@ -6460,7 +6460,7 @@
           <p:cNvPr id="45" name="TextBox 44">
             <a:extLst>
               <a:ext uri="{FF2B5EF4-FFF2-40B4-BE49-F238E27FC236}">
-                <a16:creationId xmlns:a16="http://schemas.microsoft.com/office/drawing/2014/main" xmlns="" id="{E0BBD6C8-C8F2-40C5-AA64-85961A11ADC2}"/>
+                <a16:creationId xmlns:a16="http://schemas.microsoft.com/office/drawing/2014/main" id="{E0BBD6C8-C8F2-40C5-AA64-85961A11ADC2}"/>
               </a:ext>
             </a:extLst>
           </p:cNvPr>
@@ -6495,7 +6495,7 @@
           <p:cNvPr id="26" name="TextBox 25">
             <a:extLst>
               <a:ext uri="{FF2B5EF4-FFF2-40B4-BE49-F238E27FC236}">
-                <a16:creationId xmlns:a16="http://schemas.microsoft.com/office/drawing/2014/main" xmlns="" id="{70BF22D6-D5A2-4CCC-8E2D-329E25668556}"/>
+                <a16:creationId xmlns:a16="http://schemas.microsoft.com/office/drawing/2014/main" id="{70BF22D6-D5A2-4CCC-8E2D-329E25668556}"/>
               </a:ext>
             </a:extLst>
           </p:cNvPr>
@@ -6530,7 +6530,7 @@
           <p:cNvPr id="40" name="TextBox 39">
             <a:extLst>
               <a:ext uri="{FF2B5EF4-FFF2-40B4-BE49-F238E27FC236}">
-                <a16:creationId xmlns:a16="http://schemas.microsoft.com/office/drawing/2014/main" xmlns="" id="{BF7734B1-6C1B-4ADB-BBA4-2510EE97BB9D}"/>
+                <a16:creationId xmlns:a16="http://schemas.microsoft.com/office/drawing/2014/main" id="{BF7734B1-6C1B-4ADB-BBA4-2510EE97BB9D}"/>
               </a:ext>
             </a:extLst>
           </p:cNvPr>
@@ -6565,7 +6565,7 @@
           <p:cNvPr id="32" name="Straight Arrow Connector 31">
             <a:extLst>
               <a:ext uri="{FF2B5EF4-FFF2-40B4-BE49-F238E27FC236}">
-                <a16:creationId xmlns:a16="http://schemas.microsoft.com/office/drawing/2014/main" xmlns="" id="{5BC5C957-DD00-47FE-A727-262A8F90A864}"/>
+                <a16:creationId xmlns:a16="http://schemas.microsoft.com/office/drawing/2014/main" id="{5BC5C957-DD00-47FE-A727-262A8F90A864}"/>
               </a:ext>
             </a:extLst>
           </p:cNvPr>
@@ -6640,7 +6640,7 @@
         </p:nvSpPr>
         <p:spPr>
           <a:xfrm>
-            <a:off x="1844087" y="515831"/>
+            <a:off x="1002052" y="754829"/>
             <a:ext cx="1494797" cy="991056"/>
           </a:xfrm>
           <a:prstGeom prst="rect">
@@ -6708,7 +6708,7 @@
         </p:nvSpPr>
         <p:spPr>
           <a:xfrm>
-            <a:off x="264281" y="2803441"/>
+            <a:off x="8978642" y="1136267"/>
             <a:ext cx="1494797" cy="991056"/>
           </a:xfrm>
           <a:prstGeom prst="rect">
@@ -6765,15 +6765,15 @@
           <p:cNvPr id="9" name="Straight Arrow Connector 8"/>
           <p:cNvCxnSpPr>
             <a:cxnSpLocks/>
-            <a:stCxn id="20" idx="1"/>
-            <a:endCxn id="5" idx="3"/>
+            <a:stCxn id="20" idx="3"/>
+            <a:endCxn id="5" idx="1"/>
           </p:cNvCxnSpPr>
           <p:nvPr/>
         </p:nvCxnSpPr>
         <p:spPr>
-          <a:xfrm flipH="1">
-            <a:off x="1759078" y="2147290"/>
-            <a:ext cx="3260998" cy="1151679"/>
+          <a:xfrm flipV="1">
+            <a:off x="6258426" y="1631795"/>
+            <a:ext cx="2720216" cy="836092"/>
           </a:xfrm>
           <a:prstGeom prst="straightConnector1">
             <a:avLst/>
@@ -6799,54 +6799,13 @@
       </p:cxnSp>
       <p:sp>
         <p:nvSpPr>
-          <p:cNvPr id="11" name="TextBox 10">
-            <a:extLst>
-              <a:ext uri="{FF2B5EF4-FFF2-40B4-BE49-F238E27FC236}">
-                <a16:creationId xmlns:a16="http://schemas.microsoft.com/office/drawing/2014/main" xmlns="" id="{E0BBD6C8-C8F2-40C5-AA64-85961A11ADC2}"/>
-              </a:ext>
-            </a:extLst>
-          </p:cNvPr>
-          <p:cNvSpPr txBox="1"/>
-          <p:nvPr/>
-        </p:nvSpPr>
-        <p:spPr>
-          <a:xfrm>
-            <a:off x="3717699" y="2455090"/>
-            <a:ext cx="728932" cy="461665"/>
-          </a:xfrm>
-          <a:prstGeom prst="rect">
-            <a:avLst/>
-          </a:prstGeom>
-          <a:noFill/>
-        </p:spPr>
-        <p:txBody>
-          <a:bodyPr wrap="square" rtlCol="0">
-            <a:spAutoFit/>
-          </a:bodyPr>
-          <a:lstStyle/>
-          <a:p>
-            <a:r>
-              <a:rPr lang="en-US" sz="1200" dirty="0"/>
-              <a:t>contains</a:t>
-            </a:r>
-          </a:p>
-          <a:p>
-            <a:r>
-              <a:rPr lang="en-US" sz="1200" dirty="0"/>
-              <a:t>List&lt;&gt;</a:t>
-            </a:r>
-          </a:p>
-        </p:txBody>
-      </p:sp>
-      <p:sp>
-        <p:nvSpPr>
           <p:cNvPr id="15" name="Rectangle 14"/>
           <p:cNvSpPr/>
           <p:nvPr/>
         </p:nvSpPr>
         <p:spPr>
           <a:xfrm>
-            <a:off x="7404749" y="2622404"/>
+            <a:off x="7404749" y="2760251"/>
             <a:ext cx="1494797" cy="991056"/>
           </a:xfrm>
           <a:prstGeom prst="rect">
@@ -6912,15 +6871,15 @@
           <p:cNvPr id="17" name="Straight Arrow Connector 16"/>
           <p:cNvCxnSpPr>
             <a:cxnSpLocks/>
-            <a:stCxn id="20" idx="1"/>
-            <a:endCxn id="15" idx="0"/>
+            <a:stCxn id="20" idx="3"/>
+            <a:endCxn id="15" idx="1"/>
           </p:cNvCxnSpPr>
           <p:nvPr/>
         </p:nvCxnSpPr>
         <p:spPr>
           <a:xfrm>
-            <a:off x="5020076" y="2147290"/>
-            <a:ext cx="3132072" cy="475114"/>
+            <a:off x="6258426" y="2467887"/>
+            <a:ext cx="1146323" cy="787892"/>
           </a:xfrm>
           <a:prstGeom prst="straightConnector1">
             <a:avLst/>
@@ -6949,7 +6908,7 @@
           <p:cNvPr id="19" name="TextBox 18">
             <a:extLst>
               <a:ext uri="{FF2B5EF4-FFF2-40B4-BE49-F238E27FC236}">
-                <a16:creationId xmlns:a16="http://schemas.microsoft.com/office/drawing/2014/main" xmlns="" id="{E0BBD6C8-C8F2-40C5-AA64-85961A11ADC2}"/>
+                <a16:creationId xmlns:a16="http://schemas.microsoft.com/office/drawing/2014/main" id="{E0BBD6C8-C8F2-40C5-AA64-85961A11ADC2}"/>
               </a:ext>
             </a:extLst>
           </p:cNvPr>
@@ -6958,7 +6917,7 @@
         </p:nvSpPr>
         <p:spPr>
           <a:xfrm>
-            <a:off x="6717985" y="2200161"/>
+            <a:off x="6541895" y="2477333"/>
             <a:ext cx="728932" cy="276999"/>
           </a:xfrm>
           <a:prstGeom prst="rect">
@@ -6987,7 +6946,7 @@
         </p:nvSpPr>
         <p:spPr>
           <a:xfrm>
-            <a:off x="5020076" y="1651762"/>
+            <a:off x="4668504" y="1972359"/>
             <a:ext cx="1589922" cy="991056"/>
           </a:xfrm>
           <a:prstGeom prst="rect">
@@ -7038,15 +6997,15 @@
           <p:cNvPr id="22" name="Straight Arrow Connector 21"/>
           <p:cNvCxnSpPr>
             <a:cxnSpLocks/>
-            <a:stCxn id="20" idx="0"/>
+            <a:stCxn id="20" idx="1"/>
             <a:endCxn id="4" idx="3"/>
           </p:cNvCxnSpPr>
           <p:nvPr/>
         </p:nvCxnSpPr>
         <p:spPr>
           <a:xfrm flipH="1" flipV="1">
-            <a:off x="3338884" y="1011359"/>
-            <a:ext cx="2476153" cy="640403"/>
+            <a:off x="2496849" y="1250357"/>
+            <a:ext cx="2171655" cy="1217530"/>
           </a:xfrm>
           <a:prstGeom prst="straightConnector1">
             <a:avLst/>
@@ -7075,7 +7034,7 @@
           <p:cNvPr id="23" name="TextBox 22">
             <a:extLst>
               <a:ext uri="{FF2B5EF4-FFF2-40B4-BE49-F238E27FC236}">
-                <a16:creationId xmlns:a16="http://schemas.microsoft.com/office/drawing/2014/main" xmlns="" id="{E0BBD6C8-C8F2-40C5-AA64-85961A11ADC2}"/>
+                <a16:creationId xmlns:a16="http://schemas.microsoft.com/office/drawing/2014/main" id="{E0BBD6C8-C8F2-40C5-AA64-85961A11ADC2}"/>
               </a:ext>
             </a:extLst>
           </p:cNvPr>
@@ -7084,7 +7043,7 @@
         </p:nvSpPr>
         <p:spPr>
           <a:xfrm>
-            <a:off x="3910593" y="962561"/>
+            <a:off x="3112152" y="1408599"/>
             <a:ext cx="1063847" cy="276999"/>
           </a:xfrm>
           <a:prstGeom prst="rect">
@@ -7113,7 +7072,7 @@
         </p:nvSpPr>
         <p:spPr>
           <a:xfrm>
-            <a:off x="9318978" y="1618107"/>
+            <a:off x="7388720" y="294807"/>
             <a:ext cx="653404" cy="1018434"/>
           </a:xfrm>
           <a:prstGeom prst="flowChartMagneticDisk">
@@ -7162,8 +7121,8 @@
         </p:nvCxnSpPr>
         <p:spPr>
           <a:xfrm flipV="1">
-            <a:off x="6609998" y="2127324"/>
-            <a:ext cx="2708980" cy="19966"/>
+            <a:off x="6258426" y="804024"/>
+            <a:ext cx="1130294" cy="1663863"/>
           </a:xfrm>
           <a:prstGeom prst="straightConnector1">
             <a:avLst/>
@@ -7192,7 +7151,7 @@
           <p:cNvPr id="28" name="TextBox 27">
             <a:extLst>
               <a:ext uri="{FF2B5EF4-FFF2-40B4-BE49-F238E27FC236}">
-                <a16:creationId xmlns:a16="http://schemas.microsoft.com/office/drawing/2014/main" xmlns="" id="{E0BBD6C8-C8F2-40C5-AA64-85961A11ADC2}"/>
+                <a16:creationId xmlns:a16="http://schemas.microsoft.com/office/drawing/2014/main" id="{E0BBD6C8-C8F2-40C5-AA64-85961A11ADC2}"/>
               </a:ext>
             </a:extLst>
           </p:cNvPr>
@@ -7201,7 +7160,7 @@
         </p:nvSpPr>
         <p:spPr>
           <a:xfrm>
-            <a:off x="7289158" y="1867046"/>
+            <a:off x="6889602" y="1360525"/>
             <a:ext cx="728932" cy="276999"/>
           </a:xfrm>
           <a:prstGeom prst="rect">
@@ -7230,7 +7189,7 @@
         </p:nvSpPr>
         <p:spPr>
           <a:xfrm>
-            <a:off x="5067428" y="3851532"/>
+            <a:off x="4725206" y="3751959"/>
             <a:ext cx="1494797" cy="991056"/>
           </a:xfrm>
           <a:prstGeom prst="rect">
@@ -7286,9 +7245,9 @@
           <p:nvPr/>
         </p:nvCxnSpPr>
         <p:spPr>
-          <a:xfrm flipV="1">
-            <a:off x="5814827" y="2642818"/>
-            <a:ext cx="210" cy="1208714"/>
+          <a:xfrm flipH="1" flipV="1">
+            <a:off x="5463465" y="2963415"/>
+            <a:ext cx="9140" cy="788544"/>
           </a:xfrm>
           <a:prstGeom prst="straightConnector1">
             <a:avLst/>
@@ -7317,7 +7276,7 @@
           <p:cNvPr id="34" name="TextBox 33">
             <a:extLst>
               <a:ext uri="{FF2B5EF4-FFF2-40B4-BE49-F238E27FC236}">
-                <a16:creationId xmlns:a16="http://schemas.microsoft.com/office/drawing/2014/main" xmlns="" id="{E0BBD6C8-C8F2-40C5-AA64-85961A11ADC2}"/>
+                <a16:creationId xmlns:a16="http://schemas.microsoft.com/office/drawing/2014/main" id="{E0BBD6C8-C8F2-40C5-AA64-85961A11ADC2}"/>
               </a:ext>
             </a:extLst>
           </p:cNvPr>
@@ -7326,8 +7285,8 @@
         </p:nvSpPr>
         <p:spPr>
           <a:xfrm>
-            <a:off x="5838867" y="2685923"/>
-            <a:ext cx="1062021" cy="461665"/>
+            <a:off x="4944934" y="3108328"/>
+            <a:ext cx="538098" cy="276999"/>
           </a:xfrm>
           <a:prstGeom prst="rect">
             <a:avLst/>
@@ -7342,11 +7301,8 @@
           <a:p>
             <a:r>
               <a:rPr lang="en-US" sz="1200" dirty="0"/>
-              <a:t>contains</a:t>
-            </a:r>
-          </a:p>
-          <a:p>
-            <a:endParaRPr lang="en-US" sz="1200" dirty="0"/>
+              <a:t>uses</a:t>
+            </a:r>
           </a:p>
         </p:txBody>
       </p:sp>
@@ -7358,7 +7314,7 @@
         </p:nvSpPr>
         <p:spPr>
           <a:xfrm>
-            <a:off x="2389427" y="3425312"/>
+            <a:off x="949569" y="2293030"/>
             <a:ext cx="1998489" cy="657053"/>
           </a:xfrm>
           <a:prstGeom prst="rect">
@@ -7416,8 +7372,8 @@
         </p:nvCxnSpPr>
         <p:spPr>
           <a:xfrm flipH="1" flipV="1">
-            <a:off x="4387916" y="3753839"/>
-            <a:ext cx="679512" cy="593221"/>
+            <a:off x="2948058" y="2621557"/>
+            <a:ext cx="1777148" cy="1625930"/>
           </a:xfrm>
           <a:prstGeom prst="straightConnector1">
             <a:avLst/>
@@ -7446,7 +7402,7 @@
           <p:cNvPr id="38" name="TextBox 37">
             <a:extLst>
               <a:ext uri="{FF2B5EF4-FFF2-40B4-BE49-F238E27FC236}">
-                <a16:creationId xmlns:a16="http://schemas.microsoft.com/office/drawing/2014/main" xmlns="" id="{E0BBD6C8-C8F2-40C5-AA64-85961A11ADC2}"/>
+                <a16:creationId xmlns:a16="http://schemas.microsoft.com/office/drawing/2014/main" id="{E0BBD6C8-C8F2-40C5-AA64-85961A11ADC2}"/>
               </a:ext>
             </a:extLst>
           </p:cNvPr>
@@ -7455,7 +7411,7 @@
         </p:nvSpPr>
         <p:spPr>
           <a:xfrm>
-            <a:off x="4382601" y="3999476"/>
+            <a:off x="3673623" y="3721656"/>
             <a:ext cx="728932" cy="276999"/>
           </a:xfrm>
           <a:prstGeom prst="rect">
@@ -7484,7 +7440,7 @@
         </p:nvSpPr>
         <p:spPr>
           <a:xfrm>
-            <a:off x="7289158" y="248504"/>
+            <a:off x="4550736" y="360554"/>
             <a:ext cx="1822194" cy="991056"/>
           </a:xfrm>
           <a:prstGeom prst="rect">
@@ -7542,15 +7498,15 @@
           <p:cNvPr id="41" name="Straight Arrow Connector 40"/>
           <p:cNvCxnSpPr>
             <a:cxnSpLocks/>
-            <a:stCxn id="20" idx="3"/>
-            <a:endCxn id="39" idx="1"/>
+            <a:stCxn id="20" idx="0"/>
+            <a:endCxn id="39" idx="2"/>
           </p:cNvCxnSpPr>
           <p:nvPr/>
         </p:nvCxnSpPr>
         <p:spPr>
-          <a:xfrm flipV="1">
-            <a:off x="6609998" y="744032"/>
-            <a:ext cx="679160" cy="1403258"/>
+          <a:xfrm flipH="1" flipV="1">
+            <a:off x="5461833" y="1351610"/>
+            <a:ext cx="1632" cy="620749"/>
           </a:xfrm>
           <a:prstGeom prst="straightConnector1">
             <a:avLst/>
@@ -7578,15 +7534,16 @@
         <p:nvCxnSpPr>
           <p:cNvPr id="43" name="Straight Arrow Connector 42"/>
           <p:cNvCxnSpPr>
-            <a:stCxn id="39" idx="2"/>
-            <a:endCxn id="25" idx="1"/>
+            <a:cxnSpLocks/>
+            <a:stCxn id="39" idx="3"/>
+            <a:endCxn id="25" idx="2"/>
           </p:cNvCxnSpPr>
           <p:nvPr/>
         </p:nvCxnSpPr>
         <p:spPr>
-          <a:xfrm>
-            <a:off x="8200255" y="1239560"/>
-            <a:ext cx="1445425" cy="378547"/>
+          <a:xfrm flipV="1">
+            <a:off x="6372930" y="804024"/>
+            <a:ext cx="1015790" cy="52058"/>
           </a:xfrm>
           <a:prstGeom prst="straightConnector1">
             <a:avLst/>
@@ -7615,7 +7572,7 @@
           <p:cNvPr id="44" name="TextBox 43">
             <a:extLst>
               <a:ext uri="{FF2B5EF4-FFF2-40B4-BE49-F238E27FC236}">
-                <a16:creationId xmlns:a16="http://schemas.microsoft.com/office/drawing/2014/main" xmlns="" id="{E0BBD6C8-C8F2-40C5-AA64-85961A11ADC2}"/>
+                <a16:creationId xmlns:a16="http://schemas.microsoft.com/office/drawing/2014/main" id="{E0BBD6C8-C8F2-40C5-AA64-85961A11ADC2}"/>
               </a:ext>
             </a:extLst>
           </p:cNvPr>
@@ -7624,7 +7581,7 @@
         </p:nvSpPr>
         <p:spPr>
           <a:xfrm>
-            <a:off x="6464458" y="1135063"/>
+            <a:off x="5450658" y="1491310"/>
             <a:ext cx="728932" cy="276999"/>
           </a:xfrm>
           <a:prstGeom prst="rect">
@@ -7650,7 +7607,7 @@
           <p:cNvPr id="45" name="TextBox 44">
             <a:extLst>
               <a:ext uri="{FF2B5EF4-FFF2-40B4-BE49-F238E27FC236}">
-                <a16:creationId xmlns:a16="http://schemas.microsoft.com/office/drawing/2014/main" xmlns="" id="{E0BBD6C8-C8F2-40C5-AA64-85961A11ADC2}"/>
+                <a16:creationId xmlns:a16="http://schemas.microsoft.com/office/drawing/2014/main" id="{E0BBD6C8-C8F2-40C5-AA64-85961A11ADC2}"/>
               </a:ext>
             </a:extLst>
           </p:cNvPr>
@@ -7659,7 +7616,7 @@
         </p:nvSpPr>
         <p:spPr>
           <a:xfrm>
-            <a:off x="9073102" y="1135062"/>
+            <a:off x="6609788" y="417761"/>
             <a:ext cx="864099" cy="276999"/>
           </a:xfrm>
           <a:prstGeom prst="rect">
@@ -7685,7 +7642,7 @@
           <p:cNvPr id="26" name="TextBox 25">
             <a:extLst>
               <a:ext uri="{FF2B5EF4-FFF2-40B4-BE49-F238E27FC236}">
-                <a16:creationId xmlns:a16="http://schemas.microsoft.com/office/drawing/2014/main" xmlns="" id="{6C45E26E-8FEE-4439-A34B-789237C9C62C}"/>
+                <a16:creationId xmlns:a16="http://schemas.microsoft.com/office/drawing/2014/main" id="{6C45E26E-8FEE-4439-A34B-789237C9C62C}"/>
               </a:ext>
             </a:extLst>
           </p:cNvPr>
@@ -7694,7 +7651,7 @@
         </p:nvSpPr>
         <p:spPr>
           <a:xfrm>
-            <a:off x="0" y="-59298"/>
+            <a:off x="0" y="30549"/>
             <a:ext cx="4675518" cy="369332"/>
           </a:xfrm>
           <a:prstGeom prst="rect">
@@ -7720,7 +7677,7 @@
           <p:cNvPr id="31" name="Rectangle 30">
             <a:extLst>
               <a:ext uri="{FF2B5EF4-FFF2-40B4-BE49-F238E27FC236}">
-                <a16:creationId xmlns:a16="http://schemas.microsoft.com/office/drawing/2014/main" xmlns="" id="{6D396BFC-10E0-4935-903B-EDC457BD1755}"/>
+                <a16:creationId xmlns:a16="http://schemas.microsoft.com/office/drawing/2014/main" id="{6D396BFC-10E0-4935-903B-EDC457BD1755}"/>
               </a:ext>
             </a:extLst>
           </p:cNvPr>
@@ -7729,7 +7686,7 @@
         </p:nvSpPr>
         <p:spPr>
           <a:xfrm>
-            <a:off x="2337759" y="4542883"/>
+            <a:off x="897901" y="3410601"/>
             <a:ext cx="1621682" cy="657053"/>
           </a:xfrm>
           <a:prstGeom prst="rect">
@@ -7780,7 +7737,7 @@
           <p:cNvPr id="32" name="Rectangle 31">
             <a:extLst>
               <a:ext uri="{FF2B5EF4-FFF2-40B4-BE49-F238E27FC236}">
-                <a16:creationId xmlns:a16="http://schemas.microsoft.com/office/drawing/2014/main" xmlns="" id="{02A645C8-F11F-438D-92DC-F6FCCA5ECFB8}"/>
+                <a16:creationId xmlns:a16="http://schemas.microsoft.com/office/drawing/2014/main" id="{02A645C8-F11F-438D-92DC-F6FCCA5ECFB8}"/>
               </a:ext>
             </a:extLst>
           </p:cNvPr>
@@ -7789,7 +7746,7 @@
         </p:nvSpPr>
         <p:spPr>
           <a:xfrm>
-            <a:off x="2741933" y="5738847"/>
+            <a:off x="1302075" y="4606565"/>
             <a:ext cx="2048896" cy="657053"/>
           </a:xfrm>
           <a:prstGeom prst="rect">
@@ -7840,7 +7797,7 @@
           <p:cNvPr id="12" name="Straight Arrow Connector 11">
             <a:extLst>
               <a:ext uri="{FF2B5EF4-FFF2-40B4-BE49-F238E27FC236}">
-                <a16:creationId xmlns:a16="http://schemas.microsoft.com/office/drawing/2014/main" xmlns="" id="{FF2076CA-F897-4293-B6CD-7408EB452156}"/>
+                <a16:creationId xmlns:a16="http://schemas.microsoft.com/office/drawing/2014/main" id="{FF2076CA-F897-4293-B6CD-7408EB452156}"/>
               </a:ext>
             </a:extLst>
           </p:cNvPr>
@@ -7852,9 +7809,9 @@
           <p:nvPr/>
         </p:nvCxnSpPr>
         <p:spPr>
-          <a:xfrm flipH="1">
-            <a:off x="3959441" y="4347060"/>
-            <a:ext cx="1107987" cy="524350"/>
+          <a:xfrm flipH="1" flipV="1">
+            <a:off x="2519583" y="3739128"/>
+            <a:ext cx="2205623" cy="508359"/>
           </a:xfrm>
           <a:prstGeom prst="straightConnector1">
             <a:avLst/>
@@ -7883,7 +7840,7 @@
           <p:cNvPr id="14" name="Straight Arrow Connector 13">
             <a:extLst>
               <a:ext uri="{FF2B5EF4-FFF2-40B4-BE49-F238E27FC236}">
-                <a16:creationId xmlns:a16="http://schemas.microsoft.com/office/drawing/2014/main" xmlns="" id="{5C625B7B-4A1E-46C5-9082-4FEC89B30DA9}"/>
+                <a16:creationId xmlns:a16="http://schemas.microsoft.com/office/drawing/2014/main" id="{5C625B7B-4A1E-46C5-9082-4FEC89B30DA9}"/>
               </a:ext>
             </a:extLst>
           </p:cNvPr>
@@ -7896,8 +7853,8 @@
         </p:nvCxnSpPr>
         <p:spPr>
           <a:xfrm flipH="1">
-            <a:off x="3766381" y="4347060"/>
-            <a:ext cx="1301047" cy="1391787"/>
+            <a:off x="2326523" y="4247487"/>
+            <a:ext cx="2398683" cy="359078"/>
           </a:xfrm>
           <a:prstGeom prst="straightConnector1">
             <a:avLst/>
@@ -7926,7 +7883,7 @@
           <p:cNvPr id="65" name="Straight Arrow Connector 64">
             <a:extLst>
               <a:ext uri="{FF2B5EF4-FFF2-40B4-BE49-F238E27FC236}">
-                <a16:creationId xmlns:a16="http://schemas.microsoft.com/office/drawing/2014/main" xmlns="" id="{C1C9B843-1D11-4D9F-8CBF-AE00E90AA070}"/>
+                <a16:creationId xmlns:a16="http://schemas.microsoft.com/office/drawing/2014/main" id="{C1C9B843-1D11-4D9F-8CBF-AE00E90AA070}"/>
               </a:ext>
             </a:extLst>
           </p:cNvPr>
@@ -7938,8 +7895,8 @@
         </p:nvCxnSpPr>
         <p:spPr>
           <a:xfrm flipH="1">
-            <a:off x="6609998" y="2127324"/>
-            <a:ext cx="2708980" cy="19966"/>
+            <a:off x="6258426" y="804024"/>
+            <a:ext cx="1130294" cy="1663863"/>
           </a:xfrm>
           <a:prstGeom prst="straightConnector1">
             <a:avLst/>
@@ -7968,7 +7925,7 @@
           <p:cNvPr id="66" name="TextBox 65">
             <a:extLst>
               <a:ext uri="{FF2B5EF4-FFF2-40B4-BE49-F238E27FC236}">
-                <a16:creationId xmlns:a16="http://schemas.microsoft.com/office/drawing/2014/main" xmlns="" id="{5E4B2700-0522-40EF-B035-166AA1C17D76}"/>
+                <a16:creationId xmlns:a16="http://schemas.microsoft.com/office/drawing/2014/main" id="{5E4B2700-0522-40EF-B035-166AA1C17D76}"/>
               </a:ext>
             </a:extLst>
           </p:cNvPr>
@@ -7977,7 +7934,7 @@
         </p:nvSpPr>
         <p:spPr>
           <a:xfrm>
-            <a:off x="2013001" y="3069920"/>
+            <a:off x="7934122" y="1839196"/>
             <a:ext cx="728932" cy="276999"/>
           </a:xfrm>
           <a:prstGeom prst="rect">
@@ -8006,7 +7963,7 @@
         </p:nvSpPr>
         <p:spPr>
           <a:xfrm>
-            <a:off x="5026286" y="5546532"/>
+            <a:off x="4743028" y="5213271"/>
             <a:ext cx="1494797" cy="991056"/>
           </a:xfrm>
           <a:prstGeom prst="rect">
@@ -8057,7 +8014,7 @@
           <p:cNvPr id="40" name="TextBox 39">
             <a:extLst>
               <a:ext uri="{FF2B5EF4-FFF2-40B4-BE49-F238E27FC236}">
-                <a16:creationId xmlns:a16="http://schemas.microsoft.com/office/drawing/2014/main" xmlns="" id="{E0BBD6C8-C8F2-40C5-AA64-85961A11ADC2}"/>
+                <a16:creationId xmlns:a16="http://schemas.microsoft.com/office/drawing/2014/main" id="{E0BBD6C8-C8F2-40C5-AA64-85961A11ADC2}"/>
               </a:ext>
             </a:extLst>
           </p:cNvPr>
@@ -8066,7 +8023,7 @@
         </p:nvSpPr>
         <p:spPr>
           <a:xfrm>
-            <a:off x="6945158" y="5232046"/>
+            <a:off x="6348941" y="5022915"/>
             <a:ext cx="728932" cy="276999"/>
           </a:xfrm>
           <a:prstGeom prst="rect">
@@ -8095,7 +8052,7 @@
         </p:nvSpPr>
         <p:spPr>
           <a:xfrm>
-            <a:off x="8331609" y="4203504"/>
+            <a:off x="7302262" y="4272562"/>
             <a:ext cx="1678916" cy="991056"/>
           </a:xfrm>
           <a:prstGeom prst="rect">
@@ -8129,15 +8086,14 @@
           <a:p>
             <a:pPr algn="ctr"/>
             <a:r>
-              <a:rPr lang="en-US" sz="1000" dirty="0" smtClean="0"/>
+              <a:rPr lang="en-US" sz="1000" dirty="0"/>
               <a:t>com.tlw8253.controller</a:t>
             </a:r>
-            <a:endParaRPr lang="en-US" sz="1000" dirty="0"/>
-          </a:p>
-          <a:p>
-            <a:pPr algn="ctr"/>
-            <a:r>
-              <a:rPr lang="en-US" dirty="0" err="1" smtClean="0"/>
+          </a:p>
+          <a:p>
+            <a:pPr algn="ctr"/>
+            <a:r>
+              <a:rPr lang="en-US" dirty="0" err="1"/>
               <a:t>ClientController</a:t>
             </a:r>
             <a:endParaRPr lang="en-US" dirty="0"/>
@@ -8155,8 +8111,8 @@
         </p:nvCxnSpPr>
         <p:spPr>
           <a:xfrm flipH="1" flipV="1">
-            <a:off x="6562225" y="4347060"/>
-            <a:ext cx="1769384" cy="351972"/>
+            <a:off x="6220003" y="4247487"/>
+            <a:ext cx="1082259" cy="520603"/>
           </a:xfrm>
           <a:prstGeom prst="straightConnector1">
             <a:avLst/>
@@ -8185,7 +8141,7 @@
           <p:cNvPr id="48" name="TextBox 47">
             <a:extLst>
               <a:ext uri="{FF2B5EF4-FFF2-40B4-BE49-F238E27FC236}">
-                <a16:creationId xmlns:a16="http://schemas.microsoft.com/office/drawing/2014/main" xmlns="" id="{E0BBD6C8-C8F2-40C5-AA64-85961A11ADC2}"/>
+                <a16:creationId xmlns:a16="http://schemas.microsoft.com/office/drawing/2014/main" id="{E0BBD6C8-C8F2-40C5-AA64-85961A11ADC2}"/>
               </a:ext>
             </a:extLst>
           </p:cNvPr>
@@ -8194,8 +8150,8 @@
         </p:nvSpPr>
         <p:spPr>
           <a:xfrm>
-            <a:off x="6737471" y="4395029"/>
-            <a:ext cx="1062021" cy="461665"/>
+            <a:off x="6316885" y="4108988"/>
+            <a:ext cx="1062021" cy="276999"/>
           </a:xfrm>
           <a:prstGeom prst="rect">
             <a:avLst/>
@@ -8209,16 +8165,9 @@
           <a:lstStyle/>
           <a:p>
             <a:r>
-              <a:rPr lang="en-US" sz="1200" dirty="0" smtClean="0"/>
-              <a:t>contains</a:t>
-            </a:r>
-          </a:p>
-          <a:p>
-            <a:r>
-              <a:rPr lang="en-US" sz="1200" dirty="0" smtClean="0"/>
+              <a:rPr lang="en-US" sz="1200" dirty="0"/>
               <a:t>controls</a:t>
             </a:r>
-            <a:endParaRPr lang="en-US" sz="1200" dirty="0"/>
           </a:p>
         </p:txBody>
       </p:sp>
@@ -8227,7 +8176,7 @@
           <p:cNvPr id="52" name="Rectangle 51">
             <a:extLst>
               <a:ext uri="{FF2B5EF4-FFF2-40B4-BE49-F238E27FC236}">
-                <a16:creationId xmlns:a16="http://schemas.microsoft.com/office/drawing/2014/main" xmlns="" id="{21B869D6-66CB-4B38-975F-B7FEB6AA9B13}"/>
+                <a16:creationId xmlns:a16="http://schemas.microsoft.com/office/drawing/2014/main" id="{21B869D6-66CB-4B38-975F-B7FEB6AA9B13}"/>
               </a:ext>
             </a:extLst>
           </p:cNvPr>
@@ -8236,7 +8185,7 @@
         </p:nvSpPr>
         <p:spPr>
           <a:xfrm>
-            <a:off x="7748867" y="6138579"/>
+            <a:off x="6713407" y="6274732"/>
             <a:ext cx="2844400" cy="224286"/>
           </a:xfrm>
           <a:prstGeom prst="rect">
@@ -8266,13 +8215,8 @@
             <a:pPr algn="ctr"/>
             <a:r>
               <a:rPr lang="en-US" dirty="0"/>
-              <a:t>HTTP </a:t>
-            </a:r>
-            <a:r>
-              <a:rPr lang="en-US" dirty="0" smtClean="0"/>
-              <a:t>Request / Response</a:t>
-            </a:r>
-            <a:endParaRPr lang="en-US" dirty="0"/>
+              <a:t>HTTP Request / Response</a:t>
+            </a:r>
           </a:p>
         </p:txBody>
       </p:sp>
@@ -8286,9 +8230,9 @@
           <p:nvPr/>
         </p:nvCxnSpPr>
         <p:spPr>
-          <a:xfrm>
-            <a:off x="9171067" y="5194560"/>
-            <a:ext cx="0" cy="944019"/>
+          <a:xfrm flipH="1">
+            <a:off x="8135607" y="5263618"/>
+            <a:ext cx="6113" cy="1011114"/>
           </a:xfrm>
           <a:prstGeom prst="straightConnector1">
             <a:avLst/>
@@ -8323,8 +8267,8 @@
         </p:nvCxnSpPr>
         <p:spPr>
           <a:xfrm flipV="1">
-            <a:off x="9171067" y="5194560"/>
-            <a:ext cx="0" cy="944019"/>
+            <a:off x="8135607" y="5263618"/>
+            <a:ext cx="6113" cy="1011114"/>
           </a:xfrm>
           <a:prstGeom prst="straightConnector1">
             <a:avLst/>
@@ -8353,7 +8297,7 @@
           <p:cNvPr id="58" name="TextBox 57">
             <a:extLst>
               <a:ext uri="{FF2B5EF4-FFF2-40B4-BE49-F238E27FC236}">
-                <a16:creationId xmlns:a16="http://schemas.microsoft.com/office/drawing/2014/main" xmlns="" id="{E0BBD6C8-C8F2-40C5-AA64-85961A11ADC2}"/>
+                <a16:creationId xmlns:a16="http://schemas.microsoft.com/office/drawing/2014/main" id="{E0BBD6C8-C8F2-40C5-AA64-85961A11ADC2}"/>
               </a:ext>
             </a:extLst>
           </p:cNvPr>
@@ -8362,7 +8306,7 @@
         </p:nvSpPr>
         <p:spPr>
           <a:xfrm>
-            <a:off x="9171067" y="5480936"/>
+            <a:off x="8162483" y="5615842"/>
             <a:ext cx="1063847" cy="276999"/>
           </a:xfrm>
           <a:prstGeom prst="rect">
@@ -8377,134 +8321,8 @@
           <a:lstStyle/>
           <a:p>
             <a:r>
-              <a:rPr lang="en-US" sz="1200" dirty="0" smtClean="0"/>
+              <a:rPr lang="en-US" sz="1200" dirty="0"/>
               <a:t>processes</a:t>
-            </a:r>
-            <a:endParaRPr lang="en-US" sz="1200" dirty="0"/>
-          </a:p>
-        </p:txBody>
-      </p:sp>
-      <p:sp>
-        <p:nvSpPr>
-          <p:cNvPr id="49" name="Rectangle 48"/>
-          <p:cNvSpPr/>
-          <p:nvPr/>
-        </p:nvSpPr>
-        <p:spPr>
-          <a:xfrm>
-            <a:off x="1218040" y="1666279"/>
-            <a:ext cx="1589922" cy="991056"/>
-          </a:xfrm>
-          <a:prstGeom prst="rect">
-            <a:avLst/>
-          </a:prstGeom>
-          <a:solidFill>
-            <a:schemeClr val="accent6"/>
-          </a:solidFill>
-        </p:spPr>
-        <p:style>
-          <a:lnRef idx="2">
-            <a:schemeClr val="accent1">
-              <a:shade val="50000"/>
-            </a:schemeClr>
-          </a:lnRef>
-          <a:fillRef idx="1">
-            <a:schemeClr val="accent1"/>
-          </a:fillRef>
-          <a:effectRef idx="0">
-            <a:schemeClr val="accent1"/>
-          </a:effectRef>
-          <a:fontRef idx="minor">
-            <a:schemeClr val="lt1"/>
-          </a:fontRef>
-        </p:style>
-        <p:txBody>
-          <a:bodyPr rtlCol="0" anchor="ctr"/>
-          <a:lstStyle/>
-          <a:p>
-            <a:pPr algn="ctr"/>
-            <a:r>
-              <a:rPr lang="en-US" sz="1000" dirty="0"/>
-              <a:t>com.tlw8253.dao</a:t>
-            </a:r>
-          </a:p>
-          <a:p>
-            <a:pPr algn="ctr"/>
-            <a:r>
-              <a:rPr lang="en-US" sz="1500" dirty="0" err="1"/>
-              <a:t>AccountDAOImpl</a:t>
-            </a:r>
-            <a:endParaRPr lang="en-US" sz="1500" dirty="0"/>
-          </a:p>
-        </p:txBody>
-      </p:sp>
-      <p:cxnSp>
-        <p:nvCxnSpPr>
-          <p:cNvPr id="7" name="Straight Arrow Connector 6"/>
-          <p:cNvCxnSpPr>
-            <a:stCxn id="20" idx="1"/>
-            <a:endCxn id="49" idx="3"/>
-          </p:cNvCxnSpPr>
-          <p:nvPr/>
-        </p:nvCxnSpPr>
-        <p:spPr>
-          <a:xfrm flipH="1">
-            <a:off x="2807962" y="2147290"/>
-            <a:ext cx="2212114" cy="14517"/>
-          </a:xfrm>
-          <a:prstGeom prst="straightConnector1">
-            <a:avLst/>
-          </a:prstGeom>
-          <a:ln>
-            <a:tailEnd type="triangle"/>
-          </a:ln>
-        </p:spPr>
-        <p:style>
-          <a:lnRef idx="1">
-            <a:schemeClr val="accent1"/>
-          </a:lnRef>
-          <a:fillRef idx="0">
-            <a:schemeClr val="accent1"/>
-          </a:fillRef>
-          <a:effectRef idx="0">
-            <a:schemeClr val="accent1"/>
-          </a:effectRef>
-          <a:fontRef idx="minor">
-            <a:schemeClr val="tx1"/>
-          </a:fontRef>
-        </p:style>
-      </p:cxnSp>
-      <p:sp>
-        <p:nvSpPr>
-          <p:cNvPr id="50" name="TextBox 49">
-            <a:extLst>
-              <a:ext uri="{FF2B5EF4-FFF2-40B4-BE49-F238E27FC236}">
-                <a16:creationId xmlns:a16="http://schemas.microsoft.com/office/drawing/2014/main" xmlns="" id="{E0BBD6C8-C8F2-40C5-AA64-85961A11ADC2}"/>
-              </a:ext>
-            </a:extLst>
-          </p:cNvPr>
-          <p:cNvSpPr txBox="1"/>
-          <p:nvPr/>
-        </p:nvSpPr>
-        <p:spPr>
-          <a:xfrm>
-            <a:off x="4002206" y="1879944"/>
-            <a:ext cx="728932" cy="276999"/>
-          </a:xfrm>
-          <a:prstGeom prst="rect">
-            <a:avLst/>
-          </a:prstGeom>
-          <a:noFill/>
-        </p:spPr>
-        <p:txBody>
-          <a:bodyPr wrap="square" rtlCol="0">
-            <a:spAutoFit/>
-          </a:bodyPr>
-          <a:lstStyle/>
-          <a:p>
-            <a:r>
-              <a:rPr lang="en-US" sz="1200" dirty="0"/>
-              <a:t>uses</a:t>
             </a:r>
           </a:p>
         </p:txBody>
@@ -8513,15 +8331,16 @@
         <p:nvCxnSpPr>
           <p:cNvPr id="91" name="Straight Arrow Connector 90"/>
           <p:cNvCxnSpPr>
-            <a:stCxn id="29" idx="0"/>
+            <a:cxnSpLocks/>
+            <a:stCxn id="29" idx="3"/>
             <a:endCxn id="15" idx="1"/>
           </p:cNvCxnSpPr>
           <p:nvPr/>
         </p:nvCxnSpPr>
         <p:spPr>
           <a:xfrm flipV="1">
-            <a:off x="5814827" y="3117932"/>
-            <a:ext cx="1589922" cy="733600"/>
+            <a:off x="6220003" y="3255779"/>
+            <a:ext cx="1184746" cy="991708"/>
           </a:xfrm>
           <a:prstGeom prst="straightConnector1">
             <a:avLst/>
@@ -8555,9 +8374,9 @@
           <p:nvPr/>
         </p:nvCxnSpPr>
         <p:spPr>
-          <a:xfrm flipH="1" flipV="1">
-            <a:off x="8152148" y="3613460"/>
-            <a:ext cx="1018919" cy="590044"/>
+          <a:xfrm flipV="1">
+            <a:off x="8141720" y="3751307"/>
+            <a:ext cx="10428" cy="521255"/>
           </a:xfrm>
           <a:prstGeom prst="straightConnector1">
             <a:avLst/>
@@ -8586,7 +8405,7 @@
           <p:cNvPr id="94" name="TextBox 93">
             <a:extLst>
               <a:ext uri="{FF2B5EF4-FFF2-40B4-BE49-F238E27FC236}">
-                <a16:creationId xmlns:a16="http://schemas.microsoft.com/office/drawing/2014/main" xmlns="" id="{E0BBD6C8-C8F2-40C5-AA64-85961A11ADC2}"/>
+                <a16:creationId xmlns:a16="http://schemas.microsoft.com/office/drawing/2014/main" id="{E0BBD6C8-C8F2-40C5-AA64-85961A11ADC2}"/>
               </a:ext>
             </a:extLst>
           </p:cNvPr>
@@ -8595,7 +8414,7 @@
         </p:nvSpPr>
         <p:spPr>
           <a:xfrm>
-            <a:off x="8861864" y="3761336"/>
+            <a:off x="8121633" y="3766672"/>
             <a:ext cx="728932" cy="276999"/>
           </a:xfrm>
           <a:prstGeom prst="rect">
@@ -8621,7 +8440,7 @@
           <p:cNvPr id="95" name="TextBox 94">
             <a:extLst>
               <a:ext uri="{FF2B5EF4-FFF2-40B4-BE49-F238E27FC236}">
-                <a16:creationId xmlns:a16="http://schemas.microsoft.com/office/drawing/2014/main" xmlns="" id="{E0BBD6C8-C8F2-40C5-AA64-85961A11ADC2}"/>
+                <a16:creationId xmlns:a16="http://schemas.microsoft.com/office/drawing/2014/main" id="{E0BBD6C8-C8F2-40C5-AA64-85961A11ADC2}"/>
               </a:ext>
             </a:extLst>
           </p:cNvPr>
@@ -8662,8 +8481,8 @@
         </p:nvCxnSpPr>
         <p:spPr>
           <a:xfrm flipH="1">
-            <a:off x="6521083" y="4699032"/>
-            <a:ext cx="1810526" cy="1343028"/>
+            <a:off x="6237825" y="4768090"/>
+            <a:ext cx="1064437" cy="940709"/>
           </a:xfrm>
           <a:prstGeom prst="straightConnector1">
             <a:avLst/>
@@ -8687,6 +8506,155 @@
           </a:fontRef>
         </p:style>
       </p:cxnSp>
+      <p:sp>
+        <p:nvSpPr>
+          <p:cNvPr id="53" name="Rectangle 52">
+            <a:extLst>
+              <a:ext uri="{FF2B5EF4-FFF2-40B4-BE49-F238E27FC236}">
+                <a16:creationId xmlns:a16="http://schemas.microsoft.com/office/drawing/2014/main" id="{6C40FF0E-1998-4874-BE17-1A4E9B40553E}"/>
+              </a:ext>
+            </a:extLst>
+          </p:cNvPr>
+          <p:cNvSpPr/>
+          <p:nvPr/>
+        </p:nvSpPr>
+        <p:spPr>
+          <a:xfrm>
+            <a:off x="10014074" y="2905037"/>
+            <a:ext cx="1494797" cy="991056"/>
+          </a:xfrm>
+          <a:prstGeom prst="rect">
+            <a:avLst/>
+          </a:prstGeom>
+          <a:solidFill>
+            <a:schemeClr val="accent6"/>
+          </a:solidFill>
+        </p:spPr>
+        <p:style>
+          <a:lnRef idx="2">
+            <a:schemeClr val="accent1">
+              <a:shade val="50000"/>
+            </a:schemeClr>
+          </a:lnRef>
+          <a:fillRef idx="1">
+            <a:schemeClr val="accent1"/>
+          </a:fillRef>
+          <a:effectRef idx="0">
+            <a:schemeClr val="accent1"/>
+          </a:effectRef>
+          <a:fontRef idx="minor">
+            <a:schemeClr val="lt1"/>
+          </a:fontRef>
+        </p:style>
+        <p:txBody>
+          <a:bodyPr rtlCol="0" anchor="ctr"/>
+          <a:lstStyle/>
+          <a:p>
+            <a:pPr algn="ctr"/>
+            <a:r>
+              <a:rPr lang="en-US" sz="1000" dirty="0"/>
+              <a:t>com.tlw8253.model</a:t>
+            </a:r>
+          </a:p>
+          <a:p>
+            <a:pPr algn="ctr"/>
+            <a:r>
+              <a:rPr lang="en-US" sz="1200" dirty="0"/>
+              <a:t>Model</a:t>
+            </a:r>
+          </a:p>
+          <a:p>
+            <a:pPr algn="ctr"/>
+            <a:r>
+              <a:rPr lang="en-US" dirty="0"/>
+              <a:t>Account</a:t>
+            </a:r>
+          </a:p>
+        </p:txBody>
+      </p:sp>
+      <p:cxnSp>
+        <p:nvCxnSpPr>
+          <p:cNvPr id="8" name="Straight Arrow Connector 7">
+            <a:extLst>
+              <a:ext uri="{FF2B5EF4-FFF2-40B4-BE49-F238E27FC236}">
+                <a16:creationId xmlns:a16="http://schemas.microsoft.com/office/drawing/2014/main" id="{ADE97499-DD4F-4E76-9405-EEDBB792874E}"/>
+              </a:ext>
+            </a:extLst>
+          </p:cNvPr>
+          <p:cNvCxnSpPr>
+            <a:stCxn id="5" idx="2"/>
+            <a:endCxn id="53" idx="0"/>
+          </p:cNvCxnSpPr>
+          <p:nvPr/>
+        </p:nvCxnSpPr>
+        <p:spPr>
+          <a:xfrm>
+            <a:off x="9726041" y="2127323"/>
+            <a:ext cx="1035432" cy="777714"/>
+          </a:xfrm>
+          <a:prstGeom prst="straightConnector1">
+            <a:avLst/>
+          </a:prstGeom>
+          <a:ln>
+            <a:tailEnd type="triangle"/>
+          </a:ln>
+        </p:spPr>
+        <p:style>
+          <a:lnRef idx="1">
+            <a:schemeClr val="accent1"/>
+          </a:lnRef>
+          <a:fillRef idx="0">
+            <a:schemeClr val="accent1"/>
+          </a:fillRef>
+          <a:effectRef idx="0">
+            <a:schemeClr val="accent1"/>
+          </a:effectRef>
+          <a:fontRef idx="minor">
+            <a:schemeClr val="tx1"/>
+          </a:fontRef>
+        </p:style>
+      </p:cxnSp>
+      <p:sp>
+        <p:nvSpPr>
+          <p:cNvPr id="54" name="TextBox 53">
+            <a:extLst>
+              <a:ext uri="{FF2B5EF4-FFF2-40B4-BE49-F238E27FC236}">
+                <a16:creationId xmlns:a16="http://schemas.microsoft.com/office/drawing/2014/main" id="{342D31C0-1790-4E50-9650-E15403FD6F1F}"/>
+              </a:ext>
+            </a:extLst>
+          </p:cNvPr>
+          <p:cNvSpPr txBox="1"/>
+          <p:nvPr/>
+        </p:nvSpPr>
+        <p:spPr>
+          <a:xfrm>
+            <a:off x="10334302" y="2146672"/>
+            <a:ext cx="728932" cy="461665"/>
+          </a:xfrm>
+          <a:prstGeom prst="rect">
+            <a:avLst/>
+          </a:prstGeom>
+          <a:noFill/>
+        </p:spPr>
+        <p:txBody>
+          <a:bodyPr wrap="square" rtlCol="0">
+            <a:spAutoFit/>
+          </a:bodyPr>
+          <a:lstStyle/>
+          <a:p>
+            <a:r>
+              <a:rPr lang="en-US" sz="1200" dirty="0"/>
+              <a:t>stores</a:t>
+            </a:r>
+          </a:p>
+          <a:p>
+            <a:r>
+              <a:rPr lang="en-US" sz="1200" dirty="0"/>
+              <a:t>List&lt;&gt;</a:t>
+            </a:r>
+          </a:p>
+        </p:txBody>
+      </p:sp>
     </p:spTree>
     <p:extLst>
       <p:ext uri="{BB962C8B-B14F-4D97-AF65-F5344CB8AC3E}">
@@ -8890,7 +8858,7 @@
           <p:cNvPr id="11" name="TextBox 10">
             <a:extLst>
               <a:ext uri="{FF2B5EF4-FFF2-40B4-BE49-F238E27FC236}">
-                <a16:creationId xmlns:a16="http://schemas.microsoft.com/office/drawing/2014/main" xmlns="" id="{E0BBD6C8-C8F2-40C5-AA64-85961A11ADC2}"/>
+                <a16:creationId xmlns:a16="http://schemas.microsoft.com/office/drawing/2014/main" id="{E0BBD6C8-C8F2-40C5-AA64-85961A11ADC2}"/>
               </a:ext>
             </a:extLst>
           </p:cNvPr>
@@ -9044,7 +9012,7 @@
           <p:cNvPr id="19" name="TextBox 18">
             <a:extLst>
               <a:ext uri="{FF2B5EF4-FFF2-40B4-BE49-F238E27FC236}">
-                <a16:creationId xmlns:a16="http://schemas.microsoft.com/office/drawing/2014/main" xmlns="" id="{E0BBD6C8-C8F2-40C5-AA64-85961A11ADC2}"/>
+                <a16:creationId xmlns:a16="http://schemas.microsoft.com/office/drawing/2014/main" id="{E0BBD6C8-C8F2-40C5-AA64-85961A11ADC2}"/>
               </a:ext>
             </a:extLst>
           </p:cNvPr>
@@ -9174,7 +9142,7 @@
           <p:cNvPr id="23" name="TextBox 22">
             <a:extLst>
               <a:ext uri="{FF2B5EF4-FFF2-40B4-BE49-F238E27FC236}">
-                <a16:creationId xmlns:a16="http://schemas.microsoft.com/office/drawing/2014/main" xmlns="" id="{E0BBD6C8-C8F2-40C5-AA64-85961A11ADC2}"/>
+                <a16:creationId xmlns:a16="http://schemas.microsoft.com/office/drawing/2014/main" id="{E0BBD6C8-C8F2-40C5-AA64-85961A11ADC2}"/>
               </a:ext>
             </a:extLst>
           </p:cNvPr>
@@ -9291,7 +9259,7 @@
           <p:cNvPr id="28" name="TextBox 27">
             <a:extLst>
               <a:ext uri="{FF2B5EF4-FFF2-40B4-BE49-F238E27FC236}">
-                <a16:creationId xmlns:a16="http://schemas.microsoft.com/office/drawing/2014/main" xmlns="" id="{E0BBD6C8-C8F2-40C5-AA64-85961A11ADC2}"/>
+                <a16:creationId xmlns:a16="http://schemas.microsoft.com/office/drawing/2014/main" id="{E0BBD6C8-C8F2-40C5-AA64-85961A11ADC2}"/>
               </a:ext>
             </a:extLst>
           </p:cNvPr>
@@ -9415,7 +9383,7 @@
           <p:cNvPr id="34" name="TextBox 33">
             <a:extLst>
               <a:ext uri="{FF2B5EF4-FFF2-40B4-BE49-F238E27FC236}">
-                <a16:creationId xmlns:a16="http://schemas.microsoft.com/office/drawing/2014/main" xmlns="" id="{E0BBD6C8-C8F2-40C5-AA64-85961A11ADC2}"/>
+                <a16:creationId xmlns:a16="http://schemas.microsoft.com/office/drawing/2014/main" id="{E0BBD6C8-C8F2-40C5-AA64-85961A11ADC2}"/>
               </a:ext>
             </a:extLst>
           </p:cNvPr>
@@ -9541,7 +9509,7 @@
           <p:cNvPr id="38" name="TextBox 37">
             <a:extLst>
               <a:ext uri="{FF2B5EF4-FFF2-40B4-BE49-F238E27FC236}">
-                <a16:creationId xmlns:a16="http://schemas.microsoft.com/office/drawing/2014/main" xmlns="" id="{E0BBD6C8-C8F2-40C5-AA64-85961A11ADC2}"/>
+                <a16:creationId xmlns:a16="http://schemas.microsoft.com/office/drawing/2014/main" id="{E0BBD6C8-C8F2-40C5-AA64-85961A11ADC2}"/>
               </a:ext>
             </a:extLst>
           </p:cNvPr>
@@ -9709,7 +9677,7 @@
           <p:cNvPr id="44" name="TextBox 43">
             <a:extLst>
               <a:ext uri="{FF2B5EF4-FFF2-40B4-BE49-F238E27FC236}">
-                <a16:creationId xmlns:a16="http://schemas.microsoft.com/office/drawing/2014/main" xmlns="" id="{E0BBD6C8-C8F2-40C5-AA64-85961A11ADC2}"/>
+                <a16:creationId xmlns:a16="http://schemas.microsoft.com/office/drawing/2014/main" id="{E0BBD6C8-C8F2-40C5-AA64-85961A11ADC2}"/>
               </a:ext>
             </a:extLst>
           </p:cNvPr>
@@ -9744,7 +9712,7 @@
           <p:cNvPr id="45" name="TextBox 44">
             <a:extLst>
               <a:ext uri="{FF2B5EF4-FFF2-40B4-BE49-F238E27FC236}">
-                <a16:creationId xmlns:a16="http://schemas.microsoft.com/office/drawing/2014/main" xmlns="" id="{E0BBD6C8-C8F2-40C5-AA64-85961A11ADC2}"/>
+                <a16:creationId xmlns:a16="http://schemas.microsoft.com/office/drawing/2014/main" id="{E0BBD6C8-C8F2-40C5-AA64-85961A11ADC2}"/>
               </a:ext>
             </a:extLst>
           </p:cNvPr>
@@ -9779,7 +9747,7 @@
           <p:cNvPr id="26" name="TextBox 25">
             <a:extLst>
               <a:ext uri="{FF2B5EF4-FFF2-40B4-BE49-F238E27FC236}">
-                <a16:creationId xmlns:a16="http://schemas.microsoft.com/office/drawing/2014/main" xmlns="" id="{6C45E26E-8FEE-4439-A34B-789237C9C62C}"/>
+                <a16:creationId xmlns:a16="http://schemas.microsoft.com/office/drawing/2014/main" id="{6C45E26E-8FEE-4439-A34B-789237C9C62C}"/>
               </a:ext>
             </a:extLst>
           </p:cNvPr>
@@ -9814,7 +9782,7 @@
           <p:cNvPr id="31" name="Rectangle 30">
             <a:extLst>
               <a:ext uri="{FF2B5EF4-FFF2-40B4-BE49-F238E27FC236}">
-                <a16:creationId xmlns:a16="http://schemas.microsoft.com/office/drawing/2014/main" xmlns="" id="{6D396BFC-10E0-4935-903B-EDC457BD1755}"/>
+                <a16:creationId xmlns:a16="http://schemas.microsoft.com/office/drawing/2014/main" id="{6D396BFC-10E0-4935-903B-EDC457BD1755}"/>
               </a:ext>
             </a:extLst>
           </p:cNvPr>
@@ -9874,7 +9842,7 @@
           <p:cNvPr id="32" name="Rectangle 31">
             <a:extLst>
               <a:ext uri="{FF2B5EF4-FFF2-40B4-BE49-F238E27FC236}">
-                <a16:creationId xmlns:a16="http://schemas.microsoft.com/office/drawing/2014/main" xmlns="" id="{02A645C8-F11F-438D-92DC-F6FCCA5ECFB8}"/>
+                <a16:creationId xmlns:a16="http://schemas.microsoft.com/office/drawing/2014/main" id="{02A645C8-F11F-438D-92DC-F6FCCA5ECFB8}"/>
               </a:ext>
             </a:extLst>
           </p:cNvPr>
@@ -9938,7 +9906,7 @@
           <p:cNvPr id="12" name="Straight Arrow Connector 11">
             <a:extLst>
               <a:ext uri="{FF2B5EF4-FFF2-40B4-BE49-F238E27FC236}">
-                <a16:creationId xmlns:a16="http://schemas.microsoft.com/office/drawing/2014/main" xmlns="" id="{FF2076CA-F897-4293-B6CD-7408EB452156}"/>
+                <a16:creationId xmlns:a16="http://schemas.microsoft.com/office/drawing/2014/main" id="{FF2076CA-F897-4293-B6CD-7408EB452156}"/>
               </a:ext>
             </a:extLst>
           </p:cNvPr>
@@ -9981,7 +9949,7 @@
           <p:cNvPr id="14" name="Straight Arrow Connector 13">
             <a:extLst>
               <a:ext uri="{FF2B5EF4-FFF2-40B4-BE49-F238E27FC236}">
-                <a16:creationId xmlns:a16="http://schemas.microsoft.com/office/drawing/2014/main" xmlns="" id="{5C625B7B-4A1E-46C5-9082-4FEC89B30DA9}"/>
+                <a16:creationId xmlns:a16="http://schemas.microsoft.com/office/drawing/2014/main" id="{5C625B7B-4A1E-46C5-9082-4FEC89B30DA9}"/>
               </a:ext>
             </a:extLst>
           </p:cNvPr>
@@ -10024,7 +9992,7 @@
           <p:cNvPr id="10" name="Straight Arrow Connector 9">
             <a:extLst>
               <a:ext uri="{FF2B5EF4-FFF2-40B4-BE49-F238E27FC236}">
-                <a16:creationId xmlns:a16="http://schemas.microsoft.com/office/drawing/2014/main" xmlns="" id="{EF2F45FB-579D-4721-9889-3C0942B8BBFD}"/>
+                <a16:creationId xmlns:a16="http://schemas.microsoft.com/office/drawing/2014/main" id="{EF2F45FB-579D-4721-9889-3C0942B8BBFD}"/>
               </a:ext>
             </a:extLst>
           </p:cNvPr>
@@ -10066,7 +10034,7 @@
           <p:cNvPr id="56" name="Rectangle 55">
             <a:extLst>
               <a:ext uri="{FF2B5EF4-FFF2-40B4-BE49-F238E27FC236}">
-                <a16:creationId xmlns:a16="http://schemas.microsoft.com/office/drawing/2014/main" xmlns="" id="{FA9C2261-AEDB-43AC-86CF-E53B84AB67B0}"/>
+                <a16:creationId xmlns:a16="http://schemas.microsoft.com/office/drawing/2014/main" id="{FA9C2261-AEDB-43AC-86CF-E53B84AB67B0}"/>
               </a:ext>
             </a:extLst>
           </p:cNvPr>
@@ -10156,7 +10124,7 @@
           <p:cNvPr id="61" name="Straight Arrow Connector 60">
             <a:extLst>
               <a:ext uri="{FF2B5EF4-FFF2-40B4-BE49-F238E27FC236}">
-                <a16:creationId xmlns:a16="http://schemas.microsoft.com/office/drawing/2014/main" xmlns="" id="{7A03C540-BE87-4015-8AA4-52E27BB970EE}"/>
+                <a16:creationId xmlns:a16="http://schemas.microsoft.com/office/drawing/2014/main" id="{7A03C540-BE87-4015-8AA4-52E27BB970EE}"/>
               </a:ext>
             </a:extLst>
           </p:cNvPr>
@@ -10198,7 +10166,7 @@
           <p:cNvPr id="63" name="TextBox 62">
             <a:extLst>
               <a:ext uri="{FF2B5EF4-FFF2-40B4-BE49-F238E27FC236}">
-                <a16:creationId xmlns:a16="http://schemas.microsoft.com/office/drawing/2014/main" xmlns="" id="{6A85EB8F-D36A-4163-A076-FD01F5C08B59}"/>
+                <a16:creationId xmlns:a16="http://schemas.microsoft.com/office/drawing/2014/main" id="{6A85EB8F-D36A-4163-A076-FD01F5C08B59}"/>
               </a:ext>
             </a:extLst>
           </p:cNvPr>
@@ -10233,7 +10201,7 @@
           <p:cNvPr id="64" name="TextBox 63">
             <a:extLst>
               <a:ext uri="{FF2B5EF4-FFF2-40B4-BE49-F238E27FC236}">
-                <a16:creationId xmlns:a16="http://schemas.microsoft.com/office/drawing/2014/main" xmlns="" id="{B306D2D8-E0F7-47AC-8F2B-DF5F03898A81}"/>
+                <a16:creationId xmlns:a16="http://schemas.microsoft.com/office/drawing/2014/main" id="{B306D2D8-E0F7-47AC-8F2B-DF5F03898A81}"/>
               </a:ext>
             </a:extLst>
           </p:cNvPr>
@@ -10305,18 +10273,16 @@
           <a:p>
             <a:pPr algn="ctr"/>
             <a:r>
-              <a:rPr lang="en-US" sz="1000" dirty="0" smtClean="0"/>
+              <a:rPr lang="en-US" sz="1000" dirty="0"/>
               <a:t>com.tlw8253.controller</a:t>
             </a:r>
-            <a:endParaRPr lang="en-US" sz="1000" dirty="0"/>
-          </a:p>
-          <a:p>
-            <a:pPr algn="ctr"/>
-            <a:r>
-              <a:rPr lang="en-US" sz="1600" dirty="0" smtClean="0"/>
+          </a:p>
+          <a:p>
+            <a:pPr algn="ctr"/>
+            <a:r>
+              <a:rPr lang="en-US" sz="1600" dirty="0"/>
               <a:t>&lt;T&gt;Controller</a:t>
             </a:r>
-            <a:endParaRPr lang="en-US" sz="1600" dirty="0"/>
           </a:p>
         </p:txBody>
       </p:sp>
@@ -10361,7 +10327,7 @@
           <p:cNvPr id="46" name="TextBox 45">
             <a:extLst>
               <a:ext uri="{FF2B5EF4-FFF2-40B4-BE49-F238E27FC236}">
-                <a16:creationId xmlns:a16="http://schemas.microsoft.com/office/drawing/2014/main" xmlns="" id="{E0BBD6C8-C8F2-40C5-AA64-85961A11ADC2}"/>
+                <a16:creationId xmlns:a16="http://schemas.microsoft.com/office/drawing/2014/main" id="{E0BBD6C8-C8F2-40C5-AA64-85961A11ADC2}"/>
               </a:ext>
             </a:extLst>
           </p:cNvPr>
@@ -10385,16 +10351,15 @@
           <a:lstStyle/>
           <a:p>
             <a:r>
-              <a:rPr lang="en-US" sz="1200" dirty="0" smtClean="0"/>
+              <a:rPr lang="en-US" sz="1200" dirty="0"/>
               <a:t>contains</a:t>
             </a:r>
           </a:p>
           <a:p>
             <a:r>
-              <a:rPr lang="en-US" sz="1200" dirty="0" smtClean="0"/>
+              <a:rPr lang="en-US" sz="1200" dirty="0"/>
               <a:t>controls</a:t>
             </a:r>
-            <a:endParaRPr lang="en-US" sz="1200" dirty="0"/>
           </a:p>
         </p:txBody>
       </p:sp>
@@ -10601,7 +10566,7 @@
           <p:cNvPr id="11" name="TextBox 10">
             <a:extLst>
               <a:ext uri="{FF2B5EF4-FFF2-40B4-BE49-F238E27FC236}">
-                <a16:creationId xmlns:a16="http://schemas.microsoft.com/office/drawing/2014/main" xmlns="" id="{E0BBD6C8-C8F2-40C5-AA64-85961A11ADC2}"/>
+                <a16:creationId xmlns:a16="http://schemas.microsoft.com/office/drawing/2014/main" id="{E0BBD6C8-C8F2-40C5-AA64-85961A11ADC2}"/>
               </a:ext>
             </a:extLst>
           </p:cNvPr>
@@ -10758,7 +10723,7 @@
           <p:cNvPr id="19" name="TextBox 18">
             <a:extLst>
               <a:ext uri="{FF2B5EF4-FFF2-40B4-BE49-F238E27FC236}">
-                <a16:creationId xmlns:a16="http://schemas.microsoft.com/office/drawing/2014/main" xmlns="" id="{E0BBD6C8-C8F2-40C5-AA64-85961A11ADC2}"/>
+                <a16:creationId xmlns:a16="http://schemas.microsoft.com/office/drawing/2014/main" id="{E0BBD6C8-C8F2-40C5-AA64-85961A11ADC2}"/>
               </a:ext>
             </a:extLst>
           </p:cNvPr>
@@ -10884,7 +10849,7 @@
           <p:cNvPr id="23" name="TextBox 22">
             <a:extLst>
               <a:ext uri="{FF2B5EF4-FFF2-40B4-BE49-F238E27FC236}">
-                <a16:creationId xmlns:a16="http://schemas.microsoft.com/office/drawing/2014/main" xmlns="" id="{E0BBD6C8-C8F2-40C5-AA64-85961A11ADC2}"/>
+                <a16:creationId xmlns:a16="http://schemas.microsoft.com/office/drawing/2014/main" id="{E0BBD6C8-C8F2-40C5-AA64-85961A11ADC2}"/>
               </a:ext>
             </a:extLst>
           </p:cNvPr>
@@ -11001,7 +10966,7 @@
           <p:cNvPr id="28" name="TextBox 27">
             <a:extLst>
               <a:ext uri="{FF2B5EF4-FFF2-40B4-BE49-F238E27FC236}">
-                <a16:creationId xmlns:a16="http://schemas.microsoft.com/office/drawing/2014/main" xmlns="" id="{E0BBD6C8-C8F2-40C5-AA64-85961A11ADC2}"/>
+                <a16:creationId xmlns:a16="http://schemas.microsoft.com/office/drawing/2014/main" id="{E0BBD6C8-C8F2-40C5-AA64-85961A11ADC2}"/>
               </a:ext>
             </a:extLst>
           </p:cNvPr>
@@ -11126,7 +11091,7 @@
           <p:cNvPr id="34" name="TextBox 33">
             <a:extLst>
               <a:ext uri="{FF2B5EF4-FFF2-40B4-BE49-F238E27FC236}">
-                <a16:creationId xmlns:a16="http://schemas.microsoft.com/office/drawing/2014/main" xmlns="" id="{E0BBD6C8-C8F2-40C5-AA64-85961A11ADC2}"/>
+                <a16:creationId xmlns:a16="http://schemas.microsoft.com/office/drawing/2014/main" id="{E0BBD6C8-C8F2-40C5-AA64-85961A11ADC2}"/>
               </a:ext>
             </a:extLst>
           </p:cNvPr>
@@ -11252,7 +11217,7 @@
           <p:cNvPr id="38" name="TextBox 37">
             <a:extLst>
               <a:ext uri="{FF2B5EF4-FFF2-40B4-BE49-F238E27FC236}">
-                <a16:creationId xmlns:a16="http://schemas.microsoft.com/office/drawing/2014/main" xmlns="" id="{E0BBD6C8-C8F2-40C5-AA64-85961A11ADC2}"/>
+                <a16:creationId xmlns:a16="http://schemas.microsoft.com/office/drawing/2014/main" id="{E0BBD6C8-C8F2-40C5-AA64-85961A11ADC2}"/>
               </a:ext>
             </a:extLst>
           </p:cNvPr>
@@ -11420,7 +11385,7 @@
           <p:cNvPr id="44" name="TextBox 43">
             <a:extLst>
               <a:ext uri="{FF2B5EF4-FFF2-40B4-BE49-F238E27FC236}">
-                <a16:creationId xmlns:a16="http://schemas.microsoft.com/office/drawing/2014/main" xmlns="" id="{E0BBD6C8-C8F2-40C5-AA64-85961A11ADC2}"/>
+                <a16:creationId xmlns:a16="http://schemas.microsoft.com/office/drawing/2014/main" id="{E0BBD6C8-C8F2-40C5-AA64-85961A11ADC2}"/>
               </a:ext>
             </a:extLst>
           </p:cNvPr>
@@ -11455,7 +11420,7 @@
           <p:cNvPr id="45" name="TextBox 44">
             <a:extLst>
               <a:ext uri="{FF2B5EF4-FFF2-40B4-BE49-F238E27FC236}">
-                <a16:creationId xmlns:a16="http://schemas.microsoft.com/office/drawing/2014/main" xmlns="" id="{E0BBD6C8-C8F2-40C5-AA64-85961A11ADC2}"/>
+                <a16:creationId xmlns:a16="http://schemas.microsoft.com/office/drawing/2014/main" id="{E0BBD6C8-C8F2-40C5-AA64-85961A11ADC2}"/>
               </a:ext>
             </a:extLst>
           </p:cNvPr>
@@ -11490,7 +11455,7 @@
           <p:cNvPr id="26" name="TextBox 25">
             <a:extLst>
               <a:ext uri="{FF2B5EF4-FFF2-40B4-BE49-F238E27FC236}">
-                <a16:creationId xmlns:a16="http://schemas.microsoft.com/office/drawing/2014/main" xmlns="" id="{6C45E26E-8FEE-4439-A34B-789237C9C62C}"/>
+                <a16:creationId xmlns:a16="http://schemas.microsoft.com/office/drawing/2014/main" id="{6C45E26E-8FEE-4439-A34B-789237C9C62C}"/>
               </a:ext>
             </a:extLst>
           </p:cNvPr>
@@ -11525,7 +11490,7 @@
           <p:cNvPr id="31" name="Rectangle 30">
             <a:extLst>
               <a:ext uri="{FF2B5EF4-FFF2-40B4-BE49-F238E27FC236}">
-                <a16:creationId xmlns:a16="http://schemas.microsoft.com/office/drawing/2014/main" xmlns="" id="{6D396BFC-10E0-4935-903B-EDC457BD1755}"/>
+                <a16:creationId xmlns:a16="http://schemas.microsoft.com/office/drawing/2014/main" id="{6D396BFC-10E0-4935-903B-EDC457BD1755}"/>
               </a:ext>
             </a:extLst>
           </p:cNvPr>
@@ -11585,7 +11550,7 @@
           <p:cNvPr id="32" name="Rectangle 31">
             <a:extLst>
               <a:ext uri="{FF2B5EF4-FFF2-40B4-BE49-F238E27FC236}">
-                <a16:creationId xmlns:a16="http://schemas.microsoft.com/office/drawing/2014/main" xmlns="" id="{02A645C8-F11F-438D-92DC-F6FCCA5ECFB8}"/>
+                <a16:creationId xmlns:a16="http://schemas.microsoft.com/office/drawing/2014/main" id="{02A645C8-F11F-438D-92DC-F6FCCA5ECFB8}"/>
               </a:ext>
             </a:extLst>
           </p:cNvPr>
@@ -11645,7 +11610,7 @@
           <p:cNvPr id="12" name="Straight Arrow Connector 11">
             <a:extLst>
               <a:ext uri="{FF2B5EF4-FFF2-40B4-BE49-F238E27FC236}">
-                <a16:creationId xmlns:a16="http://schemas.microsoft.com/office/drawing/2014/main" xmlns="" id="{FF2076CA-F897-4293-B6CD-7408EB452156}"/>
+                <a16:creationId xmlns:a16="http://schemas.microsoft.com/office/drawing/2014/main" id="{FF2076CA-F897-4293-B6CD-7408EB452156}"/>
               </a:ext>
             </a:extLst>
           </p:cNvPr>
@@ -11688,7 +11653,7 @@
           <p:cNvPr id="14" name="Straight Arrow Connector 13">
             <a:extLst>
               <a:ext uri="{FF2B5EF4-FFF2-40B4-BE49-F238E27FC236}">
-                <a16:creationId xmlns:a16="http://schemas.microsoft.com/office/drawing/2014/main" xmlns="" id="{5C625B7B-4A1E-46C5-9082-4FEC89B30DA9}"/>
+                <a16:creationId xmlns:a16="http://schemas.microsoft.com/office/drawing/2014/main" id="{5C625B7B-4A1E-46C5-9082-4FEC89B30DA9}"/>
               </a:ext>
             </a:extLst>
           </p:cNvPr>
@@ -11731,7 +11696,7 @@
           <p:cNvPr id="10" name="Straight Arrow Connector 9">
             <a:extLst>
               <a:ext uri="{FF2B5EF4-FFF2-40B4-BE49-F238E27FC236}">
-                <a16:creationId xmlns:a16="http://schemas.microsoft.com/office/drawing/2014/main" xmlns="" id="{EF2F45FB-579D-4721-9889-3C0942B8BBFD}"/>
+                <a16:creationId xmlns:a16="http://schemas.microsoft.com/office/drawing/2014/main" id="{EF2F45FB-579D-4721-9889-3C0942B8BBFD}"/>
               </a:ext>
             </a:extLst>
           </p:cNvPr>
@@ -11773,7 +11738,7 @@
           <p:cNvPr id="36" name="Rectangle 35">
             <a:extLst>
               <a:ext uri="{FF2B5EF4-FFF2-40B4-BE49-F238E27FC236}">
-                <a16:creationId xmlns:a16="http://schemas.microsoft.com/office/drawing/2014/main" xmlns="" id="{93FBA679-F71B-47BD-BE29-21E7C2262CEB}"/>
+                <a16:creationId xmlns:a16="http://schemas.microsoft.com/office/drawing/2014/main" id="{93FBA679-F71B-47BD-BE29-21E7C2262CEB}"/>
               </a:ext>
             </a:extLst>
           </p:cNvPr>
@@ -11855,7 +11820,7 @@
           <p:cNvPr id="40" name="Straight Arrow Connector 39">
             <a:extLst>
               <a:ext uri="{FF2B5EF4-FFF2-40B4-BE49-F238E27FC236}">
-                <a16:creationId xmlns:a16="http://schemas.microsoft.com/office/drawing/2014/main" xmlns="" id="{4EB51AD1-53A9-412E-933D-8DFB38C76755}"/>
+                <a16:creationId xmlns:a16="http://schemas.microsoft.com/office/drawing/2014/main" id="{4EB51AD1-53A9-412E-933D-8DFB38C76755}"/>
               </a:ext>
             </a:extLst>
           </p:cNvPr>
@@ -11898,7 +11863,7 @@
           <p:cNvPr id="42" name="TextBox 41">
             <a:extLst>
               <a:ext uri="{FF2B5EF4-FFF2-40B4-BE49-F238E27FC236}">
-                <a16:creationId xmlns:a16="http://schemas.microsoft.com/office/drawing/2014/main" xmlns="" id="{42986CB5-3F27-4531-B052-275C80DE06A9}"/>
+                <a16:creationId xmlns:a16="http://schemas.microsoft.com/office/drawing/2014/main" id="{42986CB5-3F27-4531-B052-275C80DE06A9}"/>
               </a:ext>
             </a:extLst>
           </p:cNvPr>
@@ -11933,7 +11898,7 @@
           <p:cNvPr id="46" name="TextBox 45">
             <a:extLst>
               <a:ext uri="{FF2B5EF4-FFF2-40B4-BE49-F238E27FC236}">
-                <a16:creationId xmlns:a16="http://schemas.microsoft.com/office/drawing/2014/main" xmlns="" id="{5EBBC5A0-26BA-4B6E-A551-6AD1BA1617D0}"/>
+                <a16:creationId xmlns:a16="http://schemas.microsoft.com/office/drawing/2014/main" id="{5EBBC5A0-26BA-4B6E-A551-6AD1BA1617D0}"/>
               </a:ext>
             </a:extLst>
           </p:cNvPr>
@@ -12005,15 +11970,14 @@
           <a:p>
             <a:pPr algn="ctr"/>
             <a:r>
-              <a:rPr lang="en-US" sz="1000" dirty="0" smtClean="0"/>
+              <a:rPr lang="en-US" sz="1000" dirty="0"/>
               <a:t>com.tlw8253.controller</a:t>
             </a:r>
-            <a:endParaRPr lang="en-US" sz="1000" dirty="0"/>
-          </a:p>
-          <a:p>
-            <a:pPr algn="ctr"/>
-            <a:r>
-              <a:rPr lang="en-US" sz="1600" dirty="0" err="1" smtClean="0"/>
+          </a:p>
+          <a:p>
+            <a:pPr algn="ctr"/>
+            <a:r>
+              <a:rPr lang="en-US" sz="1600" dirty="0" err="1"/>
               <a:t>AccountController</a:t>
             </a:r>
             <a:endParaRPr lang="en-US" sz="1600" dirty="0"/>
@@ -12061,7 +12025,7 @@
           <p:cNvPr id="48" name="TextBox 47">
             <a:extLst>
               <a:ext uri="{FF2B5EF4-FFF2-40B4-BE49-F238E27FC236}">
-                <a16:creationId xmlns:a16="http://schemas.microsoft.com/office/drawing/2014/main" xmlns="" id="{E0BBD6C8-C8F2-40C5-AA64-85961A11ADC2}"/>
+                <a16:creationId xmlns:a16="http://schemas.microsoft.com/office/drawing/2014/main" id="{E0BBD6C8-C8F2-40C5-AA64-85961A11ADC2}"/>
               </a:ext>
             </a:extLst>
           </p:cNvPr>
@@ -12085,16 +12049,15 @@
           <a:lstStyle/>
           <a:p>
             <a:r>
-              <a:rPr lang="en-US" sz="1200" dirty="0" smtClean="0"/>
+              <a:rPr lang="en-US" sz="1200" dirty="0"/>
               <a:t>contains</a:t>
             </a:r>
           </a:p>
           <a:p>
             <a:r>
-              <a:rPr lang="en-US" sz="1200" dirty="0" smtClean="0"/>
+              <a:rPr lang="en-US" sz="1200" dirty="0"/>
               <a:t>controls</a:t>
             </a:r>
-            <a:endParaRPr lang="en-US" sz="1200" dirty="0"/>
           </a:p>
         </p:txBody>
       </p:sp>
@@ -12277,7 +12240,7 @@
           <p:cNvPr id="11" name="TextBox 10">
             <a:extLst>
               <a:ext uri="{FF2B5EF4-FFF2-40B4-BE49-F238E27FC236}">
-                <a16:creationId xmlns:a16="http://schemas.microsoft.com/office/drawing/2014/main" xmlns="" id="{E0BBD6C8-C8F2-40C5-AA64-85961A11ADC2}"/>
+                <a16:creationId xmlns:a16="http://schemas.microsoft.com/office/drawing/2014/main" id="{E0BBD6C8-C8F2-40C5-AA64-85961A11ADC2}"/>
               </a:ext>
             </a:extLst>
           </p:cNvPr>

</xml_diff>

<commit_message>
20210809 1826 update to files from tlw8748253 broken happy paths.
</commit_message>
<xml_diff>
--- a/docs/Project 0.pptx
+++ b/docs/Project 0.pptx
@@ -140,7 +140,7 @@
           <p:cNvPr id="2" name="Title 1">
             <a:extLst>
               <a:ext uri="{FF2B5EF4-FFF2-40B4-BE49-F238E27FC236}">
-                <a16:creationId xmlns:a16="http://schemas.microsoft.com/office/drawing/2014/main" id="{67106D7E-D400-44F1-9A1A-D68CE501C73D}"/>
+                <a16:creationId xmlns:a16="http://schemas.microsoft.com/office/drawing/2014/main" xmlns="" id="{67106D7E-D400-44F1-9A1A-D68CE501C73D}"/>
               </a:ext>
             </a:extLst>
           </p:cNvPr>
@@ -177,7 +177,7 @@
           <p:cNvPr id="3" name="Subtitle 2">
             <a:extLst>
               <a:ext uri="{FF2B5EF4-FFF2-40B4-BE49-F238E27FC236}">
-                <a16:creationId xmlns:a16="http://schemas.microsoft.com/office/drawing/2014/main" id="{A5FDE527-E621-4639-A0C7-E1E9B0DFBCEC}"/>
+                <a16:creationId xmlns:a16="http://schemas.microsoft.com/office/drawing/2014/main" xmlns="" id="{A5FDE527-E621-4639-A0C7-E1E9B0DFBCEC}"/>
               </a:ext>
             </a:extLst>
           </p:cNvPr>
@@ -247,7 +247,7 @@
           <p:cNvPr id="4" name="Date Placeholder 3">
             <a:extLst>
               <a:ext uri="{FF2B5EF4-FFF2-40B4-BE49-F238E27FC236}">
-                <a16:creationId xmlns:a16="http://schemas.microsoft.com/office/drawing/2014/main" id="{E109CE88-B989-4109-89C8-36F7C245DB1C}"/>
+                <a16:creationId xmlns:a16="http://schemas.microsoft.com/office/drawing/2014/main" xmlns="" id="{E109CE88-B989-4109-89C8-36F7C245DB1C}"/>
               </a:ext>
             </a:extLst>
           </p:cNvPr>
@@ -265,7 +265,7 @@
           <a:p>
             <a:fld id="{6C733091-19F0-4DD7-90FE-000B4789B4CF}" type="datetimeFigureOut">
               <a:rPr lang="en-US" smtClean="0"/>
-              <a:t>8/6/2021</a:t>
+              <a:t>8/9/2021</a:t>
             </a:fld>
             <a:endParaRPr lang="en-US"/>
           </a:p>
@@ -276,7 +276,7 @@
           <p:cNvPr id="5" name="Footer Placeholder 4">
             <a:extLst>
               <a:ext uri="{FF2B5EF4-FFF2-40B4-BE49-F238E27FC236}">
-                <a16:creationId xmlns:a16="http://schemas.microsoft.com/office/drawing/2014/main" id="{0841498F-B991-43D3-B408-CC35D8EFCF37}"/>
+                <a16:creationId xmlns:a16="http://schemas.microsoft.com/office/drawing/2014/main" xmlns="" id="{0841498F-B991-43D3-B408-CC35D8EFCF37}"/>
               </a:ext>
             </a:extLst>
           </p:cNvPr>
@@ -301,7 +301,7 @@
           <p:cNvPr id="6" name="Slide Number Placeholder 5">
             <a:extLst>
               <a:ext uri="{FF2B5EF4-FFF2-40B4-BE49-F238E27FC236}">
-                <a16:creationId xmlns:a16="http://schemas.microsoft.com/office/drawing/2014/main" id="{01754CB8-17B1-45A0-AE7D-755EAA1B69D8}"/>
+                <a16:creationId xmlns:a16="http://schemas.microsoft.com/office/drawing/2014/main" xmlns="" id="{01754CB8-17B1-45A0-AE7D-755EAA1B69D8}"/>
               </a:ext>
             </a:extLst>
           </p:cNvPr>
@@ -360,7 +360,7 @@
           <p:cNvPr id="2" name="Title 1">
             <a:extLst>
               <a:ext uri="{FF2B5EF4-FFF2-40B4-BE49-F238E27FC236}">
-                <a16:creationId xmlns:a16="http://schemas.microsoft.com/office/drawing/2014/main" id="{E7A7B055-5DC2-440D-83C1-CAAE8E9A8E14}"/>
+                <a16:creationId xmlns:a16="http://schemas.microsoft.com/office/drawing/2014/main" xmlns="" id="{E7A7B055-5DC2-440D-83C1-CAAE8E9A8E14}"/>
               </a:ext>
             </a:extLst>
           </p:cNvPr>
@@ -388,7 +388,7 @@
           <p:cNvPr id="3" name="Vertical Text Placeholder 2">
             <a:extLst>
               <a:ext uri="{FF2B5EF4-FFF2-40B4-BE49-F238E27FC236}">
-                <a16:creationId xmlns:a16="http://schemas.microsoft.com/office/drawing/2014/main" id="{65710707-423D-4F9D-A49D-6C764C562553}"/>
+                <a16:creationId xmlns:a16="http://schemas.microsoft.com/office/drawing/2014/main" xmlns="" id="{65710707-423D-4F9D-A49D-6C764C562553}"/>
               </a:ext>
             </a:extLst>
           </p:cNvPr>
@@ -445,7 +445,7 @@
           <p:cNvPr id="4" name="Date Placeholder 3">
             <a:extLst>
               <a:ext uri="{FF2B5EF4-FFF2-40B4-BE49-F238E27FC236}">
-                <a16:creationId xmlns:a16="http://schemas.microsoft.com/office/drawing/2014/main" id="{98B6F7EF-D1BE-4437-85F3-99626E37E4EF}"/>
+                <a16:creationId xmlns:a16="http://schemas.microsoft.com/office/drawing/2014/main" xmlns="" id="{98B6F7EF-D1BE-4437-85F3-99626E37E4EF}"/>
               </a:ext>
             </a:extLst>
           </p:cNvPr>
@@ -463,7 +463,7 @@
           <a:p>
             <a:fld id="{6C733091-19F0-4DD7-90FE-000B4789B4CF}" type="datetimeFigureOut">
               <a:rPr lang="en-US" smtClean="0"/>
-              <a:t>8/6/2021</a:t>
+              <a:t>8/9/2021</a:t>
             </a:fld>
             <a:endParaRPr lang="en-US"/>
           </a:p>
@@ -474,7 +474,7 @@
           <p:cNvPr id="5" name="Footer Placeholder 4">
             <a:extLst>
               <a:ext uri="{FF2B5EF4-FFF2-40B4-BE49-F238E27FC236}">
-                <a16:creationId xmlns:a16="http://schemas.microsoft.com/office/drawing/2014/main" id="{D890AA9B-E479-4209-B245-83608F3D4013}"/>
+                <a16:creationId xmlns:a16="http://schemas.microsoft.com/office/drawing/2014/main" xmlns="" id="{D890AA9B-E479-4209-B245-83608F3D4013}"/>
               </a:ext>
             </a:extLst>
           </p:cNvPr>
@@ -499,7 +499,7 @@
           <p:cNvPr id="6" name="Slide Number Placeholder 5">
             <a:extLst>
               <a:ext uri="{FF2B5EF4-FFF2-40B4-BE49-F238E27FC236}">
-                <a16:creationId xmlns:a16="http://schemas.microsoft.com/office/drawing/2014/main" id="{0E4976E4-E15A-4296-A430-633D2BB9142B}"/>
+                <a16:creationId xmlns:a16="http://schemas.microsoft.com/office/drawing/2014/main" xmlns="" id="{0E4976E4-E15A-4296-A430-633D2BB9142B}"/>
               </a:ext>
             </a:extLst>
           </p:cNvPr>
@@ -558,7 +558,7 @@
           <p:cNvPr id="2" name="Vertical Title 1">
             <a:extLst>
               <a:ext uri="{FF2B5EF4-FFF2-40B4-BE49-F238E27FC236}">
-                <a16:creationId xmlns:a16="http://schemas.microsoft.com/office/drawing/2014/main" id="{66F63CF5-8DEE-4BB2-A2A5-5C16FEBE1AD5}"/>
+                <a16:creationId xmlns:a16="http://schemas.microsoft.com/office/drawing/2014/main" xmlns="" id="{66F63CF5-8DEE-4BB2-A2A5-5C16FEBE1AD5}"/>
               </a:ext>
             </a:extLst>
           </p:cNvPr>
@@ -591,7 +591,7 @@
           <p:cNvPr id="3" name="Vertical Text Placeholder 2">
             <a:extLst>
               <a:ext uri="{FF2B5EF4-FFF2-40B4-BE49-F238E27FC236}">
-                <a16:creationId xmlns:a16="http://schemas.microsoft.com/office/drawing/2014/main" id="{E0D5EBA5-94AF-4373-B032-A40FF73C7575}"/>
+                <a16:creationId xmlns:a16="http://schemas.microsoft.com/office/drawing/2014/main" xmlns="" id="{E0D5EBA5-94AF-4373-B032-A40FF73C7575}"/>
               </a:ext>
             </a:extLst>
           </p:cNvPr>
@@ -653,7 +653,7 @@
           <p:cNvPr id="4" name="Date Placeholder 3">
             <a:extLst>
               <a:ext uri="{FF2B5EF4-FFF2-40B4-BE49-F238E27FC236}">
-                <a16:creationId xmlns:a16="http://schemas.microsoft.com/office/drawing/2014/main" id="{7426B8E1-6758-4F5E-B618-96641332600B}"/>
+                <a16:creationId xmlns:a16="http://schemas.microsoft.com/office/drawing/2014/main" xmlns="" id="{7426B8E1-6758-4F5E-B618-96641332600B}"/>
               </a:ext>
             </a:extLst>
           </p:cNvPr>
@@ -671,7 +671,7 @@
           <a:p>
             <a:fld id="{6C733091-19F0-4DD7-90FE-000B4789B4CF}" type="datetimeFigureOut">
               <a:rPr lang="en-US" smtClean="0"/>
-              <a:t>8/6/2021</a:t>
+              <a:t>8/9/2021</a:t>
             </a:fld>
             <a:endParaRPr lang="en-US"/>
           </a:p>
@@ -682,7 +682,7 @@
           <p:cNvPr id="5" name="Footer Placeholder 4">
             <a:extLst>
               <a:ext uri="{FF2B5EF4-FFF2-40B4-BE49-F238E27FC236}">
-                <a16:creationId xmlns:a16="http://schemas.microsoft.com/office/drawing/2014/main" id="{F65E330E-2A7E-482D-AE0F-70EA5A29958B}"/>
+                <a16:creationId xmlns:a16="http://schemas.microsoft.com/office/drawing/2014/main" xmlns="" id="{F65E330E-2A7E-482D-AE0F-70EA5A29958B}"/>
               </a:ext>
             </a:extLst>
           </p:cNvPr>
@@ -707,7 +707,7 @@
           <p:cNvPr id="6" name="Slide Number Placeholder 5">
             <a:extLst>
               <a:ext uri="{FF2B5EF4-FFF2-40B4-BE49-F238E27FC236}">
-                <a16:creationId xmlns:a16="http://schemas.microsoft.com/office/drawing/2014/main" id="{B8000005-FC38-4A6C-9D09-7945EFA08160}"/>
+                <a16:creationId xmlns:a16="http://schemas.microsoft.com/office/drawing/2014/main" xmlns="" id="{B8000005-FC38-4A6C-9D09-7945EFA08160}"/>
               </a:ext>
             </a:extLst>
           </p:cNvPr>
@@ -766,7 +766,7 @@
           <p:cNvPr id="2" name="Title 1">
             <a:extLst>
               <a:ext uri="{FF2B5EF4-FFF2-40B4-BE49-F238E27FC236}">
-                <a16:creationId xmlns:a16="http://schemas.microsoft.com/office/drawing/2014/main" id="{91D0002C-766B-44B4-A24C-BE6DE6C7BA4C}"/>
+                <a16:creationId xmlns:a16="http://schemas.microsoft.com/office/drawing/2014/main" xmlns="" id="{91D0002C-766B-44B4-A24C-BE6DE6C7BA4C}"/>
               </a:ext>
             </a:extLst>
           </p:cNvPr>
@@ -794,7 +794,7 @@
           <p:cNvPr id="3" name="Content Placeholder 2">
             <a:extLst>
               <a:ext uri="{FF2B5EF4-FFF2-40B4-BE49-F238E27FC236}">
-                <a16:creationId xmlns:a16="http://schemas.microsoft.com/office/drawing/2014/main" id="{3455BAA9-6C7B-4874-AD76-BD466F64802D}"/>
+                <a16:creationId xmlns:a16="http://schemas.microsoft.com/office/drawing/2014/main" xmlns="" id="{3455BAA9-6C7B-4874-AD76-BD466F64802D}"/>
               </a:ext>
             </a:extLst>
           </p:cNvPr>
@@ -851,7 +851,7 @@
           <p:cNvPr id="4" name="Date Placeholder 3">
             <a:extLst>
               <a:ext uri="{FF2B5EF4-FFF2-40B4-BE49-F238E27FC236}">
-                <a16:creationId xmlns:a16="http://schemas.microsoft.com/office/drawing/2014/main" id="{8776BDAF-D8F2-4A61-904D-094BB4545702}"/>
+                <a16:creationId xmlns:a16="http://schemas.microsoft.com/office/drawing/2014/main" xmlns="" id="{8776BDAF-D8F2-4A61-904D-094BB4545702}"/>
               </a:ext>
             </a:extLst>
           </p:cNvPr>
@@ -869,7 +869,7 @@
           <a:p>
             <a:fld id="{6C733091-19F0-4DD7-90FE-000B4789B4CF}" type="datetimeFigureOut">
               <a:rPr lang="en-US" smtClean="0"/>
-              <a:t>8/6/2021</a:t>
+              <a:t>8/9/2021</a:t>
             </a:fld>
             <a:endParaRPr lang="en-US"/>
           </a:p>
@@ -880,7 +880,7 @@
           <p:cNvPr id="5" name="Footer Placeholder 4">
             <a:extLst>
               <a:ext uri="{FF2B5EF4-FFF2-40B4-BE49-F238E27FC236}">
-                <a16:creationId xmlns:a16="http://schemas.microsoft.com/office/drawing/2014/main" id="{F89C5665-4384-4706-9BD2-9F42B05C96BC}"/>
+                <a16:creationId xmlns:a16="http://schemas.microsoft.com/office/drawing/2014/main" xmlns="" id="{F89C5665-4384-4706-9BD2-9F42B05C96BC}"/>
               </a:ext>
             </a:extLst>
           </p:cNvPr>
@@ -905,7 +905,7 @@
           <p:cNvPr id="6" name="Slide Number Placeholder 5">
             <a:extLst>
               <a:ext uri="{FF2B5EF4-FFF2-40B4-BE49-F238E27FC236}">
-                <a16:creationId xmlns:a16="http://schemas.microsoft.com/office/drawing/2014/main" id="{7DCAD73E-CAB3-4BA7-905E-D203691D0418}"/>
+                <a16:creationId xmlns:a16="http://schemas.microsoft.com/office/drawing/2014/main" xmlns="" id="{7DCAD73E-CAB3-4BA7-905E-D203691D0418}"/>
               </a:ext>
             </a:extLst>
           </p:cNvPr>
@@ -964,7 +964,7 @@
           <p:cNvPr id="2" name="Title 1">
             <a:extLst>
               <a:ext uri="{FF2B5EF4-FFF2-40B4-BE49-F238E27FC236}">
-                <a16:creationId xmlns:a16="http://schemas.microsoft.com/office/drawing/2014/main" id="{A9880706-F7FA-4EC3-A022-9D6C7CEC3692}"/>
+                <a16:creationId xmlns:a16="http://schemas.microsoft.com/office/drawing/2014/main" xmlns="" id="{A9880706-F7FA-4EC3-A022-9D6C7CEC3692}"/>
               </a:ext>
             </a:extLst>
           </p:cNvPr>
@@ -1001,7 +1001,7 @@
           <p:cNvPr id="3" name="Text Placeholder 2">
             <a:extLst>
               <a:ext uri="{FF2B5EF4-FFF2-40B4-BE49-F238E27FC236}">
-                <a16:creationId xmlns:a16="http://schemas.microsoft.com/office/drawing/2014/main" id="{FA8A65D0-3DF5-448D-82EC-A967682A0DED}"/>
+                <a16:creationId xmlns:a16="http://schemas.microsoft.com/office/drawing/2014/main" xmlns="" id="{FA8A65D0-3DF5-448D-82EC-A967682A0DED}"/>
               </a:ext>
             </a:extLst>
           </p:cNvPr>
@@ -1126,7 +1126,7 @@
           <p:cNvPr id="4" name="Date Placeholder 3">
             <a:extLst>
               <a:ext uri="{FF2B5EF4-FFF2-40B4-BE49-F238E27FC236}">
-                <a16:creationId xmlns:a16="http://schemas.microsoft.com/office/drawing/2014/main" id="{600EA68C-01A6-487D-9D6E-1D1B4EAC0440}"/>
+                <a16:creationId xmlns:a16="http://schemas.microsoft.com/office/drawing/2014/main" xmlns="" id="{600EA68C-01A6-487D-9D6E-1D1B4EAC0440}"/>
               </a:ext>
             </a:extLst>
           </p:cNvPr>
@@ -1144,7 +1144,7 @@
           <a:p>
             <a:fld id="{6C733091-19F0-4DD7-90FE-000B4789B4CF}" type="datetimeFigureOut">
               <a:rPr lang="en-US" smtClean="0"/>
-              <a:t>8/6/2021</a:t>
+              <a:t>8/9/2021</a:t>
             </a:fld>
             <a:endParaRPr lang="en-US"/>
           </a:p>
@@ -1155,7 +1155,7 @@
           <p:cNvPr id="5" name="Footer Placeholder 4">
             <a:extLst>
               <a:ext uri="{FF2B5EF4-FFF2-40B4-BE49-F238E27FC236}">
-                <a16:creationId xmlns:a16="http://schemas.microsoft.com/office/drawing/2014/main" id="{6E6527CB-4FFD-4569-A82C-5EDC311B2CF6}"/>
+                <a16:creationId xmlns:a16="http://schemas.microsoft.com/office/drawing/2014/main" xmlns="" id="{6E6527CB-4FFD-4569-A82C-5EDC311B2CF6}"/>
               </a:ext>
             </a:extLst>
           </p:cNvPr>
@@ -1180,7 +1180,7 @@
           <p:cNvPr id="6" name="Slide Number Placeholder 5">
             <a:extLst>
               <a:ext uri="{FF2B5EF4-FFF2-40B4-BE49-F238E27FC236}">
-                <a16:creationId xmlns:a16="http://schemas.microsoft.com/office/drawing/2014/main" id="{24B19E5B-5A98-4381-A01D-01F81FD65792}"/>
+                <a16:creationId xmlns:a16="http://schemas.microsoft.com/office/drawing/2014/main" xmlns="" id="{24B19E5B-5A98-4381-A01D-01F81FD65792}"/>
               </a:ext>
             </a:extLst>
           </p:cNvPr>
@@ -1239,7 +1239,7 @@
           <p:cNvPr id="2" name="Title 1">
             <a:extLst>
               <a:ext uri="{FF2B5EF4-FFF2-40B4-BE49-F238E27FC236}">
-                <a16:creationId xmlns:a16="http://schemas.microsoft.com/office/drawing/2014/main" id="{63228B71-E923-4431-B8D2-FAE724678940}"/>
+                <a16:creationId xmlns:a16="http://schemas.microsoft.com/office/drawing/2014/main" xmlns="" id="{63228B71-E923-4431-B8D2-FAE724678940}"/>
               </a:ext>
             </a:extLst>
           </p:cNvPr>
@@ -1267,7 +1267,7 @@
           <p:cNvPr id="3" name="Content Placeholder 2">
             <a:extLst>
               <a:ext uri="{FF2B5EF4-FFF2-40B4-BE49-F238E27FC236}">
-                <a16:creationId xmlns:a16="http://schemas.microsoft.com/office/drawing/2014/main" id="{B18895E9-B7FF-4A00-955B-206CF8C73E43}"/>
+                <a16:creationId xmlns:a16="http://schemas.microsoft.com/office/drawing/2014/main" xmlns="" id="{B18895E9-B7FF-4A00-955B-206CF8C73E43}"/>
               </a:ext>
             </a:extLst>
           </p:cNvPr>
@@ -1329,7 +1329,7 @@
           <p:cNvPr id="4" name="Content Placeholder 3">
             <a:extLst>
               <a:ext uri="{FF2B5EF4-FFF2-40B4-BE49-F238E27FC236}">
-                <a16:creationId xmlns:a16="http://schemas.microsoft.com/office/drawing/2014/main" id="{DA813955-E3B9-44BC-8E1D-139269C8B48A}"/>
+                <a16:creationId xmlns:a16="http://schemas.microsoft.com/office/drawing/2014/main" xmlns="" id="{DA813955-E3B9-44BC-8E1D-139269C8B48A}"/>
               </a:ext>
             </a:extLst>
           </p:cNvPr>
@@ -1391,7 +1391,7 @@
           <p:cNvPr id="5" name="Date Placeholder 4">
             <a:extLst>
               <a:ext uri="{FF2B5EF4-FFF2-40B4-BE49-F238E27FC236}">
-                <a16:creationId xmlns:a16="http://schemas.microsoft.com/office/drawing/2014/main" id="{7E9B8EF5-28D5-4C4E-A2AB-EEA30D75DAFE}"/>
+                <a16:creationId xmlns:a16="http://schemas.microsoft.com/office/drawing/2014/main" xmlns="" id="{7E9B8EF5-28D5-4C4E-A2AB-EEA30D75DAFE}"/>
               </a:ext>
             </a:extLst>
           </p:cNvPr>
@@ -1409,7 +1409,7 @@
           <a:p>
             <a:fld id="{6C733091-19F0-4DD7-90FE-000B4789B4CF}" type="datetimeFigureOut">
               <a:rPr lang="en-US" smtClean="0"/>
-              <a:t>8/6/2021</a:t>
+              <a:t>8/9/2021</a:t>
             </a:fld>
             <a:endParaRPr lang="en-US"/>
           </a:p>
@@ -1420,7 +1420,7 @@
           <p:cNvPr id="6" name="Footer Placeholder 5">
             <a:extLst>
               <a:ext uri="{FF2B5EF4-FFF2-40B4-BE49-F238E27FC236}">
-                <a16:creationId xmlns:a16="http://schemas.microsoft.com/office/drawing/2014/main" id="{5723E678-8CB4-4335-AA04-6BD391748717}"/>
+                <a16:creationId xmlns:a16="http://schemas.microsoft.com/office/drawing/2014/main" xmlns="" id="{5723E678-8CB4-4335-AA04-6BD391748717}"/>
               </a:ext>
             </a:extLst>
           </p:cNvPr>
@@ -1445,7 +1445,7 @@
           <p:cNvPr id="7" name="Slide Number Placeholder 6">
             <a:extLst>
               <a:ext uri="{FF2B5EF4-FFF2-40B4-BE49-F238E27FC236}">
-                <a16:creationId xmlns:a16="http://schemas.microsoft.com/office/drawing/2014/main" id="{887B5567-9F4D-4AE1-92D8-769C9F7EA4F0}"/>
+                <a16:creationId xmlns:a16="http://schemas.microsoft.com/office/drawing/2014/main" xmlns="" id="{887B5567-9F4D-4AE1-92D8-769C9F7EA4F0}"/>
               </a:ext>
             </a:extLst>
           </p:cNvPr>
@@ -1504,7 +1504,7 @@
           <p:cNvPr id="2" name="Title 1">
             <a:extLst>
               <a:ext uri="{FF2B5EF4-FFF2-40B4-BE49-F238E27FC236}">
-                <a16:creationId xmlns:a16="http://schemas.microsoft.com/office/drawing/2014/main" id="{A40320A9-7C0C-45B4-BF2B-3B53B5686EBB}"/>
+                <a16:creationId xmlns:a16="http://schemas.microsoft.com/office/drawing/2014/main" xmlns="" id="{A40320A9-7C0C-45B4-BF2B-3B53B5686EBB}"/>
               </a:ext>
             </a:extLst>
           </p:cNvPr>
@@ -1537,7 +1537,7 @@
           <p:cNvPr id="3" name="Text Placeholder 2">
             <a:extLst>
               <a:ext uri="{FF2B5EF4-FFF2-40B4-BE49-F238E27FC236}">
-                <a16:creationId xmlns:a16="http://schemas.microsoft.com/office/drawing/2014/main" id="{8C440DE1-7DD6-4B1C-B961-CD2079B51F03}"/>
+                <a16:creationId xmlns:a16="http://schemas.microsoft.com/office/drawing/2014/main" xmlns="" id="{8C440DE1-7DD6-4B1C-B961-CD2079B51F03}"/>
               </a:ext>
             </a:extLst>
           </p:cNvPr>
@@ -1608,7 +1608,7 @@
           <p:cNvPr id="4" name="Content Placeholder 3">
             <a:extLst>
               <a:ext uri="{FF2B5EF4-FFF2-40B4-BE49-F238E27FC236}">
-                <a16:creationId xmlns:a16="http://schemas.microsoft.com/office/drawing/2014/main" id="{6FAFE840-CC9A-4D89-B05F-159EF756B427}"/>
+                <a16:creationId xmlns:a16="http://schemas.microsoft.com/office/drawing/2014/main" xmlns="" id="{6FAFE840-CC9A-4D89-B05F-159EF756B427}"/>
               </a:ext>
             </a:extLst>
           </p:cNvPr>
@@ -1670,7 +1670,7 @@
           <p:cNvPr id="5" name="Text Placeholder 4">
             <a:extLst>
               <a:ext uri="{FF2B5EF4-FFF2-40B4-BE49-F238E27FC236}">
-                <a16:creationId xmlns:a16="http://schemas.microsoft.com/office/drawing/2014/main" id="{4B87AADC-3401-48C6-98F6-0AB60F6DF9BE}"/>
+                <a16:creationId xmlns:a16="http://schemas.microsoft.com/office/drawing/2014/main" xmlns="" id="{4B87AADC-3401-48C6-98F6-0AB60F6DF9BE}"/>
               </a:ext>
             </a:extLst>
           </p:cNvPr>
@@ -1741,7 +1741,7 @@
           <p:cNvPr id="6" name="Content Placeholder 5">
             <a:extLst>
               <a:ext uri="{FF2B5EF4-FFF2-40B4-BE49-F238E27FC236}">
-                <a16:creationId xmlns:a16="http://schemas.microsoft.com/office/drawing/2014/main" id="{34BCF1A4-FB52-4DCD-80BC-324BA41C33CD}"/>
+                <a16:creationId xmlns:a16="http://schemas.microsoft.com/office/drawing/2014/main" xmlns="" id="{34BCF1A4-FB52-4DCD-80BC-324BA41C33CD}"/>
               </a:ext>
             </a:extLst>
           </p:cNvPr>
@@ -1803,7 +1803,7 @@
           <p:cNvPr id="7" name="Date Placeholder 6">
             <a:extLst>
               <a:ext uri="{FF2B5EF4-FFF2-40B4-BE49-F238E27FC236}">
-                <a16:creationId xmlns:a16="http://schemas.microsoft.com/office/drawing/2014/main" id="{8CFD4208-60E7-48B1-8CD0-717D5E26B827}"/>
+                <a16:creationId xmlns:a16="http://schemas.microsoft.com/office/drawing/2014/main" xmlns="" id="{8CFD4208-60E7-48B1-8CD0-717D5E26B827}"/>
               </a:ext>
             </a:extLst>
           </p:cNvPr>
@@ -1821,7 +1821,7 @@
           <a:p>
             <a:fld id="{6C733091-19F0-4DD7-90FE-000B4789B4CF}" type="datetimeFigureOut">
               <a:rPr lang="en-US" smtClean="0"/>
-              <a:t>8/6/2021</a:t>
+              <a:t>8/9/2021</a:t>
             </a:fld>
             <a:endParaRPr lang="en-US"/>
           </a:p>
@@ -1832,7 +1832,7 @@
           <p:cNvPr id="8" name="Footer Placeholder 7">
             <a:extLst>
               <a:ext uri="{FF2B5EF4-FFF2-40B4-BE49-F238E27FC236}">
-                <a16:creationId xmlns:a16="http://schemas.microsoft.com/office/drawing/2014/main" id="{94E429D1-BEB1-4D8A-91F2-CD4F80157F8D}"/>
+                <a16:creationId xmlns:a16="http://schemas.microsoft.com/office/drawing/2014/main" xmlns="" id="{94E429D1-BEB1-4D8A-91F2-CD4F80157F8D}"/>
               </a:ext>
             </a:extLst>
           </p:cNvPr>
@@ -1857,7 +1857,7 @@
           <p:cNvPr id="9" name="Slide Number Placeholder 8">
             <a:extLst>
               <a:ext uri="{FF2B5EF4-FFF2-40B4-BE49-F238E27FC236}">
-                <a16:creationId xmlns:a16="http://schemas.microsoft.com/office/drawing/2014/main" id="{6F17C19C-8370-4118-A8FC-5DDA6F84230F}"/>
+                <a16:creationId xmlns:a16="http://schemas.microsoft.com/office/drawing/2014/main" xmlns="" id="{6F17C19C-8370-4118-A8FC-5DDA6F84230F}"/>
               </a:ext>
             </a:extLst>
           </p:cNvPr>
@@ -1916,7 +1916,7 @@
           <p:cNvPr id="2" name="Title 1">
             <a:extLst>
               <a:ext uri="{FF2B5EF4-FFF2-40B4-BE49-F238E27FC236}">
-                <a16:creationId xmlns:a16="http://schemas.microsoft.com/office/drawing/2014/main" id="{252CBF36-7F99-45A9-BC35-BD2EC260CBF0}"/>
+                <a16:creationId xmlns:a16="http://schemas.microsoft.com/office/drawing/2014/main" xmlns="" id="{252CBF36-7F99-45A9-BC35-BD2EC260CBF0}"/>
               </a:ext>
             </a:extLst>
           </p:cNvPr>
@@ -1944,7 +1944,7 @@
           <p:cNvPr id="3" name="Date Placeholder 2">
             <a:extLst>
               <a:ext uri="{FF2B5EF4-FFF2-40B4-BE49-F238E27FC236}">
-                <a16:creationId xmlns:a16="http://schemas.microsoft.com/office/drawing/2014/main" id="{0D6F5F83-F07E-4501-B86B-9F96CD43993C}"/>
+                <a16:creationId xmlns:a16="http://schemas.microsoft.com/office/drawing/2014/main" xmlns="" id="{0D6F5F83-F07E-4501-B86B-9F96CD43993C}"/>
               </a:ext>
             </a:extLst>
           </p:cNvPr>
@@ -1962,7 +1962,7 @@
           <a:p>
             <a:fld id="{6C733091-19F0-4DD7-90FE-000B4789B4CF}" type="datetimeFigureOut">
               <a:rPr lang="en-US" smtClean="0"/>
-              <a:t>8/6/2021</a:t>
+              <a:t>8/9/2021</a:t>
             </a:fld>
             <a:endParaRPr lang="en-US"/>
           </a:p>
@@ -1973,7 +1973,7 @@
           <p:cNvPr id="4" name="Footer Placeholder 3">
             <a:extLst>
               <a:ext uri="{FF2B5EF4-FFF2-40B4-BE49-F238E27FC236}">
-                <a16:creationId xmlns:a16="http://schemas.microsoft.com/office/drawing/2014/main" id="{2861989B-F8E9-41FD-8E16-687424BCC266}"/>
+                <a16:creationId xmlns:a16="http://schemas.microsoft.com/office/drawing/2014/main" xmlns="" id="{2861989B-F8E9-41FD-8E16-687424BCC266}"/>
               </a:ext>
             </a:extLst>
           </p:cNvPr>
@@ -1998,7 +1998,7 @@
           <p:cNvPr id="5" name="Slide Number Placeholder 4">
             <a:extLst>
               <a:ext uri="{FF2B5EF4-FFF2-40B4-BE49-F238E27FC236}">
-                <a16:creationId xmlns:a16="http://schemas.microsoft.com/office/drawing/2014/main" id="{2026B6D7-7832-4815-95CE-5CEC39502825}"/>
+                <a16:creationId xmlns:a16="http://schemas.microsoft.com/office/drawing/2014/main" xmlns="" id="{2026B6D7-7832-4815-95CE-5CEC39502825}"/>
               </a:ext>
             </a:extLst>
           </p:cNvPr>
@@ -2057,7 +2057,7 @@
           <p:cNvPr id="2" name="Date Placeholder 1">
             <a:extLst>
               <a:ext uri="{FF2B5EF4-FFF2-40B4-BE49-F238E27FC236}">
-                <a16:creationId xmlns:a16="http://schemas.microsoft.com/office/drawing/2014/main" id="{9877919A-C4B6-46FD-A08A-9A4B867FE01A}"/>
+                <a16:creationId xmlns:a16="http://schemas.microsoft.com/office/drawing/2014/main" xmlns="" id="{9877919A-C4B6-46FD-A08A-9A4B867FE01A}"/>
               </a:ext>
             </a:extLst>
           </p:cNvPr>
@@ -2075,7 +2075,7 @@
           <a:p>
             <a:fld id="{6C733091-19F0-4DD7-90FE-000B4789B4CF}" type="datetimeFigureOut">
               <a:rPr lang="en-US" smtClean="0"/>
-              <a:t>8/6/2021</a:t>
+              <a:t>8/9/2021</a:t>
             </a:fld>
             <a:endParaRPr lang="en-US"/>
           </a:p>
@@ -2086,7 +2086,7 @@
           <p:cNvPr id="3" name="Footer Placeholder 2">
             <a:extLst>
               <a:ext uri="{FF2B5EF4-FFF2-40B4-BE49-F238E27FC236}">
-                <a16:creationId xmlns:a16="http://schemas.microsoft.com/office/drawing/2014/main" id="{9118539E-383C-4F1C-86F2-14C533A7E9FB}"/>
+                <a16:creationId xmlns:a16="http://schemas.microsoft.com/office/drawing/2014/main" xmlns="" id="{9118539E-383C-4F1C-86F2-14C533A7E9FB}"/>
               </a:ext>
             </a:extLst>
           </p:cNvPr>
@@ -2111,7 +2111,7 @@
           <p:cNvPr id="4" name="Slide Number Placeholder 3">
             <a:extLst>
               <a:ext uri="{FF2B5EF4-FFF2-40B4-BE49-F238E27FC236}">
-                <a16:creationId xmlns:a16="http://schemas.microsoft.com/office/drawing/2014/main" id="{C9A6D4E1-CA83-4214-9942-9E4617AA89BF}"/>
+                <a16:creationId xmlns:a16="http://schemas.microsoft.com/office/drawing/2014/main" xmlns="" id="{C9A6D4E1-CA83-4214-9942-9E4617AA89BF}"/>
               </a:ext>
             </a:extLst>
           </p:cNvPr>
@@ -2170,7 +2170,7 @@
           <p:cNvPr id="2" name="Title 1">
             <a:extLst>
               <a:ext uri="{FF2B5EF4-FFF2-40B4-BE49-F238E27FC236}">
-                <a16:creationId xmlns:a16="http://schemas.microsoft.com/office/drawing/2014/main" id="{046EF9B5-7A2A-4225-8817-86D028D6950C}"/>
+                <a16:creationId xmlns:a16="http://schemas.microsoft.com/office/drawing/2014/main" xmlns="" id="{046EF9B5-7A2A-4225-8817-86D028D6950C}"/>
               </a:ext>
             </a:extLst>
           </p:cNvPr>
@@ -2207,7 +2207,7 @@
           <p:cNvPr id="3" name="Content Placeholder 2">
             <a:extLst>
               <a:ext uri="{FF2B5EF4-FFF2-40B4-BE49-F238E27FC236}">
-                <a16:creationId xmlns:a16="http://schemas.microsoft.com/office/drawing/2014/main" id="{8667C390-5297-41E8-A403-22856007B051}"/>
+                <a16:creationId xmlns:a16="http://schemas.microsoft.com/office/drawing/2014/main" xmlns="" id="{8667C390-5297-41E8-A403-22856007B051}"/>
               </a:ext>
             </a:extLst>
           </p:cNvPr>
@@ -2297,7 +2297,7 @@
           <p:cNvPr id="4" name="Text Placeholder 3">
             <a:extLst>
               <a:ext uri="{FF2B5EF4-FFF2-40B4-BE49-F238E27FC236}">
-                <a16:creationId xmlns:a16="http://schemas.microsoft.com/office/drawing/2014/main" id="{8D0D2F7D-D6CD-4AB1-A3EA-CBFD2A2B3703}"/>
+                <a16:creationId xmlns:a16="http://schemas.microsoft.com/office/drawing/2014/main" xmlns="" id="{8D0D2F7D-D6CD-4AB1-A3EA-CBFD2A2B3703}"/>
               </a:ext>
             </a:extLst>
           </p:cNvPr>
@@ -2368,7 +2368,7 @@
           <p:cNvPr id="5" name="Date Placeholder 4">
             <a:extLst>
               <a:ext uri="{FF2B5EF4-FFF2-40B4-BE49-F238E27FC236}">
-                <a16:creationId xmlns:a16="http://schemas.microsoft.com/office/drawing/2014/main" id="{E17A441D-4FA7-4110-BF24-165CD3C3DAD7}"/>
+                <a16:creationId xmlns:a16="http://schemas.microsoft.com/office/drawing/2014/main" xmlns="" id="{E17A441D-4FA7-4110-BF24-165CD3C3DAD7}"/>
               </a:ext>
             </a:extLst>
           </p:cNvPr>
@@ -2386,7 +2386,7 @@
           <a:p>
             <a:fld id="{6C733091-19F0-4DD7-90FE-000B4789B4CF}" type="datetimeFigureOut">
               <a:rPr lang="en-US" smtClean="0"/>
-              <a:t>8/6/2021</a:t>
+              <a:t>8/9/2021</a:t>
             </a:fld>
             <a:endParaRPr lang="en-US"/>
           </a:p>
@@ -2397,7 +2397,7 @@
           <p:cNvPr id="6" name="Footer Placeholder 5">
             <a:extLst>
               <a:ext uri="{FF2B5EF4-FFF2-40B4-BE49-F238E27FC236}">
-                <a16:creationId xmlns:a16="http://schemas.microsoft.com/office/drawing/2014/main" id="{346102C5-5AE3-43CF-A686-1AB72B0790AB}"/>
+                <a16:creationId xmlns:a16="http://schemas.microsoft.com/office/drawing/2014/main" xmlns="" id="{346102C5-5AE3-43CF-A686-1AB72B0790AB}"/>
               </a:ext>
             </a:extLst>
           </p:cNvPr>
@@ -2422,7 +2422,7 @@
           <p:cNvPr id="7" name="Slide Number Placeholder 6">
             <a:extLst>
               <a:ext uri="{FF2B5EF4-FFF2-40B4-BE49-F238E27FC236}">
-                <a16:creationId xmlns:a16="http://schemas.microsoft.com/office/drawing/2014/main" id="{5528B3F7-462C-4500-8836-B3E5CD8DA61A}"/>
+                <a16:creationId xmlns:a16="http://schemas.microsoft.com/office/drawing/2014/main" xmlns="" id="{5528B3F7-462C-4500-8836-B3E5CD8DA61A}"/>
               </a:ext>
             </a:extLst>
           </p:cNvPr>
@@ -2481,7 +2481,7 @@
           <p:cNvPr id="2" name="Title 1">
             <a:extLst>
               <a:ext uri="{FF2B5EF4-FFF2-40B4-BE49-F238E27FC236}">
-                <a16:creationId xmlns:a16="http://schemas.microsoft.com/office/drawing/2014/main" id="{4BA10E59-DA48-4690-A956-9EB8E4E11EE5}"/>
+                <a16:creationId xmlns:a16="http://schemas.microsoft.com/office/drawing/2014/main" xmlns="" id="{4BA10E59-DA48-4690-A956-9EB8E4E11EE5}"/>
               </a:ext>
             </a:extLst>
           </p:cNvPr>
@@ -2518,7 +2518,7 @@
           <p:cNvPr id="3" name="Picture Placeholder 2">
             <a:extLst>
               <a:ext uri="{FF2B5EF4-FFF2-40B4-BE49-F238E27FC236}">
-                <a16:creationId xmlns:a16="http://schemas.microsoft.com/office/drawing/2014/main" id="{AC7AFE1E-67D1-4106-97CA-98302D42CC4D}"/>
+                <a16:creationId xmlns:a16="http://schemas.microsoft.com/office/drawing/2014/main" xmlns="" id="{AC7AFE1E-67D1-4106-97CA-98302D42CC4D}"/>
               </a:ext>
             </a:extLst>
           </p:cNvPr>
@@ -2585,7 +2585,7 @@
           <p:cNvPr id="4" name="Text Placeholder 3">
             <a:extLst>
               <a:ext uri="{FF2B5EF4-FFF2-40B4-BE49-F238E27FC236}">
-                <a16:creationId xmlns:a16="http://schemas.microsoft.com/office/drawing/2014/main" id="{67D8D73B-3D4D-42A7-9A3C-1D508E8A9B45}"/>
+                <a16:creationId xmlns:a16="http://schemas.microsoft.com/office/drawing/2014/main" xmlns="" id="{67D8D73B-3D4D-42A7-9A3C-1D508E8A9B45}"/>
               </a:ext>
             </a:extLst>
           </p:cNvPr>
@@ -2656,7 +2656,7 @@
           <p:cNvPr id="5" name="Date Placeholder 4">
             <a:extLst>
               <a:ext uri="{FF2B5EF4-FFF2-40B4-BE49-F238E27FC236}">
-                <a16:creationId xmlns:a16="http://schemas.microsoft.com/office/drawing/2014/main" id="{48C8945E-A47A-42A2-9DF6-CA6D5002F65F}"/>
+                <a16:creationId xmlns:a16="http://schemas.microsoft.com/office/drawing/2014/main" xmlns="" id="{48C8945E-A47A-42A2-9DF6-CA6D5002F65F}"/>
               </a:ext>
             </a:extLst>
           </p:cNvPr>
@@ -2674,7 +2674,7 @@
           <a:p>
             <a:fld id="{6C733091-19F0-4DD7-90FE-000B4789B4CF}" type="datetimeFigureOut">
               <a:rPr lang="en-US" smtClean="0"/>
-              <a:t>8/6/2021</a:t>
+              <a:t>8/9/2021</a:t>
             </a:fld>
             <a:endParaRPr lang="en-US"/>
           </a:p>
@@ -2685,7 +2685,7 @@
           <p:cNvPr id="6" name="Footer Placeholder 5">
             <a:extLst>
               <a:ext uri="{FF2B5EF4-FFF2-40B4-BE49-F238E27FC236}">
-                <a16:creationId xmlns:a16="http://schemas.microsoft.com/office/drawing/2014/main" id="{EB000DB4-2747-4297-B400-42A539FBDB42}"/>
+                <a16:creationId xmlns:a16="http://schemas.microsoft.com/office/drawing/2014/main" xmlns="" id="{EB000DB4-2747-4297-B400-42A539FBDB42}"/>
               </a:ext>
             </a:extLst>
           </p:cNvPr>
@@ -2710,7 +2710,7 @@
           <p:cNvPr id="7" name="Slide Number Placeholder 6">
             <a:extLst>
               <a:ext uri="{FF2B5EF4-FFF2-40B4-BE49-F238E27FC236}">
-                <a16:creationId xmlns:a16="http://schemas.microsoft.com/office/drawing/2014/main" id="{5BAD9222-F141-4803-AF73-E2DD92E2ABBC}"/>
+                <a16:creationId xmlns:a16="http://schemas.microsoft.com/office/drawing/2014/main" xmlns="" id="{5BAD9222-F141-4803-AF73-E2DD92E2ABBC}"/>
               </a:ext>
             </a:extLst>
           </p:cNvPr>
@@ -2774,7 +2774,7 @@
           <p:cNvPr id="2" name="Title Placeholder 1">
             <a:extLst>
               <a:ext uri="{FF2B5EF4-FFF2-40B4-BE49-F238E27FC236}">
-                <a16:creationId xmlns:a16="http://schemas.microsoft.com/office/drawing/2014/main" id="{5BF9D404-795C-4EA4-AD01-26740519239C}"/>
+                <a16:creationId xmlns:a16="http://schemas.microsoft.com/office/drawing/2014/main" xmlns="" id="{5BF9D404-795C-4EA4-AD01-26740519239C}"/>
               </a:ext>
             </a:extLst>
           </p:cNvPr>
@@ -2812,7 +2812,7 @@
           <p:cNvPr id="3" name="Text Placeholder 2">
             <a:extLst>
               <a:ext uri="{FF2B5EF4-FFF2-40B4-BE49-F238E27FC236}">
-                <a16:creationId xmlns:a16="http://schemas.microsoft.com/office/drawing/2014/main" id="{DE3FEC7B-48F8-4348-9BC6-68F83B859EE9}"/>
+                <a16:creationId xmlns:a16="http://schemas.microsoft.com/office/drawing/2014/main" xmlns="" id="{DE3FEC7B-48F8-4348-9BC6-68F83B859EE9}"/>
               </a:ext>
             </a:extLst>
           </p:cNvPr>
@@ -2879,7 +2879,7 @@
           <p:cNvPr id="4" name="Date Placeholder 3">
             <a:extLst>
               <a:ext uri="{FF2B5EF4-FFF2-40B4-BE49-F238E27FC236}">
-                <a16:creationId xmlns:a16="http://schemas.microsoft.com/office/drawing/2014/main" id="{31CA1A1D-E2F5-4161-A025-7B911965C2FE}"/>
+                <a16:creationId xmlns:a16="http://schemas.microsoft.com/office/drawing/2014/main" xmlns="" id="{31CA1A1D-E2F5-4161-A025-7B911965C2FE}"/>
               </a:ext>
             </a:extLst>
           </p:cNvPr>
@@ -2915,7 +2915,7 @@
           <a:p>
             <a:fld id="{6C733091-19F0-4DD7-90FE-000B4789B4CF}" type="datetimeFigureOut">
               <a:rPr lang="en-US" smtClean="0"/>
-              <a:t>8/6/2021</a:t>
+              <a:t>8/9/2021</a:t>
             </a:fld>
             <a:endParaRPr lang="en-US"/>
           </a:p>
@@ -2926,7 +2926,7 @@
           <p:cNvPr id="5" name="Footer Placeholder 4">
             <a:extLst>
               <a:ext uri="{FF2B5EF4-FFF2-40B4-BE49-F238E27FC236}">
-                <a16:creationId xmlns:a16="http://schemas.microsoft.com/office/drawing/2014/main" id="{43C7B926-18F3-4C13-AB92-764E10D324FB}"/>
+                <a16:creationId xmlns:a16="http://schemas.microsoft.com/office/drawing/2014/main" xmlns="" id="{43C7B926-18F3-4C13-AB92-764E10D324FB}"/>
               </a:ext>
             </a:extLst>
           </p:cNvPr>
@@ -2969,7 +2969,7 @@
           <p:cNvPr id="6" name="Slide Number Placeholder 5">
             <a:extLst>
               <a:ext uri="{FF2B5EF4-FFF2-40B4-BE49-F238E27FC236}">
-                <a16:creationId xmlns:a16="http://schemas.microsoft.com/office/drawing/2014/main" id="{734FA846-3BF6-46FD-80CF-34B300D244C0}"/>
+                <a16:creationId xmlns:a16="http://schemas.microsoft.com/office/drawing/2014/main" xmlns="" id="{734FA846-3BF6-46FD-80CF-34B300D244C0}"/>
               </a:ext>
             </a:extLst>
           </p:cNvPr>
@@ -3337,7 +3337,7 @@
           <p:cNvPr id="4" name="Rectangle 3">
             <a:extLst>
               <a:ext uri="{FF2B5EF4-FFF2-40B4-BE49-F238E27FC236}">
-                <a16:creationId xmlns:a16="http://schemas.microsoft.com/office/drawing/2014/main" id="{0A71868C-EF96-4004-8116-DFD1FCCEE6C3}"/>
+                <a16:creationId xmlns:a16="http://schemas.microsoft.com/office/drawing/2014/main" xmlns="" id="{0A71868C-EF96-4004-8116-DFD1FCCEE6C3}"/>
               </a:ext>
             </a:extLst>
           </p:cNvPr>
@@ -3393,7 +3393,7 @@
           <p:cNvPr id="5" name="Rectangle 4">
             <a:extLst>
               <a:ext uri="{FF2B5EF4-FFF2-40B4-BE49-F238E27FC236}">
-                <a16:creationId xmlns:a16="http://schemas.microsoft.com/office/drawing/2014/main" id="{67A88ADC-D070-420B-9A88-FDBA4865856A}"/>
+                <a16:creationId xmlns:a16="http://schemas.microsoft.com/office/drawing/2014/main" xmlns="" id="{67A88ADC-D070-420B-9A88-FDBA4865856A}"/>
               </a:ext>
             </a:extLst>
           </p:cNvPr>
@@ -3453,7 +3453,7 @@
           <p:cNvPr id="7" name="Straight Arrow Connector 6">
             <a:extLst>
               <a:ext uri="{FF2B5EF4-FFF2-40B4-BE49-F238E27FC236}">
-                <a16:creationId xmlns:a16="http://schemas.microsoft.com/office/drawing/2014/main" id="{45AD00B6-B022-4C7F-A523-E16E6292918D}"/>
+                <a16:creationId xmlns:a16="http://schemas.microsoft.com/office/drawing/2014/main" xmlns="" id="{45AD00B6-B022-4C7F-A523-E16E6292918D}"/>
               </a:ext>
             </a:extLst>
           </p:cNvPr>
@@ -3495,7 +3495,7 @@
           <p:cNvPr id="8" name="Rectangle 7">
             <a:extLst>
               <a:ext uri="{FF2B5EF4-FFF2-40B4-BE49-F238E27FC236}">
-                <a16:creationId xmlns:a16="http://schemas.microsoft.com/office/drawing/2014/main" id="{3C7A2B3E-B0CA-48CD-A6CB-935EF9D71843}"/>
+                <a16:creationId xmlns:a16="http://schemas.microsoft.com/office/drawing/2014/main" xmlns="" id="{3C7A2B3E-B0CA-48CD-A6CB-935EF9D71843}"/>
               </a:ext>
             </a:extLst>
           </p:cNvPr>
@@ -3555,7 +3555,7 @@
           <p:cNvPr id="9" name="TextBox 8">
             <a:extLst>
               <a:ext uri="{FF2B5EF4-FFF2-40B4-BE49-F238E27FC236}">
-                <a16:creationId xmlns:a16="http://schemas.microsoft.com/office/drawing/2014/main" id="{ABD7B54F-357C-489B-ADE1-DFA04BEA1686}"/>
+                <a16:creationId xmlns:a16="http://schemas.microsoft.com/office/drawing/2014/main" xmlns="" id="{ABD7B54F-357C-489B-ADE1-DFA04BEA1686}"/>
               </a:ext>
             </a:extLst>
           </p:cNvPr>
@@ -3590,7 +3590,7 @@
           <p:cNvPr id="10" name="Rectangle 9">
             <a:extLst>
               <a:ext uri="{FF2B5EF4-FFF2-40B4-BE49-F238E27FC236}">
-                <a16:creationId xmlns:a16="http://schemas.microsoft.com/office/drawing/2014/main" id="{21B869D6-66CB-4B38-975F-B7FEB6AA9B13}"/>
+                <a16:creationId xmlns:a16="http://schemas.microsoft.com/office/drawing/2014/main" xmlns="" id="{21B869D6-66CB-4B38-975F-B7FEB6AA9B13}"/>
               </a:ext>
             </a:extLst>
           </p:cNvPr>
@@ -3639,7 +3639,7 @@
           <p:cNvPr id="12" name="Straight Arrow Connector 11">
             <a:extLst>
               <a:ext uri="{FF2B5EF4-FFF2-40B4-BE49-F238E27FC236}">
-                <a16:creationId xmlns:a16="http://schemas.microsoft.com/office/drawing/2014/main" id="{78CBB1AB-C0E2-40F2-828D-F209304958AC}"/>
+                <a16:creationId xmlns:a16="http://schemas.microsoft.com/office/drawing/2014/main" xmlns="" id="{78CBB1AB-C0E2-40F2-828D-F209304958AC}"/>
               </a:ext>
             </a:extLst>
           </p:cNvPr>
@@ -3682,7 +3682,7 @@
           <p:cNvPr id="14" name="TextBox 13">
             <a:extLst>
               <a:ext uri="{FF2B5EF4-FFF2-40B4-BE49-F238E27FC236}">
-                <a16:creationId xmlns:a16="http://schemas.microsoft.com/office/drawing/2014/main" id="{E0BBD6C8-C8F2-40C5-AA64-85961A11ADC2}"/>
+                <a16:creationId xmlns:a16="http://schemas.microsoft.com/office/drawing/2014/main" xmlns="" id="{E0BBD6C8-C8F2-40C5-AA64-85961A11ADC2}"/>
               </a:ext>
             </a:extLst>
           </p:cNvPr>
@@ -3717,7 +3717,7 @@
           <p:cNvPr id="16" name="Straight Arrow Connector 15">
             <a:extLst>
               <a:ext uri="{FF2B5EF4-FFF2-40B4-BE49-F238E27FC236}">
-                <a16:creationId xmlns:a16="http://schemas.microsoft.com/office/drawing/2014/main" id="{22509349-F226-482F-AC14-E28C2411C4C3}"/>
+                <a16:creationId xmlns:a16="http://schemas.microsoft.com/office/drawing/2014/main" xmlns="" id="{22509349-F226-482F-AC14-E28C2411C4C3}"/>
               </a:ext>
             </a:extLst>
           </p:cNvPr>
@@ -3760,7 +3760,7 @@
           <p:cNvPr id="18" name="TextBox 17">
             <a:extLst>
               <a:ext uri="{FF2B5EF4-FFF2-40B4-BE49-F238E27FC236}">
-                <a16:creationId xmlns:a16="http://schemas.microsoft.com/office/drawing/2014/main" id="{E2DE2503-050C-47C3-BC73-C61D89CEB131}"/>
+                <a16:creationId xmlns:a16="http://schemas.microsoft.com/office/drawing/2014/main" xmlns="" id="{E2DE2503-050C-47C3-BC73-C61D89CEB131}"/>
               </a:ext>
             </a:extLst>
           </p:cNvPr>
@@ -3795,7 +3795,7 @@
           <p:cNvPr id="23" name="Straight Arrow Connector 22">
             <a:extLst>
               <a:ext uri="{FF2B5EF4-FFF2-40B4-BE49-F238E27FC236}">
-                <a16:creationId xmlns:a16="http://schemas.microsoft.com/office/drawing/2014/main" id="{5D314D83-3A56-4BD7-B215-19DEE4ED8C0B}"/>
+                <a16:creationId xmlns:a16="http://schemas.microsoft.com/office/drawing/2014/main" xmlns="" id="{5D314D83-3A56-4BD7-B215-19DEE4ED8C0B}"/>
               </a:ext>
             </a:extLst>
           </p:cNvPr>
@@ -3838,7 +3838,7 @@
           <p:cNvPr id="24" name="Straight Arrow Connector 23">
             <a:extLst>
               <a:ext uri="{FF2B5EF4-FFF2-40B4-BE49-F238E27FC236}">
-                <a16:creationId xmlns:a16="http://schemas.microsoft.com/office/drawing/2014/main" id="{874E7075-4C88-4378-99B9-DC474BE0CE65}"/>
+                <a16:creationId xmlns:a16="http://schemas.microsoft.com/office/drawing/2014/main" xmlns="" id="{874E7075-4C88-4378-99B9-DC474BE0CE65}"/>
               </a:ext>
             </a:extLst>
           </p:cNvPr>
@@ -3881,7 +3881,7 @@
           <p:cNvPr id="25" name="TextBox 24">
             <a:extLst>
               <a:ext uri="{FF2B5EF4-FFF2-40B4-BE49-F238E27FC236}">
-                <a16:creationId xmlns:a16="http://schemas.microsoft.com/office/drawing/2014/main" id="{171D93A1-C181-4F9C-8D75-C106DB531AB7}"/>
+                <a16:creationId xmlns:a16="http://schemas.microsoft.com/office/drawing/2014/main" xmlns="" id="{171D93A1-C181-4F9C-8D75-C106DB531AB7}"/>
               </a:ext>
             </a:extLst>
           </p:cNvPr>
@@ -3916,7 +3916,7 @@
           <p:cNvPr id="26" name="TextBox 25">
             <a:extLst>
               <a:ext uri="{FF2B5EF4-FFF2-40B4-BE49-F238E27FC236}">
-                <a16:creationId xmlns:a16="http://schemas.microsoft.com/office/drawing/2014/main" id="{03EAB749-77B2-435B-A0A3-02060FD4A06F}"/>
+                <a16:creationId xmlns:a16="http://schemas.microsoft.com/office/drawing/2014/main" xmlns="" id="{03EAB749-77B2-435B-A0A3-02060FD4A06F}"/>
               </a:ext>
             </a:extLst>
           </p:cNvPr>
@@ -3951,7 +3951,7 @@
           <p:cNvPr id="27" name="TextBox 26">
             <a:extLst>
               <a:ext uri="{FF2B5EF4-FFF2-40B4-BE49-F238E27FC236}">
-                <a16:creationId xmlns:a16="http://schemas.microsoft.com/office/drawing/2014/main" id="{7D8414B9-747D-41E7-A06D-8BBA5042C15C}"/>
+                <a16:creationId xmlns:a16="http://schemas.microsoft.com/office/drawing/2014/main" xmlns="" id="{7D8414B9-747D-41E7-A06D-8BBA5042C15C}"/>
               </a:ext>
             </a:extLst>
           </p:cNvPr>
@@ -3986,7 +3986,7 @@
           <p:cNvPr id="28" name="TextBox 27">
             <a:extLst>
               <a:ext uri="{FF2B5EF4-FFF2-40B4-BE49-F238E27FC236}">
-                <a16:creationId xmlns:a16="http://schemas.microsoft.com/office/drawing/2014/main" id="{F559714E-416D-4742-9901-ADC4D8BAC5FA}"/>
+                <a16:creationId xmlns:a16="http://schemas.microsoft.com/office/drawing/2014/main" xmlns="" id="{F559714E-416D-4742-9901-ADC4D8BAC5FA}"/>
               </a:ext>
             </a:extLst>
           </p:cNvPr>
@@ -4021,7 +4021,7 @@
           <p:cNvPr id="31" name="Rectangle 30">
             <a:extLst>
               <a:ext uri="{FF2B5EF4-FFF2-40B4-BE49-F238E27FC236}">
-                <a16:creationId xmlns:a16="http://schemas.microsoft.com/office/drawing/2014/main" id="{9061AF07-38B9-4B05-B6B2-1A74D7C0C618}"/>
+                <a16:creationId xmlns:a16="http://schemas.microsoft.com/office/drawing/2014/main" xmlns="" id="{9061AF07-38B9-4B05-B6B2-1A74D7C0C618}"/>
               </a:ext>
             </a:extLst>
           </p:cNvPr>
@@ -4081,7 +4081,7 @@
           <p:cNvPr id="33" name="Connector: Elbow 32">
             <a:extLst>
               <a:ext uri="{FF2B5EF4-FFF2-40B4-BE49-F238E27FC236}">
-                <a16:creationId xmlns:a16="http://schemas.microsoft.com/office/drawing/2014/main" id="{B367C937-E98B-4009-B48E-DBF7102DCFD1}"/>
+                <a16:creationId xmlns:a16="http://schemas.microsoft.com/office/drawing/2014/main" xmlns="" id="{B367C937-E98B-4009-B48E-DBF7102DCFD1}"/>
               </a:ext>
             </a:extLst>
           </p:cNvPr>
@@ -4123,7 +4123,7 @@
           <p:cNvPr id="34" name="TextBox 33">
             <a:extLst>
               <a:ext uri="{FF2B5EF4-FFF2-40B4-BE49-F238E27FC236}">
-                <a16:creationId xmlns:a16="http://schemas.microsoft.com/office/drawing/2014/main" id="{7FC33359-8BE1-4CD9-AD98-06C75CE8FF08}"/>
+                <a16:creationId xmlns:a16="http://schemas.microsoft.com/office/drawing/2014/main" xmlns="" id="{7FC33359-8BE1-4CD9-AD98-06C75CE8FF08}"/>
               </a:ext>
             </a:extLst>
           </p:cNvPr>
@@ -4158,7 +4158,7 @@
           <p:cNvPr id="35" name="Rectangle 34">
             <a:extLst>
               <a:ext uri="{FF2B5EF4-FFF2-40B4-BE49-F238E27FC236}">
-                <a16:creationId xmlns:a16="http://schemas.microsoft.com/office/drawing/2014/main" id="{85531841-C806-4F00-B17D-D19E7CE1C155}"/>
+                <a16:creationId xmlns:a16="http://schemas.microsoft.com/office/drawing/2014/main" xmlns="" id="{85531841-C806-4F00-B17D-D19E7CE1C155}"/>
               </a:ext>
             </a:extLst>
           </p:cNvPr>
@@ -4217,7 +4217,7 @@
           <p:cNvPr id="37" name="Connector: Elbow 36">
             <a:extLst>
               <a:ext uri="{FF2B5EF4-FFF2-40B4-BE49-F238E27FC236}">
-                <a16:creationId xmlns:a16="http://schemas.microsoft.com/office/drawing/2014/main" id="{1BFE62EC-0F5D-4135-832D-63D5DC95509C}"/>
+                <a16:creationId xmlns:a16="http://schemas.microsoft.com/office/drawing/2014/main" xmlns="" id="{1BFE62EC-0F5D-4135-832D-63D5DC95509C}"/>
               </a:ext>
             </a:extLst>
           </p:cNvPr>
@@ -4262,7 +4262,7 @@
           <p:cNvPr id="38" name="TextBox 37">
             <a:extLst>
               <a:ext uri="{FF2B5EF4-FFF2-40B4-BE49-F238E27FC236}">
-                <a16:creationId xmlns:a16="http://schemas.microsoft.com/office/drawing/2014/main" id="{892D5E6B-E445-4560-9C01-6D3C52FFC5AA}"/>
+                <a16:creationId xmlns:a16="http://schemas.microsoft.com/office/drawing/2014/main" xmlns="" id="{892D5E6B-E445-4560-9C01-6D3C52FFC5AA}"/>
               </a:ext>
             </a:extLst>
           </p:cNvPr>
@@ -4297,7 +4297,7 @@
           <p:cNvPr id="39" name="Rectangle 38">
             <a:extLst>
               <a:ext uri="{FF2B5EF4-FFF2-40B4-BE49-F238E27FC236}">
-                <a16:creationId xmlns:a16="http://schemas.microsoft.com/office/drawing/2014/main" id="{2F2BC059-EF97-4BEE-8F18-133838E3F2D8}"/>
+                <a16:creationId xmlns:a16="http://schemas.microsoft.com/office/drawing/2014/main" xmlns="" id="{2F2BC059-EF97-4BEE-8F18-133838E3F2D8}"/>
               </a:ext>
             </a:extLst>
           </p:cNvPr>
@@ -4346,7 +4346,7 @@
           <p:cNvPr id="44" name="TextBox 43">
             <a:extLst>
               <a:ext uri="{FF2B5EF4-FFF2-40B4-BE49-F238E27FC236}">
-                <a16:creationId xmlns:a16="http://schemas.microsoft.com/office/drawing/2014/main" id="{48B10C1F-BA7F-40E8-B79A-E87D7A3A66AB}"/>
+                <a16:creationId xmlns:a16="http://schemas.microsoft.com/office/drawing/2014/main" xmlns="" id="{48B10C1F-BA7F-40E8-B79A-E87D7A3A66AB}"/>
               </a:ext>
             </a:extLst>
           </p:cNvPr>
@@ -4561,7 +4561,7 @@
           <p:cNvPr id="11" name="TextBox 10">
             <a:extLst>
               <a:ext uri="{FF2B5EF4-FFF2-40B4-BE49-F238E27FC236}">
-                <a16:creationId xmlns:a16="http://schemas.microsoft.com/office/drawing/2014/main" id="{E0BBD6C8-C8F2-40C5-AA64-85961A11ADC2}"/>
+                <a16:creationId xmlns:a16="http://schemas.microsoft.com/office/drawing/2014/main" xmlns="" id="{E0BBD6C8-C8F2-40C5-AA64-85961A11ADC2}"/>
               </a:ext>
             </a:extLst>
           </p:cNvPr>
@@ -4689,7 +4689,7 @@
           <p:cNvPr id="19" name="TextBox 18">
             <a:extLst>
               <a:ext uri="{FF2B5EF4-FFF2-40B4-BE49-F238E27FC236}">
-                <a16:creationId xmlns:a16="http://schemas.microsoft.com/office/drawing/2014/main" id="{E0BBD6C8-C8F2-40C5-AA64-85961A11ADC2}"/>
+                <a16:creationId xmlns:a16="http://schemas.microsoft.com/office/drawing/2014/main" xmlns="" id="{E0BBD6C8-C8F2-40C5-AA64-85961A11ADC2}"/>
               </a:ext>
             </a:extLst>
           </p:cNvPr>
@@ -4811,7 +4811,7 @@
           <p:cNvPr id="23" name="TextBox 22">
             <a:extLst>
               <a:ext uri="{FF2B5EF4-FFF2-40B4-BE49-F238E27FC236}">
-                <a16:creationId xmlns:a16="http://schemas.microsoft.com/office/drawing/2014/main" id="{E0BBD6C8-C8F2-40C5-AA64-85961A11ADC2}"/>
+                <a16:creationId xmlns:a16="http://schemas.microsoft.com/office/drawing/2014/main" xmlns="" id="{E0BBD6C8-C8F2-40C5-AA64-85961A11ADC2}"/>
               </a:ext>
             </a:extLst>
           </p:cNvPr>
@@ -4931,7 +4931,7 @@
           <p:cNvPr id="28" name="TextBox 27">
             <a:extLst>
               <a:ext uri="{FF2B5EF4-FFF2-40B4-BE49-F238E27FC236}">
-                <a16:creationId xmlns:a16="http://schemas.microsoft.com/office/drawing/2014/main" id="{E0BBD6C8-C8F2-40C5-AA64-85961A11ADC2}"/>
+                <a16:creationId xmlns:a16="http://schemas.microsoft.com/office/drawing/2014/main" xmlns="" id="{E0BBD6C8-C8F2-40C5-AA64-85961A11ADC2}"/>
               </a:ext>
             </a:extLst>
           </p:cNvPr>
@@ -5060,7 +5060,7 @@
           <p:cNvPr id="34" name="TextBox 33">
             <a:extLst>
               <a:ext uri="{FF2B5EF4-FFF2-40B4-BE49-F238E27FC236}">
-                <a16:creationId xmlns:a16="http://schemas.microsoft.com/office/drawing/2014/main" id="{E0BBD6C8-C8F2-40C5-AA64-85961A11ADC2}"/>
+                <a16:creationId xmlns:a16="http://schemas.microsoft.com/office/drawing/2014/main" xmlns="" id="{E0BBD6C8-C8F2-40C5-AA64-85961A11ADC2}"/>
               </a:ext>
             </a:extLst>
           </p:cNvPr>
@@ -5192,7 +5192,7 @@
           <p:cNvPr id="38" name="TextBox 37">
             <a:extLst>
               <a:ext uri="{FF2B5EF4-FFF2-40B4-BE49-F238E27FC236}">
-                <a16:creationId xmlns:a16="http://schemas.microsoft.com/office/drawing/2014/main" id="{E0BBD6C8-C8F2-40C5-AA64-85961A11ADC2}"/>
+                <a16:creationId xmlns:a16="http://schemas.microsoft.com/office/drawing/2014/main" xmlns="" id="{E0BBD6C8-C8F2-40C5-AA64-85961A11ADC2}"/>
               </a:ext>
             </a:extLst>
           </p:cNvPr>
@@ -5362,7 +5362,7 @@
           <p:cNvPr id="44" name="TextBox 43">
             <a:extLst>
               <a:ext uri="{FF2B5EF4-FFF2-40B4-BE49-F238E27FC236}">
-                <a16:creationId xmlns:a16="http://schemas.microsoft.com/office/drawing/2014/main" id="{E0BBD6C8-C8F2-40C5-AA64-85961A11ADC2}"/>
+                <a16:creationId xmlns:a16="http://schemas.microsoft.com/office/drawing/2014/main" xmlns="" id="{E0BBD6C8-C8F2-40C5-AA64-85961A11ADC2}"/>
               </a:ext>
             </a:extLst>
           </p:cNvPr>
@@ -5397,7 +5397,7 @@
           <p:cNvPr id="45" name="TextBox 44">
             <a:extLst>
               <a:ext uri="{FF2B5EF4-FFF2-40B4-BE49-F238E27FC236}">
-                <a16:creationId xmlns:a16="http://schemas.microsoft.com/office/drawing/2014/main" id="{E0BBD6C8-C8F2-40C5-AA64-85961A11ADC2}"/>
+                <a16:creationId xmlns:a16="http://schemas.microsoft.com/office/drawing/2014/main" xmlns="" id="{E0BBD6C8-C8F2-40C5-AA64-85961A11ADC2}"/>
               </a:ext>
             </a:extLst>
           </p:cNvPr>
@@ -5432,7 +5432,7 @@
           <p:cNvPr id="26" name="TextBox 25">
             <a:extLst>
               <a:ext uri="{FF2B5EF4-FFF2-40B4-BE49-F238E27FC236}">
-                <a16:creationId xmlns:a16="http://schemas.microsoft.com/office/drawing/2014/main" id="{70BF22D6-D5A2-4CCC-8E2D-329E25668556}"/>
+                <a16:creationId xmlns:a16="http://schemas.microsoft.com/office/drawing/2014/main" xmlns="" id="{70BF22D6-D5A2-4CCC-8E2D-329E25668556}"/>
               </a:ext>
             </a:extLst>
           </p:cNvPr>
@@ -5648,7 +5648,7 @@
           <p:cNvPr id="11" name="TextBox 10">
             <a:extLst>
               <a:ext uri="{FF2B5EF4-FFF2-40B4-BE49-F238E27FC236}">
-                <a16:creationId xmlns:a16="http://schemas.microsoft.com/office/drawing/2014/main" id="{E0BBD6C8-C8F2-40C5-AA64-85961A11ADC2}"/>
+                <a16:creationId xmlns:a16="http://schemas.microsoft.com/office/drawing/2014/main" xmlns="" id="{E0BBD6C8-C8F2-40C5-AA64-85961A11ADC2}"/>
               </a:ext>
             </a:extLst>
           </p:cNvPr>
@@ -5783,7 +5783,7 @@
           <p:cNvPr id="19" name="TextBox 18">
             <a:extLst>
               <a:ext uri="{FF2B5EF4-FFF2-40B4-BE49-F238E27FC236}">
-                <a16:creationId xmlns:a16="http://schemas.microsoft.com/office/drawing/2014/main" id="{E0BBD6C8-C8F2-40C5-AA64-85961A11ADC2}"/>
+                <a16:creationId xmlns:a16="http://schemas.microsoft.com/office/drawing/2014/main" xmlns="" id="{E0BBD6C8-C8F2-40C5-AA64-85961A11ADC2}"/>
               </a:ext>
             </a:extLst>
           </p:cNvPr>
@@ -5905,7 +5905,7 @@
           <p:cNvPr id="23" name="TextBox 22">
             <a:extLst>
               <a:ext uri="{FF2B5EF4-FFF2-40B4-BE49-F238E27FC236}">
-                <a16:creationId xmlns:a16="http://schemas.microsoft.com/office/drawing/2014/main" id="{E0BBD6C8-C8F2-40C5-AA64-85961A11ADC2}"/>
+                <a16:creationId xmlns:a16="http://schemas.microsoft.com/office/drawing/2014/main" xmlns="" id="{E0BBD6C8-C8F2-40C5-AA64-85961A11ADC2}"/>
               </a:ext>
             </a:extLst>
           </p:cNvPr>
@@ -6019,7 +6019,7 @@
           <p:cNvPr id="28" name="TextBox 27">
             <a:extLst>
               <a:ext uri="{FF2B5EF4-FFF2-40B4-BE49-F238E27FC236}">
-                <a16:creationId xmlns:a16="http://schemas.microsoft.com/office/drawing/2014/main" id="{E0BBD6C8-C8F2-40C5-AA64-85961A11ADC2}"/>
+                <a16:creationId xmlns:a16="http://schemas.microsoft.com/office/drawing/2014/main" xmlns="" id="{E0BBD6C8-C8F2-40C5-AA64-85961A11ADC2}"/>
               </a:ext>
             </a:extLst>
           </p:cNvPr>
@@ -6140,7 +6140,7 @@
           <p:cNvPr id="34" name="TextBox 33">
             <a:extLst>
               <a:ext uri="{FF2B5EF4-FFF2-40B4-BE49-F238E27FC236}">
-                <a16:creationId xmlns:a16="http://schemas.microsoft.com/office/drawing/2014/main" id="{E0BBD6C8-C8F2-40C5-AA64-85961A11ADC2}"/>
+                <a16:creationId xmlns:a16="http://schemas.microsoft.com/office/drawing/2014/main" xmlns="" id="{E0BBD6C8-C8F2-40C5-AA64-85961A11ADC2}"/>
               </a:ext>
             </a:extLst>
           </p:cNvPr>
@@ -6261,7 +6261,7 @@
           <p:cNvPr id="38" name="TextBox 37">
             <a:extLst>
               <a:ext uri="{FF2B5EF4-FFF2-40B4-BE49-F238E27FC236}">
-                <a16:creationId xmlns:a16="http://schemas.microsoft.com/office/drawing/2014/main" id="{E0BBD6C8-C8F2-40C5-AA64-85961A11ADC2}"/>
+                <a16:creationId xmlns:a16="http://schemas.microsoft.com/office/drawing/2014/main" xmlns="" id="{E0BBD6C8-C8F2-40C5-AA64-85961A11ADC2}"/>
               </a:ext>
             </a:extLst>
           </p:cNvPr>
@@ -6425,7 +6425,7 @@
           <p:cNvPr id="44" name="TextBox 43">
             <a:extLst>
               <a:ext uri="{FF2B5EF4-FFF2-40B4-BE49-F238E27FC236}">
-                <a16:creationId xmlns:a16="http://schemas.microsoft.com/office/drawing/2014/main" id="{E0BBD6C8-C8F2-40C5-AA64-85961A11ADC2}"/>
+                <a16:creationId xmlns:a16="http://schemas.microsoft.com/office/drawing/2014/main" xmlns="" id="{E0BBD6C8-C8F2-40C5-AA64-85961A11ADC2}"/>
               </a:ext>
             </a:extLst>
           </p:cNvPr>
@@ -6460,7 +6460,7 @@
           <p:cNvPr id="45" name="TextBox 44">
             <a:extLst>
               <a:ext uri="{FF2B5EF4-FFF2-40B4-BE49-F238E27FC236}">
-                <a16:creationId xmlns:a16="http://schemas.microsoft.com/office/drawing/2014/main" id="{E0BBD6C8-C8F2-40C5-AA64-85961A11ADC2}"/>
+                <a16:creationId xmlns:a16="http://schemas.microsoft.com/office/drawing/2014/main" xmlns="" id="{E0BBD6C8-C8F2-40C5-AA64-85961A11ADC2}"/>
               </a:ext>
             </a:extLst>
           </p:cNvPr>
@@ -6495,7 +6495,7 @@
           <p:cNvPr id="26" name="TextBox 25">
             <a:extLst>
               <a:ext uri="{FF2B5EF4-FFF2-40B4-BE49-F238E27FC236}">
-                <a16:creationId xmlns:a16="http://schemas.microsoft.com/office/drawing/2014/main" id="{70BF22D6-D5A2-4CCC-8E2D-329E25668556}"/>
+                <a16:creationId xmlns:a16="http://schemas.microsoft.com/office/drawing/2014/main" xmlns="" id="{70BF22D6-D5A2-4CCC-8E2D-329E25668556}"/>
               </a:ext>
             </a:extLst>
           </p:cNvPr>
@@ -6530,7 +6530,7 @@
           <p:cNvPr id="40" name="TextBox 39">
             <a:extLst>
               <a:ext uri="{FF2B5EF4-FFF2-40B4-BE49-F238E27FC236}">
-                <a16:creationId xmlns:a16="http://schemas.microsoft.com/office/drawing/2014/main" id="{BF7734B1-6C1B-4ADB-BBA4-2510EE97BB9D}"/>
+                <a16:creationId xmlns:a16="http://schemas.microsoft.com/office/drawing/2014/main" xmlns="" id="{BF7734B1-6C1B-4ADB-BBA4-2510EE97BB9D}"/>
               </a:ext>
             </a:extLst>
           </p:cNvPr>
@@ -6565,7 +6565,7 @@
           <p:cNvPr id="32" name="Straight Arrow Connector 31">
             <a:extLst>
               <a:ext uri="{FF2B5EF4-FFF2-40B4-BE49-F238E27FC236}">
-                <a16:creationId xmlns:a16="http://schemas.microsoft.com/office/drawing/2014/main" id="{5BC5C957-DD00-47FE-A727-262A8F90A864}"/>
+                <a16:creationId xmlns:a16="http://schemas.microsoft.com/office/drawing/2014/main" xmlns="" id="{5BC5C957-DD00-47FE-A727-262A8F90A864}"/>
               </a:ext>
             </a:extLst>
           </p:cNvPr>
@@ -6908,7 +6908,7 @@
           <p:cNvPr id="19" name="TextBox 18">
             <a:extLst>
               <a:ext uri="{FF2B5EF4-FFF2-40B4-BE49-F238E27FC236}">
-                <a16:creationId xmlns:a16="http://schemas.microsoft.com/office/drawing/2014/main" id="{E0BBD6C8-C8F2-40C5-AA64-85961A11ADC2}"/>
+                <a16:creationId xmlns:a16="http://schemas.microsoft.com/office/drawing/2014/main" xmlns="" id="{E0BBD6C8-C8F2-40C5-AA64-85961A11ADC2}"/>
               </a:ext>
             </a:extLst>
           </p:cNvPr>
@@ -7034,7 +7034,7 @@
           <p:cNvPr id="23" name="TextBox 22">
             <a:extLst>
               <a:ext uri="{FF2B5EF4-FFF2-40B4-BE49-F238E27FC236}">
-                <a16:creationId xmlns:a16="http://schemas.microsoft.com/office/drawing/2014/main" id="{E0BBD6C8-C8F2-40C5-AA64-85961A11ADC2}"/>
+                <a16:creationId xmlns:a16="http://schemas.microsoft.com/office/drawing/2014/main" xmlns="" id="{E0BBD6C8-C8F2-40C5-AA64-85961A11ADC2}"/>
               </a:ext>
             </a:extLst>
           </p:cNvPr>
@@ -7151,7 +7151,7 @@
           <p:cNvPr id="28" name="TextBox 27">
             <a:extLst>
               <a:ext uri="{FF2B5EF4-FFF2-40B4-BE49-F238E27FC236}">
-                <a16:creationId xmlns:a16="http://schemas.microsoft.com/office/drawing/2014/main" id="{E0BBD6C8-C8F2-40C5-AA64-85961A11ADC2}"/>
+                <a16:creationId xmlns:a16="http://schemas.microsoft.com/office/drawing/2014/main" xmlns="" id="{E0BBD6C8-C8F2-40C5-AA64-85961A11ADC2}"/>
               </a:ext>
             </a:extLst>
           </p:cNvPr>
@@ -7276,7 +7276,7 @@
           <p:cNvPr id="34" name="TextBox 33">
             <a:extLst>
               <a:ext uri="{FF2B5EF4-FFF2-40B4-BE49-F238E27FC236}">
-                <a16:creationId xmlns:a16="http://schemas.microsoft.com/office/drawing/2014/main" id="{E0BBD6C8-C8F2-40C5-AA64-85961A11ADC2}"/>
+                <a16:creationId xmlns:a16="http://schemas.microsoft.com/office/drawing/2014/main" xmlns="" id="{E0BBD6C8-C8F2-40C5-AA64-85961A11ADC2}"/>
               </a:ext>
             </a:extLst>
           </p:cNvPr>
@@ -7402,7 +7402,7 @@
           <p:cNvPr id="38" name="TextBox 37">
             <a:extLst>
               <a:ext uri="{FF2B5EF4-FFF2-40B4-BE49-F238E27FC236}">
-                <a16:creationId xmlns:a16="http://schemas.microsoft.com/office/drawing/2014/main" id="{E0BBD6C8-C8F2-40C5-AA64-85961A11ADC2}"/>
+                <a16:creationId xmlns:a16="http://schemas.microsoft.com/office/drawing/2014/main" xmlns="" id="{E0BBD6C8-C8F2-40C5-AA64-85961A11ADC2}"/>
               </a:ext>
             </a:extLst>
           </p:cNvPr>
@@ -7572,7 +7572,7 @@
           <p:cNvPr id="44" name="TextBox 43">
             <a:extLst>
               <a:ext uri="{FF2B5EF4-FFF2-40B4-BE49-F238E27FC236}">
-                <a16:creationId xmlns:a16="http://schemas.microsoft.com/office/drawing/2014/main" id="{E0BBD6C8-C8F2-40C5-AA64-85961A11ADC2}"/>
+                <a16:creationId xmlns:a16="http://schemas.microsoft.com/office/drawing/2014/main" xmlns="" id="{E0BBD6C8-C8F2-40C5-AA64-85961A11ADC2}"/>
               </a:ext>
             </a:extLst>
           </p:cNvPr>
@@ -7607,7 +7607,7 @@
           <p:cNvPr id="45" name="TextBox 44">
             <a:extLst>
               <a:ext uri="{FF2B5EF4-FFF2-40B4-BE49-F238E27FC236}">
-                <a16:creationId xmlns:a16="http://schemas.microsoft.com/office/drawing/2014/main" id="{E0BBD6C8-C8F2-40C5-AA64-85961A11ADC2}"/>
+                <a16:creationId xmlns:a16="http://schemas.microsoft.com/office/drawing/2014/main" xmlns="" id="{E0BBD6C8-C8F2-40C5-AA64-85961A11ADC2}"/>
               </a:ext>
             </a:extLst>
           </p:cNvPr>
@@ -7642,7 +7642,7 @@
           <p:cNvPr id="26" name="TextBox 25">
             <a:extLst>
               <a:ext uri="{FF2B5EF4-FFF2-40B4-BE49-F238E27FC236}">
-                <a16:creationId xmlns:a16="http://schemas.microsoft.com/office/drawing/2014/main" id="{6C45E26E-8FEE-4439-A34B-789237C9C62C}"/>
+                <a16:creationId xmlns:a16="http://schemas.microsoft.com/office/drawing/2014/main" xmlns="" id="{6C45E26E-8FEE-4439-A34B-789237C9C62C}"/>
               </a:ext>
             </a:extLst>
           </p:cNvPr>
@@ -7667,8 +7667,13 @@
           <a:p>
             <a:r>
               <a:rPr lang="en-US" dirty="0"/>
-              <a:t>Project 0 Specific Database Access Client Model</a:t>
-            </a:r>
+              <a:t>Project 0 </a:t>
+            </a:r>
+            <a:r>
+              <a:rPr lang="en-US" dirty="0" smtClean="0"/>
+              <a:t>Client Control Model</a:t>
+            </a:r>
+            <a:endParaRPr lang="en-US" dirty="0"/>
           </a:p>
         </p:txBody>
       </p:sp>
@@ -7677,7 +7682,7 @@
           <p:cNvPr id="31" name="Rectangle 30">
             <a:extLst>
               <a:ext uri="{FF2B5EF4-FFF2-40B4-BE49-F238E27FC236}">
-                <a16:creationId xmlns:a16="http://schemas.microsoft.com/office/drawing/2014/main" id="{6D396BFC-10E0-4935-903B-EDC457BD1755}"/>
+                <a16:creationId xmlns:a16="http://schemas.microsoft.com/office/drawing/2014/main" xmlns="" id="{6D396BFC-10E0-4935-903B-EDC457BD1755}"/>
               </a:ext>
             </a:extLst>
           </p:cNvPr>
@@ -7737,7 +7742,7 @@
           <p:cNvPr id="32" name="Rectangle 31">
             <a:extLst>
               <a:ext uri="{FF2B5EF4-FFF2-40B4-BE49-F238E27FC236}">
-                <a16:creationId xmlns:a16="http://schemas.microsoft.com/office/drawing/2014/main" id="{02A645C8-F11F-438D-92DC-F6FCCA5ECFB8}"/>
+                <a16:creationId xmlns:a16="http://schemas.microsoft.com/office/drawing/2014/main" xmlns="" id="{02A645C8-F11F-438D-92DC-F6FCCA5ECFB8}"/>
               </a:ext>
             </a:extLst>
           </p:cNvPr>
@@ -7797,7 +7802,7 @@
           <p:cNvPr id="12" name="Straight Arrow Connector 11">
             <a:extLst>
               <a:ext uri="{FF2B5EF4-FFF2-40B4-BE49-F238E27FC236}">
-                <a16:creationId xmlns:a16="http://schemas.microsoft.com/office/drawing/2014/main" id="{FF2076CA-F897-4293-B6CD-7408EB452156}"/>
+                <a16:creationId xmlns:a16="http://schemas.microsoft.com/office/drawing/2014/main" xmlns="" id="{FF2076CA-F897-4293-B6CD-7408EB452156}"/>
               </a:ext>
             </a:extLst>
           </p:cNvPr>
@@ -7840,7 +7845,7 @@
           <p:cNvPr id="14" name="Straight Arrow Connector 13">
             <a:extLst>
               <a:ext uri="{FF2B5EF4-FFF2-40B4-BE49-F238E27FC236}">
-                <a16:creationId xmlns:a16="http://schemas.microsoft.com/office/drawing/2014/main" id="{5C625B7B-4A1E-46C5-9082-4FEC89B30DA9}"/>
+                <a16:creationId xmlns:a16="http://schemas.microsoft.com/office/drawing/2014/main" xmlns="" id="{5C625B7B-4A1E-46C5-9082-4FEC89B30DA9}"/>
               </a:ext>
             </a:extLst>
           </p:cNvPr>
@@ -7883,7 +7888,7 @@
           <p:cNvPr id="65" name="Straight Arrow Connector 64">
             <a:extLst>
               <a:ext uri="{FF2B5EF4-FFF2-40B4-BE49-F238E27FC236}">
-                <a16:creationId xmlns:a16="http://schemas.microsoft.com/office/drawing/2014/main" id="{C1C9B843-1D11-4D9F-8CBF-AE00E90AA070}"/>
+                <a16:creationId xmlns:a16="http://schemas.microsoft.com/office/drawing/2014/main" xmlns="" id="{C1C9B843-1D11-4D9F-8CBF-AE00E90AA070}"/>
               </a:ext>
             </a:extLst>
           </p:cNvPr>
@@ -7925,7 +7930,7 @@
           <p:cNvPr id="66" name="TextBox 65">
             <a:extLst>
               <a:ext uri="{FF2B5EF4-FFF2-40B4-BE49-F238E27FC236}">
-                <a16:creationId xmlns:a16="http://schemas.microsoft.com/office/drawing/2014/main" id="{5E4B2700-0522-40EF-B035-166AA1C17D76}"/>
+                <a16:creationId xmlns:a16="http://schemas.microsoft.com/office/drawing/2014/main" xmlns="" id="{5E4B2700-0522-40EF-B035-166AA1C17D76}"/>
               </a:ext>
             </a:extLst>
           </p:cNvPr>
@@ -8014,7 +8019,7 @@
           <p:cNvPr id="40" name="TextBox 39">
             <a:extLst>
               <a:ext uri="{FF2B5EF4-FFF2-40B4-BE49-F238E27FC236}">
-                <a16:creationId xmlns:a16="http://schemas.microsoft.com/office/drawing/2014/main" id="{E0BBD6C8-C8F2-40C5-AA64-85961A11ADC2}"/>
+                <a16:creationId xmlns:a16="http://schemas.microsoft.com/office/drawing/2014/main" xmlns="" id="{E0BBD6C8-C8F2-40C5-AA64-85961A11ADC2}"/>
               </a:ext>
             </a:extLst>
           </p:cNvPr>
@@ -8141,7 +8146,7 @@
           <p:cNvPr id="48" name="TextBox 47">
             <a:extLst>
               <a:ext uri="{FF2B5EF4-FFF2-40B4-BE49-F238E27FC236}">
-                <a16:creationId xmlns:a16="http://schemas.microsoft.com/office/drawing/2014/main" id="{E0BBD6C8-C8F2-40C5-AA64-85961A11ADC2}"/>
+                <a16:creationId xmlns:a16="http://schemas.microsoft.com/office/drawing/2014/main" xmlns="" id="{E0BBD6C8-C8F2-40C5-AA64-85961A11ADC2}"/>
               </a:ext>
             </a:extLst>
           </p:cNvPr>
@@ -8176,7 +8181,7 @@
           <p:cNvPr id="52" name="Rectangle 51">
             <a:extLst>
               <a:ext uri="{FF2B5EF4-FFF2-40B4-BE49-F238E27FC236}">
-                <a16:creationId xmlns:a16="http://schemas.microsoft.com/office/drawing/2014/main" id="{21B869D6-66CB-4B38-975F-B7FEB6AA9B13}"/>
+                <a16:creationId xmlns:a16="http://schemas.microsoft.com/office/drawing/2014/main" xmlns="" id="{21B869D6-66CB-4B38-975F-B7FEB6AA9B13}"/>
               </a:ext>
             </a:extLst>
           </p:cNvPr>
@@ -8297,7 +8302,7 @@
           <p:cNvPr id="58" name="TextBox 57">
             <a:extLst>
               <a:ext uri="{FF2B5EF4-FFF2-40B4-BE49-F238E27FC236}">
-                <a16:creationId xmlns:a16="http://schemas.microsoft.com/office/drawing/2014/main" id="{E0BBD6C8-C8F2-40C5-AA64-85961A11ADC2}"/>
+                <a16:creationId xmlns:a16="http://schemas.microsoft.com/office/drawing/2014/main" xmlns="" id="{E0BBD6C8-C8F2-40C5-AA64-85961A11ADC2}"/>
               </a:ext>
             </a:extLst>
           </p:cNvPr>
@@ -8405,7 +8410,7 @@
           <p:cNvPr id="94" name="TextBox 93">
             <a:extLst>
               <a:ext uri="{FF2B5EF4-FFF2-40B4-BE49-F238E27FC236}">
-                <a16:creationId xmlns:a16="http://schemas.microsoft.com/office/drawing/2014/main" id="{E0BBD6C8-C8F2-40C5-AA64-85961A11ADC2}"/>
+                <a16:creationId xmlns:a16="http://schemas.microsoft.com/office/drawing/2014/main" xmlns="" id="{E0BBD6C8-C8F2-40C5-AA64-85961A11ADC2}"/>
               </a:ext>
             </a:extLst>
           </p:cNvPr>
@@ -8440,7 +8445,7 @@
           <p:cNvPr id="95" name="TextBox 94">
             <a:extLst>
               <a:ext uri="{FF2B5EF4-FFF2-40B4-BE49-F238E27FC236}">
-                <a16:creationId xmlns:a16="http://schemas.microsoft.com/office/drawing/2014/main" id="{E0BBD6C8-C8F2-40C5-AA64-85961A11ADC2}"/>
+                <a16:creationId xmlns:a16="http://schemas.microsoft.com/office/drawing/2014/main" xmlns="" id="{E0BBD6C8-C8F2-40C5-AA64-85961A11ADC2}"/>
               </a:ext>
             </a:extLst>
           </p:cNvPr>
@@ -8511,7 +8516,7 @@
           <p:cNvPr id="53" name="Rectangle 52">
             <a:extLst>
               <a:ext uri="{FF2B5EF4-FFF2-40B4-BE49-F238E27FC236}">
-                <a16:creationId xmlns:a16="http://schemas.microsoft.com/office/drawing/2014/main" id="{6C40FF0E-1998-4874-BE17-1A4E9B40553E}"/>
+                <a16:creationId xmlns:a16="http://schemas.microsoft.com/office/drawing/2014/main" xmlns="" id="{6C40FF0E-1998-4874-BE17-1A4E9B40553E}"/>
               </a:ext>
             </a:extLst>
           </p:cNvPr>
@@ -8577,7 +8582,7 @@
           <p:cNvPr id="8" name="Straight Arrow Connector 7">
             <a:extLst>
               <a:ext uri="{FF2B5EF4-FFF2-40B4-BE49-F238E27FC236}">
-                <a16:creationId xmlns:a16="http://schemas.microsoft.com/office/drawing/2014/main" id="{ADE97499-DD4F-4E76-9405-EEDBB792874E}"/>
+                <a16:creationId xmlns:a16="http://schemas.microsoft.com/office/drawing/2014/main" xmlns="" id="{ADE97499-DD4F-4E76-9405-EEDBB792874E}"/>
               </a:ext>
             </a:extLst>
           </p:cNvPr>
@@ -8619,7 +8624,7 @@
           <p:cNvPr id="54" name="TextBox 53">
             <a:extLst>
               <a:ext uri="{FF2B5EF4-FFF2-40B4-BE49-F238E27FC236}">
-                <a16:creationId xmlns:a16="http://schemas.microsoft.com/office/drawing/2014/main" id="{342D31C0-1790-4E50-9650-E15403FD6F1F}"/>
+                <a16:creationId xmlns:a16="http://schemas.microsoft.com/office/drawing/2014/main" xmlns="" id="{342D31C0-1790-4E50-9650-E15403FD6F1F}"/>
               </a:ext>
             </a:extLst>
           </p:cNvPr>
@@ -8858,7 +8863,7 @@
           <p:cNvPr id="11" name="TextBox 10">
             <a:extLst>
               <a:ext uri="{FF2B5EF4-FFF2-40B4-BE49-F238E27FC236}">
-                <a16:creationId xmlns:a16="http://schemas.microsoft.com/office/drawing/2014/main" id="{E0BBD6C8-C8F2-40C5-AA64-85961A11ADC2}"/>
+                <a16:creationId xmlns:a16="http://schemas.microsoft.com/office/drawing/2014/main" xmlns="" id="{E0BBD6C8-C8F2-40C5-AA64-85961A11ADC2}"/>
               </a:ext>
             </a:extLst>
           </p:cNvPr>
@@ -9012,7 +9017,7 @@
           <p:cNvPr id="19" name="TextBox 18">
             <a:extLst>
               <a:ext uri="{FF2B5EF4-FFF2-40B4-BE49-F238E27FC236}">
-                <a16:creationId xmlns:a16="http://schemas.microsoft.com/office/drawing/2014/main" id="{E0BBD6C8-C8F2-40C5-AA64-85961A11ADC2}"/>
+                <a16:creationId xmlns:a16="http://schemas.microsoft.com/office/drawing/2014/main" xmlns="" id="{E0BBD6C8-C8F2-40C5-AA64-85961A11ADC2}"/>
               </a:ext>
             </a:extLst>
           </p:cNvPr>
@@ -9142,7 +9147,7 @@
           <p:cNvPr id="23" name="TextBox 22">
             <a:extLst>
               <a:ext uri="{FF2B5EF4-FFF2-40B4-BE49-F238E27FC236}">
-                <a16:creationId xmlns:a16="http://schemas.microsoft.com/office/drawing/2014/main" id="{E0BBD6C8-C8F2-40C5-AA64-85961A11ADC2}"/>
+                <a16:creationId xmlns:a16="http://schemas.microsoft.com/office/drawing/2014/main" xmlns="" id="{E0BBD6C8-C8F2-40C5-AA64-85961A11ADC2}"/>
               </a:ext>
             </a:extLst>
           </p:cNvPr>
@@ -9259,7 +9264,7 @@
           <p:cNvPr id="28" name="TextBox 27">
             <a:extLst>
               <a:ext uri="{FF2B5EF4-FFF2-40B4-BE49-F238E27FC236}">
-                <a16:creationId xmlns:a16="http://schemas.microsoft.com/office/drawing/2014/main" id="{E0BBD6C8-C8F2-40C5-AA64-85961A11ADC2}"/>
+                <a16:creationId xmlns:a16="http://schemas.microsoft.com/office/drawing/2014/main" xmlns="" id="{E0BBD6C8-C8F2-40C5-AA64-85961A11ADC2}"/>
               </a:ext>
             </a:extLst>
           </p:cNvPr>
@@ -9383,7 +9388,7 @@
           <p:cNvPr id="34" name="TextBox 33">
             <a:extLst>
               <a:ext uri="{FF2B5EF4-FFF2-40B4-BE49-F238E27FC236}">
-                <a16:creationId xmlns:a16="http://schemas.microsoft.com/office/drawing/2014/main" id="{E0BBD6C8-C8F2-40C5-AA64-85961A11ADC2}"/>
+                <a16:creationId xmlns:a16="http://schemas.microsoft.com/office/drawing/2014/main" xmlns="" id="{E0BBD6C8-C8F2-40C5-AA64-85961A11ADC2}"/>
               </a:ext>
             </a:extLst>
           </p:cNvPr>
@@ -9509,7 +9514,7 @@
           <p:cNvPr id="38" name="TextBox 37">
             <a:extLst>
               <a:ext uri="{FF2B5EF4-FFF2-40B4-BE49-F238E27FC236}">
-                <a16:creationId xmlns:a16="http://schemas.microsoft.com/office/drawing/2014/main" id="{E0BBD6C8-C8F2-40C5-AA64-85961A11ADC2}"/>
+                <a16:creationId xmlns:a16="http://schemas.microsoft.com/office/drawing/2014/main" xmlns="" id="{E0BBD6C8-C8F2-40C5-AA64-85961A11ADC2}"/>
               </a:ext>
             </a:extLst>
           </p:cNvPr>
@@ -9677,7 +9682,7 @@
           <p:cNvPr id="44" name="TextBox 43">
             <a:extLst>
               <a:ext uri="{FF2B5EF4-FFF2-40B4-BE49-F238E27FC236}">
-                <a16:creationId xmlns:a16="http://schemas.microsoft.com/office/drawing/2014/main" id="{E0BBD6C8-C8F2-40C5-AA64-85961A11ADC2}"/>
+                <a16:creationId xmlns:a16="http://schemas.microsoft.com/office/drawing/2014/main" xmlns="" id="{E0BBD6C8-C8F2-40C5-AA64-85961A11ADC2}"/>
               </a:ext>
             </a:extLst>
           </p:cNvPr>
@@ -9712,7 +9717,7 @@
           <p:cNvPr id="45" name="TextBox 44">
             <a:extLst>
               <a:ext uri="{FF2B5EF4-FFF2-40B4-BE49-F238E27FC236}">
-                <a16:creationId xmlns:a16="http://schemas.microsoft.com/office/drawing/2014/main" id="{E0BBD6C8-C8F2-40C5-AA64-85961A11ADC2}"/>
+                <a16:creationId xmlns:a16="http://schemas.microsoft.com/office/drawing/2014/main" xmlns="" id="{E0BBD6C8-C8F2-40C5-AA64-85961A11ADC2}"/>
               </a:ext>
             </a:extLst>
           </p:cNvPr>
@@ -9747,7 +9752,7 @@
           <p:cNvPr id="26" name="TextBox 25">
             <a:extLst>
               <a:ext uri="{FF2B5EF4-FFF2-40B4-BE49-F238E27FC236}">
-                <a16:creationId xmlns:a16="http://schemas.microsoft.com/office/drawing/2014/main" id="{6C45E26E-8FEE-4439-A34B-789237C9C62C}"/>
+                <a16:creationId xmlns:a16="http://schemas.microsoft.com/office/drawing/2014/main" xmlns="" id="{6C45E26E-8FEE-4439-A34B-789237C9C62C}"/>
               </a:ext>
             </a:extLst>
           </p:cNvPr>
@@ -9782,7 +9787,7 @@
           <p:cNvPr id="31" name="Rectangle 30">
             <a:extLst>
               <a:ext uri="{FF2B5EF4-FFF2-40B4-BE49-F238E27FC236}">
-                <a16:creationId xmlns:a16="http://schemas.microsoft.com/office/drawing/2014/main" id="{6D396BFC-10E0-4935-903B-EDC457BD1755}"/>
+                <a16:creationId xmlns:a16="http://schemas.microsoft.com/office/drawing/2014/main" xmlns="" id="{6D396BFC-10E0-4935-903B-EDC457BD1755}"/>
               </a:ext>
             </a:extLst>
           </p:cNvPr>
@@ -9842,7 +9847,7 @@
           <p:cNvPr id="32" name="Rectangle 31">
             <a:extLst>
               <a:ext uri="{FF2B5EF4-FFF2-40B4-BE49-F238E27FC236}">
-                <a16:creationId xmlns:a16="http://schemas.microsoft.com/office/drawing/2014/main" id="{02A645C8-F11F-438D-92DC-F6FCCA5ECFB8}"/>
+                <a16:creationId xmlns:a16="http://schemas.microsoft.com/office/drawing/2014/main" xmlns="" id="{02A645C8-F11F-438D-92DC-F6FCCA5ECFB8}"/>
               </a:ext>
             </a:extLst>
           </p:cNvPr>
@@ -9906,7 +9911,7 @@
           <p:cNvPr id="12" name="Straight Arrow Connector 11">
             <a:extLst>
               <a:ext uri="{FF2B5EF4-FFF2-40B4-BE49-F238E27FC236}">
-                <a16:creationId xmlns:a16="http://schemas.microsoft.com/office/drawing/2014/main" id="{FF2076CA-F897-4293-B6CD-7408EB452156}"/>
+                <a16:creationId xmlns:a16="http://schemas.microsoft.com/office/drawing/2014/main" xmlns="" id="{FF2076CA-F897-4293-B6CD-7408EB452156}"/>
               </a:ext>
             </a:extLst>
           </p:cNvPr>
@@ -9949,7 +9954,7 @@
           <p:cNvPr id="14" name="Straight Arrow Connector 13">
             <a:extLst>
               <a:ext uri="{FF2B5EF4-FFF2-40B4-BE49-F238E27FC236}">
-                <a16:creationId xmlns:a16="http://schemas.microsoft.com/office/drawing/2014/main" id="{5C625B7B-4A1E-46C5-9082-4FEC89B30DA9}"/>
+                <a16:creationId xmlns:a16="http://schemas.microsoft.com/office/drawing/2014/main" xmlns="" id="{5C625B7B-4A1E-46C5-9082-4FEC89B30DA9}"/>
               </a:ext>
             </a:extLst>
           </p:cNvPr>
@@ -9992,7 +9997,7 @@
           <p:cNvPr id="10" name="Straight Arrow Connector 9">
             <a:extLst>
               <a:ext uri="{FF2B5EF4-FFF2-40B4-BE49-F238E27FC236}">
-                <a16:creationId xmlns:a16="http://schemas.microsoft.com/office/drawing/2014/main" id="{EF2F45FB-579D-4721-9889-3C0942B8BBFD}"/>
+                <a16:creationId xmlns:a16="http://schemas.microsoft.com/office/drawing/2014/main" xmlns="" id="{EF2F45FB-579D-4721-9889-3C0942B8BBFD}"/>
               </a:ext>
             </a:extLst>
           </p:cNvPr>
@@ -10034,7 +10039,7 @@
           <p:cNvPr id="56" name="Rectangle 55">
             <a:extLst>
               <a:ext uri="{FF2B5EF4-FFF2-40B4-BE49-F238E27FC236}">
-                <a16:creationId xmlns:a16="http://schemas.microsoft.com/office/drawing/2014/main" id="{FA9C2261-AEDB-43AC-86CF-E53B84AB67B0}"/>
+                <a16:creationId xmlns:a16="http://schemas.microsoft.com/office/drawing/2014/main" xmlns="" id="{FA9C2261-AEDB-43AC-86CF-E53B84AB67B0}"/>
               </a:ext>
             </a:extLst>
           </p:cNvPr>
@@ -10124,7 +10129,7 @@
           <p:cNvPr id="61" name="Straight Arrow Connector 60">
             <a:extLst>
               <a:ext uri="{FF2B5EF4-FFF2-40B4-BE49-F238E27FC236}">
-                <a16:creationId xmlns:a16="http://schemas.microsoft.com/office/drawing/2014/main" id="{7A03C540-BE87-4015-8AA4-52E27BB970EE}"/>
+                <a16:creationId xmlns:a16="http://schemas.microsoft.com/office/drawing/2014/main" xmlns="" id="{7A03C540-BE87-4015-8AA4-52E27BB970EE}"/>
               </a:ext>
             </a:extLst>
           </p:cNvPr>
@@ -10166,7 +10171,7 @@
           <p:cNvPr id="63" name="TextBox 62">
             <a:extLst>
               <a:ext uri="{FF2B5EF4-FFF2-40B4-BE49-F238E27FC236}">
-                <a16:creationId xmlns:a16="http://schemas.microsoft.com/office/drawing/2014/main" id="{6A85EB8F-D36A-4163-A076-FD01F5C08B59}"/>
+                <a16:creationId xmlns:a16="http://schemas.microsoft.com/office/drawing/2014/main" xmlns="" id="{6A85EB8F-D36A-4163-A076-FD01F5C08B59}"/>
               </a:ext>
             </a:extLst>
           </p:cNvPr>
@@ -10201,7 +10206,7 @@
           <p:cNvPr id="64" name="TextBox 63">
             <a:extLst>
               <a:ext uri="{FF2B5EF4-FFF2-40B4-BE49-F238E27FC236}">
-                <a16:creationId xmlns:a16="http://schemas.microsoft.com/office/drawing/2014/main" id="{B306D2D8-E0F7-47AC-8F2B-DF5F03898A81}"/>
+                <a16:creationId xmlns:a16="http://schemas.microsoft.com/office/drawing/2014/main" xmlns="" id="{B306D2D8-E0F7-47AC-8F2B-DF5F03898A81}"/>
               </a:ext>
             </a:extLst>
           </p:cNvPr>
@@ -10327,7 +10332,7 @@
           <p:cNvPr id="46" name="TextBox 45">
             <a:extLst>
               <a:ext uri="{FF2B5EF4-FFF2-40B4-BE49-F238E27FC236}">
-                <a16:creationId xmlns:a16="http://schemas.microsoft.com/office/drawing/2014/main" id="{E0BBD6C8-C8F2-40C5-AA64-85961A11ADC2}"/>
+                <a16:creationId xmlns:a16="http://schemas.microsoft.com/office/drawing/2014/main" xmlns="" id="{E0BBD6C8-C8F2-40C5-AA64-85961A11ADC2}"/>
               </a:ext>
             </a:extLst>
           </p:cNvPr>
@@ -10566,7 +10571,7 @@
           <p:cNvPr id="11" name="TextBox 10">
             <a:extLst>
               <a:ext uri="{FF2B5EF4-FFF2-40B4-BE49-F238E27FC236}">
-                <a16:creationId xmlns:a16="http://schemas.microsoft.com/office/drawing/2014/main" id="{E0BBD6C8-C8F2-40C5-AA64-85961A11ADC2}"/>
+                <a16:creationId xmlns:a16="http://schemas.microsoft.com/office/drawing/2014/main" xmlns="" id="{E0BBD6C8-C8F2-40C5-AA64-85961A11ADC2}"/>
               </a:ext>
             </a:extLst>
           </p:cNvPr>
@@ -10723,7 +10728,7 @@
           <p:cNvPr id="19" name="TextBox 18">
             <a:extLst>
               <a:ext uri="{FF2B5EF4-FFF2-40B4-BE49-F238E27FC236}">
-                <a16:creationId xmlns:a16="http://schemas.microsoft.com/office/drawing/2014/main" id="{E0BBD6C8-C8F2-40C5-AA64-85961A11ADC2}"/>
+                <a16:creationId xmlns:a16="http://schemas.microsoft.com/office/drawing/2014/main" xmlns="" id="{E0BBD6C8-C8F2-40C5-AA64-85961A11ADC2}"/>
               </a:ext>
             </a:extLst>
           </p:cNvPr>
@@ -10849,7 +10854,7 @@
           <p:cNvPr id="23" name="TextBox 22">
             <a:extLst>
               <a:ext uri="{FF2B5EF4-FFF2-40B4-BE49-F238E27FC236}">
-                <a16:creationId xmlns:a16="http://schemas.microsoft.com/office/drawing/2014/main" id="{E0BBD6C8-C8F2-40C5-AA64-85961A11ADC2}"/>
+                <a16:creationId xmlns:a16="http://schemas.microsoft.com/office/drawing/2014/main" xmlns="" id="{E0BBD6C8-C8F2-40C5-AA64-85961A11ADC2}"/>
               </a:ext>
             </a:extLst>
           </p:cNvPr>
@@ -10966,7 +10971,7 @@
           <p:cNvPr id="28" name="TextBox 27">
             <a:extLst>
               <a:ext uri="{FF2B5EF4-FFF2-40B4-BE49-F238E27FC236}">
-                <a16:creationId xmlns:a16="http://schemas.microsoft.com/office/drawing/2014/main" id="{E0BBD6C8-C8F2-40C5-AA64-85961A11ADC2}"/>
+                <a16:creationId xmlns:a16="http://schemas.microsoft.com/office/drawing/2014/main" xmlns="" id="{E0BBD6C8-C8F2-40C5-AA64-85961A11ADC2}"/>
               </a:ext>
             </a:extLst>
           </p:cNvPr>
@@ -11091,7 +11096,7 @@
           <p:cNvPr id="34" name="TextBox 33">
             <a:extLst>
               <a:ext uri="{FF2B5EF4-FFF2-40B4-BE49-F238E27FC236}">
-                <a16:creationId xmlns:a16="http://schemas.microsoft.com/office/drawing/2014/main" id="{E0BBD6C8-C8F2-40C5-AA64-85961A11ADC2}"/>
+                <a16:creationId xmlns:a16="http://schemas.microsoft.com/office/drawing/2014/main" xmlns="" id="{E0BBD6C8-C8F2-40C5-AA64-85961A11ADC2}"/>
               </a:ext>
             </a:extLst>
           </p:cNvPr>
@@ -11217,7 +11222,7 @@
           <p:cNvPr id="38" name="TextBox 37">
             <a:extLst>
               <a:ext uri="{FF2B5EF4-FFF2-40B4-BE49-F238E27FC236}">
-                <a16:creationId xmlns:a16="http://schemas.microsoft.com/office/drawing/2014/main" id="{E0BBD6C8-C8F2-40C5-AA64-85961A11ADC2}"/>
+                <a16:creationId xmlns:a16="http://schemas.microsoft.com/office/drawing/2014/main" xmlns="" id="{E0BBD6C8-C8F2-40C5-AA64-85961A11ADC2}"/>
               </a:ext>
             </a:extLst>
           </p:cNvPr>
@@ -11385,7 +11390,7 @@
           <p:cNvPr id="44" name="TextBox 43">
             <a:extLst>
               <a:ext uri="{FF2B5EF4-FFF2-40B4-BE49-F238E27FC236}">
-                <a16:creationId xmlns:a16="http://schemas.microsoft.com/office/drawing/2014/main" id="{E0BBD6C8-C8F2-40C5-AA64-85961A11ADC2}"/>
+                <a16:creationId xmlns:a16="http://schemas.microsoft.com/office/drawing/2014/main" xmlns="" id="{E0BBD6C8-C8F2-40C5-AA64-85961A11ADC2}"/>
               </a:ext>
             </a:extLst>
           </p:cNvPr>
@@ -11420,7 +11425,7 @@
           <p:cNvPr id="45" name="TextBox 44">
             <a:extLst>
               <a:ext uri="{FF2B5EF4-FFF2-40B4-BE49-F238E27FC236}">
-                <a16:creationId xmlns:a16="http://schemas.microsoft.com/office/drawing/2014/main" id="{E0BBD6C8-C8F2-40C5-AA64-85961A11ADC2}"/>
+                <a16:creationId xmlns:a16="http://schemas.microsoft.com/office/drawing/2014/main" xmlns="" id="{E0BBD6C8-C8F2-40C5-AA64-85961A11ADC2}"/>
               </a:ext>
             </a:extLst>
           </p:cNvPr>
@@ -11455,7 +11460,7 @@
           <p:cNvPr id="26" name="TextBox 25">
             <a:extLst>
               <a:ext uri="{FF2B5EF4-FFF2-40B4-BE49-F238E27FC236}">
-                <a16:creationId xmlns:a16="http://schemas.microsoft.com/office/drawing/2014/main" id="{6C45E26E-8FEE-4439-A34B-789237C9C62C}"/>
+                <a16:creationId xmlns:a16="http://schemas.microsoft.com/office/drawing/2014/main" xmlns="" id="{6C45E26E-8FEE-4439-A34B-789237C9C62C}"/>
               </a:ext>
             </a:extLst>
           </p:cNvPr>
@@ -11490,7 +11495,7 @@
           <p:cNvPr id="31" name="Rectangle 30">
             <a:extLst>
               <a:ext uri="{FF2B5EF4-FFF2-40B4-BE49-F238E27FC236}">
-                <a16:creationId xmlns:a16="http://schemas.microsoft.com/office/drawing/2014/main" id="{6D396BFC-10E0-4935-903B-EDC457BD1755}"/>
+                <a16:creationId xmlns:a16="http://schemas.microsoft.com/office/drawing/2014/main" xmlns="" id="{6D396BFC-10E0-4935-903B-EDC457BD1755}"/>
               </a:ext>
             </a:extLst>
           </p:cNvPr>
@@ -11550,7 +11555,7 @@
           <p:cNvPr id="32" name="Rectangle 31">
             <a:extLst>
               <a:ext uri="{FF2B5EF4-FFF2-40B4-BE49-F238E27FC236}">
-                <a16:creationId xmlns:a16="http://schemas.microsoft.com/office/drawing/2014/main" id="{02A645C8-F11F-438D-92DC-F6FCCA5ECFB8}"/>
+                <a16:creationId xmlns:a16="http://schemas.microsoft.com/office/drawing/2014/main" xmlns="" id="{02A645C8-F11F-438D-92DC-F6FCCA5ECFB8}"/>
               </a:ext>
             </a:extLst>
           </p:cNvPr>
@@ -11610,7 +11615,7 @@
           <p:cNvPr id="12" name="Straight Arrow Connector 11">
             <a:extLst>
               <a:ext uri="{FF2B5EF4-FFF2-40B4-BE49-F238E27FC236}">
-                <a16:creationId xmlns:a16="http://schemas.microsoft.com/office/drawing/2014/main" id="{FF2076CA-F897-4293-B6CD-7408EB452156}"/>
+                <a16:creationId xmlns:a16="http://schemas.microsoft.com/office/drawing/2014/main" xmlns="" id="{FF2076CA-F897-4293-B6CD-7408EB452156}"/>
               </a:ext>
             </a:extLst>
           </p:cNvPr>
@@ -11653,7 +11658,7 @@
           <p:cNvPr id="14" name="Straight Arrow Connector 13">
             <a:extLst>
               <a:ext uri="{FF2B5EF4-FFF2-40B4-BE49-F238E27FC236}">
-                <a16:creationId xmlns:a16="http://schemas.microsoft.com/office/drawing/2014/main" id="{5C625B7B-4A1E-46C5-9082-4FEC89B30DA9}"/>
+                <a16:creationId xmlns:a16="http://schemas.microsoft.com/office/drawing/2014/main" xmlns="" id="{5C625B7B-4A1E-46C5-9082-4FEC89B30DA9}"/>
               </a:ext>
             </a:extLst>
           </p:cNvPr>
@@ -11696,7 +11701,7 @@
           <p:cNvPr id="10" name="Straight Arrow Connector 9">
             <a:extLst>
               <a:ext uri="{FF2B5EF4-FFF2-40B4-BE49-F238E27FC236}">
-                <a16:creationId xmlns:a16="http://schemas.microsoft.com/office/drawing/2014/main" id="{EF2F45FB-579D-4721-9889-3C0942B8BBFD}"/>
+                <a16:creationId xmlns:a16="http://schemas.microsoft.com/office/drawing/2014/main" xmlns="" id="{EF2F45FB-579D-4721-9889-3C0942B8BBFD}"/>
               </a:ext>
             </a:extLst>
           </p:cNvPr>
@@ -11738,7 +11743,7 @@
           <p:cNvPr id="36" name="Rectangle 35">
             <a:extLst>
               <a:ext uri="{FF2B5EF4-FFF2-40B4-BE49-F238E27FC236}">
-                <a16:creationId xmlns:a16="http://schemas.microsoft.com/office/drawing/2014/main" id="{93FBA679-F71B-47BD-BE29-21E7C2262CEB}"/>
+                <a16:creationId xmlns:a16="http://schemas.microsoft.com/office/drawing/2014/main" xmlns="" id="{93FBA679-F71B-47BD-BE29-21E7C2262CEB}"/>
               </a:ext>
             </a:extLst>
           </p:cNvPr>
@@ -11820,7 +11825,7 @@
           <p:cNvPr id="40" name="Straight Arrow Connector 39">
             <a:extLst>
               <a:ext uri="{FF2B5EF4-FFF2-40B4-BE49-F238E27FC236}">
-                <a16:creationId xmlns:a16="http://schemas.microsoft.com/office/drawing/2014/main" id="{4EB51AD1-53A9-412E-933D-8DFB38C76755}"/>
+                <a16:creationId xmlns:a16="http://schemas.microsoft.com/office/drawing/2014/main" xmlns="" id="{4EB51AD1-53A9-412E-933D-8DFB38C76755}"/>
               </a:ext>
             </a:extLst>
           </p:cNvPr>
@@ -11863,7 +11868,7 @@
           <p:cNvPr id="42" name="TextBox 41">
             <a:extLst>
               <a:ext uri="{FF2B5EF4-FFF2-40B4-BE49-F238E27FC236}">
-                <a16:creationId xmlns:a16="http://schemas.microsoft.com/office/drawing/2014/main" id="{42986CB5-3F27-4531-B052-275C80DE06A9}"/>
+                <a16:creationId xmlns:a16="http://schemas.microsoft.com/office/drawing/2014/main" xmlns="" id="{42986CB5-3F27-4531-B052-275C80DE06A9}"/>
               </a:ext>
             </a:extLst>
           </p:cNvPr>
@@ -11898,7 +11903,7 @@
           <p:cNvPr id="46" name="TextBox 45">
             <a:extLst>
               <a:ext uri="{FF2B5EF4-FFF2-40B4-BE49-F238E27FC236}">
-                <a16:creationId xmlns:a16="http://schemas.microsoft.com/office/drawing/2014/main" id="{5EBBC5A0-26BA-4B6E-A551-6AD1BA1617D0}"/>
+                <a16:creationId xmlns:a16="http://schemas.microsoft.com/office/drawing/2014/main" xmlns="" id="{5EBBC5A0-26BA-4B6E-A551-6AD1BA1617D0}"/>
               </a:ext>
             </a:extLst>
           </p:cNvPr>
@@ -12025,7 +12030,7 @@
           <p:cNvPr id="48" name="TextBox 47">
             <a:extLst>
               <a:ext uri="{FF2B5EF4-FFF2-40B4-BE49-F238E27FC236}">
-                <a16:creationId xmlns:a16="http://schemas.microsoft.com/office/drawing/2014/main" id="{E0BBD6C8-C8F2-40C5-AA64-85961A11ADC2}"/>
+                <a16:creationId xmlns:a16="http://schemas.microsoft.com/office/drawing/2014/main" xmlns="" id="{E0BBD6C8-C8F2-40C5-AA64-85961A11ADC2}"/>
               </a:ext>
             </a:extLst>
           </p:cNvPr>
@@ -12240,7 +12245,7 @@
           <p:cNvPr id="11" name="TextBox 10">
             <a:extLst>
               <a:ext uri="{FF2B5EF4-FFF2-40B4-BE49-F238E27FC236}">
-                <a16:creationId xmlns:a16="http://schemas.microsoft.com/office/drawing/2014/main" id="{E0BBD6C8-C8F2-40C5-AA64-85961A11ADC2}"/>
+                <a16:creationId xmlns:a16="http://schemas.microsoft.com/office/drawing/2014/main" xmlns="" id="{E0BBD6C8-C8F2-40C5-AA64-85961A11ADC2}"/>
               </a:ext>
             </a:extLst>
           </p:cNvPr>

</xml_diff>